<commit_message>
adding more artifacts for poster
</commit_message>
<xml_diff>
--- a/Poster Artifacts/Poster.pptx
+++ b/Poster Artifacts/Poster.pptx
@@ -303,7 +303,7 @@
             <a:fld id="{1D8BD707-D9CF-40AE-B4C6-C98DA3205C09}" type="datetimeFigureOut">
               <a:rPr lang="en-US" smtClean="0"/>
               <a:pPr/>
-              <a:t>1/27/2017</a:t>
+              <a:t>1/31/2017</a:t>
             </a:fld>
             <a:endParaRPr lang="en-US"/>
           </a:p>
@@ -468,7 +468,7 @@
             <a:fld id="{1D8BD707-D9CF-40AE-B4C6-C98DA3205C09}" type="datetimeFigureOut">
               <a:rPr lang="en-US" smtClean="0"/>
               <a:pPr/>
-              <a:t>1/27/2017</a:t>
+              <a:t>1/31/2017</a:t>
             </a:fld>
             <a:endParaRPr lang="en-US"/>
           </a:p>
@@ -643,7 +643,7 @@
             <a:fld id="{1D8BD707-D9CF-40AE-B4C6-C98DA3205C09}" type="datetimeFigureOut">
               <a:rPr lang="en-US" smtClean="0"/>
               <a:pPr/>
-              <a:t>1/27/2017</a:t>
+              <a:t>1/31/2017</a:t>
             </a:fld>
             <a:endParaRPr lang="en-US"/>
           </a:p>
@@ -808,7 +808,7 @@
             <a:fld id="{1D8BD707-D9CF-40AE-B4C6-C98DA3205C09}" type="datetimeFigureOut">
               <a:rPr lang="en-US" smtClean="0"/>
               <a:pPr/>
-              <a:t>1/27/2017</a:t>
+              <a:t>1/31/2017</a:t>
             </a:fld>
             <a:endParaRPr lang="en-US"/>
           </a:p>
@@ -1050,7 +1050,7 @@
             <a:fld id="{1D8BD707-D9CF-40AE-B4C6-C98DA3205C09}" type="datetimeFigureOut">
               <a:rPr lang="en-US" smtClean="0"/>
               <a:pPr/>
-              <a:t>1/27/2017</a:t>
+              <a:t>1/31/2017</a:t>
             </a:fld>
             <a:endParaRPr lang="en-US"/>
           </a:p>
@@ -1332,7 +1332,7 @@
             <a:fld id="{1D8BD707-D9CF-40AE-B4C6-C98DA3205C09}" type="datetimeFigureOut">
               <a:rPr lang="en-US" smtClean="0"/>
               <a:pPr/>
-              <a:t>1/27/2017</a:t>
+              <a:t>1/31/2017</a:t>
             </a:fld>
             <a:endParaRPr lang="en-US"/>
           </a:p>
@@ -1748,7 +1748,7 @@
             <a:fld id="{1D8BD707-D9CF-40AE-B4C6-C98DA3205C09}" type="datetimeFigureOut">
               <a:rPr lang="en-US" smtClean="0"/>
               <a:pPr/>
-              <a:t>1/27/2017</a:t>
+              <a:t>1/31/2017</a:t>
             </a:fld>
             <a:endParaRPr lang="en-US"/>
           </a:p>
@@ -1862,7 +1862,7 @@
             <a:fld id="{1D8BD707-D9CF-40AE-B4C6-C98DA3205C09}" type="datetimeFigureOut">
               <a:rPr lang="en-US" smtClean="0"/>
               <a:pPr/>
-              <a:t>1/27/2017</a:t>
+              <a:t>1/31/2017</a:t>
             </a:fld>
             <a:endParaRPr lang="en-US"/>
           </a:p>
@@ -1954,7 +1954,7 @@
             <a:fld id="{1D8BD707-D9CF-40AE-B4C6-C98DA3205C09}" type="datetimeFigureOut">
               <a:rPr lang="en-US" smtClean="0"/>
               <a:pPr/>
-              <a:t>1/27/2017</a:t>
+              <a:t>1/31/2017</a:t>
             </a:fld>
             <a:endParaRPr lang="en-US"/>
           </a:p>
@@ -2226,7 +2226,7 @@
             <a:fld id="{1D8BD707-D9CF-40AE-B4C6-C98DA3205C09}" type="datetimeFigureOut">
               <a:rPr lang="en-US" smtClean="0"/>
               <a:pPr/>
-              <a:t>1/27/2017</a:t>
+              <a:t>1/31/2017</a:t>
             </a:fld>
             <a:endParaRPr lang="en-US"/>
           </a:p>
@@ -2475,7 +2475,7 @@
             <a:fld id="{1D8BD707-D9CF-40AE-B4C6-C98DA3205C09}" type="datetimeFigureOut">
               <a:rPr lang="en-US" smtClean="0"/>
               <a:pPr/>
-              <a:t>1/27/2017</a:t>
+              <a:t>1/31/2017</a:t>
             </a:fld>
             <a:endParaRPr lang="en-US"/>
           </a:p>
@@ -2683,7 +2683,7 @@
             <a:fld id="{1D8BD707-D9CF-40AE-B4C6-C98DA3205C09}" type="datetimeFigureOut">
               <a:rPr lang="en-US" smtClean="0"/>
               <a:pPr/>
-              <a:t>1/27/2017</a:t>
+              <a:t>1/31/2017</a:t>
             </a:fld>
             <a:endParaRPr lang="en-US"/>
           </a:p>
@@ -3094,8 +3094,8 @@
         </p:nvSpPr>
         <p:spPr bwMode="auto">
           <a:xfrm>
-            <a:off x="16659356" y="71460"/>
-            <a:ext cx="12330113" cy="1585753"/>
+            <a:off x="16659356" y="304800"/>
+            <a:ext cx="12330113" cy="3316877"/>
           </a:xfrm>
           <a:prstGeom prst="rect">
             <a:avLst/>
@@ -3224,1361 +3224,41 @@
                 </a:solidFill>
                 <a:latin typeface="Impact" pitchFamily="34" charset="0"/>
               </a:rPr>
-              <a:t>NEAR FIELD COMMUNICATION</a:t>
-            </a:r>
-          </a:p>
-        </p:txBody>
-      </p:sp>
-      <p:sp>
-        <p:nvSpPr>
-          <p:cNvPr id="21" name="Text Box 19"/>
-          <p:cNvSpPr txBox="1">
-            <a:spLocks noChangeArrowheads="1"/>
-          </p:cNvSpPr>
-          <p:nvPr/>
-        </p:nvSpPr>
-        <p:spPr bwMode="auto">
-          <a:xfrm>
-            <a:off x="13563600" y="23864193"/>
-            <a:ext cx="17841349" cy="4421187"/>
-          </a:xfrm>
-          <a:prstGeom prst="rect">
-            <a:avLst/>
-          </a:prstGeom>
-          <a:noFill/>
-          <a:ln w="19050">
-            <a:solidFill>
-              <a:srgbClr val="FFFFFF"/>
-            </a:solidFill>
-            <a:prstDash val="dash"/>
-            <a:miter lim="800000"/>
-            <a:headEnd/>
-            <a:tailEnd/>
-          </a:ln>
-          <a:effectLst/>
-          <a:extLst>
-            <a:ext uri="{909E8E84-426E-40DD-AFC4-6F175D3DCCD1}">
-              <a14:hiddenFill xmlns:a14="http://schemas.microsoft.com/office/drawing/2010/main">
-                <a:solidFill>
-                  <a:schemeClr val="accent1"/>
-                </a:solidFill>
-              </a14:hiddenFill>
-            </a:ext>
-            <a:ext uri="{AF507438-7753-43E0-B8FC-AC1667EBCBE1}">
-              <a14:hiddenEffects xmlns:a14="http://schemas.microsoft.com/office/drawing/2010/main">
-                <a:effectLst>
-                  <a:outerShdw dist="35921" dir="2700000" algn="ctr" rotWithShape="0">
-                    <a:schemeClr val="bg2"/>
-                  </a:outerShdw>
-                </a:effectLst>
-              </a14:hiddenEffects>
-            </a:ext>
-          </a:extLst>
-        </p:spPr>
-        <p:txBody>
-          <a:bodyPr lIns="228600" tIns="228600" rIns="228600" bIns="228600"/>
-          <a:lstStyle/>
-          <a:p>
-            <a:pPr marL="0" marR="0" lvl="0" indent="0" defTabSz="457200" eaLnBrk="1" fontAlgn="auto" latinLnBrk="0" hangingPunct="1">
-              <a:lnSpc>
-                <a:spcPct val="100000"/>
-              </a:lnSpc>
-              <a:spcBef>
-                <a:spcPts val="0"/>
-              </a:spcBef>
-              <a:spcAft>
-                <a:spcPts val="0"/>
-              </a:spcAft>
-              <a:buClrTx/>
-              <a:buSzTx/>
-              <a:buFontTx/>
-              <a:buNone/>
-              <a:tabLst/>
-              <a:defRPr/>
-            </a:pPr>
-            <a:r>
-              <a:rPr kumimoji="0" lang="en-US" sz="1800" b="1" i="0" u="none" strike="noStrike" kern="0" cap="none" spc="0" normalizeH="0" baseline="0" noProof="0" dirty="0" err="1">
-                <a:ln>
-                  <a:noFill/>
+              <a:t>NEAR FIELD </a:t>
+            </a:r>
+          </a:p>
+          <a:p>
+            <a:pPr algn="ctr"/>
+            <a:r>
+              <a:rPr lang="en-US" sz="8000" dirty="0">
+                <a:ln w="34925" cap="rnd" cmpd="sng">
+                  <a:solidFill>
+                    <a:srgbClr val="6F6F74"/>
+                  </a:solidFill>
                 </a:ln>
-                <a:effectLst/>
-                <a:uLnTx/>
-                <a:uFillTx/>
-                <a:latin typeface="Century Schoolbook" panose="02040604050505020304"/>
-              </a:rPr>
-              <a:t>Genigraphics</a:t>
-            </a:r>
-            <a:r>
-              <a:rPr kumimoji="0" lang="en-US" sz="1800" b="0" i="0" u="none" strike="noStrike" kern="0" cap="none" spc="0" normalizeH="0" baseline="0" noProof="0" dirty="0">
-                <a:ln>
-                  <a:noFill/>
-                </a:ln>
-                <a:effectLst/>
-                <a:uLnTx/>
-                <a:uFillTx/>
-                <a:latin typeface="Century Schoolbook" panose="02040604050505020304"/>
-              </a:rPr>
-              <a:t> has provided this template to assist in preparation of a medical or scientific research poster. The dimensions are set to 36” high by 48” wide but prints can also be scaled up proportionally as large as 54” high by 72” wide. When you order your print we will know to scale the original file to the size you specify.</a:t>
-            </a:r>
-          </a:p>
-          <a:p>
-            <a:pPr marL="0" marR="0" lvl="0" indent="0" defTabSz="457200" eaLnBrk="1" fontAlgn="auto" latinLnBrk="0" hangingPunct="1">
-              <a:lnSpc>
-                <a:spcPct val="100000"/>
-              </a:lnSpc>
-              <a:spcBef>
-                <a:spcPts val="0"/>
-              </a:spcBef>
-              <a:spcAft>
-                <a:spcPts val="0"/>
-              </a:spcAft>
-              <a:buClrTx/>
-              <a:buSzTx/>
-              <a:buFontTx/>
-              <a:buNone/>
-              <a:tabLst/>
-              <a:defRPr/>
-            </a:pPr>
-            <a:endParaRPr kumimoji="0" lang="en-US" sz="1800" b="0" i="0" u="none" strike="noStrike" kern="0" cap="none" spc="0" normalizeH="0" baseline="0" noProof="0" dirty="0">
-              <a:ln>
-                <a:noFill/>
-              </a:ln>
-              <a:effectLst/>
-              <a:uLnTx/>
-              <a:uFillTx/>
-              <a:latin typeface="Century Schoolbook" panose="02040604050505020304"/>
-            </a:endParaRPr>
-          </a:p>
-          <a:p>
-            <a:pPr marL="0" marR="0" lvl="0" indent="0" defTabSz="457200" eaLnBrk="1" fontAlgn="auto" latinLnBrk="0" hangingPunct="1">
-              <a:lnSpc>
-                <a:spcPct val="100000"/>
-              </a:lnSpc>
-              <a:spcBef>
-                <a:spcPts val="0"/>
-              </a:spcBef>
-              <a:spcAft>
-                <a:spcPts val="0"/>
-              </a:spcAft>
-              <a:buClrTx/>
-              <a:buSzTx/>
-              <a:buFontTx/>
-              <a:buNone/>
-              <a:tabLst/>
-              <a:defRPr/>
-            </a:pPr>
-            <a:r>
-              <a:rPr kumimoji="0" lang="en-US" sz="1800" b="0" i="0" u="none" strike="noStrike" kern="0" cap="none" spc="0" normalizeH="0" baseline="0" noProof="0" dirty="0">
-                <a:ln>
-                  <a:noFill/>
-                </a:ln>
-                <a:effectLst/>
-                <a:uLnTx/>
-                <a:uFillTx/>
-                <a:latin typeface="Century Schoolbook" panose="02040604050505020304"/>
-              </a:rPr>
-              <a:t>For other sizes, visit us  at </a:t>
-            </a:r>
-            <a:r>
-              <a:rPr kumimoji="0" lang="en-US" sz="1800" b="1" i="0" u="none" strike="noStrike" kern="0" cap="none" spc="0" normalizeH="0" baseline="0" noProof="0" dirty="0">
-                <a:ln>
-                  <a:noFill/>
-                </a:ln>
-                <a:effectLst/>
-                <a:uLnTx/>
-                <a:uFillTx/>
-                <a:latin typeface="Century Schoolbook" panose="02040604050505020304"/>
-              </a:rPr>
-              <a:t>www.genigraphics.com</a:t>
-            </a:r>
-            <a:r>
-              <a:rPr kumimoji="0" lang="en-US" sz="1800" b="0" i="0" u="none" strike="noStrike" kern="0" cap="none" spc="0" normalizeH="0" baseline="0" noProof="0" dirty="0">
-                <a:ln>
-                  <a:noFill/>
-                </a:ln>
-                <a:effectLst/>
-                <a:uLnTx/>
-                <a:uFillTx/>
-                <a:latin typeface="Century Schoolbook" panose="02040604050505020304"/>
-              </a:rPr>
-              <a:t> or send an email request to </a:t>
-            </a:r>
-            <a:r>
-              <a:rPr kumimoji="0" lang="en-US" sz="1800" b="1" i="0" u="none" strike="noStrike" kern="0" cap="none" spc="0" normalizeH="0" baseline="0" noProof="0" dirty="0">
-                <a:ln>
-                  <a:noFill/>
-                </a:ln>
-                <a:effectLst/>
-                <a:uLnTx/>
-                <a:uFillTx/>
-                <a:latin typeface="Century Schoolbook" panose="02040604050505020304"/>
-              </a:rPr>
-              <a:t>info@genigraphics.com</a:t>
-            </a:r>
-            <a:r>
-              <a:rPr kumimoji="0" lang="en-US" sz="1800" b="0" i="0" u="none" strike="noStrike" kern="0" cap="none" spc="0" normalizeH="0" baseline="0" noProof="0" dirty="0">
-                <a:ln>
-                  <a:noFill/>
-                </a:ln>
-                <a:effectLst/>
-                <a:uLnTx/>
-                <a:uFillTx/>
-                <a:latin typeface="Century Schoolbook" panose="02040604050505020304"/>
-              </a:rPr>
-              <a:t> or give us a call toll free at </a:t>
-            </a:r>
-            <a:r>
-              <a:rPr kumimoji="0" lang="en-US" sz="1800" b="1" i="0" u="none" strike="noStrike" kern="0" cap="none" spc="0" normalizeH="0" baseline="0" noProof="0" dirty="0">
-                <a:ln>
-                  <a:noFill/>
-                </a:ln>
-                <a:effectLst/>
-                <a:uLnTx/>
-                <a:uFillTx/>
-                <a:latin typeface="Century Schoolbook" panose="02040604050505020304"/>
-              </a:rPr>
-              <a:t>1.800.790.4001</a:t>
-            </a:r>
-            <a:r>
-              <a:rPr kumimoji="0" lang="en-US" sz="1800" b="0" i="0" u="none" strike="noStrike" kern="0" cap="none" spc="0" normalizeH="0" baseline="0" noProof="0" dirty="0">
-                <a:ln>
-                  <a:noFill/>
-                </a:ln>
-                <a:effectLst/>
-                <a:uLnTx/>
-                <a:uFillTx/>
-                <a:latin typeface="Century Schoolbook" panose="02040604050505020304"/>
-              </a:rPr>
-              <a:t>.</a:t>
-            </a:r>
-          </a:p>
-          <a:p>
-            <a:pPr marL="0" marR="0" lvl="0" indent="0" defTabSz="457200" eaLnBrk="1" fontAlgn="auto" latinLnBrk="0" hangingPunct="1">
-              <a:lnSpc>
-                <a:spcPct val="100000"/>
-              </a:lnSpc>
-              <a:spcBef>
-                <a:spcPts val="0"/>
-              </a:spcBef>
-              <a:spcAft>
-                <a:spcPts val="0"/>
-              </a:spcAft>
-              <a:buClrTx/>
-              <a:buSzTx/>
-              <a:buFontTx/>
-              <a:buNone/>
-              <a:tabLst/>
-              <a:defRPr/>
-            </a:pPr>
-            <a:endParaRPr kumimoji="0" lang="en-US" sz="1800" b="1" i="0" u="none" strike="noStrike" kern="0" cap="none" spc="0" normalizeH="0" baseline="0" noProof="0" dirty="0">
-              <a:ln>
-                <a:noFill/>
-              </a:ln>
-              <a:effectLst/>
-              <a:uLnTx/>
-              <a:uFillTx/>
-              <a:latin typeface="Century Schoolbook" panose="02040604050505020304"/>
-            </a:endParaRPr>
-          </a:p>
-          <a:p>
-            <a:pPr marL="0" marR="0" lvl="0" indent="0" defTabSz="457200" eaLnBrk="1" fontAlgn="auto" latinLnBrk="0" hangingPunct="1">
-              <a:lnSpc>
-                <a:spcPct val="100000"/>
-              </a:lnSpc>
-              <a:spcBef>
-                <a:spcPts val="0"/>
-              </a:spcBef>
-              <a:spcAft>
-                <a:spcPts val="0"/>
-              </a:spcAft>
-              <a:buClrTx/>
-              <a:buSzTx/>
-              <a:buFontTx/>
-              <a:buNone/>
-              <a:tabLst/>
-              <a:defRPr/>
-            </a:pPr>
-            <a:r>
-              <a:rPr kumimoji="0" lang="en-US" sz="1800" b="1" i="0" u="none" strike="noStrike" kern="0" cap="none" spc="0" normalizeH="0" baseline="0" noProof="0" dirty="0">
-                <a:ln>
-                  <a:noFill/>
-                </a:ln>
-                <a:effectLst/>
-                <a:uLnTx/>
-                <a:uFillTx/>
-                <a:latin typeface="Century Schoolbook" panose="02040604050505020304"/>
-              </a:rPr>
-              <a:t>The various elements and text boxes included in this template are examples of what we commonly see on posters of this kind. They are simply placeholders and you should feel free to add, delete, re-arrange, re-name, or re-size as best suits your needs.</a:t>
-            </a:r>
-          </a:p>
-          <a:p>
-            <a:pPr marL="0" marR="0" lvl="0" indent="0" defTabSz="457200" eaLnBrk="1" fontAlgn="auto" latinLnBrk="0" hangingPunct="1">
-              <a:lnSpc>
-                <a:spcPct val="100000"/>
-              </a:lnSpc>
-              <a:spcBef>
-                <a:spcPts val="0"/>
-              </a:spcBef>
-              <a:spcAft>
-                <a:spcPts val="0"/>
-              </a:spcAft>
-              <a:buClrTx/>
-              <a:buSzTx/>
-              <a:buFontTx/>
-              <a:buNone/>
-              <a:tabLst/>
-              <a:defRPr/>
-            </a:pPr>
-            <a:endParaRPr kumimoji="0" lang="en-US" sz="1800" b="1" i="0" u="none" strike="noStrike" kern="0" cap="none" spc="0" normalizeH="0" baseline="0" noProof="0" dirty="0">
-              <a:ln>
-                <a:noFill/>
-              </a:ln>
-              <a:effectLst/>
-              <a:uLnTx/>
-              <a:uFillTx/>
-              <a:latin typeface="Century Schoolbook" panose="02040604050505020304"/>
-            </a:endParaRPr>
-          </a:p>
-          <a:p>
-            <a:pPr marL="0" marR="0" lvl="0" indent="0" defTabSz="457200" eaLnBrk="1" fontAlgn="auto" latinLnBrk="0" hangingPunct="1">
-              <a:lnSpc>
-                <a:spcPct val="100000"/>
-              </a:lnSpc>
-              <a:spcBef>
-                <a:spcPts val="0"/>
-              </a:spcBef>
-              <a:spcAft>
-                <a:spcPts val="0"/>
-              </a:spcAft>
-              <a:buClrTx/>
-              <a:buSzTx/>
-              <a:buFontTx/>
-              <a:buNone/>
-              <a:tabLst/>
-              <a:defRPr/>
-            </a:pPr>
-            <a:r>
-              <a:rPr kumimoji="0" lang="en-US" sz="1800" b="0" i="0" u="none" strike="noStrike" kern="0" cap="none" spc="0" normalizeH="0" baseline="0" noProof="0" dirty="0">
-                <a:ln>
-                  <a:noFill/>
-                </a:ln>
-                <a:effectLst/>
-                <a:uLnTx/>
-                <a:uFillTx/>
-                <a:latin typeface="Century Schoolbook" panose="02040604050505020304"/>
-              </a:rPr>
-              <a:t>Choose </a:t>
-            </a:r>
-            <a:r>
-              <a:rPr kumimoji="0" lang="en-US" sz="1800" b="0" i="0" u="none" strike="noStrike" kern="0" cap="none" spc="0" normalizeH="0" baseline="0" noProof="0" dirty="0" err="1">
-                <a:ln>
-                  <a:noFill/>
-                </a:ln>
-                <a:effectLst/>
-                <a:uLnTx/>
-                <a:uFillTx/>
-                <a:latin typeface="Century Schoolbook" panose="02040604050505020304"/>
-              </a:rPr>
-              <a:t>Genigraphics</a:t>
-            </a:r>
-            <a:r>
-              <a:rPr kumimoji="0" lang="en-US" sz="1800" b="0" i="0" u="none" strike="noStrike" kern="0" cap="none" spc="0" normalizeH="0" baseline="0" noProof="0" dirty="0">
-                <a:ln>
-                  <a:noFill/>
-                </a:ln>
-                <a:effectLst/>
-                <a:uLnTx/>
-                <a:uFillTx/>
-                <a:latin typeface="Century Schoolbook" panose="02040604050505020304"/>
-              </a:rPr>
-              <a:t> to print your poster and we will perform a free design review and advise you if we see anything that may be a concern for printing.</a:t>
-            </a:r>
-          </a:p>
-          <a:p>
-            <a:pPr marL="0" marR="0" lvl="0" indent="0" defTabSz="457200" eaLnBrk="1" fontAlgn="auto" latinLnBrk="0" hangingPunct="1">
-              <a:lnSpc>
-                <a:spcPct val="100000"/>
-              </a:lnSpc>
-              <a:spcBef>
-                <a:spcPts val="0"/>
-              </a:spcBef>
-              <a:spcAft>
-                <a:spcPts val="0"/>
-              </a:spcAft>
-              <a:buClrTx/>
-              <a:buSzTx/>
-              <a:buFontTx/>
-              <a:buNone/>
-              <a:tabLst/>
-              <a:defRPr/>
-            </a:pPr>
-            <a:endParaRPr kumimoji="0" lang="en-US" sz="1800" b="0" i="0" u="none" strike="noStrike" kern="0" cap="none" spc="0" normalizeH="0" baseline="0" noProof="0" dirty="0">
-              <a:ln>
-                <a:noFill/>
-              </a:ln>
-              <a:effectLst/>
-              <a:uLnTx/>
-              <a:uFillTx/>
-              <a:latin typeface="Century Schoolbook" panose="02040604050505020304"/>
-            </a:endParaRPr>
-          </a:p>
-          <a:p>
-            <a:pPr marL="0" marR="0" lvl="0" indent="0" defTabSz="457200" eaLnBrk="1" fontAlgn="auto" latinLnBrk="0" hangingPunct="1">
-              <a:lnSpc>
-                <a:spcPct val="100000"/>
-              </a:lnSpc>
-              <a:spcBef>
-                <a:spcPts val="0"/>
-              </a:spcBef>
-              <a:spcAft>
-                <a:spcPts val="0"/>
-              </a:spcAft>
-              <a:buClrTx/>
-              <a:buSzTx/>
-              <a:buFontTx/>
-              <a:buNone/>
-              <a:tabLst/>
-              <a:defRPr/>
-            </a:pPr>
-            <a:r>
-              <a:rPr kumimoji="0" lang="en-US" sz="1800" b="0" i="0" u="none" strike="noStrike" kern="0" cap="none" spc="0" normalizeH="0" baseline="0" noProof="0" dirty="0">
-                <a:ln>
-                  <a:noFill/>
-                </a:ln>
-                <a:effectLst/>
-                <a:uLnTx/>
-                <a:uFillTx/>
-                <a:latin typeface="Century Schoolbook" panose="02040604050505020304"/>
-              </a:rPr>
-              <a:t>We print directly from PowerPoint so your poster will look just like it does on screen. Other printing outlets (Kinko’s, for example) convert your file to another format prior to printing. This can result in elements shifting, loss of effects, or altered colors. By printing from the same version of PowerPoint that your file was created in, </a:t>
-            </a:r>
-            <a:r>
-              <a:rPr kumimoji="0" lang="en-US" sz="1800" b="0" i="0" u="none" strike="noStrike" kern="0" cap="none" spc="0" normalizeH="0" baseline="0" noProof="0" dirty="0" err="1">
-                <a:ln>
-                  <a:noFill/>
-                </a:ln>
-                <a:effectLst/>
-                <a:uLnTx/>
-                <a:uFillTx/>
-                <a:latin typeface="Century Schoolbook" panose="02040604050505020304"/>
-              </a:rPr>
-              <a:t>Genigraphics</a:t>
-            </a:r>
-            <a:r>
-              <a:rPr kumimoji="0" lang="en-US" sz="1800" b="0" i="0" u="none" strike="noStrike" kern="0" cap="none" spc="0" normalizeH="0" baseline="0" noProof="0" dirty="0">
-                <a:ln>
-                  <a:noFill/>
-                </a:ln>
-                <a:effectLst/>
-                <a:uLnTx/>
-                <a:uFillTx/>
-                <a:latin typeface="Century Schoolbook" panose="02040604050505020304"/>
-              </a:rPr>
-              <a:t> gives you the most accurate reproduction available.</a:t>
-            </a:r>
-          </a:p>
-        </p:txBody>
-      </p:sp>
-      <p:sp>
-        <p:nvSpPr>
-          <p:cNvPr id="22" name="Text Box 20"/>
-          <p:cNvSpPr txBox="1">
-            <a:spLocks noChangeArrowheads="1"/>
-          </p:cNvSpPr>
-          <p:nvPr/>
-        </p:nvSpPr>
-        <p:spPr bwMode="auto">
-          <a:xfrm>
-            <a:off x="29954645" y="3356978"/>
-            <a:ext cx="5548313" cy="6767328"/>
-          </a:xfrm>
-          <a:prstGeom prst="rect">
-            <a:avLst/>
-          </a:prstGeom>
-          <a:noFill/>
-          <a:ln w="19050">
-            <a:solidFill>
-              <a:srgbClr val="FFFFFF"/>
-            </a:solidFill>
-            <a:prstDash val="dash"/>
-            <a:miter lim="800000"/>
-            <a:headEnd/>
-            <a:tailEnd/>
-          </a:ln>
-          <a:effectLst/>
-          <a:extLst>
-            <a:ext uri="{909E8E84-426E-40DD-AFC4-6F175D3DCCD1}">
-              <a14:hiddenFill xmlns:a14="http://schemas.microsoft.com/office/drawing/2010/main">
-                <a:solidFill>
-                  <a:schemeClr val="accent1"/>
-                </a:solidFill>
-              </a14:hiddenFill>
-            </a:ext>
-            <a:ext uri="{AF507438-7753-43E0-B8FC-AC1667EBCBE1}">
-              <a14:hiddenEffects xmlns:a14="http://schemas.microsoft.com/office/drawing/2010/main">
-                <a:effectLst>
-                  <a:outerShdw dist="35921" dir="2700000" algn="ctr" rotWithShape="0">
-                    <a:schemeClr val="bg2"/>
-                  </a:outerShdw>
-                </a:effectLst>
-              </a14:hiddenEffects>
-            </a:ext>
-          </a:extLst>
-        </p:spPr>
-        <p:txBody>
-          <a:bodyPr lIns="228600" tIns="228600" rIns="228600" bIns="228600"/>
-          <a:lstStyle/>
-          <a:p>
-            <a:pPr marL="0" marR="0" lvl="0" indent="0" defTabSz="457200" eaLnBrk="1" fontAlgn="auto" latinLnBrk="0" hangingPunct="1">
-              <a:lnSpc>
-                <a:spcPct val="100000"/>
-              </a:lnSpc>
-              <a:spcBef>
-                <a:spcPts val="0"/>
-              </a:spcBef>
-              <a:spcAft>
-                <a:spcPts val="0"/>
-              </a:spcAft>
-              <a:buClrTx/>
-              <a:buSzTx/>
-              <a:buFontTx/>
-              <a:buNone/>
-              <a:tabLst/>
-              <a:defRPr/>
-            </a:pPr>
-            <a:r>
-              <a:rPr kumimoji="0" lang="en-US" sz="1800" b="0" i="0" u="none" strike="noStrike" kern="0" cap="none" spc="0" normalizeH="0" baseline="0" noProof="0" dirty="0">
-                <a:ln>
-                  <a:noFill/>
-                </a:ln>
-                <a:effectLst/>
-                <a:uLnTx/>
-                <a:uFillTx/>
-                <a:latin typeface="Century Schoolbook" panose="02040604050505020304"/>
-              </a:rPr>
-              <a:t>Click here to insert your Introduction text. Type it in or copy and paste from your Word document or other source. Click once on the dashed border to highlight then drag the bottom edge up to fit. Or change the font size to fill the box. </a:t>
-            </a:r>
-          </a:p>
-          <a:p>
-            <a:pPr marL="0" marR="0" lvl="0" indent="0" defTabSz="457200" eaLnBrk="1" fontAlgn="auto" latinLnBrk="0" hangingPunct="1">
-              <a:lnSpc>
-                <a:spcPct val="100000"/>
-              </a:lnSpc>
-              <a:spcBef>
-                <a:spcPts val="0"/>
-              </a:spcBef>
-              <a:spcAft>
-                <a:spcPts val="0"/>
-              </a:spcAft>
-              <a:buClrTx/>
-              <a:buSzTx/>
-              <a:buFontTx/>
-              <a:buNone/>
-              <a:tabLst/>
-              <a:defRPr/>
-            </a:pPr>
-            <a:endParaRPr kumimoji="0" lang="en-US" sz="1800" b="0" i="0" u="none" strike="noStrike" kern="0" cap="none" spc="0" normalizeH="0" baseline="0" noProof="0" dirty="0">
-              <a:ln>
-                <a:noFill/>
-              </a:ln>
-              <a:effectLst/>
-              <a:uLnTx/>
-              <a:uFillTx/>
-              <a:latin typeface="Century Schoolbook" panose="02040604050505020304"/>
-            </a:endParaRPr>
-          </a:p>
-          <a:p>
-            <a:pPr marL="0" marR="0" lvl="0" indent="0" defTabSz="457200" eaLnBrk="1" fontAlgn="auto" latinLnBrk="0" hangingPunct="1">
-              <a:lnSpc>
-                <a:spcPct val="100000"/>
-              </a:lnSpc>
-              <a:spcBef>
-                <a:spcPts val="0"/>
-              </a:spcBef>
-              <a:spcAft>
-                <a:spcPts val="0"/>
-              </a:spcAft>
-              <a:buClrTx/>
-              <a:buSzTx/>
-              <a:buFontTx/>
-              <a:buNone/>
-              <a:tabLst/>
-              <a:defRPr/>
-            </a:pPr>
-            <a:r>
-              <a:rPr kumimoji="0" lang="en-US" sz="1800" b="0" i="0" u="none" strike="noStrike" kern="0" cap="none" spc="0" normalizeH="0" baseline="0" noProof="0" dirty="0">
-                <a:ln>
-                  <a:noFill/>
-                </a:ln>
-                <a:effectLst/>
-                <a:uLnTx/>
-                <a:uFillTx/>
-                <a:latin typeface="Century Schoolbook" panose="02040604050505020304"/>
-              </a:rPr>
-              <a:t>Double-click the border and select ‘Text Box’, then check “Resize AutoShape to Fit Text” to have the box automatically re-size to your text.</a:t>
-            </a:r>
-          </a:p>
-          <a:p>
-            <a:pPr marL="0" marR="0" lvl="0" indent="0" defTabSz="457200" eaLnBrk="1" fontAlgn="auto" latinLnBrk="0" hangingPunct="1">
-              <a:lnSpc>
-                <a:spcPct val="100000"/>
-              </a:lnSpc>
-              <a:spcBef>
-                <a:spcPts val="0"/>
-              </a:spcBef>
-              <a:spcAft>
-                <a:spcPts val="0"/>
-              </a:spcAft>
-              <a:buClrTx/>
-              <a:buSzTx/>
-              <a:buFontTx/>
-              <a:buNone/>
-              <a:tabLst/>
-              <a:defRPr/>
-            </a:pPr>
-            <a:endParaRPr kumimoji="0" lang="en-US" sz="1800" b="0" i="0" u="none" strike="noStrike" kern="0" cap="none" spc="0" normalizeH="0" baseline="0" noProof="0" dirty="0">
-              <a:ln>
-                <a:noFill/>
-              </a:ln>
-              <a:effectLst/>
-              <a:uLnTx/>
-              <a:uFillTx/>
-              <a:latin typeface="Century Schoolbook" panose="02040604050505020304"/>
-            </a:endParaRPr>
-          </a:p>
-          <a:p>
-            <a:pPr marL="0" marR="0" lvl="0" indent="0" defTabSz="457200" eaLnBrk="1" fontAlgn="auto" latinLnBrk="0" hangingPunct="1">
-              <a:lnSpc>
-                <a:spcPct val="100000"/>
-              </a:lnSpc>
-              <a:spcBef>
-                <a:spcPts val="0"/>
-              </a:spcBef>
-              <a:spcAft>
-                <a:spcPts val="0"/>
-              </a:spcAft>
-              <a:buClrTx/>
-              <a:buSzTx/>
-              <a:buFontTx/>
-              <a:buNone/>
-              <a:tabLst/>
-              <a:defRPr/>
-            </a:pPr>
-            <a:r>
-              <a:rPr kumimoji="0" lang="en-US" sz="1800" b="0" i="0" u="none" strike="noStrike" kern="0" cap="none" spc="0" normalizeH="0" baseline="0" noProof="0" dirty="0">
-                <a:ln>
-                  <a:noFill/>
-                </a:ln>
-                <a:effectLst/>
-                <a:uLnTx/>
-                <a:uFillTx/>
-                <a:latin typeface="Century Schoolbook" panose="02040604050505020304"/>
-              </a:rPr>
-              <a:t>To change the border style of this text box: Double-click on the dashed border, select ‘Colors and Lines’, and change the border to solid or whatever style/color you like. Or ‘No Line’ to remove the border altogether.</a:t>
-            </a:r>
-          </a:p>
-          <a:p>
-            <a:pPr marL="0" marR="0" lvl="0" indent="0" defTabSz="457200" eaLnBrk="1" fontAlgn="auto" latinLnBrk="0" hangingPunct="1">
-              <a:lnSpc>
-                <a:spcPct val="100000"/>
-              </a:lnSpc>
-              <a:spcBef>
-                <a:spcPts val="0"/>
-              </a:spcBef>
-              <a:spcAft>
-                <a:spcPts val="0"/>
-              </a:spcAft>
-              <a:buClrTx/>
-              <a:buSzTx/>
-              <a:buFontTx/>
-              <a:buNone/>
-              <a:tabLst/>
-              <a:defRPr/>
-            </a:pPr>
-            <a:endParaRPr kumimoji="0" lang="en-US" sz="1800" b="0" i="0" u="none" strike="noStrike" kern="0" cap="none" spc="0" normalizeH="0" baseline="0" noProof="0" dirty="0">
-              <a:ln>
-                <a:noFill/>
-              </a:ln>
-              <a:effectLst/>
-              <a:uLnTx/>
-              <a:uFillTx/>
-              <a:latin typeface="Century Schoolbook" panose="02040604050505020304"/>
-            </a:endParaRPr>
-          </a:p>
-          <a:p>
-            <a:pPr marL="0" marR="0" lvl="0" indent="0" defTabSz="457200" eaLnBrk="1" fontAlgn="auto" latinLnBrk="0" hangingPunct="1">
-              <a:lnSpc>
-                <a:spcPct val="100000"/>
-              </a:lnSpc>
-              <a:spcBef>
-                <a:spcPts val="0"/>
-              </a:spcBef>
-              <a:spcAft>
-                <a:spcPts val="0"/>
-              </a:spcAft>
-              <a:buClrTx/>
-              <a:buSzTx/>
-              <a:buFontTx/>
-              <a:buNone/>
-              <a:tabLst/>
-              <a:defRPr/>
-            </a:pPr>
-            <a:r>
-              <a:rPr kumimoji="0" lang="en-US" sz="1800" b="0" i="0" u="none" strike="noStrike" kern="0" cap="none" spc="0" normalizeH="0" baseline="0" noProof="0" dirty="0">
-                <a:ln>
-                  <a:noFill/>
-                </a:ln>
-                <a:effectLst/>
-                <a:uLnTx/>
-                <a:uFillTx/>
-                <a:latin typeface="Century Schoolbook" panose="02040604050505020304"/>
-              </a:rPr>
-              <a:t>To change the font style of this text box: Click on the border once to highlight the entire text box, then select a different font or font size that suits you. This text is in Arial 32pt and is easily readable up to 6 feet away. Try to stay between 28pt – 40pt for best viewing.</a:t>
-            </a:r>
-          </a:p>
-          <a:p>
-            <a:pPr marL="0" marR="0" lvl="0" indent="0" defTabSz="457200" eaLnBrk="1" fontAlgn="auto" latinLnBrk="0" hangingPunct="1">
-              <a:lnSpc>
-                <a:spcPct val="100000"/>
-              </a:lnSpc>
-              <a:spcBef>
-                <a:spcPts val="0"/>
-              </a:spcBef>
-              <a:spcAft>
-                <a:spcPts val="0"/>
-              </a:spcAft>
-              <a:buClrTx/>
-              <a:buSzTx/>
-              <a:buFontTx/>
-              <a:buNone/>
-              <a:tabLst/>
-              <a:defRPr/>
-            </a:pPr>
-            <a:endParaRPr kumimoji="0" lang="en-US" sz="1800" b="0" i="0" u="none" strike="noStrike" kern="0" cap="none" spc="0" normalizeH="0" baseline="0" noProof="0" dirty="0">
-              <a:ln>
-                <a:noFill/>
-              </a:ln>
-              <a:effectLst/>
-              <a:uLnTx/>
-              <a:uFillTx/>
-              <a:latin typeface="Century Schoolbook" panose="02040604050505020304"/>
-            </a:endParaRPr>
-          </a:p>
-        </p:txBody>
-      </p:sp>
-      <p:sp>
-        <p:nvSpPr>
-          <p:cNvPr id="23" name="Text Box 21"/>
-          <p:cNvSpPr txBox="1">
-            <a:spLocks noChangeArrowheads="1"/>
-          </p:cNvSpPr>
-          <p:nvPr/>
-        </p:nvSpPr>
-        <p:spPr bwMode="auto">
-          <a:xfrm>
-            <a:off x="23499607" y="3593981"/>
-            <a:ext cx="5784850" cy="6397625"/>
-          </a:xfrm>
-          <a:prstGeom prst="rect">
-            <a:avLst/>
-          </a:prstGeom>
-          <a:noFill/>
-          <a:ln w="19050">
-            <a:solidFill>
-              <a:srgbClr val="FFFFFF"/>
-            </a:solidFill>
-            <a:prstDash val="dash"/>
-            <a:miter lim="800000"/>
-            <a:headEnd/>
-            <a:tailEnd/>
-          </a:ln>
-          <a:effectLst/>
-          <a:extLst>
-            <a:ext uri="{909E8E84-426E-40DD-AFC4-6F175D3DCCD1}">
-              <a14:hiddenFill xmlns:a14="http://schemas.microsoft.com/office/drawing/2010/main">
-                <a:solidFill>
-                  <a:schemeClr val="accent1"/>
-                </a:solidFill>
-              </a14:hiddenFill>
-            </a:ext>
-            <a:ext uri="{AF507438-7753-43E0-B8FC-AC1667EBCBE1}">
-              <a14:hiddenEffects xmlns:a14="http://schemas.microsoft.com/office/drawing/2010/main">
-                <a:effectLst>
-                  <a:outerShdw dist="35921" dir="2700000" algn="ctr" rotWithShape="0">
-                    <a:schemeClr val="bg2"/>
-                  </a:outerShdw>
-                </a:effectLst>
-              </a14:hiddenEffects>
-            </a:ext>
-          </a:extLst>
-        </p:spPr>
-        <p:txBody>
-          <a:bodyPr lIns="228600" tIns="228600" rIns="228600" bIns="228600"/>
-          <a:lstStyle/>
-          <a:p>
-            <a:pPr marL="0" marR="0" lvl="0" indent="0" defTabSz="457200" eaLnBrk="1" fontAlgn="auto" latinLnBrk="0" hangingPunct="1">
-              <a:lnSpc>
-                <a:spcPct val="100000"/>
-              </a:lnSpc>
-              <a:spcBef>
-                <a:spcPts val="0"/>
-              </a:spcBef>
-              <a:spcAft>
-                <a:spcPts val="0"/>
-              </a:spcAft>
-              <a:buClrTx/>
-              <a:buSzTx/>
-              <a:buFontTx/>
-              <a:buNone/>
-              <a:tabLst/>
-              <a:defRPr/>
-            </a:pPr>
-            <a:r>
-              <a:rPr kumimoji="0" lang="en-US" sz="1800" b="0" i="0" u="none" strike="noStrike" kern="0" cap="none" spc="0" normalizeH="0" baseline="0" noProof="0" dirty="0">
-                <a:ln>
-                  <a:noFill/>
-                </a:ln>
-                <a:effectLst/>
-                <a:uLnTx/>
-                <a:uFillTx/>
-                <a:latin typeface="Century Schoolbook" panose="02040604050505020304"/>
-              </a:rPr>
-              <a:t>Click here to insert your Introduction text. Type it in or copy and paste from your Word document or other source. Click once on the dashed border to highlight then drag the bottom edge up to fit. Or change the font size to fill the box. </a:t>
-            </a:r>
-          </a:p>
-          <a:p>
-            <a:pPr marL="0" marR="0" lvl="0" indent="0" defTabSz="457200" eaLnBrk="1" fontAlgn="auto" latinLnBrk="0" hangingPunct="1">
-              <a:lnSpc>
-                <a:spcPct val="100000"/>
-              </a:lnSpc>
-              <a:spcBef>
-                <a:spcPts val="0"/>
-              </a:spcBef>
-              <a:spcAft>
-                <a:spcPts val="0"/>
-              </a:spcAft>
-              <a:buClrTx/>
-              <a:buSzTx/>
-              <a:buFontTx/>
-              <a:buNone/>
-              <a:tabLst/>
-              <a:defRPr/>
-            </a:pPr>
-            <a:endParaRPr kumimoji="0" lang="en-US" sz="1800" b="0" i="0" u="none" strike="noStrike" kern="0" cap="none" spc="0" normalizeH="0" baseline="0" noProof="0" dirty="0">
-              <a:ln>
-                <a:noFill/>
-              </a:ln>
-              <a:effectLst/>
-              <a:uLnTx/>
-              <a:uFillTx/>
-              <a:latin typeface="Century Schoolbook" panose="02040604050505020304"/>
-            </a:endParaRPr>
-          </a:p>
-          <a:p>
-            <a:pPr marL="0" marR="0" lvl="0" indent="0" defTabSz="457200" eaLnBrk="1" fontAlgn="auto" latinLnBrk="0" hangingPunct="1">
-              <a:lnSpc>
-                <a:spcPct val="100000"/>
-              </a:lnSpc>
-              <a:spcBef>
-                <a:spcPts val="0"/>
-              </a:spcBef>
-              <a:spcAft>
-                <a:spcPts val="0"/>
-              </a:spcAft>
-              <a:buClrTx/>
-              <a:buSzTx/>
-              <a:buFontTx/>
-              <a:buNone/>
-              <a:tabLst/>
-              <a:defRPr/>
-            </a:pPr>
-            <a:r>
-              <a:rPr kumimoji="0" lang="en-US" sz="1800" b="0" i="0" u="none" strike="noStrike" kern="0" cap="none" spc="0" normalizeH="0" baseline="0" noProof="0" dirty="0">
-                <a:ln>
-                  <a:noFill/>
-                </a:ln>
-                <a:effectLst/>
-                <a:uLnTx/>
-                <a:uFillTx/>
-                <a:latin typeface="Century Schoolbook" panose="02040604050505020304"/>
-              </a:rPr>
-              <a:t>Double-click the border and select ‘Text Box’, then check “Resize AutoShape to Fit Text” to have the box automatically re-size to your text.</a:t>
-            </a:r>
-          </a:p>
-          <a:p>
-            <a:pPr marL="0" marR="0" lvl="0" indent="0" defTabSz="457200" eaLnBrk="1" fontAlgn="auto" latinLnBrk="0" hangingPunct="1">
-              <a:lnSpc>
-                <a:spcPct val="100000"/>
-              </a:lnSpc>
-              <a:spcBef>
-                <a:spcPts val="0"/>
-              </a:spcBef>
-              <a:spcAft>
-                <a:spcPts val="0"/>
-              </a:spcAft>
-              <a:buClrTx/>
-              <a:buSzTx/>
-              <a:buFontTx/>
-              <a:buNone/>
-              <a:tabLst/>
-              <a:defRPr/>
-            </a:pPr>
-            <a:endParaRPr kumimoji="0" lang="en-US" sz="1800" b="0" i="0" u="none" strike="noStrike" kern="0" cap="none" spc="0" normalizeH="0" baseline="0" noProof="0" dirty="0">
-              <a:ln>
-                <a:noFill/>
-              </a:ln>
-              <a:effectLst/>
-              <a:uLnTx/>
-              <a:uFillTx/>
-              <a:latin typeface="Century Schoolbook" panose="02040604050505020304"/>
-            </a:endParaRPr>
-          </a:p>
-          <a:p>
-            <a:pPr marL="0" marR="0" lvl="0" indent="0" defTabSz="457200" eaLnBrk="1" fontAlgn="auto" latinLnBrk="0" hangingPunct="1">
-              <a:lnSpc>
-                <a:spcPct val="100000"/>
-              </a:lnSpc>
-              <a:spcBef>
-                <a:spcPts val="0"/>
-              </a:spcBef>
-              <a:spcAft>
-                <a:spcPts val="0"/>
-              </a:spcAft>
-              <a:buClrTx/>
-              <a:buSzTx/>
-              <a:buFontTx/>
-              <a:buNone/>
-              <a:tabLst/>
-              <a:defRPr/>
-            </a:pPr>
-            <a:r>
-              <a:rPr kumimoji="0" lang="en-US" sz="1800" b="0" i="0" u="none" strike="noStrike" kern="0" cap="none" spc="0" normalizeH="0" baseline="0" noProof="0" dirty="0">
-                <a:ln>
-                  <a:noFill/>
-                </a:ln>
-                <a:effectLst/>
-                <a:uLnTx/>
-                <a:uFillTx/>
-                <a:latin typeface="Century Schoolbook" panose="02040604050505020304"/>
-              </a:rPr>
-              <a:t>To change the border style of this text box: Double-click on the dashed border, select ‘Colors and Lines’, and change the border to solid or whatever style/color you like. Or ‘No Line’ to remove the border altogether.</a:t>
-            </a:r>
-          </a:p>
-          <a:p>
-            <a:pPr marL="0" marR="0" lvl="0" indent="0" defTabSz="457200" eaLnBrk="1" fontAlgn="auto" latinLnBrk="0" hangingPunct="1">
-              <a:lnSpc>
-                <a:spcPct val="100000"/>
-              </a:lnSpc>
-              <a:spcBef>
-                <a:spcPts val="0"/>
-              </a:spcBef>
-              <a:spcAft>
-                <a:spcPts val="0"/>
-              </a:spcAft>
-              <a:buClrTx/>
-              <a:buSzTx/>
-              <a:buFontTx/>
-              <a:buNone/>
-              <a:tabLst/>
-              <a:defRPr/>
-            </a:pPr>
-            <a:endParaRPr kumimoji="0" lang="en-US" sz="1800" b="0" i="0" u="none" strike="noStrike" kern="0" cap="none" spc="0" normalizeH="0" baseline="0" noProof="0" dirty="0">
-              <a:ln>
-                <a:noFill/>
-              </a:ln>
-              <a:effectLst/>
-              <a:uLnTx/>
-              <a:uFillTx/>
-              <a:latin typeface="Century Schoolbook" panose="02040604050505020304"/>
-            </a:endParaRPr>
-          </a:p>
-          <a:p>
-            <a:pPr marL="0" marR="0" lvl="0" indent="0" defTabSz="457200" eaLnBrk="1" fontAlgn="auto" latinLnBrk="0" hangingPunct="1">
-              <a:lnSpc>
-                <a:spcPct val="100000"/>
-              </a:lnSpc>
-              <a:spcBef>
-                <a:spcPts val="0"/>
-              </a:spcBef>
-              <a:spcAft>
-                <a:spcPts val="0"/>
-              </a:spcAft>
-              <a:buClrTx/>
-              <a:buSzTx/>
-              <a:buFontTx/>
-              <a:buNone/>
-              <a:tabLst/>
-              <a:defRPr/>
-            </a:pPr>
-            <a:r>
-              <a:rPr kumimoji="0" lang="en-US" sz="1800" b="0" i="0" u="none" strike="noStrike" kern="0" cap="none" spc="0" normalizeH="0" baseline="0" noProof="0" dirty="0">
-                <a:ln>
-                  <a:noFill/>
-                </a:ln>
-                <a:effectLst/>
-                <a:uLnTx/>
-                <a:uFillTx/>
-                <a:latin typeface="Century Schoolbook" panose="02040604050505020304"/>
-              </a:rPr>
-              <a:t>To change the font style of this text box: Click on the border once to highlight the entire text box, then select a different font or font size that suits you. This text is in Arial 32pt and is easily readable up to 6 feet away. Try to stay between 28pt – 40pt for best viewing.</a:t>
-            </a:r>
-          </a:p>
-          <a:p>
-            <a:pPr marL="0" marR="0" lvl="0" indent="0" defTabSz="457200" eaLnBrk="1" fontAlgn="auto" latinLnBrk="0" hangingPunct="1">
-              <a:lnSpc>
-                <a:spcPct val="100000"/>
-              </a:lnSpc>
-              <a:spcBef>
-                <a:spcPts val="0"/>
-              </a:spcBef>
-              <a:spcAft>
-                <a:spcPts val="0"/>
-              </a:spcAft>
-              <a:buClrTx/>
-              <a:buSzTx/>
-              <a:buFontTx/>
-              <a:buNone/>
-              <a:tabLst/>
-              <a:defRPr/>
-            </a:pPr>
-            <a:endParaRPr kumimoji="0" lang="en-US" sz="1800" b="0" i="0" u="none" strike="noStrike" kern="0" cap="none" spc="0" normalizeH="0" baseline="0" noProof="0" dirty="0">
-              <a:ln>
-                <a:noFill/>
-              </a:ln>
-              <a:effectLst/>
-              <a:uLnTx/>
-              <a:uFillTx/>
-              <a:latin typeface="Century Schoolbook" panose="02040604050505020304"/>
-            </a:endParaRPr>
-          </a:p>
-          <a:p>
-            <a:pPr marL="0" marR="0" lvl="0" indent="0" defTabSz="457200" eaLnBrk="1" fontAlgn="auto" latinLnBrk="0" hangingPunct="1">
-              <a:lnSpc>
-                <a:spcPct val="100000"/>
-              </a:lnSpc>
-              <a:spcBef>
-                <a:spcPts val="0"/>
-              </a:spcBef>
-              <a:spcAft>
-                <a:spcPts val="0"/>
-              </a:spcAft>
-              <a:buClrTx/>
-              <a:buSzTx/>
-              <a:buFontTx/>
-              <a:buNone/>
-              <a:tabLst/>
-              <a:defRPr/>
-            </a:pPr>
-            <a:endParaRPr kumimoji="0" lang="en-US" sz="1800" b="0" i="0" u="none" strike="noStrike" kern="0" cap="none" spc="0" normalizeH="0" baseline="0" noProof="0" dirty="0">
-              <a:ln>
-                <a:noFill/>
-              </a:ln>
-              <a:effectLst/>
-              <a:uLnTx/>
-              <a:uFillTx/>
-              <a:latin typeface="Century Schoolbook" panose="02040604050505020304"/>
-            </a:endParaRPr>
-          </a:p>
-        </p:txBody>
-      </p:sp>
-      <p:sp>
-        <p:nvSpPr>
-          <p:cNvPr id="24" name="Text Box 22"/>
-          <p:cNvSpPr txBox="1">
-            <a:spLocks noChangeArrowheads="1"/>
-          </p:cNvSpPr>
-          <p:nvPr/>
-        </p:nvSpPr>
-        <p:spPr bwMode="auto">
-          <a:xfrm>
-            <a:off x="31935267" y="23864193"/>
-            <a:ext cx="5548313" cy="4421187"/>
-          </a:xfrm>
-          <a:prstGeom prst="rect">
-            <a:avLst/>
-          </a:prstGeom>
-          <a:noFill/>
-          <a:ln w="19050">
-            <a:solidFill>
-              <a:srgbClr val="FFFFFF"/>
-            </a:solidFill>
-            <a:prstDash val="dash"/>
-            <a:miter lim="800000"/>
-            <a:headEnd/>
-            <a:tailEnd/>
-          </a:ln>
-          <a:effectLst/>
-          <a:extLst>
-            <a:ext uri="{909E8E84-426E-40DD-AFC4-6F175D3DCCD1}">
-              <a14:hiddenFill xmlns:a14="http://schemas.microsoft.com/office/drawing/2010/main">
-                <a:solidFill>
-                  <a:schemeClr val="accent1"/>
-                </a:solidFill>
-              </a14:hiddenFill>
-            </a:ext>
-            <a:ext uri="{AF507438-7753-43E0-B8FC-AC1667EBCBE1}">
-              <a14:hiddenEffects xmlns:a14="http://schemas.microsoft.com/office/drawing/2010/main">
-                <a:effectLst>
-                  <a:outerShdw dist="35921" dir="2700000" algn="ctr" rotWithShape="0">
-                    <a:schemeClr val="bg2"/>
-                  </a:outerShdw>
-                </a:effectLst>
-              </a14:hiddenEffects>
-            </a:ext>
-          </a:extLst>
-        </p:spPr>
-        <p:txBody>
-          <a:bodyPr lIns="228600" tIns="228600" rIns="228600" bIns="228600"/>
-          <a:lstStyle/>
-          <a:p>
-            <a:pPr marL="0" marR="0" lvl="0" indent="0" defTabSz="457200" eaLnBrk="1" fontAlgn="auto" latinLnBrk="0" hangingPunct="1">
-              <a:lnSpc>
-                <a:spcPct val="100000"/>
-              </a:lnSpc>
-              <a:spcBef>
-                <a:spcPts val="0"/>
-              </a:spcBef>
-              <a:spcAft>
-                <a:spcPts val="0"/>
-              </a:spcAft>
-              <a:buClrTx/>
-              <a:buSzTx/>
-              <a:buFontTx/>
-              <a:buNone/>
-              <a:tabLst/>
-              <a:defRPr/>
-            </a:pPr>
-            <a:r>
-              <a:rPr kumimoji="0" lang="en-US" sz="1800" b="0" i="0" u="none" strike="noStrike" kern="0" cap="none" spc="0" normalizeH="0" baseline="0" noProof="0" dirty="0">
-                <a:ln>
-                  <a:noFill/>
-                </a:ln>
-                <a:effectLst/>
-                <a:uLnTx/>
-                <a:uFillTx/>
-                <a:latin typeface="Century Schoolbook" panose="02040604050505020304"/>
-              </a:rPr>
-              <a:t>Click here to insert your Conclusions text. Type it in or copy and paste from your Word document or other source. </a:t>
-            </a:r>
-          </a:p>
-          <a:p>
-            <a:pPr marL="0" marR="0" lvl="0" indent="0" defTabSz="457200" eaLnBrk="1" fontAlgn="auto" latinLnBrk="0" hangingPunct="1">
-              <a:lnSpc>
-                <a:spcPct val="100000"/>
-              </a:lnSpc>
-              <a:spcBef>
-                <a:spcPts val="0"/>
-              </a:spcBef>
-              <a:spcAft>
-                <a:spcPts val="0"/>
-              </a:spcAft>
-              <a:buClrTx/>
-              <a:buSzTx/>
-              <a:buFontTx/>
-              <a:buNone/>
-              <a:tabLst/>
-              <a:defRPr/>
-            </a:pPr>
-            <a:endParaRPr kumimoji="0" lang="en-US" sz="1800" b="0" i="0" u="none" strike="noStrike" kern="0" cap="none" spc="0" normalizeH="0" baseline="0" noProof="0" dirty="0">
-              <a:ln>
-                <a:noFill/>
-              </a:ln>
-              <a:effectLst/>
-              <a:uLnTx/>
-              <a:uFillTx/>
-              <a:latin typeface="Century Schoolbook" panose="02040604050505020304"/>
-            </a:endParaRPr>
-          </a:p>
-          <a:p>
-            <a:pPr marL="0" marR="0" lvl="0" indent="0" defTabSz="457200" eaLnBrk="1" fontAlgn="auto" latinLnBrk="0" hangingPunct="1">
-              <a:lnSpc>
-                <a:spcPct val="100000"/>
-              </a:lnSpc>
-              <a:spcBef>
-                <a:spcPts val="0"/>
-              </a:spcBef>
-              <a:spcAft>
-                <a:spcPts val="0"/>
-              </a:spcAft>
-              <a:buClrTx/>
-              <a:buSzTx/>
-              <a:buFontTx/>
-              <a:buNone/>
-              <a:tabLst/>
-              <a:defRPr/>
-            </a:pPr>
-            <a:r>
-              <a:rPr kumimoji="0" lang="en-US" sz="1800" b="0" i="0" u="none" strike="noStrike" kern="0" cap="none" spc="0" normalizeH="0" baseline="0" noProof="0" dirty="0">
-                <a:ln>
-                  <a:noFill/>
-                </a:ln>
-                <a:effectLst/>
-                <a:uLnTx/>
-                <a:uFillTx/>
-                <a:latin typeface="Century Schoolbook" panose="02040604050505020304"/>
-              </a:rPr>
-              <a:t>Click on the border once to highlight and select a different font or font size that suits you. This text is in Arial 32pt and is easily readable up to 6 feet away. Try to stay between 28pt – 40pt for best viewing.</a:t>
-            </a:r>
-          </a:p>
-        </p:txBody>
-      </p:sp>
-      <p:sp>
-        <p:nvSpPr>
-          <p:cNvPr id="27" name="Text Box 25"/>
-          <p:cNvSpPr txBox="1">
-            <a:spLocks noChangeArrowheads="1"/>
-          </p:cNvSpPr>
-          <p:nvPr/>
-        </p:nvSpPr>
-        <p:spPr bwMode="auto">
-          <a:xfrm>
-            <a:off x="23499607" y="2222381"/>
-            <a:ext cx="5788025" cy="1371600"/>
-          </a:xfrm>
-          <a:prstGeom prst="rect">
-            <a:avLst/>
-          </a:prstGeom>
-          <a:noFill/>
-          <a:ln>
-            <a:noFill/>
-          </a:ln>
-          <a:effectLst/>
-          <a:extLst>
-            <a:ext uri="{909E8E84-426E-40DD-AFC4-6F175D3DCCD1}">
-              <a14:hiddenFill xmlns:a14="http://schemas.microsoft.com/office/drawing/2010/main">
-                <a:solidFill>
-                  <a:schemeClr val="accent1"/>
-                </a:solidFill>
-              </a14:hiddenFill>
-            </a:ext>
-            <a:ext uri="{91240B29-F687-4F45-9708-019B960494DF}">
-              <a14:hiddenLine xmlns:a14="http://schemas.microsoft.com/office/drawing/2010/main" w="9525">
-                <a:solidFill>
-                  <a:schemeClr val="tx1"/>
-                </a:solidFill>
-                <a:prstDash val="sysDot"/>
-                <a:miter lim="800000"/>
-                <a:headEnd/>
-                <a:tailEnd/>
-              </a14:hiddenLine>
-            </a:ext>
-            <a:ext uri="{AF507438-7753-43E0-B8FC-AC1667EBCBE1}">
-              <a14:hiddenEffects xmlns:a14="http://schemas.microsoft.com/office/drawing/2010/main">
-                <a:effectLst>
-                  <a:outerShdw dist="35921" dir="2700000" algn="ctr" rotWithShape="0">
-                    <a:schemeClr val="bg2"/>
-                  </a:outerShdw>
-                </a:effectLst>
-              </a14:hiddenEffects>
-            </a:ext>
-          </a:extLst>
-        </p:spPr>
-        <p:txBody>
-          <a:bodyPr wrap="none" lIns="228600" tIns="228600" rIns="228600" bIns="228600" anchor="ctr" anchorCtr="1"/>
-          <a:lstStyle>
-            <a:lvl1pPr defTabSz="4389438">
-              <a:defRPr>
-                <a:solidFill>
-                  <a:schemeClr val="tx1"/>
-                </a:solidFill>
-                <a:latin typeface="Arial" charset="0"/>
-              </a:defRPr>
-            </a:lvl1pPr>
-            <a:lvl2pPr defTabSz="4389438">
-              <a:defRPr>
-                <a:solidFill>
-                  <a:schemeClr val="tx1"/>
-                </a:solidFill>
-                <a:latin typeface="Arial" charset="0"/>
-              </a:defRPr>
-            </a:lvl2pPr>
-            <a:lvl3pPr defTabSz="4389438">
-              <a:defRPr>
-                <a:solidFill>
-                  <a:schemeClr val="tx1"/>
-                </a:solidFill>
-                <a:latin typeface="Arial" charset="0"/>
-              </a:defRPr>
-            </a:lvl3pPr>
-            <a:lvl4pPr defTabSz="4389438">
-              <a:defRPr>
-                <a:solidFill>
-                  <a:schemeClr val="tx1"/>
-                </a:solidFill>
-                <a:latin typeface="Arial" charset="0"/>
-              </a:defRPr>
-            </a:lvl4pPr>
-            <a:lvl5pPr defTabSz="4389438">
-              <a:defRPr>
-                <a:solidFill>
-                  <a:schemeClr val="tx1"/>
-                </a:solidFill>
-                <a:latin typeface="Arial" charset="0"/>
-              </a:defRPr>
-            </a:lvl5pPr>
-            <a:lvl6pPr defTabSz="4389438" fontAlgn="base">
-              <a:spcBef>
-                <a:spcPct val="0"/>
-              </a:spcBef>
-              <a:spcAft>
-                <a:spcPct val="0"/>
-              </a:spcAft>
-              <a:defRPr>
-                <a:solidFill>
-                  <a:schemeClr val="tx1"/>
-                </a:solidFill>
-                <a:latin typeface="Arial" charset="0"/>
-              </a:defRPr>
-            </a:lvl6pPr>
-            <a:lvl7pPr defTabSz="4389438" fontAlgn="base">
-              <a:spcBef>
-                <a:spcPct val="0"/>
-              </a:spcBef>
-              <a:spcAft>
-                <a:spcPct val="0"/>
-              </a:spcAft>
-              <a:defRPr>
-                <a:solidFill>
-                  <a:schemeClr val="tx1"/>
-                </a:solidFill>
-                <a:latin typeface="Arial" charset="0"/>
-              </a:defRPr>
-            </a:lvl7pPr>
-            <a:lvl8pPr defTabSz="4389438" fontAlgn="base">
-              <a:spcBef>
-                <a:spcPct val="0"/>
-              </a:spcBef>
-              <a:spcAft>
-                <a:spcPct val="0"/>
-              </a:spcAft>
-              <a:defRPr>
-                <a:solidFill>
-                  <a:schemeClr val="tx1"/>
-                </a:solidFill>
-                <a:latin typeface="Arial" charset="0"/>
-              </a:defRPr>
-            </a:lvl8pPr>
-            <a:lvl9pPr defTabSz="4389438" fontAlgn="base">
-              <a:spcBef>
-                <a:spcPct val="0"/>
-              </a:spcBef>
-              <a:spcAft>
-                <a:spcPct val="0"/>
-              </a:spcAft>
-              <a:defRPr>
-                <a:solidFill>
-                  <a:schemeClr val="tx1"/>
-                </a:solidFill>
-                <a:latin typeface="Arial" charset="0"/>
-              </a:defRPr>
-            </a:lvl9pPr>
-          </a:lstStyle>
-          <a:p>
-            <a:r>
-              <a:rPr lang="en-US" sz="4800" dirty="0">
+                <a:solidFill>
+                  <a:srgbClr val="FFFFFF"/>
+                </a:solidFill>
                 <a:latin typeface="Impact" pitchFamily="34" charset="0"/>
               </a:rPr>
-              <a:t>METHODS AND MATERIALS</a:t>
+              <a:t>COMMUNICATION</a:t>
+            </a:r>
+          </a:p>
+          <a:p>
+            <a:pPr algn="ctr"/>
+            <a:r>
+              <a:rPr lang="en-US" sz="8000" dirty="0">
+                <a:ln w="34925" cap="rnd" cmpd="sng">
+                  <a:solidFill>
+                    <a:srgbClr val="6F6F74"/>
+                  </a:solidFill>
+                </a:ln>
+                <a:solidFill>
+                  <a:srgbClr val="FFFFFF"/>
+                </a:solidFill>
+                <a:latin typeface="Impact" pitchFamily="34" charset="0"/>
+              </a:rPr>
+              <a:t>( NFC )</a:t>
             </a:r>
           </a:p>
         </p:txBody>
@@ -4593,7 +3273,7 @@
         </p:nvSpPr>
         <p:spPr bwMode="auto">
           <a:xfrm>
-            <a:off x="38022987" y="23827684"/>
+            <a:off x="38000575" y="19738688"/>
             <a:ext cx="5548313" cy="6362854"/>
           </a:xfrm>
           <a:prstGeom prst="rect">
@@ -4826,489 +3506,6 @@
       </p:sp>
       <p:sp>
         <p:nvSpPr>
-          <p:cNvPr id="29" name="Text Box 27"/>
-          <p:cNvSpPr txBox="1">
-            <a:spLocks noChangeArrowheads="1"/>
-          </p:cNvSpPr>
-          <p:nvPr/>
-        </p:nvSpPr>
-        <p:spPr bwMode="auto">
-          <a:xfrm>
-            <a:off x="31935267" y="22492593"/>
-            <a:ext cx="5548313" cy="1371600"/>
-          </a:xfrm>
-          <a:prstGeom prst="rect">
-            <a:avLst/>
-          </a:prstGeom>
-          <a:noFill/>
-          <a:ln>
-            <a:noFill/>
-          </a:ln>
-          <a:effectLst/>
-          <a:extLst>
-            <a:ext uri="{909E8E84-426E-40DD-AFC4-6F175D3DCCD1}">
-              <a14:hiddenFill xmlns:a14="http://schemas.microsoft.com/office/drawing/2010/main">
-                <a:solidFill>
-                  <a:schemeClr val="accent1"/>
-                </a:solidFill>
-              </a14:hiddenFill>
-            </a:ext>
-            <a:ext uri="{91240B29-F687-4F45-9708-019B960494DF}">
-              <a14:hiddenLine xmlns:a14="http://schemas.microsoft.com/office/drawing/2010/main" w="9525">
-                <a:solidFill>
-                  <a:schemeClr val="tx1"/>
-                </a:solidFill>
-                <a:prstDash val="sysDot"/>
-                <a:miter lim="800000"/>
-                <a:headEnd/>
-                <a:tailEnd/>
-              </a14:hiddenLine>
-            </a:ext>
-            <a:ext uri="{AF507438-7753-43E0-B8FC-AC1667EBCBE1}">
-              <a14:hiddenEffects xmlns:a14="http://schemas.microsoft.com/office/drawing/2010/main">
-                <a:effectLst>
-                  <a:outerShdw dist="35921" dir="2700000" algn="ctr" rotWithShape="0">
-                    <a:schemeClr val="bg2"/>
-                  </a:outerShdw>
-                </a:effectLst>
-              </a14:hiddenEffects>
-            </a:ext>
-          </a:extLst>
-        </p:spPr>
-        <p:txBody>
-          <a:bodyPr wrap="none" lIns="228600" tIns="228600" rIns="228600" bIns="228600" anchor="ctr" anchorCtr="1"/>
-          <a:lstStyle>
-            <a:lvl1pPr defTabSz="4389438">
-              <a:defRPr>
-                <a:solidFill>
-                  <a:schemeClr val="tx1"/>
-                </a:solidFill>
-                <a:latin typeface="Arial" charset="0"/>
-              </a:defRPr>
-            </a:lvl1pPr>
-            <a:lvl2pPr defTabSz="4389438">
-              <a:defRPr>
-                <a:solidFill>
-                  <a:schemeClr val="tx1"/>
-                </a:solidFill>
-                <a:latin typeface="Arial" charset="0"/>
-              </a:defRPr>
-            </a:lvl2pPr>
-            <a:lvl3pPr defTabSz="4389438">
-              <a:defRPr>
-                <a:solidFill>
-                  <a:schemeClr val="tx1"/>
-                </a:solidFill>
-                <a:latin typeface="Arial" charset="0"/>
-              </a:defRPr>
-            </a:lvl3pPr>
-            <a:lvl4pPr defTabSz="4389438">
-              <a:defRPr>
-                <a:solidFill>
-                  <a:schemeClr val="tx1"/>
-                </a:solidFill>
-                <a:latin typeface="Arial" charset="0"/>
-              </a:defRPr>
-            </a:lvl4pPr>
-            <a:lvl5pPr defTabSz="4389438">
-              <a:defRPr>
-                <a:solidFill>
-                  <a:schemeClr val="tx1"/>
-                </a:solidFill>
-                <a:latin typeface="Arial" charset="0"/>
-              </a:defRPr>
-            </a:lvl5pPr>
-            <a:lvl6pPr defTabSz="4389438" fontAlgn="base">
-              <a:spcBef>
-                <a:spcPct val="0"/>
-              </a:spcBef>
-              <a:spcAft>
-                <a:spcPct val="0"/>
-              </a:spcAft>
-              <a:defRPr>
-                <a:solidFill>
-                  <a:schemeClr val="tx1"/>
-                </a:solidFill>
-                <a:latin typeface="Arial" charset="0"/>
-              </a:defRPr>
-            </a:lvl6pPr>
-            <a:lvl7pPr defTabSz="4389438" fontAlgn="base">
-              <a:spcBef>
-                <a:spcPct val="0"/>
-              </a:spcBef>
-              <a:spcAft>
-                <a:spcPct val="0"/>
-              </a:spcAft>
-              <a:defRPr>
-                <a:solidFill>
-                  <a:schemeClr val="tx1"/>
-                </a:solidFill>
-                <a:latin typeface="Arial" charset="0"/>
-              </a:defRPr>
-            </a:lvl7pPr>
-            <a:lvl8pPr defTabSz="4389438" fontAlgn="base">
-              <a:spcBef>
-                <a:spcPct val="0"/>
-              </a:spcBef>
-              <a:spcAft>
-                <a:spcPct val="0"/>
-              </a:spcAft>
-              <a:defRPr>
-                <a:solidFill>
-                  <a:schemeClr val="tx1"/>
-                </a:solidFill>
-                <a:latin typeface="Arial" charset="0"/>
-              </a:defRPr>
-            </a:lvl8pPr>
-            <a:lvl9pPr defTabSz="4389438" fontAlgn="base">
-              <a:spcBef>
-                <a:spcPct val="0"/>
-              </a:spcBef>
-              <a:spcAft>
-                <a:spcPct val="0"/>
-              </a:spcAft>
-              <a:defRPr>
-                <a:solidFill>
-                  <a:schemeClr val="tx1"/>
-                </a:solidFill>
-                <a:latin typeface="Arial" charset="0"/>
-              </a:defRPr>
-            </a:lvl9pPr>
-          </a:lstStyle>
-          <a:p>
-            <a:r>
-              <a:rPr lang="en-US" sz="4800" dirty="0">
-                <a:latin typeface="Impact" pitchFamily="34" charset="0"/>
-              </a:rPr>
-              <a:t>CONCLUSIONS</a:t>
-            </a:r>
-          </a:p>
-        </p:txBody>
-      </p:sp>
-      <p:sp>
-        <p:nvSpPr>
-          <p:cNvPr id="30" name="Text Box 28"/>
-          <p:cNvSpPr txBox="1">
-            <a:spLocks noChangeArrowheads="1"/>
-          </p:cNvSpPr>
-          <p:nvPr/>
-        </p:nvSpPr>
-        <p:spPr bwMode="auto">
-          <a:xfrm>
-            <a:off x="29954645" y="1988552"/>
-            <a:ext cx="5548313" cy="1353779"/>
-          </a:xfrm>
-          <a:prstGeom prst="rect">
-            <a:avLst/>
-          </a:prstGeom>
-          <a:noFill/>
-          <a:ln>
-            <a:noFill/>
-          </a:ln>
-          <a:effectLst/>
-          <a:extLst>
-            <a:ext uri="{909E8E84-426E-40DD-AFC4-6F175D3DCCD1}">
-              <a14:hiddenFill xmlns:a14="http://schemas.microsoft.com/office/drawing/2010/main">
-                <a:solidFill>
-                  <a:schemeClr val="accent1"/>
-                </a:solidFill>
-              </a14:hiddenFill>
-            </a:ext>
-            <a:ext uri="{91240B29-F687-4F45-9708-019B960494DF}">
-              <a14:hiddenLine xmlns:a14="http://schemas.microsoft.com/office/drawing/2010/main" w="9525">
-                <a:solidFill>
-                  <a:schemeClr val="tx1"/>
-                </a:solidFill>
-                <a:prstDash val="sysDot"/>
-                <a:miter lim="800000"/>
-                <a:headEnd/>
-                <a:tailEnd/>
-              </a14:hiddenLine>
-            </a:ext>
-            <a:ext uri="{AF507438-7753-43E0-B8FC-AC1667EBCBE1}">
-              <a14:hiddenEffects xmlns:a14="http://schemas.microsoft.com/office/drawing/2010/main">
-                <a:effectLst>
-                  <a:outerShdw dist="35921" dir="2700000" algn="ctr" rotWithShape="0">
-                    <a:schemeClr val="bg2"/>
-                  </a:outerShdw>
-                </a:effectLst>
-              </a14:hiddenEffects>
-            </a:ext>
-          </a:extLst>
-        </p:spPr>
-        <p:txBody>
-          <a:bodyPr wrap="none" lIns="228600" tIns="228600" rIns="228600" bIns="228600" anchor="ctr" anchorCtr="1"/>
-          <a:lstStyle>
-            <a:lvl1pPr defTabSz="4389438">
-              <a:defRPr>
-                <a:solidFill>
-                  <a:schemeClr val="tx1"/>
-                </a:solidFill>
-                <a:latin typeface="Arial" charset="0"/>
-              </a:defRPr>
-            </a:lvl1pPr>
-            <a:lvl2pPr defTabSz="4389438">
-              <a:defRPr>
-                <a:solidFill>
-                  <a:schemeClr val="tx1"/>
-                </a:solidFill>
-                <a:latin typeface="Arial" charset="0"/>
-              </a:defRPr>
-            </a:lvl2pPr>
-            <a:lvl3pPr defTabSz="4389438">
-              <a:defRPr>
-                <a:solidFill>
-                  <a:schemeClr val="tx1"/>
-                </a:solidFill>
-                <a:latin typeface="Arial" charset="0"/>
-              </a:defRPr>
-            </a:lvl3pPr>
-            <a:lvl4pPr defTabSz="4389438">
-              <a:defRPr>
-                <a:solidFill>
-                  <a:schemeClr val="tx1"/>
-                </a:solidFill>
-                <a:latin typeface="Arial" charset="0"/>
-              </a:defRPr>
-            </a:lvl4pPr>
-            <a:lvl5pPr defTabSz="4389438">
-              <a:defRPr>
-                <a:solidFill>
-                  <a:schemeClr val="tx1"/>
-                </a:solidFill>
-                <a:latin typeface="Arial" charset="0"/>
-              </a:defRPr>
-            </a:lvl5pPr>
-            <a:lvl6pPr defTabSz="4389438" fontAlgn="base">
-              <a:spcBef>
-                <a:spcPct val="0"/>
-              </a:spcBef>
-              <a:spcAft>
-                <a:spcPct val="0"/>
-              </a:spcAft>
-              <a:defRPr>
-                <a:solidFill>
-                  <a:schemeClr val="tx1"/>
-                </a:solidFill>
-                <a:latin typeface="Arial" charset="0"/>
-              </a:defRPr>
-            </a:lvl6pPr>
-            <a:lvl7pPr defTabSz="4389438" fontAlgn="base">
-              <a:spcBef>
-                <a:spcPct val="0"/>
-              </a:spcBef>
-              <a:spcAft>
-                <a:spcPct val="0"/>
-              </a:spcAft>
-              <a:defRPr>
-                <a:solidFill>
-                  <a:schemeClr val="tx1"/>
-                </a:solidFill>
-                <a:latin typeface="Arial" charset="0"/>
-              </a:defRPr>
-            </a:lvl7pPr>
-            <a:lvl8pPr defTabSz="4389438" fontAlgn="base">
-              <a:spcBef>
-                <a:spcPct val="0"/>
-              </a:spcBef>
-              <a:spcAft>
-                <a:spcPct val="0"/>
-              </a:spcAft>
-              <a:defRPr>
-                <a:solidFill>
-                  <a:schemeClr val="tx1"/>
-                </a:solidFill>
-                <a:latin typeface="Arial" charset="0"/>
-              </a:defRPr>
-            </a:lvl8pPr>
-            <a:lvl9pPr defTabSz="4389438" fontAlgn="base">
-              <a:spcBef>
-                <a:spcPct val="0"/>
-              </a:spcBef>
-              <a:spcAft>
-                <a:spcPct val="0"/>
-              </a:spcAft>
-              <a:defRPr>
-                <a:solidFill>
-                  <a:schemeClr val="tx1"/>
-                </a:solidFill>
-                <a:latin typeface="Arial" charset="0"/>
-              </a:defRPr>
-            </a:lvl9pPr>
-          </a:lstStyle>
-          <a:p>
-            <a:r>
-              <a:rPr lang="en-US" sz="4800">
-                <a:latin typeface="Impact" pitchFamily="34" charset="0"/>
-              </a:rPr>
-              <a:t>DISCUSSION</a:t>
-            </a:r>
-          </a:p>
-        </p:txBody>
-      </p:sp>
-      <p:sp>
-        <p:nvSpPr>
-          <p:cNvPr id="31" name="Text Box 29"/>
-          <p:cNvSpPr txBox="1">
-            <a:spLocks noChangeArrowheads="1"/>
-          </p:cNvSpPr>
-          <p:nvPr/>
-        </p:nvSpPr>
-        <p:spPr bwMode="auto">
-          <a:xfrm>
-            <a:off x="13563600" y="22492593"/>
-            <a:ext cx="17841349" cy="1371600"/>
-          </a:xfrm>
-          <a:prstGeom prst="rect">
-            <a:avLst/>
-          </a:prstGeom>
-          <a:noFill/>
-          <a:ln>
-            <a:noFill/>
-          </a:ln>
-          <a:effectLst/>
-          <a:extLst>
-            <a:ext uri="{909E8E84-426E-40DD-AFC4-6F175D3DCCD1}">
-              <a14:hiddenFill xmlns:a14="http://schemas.microsoft.com/office/drawing/2010/main">
-                <a:solidFill>
-                  <a:schemeClr val="accent1"/>
-                </a:solidFill>
-              </a14:hiddenFill>
-            </a:ext>
-            <a:ext uri="{91240B29-F687-4F45-9708-019B960494DF}">
-              <a14:hiddenLine xmlns:a14="http://schemas.microsoft.com/office/drawing/2010/main" w="9525">
-                <a:solidFill>
-                  <a:schemeClr val="tx1"/>
-                </a:solidFill>
-                <a:prstDash val="sysDot"/>
-                <a:miter lim="800000"/>
-                <a:headEnd/>
-                <a:tailEnd/>
-              </a14:hiddenLine>
-            </a:ext>
-            <a:ext uri="{AF507438-7753-43E0-B8FC-AC1667EBCBE1}">
-              <a14:hiddenEffects xmlns:a14="http://schemas.microsoft.com/office/drawing/2010/main">
-                <a:effectLst>
-                  <a:outerShdw dist="35921" dir="2700000" algn="ctr" rotWithShape="0">
-                    <a:schemeClr val="bg2"/>
-                  </a:outerShdw>
-                </a:effectLst>
-              </a14:hiddenEffects>
-            </a:ext>
-          </a:extLst>
-        </p:spPr>
-        <p:txBody>
-          <a:bodyPr wrap="none" lIns="228600" tIns="228600" rIns="228600" bIns="228600" anchor="ctr" anchorCtr="1"/>
-          <a:lstStyle>
-            <a:lvl1pPr defTabSz="4389438">
-              <a:defRPr>
-                <a:solidFill>
-                  <a:schemeClr val="tx1"/>
-                </a:solidFill>
-                <a:latin typeface="Arial" charset="0"/>
-              </a:defRPr>
-            </a:lvl1pPr>
-            <a:lvl2pPr defTabSz="4389438">
-              <a:defRPr>
-                <a:solidFill>
-                  <a:schemeClr val="tx1"/>
-                </a:solidFill>
-                <a:latin typeface="Arial" charset="0"/>
-              </a:defRPr>
-            </a:lvl2pPr>
-            <a:lvl3pPr defTabSz="4389438">
-              <a:defRPr>
-                <a:solidFill>
-                  <a:schemeClr val="tx1"/>
-                </a:solidFill>
-                <a:latin typeface="Arial" charset="0"/>
-              </a:defRPr>
-            </a:lvl3pPr>
-            <a:lvl4pPr defTabSz="4389438">
-              <a:defRPr>
-                <a:solidFill>
-                  <a:schemeClr val="tx1"/>
-                </a:solidFill>
-                <a:latin typeface="Arial" charset="0"/>
-              </a:defRPr>
-            </a:lvl4pPr>
-            <a:lvl5pPr defTabSz="4389438">
-              <a:defRPr>
-                <a:solidFill>
-                  <a:schemeClr val="tx1"/>
-                </a:solidFill>
-                <a:latin typeface="Arial" charset="0"/>
-              </a:defRPr>
-            </a:lvl5pPr>
-            <a:lvl6pPr defTabSz="4389438" fontAlgn="base">
-              <a:spcBef>
-                <a:spcPct val="0"/>
-              </a:spcBef>
-              <a:spcAft>
-                <a:spcPct val="0"/>
-              </a:spcAft>
-              <a:defRPr>
-                <a:solidFill>
-                  <a:schemeClr val="tx1"/>
-                </a:solidFill>
-                <a:latin typeface="Arial" charset="0"/>
-              </a:defRPr>
-            </a:lvl6pPr>
-            <a:lvl7pPr defTabSz="4389438" fontAlgn="base">
-              <a:spcBef>
-                <a:spcPct val="0"/>
-              </a:spcBef>
-              <a:spcAft>
-                <a:spcPct val="0"/>
-              </a:spcAft>
-              <a:defRPr>
-                <a:solidFill>
-                  <a:schemeClr val="tx1"/>
-                </a:solidFill>
-                <a:latin typeface="Arial" charset="0"/>
-              </a:defRPr>
-            </a:lvl7pPr>
-            <a:lvl8pPr defTabSz="4389438" fontAlgn="base">
-              <a:spcBef>
-                <a:spcPct val="0"/>
-              </a:spcBef>
-              <a:spcAft>
-                <a:spcPct val="0"/>
-              </a:spcAft>
-              <a:defRPr>
-                <a:solidFill>
-                  <a:schemeClr val="tx1"/>
-                </a:solidFill>
-                <a:latin typeface="Arial" charset="0"/>
-              </a:defRPr>
-            </a:lvl8pPr>
-            <a:lvl9pPr defTabSz="4389438" fontAlgn="base">
-              <a:spcBef>
-                <a:spcPct val="0"/>
-              </a:spcBef>
-              <a:spcAft>
-                <a:spcPct val="0"/>
-              </a:spcAft>
-              <a:defRPr>
-                <a:solidFill>
-                  <a:schemeClr val="tx1"/>
-                </a:solidFill>
-                <a:latin typeface="Arial" charset="0"/>
-              </a:defRPr>
-            </a:lvl9pPr>
-          </a:lstStyle>
-          <a:p>
-            <a:r>
-              <a:rPr lang="en-US" sz="4800" dirty="0">
-                <a:latin typeface="Impact" pitchFamily="34" charset="0"/>
-              </a:rPr>
-              <a:t>RESULTS</a:t>
-            </a:r>
-          </a:p>
-        </p:txBody>
-      </p:sp>
-      <p:sp>
-        <p:nvSpPr>
           <p:cNvPr id="32" name="Text Box 30"/>
           <p:cNvSpPr txBox="1">
             <a:spLocks noChangeArrowheads="1"/>
@@ -5317,7 +3514,7 @@
         </p:nvSpPr>
         <p:spPr bwMode="auto">
           <a:xfrm>
-            <a:off x="38022987" y="22457672"/>
+            <a:off x="38000575" y="18368676"/>
             <a:ext cx="5548313" cy="1179722"/>
           </a:xfrm>
           <a:prstGeom prst="rect">
@@ -5491,7 +3688,7 @@
         </p:blipFill>
         <p:spPr bwMode="auto">
           <a:xfrm>
-            <a:off x="38039029" y="30368858"/>
+            <a:off x="6661803" y="30283642"/>
             <a:ext cx="5916261" cy="2495645"/>
           </a:xfrm>
           <a:prstGeom prst="rect">
@@ -5565,267 +3762,6 @@
       </p:pic>
       <p:sp>
         <p:nvSpPr>
-          <p:cNvPr id="19" name="Text Box 14"/>
-          <p:cNvSpPr txBox="1">
-            <a:spLocks noChangeArrowheads="1"/>
-          </p:cNvSpPr>
-          <p:nvPr/>
-        </p:nvSpPr>
-        <p:spPr bwMode="auto">
-          <a:xfrm>
-            <a:off x="10608748" y="3736189"/>
-            <a:ext cx="5788025" cy="5724644"/>
-          </a:xfrm>
-          <a:prstGeom prst="rect">
-            <a:avLst/>
-          </a:prstGeom>
-          <a:noFill/>
-          <a:ln w="19050">
-            <a:solidFill>
-              <a:srgbClr val="FFFFFF"/>
-            </a:solidFill>
-            <a:prstDash val="dash"/>
-            <a:miter lim="800000"/>
-            <a:headEnd/>
-            <a:tailEnd/>
-          </a:ln>
-          <a:effectLst/>
-          <a:extLst>
-            <a:ext uri="{909E8E84-426E-40DD-AFC4-6F175D3DCCD1}">
-              <a14:hiddenFill xmlns:a14="http://schemas.microsoft.com/office/drawing/2010/main">
-                <a:solidFill>
-                  <a:schemeClr val="accent1"/>
-                </a:solidFill>
-              </a14:hiddenFill>
-            </a:ext>
-            <a:ext uri="{AF507438-7753-43E0-B8FC-AC1667EBCBE1}">
-              <a14:hiddenEffects xmlns:a14="http://schemas.microsoft.com/office/drawing/2010/main">
-                <a:effectLst>
-                  <a:outerShdw dist="35921" dir="2700000" algn="ctr" rotWithShape="0">
-                    <a:schemeClr val="bg2"/>
-                  </a:outerShdw>
-                </a:effectLst>
-              </a14:hiddenEffects>
-            </a:ext>
-          </a:extLst>
-        </p:spPr>
-        <p:txBody>
-          <a:bodyPr wrap="square" lIns="228600" tIns="228600" rIns="228600" bIns="228600">
-            <a:spAutoFit/>
-          </a:bodyPr>
-          <a:lstStyle/>
-          <a:p>
-            <a:pPr marL="0" marR="0" lvl="0" indent="0" defTabSz="457200" eaLnBrk="1" fontAlgn="auto" latinLnBrk="0" hangingPunct="1">
-              <a:lnSpc>
-                <a:spcPct val="100000"/>
-              </a:lnSpc>
-              <a:spcBef>
-                <a:spcPts val="0"/>
-              </a:spcBef>
-              <a:spcAft>
-                <a:spcPts val="0"/>
-              </a:spcAft>
-              <a:buClrTx/>
-              <a:buSzTx/>
-              <a:buFontTx/>
-              <a:buNone/>
-              <a:tabLst/>
-              <a:defRPr/>
-            </a:pPr>
-            <a:r>
-              <a:rPr kumimoji="0" lang="en-US" sz="1800" b="0" i="0" u="none" strike="noStrike" kern="0" cap="none" spc="0" normalizeH="0" baseline="0" noProof="0" dirty="0">
-                <a:ln>
-                  <a:noFill/>
-                </a:ln>
-                <a:effectLst/>
-                <a:uLnTx/>
-                <a:uFillTx/>
-                <a:latin typeface="Century Schoolbook" panose="02040604050505020304"/>
-              </a:rPr>
-              <a:t>Click here to insert your Abstract text. Type it in or copy and paste from your Word document or other source.</a:t>
-            </a:r>
-          </a:p>
-          <a:p>
-            <a:pPr marL="0" marR="0" lvl="0" indent="0" defTabSz="457200" eaLnBrk="1" fontAlgn="auto" latinLnBrk="0" hangingPunct="1">
-              <a:lnSpc>
-                <a:spcPct val="100000"/>
-              </a:lnSpc>
-              <a:spcBef>
-                <a:spcPts val="0"/>
-              </a:spcBef>
-              <a:spcAft>
-                <a:spcPts val="0"/>
-              </a:spcAft>
-              <a:buClrTx/>
-              <a:buSzTx/>
-              <a:buFontTx/>
-              <a:buNone/>
-              <a:tabLst/>
-              <a:defRPr/>
-            </a:pPr>
-            <a:endParaRPr kumimoji="0" lang="en-US" sz="1800" b="0" i="0" u="none" strike="noStrike" kern="0" cap="none" spc="0" normalizeH="0" baseline="0" noProof="0" dirty="0">
-              <a:ln>
-                <a:noFill/>
-              </a:ln>
-              <a:effectLst/>
-              <a:uLnTx/>
-              <a:uFillTx/>
-              <a:latin typeface="Century Schoolbook" panose="02040604050505020304"/>
-            </a:endParaRPr>
-          </a:p>
-          <a:p>
-            <a:pPr marL="0" marR="0" lvl="0" indent="0" defTabSz="457200" eaLnBrk="1" fontAlgn="auto" latinLnBrk="0" hangingPunct="1">
-              <a:lnSpc>
-                <a:spcPct val="100000"/>
-              </a:lnSpc>
-              <a:spcBef>
-                <a:spcPts val="0"/>
-              </a:spcBef>
-              <a:spcAft>
-                <a:spcPts val="0"/>
-              </a:spcAft>
-              <a:buClrTx/>
-              <a:buSzTx/>
-              <a:buFontTx/>
-              <a:buNone/>
-              <a:tabLst/>
-              <a:defRPr/>
-            </a:pPr>
-            <a:r>
-              <a:rPr kumimoji="0" lang="en-US" sz="1800" b="0" i="0" u="none" strike="noStrike" kern="0" cap="none" spc="0" normalizeH="0" baseline="0" noProof="0" dirty="0">
-                <a:ln>
-                  <a:noFill/>
-                </a:ln>
-                <a:effectLst/>
-                <a:uLnTx/>
-                <a:uFillTx/>
-                <a:latin typeface="Century Schoolbook" panose="02040604050505020304"/>
-              </a:rPr>
-              <a:t>This text box will automatically re-size to your text.</a:t>
-            </a:r>
-          </a:p>
-          <a:p>
-            <a:pPr marL="0" marR="0" lvl="0" indent="0" defTabSz="457200" eaLnBrk="1" fontAlgn="auto" latinLnBrk="0" hangingPunct="1">
-              <a:lnSpc>
-                <a:spcPct val="100000"/>
-              </a:lnSpc>
-              <a:spcBef>
-                <a:spcPts val="0"/>
-              </a:spcBef>
-              <a:spcAft>
-                <a:spcPts val="0"/>
-              </a:spcAft>
-              <a:buClrTx/>
-              <a:buSzTx/>
-              <a:buFontTx/>
-              <a:buNone/>
-              <a:tabLst/>
-              <a:defRPr/>
-            </a:pPr>
-            <a:endParaRPr kumimoji="0" lang="en-US" sz="1800" b="0" i="0" u="none" strike="noStrike" kern="0" cap="none" spc="0" normalizeH="0" baseline="0" noProof="0" dirty="0">
-              <a:ln>
-                <a:noFill/>
-              </a:ln>
-              <a:effectLst/>
-              <a:uLnTx/>
-              <a:uFillTx/>
-              <a:latin typeface="Century Schoolbook" panose="02040604050505020304"/>
-            </a:endParaRPr>
-          </a:p>
-          <a:p>
-            <a:pPr marL="0" marR="0" lvl="0" indent="0" defTabSz="457200" eaLnBrk="1" fontAlgn="auto" latinLnBrk="0" hangingPunct="1">
-              <a:lnSpc>
-                <a:spcPct val="100000"/>
-              </a:lnSpc>
-              <a:spcBef>
-                <a:spcPts val="0"/>
-              </a:spcBef>
-              <a:spcAft>
-                <a:spcPts val="0"/>
-              </a:spcAft>
-              <a:buClrTx/>
-              <a:buSzTx/>
-              <a:buFontTx/>
-              <a:buNone/>
-              <a:tabLst/>
-              <a:defRPr/>
-            </a:pPr>
-            <a:r>
-              <a:rPr kumimoji="0" lang="en-US" sz="1800" b="0" i="0" u="none" strike="noStrike" kern="0" cap="none" spc="0" normalizeH="0" baseline="0" noProof="0" dirty="0">
-                <a:ln>
-                  <a:noFill/>
-                </a:ln>
-                <a:effectLst/>
-                <a:uLnTx/>
-                <a:uFillTx/>
-                <a:latin typeface="Century Schoolbook" panose="02040604050505020304"/>
-              </a:rPr>
-              <a:t>To change the border style of this text box: Double-click on the dashed border, select ‘Colors and Lines’, and change the border to solid or whatever style/color you like. Or ‘No Line’ to remove the border altogether.</a:t>
-            </a:r>
-          </a:p>
-          <a:p>
-            <a:pPr marL="0" marR="0" lvl="0" indent="0" defTabSz="457200" eaLnBrk="1" fontAlgn="auto" latinLnBrk="0" hangingPunct="1">
-              <a:lnSpc>
-                <a:spcPct val="100000"/>
-              </a:lnSpc>
-              <a:spcBef>
-                <a:spcPts val="0"/>
-              </a:spcBef>
-              <a:spcAft>
-                <a:spcPts val="0"/>
-              </a:spcAft>
-              <a:buClrTx/>
-              <a:buSzTx/>
-              <a:buFontTx/>
-              <a:buNone/>
-              <a:tabLst/>
-              <a:defRPr/>
-            </a:pPr>
-            <a:endParaRPr kumimoji="0" lang="en-US" sz="1800" b="0" i="0" u="none" strike="noStrike" kern="0" cap="none" spc="0" normalizeH="0" baseline="0" noProof="0" dirty="0">
-              <a:ln>
-                <a:noFill/>
-              </a:ln>
-              <a:effectLst/>
-              <a:uLnTx/>
-              <a:uFillTx/>
-              <a:latin typeface="Century Schoolbook" panose="02040604050505020304"/>
-            </a:endParaRPr>
-          </a:p>
-          <a:p>
-            <a:pPr marL="0" marR="0" lvl="0" indent="0" defTabSz="457200" eaLnBrk="1" fontAlgn="auto" latinLnBrk="0" hangingPunct="1">
-              <a:lnSpc>
-                <a:spcPct val="100000"/>
-              </a:lnSpc>
-              <a:spcBef>
-                <a:spcPts val="0"/>
-              </a:spcBef>
-              <a:spcAft>
-                <a:spcPts val="0"/>
-              </a:spcAft>
-              <a:buClrTx/>
-              <a:buSzTx/>
-              <a:buFontTx/>
-              <a:buNone/>
-              <a:tabLst/>
-              <a:defRPr/>
-            </a:pPr>
-            <a:r>
-              <a:rPr kumimoji="0" lang="en-US" sz="1800" b="0" i="0" u="none" strike="noStrike" kern="0" cap="none" spc="0" normalizeH="0" baseline="0" noProof="0" dirty="0">
-                <a:ln>
-                  <a:noFill/>
-                </a:ln>
-                <a:effectLst/>
-                <a:uLnTx/>
-                <a:uFillTx/>
-                <a:latin typeface="Century Schoolbook" panose="02040604050505020304"/>
-              </a:rPr>
-              <a:t>To change the font style of this text box: Click on the border once to highlight the entire text box, then select a different font or font size that suits you. This text is in Arial 32pt and is easily readable up to 6 feet away on a 36” x 48” poster. Try to stay between 28pt – 40pt for best viewing.</a:t>
-            </a:r>
-          </a:p>
-        </p:txBody>
-      </p:sp>
-      <p:sp>
-        <p:nvSpPr>
           <p:cNvPr id="25" name="Text Box 18"/>
           <p:cNvSpPr txBox="1">
             <a:spLocks noChangeArrowheads="1"/>
@@ -5834,7 +3770,7 @@
         </p:nvSpPr>
         <p:spPr bwMode="auto">
           <a:xfrm>
-            <a:off x="17063786" y="3733015"/>
+            <a:off x="7741376" y="4617519"/>
             <a:ext cx="5784850" cy="6858000"/>
           </a:xfrm>
           <a:prstGeom prst="rect">
@@ -6093,7 +4029,7 @@
         </p:nvSpPr>
         <p:spPr bwMode="auto">
           <a:xfrm>
-            <a:off x="17063786" y="2364589"/>
+            <a:off x="7741376" y="3249093"/>
             <a:ext cx="5788025" cy="1371600"/>
           </a:xfrm>
           <a:prstGeom prst="rect">
@@ -6240,166 +4176,6 @@
                 <a:latin typeface="Impact" pitchFamily="34" charset="0"/>
               </a:rPr>
               <a:t>INTRODUCTION</a:t>
-            </a:r>
-          </a:p>
-        </p:txBody>
-      </p:sp>
-      <p:sp>
-        <p:nvSpPr>
-          <p:cNvPr id="33" name="Text Box 118"/>
-          <p:cNvSpPr txBox="1">
-            <a:spLocks noChangeArrowheads="1"/>
-          </p:cNvSpPr>
-          <p:nvPr/>
-        </p:nvSpPr>
-        <p:spPr bwMode="auto">
-          <a:xfrm>
-            <a:off x="10608748" y="2364589"/>
-            <a:ext cx="5788025" cy="1371600"/>
-          </a:xfrm>
-          <a:prstGeom prst="rect">
-            <a:avLst/>
-          </a:prstGeom>
-          <a:noFill/>
-          <a:ln>
-            <a:noFill/>
-          </a:ln>
-          <a:effectLst/>
-          <a:extLst>
-            <a:ext uri="{909E8E84-426E-40DD-AFC4-6F175D3DCCD1}">
-              <a14:hiddenFill xmlns:a14="http://schemas.microsoft.com/office/drawing/2010/main">
-                <a:solidFill>
-                  <a:schemeClr val="accent1"/>
-                </a:solidFill>
-              </a14:hiddenFill>
-            </a:ext>
-            <a:ext uri="{91240B29-F687-4F45-9708-019B960494DF}">
-              <a14:hiddenLine xmlns:a14="http://schemas.microsoft.com/office/drawing/2010/main" w="9525">
-                <a:solidFill>
-                  <a:schemeClr val="tx1"/>
-                </a:solidFill>
-                <a:miter lim="800000"/>
-                <a:headEnd/>
-                <a:tailEnd/>
-              </a14:hiddenLine>
-            </a:ext>
-            <a:ext uri="{AF507438-7753-43E0-B8FC-AC1667EBCBE1}">
-              <a14:hiddenEffects xmlns:a14="http://schemas.microsoft.com/office/drawing/2010/main">
-                <a:effectLst>
-                  <a:outerShdw dist="35921" dir="2700000" algn="ctr" rotWithShape="0">
-                    <a:schemeClr val="bg2"/>
-                  </a:outerShdw>
-                </a:effectLst>
-              </a14:hiddenEffects>
-            </a:ext>
-          </a:extLst>
-        </p:spPr>
-        <p:txBody>
-          <a:bodyPr wrap="none" lIns="228600" tIns="228600" rIns="228600" bIns="228600" anchor="ctr" anchorCtr="1"/>
-          <a:lstStyle>
-            <a:lvl1pPr defTabSz="4389438">
-              <a:defRPr>
-                <a:solidFill>
-                  <a:schemeClr val="tx1"/>
-                </a:solidFill>
-                <a:latin typeface="Arial" charset="0"/>
-              </a:defRPr>
-            </a:lvl1pPr>
-            <a:lvl2pPr defTabSz="4389438">
-              <a:defRPr>
-                <a:solidFill>
-                  <a:schemeClr val="tx1"/>
-                </a:solidFill>
-                <a:latin typeface="Arial" charset="0"/>
-              </a:defRPr>
-            </a:lvl2pPr>
-            <a:lvl3pPr defTabSz="4389438">
-              <a:defRPr>
-                <a:solidFill>
-                  <a:schemeClr val="tx1"/>
-                </a:solidFill>
-                <a:latin typeface="Arial" charset="0"/>
-              </a:defRPr>
-            </a:lvl3pPr>
-            <a:lvl4pPr defTabSz="4389438">
-              <a:defRPr>
-                <a:solidFill>
-                  <a:schemeClr val="tx1"/>
-                </a:solidFill>
-                <a:latin typeface="Arial" charset="0"/>
-              </a:defRPr>
-            </a:lvl4pPr>
-            <a:lvl5pPr defTabSz="4389438">
-              <a:defRPr>
-                <a:solidFill>
-                  <a:schemeClr val="tx1"/>
-                </a:solidFill>
-                <a:latin typeface="Arial" charset="0"/>
-              </a:defRPr>
-            </a:lvl5pPr>
-            <a:lvl6pPr defTabSz="4389438" fontAlgn="base">
-              <a:spcBef>
-                <a:spcPct val="0"/>
-              </a:spcBef>
-              <a:spcAft>
-                <a:spcPct val="0"/>
-              </a:spcAft>
-              <a:defRPr>
-                <a:solidFill>
-                  <a:schemeClr val="tx1"/>
-                </a:solidFill>
-                <a:latin typeface="Arial" charset="0"/>
-              </a:defRPr>
-            </a:lvl6pPr>
-            <a:lvl7pPr defTabSz="4389438" fontAlgn="base">
-              <a:spcBef>
-                <a:spcPct val="0"/>
-              </a:spcBef>
-              <a:spcAft>
-                <a:spcPct val="0"/>
-              </a:spcAft>
-              <a:defRPr>
-                <a:solidFill>
-                  <a:schemeClr val="tx1"/>
-                </a:solidFill>
-                <a:latin typeface="Arial" charset="0"/>
-              </a:defRPr>
-            </a:lvl7pPr>
-            <a:lvl8pPr defTabSz="4389438" fontAlgn="base">
-              <a:spcBef>
-                <a:spcPct val="0"/>
-              </a:spcBef>
-              <a:spcAft>
-                <a:spcPct val="0"/>
-              </a:spcAft>
-              <a:defRPr>
-                <a:solidFill>
-                  <a:schemeClr val="tx1"/>
-                </a:solidFill>
-                <a:latin typeface="Arial" charset="0"/>
-              </a:defRPr>
-            </a:lvl8pPr>
-            <a:lvl9pPr defTabSz="4389438" fontAlgn="base">
-              <a:spcBef>
-                <a:spcPct val="0"/>
-              </a:spcBef>
-              <a:spcAft>
-                <a:spcPct val="0"/>
-              </a:spcAft>
-              <a:defRPr>
-                <a:solidFill>
-                  <a:schemeClr val="tx1"/>
-                </a:solidFill>
-                <a:latin typeface="Arial" charset="0"/>
-              </a:defRPr>
-            </a:lvl9pPr>
-          </a:lstStyle>
-          <a:p>
-            <a:r>
-              <a:rPr lang="en-US" sz="4800" dirty="0">
-                <a:latin typeface="Impact" pitchFamily="34" charset="0"/>
-              </a:rPr>
-              <a:t>ABSTRACT</a:t>
             </a:r>
           </a:p>
         </p:txBody>
@@ -6550,6 +4326,610 @@
           </a:p>
         </p:txBody>
       </p:sp>
+      <p:sp>
+        <p:nvSpPr>
+          <p:cNvPr id="35" name="Text Box 22"/>
+          <p:cNvSpPr txBox="1">
+            <a:spLocks noChangeArrowheads="1"/>
+          </p:cNvSpPr>
+          <p:nvPr/>
+        </p:nvSpPr>
+        <p:spPr bwMode="auto">
+          <a:xfrm>
+            <a:off x="37939815" y="31602796"/>
+            <a:ext cx="5548313" cy="1176491"/>
+          </a:xfrm>
+          <a:prstGeom prst="rect">
+            <a:avLst/>
+          </a:prstGeom>
+          <a:noFill/>
+          <a:ln w="19050">
+            <a:solidFill>
+              <a:srgbClr val="FFFFFF"/>
+            </a:solidFill>
+            <a:prstDash val="dash"/>
+            <a:miter lim="800000"/>
+            <a:headEnd/>
+            <a:tailEnd/>
+          </a:ln>
+          <a:effectLst/>
+          <a:extLst>
+            <a:ext uri="{909E8E84-426E-40DD-AFC4-6F175D3DCCD1}">
+              <a14:hiddenFill xmlns:a14="http://schemas.microsoft.com/office/drawing/2010/main">
+                <a:solidFill>
+                  <a:schemeClr val="accent1"/>
+                </a:solidFill>
+              </a14:hiddenFill>
+            </a:ext>
+            <a:ext uri="{AF507438-7753-43E0-B8FC-AC1667EBCBE1}">
+              <a14:hiddenEffects xmlns:a14="http://schemas.microsoft.com/office/drawing/2010/main">
+                <a:effectLst>
+                  <a:outerShdw dist="35921" dir="2700000" algn="ctr" rotWithShape="0">
+                    <a:schemeClr val="bg2"/>
+                  </a:outerShdw>
+                </a:effectLst>
+              </a14:hiddenEffects>
+            </a:ext>
+          </a:extLst>
+        </p:spPr>
+        <p:txBody>
+          <a:bodyPr lIns="228600" tIns="228600" rIns="228600" bIns="228600"/>
+          <a:lstStyle/>
+          <a:p>
+            <a:pPr marL="0" marR="0" lvl="0" indent="0" algn="ctr" defTabSz="457200" eaLnBrk="1" fontAlgn="auto" latinLnBrk="0" hangingPunct="1">
+              <a:lnSpc>
+                <a:spcPct val="100000"/>
+              </a:lnSpc>
+              <a:spcBef>
+                <a:spcPts val="0"/>
+              </a:spcBef>
+              <a:spcAft>
+                <a:spcPts val="0"/>
+              </a:spcAft>
+              <a:buClrTx/>
+              <a:buSzTx/>
+              <a:buFontTx/>
+              <a:buNone/>
+              <a:tabLst/>
+              <a:defRPr/>
+            </a:pPr>
+            <a:r>
+              <a:rPr kumimoji="0" lang="en-US" sz="1800" b="0" i="0" u="none" strike="noStrike" kern="0" cap="none" spc="0" normalizeH="0" baseline="0" noProof="0" dirty="0">
+                <a:ln>
+                  <a:noFill/>
+                </a:ln>
+                <a:effectLst/>
+                <a:uLnTx/>
+                <a:uFillTx/>
+                <a:latin typeface="Century Schoolbook" panose="02040604050505020304"/>
+              </a:rPr>
+              <a:t>Christopher Small</a:t>
+            </a:r>
+          </a:p>
+          <a:p>
+            <a:pPr marL="0" marR="0" lvl="0" indent="0" algn="ctr" defTabSz="457200" eaLnBrk="1" fontAlgn="auto" latinLnBrk="0" hangingPunct="1">
+              <a:lnSpc>
+                <a:spcPct val="100000"/>
+              </a:lnSpc>
+              <a:spcBef>
+                <a:spcPts val="0"/>
+              </a:spcBef>
+              <a:spcAft>
+                <a:spcPts val="0"/>
+              </a:spcAft>
+              <a:buClrTx/>
+              <a:buSzTx/>
+              <a:buFontTx/>
+              <a:buNone/>
+              <a:tabLst/>
+              <a:defRPr/>
+            </a:pPr>
+            <a:r>
+              <a:rPr lang="en-US" sz="1800" kern="0" dirty="0">
+                <a:latin typeface="Century Schoolbook" panose="02040604050505020304"/>
+                <a:hlinkClick r:id="rId5"/>
+              </a:rPr>
+              <a:t>N00931863@ospreys.unf.edu</a:t>
+            </a:r>
+            <a:endParaRPr lang="en-US" sz="1800" kern="0" dirty="0">
+              <a:latin typeface="Century Schoolbook" panose="02040604050505020304"/>
+            </a:endParaRPr>
+          </a:p>
+          <a:p>
+            <a:pPr marL="0" marR="0" lvl="0" indent="0" defTabSz="457200" eaLnBrk="1" fontAlgn="auto" latinLnBrk="0" hangingPunct="1">
+              <a:lnSpc>
+                <a:spcPct val="100000"/>
+              </a:lnSpc>
+              <a:spcBef>
+                <a:spcPts val="0"/>
+              </a:spcBef>
+              <a:spcAft>
+                <a:spcPts val="0"/>
+              </a:spcAft>
+              <a:buClrTx/>
+              <a:buSzTx/>
+              <a:buFontTx/>
+              <a:buNone/>
+              <a:tabLst/>
+              <a:defRPr/>
+            </a:pPr>
+            <a:endParaRPr kumimoji="0" lang="en-US" sz="1800" b="0" i="0" u="none" strike="noStrike" kern="0" cap="none" spc="0" normalizeH="0" baseline="0" noProof="0" dirty="0">
+              <a:ln>
+                <a:noFill/>
+              </a:ln>
+              <a:effectLst/>
+              <a:uLnTx/>
+              <a:uFillTx/>
+              <a:latin typeface="Century Schoolbook" panose="02040604050505020304"/>
+            </a:endParaRPr>
+          </a:p>
+        </p:txBody>
+      </p:sp>
+      <p:sp>
+        <p:nvSpPr>
+          <p:cNvPr id="37" name="Text Box 27"/>
+          <p:cNvSpPr txBox="1">
+            <a:spLocks noChangeArrowheads="1"/>
+          </p:cNvSpPr>
+          <p:nvPr/>
+        </p:nvSpPr>
+        <p:spPr bwMode="auto">
+          <a:xfrm>
+            <a:off x="37885310" y="30488298"/>
+            <a:ext cx="5548313" cy="1114498"/>
+          </a:xfrm>
+          <a:prstGeom prst="rect">
+            <a:avLst/>
+          </a:prstGeom>
+          <a:noFill/>
+          <a:ln>
+            <a:noFill/>
+          </a:ln>
+          <a:effectLst/>
+          <a:extLst>
+            <a:ext uri="{909E8E84-426E-40DD-AFC4-6F175D3DCCD1}">
+              <a14:hiddenFill xmlns:a14="http://schemas.microsoft.com/office/drawing/2010/main">
+                <a:solidFill>
+                  <a:schemeClr val="accent1"/>
+                </a:solidFill>
+              </a14:hiddenFill>
+            </a:ext>
+            <a:ext uri="{91240B29-F687-4F45-9708-019B960494DF}">
+              <a14:hiddenLine xmlns:a14="http://schemas.microsoft.com/office/drawing/2010/main" w="9525">
+                <a:solidFill>
+                  <a:schemeClr val="tx1"/>
+                </a:solidFill>
+                <a:prstDash val="sysDot"/>
+                <a:miter lim="800000"/>
+                <a:headEnd/>
+                <a:tailEnd/>
+              </a14:hiddenLine>
+            </a:ext>
+            <a:ext uri="{AF507438-7753-43E0-B8FC-AC1667EBCBE1}">
+              <a14:hiddenEffects xmlns:a14="http://schemas.microsoft.com/office/drawing/2010/main">
+                <a:effectLst>
+                  <a:outerShdw dist="35921" dir="2700000" algn="ctr" rotWithShape="0">
+                    <a:schemeClr val="bg2"/>
+                  </a:outerShdw>
+                </a:effectLst>
+              </a14:hiddenEffects>
+            </a:ext>
+          </a:extLst>
+        </p:spPr>
+        <p:txBody>
+          <a:bodyPr wrap="none" lIns="228600" tIns="228600" rIns="228600" bIns="228600" anchor="ctr" anchorCtr="1"/>
+          <a:lstStyle>
+            <a:lvl1pPr defTabSz="4389438">
+              <a:defRPr>
+                <a:solidFill>
+                  <a:schemeClr val="tx1"/>
+                </a:solidFill>
+                <a:latin typeface="Arial" charset="0"/>
+              </a:defRPr>
+            </a:lvl1pPr>
+            <a:lvl2pPr defTabSz="4389438">
+              <a:defRPr>
+                <a:solidFill>
+                  <a:schemeClr val="tx1"/>
+                </a:solidFill>
+                <a:latin typeface="Arial" charset="0"/>
+              </a:defRPr>
+            </a:lvl2pPr>
+            <a:lvl3pPr defTabSz="4389438">
+              <a:defRPr>
+                <a:solidFill>
+                  <a:schemeClr val="tx1"/>
+                </a:solidFill>
+                <a:latin typeface="Arial" charset="0"/>
+              </a:defRPr>
+            </a:lvl3pPr>
+            <a:lvl4pPr defTabSz="4389438">
+              <a:defRPr>
+                <a:solidFill>
+                  <a:schemeClr val="tx1"/>
+                </a:solidFill>
+                <a:latin typeface="Arial" charset="0"/>
+              </a:defRPr>
+            </a:lvl4pPr>
+            <a:lvl5pPr defTabSz="4389438">
+              <a:defRPr>
+                <a:solidFill>
+                  <a:schemeClr val="tx1"/>
+                </a:solidFill>
+                <a:latin typeface="Arial" charset="0"/>
+              </a:defRPr>
+            </a:lvl5pPr>
+            <a:lvl6pPr defTabSz="4389438" fontAlgn="base">
+              <a:spcBef>
+                <a:spcPct val="0"/>
+              </a:spcBef>
+              <a:spcAft>
+                <a:spcPct val="0"/>
+              </a:spcAft>
+              <a:defRPr>
+                <a:solidFill>
+                  <a:schemeClr val="tx1"/>
+                </a:solidFill>
+                <a:latin typeface="Arial" charset="0"/>
+              </a:defRPr>
+            </a:lvl6pPr>
+            <a:lvl7pPr defTabSz="4389438" fontAlgn="base">
+              <a:spcBef>
+                <a:spcPct val="0"/>
+              </a:spcBef>
+              <a:spcAft>
+                <a:spcPct val="0"/>
+              </a:spcAft>
+              <a:defRPr>
+                <a:solidFill>
+                  <a:schemeClr val="tx1"/>
+                </a:solidFill>
+                <a:latin typeface="Arial" charset="0"/>
+              </a:defRPr>
+            </a:lvl7pPr>
+            <a:lvl8pPr defTabSz="4389438" fontAlgn="base">
+              <a:spcBef>
+                <a:spcPct val="0"/>
+              </a:spcBef>
+              <a:spcAft>
+                <a:spcPct val="0"/>
+              </a:spcAft>
+              <a:defRPr>
+                <a:solidFill>
+                  <a:schemeClr val="tx1"/>
+                </a:solidFill>
+                <a:latin typeface="Arial" charset="0"/>
+              </a:defRPr>
+            </a:lvl8pPr>
+            <a:lvl9pPr defTabSz="4389438" fontAlgn="base">
+              <a:spcBef>
+                <a:spcPct val="0"/>
+              </a:spcBef>
+              <a:spcAft>
+                <a:spcPct val="0"/>
+              </a:spcAft>
+              <a:defRPr>
+                <a:solidFill>
+                  <a:schemeClr val="tx1"/>
+                </a:solidFill>
+                <a:latin typeface="Arial" charset="0"/>
+              </a:defRPr>
+            </a:lvl9pPr>
+          </a:lstStyle>
+          <a:p>
+            <a:pPr algn="ctr"/>
+            <a:r>
+              <a:rPr lang="en-US" sz="4800" dirty="0">
+                <a:latin typeface="Impact" pitchFamily="34" charset="0"/>
+              </a:rPr>
+              <a:t>CONTACT</a:t>
+            </a:r>
+          </a:p>
+        </p:txBody>
+      </p:sp>
+      <p:sp>
+        <p:nvSpPr>
+          <p:cNvPr id="39" name="Text Box 22"/>
+          <p:cNvSpPr txBox="1">
+            <a:spLocks noChangeArrowheads="1"/>
+          </p:cNvSpPr>
+          <p:nvPr/>
+        </p:nvSpPr>
+        <p:spPr bwMode="auto">
+          <a:xfrm>
+            <a:off x="37923410" y="28920733"/>
+            <a:ext cx="5548313" cy="1473469"/>
+          </a:xfrm>
+          <a:prstGeom prst="rect">
+            <a:avLst/>
+          </a:prstGeom>
+          <a:noFill/>
+          <a:ln w="19050">
+            <a:solidFill>
+              <a:srgbClr val="FFFFFF"/>
+            </a:solidFill>
+            <a:prstDash val="dash"/>
+            <a:miter lim="800000"/>
+            <a:headEnd/>
+            <a:tailEnd/>
+          </a:ln>
+          <a:effectLst/>
+          <a:extLst>
+            <a:ext uri="{909E8E84-426E-40DD-AFC4-6F175D3DCCD1}">
+              <a14:hiddenFill xmlns:a14="http://schemas.microsoft.com/office/drawing/2010/main">
+                <a:solidFill>
+                  <a:schemeClr val="accent1"/>
+                </a:solidFill>
+              </a14:hiddenFill>
+            </a:ext>
+            <a:ext uri="{AF507438-7753-43E0-B8FC-AC1667EBCBE1}">
+              <a14:hiddenEffects xmlns:a14="http://schemas.microsoft.com/office/drawing/2010/main">
+                <a:effectLst>
+                  <a:outerShdw dist="35921" dir="2700000" algn="ctr" rotWithShape="0">
+                    <a:schemeClr val="bg2"/>
+                  </a:outerShdw>
+                </a:effectLst>
+              </a14:hiddenEffects>
+            </a:ext>
+          </a:extLst>
+        </p:spPr>
+        <p:txBody>
+          <a:bodyPr lIns="228600" tIns="228600" rIns="228600" bIns="228600"/>
+          <a:lstStyle/>
+          <a:p>
+            <a:pPr lvl="0" algn="ctr" defTabSz="457200">
+              <a:defRPr/>
+            </a:pPr>
+            <a:r>
+              <a:rPr lang="en-US" sz="1800" kern="0" dirty="0">
+                <a:latin typeface="Century Schoolbook" panose="02040604050505020304"/>
+              </a:rPr>
+              <a:t>CNT 4514C: Wireless Networks and Mobile Computing</a:t>
+            </a:r>
+          </a:p>
+          <a:p>
+            <a:pPr lvl="0" algn="ctr" defTabSz="457200">
+              <a:defRPr/>
+            </a:pPr>
+            <a:r>
+              <a:rPr lang="en-US" sz="1800" kern="0" dirty="0">
+                <a:latin typeface="Century Schoolbook" panose="02040604050505020304"/>
+              </a:rPr>
+              <a:t>Professor </a:t>
+            </a:r>
+            <a:r>
+              <a:rPr lang="en-US" sz="1800" kern="0" dirty="0" err="1">
+                <a:latin typeface="Century Schoolbook" panose="02040604050505020304"/>
+              </a:rPr>
+              <a:t>Zornitza</a:t>
+            </a:r>
+            <a:r>
+              <a:rPr lang="en-US" sz="1800" kern="0" dirty="0">
+                <a:latin typeface="Century Schoolbook" panose="02040604050505020304"/>
+              </a:rPr>
+              <a:t> Genova </a:t>
+            </a:r>
+            <a:r>
+              <a:rPr lang="en-US" sz="1800" kern="0" dirty="0" err="1">
+                <a:latin typeface="Century Schoolbook" panose="02040604050505020304"/>
+              </a:rPr>
+              <a:t>Prodanoff</a:t>
+            </a:r>
+            <a:endParaRPr lang="en-US" sz="1800" kern="0" dirty="0">
+              <a:latin typeface="Century Schoolbook" panose="02040604050505020304"/>
+            </a:endParaRPr>
+          </a:p>
+          <a:p>
+            <a:pPr lvl="0" algn="ctr" defTabSz="457200">
+              <a:defRPr/>
+            </a:pPr>
+            <a:r>
+              <a:rPr kumimoji="0" lang="en-US" sz="1800" b="0" i="0" u="none" strike="noStrike" kern="0" cap="none" spc="0" normalizeH="0" baseline="0" noProof="0" dirty="0">
+                <a:ln>
+                  <a:noFill/>
+                </a:ln>
+                <a:effectLst/>
+                <a:uLnTx/>
+                <a:uFillTx/>
+                <a:latin typeface="Century Schoolbook" panose="02040604050505020304"/>
+              </a:rPr>
+              <a:t>Spring Term 2017</a:t>
+            </a:r>
+          </a:p>
+        </p:txBody>
+      </p:sp>
+      <p:sp>
+        <p:nvSpPr>
+          <p:cNvPr id="41" name="Text Box 27"/>
+          <p:cNvSpPr txBox="1">
+            <a:spLocks noChangeArrowheads="1"/>
+          </p:cNvSpPr>
+          <p:nvPr/>
+        </p:nvSpPr>
+        <p:spPr bwMode="auto">
+          <a:xfrm>
+            <a:off x="37923410" y="27806235"/>
+            <a:ext cx="5548313" cy="1114497"/>
+          </a:xfrm>
+          <a:prstGeom prst="rect">
+            <a:avLst/>
+          </a:prstGeom>
+          <a:noFill/>
+          <a:ln>
+            <a:noFill/>
+          </a:ln>
+          <a:effectLst/>
+          <a:extLst>
+            <a:ext uri="{909E8E84-426E-40DD-AFC4-6F175D3DCCD1}">
+              <a14:hiddenFill xmlns:a14="http://schemas.microsoft.com/office/drawing/2010/main">
+                <a:solidFill>
+                  <a:schemeClr val="accent1"/>
+                </a:solidFill>
+              </a14:hiddenFill>
+            </a:ext>
+            <a:ext uri="{91240B29-F687-4F45-9708-019B960494DF}">
+              <a14:hiddenLine xmlns:a14="http://schemas.microsoft.com/office/drawing/2010/main" w="9525">
+                <a:solidFill>
+                  <a:schemeClr val="tx1"/>
+                </a:solidFill>
+                <a:prstDash val="sysDot"/>
+                <a:miter lim="800000"/>
+                <a:headEnd/>
+                <a:tailEnd/>
+              </a14:hiddenLine>
+            </a:ext>
+            <a:ext uri="{AF507438-7753-43E0-B8FC-AC1667EBCBE1}">
+              <a14:hiddenEffects xmlns:a14="http://schemas.microsoft.com/office/drawing/2010/main">
+                <a:effectLst>
+                  <a:outerShdw dist="35921" dir="2700000" algn="ctr" rotWithShape="0">
+                    <a:schemeClr val="bg2"/>
+                  </a:outerShdw>
+                </a:effectLst>
+              </a14:hiddenEffects>
+            </a:ext>
+          </a:extLst>
+        </p:spPr>
+        <p:txBody>
+          <a:bodyPr wrap="none" lIns="228600" tIns="228600" rIns="228600" bIns="228600" anchor="ctr" anchorCtr="1"/>
+          <a:lstStyle>
+            <a:lvl1pPr defTabSz="4389438">
+              <a:defRPr>
+                <a:solidFill>
+                  <a:schemeClr val="tx1"/>
+                </a:solidFill>
+                <a:latin typeface="Arial" charset="0"/>
+              </a:defRPr>
+            </a:lvl1pPr>
+            <a:lvl2pPr defTabSz="4389438">
+              <a:defRPr>
+                <a:solidFill>
+                  <a:schemeClr val="tx1"/>
+                </a:solidFill>
+                <a:latin typeface="Arial" charset="0"/>
+              </a:defRPr>
+            </a:lvl2pPr>
+            <a:lvl3pPr defTabSz="4389438">
+              <a:defRPr>
+                <a:solidFill>
+                  <a:schemeClr val="tx1"/>
+                </a:solidFill>
+                <a:latin typeface="Arial" charset="0"/>
+              </a:defRPr>
+            </a:lvl3pPr>
+            <a:lvl4pPr defTabSz="4389438">
+              <a:defRPr>
+                <a:solidFill>
+                  <a:schemeClr val="tx1"/>
+                </a:solidFill>
+                <a:latin typeface="Arial" charset="0"/>
+              </a:defRPr>
+            </a:lvl4pPr>
+            <a:lvl5pPr defTabSz="4389438">
+              <a:defRPr>
+                <a:solidFill>
+                  <a:schemeClr val="tx1"/>
+                </a:solidFill>
+                <a:latin typeface="Arial" charset="0"/>
+              </a:defRPr>
+            </a:lvl5pPr>
+            <a:lvl6pPr defTabSz="4389438" fontAlgn="base">
+              <a:spcBef>
+                <a:spcPct val="0"/>
+              </a:spcBef>
+              <a:spcAft>
+                <a:spcPct val="0"/>
+              </a:spcAft>
+              <a:defRPr>
+                <a:solidFill>
+                  <a:schemeClr val="tx1"/>
+                </a:solidFill>
+                <a:latin typeface="Arial" charset="0"/>
+              </a:defRPr>
+            </a:lvl6pPr>
+            <a:lvl7pPr defTabSz="4389438" fontAlgn="base">
+              <a:spcBef>
+                <a:spcPct val="0"/>
+              </a:spcBef>
+              <a:spcAft>
+                <a:spcPct val="0"/>
+              </a:spcAft>
+              <a:defRPr>
+                <a:solidFill>
+                  <a:schemeClr val="tx1"/>
+                </a:solidFill>
+                <a:latin typeface="Arial" charset="0"/>
+              </a:defRPr>
+            </a:lvl7pPr>
+            <a:lvl8pPr defTabSz="4389438" fontAlgn="base">
+              <a:spcBef>
+                <a:spcPct val="0"/>
+              </a:spcBef>
+              <a:spcAft>
+                <a:spcPct val="0"/>
+              </a:spcAft>
+              <a:defRPr>
+                <a:solidFill>
+                  <a:schemeClr val="tx1"/>
+                </a:solidFill>
+                <a:latin typeface="Arial" charset="0"/>
+              </a:defRPr>
+            </a:lvl8pPr>
+            <a:lvl9pPr defTabSz="4389438" fontAlgn="base">
+              <a:spcBef>
+                <a:spcPct val="0"/>
+              </a:spcBef>
+              <a:spcAft>
+                <a:spcPct val="0"/>
+              </a:spcAft>
+              <a:defRPr>
+                <a:solidFill>
+                  <a:schemeClr val="tx1"/>
+                </a:solidFill>
+                <a:latin typeface="Arial" charset="0"/>
+              </a:defRPr>
+            </a:lvl9pPr>
+          </a:lstStyle>
+          <a:p>
+            <a:pPr algn="ctr"/>
+            <a:r>
+              <a:rPr lang="en-US" sz="4800" dirty="0">
+                <a:latin typeface="Impact" pitchFamily="34" charset="0"/>
+              </a:rPr>
+              <a:t>COURSE INFORMATION</a:t>
+            </a:r>
+          </a:p>
+        </p:txBody>
+      </p:sp>
+      <p:pic>
+        <p:nvPicPr>
+          <p:cNvPr id="4" name="Picture 3"/>
+          <p:cNvPicPr>
+            <a:picLocks noChangeAspect="1"/>
+          </p:cNvPicPr>
+          <p:nvPr/>
+        </p:nvPicPr>
+        <p:blipFill>
+          <a:blip r:embed="rId6">
+            <a:extLst>
+              <a:ext uri="{28A0092B-C50C-407E-A947-70E740481C1C}">
+                <a14:useLocalDpi xmlns:a14="http://schemas.microsoft.com/office/drawing/2010/main" val="0"/>
+              </a:ext>
+            </a:extLst>
+          </a:blip>
+          <a:stretch>
+            <a:fillRect/>
+          </a:stretch>
+        </p:blipFill>
+        <p:spPr>
+          <a:xfrm>
+            <a:off x="33573747" y="251787"/>
+            <a:ext cx="9975141" cy="2306955"/>
+          </a:xfrm>
+          <a:prstGeom prst="rect">
+            <a:avLst/>
+          </a:prstGeom>
+        </p:spPr>
+      </p:pic>
     </p:spTree>
     <p:extLst>
       <p:ext uri="{BB962C8B-B14F-4D97-AF65-F5344CB8AC3E}">

</xml_diff>

<commit_message>
added more docs to reference
</commit_message>
<xml_diff>
--- a/Poster Artifacts/Poster.pptx
+++ b/Poster Artifacts/Poster.pptx
@@ -303,7 +303,7 @@
             <a:fld id="{1D8BD707-D9CF-40AE-B4C6-C98DA3205C09}" type="datetimeFigureOut">
               <a:rPr lang="en-US" smtClean="0"/>
               <a:pPr/>
-              <a:t>1/31/2017</a:t>
+              <a:t>2/1/2017</a:t>
             </a:fld>
             <a:endParaRPr lang="en-US"/>
           </a:p>
@@ -468,7 +468,7 @@
             <a:fld id="{1D8BD707-D9CF-40AE-B4C6-C98DA3205C09}" type="datetimeFigureOut">
               <a:rPr lang="en-US" smtClean="0"/>
               <a:pPr/>
-              <a:t>1/31/2017</a:t>
+              <a:t>2/1/2017</a:t>
             </a:fld>
             <a:endParaRPr lang="en-US"/>
           </a:p>
@@ -643,7 +643,7 @@
             <a:fld id="{1D8BD707-D9CF-40AE-B4C6-C98DA3205C09}" type="datetimeFigureOut">
               <a:rPr lang="en-US" smtClean="0"/>
               <a:pPr/>
-              <a:t>1/31/2017</a:t>
+              <a:t>2/1/2017</a:t>
             </a:fld>
             <a:endParaRPr lang="en-US"/>
           </a:p>
@@ -808,7 +808,7 @@
             <a:fld id="{1D8BD707-D9CF-40AE-B4C6-C98DA3205C09}" type="datetimeFigureOut">
               <a:rPr lang="en-US" smtClean="0"/>
               <a:pPr/>
-              <a:t>1/31/2017</a:t>
+              <a:t>2/1/2017</a:t>
             </a:fld>
             <a:endParaRPr lang="en-US"/>
           </a:p>
@@ -1050,7 +1050,7 @@
             <a:fld id="{1D8BD707-D9CF-40AE-B4C6-C98DA3205C09}" type="datetimeFigureOut">
               <a:rPr lang="en-US" smtClean="0"/>
               <a:pPr/>
-              <a:t>1/31/2017</a:t>
+              <a:t>2/1/2017</a:t>
             </a:fld>
             <a:endParaRPr lang="en-US"/>
           </a:p>
@@ -1332,7 +1332,7 @@
             <a:fld id="{1D8BD707-D9CF-40AE-B4C6-C98DA3205C09}" type="datetimeFigureOut">
               <a:rPr lang="en-US" smtClean="0"/>
               <a:pPr/>
-              <a:t>1/31/2017</a:t>
+              <a:t>2/1/2017</a:t>
             </a:fld>
             <a:endParaRPr lang="en-US"/>
           </a:p>
@@ -1748,7 +1748,7 @@
             <a:fld id="{1D8BD707-D9CF-40AE-B4C6-C98DA3205C09}" type="datetimeFigureOut">
               <a:rPr lang="en-US" smtClean="0"/>
               <a:pPr/>
-              <a:t>1/31/2017</a:t>
+              <a:t>2/1/2017</a:t>
             </a:fld>
             <a:endParaRPr lang="en-US"/>
           </a:p>
@@ -1862,7 +1862,7 @@
             <a:fld id="{1D8BD707-D9CF-40AE-B4C6-C98DA3205C09}" type="datetimeFigureOut">
               <a:rPr lang="en-US" smtClean="0"/>
               <a:pPr/>
-              <a:t>1/31/2017</a:t>
+              <a:t>2/1/2017</a:t>
             </a:fld>
             <a:endParaRPr lang="en-US"/>
           </a:p>
@@ -1954,7 +1954,7 @@
             <a:fld id="{1D8BD707-D9CF-40AE-B4C6-C98DA3205C09}" type="datetimeFigureOut">
               <a:rPr lang="en-US" smtClean="0"/>
               <a:pPr/>
-              <a:t>1/31/2017</a:t>
+              <a:t>2/1/2017</a:t>
             </a:fld>
             <a:endParaRPr lang="en-US"/>
           </a:p>
@@ -2226,7 +2226,7 @@
             <a:fld id="{1D8BD707-D9CF-40AE-B4C6-C98DA3205C09}" type="datetimeFigureOut">
               <a:rPr lang="en-US" smtClean="0"/>
               <a:pPr/>
-              <a:t>1/31/2017</a:t>
+              <a:t>2/1/2017</a:t>
             </a:fld>
             <a:endParaRPr lang="en-US"/>
           </a:p>
@@ -2475,7 +2475,7 @@
             <a:fld id="{1D8BD707-D9CF-40AE-B4C6-C98DA3205C09}" type="datetimeFigureOut">
               <a:rPr lang="en-US" smtClean="0"/>
               <a:pPr/>
-              <a:t>1/31/2017</a:t>
+              <a:t>2/1/2017</a:t>
             </a:fld>
             <a:endParaRPr lang="en-US"/>
           </a:p>
@@ -2683,7 +2683,7 @@
             <a:fld id="{1D8BD707-D9CF-40AE-B4C6-C98DA3205C09}" type="datetimeFigureOut">
               <a:rPr lang="en-US" smtClean="0"/>
               <a:pPr/>
-              <a:t>1/31/2017</a:t>
+              <a:t>2/1/2017</a:t>
             </a:fld>
             <a:endParaRPr lang="en-US"/>
           </a:p>
@@ -3273,8 +3273,8 @@
         </p:nvSpPr>
         <p:spPr bwMode="auto">
           <a:xfrm>
-            <a:off x="38000575" y="19738688"/>
-            <a:ext cx="5548313" cy="6362854"/>
+            <a:off x="29260801" y="19738688"/>
+            <a:ext cx="14288088" cy="6362854"/>
           </a:xfrm>
           <a:prstGeom prst="rect">
             <a:avLst/>
@@ -3410,97 +3410,70 @@
             </a:lvl9pPr>
           </a:lstStyle>
           <a:p>
-            <a:pPr marL="342900" marR="0" lvl="0" indent="-342900" defTabSz="457200" eaLnBrk="1" fontAlgn="auto" latinLnBrk="0" hangingPunct="1">
-              <a:lnSpc>
-                <a:spcPct val="100000"/>
-              </a:lnSpc>
-              <a:spcBef>
-                <a:spcPts val="0"/>
-              </a:spcBef>
+            <a:pPr marL="457200" lvl="0" indent="-457200" defTabSz="457200">
               <a:spcAft>
                 <a:spcPct val="50000"/>
               </a:spcAft>
-              <a:buClrTx/>
-              <a:buSzTx/>
-              <a:buFontTx/>
+              <a:buFont typeface="+mj-lt"/>
               <a:buAutoNum type="arabicPeriod"/>
-              <a:tabLst/>
               <a:defRPr/>
             </a:pPr>
             <a:r>
-              <a:rPr kumimoji="0" lang="en-US" sz="2400" b="0" i="0" u="none" strike="noStrike" kern="0" cap="none" spc="0" normalizeH="0" baseline="0" noProof="0" dirty="0">
-                <a:ln>
-                  <a:noFill/>
-                </a:ln>
-                <a:effectLst/>
-                <a:uLnTx/>
-                <a:uFillTx/>
-                <a:latin typeface="Arial" charset="0"/>
-              </a:rPr>
-              <a:t>Click here to insert your References. Type it in or copy and paste from your Word document or other source.</a:t>
-            </a:r>
-          </a:p>
-          <a:p>
-            <a:pPr marL="342900" marR="0" lvl="0" indent="-342900" defTabSz="457200" eaLnBrk="1" fontAlgn="auto" latinLnBrk="0" hangingPunct="1">
-              <a:lnSpc>
-                <a:spcPct val="100000"/>
-              </a:lnSpc>
-              <a:spcBef>
-                <a:spcPts val="0"/>
-              </a:spcBef>
+              <a:rPr lang="en-US" sz="2400" kern="0" dirty="0"/>
+              <a:t>M. Roland and J. Langer, "Digital Signature Records for the NFC Data Exchange Format," 2010 Second International Workshop on Near Field Communication, Monaco, 2010, pp. 71-76. </a:t>
+            </a:r>
+            <a:r>
+              <a:rPr lang="en-US" sz="2400" kern="0" dirty="0" err="1"/>
+              <a:t>doi</a:t>
+            </a:r>
+            <a:r>
+              <a:rPr lang="en-US" sz="2400" kern="0" dirty="0"/>
+              <a:t>: 10.1109/NFC.2010.10</a:t>
+            </a:r>
+          </a:p>
+          <a:p>
+            <a:pPr marL="457200" lvl="0" indent="-457200" defTabSz="457200">
               <a:spcAft>
                 <a:spcPct val="50000"/>
               </a:spcAft>
-              <a:buClrTx/>
-              <a:buSzTx/>
-              <a:buFontTx/>
+              <a:buFont typeface="+mj-lt"/>
               <a:buAutoNum type="arabicPeriod"/>
-              <a:tabLst/>
               <a:defRPr/>
             </a:pPr>
             <a:r>
-              <a:rPr kumimoji="0" lang="en-US" sz="2400" b="0" i="0" u="none" strike="noStrike" kern="0" cap="none" spc="0" normalizeH="0" baseline="0" noProof="0" dirty="0">
-                <a:ln>
-                  <a:noFill/>
-                </a:ln>
-                <a:effectLst/>
-                <a:uLnTx/>
-                <a:uFillTx/>
-                <a:latin typeface="Arial" charset="0"/>
-              </a:rPr>
-              <a:t>Click on the border once to highlight and select a different font or font size that suits you. This text is in Arial 24pt and is easily readable up to 4 feet away. Try to stay between 18pt – 28pt for best viewing.</a:t>
-            </a:r>
-          </a:p>
-          <a:p>
-            <a:pPr marL="342900" marR="0" lvl="0" indent="-342900" defTabSz="457200" eaLnBrk="1" fontAlgn="auto" latinLnBrk="0" hangingPunct="1">
-              <a:lnSpc>
-                <a:spcPct val="100000"/>
-              </a:lnSpc>
-              <a:spcBef>
-                <a:spcPts val="0"/>
-              </a:spcBef>
+              <a:rPr lang="en-US" sz="2400" kern="0" dirty="0"/>
+              <a:t>electrical 4 u, "Air core transformer," 2011. [Online]. Available: http://www.electrical4u.com/air-core-transformer/. Accessed: Feb. 1, 2017.</a:t>
+            </a:r>
+          </a:p>
+          <a:p>
+            <a:pPr marL="457200" lvl="0" indent="-457200" defTabSz="457200">
               <a:spcAft>
                 <a:spcPct val="50000"/>
               </a:spcAft>
-              <a:buClrTx/>
-              <a:buSzTx/>
-              <a:buFontTx/>
+              <a:buFont typeface="+mj-lt"/>
               <a:buAutoNum type="arabicPeriod"/>
-              <a:tabLst/>
               <a:defRPr/>
             </a:pPr>
-            <a:r>
-              <a:rPr kumimoji="0" lang="en-US" sz="2400" b="0" i="0" u="none" strike="noStrike" kern="0" cap="none" spc="0" normalizeH="0" baseline="0" noProof="0" dirty="0">
-                <a:ln>
-                  <a:noFill/>
-                </a:ln>
-                <a:effectLst/>
-                <a:uLnTx/>
-                <a:uFillTx/>
-                <a:latin typeface="Arial" charset="0"/>
-              </a:rPr>
-              <a:t>The line spacing is set to add one-half of a line height after each entry. Select ‘Format, Line Spacing’ to adjust this setting.</a:t>
-            </a:r>
+            <a:endParaRPr lang="en-US" sz="2400" kern="0" dirty="0"/>
+          </a:p>
+          <a:p>
+            <a:pPr marL="457200" lvl="0" indent="-457200" defTabSz="457200">
+              <a:spcAft>
+                <a:spcPct val="50000"/>
+              </a:spcAft>
+              <a:buFont typeface="+mj-lt"/>
+              <a:buAutoNum type="arabicPeriod"/>
+              <a:defRPr/>
+            </a:pPr>
+            <a:endParaRPr kumimoji="0" lang="en-US" sz="2400" b="0" i="0" u="none" strike="noStrike" kern="0" cap="none" spc="0" normalizeH="0" baseline="0" noProof="0" dirty="0">
+              <a:ln>
+                <a:noFill/>
+              </a:ln>
+              <a:effectLst/>
+              <a:uLnTx/>
+              <a:uFillTx/>
+              <a:latin typeface="Arial" charset="0"/>
+            </a:endParaRPr>
           </a:p>
         </p:txBody>
       </p:sp>

</xml_diff>

<commit_message>
updated poster for Phase I Submission
</commit_message>
<xml_diff>
--- a/Poster Artifacts/Poster.pptx
+++ b/Poster Artifacts/Poster.pptx
@@ -4,6 +4,9 @@
   <p:sldMasterIdLst>
     <p:sldMasterId id="2147483648" r:id="rId1"/>
   </p:sldMasterIdLst>
+  <p:notesMasterIdLst>
+    <p:notesMasterId r:id="rId3"/>
+  </p:notesMasterIdLst>
   <p:sldIdLst>
     <p:sldId id="256" r:id="rId2"/>
   </p:sldIdLst>
@@ -121,6 +124,440 @@
     </p:ext>
   </p:extLst>
 </p:presentation>
+</file>
+
+<file path=ppt/notesMasters/notesMaster1.xml><?xml version="1.0" encoding="utf-8"?>
+<p:notesMaster xmlns:a="http://schemas.openxmlformats.org/drawingml/2006/main" xmlns:r="http://schemas.openxmlformats.org/officeDocument/2006/relationships" xmlns:p="http://schemas.openxmlformats.org/presentationml/2006/main">
+  <p:cSld>
+    <p:bg>
+      <p:bgRef idx="1001">
+        <a:schemeClr val="bg1"/>
+      </p:bgRef>
+    </p:bg>
+    <p:spTree>
+      <p:nvGrpSpPr>
+        <p:cNvPr id="1" name=""/>
+        <p:cNvGrpSpPr/>
+        <p:nvPr/>
+      </p:nvGrpSpPr>
+      <p:grpSpPr>
+        <a:xfrm>
+          <a:off x="0" y="0"/>
+          <a:ext cx="0" cy="0"/>
+          <a:chOff x="0" y="0"/>
+          <a:chExt cx="0" cy="0"/>
+        </a:xfrm>
+      </p:grpSpPr>
+      <p:sp>
+        <p:nvSpPr>
+          <p:cNvPr id="2" name="Header Placeholder 1"/>
+          <p:cNvSpPr>
+            <a:spLocks noGrp="1"/>
+          </p:cNvSpPr>
+          <p:nvPr>
+            <p:ph type="hdr" sz="quarter"/>
+          </p:nvPr>
+        </p:nvSpPr>
+        <p:spPr>
+          <a:xfrm>
+            <a:off x="0" y="0"/>
+            <a:ext cx="2971800" cy="458788"/>
+          </a:xfrm>
+          <a:prstGeom prst="rect">
+            <a:avLst/>
+          </a:prstGeom>
+        </p:spPr>
+        <p:txBody>
+          <a:bodyPr vert="horz" lIns="91440" tIns="45720" rIns="91440" bIns="45720" rtlCol="0"/>
+          <a:lstStyle>
+            <a:lvl1pPr algn="l">
+              <a:defRPr sz="1200"/>
+            </a:lvl1pPr>
+          </a:lstStyle>
+          <a:p>
+            <a:endParaRPr lang="en-US"/>
+          </a:p>
+        </p:txBody>
+      </p:sp>
+      <p:sp>
+        <p:nvSpPr>
+          <p:cNvPr id="3" name="Date Placeholder 2"/>
+          <p:cNvSpPr>
+            <a:spLocks noGrp="1"/>
+          </p:cNvSpPr>
+          <p:nvPr>
+            <p:ph type="dt" idx="1"/>
+          </p:nvPr>
+        </p:nvSpPr>
+        <p:spPr>
+          <a:xfrm>
+            <a:off x="3884613" y="0"/>
+            <a:ext cx="2971800" cy="458788"/>
+          </a:xfrm>
+          <a:prstGeom prst="rect">
+            <a:avLst/>
+          </a:prstGeom>
+        </p:spPr>
+        <p:txBody>
+          <a:bodyPr vert="horz" lIns="91440" tIns="45720" rIns="91440" bIns="45720" rtlCol="0"/>
+          <a:lstStyle>
+            <a:lvl1pPr algn="r">
+              <a:defRPr sz="1200"/>
+            </a:lvl1pPr>
+          </a:lstStyle>
+          <a:p>
+            <a:fld id="{CAD4E7B3-883E-4909-856A-D4D2FBCEB0AE}" type="datetimeFigureOut">
+              <a:rPr lang="en-US" smtClean="0"/>
+              <a:t>2/1/2017</a:t>
+            </a:fld>
+            <a:endParaRPr lang="en-US"/>
+          </a:p>
+        </p:txBody>
+      </p:sp>
+      <p:sp>
+        <p:nvSpPr>
+          <p:cNvPr id="4" name="Slide Image Placeholder 3"/>
+          <p:cNvSpPr>
+            <a:spLocks noGrp="1" noRot="1" noChangeAspect="1"/>
+          </p:cNvSpPr>
+          <p:nvPr>
+            <p:ph type="sldImg" idx="2"/>
+          </p:nvPr>
+        </p:nvSpPr>
+        <p:spPr>
+          <a:xfrm>
+            <a:off x="1371600" y="1143000"/>
+            <a:ext cx="4114800" cy="3086100"/>
+          </a:xfrm>
+          <a:prstGeom prst="rect">
+            <a:avLst/>
+          </a:prstGeom>
+          <a:noFill/>
+          <a:ln w="12700">
+            <a:solidFill>
+              <a:prstClr val="black"/>
+            </a:solidFill>
+          </a:ln>
+        </p:spPr>
+        <p:txBody>
+          <a:bodyPr vert="horz" lIns="91440" tIns="45720" rIns="91440" bIns="45720" rtlCol="0" anchor="ctr"/>
+          <a:lstStyle/>
+          <a:p>
+            <a:endParaRPr lang="en-US"/>
+          </a:p>
+        </p:txBody>
+      </p:sp>
+      <p:sp>
+        <p:nvSpPr>
+          <p:cNvPr id="5" name="Notes Placeholder 4"/>
+          <p:cNvSpPr>
+            <a:spLocks noGrp="1"/>
+          </p:cNvSpPr>
+          <p:nvPr>
+            <p:ph type="body" sz="quarter" idx="3"/>
+          </p:nvPr>
+        </p:nvSpPr>
+        <p:spPr>
+          <a:xfrm>
+            <a:off x="685800" y="4400550"/>
+            <a:ext cx="5486400" cy="3600450"/>
+          </a:xfrm>
+          <a:prstGeom prst="rect">
+            <a:avLst/>
+          </a:prstGeom>
+        </p:spPr>
+        <p:txBody>
+          <a:bodyPr vert="horz" lIns="91440" tIns="45720" rIns="91440" bIns="45720" rtlCol="0"/>
+          <a:lstStyle/>
+          <a:p>
+            <a:pPr lvl="0"/>
+            <a:r>
+              <a:rPr lang="en-US"/>
+              <a:t>Edit Master text styles</a:t>
+            </a:r>
+          </a:p>
+          <a:p>
+            <a:pPr lvl="1"/>
+            <a:r>
+              <a:rPr lang="en-US"/>
+              <a:t>Second level</a:t>
+            </a:r>
+          </a:p>
+          <a:p>
+            <a:pPr lvl="2"/>
+            <a:r>
+              <a:rPr lang="en-US"/>
+              <a:t>Third level</a:t>
+            </a:r>
+          </a:p>
+          <a:p>
+            <a:pPr lvl="3"/>
+            <a:r>
+              <a:rPr lang="en-US"/>
+              <a:t>Fourth level</a:t>
+            </a:r>
+          </a:p>
+          <a:p>
+            <a:pPr lvl="4"/>
+            <a:r>
+              <a:rPr lang="en-US"/>
+              <a:t>Fifth level</a:t>
+            </a:r>
+            <a:endParaRPr lang="en-US"/>
+          </a:p>
+        </p:txBody>
+      </p:sp>
+      <p:sp>
+        <p:nvSpPr>
+          <p:cNvPr id="6" name="Footer Placeholder 5"/>
+          <p:cNvSpPr>
+            <a:spLocks noGrp="1"/>
+          </p:cNvSpPr>
+          <p:nvPr>
+            <p:ph type="ftr" sz="quarter" idx="4"/>
+          </p:nvPr>
+        </p:nvSpPr>
+        <p:spPr>
+          <a:xfrm>
+            <a:off x="0" y="8685213"/>
+            <a:ext cx="2971800" cy="458787"/>
+          </a:xfrm>
+          <a:prstGeom prst="rect">
+            <a:avLst/>
+          </a:prstGeom>
+        </p:spPr>
+        <p:txBody>
+          <a:bodyPr vert="horz" lIns="91440" tIns="45720" rIns="91440" bIns="45720" rtlCol="0" anchor="b"/>
+          <a:lstStyle>
+            <a:lvl1pPr algn="l">
+              <a:defRPr sz="1200"/>
+            </a:lvl1pPr>
+          </a:lstStyle>
+          <a:p>
+            <a:endParaRPr lang="en-US"/>
+          </a:p>
+        </p:txBody>
+      </p:sp>
+      <p:sp>
+        <p:nvSpPr>
+          <p:cNvPr id="7" name="Slide Number Placeholder 6"/>
+          <p:cNvSpPr>
+            <a:spLocks noGrp="1"/>
+          </p:cNvSpPr>
+          <p:nvPr>
+            <p:ph type="sldNum" sz="quarter" idx="5"/>
+          </p:nvPr>
+        </p:nvSpPr>
+        <p:spPr>
+          <a:xfrm>
+            <a:off x="3884613" y="8685213"/>
+            <a:ext cx="2971800" cy="458787"/>
+          </a:xfrm>
+          <a:prstGeom prst="rect">
+            <a:avLst/>
+          </a:prstGeom>
+        </p:spPr>
+        <p:txBody>
+          <a:bodyPr vert="horz" lIns="91440" tIns="45720" rIns="91440" bIns="45720" rtlCol="0" anchor="b"/>
+          <a:lstStyle>
+            <a:lvl1pPr algn="r">
+              <a:defRPr sz="1200"/>
+            </a:lvl1pPr>
+          </a:lstStyle>
+          <a:p>
+            <a:fld id="{4BC4B03E-A05D-444D-8D88-A502D3A7EEBD}" type="slidenum">
+              <a:rPr lang="en-US" smtClean="0"/>
+              <a:t>‹#›</a:t>
+            </a:fld>
+            <a:endParaRPr lang="en-US"/>
+          </a:p>
+        </p:txBody>
+      </p:sp>
+    </p:spTree>
+    <p:extLst>
+      <p:ext uri="{BB962C8B-B14F-4D97-AF65-F5344CB8AC3E}">
+        <p14:creationId xmlns:p14="http://schemas.microsoft.com/office/powerpoint/2010/main" val="377067432"/>
+      </p:ext>
+    </p:extLst>
+  </p:cSld>
+  <p:clrMap bg1="lt1" tx1="dk1" bg2="lt2" tx2="dk2" accent1="accent1" accent2="accent2" accent3="accent3" accent4="accent4" accent5="accent5" accent6="accent6" hlink="hlink" folHlink="folHlink"/>
+  <p:notesStyle>
+    <a:lvl1pPr marL="0" algn="l" defTabSz="914400" rtl="0" eaLnBrk="1" latinLnBrk="0" hangingPunct="1">
+      <a:defRPr sz="1200" kern="1200">
+        <a:solidFill>
+          <a:schemeClr val="tx1"/>
+        </a:solidFill>
+        <a:latin typeface="+mn-lt"/>
+        <a:ea typeface="+mn-ea"/>
+        <a:cs typeface="+mn-cs"/>
+      </a:defRPr>
+    </a:lvl1pPr>
+    <a:lvl2pPr marL="457200" algn="l" defTabSz="914400" rtl="0" eaLnBrk="1" latinLnBrk="0" hangingPunct="1">
+      <a:defRPr sz="1200" kern="1200">
+        <a:solidFill>
+          <a:schemeClr val="tx1"/>
+        </a:solidFill>
+        <a:latin typeface="+mn-lt"/>
+        <a:ea typeface="+mn-ea"/>
+        <a:cs typeface="+mn-cs"/>
+      </a:defRPr>
+    </a:lvl2pPr>
+    <a:lvl3pPr marL="914400" algn="l" defTabSz="914400" rtl="0" eaLnBrk="1" latinLnBrk="0" hangingPunct="1">
+      <a:defRPr sz="1200" kern="1200">
+        <a:solidFill>
+          <a:schemeClr val="tx1"/>
+        </a:solidFill>
+        <a:latin typeface="+mn-lt"/>
+        <a:ea typeface="+mn-ea"/>
+        <a:cs typeface="+mn-cs"/>
+      </a:defRPr>
+    </a:lvl3pPr>
+    <a:lvl4pPr marL="1371600" algn="l" defTabSz="914400" rtl="0" eaLnBrk="1" latinLnBrk="0" hangingPunct="1">
+      <a:defRPr sz="1200" kern="1200">
+        <a:solidFill>
+          <a:schemeClr val="tx1"/>
+        </a:solidFill>
+        <a:latin typeface="+mn-lt"/>
+        <a:ea typeface="+mn-ea"/>
+        <a:cs typeface="+mn-cs"/>
+      </a:defRPr>
+    </a:lvl4pPr>
+    <a:lvl5pPr marL="1828800" algn="l" defTabSz="914400" rtl="0" eaLnBrk="1" latinLnBrk="0" hangingPunct="1">
+      <a:defRPr sz="1200" kern="1200">
+        <a:solidFill>
+          <a:schemeClr val="tx1"/>
+        </a:solidFill>
+        <a:latin typeface="+mn-lt"/>
+        <a:ea typeface="+mn-ea"/>
+        <a:cs typeface="+mn-cs"/>
+      </a:defRPr>
+    </a:lvl5pPr>
+    <a:lvl6pPr marL="2286000" algn="l" defTabSz="914400" rtl="0" eaLnBrk="1" latinLnBrk="0" hangingPunct="1">
+      <a:defRPr sz="1200" kern="1200">
+        <a:solidFill>
+          <a:schemeClr val="tx1"/>
+        </a:solidFill>
+        <a:latin typeface="+mn-lt"/>
+        <a:ea typeface="+mn-ea"/>
+        <a:cs typeface="+mn-cs"/>
+      </a:defRPr>
+    </a:lvl6pPr>
+    <a:lvl7pPr marL="2743200" algn="l" defTabSz="914400" rtl="0" eaLnBrk="1" latinLnBrk="0" hangingPunct="1">
+      <a:defRPr sz="1200" kern="1200">
+        <a:solidFill>
+          <a:schemeClr val="tx1"/>
+        </a:solidFill>
+        <a:latin typeface="+mn-lt"/>
+        <a:ea typeface="+mn-ea"/>
+        <a:cs typeface="+mn-cs"/>
+      </a:defRPr>
+    </a:lvl7pPr>
+    <a:lvl8pPr marL="3200400" algn="l" defTabSz="914400" rtl="0" eaLnBrk="1" latinLnBrk="0" hangingPunct="1">
+      <a:defRPr sz="1200" kern="1200">
+        <a:solidFill>
+          <a:schemeClr val="tx1"/>
+        </a:solidFill>
+        <a:latin typeface="+mn-lt"/>
+        <a:ea typeface="+mn-ea"/>
+        <a:cs typeface="+mn-cs"/>
+      </a:defRPr>
+    </a:lvl8pPr>
+    <a:lvl9pPr marL="3657600" algn="l" defTabSz="914400" rtl="0" eaLnBrk="1" latinLnBrk="0" hangingPunct="1">
+      <a:defRPr sz="1200" kern="1200">
+        <a:solidFill>
+          <a:schemeClr val="tx1"/>
+        </a:solidFill>
+        <a:latin typeface="+mn-lt"/>
+        <a:ea typeface="+mn-ea"/>
+        <a:cs typeface="+mn-cs"/>
+      </a:defRPr>
+    </a:lvl9pPr>
+  </p:notesStyle>
+</p:notesMaster>
+</file>
+
+<file path=ppt/notesSlides/notesSlide1.xml><?xml version="1.0" encoding="utf-8"?>
+<p:notes xmlns:a="http://schemas.openxmlformats.org/drawingml/2006/main" xmlns:r="http://schemas.openxmlformats.org/officeDocument/2006/relationships" xmlns:p="http://schemas.openxmlformats.org/presentationml/2006/main">
+  <p:cSld>
+    <p:spTree>
+      <p:nvGrpSpPr>
+        <p:cNvPr id="1" name=""/>
+        <p:cNvGrpSpPr/>
+        <p:nvPr/>
+      </p:nvGrpSpPr>
+      <p:grpSpPr>
+        <a:xfrm>
+          <a:off x="0" y="0"/>
+          <a:ext cx="0" cy="0"/>
+          <a:chOff x="0" y="0"/>
+          <a:chExt cx="0" cy="0"/>
+        </a:xfrm>
+      </p:grpSpPr>
+      <p:sp>
+        <p:nvSpPr>
+          <p:cNvPr id="2" name="Slide Image Placeholder 1"/>
+          <p:cNvSpPr>
+            <a:spLocks noGrp="1" noRot="1" noChangeAspect="1"/>
+          </p:cNvSpPr>
+          <p:nvPr>
+            <p:ph type="sldImg"/>
+          </p:nvPr>
+        </p:nvSpPr>
+        <p:spPr/>
+      </p:sp>
+      <p:sp>
+        <p:nvSpPr>
+          <p:cNvPr id="3" name="Notes Placeholder 2"/>
+          <p:cNvSpPr>
+            <a:spLocks noGrp="1"/>
+          </p:cNvSpPr>
+          <p:nvPr>
+            <p:ph type="body" idx="1"/>
+          </p:nvPr>
+        </p:nvSpPr>
+        <p:spPr/>
+        <p:txBody>
+          <a:bodyPr/>
+          <a:lstStyle/>
+          <a:p>
+            <a:endParaRPr lang="en-US" dirty="0"/>
+          </a:p>
+        </p:txBody>
+      </p:sp>
+      <p:sp>
+        <p:nvSpPr>
+          <p:cNvPr id="4" name="Slide Number Placeholder 3"/>
+          <p:cNvSpPr>
+            <a:spLocks noGrp="1"/>
+          </p:cNvSpPr>
+          <p:nvPr>
+            <p:ph type="sldNum" sz="quarter" idx="10"/>
+          </p:nvPr>
+        </p:nvSpPr>
+        <p:spPr/>
+        <p:txBody>
+          <a:bodyPr/>
+          <a:lstStyle/>
+          <a:p>
+            <a:fld id="{4BC4B03E-A05D-444D-8D88-A502D3A7EEBD}" type="slidenum">
+              <a:rPr lang="en-US" smtClean="0"/>
+              <a:t>1</a:t>
+            </a:fld>
+            <a:endParaRPr lang="en-US"/>
+          </a:p>
+        </p:txBody>
+      </p:sp>
+    </p:spTree>
+    <p:extLst>
+      <p:ext uri="{BB962C8B-B14F-4D97-AF65-F5344CB8AC3E}">
+        <p14:creationId xmlns:p14="http://schemas.microsoft.com/office/powerpoint/2010/main" val="1780313384"/>
+      </p:ext>
+    </p:extLst>
+  </p:cSld>
+  <p:clrMapOvr>
+    <a:masterClrMapping/>
+  </p:clrMapOvr>
+</p:notes>
 </file>
 
 <file path=ppt/slideLayouts/slideLayout1.xml><?xml version="1.0" encoding="utf-8"?>
@@ -3094,22 +3531,36 @@
         </p:nvSpPr>
         <p:spPr bwMode="auto">
           <a:xfrm>
-            <a:off x="16659356" y="304800"/>
-            <a:ext cx="12330113" cy="3316877"/>
+            <a:off x="7315200" y="13758816"/>
+            <a:ext cx="30624615" cy="3103631"/>
           </a:xfrm>
           <a:prstGeom prst="rect">
             <a:avLst/>
           </a:prstGeom>
-          <a:noFill/>
-          <a:ln w="9525">
+          <a:solidFill>
+            <a:schemeClr val="accent6">
+              <a:alpha val="50000"/>
+            </a:schemeClr>
+          </a:solidFill>
+          <a:ln>
             <a:noFill/>
-            <a:miter lim="800000"/>
-            <a:headEnd/>
-            <a:tailEnd/>
           </a:ln>
-          <a:effectLst/>
           <a:extLst/>
         </p:spPr>
+        <p:style>
+          <a:lnRef idx="0">
+            <a:scrgbClr r="0" g="0" b="0"/>
+          </a:lnRef>
+          <a:fillRef idx="0">
+            <a:scrgbClr r="0" g="0" b="0"/>
+          </a:fillRef>
+          <a:effectRef idx="0">
+            <a:scrgbClr r="0" g="0" b="0"/>
+          </a:effectRef>
+          <a:fontRef idx="minor">
+            <a:schemeClr val="lt1"/>
+          </a:fontRef>
+        </p:style>
         <p:txBody>
           <a:bodyPr lIns="457200" tIns="914400" rIns="457200" bIns="457200" anchor="ctr" anchorCtr="1"/>
           <a:lstStyle>
@@ -3213,52 +3664,30 @@
           <a:p>
             <a:pPr algn="ctr"/>
             <a:r>
-              <a:rPr lang="en-US" sz="8000" dirty="0">
-                <a:ln w="34925" cap="rnd" cmpd="sng">
+              <a:rPr lang="en-US" sz="11500" b="1" dirty="0">
+                <a:ln w="12700">
                   <a:solidFill>
-                    <a:srgbClr val="6F6F74"/>
+                    <a:schemeClr val="accent3">
+                      <a:lumMod val="50000"/>
+                    </a:schemeClr>
                   </a:solidFill>
+                  <a:prstDash val="solid"/>
                 </a:ln>
                 <a:solidFill>
-                  <a:srgbClr val="FFFFFF"/>
-                </a:solidFill>
-                <a:latin typeface="Impact" pitchFamily="34" charset="0"/>
+                  <a:srgbClr val="FFFF00"/>
+                </a:solidFill>
+                <a:effectLst>
+                  <a:innerShdw blurRad="177800">
+                    <a:schemeClr val="accent3">
+                      <a:lumMod val="50000"/>
+                    </a:schemeClr>
+                  </a:innerShdw>
+                </a:effectLst>
+                <a:latin typeface="Segoe UI Black" panose="020B0A02040204020203" pitchFamily="34" charset="0"/>
+                <a:ea typeface="Segoe UI Black" panose="020B0A02040204020203" pitchFamily="34" charset="0"/>
+                <a:cs typeface="Segoe UI Black" panose="020B0A02040204020203" pitchFamily="34" charset="0"/>
               </a:rPr>
-              <a:t>NEAR FIELD </a:t>
-            </a:r>
-          </a:p>
-          <a:p>
-            <a:pPr algn="ctr"/>
-            <a:r>
-              <a:rPr lang="en-US" sz="8000" dirty="0">
-                <a:ln w="34925" cap="rnd" cmpd="sng">
-                  <a:solidFill>
-                    <a:srgbClr val="6F6F74"/>
-                  </a:solidFill>
-                </a:ln>
-                <a:solidFill>
-                  <a:srgbClr val="FFFFFF"/>
-                </a:solidFill>
-                <a:latin typeface="Impact" pitchFamily="34" charset="0"/>
-              </a:rPr>
-              <a:t>COMMUNICATION</a:t>
-            </a:r>
-          </a:p>
-          <a:p>
-            <a:pPr algn="ctr"/>
-            <a:r>
-              <a:rPr lang="en-US" sz="8000" dirty="0">
-                <a:ln w="34925" cap="rnd" cmpd="sng">
-                  <a:solidFill>
-                    <a:srgbClr val="6F6F74"/>
-                  </a:solidFill>
-                </a:ln>
-                <a:solidFill>
-                  <a:srgbClr val="FFFFFF"/>
-                </a:solidFill>
-                <a:latin typeface="Impact" pitchFamily="34" charset="0"/>
-              </a:rPr>
-              <a:t>( NFC )</a:t>
+              <a:t>NEAR FIELD COMMUNICATION</a:t>
             </a:r>
           </a:p>
         </p:txBody>
@@ -3273,8 +3702,8 @@
         </p:nvSpPr>
         <p:spPr bwMode="auto">
           <a:xfrm>
-            <a:off x="29260801" y="19738688"/>
-            <a:ext cx="14288088" cy="6362854"/>
+            <a:off x="10996981" y="28194000"/>
+            <a:ext cx="22122318" cy="4413021"/>
           </a:xfrm>
           <a:prstGeom prst="rect">
             <a:avLst/>
@@ -3442,8 +3871,69 @@
             </a:pPr>
             <a:r>
               <a:rPr lang="en-US" sz="2400" kern="0" dirty="0"/>
+              <a:t>B. Jepson, D. Coleman, and T. </a:t>
+            </a:r>
+            <a:r>
+              <a:rPr lang="en-US" sz="2400" kern="0" dirty="0" err="1"/>
+              <a:t>Igoe</a:t>
+            </a:r>
+            <a:r>
+              <a:rPr lang="en-US" sz="2400" kern="0" dirty="0"/>
+              <a:t>, 4. Introducing NDEF [Book]. Safari, 2017. [Online]. Available: https://www.safaribooksonline.com/library/view/beginning-nfc/9781449324094/ch04.html. Accessed: Feb. 2, 2017.</a:t>
+            </a:r>
+          </a:p>
+          <a:p>
+            <a:pPr marL="457200" lvl="0" indent="-457200" defTabSz="457200">
+              <a:spcAft>
+                <a:spcPct val="50000"/>
+              </a:spcAft>
+              <a:buFont typeface="+mj-lt"/>
+              <a:buAutoNum type="arabicPeriod"/>
+              <a:defRPr/>
+            </a:pPr>
+            <a:r>
+              <a:rPr lang="en-US" sz="2400" kern="0" dirty="0"/>
+              <a:t>NFC, Forum. "NFC Forum Technical Specifications Improve RF Communication and NFC Tag Interoperability with NFC Devices." Business Wire (English) Dec. 0010: Regional Business News. Web. 1 Feb. 2017.</a:t>
+            </a:r>
+          </a:p>
+          <a:p>
+            <a:pPr marL="457200" indent="-457200" defTabSz="457200">
+              <a:spcAft>
+                <a:spcPct val="50000"/>
+              </a:spcAft>
+              <a:buFont typeface="+mj-lt"/>
+              <a:buAutoNum type="arabicPeriod"/>
+              <a:defRPr/>
+            </a:pPr>
+            <a:r>
+              <a:rPr lang="en-US" sz="2400" kern="0" dirty="0"/>
               <a:t>electrical 4 u, "Air core transformer," 2011. [Online]. Available: http://www.electrical4u.com/air-core-transformer/. Accessed: Feb. 1, 2017.</a:t>
             </a:r>
+          </a:p>
+          <a:p>
+            <a:pPr marL="457200" indent="-457200" defTabSz="457200">
+              <a:spcAft>
+                <a:spcPct val="50000"/>
+              </a:spcAft>
+              <a:buFont typeface="+mj-lt"/>
+              <a:buAutoNum type="arabicPeriod"/>
+              <a:defRPr/>
+            </a:pPr>
+            <a:r>
+              <a:rPr lang="en-US" sz="2400" kern="0" dirty="0"/>
+              <a:t>N. Forum, A. rights reserved, A. M. services, Virtual, P. P. Terms, and C. Feedback, "What are the operating modes of NFC devices? - NFC forum," NFC Forum, 2017. [Online]. Available: http://nfc-forum.org/resources/what-are-the-operating-modes-of-nfc-devices/. Accessed: Feb. 2, 2017.</a:t>
+            </a:r>
+          </a:p>
+          <a:p>
+            <a:pPr marL="457200" lvl="0" indent="-457200" defTabSz="457200">
+              <a:spcAft>
+                <a:spcPct val="50000"/>
+              </a:spcAft>
+              <a:buFont typeface="+mj-lt"/>
+              <a:buAutoNum type="arabicPeriod"/>
+              <a:defRPr/>
+            </a:pPr>
+            <a:endParaRPr lang="en-US" sz="2400" kern="0" dirty="0"/>
           </a:p>
           <a:p>
             <a:pPr marL="457200" lvl="0" indent="-457200" defTabSz="457200">
@@ -3487,8 +3977,8 @@
         </p:nvSpPr>
         <p:spPr bwMode="auto">
           <a:xfrm>
-            <a:off x="38000575" y="18368676"/>
-            <a:ext cx="5548313" cy="1179722"/>
+            <a:off x="10996981" y="27431999"/>
+            <a:ext cx="22122318" cy="610399"/>
           </a:xfrm>
           <a:prstGeom prst="rect">
             <a:avLst/>
@@ -3629,9 +4119,20 @@
             </a:lvl9pPr>
           </a:lstStyle>
           <a:p>
+            <a:pPr algn="ctr"/>
             <a:r>
               <a:rPr lang="en-US" sz="4800" dirty="0">
-                <a:latin typeface="Impact" pitchFamily="34" charset="0"/>
+                <a:ln w="0"/>
+                <a:effectLst>
+                  <a:outerShdw blurRad="38100" dist="19050" dir="2700000" algn="tl" rotWithShape="0">
+                    <a:schemeClr val="dk1">
+                      <a:alpha val="40000"/>
+                    </a:schemeClr>
+                  </a:outerShdw>
+                </a:effectLst>
+                <a:latin typeface="Verdana" panose="020B0604030504040204" pitchFamily="34" charset="0"/>
+                <a:ea typeface="Verdana" panose="020B0604030504040204" pitchFamily="34" charset="0"/>
+                <a:cs typeface="Verdana" panose="020B0604030504040204" pitchFamily="34" charset="0"/>
               </a:rPr>
               <a:t>REFERENCES</a:t>
             </a:r>
@@ -3647,7 +4148,7 @@
           <p:nvPr/>
         </p:nvPicPr>
         <p:blipFill>
-          <a:blip r:embed="rId2">
+          <a:blip r:embed="rId3">
             <a:extLst>
               <a:ext uri="{28A0092B-C50C-407E-A947-70E740481C1C}">
                 <a14:useLocalDpi xmlns:a14="http://schemas.microsoft.com/office/drawing/2010/main" val="0"/>
@@ -3661,8 +4162,8 @@
         </p:blipFill>
         <p:spPr bwMode="auto">
           <a:xfrm>
-            <a:off x="6661803" y="30283642"/>
-            <a:ext cx="5916261" cy="2495645"/>
+            <a:off x="33374976" y="29567961"/>
+            <a:ext cx="6342799" cy="2675570"/>
           </a:xfrm>
           <a:prstGeom prst="rect">
             <a:avLst/>
@@ -3682,7 +4183,7 @@
           <p:nvPr/>
         </p:nvPicPr>
         <p:blipFill>
-          <a:blip r:embed="rId3">
+          <a:blip r:embed="rId4">
             <a:extLst>
               <a:ext uri="{28A0092B-C50C-407E-A947-70E740481C1C}">
                 <a14:useLocalDpi xmlns:a14="http://schemas.microsoft.com/office/drawing/2010/main" val="0"/>
@@ -3695,7 +4196,7 @@
         </p:blipFill>
         <p:spPr>
           <a:xfrm>
-            <a:off x="39093293" y="11930622"/>
+            <a:off x="39093293" y="12461862"/>
             <a:ext cx="4455595" cy="6054738"/>
           </a:xfrm>
           <a:prstGeom prst="rect">
@@ -3712,7 +4213,7 @@
           <p:nvPr/>
         </p:nvPicPr>
         <p:blipFill>
-          <a:blip r:embed="rId4">
+          <a:blip r:embed="rId5">
             <a:extLst>
               <a:ext uri="{28A0092B-C50C-407E-A947-70E740481C1C}">
                 <a14:useLocalDpi xmlns:a14="http://schemas.microsoft.com/office/drawing/2010/main" val="0"/>
@@ -3743,8 +4244,8 @@
         </p:nvSpPr>
         <p:spPr bwMode="auto">
           <a:xfrm>
-            <a:off x="7741376" y="4617519"/>
-            <a:ext cx="5784850" cy="6858000"/>
+            <a:off x="7470058" y="1872753"/>
+            <a:ext cx="10221708" cy="5696969"/>
           </a:xfrm>
           <a:prstGeom prst="rect">
             <a:avLst/>
@@ -3801,16 +4302,10 @@
               <a:defRPr/>
             </a:pPr>
             <a:r>
-              <a:rPr kumimoji="0" lang="en-US" sz="1800" b="0" i="0" u="none" strike="noStrike" kern="0" cap="none" spc="0" normalizeH="0" baseline="0" noProof="0" dirty="0">
-                <a:ln>
-                  <a:noFill/>
-                </a:ln>
-                <a:effectLst/>
-                <a:uLnTx/>
-                <a:uFillTx/>
+              <a:rPr lang="en-US" sz="1800" kern="0" dirty="0">
                 <a:latin typeface="Century Schoolbook" panose="02040604050505020304"/>
               </a:rPr>
-              <a:t>Click here to insert your Introduction text. Type it in or copy and paste from your Word document or other source. Click once on the dashed border to highlight then drag the bottom edge up to fit. Or change the font size to fill the box. </a:t>
+              <a:t>Near Field Communication (NFC) was developed to enable contactless transmission of data. This poster focuses on the electromechanical properties of technology that can generate a message using an Android device (smartphone) and illustrating the standardized format of a typical message facilitating the exchange (NDEF).</a:t>
             </a:r>
           </a:p>
           <a:p>
@@ -3842,6 +4337,64 @@
             </a:endParaRPr>
           </a:p>
           <a:p>
+            <a:pPr lvl="0" defTabSz="457200">
+              <a:defRPr/>
+            </a:pPr>
+            <a:r>
+              <a:rPr lang="en-US" sz="1800" kern="0" dirty="0">
+                <a:latin typeface="Century Schoolbook" panose="02040604050505020304"/>
+              </a:rPr>
+              <a:t>Fig. 1 illustrates how a controlled electric current applied to an antenna coil attached to the powered device actively generates a directed electromagnetic field. NFC technology makes use of an phenomenon called electromagnetic induction. The presence/absence of this field over time is used to logically generate a stream of binary data.</a:t>
+            </a:r>
+          </a:p>
+          <a:p>
+            <a:pPr lvl="0" defTabSz="457200">
+              <a:defRPr/>
+            </a:pPr>
+            <a:endParaRPr lang="en-US" sz="1800" kern="0" dirty="0">
+              <a:latin typeface="Century Schoolbook" panose="02040604050505020304"/>
+            </a:endParaRPr>
+          </a:p>
+          <a:p>
+            <a:pPr lvl="0" defTabSz="457200">
+              <a:defRPr/>
+            </a:pPr>
+            <a:r>
+              <a:rPr lang="en-US" sz="1800" kern="0" dirty="0">
+                <a:latin typeface="Century Schoolbook" panose="02040604050505020304"/>
+              </a:rPr>
+              <a:t>ISO/IEC 14443 specifies the characteristics of the fields to be provided for power and bi-directional communication between proximity coupling devices (PCDs) and proximity cards or objects (PICCs).</a:t>
+            </a:r>
+          </a:p>
+          <a:p>
+            <a:pPr lvl="0" defTabSz="457200">
+              <a:defRPr/>
+            </a:pPr>
+            <a:endParaRPr lang="en-US" sz="1800" kern="0" dirty="0">
+              <a:latin typeface="Century Schoolbook" panose="02040604050505020304"/>
+            </a:endParaRPr>
+          </a:p>
+          <a:p>
+            <a:pPr lvl="0" defTabSz="457200">
+              <a:defRPr/>
+            </a:pPr>
+            <a:r>
+              <a:rPr lang="en-US" sz="1800" kern="0" dirty="0">
+                <a:latin typeface="Century Schoolbook" panose="02040604050505020304"/>
+              </a:rPr>
+              <a:t>Smartphone devices that are NFC-enable operate in reader/writer mode, one of three modes defined by the NFC Forum, when interfacing with passive NFC tags. RF interfaces must be compliant with the ISO 14443 standard in order to generate, transmit, and receive messages on ISO/IEC 18000-3 air interface which describes the parameters for air interface communications at 13.56 </a:t>
+            </a:r>
+            <a:r>
+              <a:rPr lang="en-US" sz="1800" kern="0" dirty="0" err="1">
+                <a:latin typeface="Century Schoolbook" panose="02040604050505020304"/>
+              </a:rPr>
+              <a:t>MHz.</a:t>
+            </a:r>
+            <a:endParaRPr lang="en-US" sz="1800" kern="0" dirty="0">
+              <a:latin typeface="Century Schoolbook" panose="02040604050505020304"/>
+            </a:endParaRPr>
+          </a:p>
+          <a:p>
             <a:pPr marL="0" marR="0" lvl="0" indent="0" defTabSz="457200" eaLnBrk="1" fontAlgn="auto" latinLnBrk="0" hangingPunct="1">
               <a:lnSpc>
                 <a:spcPct val="100000"/>
@@ -3859,18 +4412,15 @@
               <a:tabLst/>
               <a:defRPr/>
             </a:pPr>
-            <a:r>
-              <a:rPr kumimoji="0" lang="en-US" sz="1800" b="0" i="0" u="none" strike="noStrike" kern="0" cap="none" spc="0" normalizeH="0" baseline="0" noProof="0" dirty="0">
-                <a:ln>
-                  <a:noFill/>
-                </a:ln>
-                <a:effectLst/>
-                <a:uLnTx/>
-                <a:uFillTx/>
-                <a:latin typeface="Century Schoolbook" panose="02040604050505020304"/>
-              </a:rPr>
-              <a:t>Double-click the border and select ‘Text Box’, then check “Resize AutoShape to Fit Text” to have the box automatically re-size to your text.</a:t>
-            </a:r>
+            <a:endParaRPr kumimoji="0" lang="en-US" sz="1800" b="0" i="0" u="none" strike="noStrike" kern="0" cap="none" spc="0" normalizeH="0" baseline="0" noProof="0" dirty="0">
+              <a:ln>
+                <a:noFill/>
+              </a:ln>
+              <a:effectLst/>
+              <a:uLnTx/>
+              <a:uFillTx/>
+              <a:latin typeface="Century Schoolbook" panose="02040604050505020304"/>
+            </a:endParaRPr>
           </a:p>
           <a:p>
             <a:pPr marL="0" marR="0" lvl="0" indent="0" defTabSz="457200" eaLnBrk="1" fontAlgn="auto" latinLnBrk="0" hangingPunct="1">
@@ -3900,96 +4450,6 @@
               <a:latin typeface="Century Schoolbook" panose="02040604050505020304"/>
             </a:endParaRPr>
           </a:p>
-          <a:p>
-            <a:pPr marL="0" marR="0" lvl="0" indent="0" defTabSz="457200" eaLnBrk="1" fontAlgn="auto" latinLnBrk="0" hangingPunct="1">
-              <a:lnSpc>
-                <a:spcPct val="100000"/>
-              </a:lnSpc>
-              <a:spcBef>
-                <a:spcPts val="0"/>
-              </a:spcBef>
-              <a:spcAft>
-                <a:spcPts val="0"/>
-              </a:spcAft>
-              <a:buClrTx/>
-              <a:buSzTx/>
-              <a:buFontTx/>
-              <a:buNone/>
-              <a:tabLst/>
-              <a:defRPr/>
-            </a:pPr>
-            <a:r>
-              <a:rPr kumimoji="0" lang="en-US" sz="1800" b="0" i="0" u="none" strike="noStrike" kern="0" cap="none" spc="0" normalizeH="0" baseline="0" noProof="0" dirty="0">
-                <a:ln>
-                  <a:noFill/>
-                </a:ln>
-                <a:effectLst/>
-                <a:uLnTx/>
-                <a:uFillTx/>
-                <a:latin typeface="Century Schoolbook" panose="02040604050505020304"/>
-              </a:rPr>
-              <a:t>To change the border style of this text box: Double-click on the dashed border, select ‘Colors and Lines’, and change the border to solid or whatever style/color you like. Or ‘No Line’ to remove the border altogether.</a:t>
-            </a:r>
-          </a:p>
-          <a:p>
-            <a:pPr marL="0" marR="0" lvl="0" indent="0" defTabSz="457200" eaLnBrk="1" fontAlgn="auto" latinLnBrk="0" hangingPunct="1">
-              <a:lnSpc>
-                <a:spcPct val="100000"/>
-              </a:lnSpc>
-              <a:spcBef>
-                <a:spcPts val="0"/>
-              </a:spcBef>
-              <a:spcAft>
-                <a:spcPts val="0"/>
-              </a:spcAft>
-              <a:buClrTx/>
-              <a:buSzTx/>
-              <a:buFontTx/>
-              <a:buNone/>
-              <a:tabLst/>
-              <a:defRPr/>
-            </a:pPr>
-            <a:endParaRPr kumimoji="0" lang="en-US" sz="1800" b="0" i="0" u="none" strike="noStrike" kern="0" cap="none" spc="0" normalizeH="0" baseline="0" noProof="0" dirty="0">
-              <a:ln>
-                <a:noFill/>
-              </a:ln>
-              <a:effectLst/>
-              <a:uLnTx/>
-              <a:uFillTx/>
-              <a:latin typeface="Century Schoolbook" panose="02040604050505020304"/>
-            </a:endParaRPr>
-          </a:p>
-          <a:p>
-            <a:pPr marL="0" marR="0" lvl="0" indent="0" defTabSz="457200" eaLnBrk="1" fontAlgn="auto" latinLnBrk="0" hangingPunct="1">
-              <a:lnSpc>
-                <a:spcPct val="100000"/>
-              </a:lnSpc>
-              <a:spcBef>
-                <a:spcPts val="0"/>
-              </a:spcBef>
-              <a:spcAft>
-                <a:spcPts val="0"/>
-              </a:spcAft>
-              <a:buClrTx/>
-              <a:buSzTx/>
-              <a:buFontTx/>
-              <a:buNone/>
-              <a:tabLst/>
-              <a:defRPr/>
-            </a:pPr>
-            <a:r>
-              <a:rPr kumimoji="0" lang="en-US" sz="1800" b="0" i="0" u="none" strike="noStrike" kern="0" cap="none" spc="0" normalizeH="0" baseline="0" noProof="0" dirty="0">
-                <a:ln>
-                  <a:noFill/>
-                </a:ln>
-                <a:effectLst/>
-                <a:uLnTx/>
-                <a:uFillTx/>
-                <a:latin typeface="Century Schoolbook" panose="02040604050505020304"/>
-              </a:rPr>
-              <a:t>To change the font style of this text box: Click on the border once to highlight the entire text box, then select a different font or font size that suits you. This text is in Arial 32pt and is easily readable up to 6 feet away. Try to stay between 28pt – 40pt for best viewing.</a:t>
-            </a:r>
-          </a:p>
         </p:txBody>
       </p:sp>
       <p:sp>
@@ -4002,8 +4462,8 @@
         </p:nvSpPr>
         <p:spPr bwMode="auto">
           <a:xfrm>
-            <a:off x="7741376" y="3249093"/>
-            <a:ext cx="5788025" cy="1371600"/>
+            <a:off x="7470058" y="1203955"/>
+            <a:ext cx="10221708" cy="671972"/>
           </a:xfrm>
           <a:prstGeom prst="rect">
             <a:avLst/>
@@ -4146,7 +4606,17 @@
           <a:p>
             <a:r>
               <a:rPr lang="en-US" sz="4800" dirty="0">
-                <a:latin typeface="Impact" pitchFamily="34" charset="0"/>
+                <a:ln w="0"/>
+                <a:effectLst>
+                  <a:outerShdw blurRad="38100" dist="19050" dir="2700000" algn="tl" rotWithShape="0">
+                    <a:schemeClr val="dk1">
+                      <a:alpha val="40000"/>
+                    </a:schemeClr>
+                  </a:outerShdw>
+                </a:effectLst>
+                <a:latin typeface="Verdana" panose="020B0604030504040204" pitchFamily="34" charset="0"/>
+                <a:ea typeface="Verdana" panose="020B0604030504040204" pitchFamily="34" charset="0"/>
+                <a:cs typeface="Verdana" panose="020B0604030504040204" pitchFamily="34" charset="0"/>
               </a:rPr>
               <a:t>INTRODUCTION</a:t>
             </a:r>
@@ -4161,7 +4631,7 @@
         </p:nvSpPr>
         <p:spPr>
           <a:xfrm>
-            <a:off x="6661803" y="14909069"/>
+            <a:off x="6661803" y="15392400"/>
             <a:ext cx="33311650" cy="4343400"/>
           </a:xfrm>
           <a:prstGeom prst="stripedRightArrow">
@@ -4169,19 +4639,17 @@
           </a:prstGeom>
         </p:spPr>
         <p:style>
-          <a:lnRef idx="2">
-            <a:schemeClr val="accent1">
-              <a:shade val="50000"/>
-            </a:schemeClr>
+          <a:lnRef idx="1">
+            <a:schemeClr val="accent3"/>
           </a:lnRef>
-          <a:fillRef idx="1">
-            <a:schemeClr val="accent1"/>
+          <a:fillRef idx="2">
+            <a:schemeClr val="accent3"/>
           </a:fillRef>
-          <a:effectRef idx="0">
-            <a:schemeClr val="accent1"/>
+          <a:effectRef idx="1">
+            <a:schemeClr val="accent3"/>
           </a:effectRef>
           <a:fontRef idx="minor">
-            <a:schemeClr val="lt1"/>
+            <a:schemeClr val="dk1"/>
           </a:fontRef>
         </p:style>
         <p:txBody>
@@ -4201,7 +4669,7 @@
         </p:nvSpPr>
         <p:spPr>
           <a:xfrm>
-            <a:off x="7741376" y="16289930"/>
+            <a:off x="7741376" y="16773261"/>
             <a:ext cx="30198439" cy="1631216"/>
           </a:xfrm>
           <a:prstGeom prst="rect">
@@ -4242,19 +4710,17 @@
           </a:prstGeom>
         </p:spPr>
         <p:style>
-          <a:lnRef idx="2">
-            <a:schemeClr val="accent1">
-              <a:shade val="50000"/>
-            </a:schemeClr>
+          <a:lnRef idx="1">
+            <a:schemeClr val="accent5"/>
           </a:lnRef>
-          <a:fillRef idx="1">
-            <a:schemeClr val="accent1"/>
+          <a:fillRef idx="2">
+            <a:schemeClr val="accent5"/>
           </a:fillRef>
-          <a:effectRef idx="0">
-            <a:schemeClr val="accent1"/>
+          <a:effectRef idx="1">
+            <a:schemeClr val="accent5"/>
           </a:effectRef>
           <a:fontRef idx="minor">
-            <a:schemeClr val="lt1"/>
+            <a:schemeClr val="dk1"/>
           </a:fontRef>
         </p:style>
         <p:txBody>
@@ -4309,8 +4775,8 @@
         </p:nvSpPr>
         <p:spPr bwMode="auto">
           <a:xfrm>
-            <a:off x="37939815" y="31602796"/>
-            <a:ext cx="5548313" cy="1176491"/>
+            <a:off x="33573747" y="6519709"/>
+            <a:ext cx="9914381" cy="1176491"/>
           </a:xfrm>
           <a:prstGeom prst="rect">
             <a:avLst/>
@@ -4400,7 +4866,7 @@
             <a:r>
               <a:rPr lang="en-US" sz="1800" kern="0" dirty="0">
                 <a:latin typeface="Century Schoolbook" panose="02040604050505020304"/>
-                <a:hlinkClick r:id="rId5"/>
+                <a:hlinkClick r:id="rId6"/>
               </a:rPr>
               <a:t>N00931863@ospreys.unf.edu</a:t>
             </a:r>
@@ -4448,8 +4914,8 @@
         </p:nvSpPr>
         <p:spPr bwMode="auto">
           <a:xfrm>
-            <a:off x="37885310" y="30488298"/>
-            <a:ext cx="5548313" cy="1114498"/>
+            <a:off x="33519242" y="5891429"/>
+            <a:ext cx="9914381" cy="628279"/>
           </a:xfrm>
           <a:prstGeom prst="rect">
             <a:avLst/>
@@ -4593,7 +5059,9 @@
             <a:pPr algn="ctr"/>
             <a:r>
               <a:rPr lang="en-US" sz="4800" dirty="0">
-                <a:latin typeface="Impact" pitchFamily="34" charset="0"/>
+                <a:latin typeface="Verdana" panose="020B0604030504040204" pitchFamily="34" charset="0"/>
+                <a:ea typeface="Verdana" panose="020B0604030504040204" pitchFamily="34" charset="0"/>
+                <a:cs typeface="Verdana" panose="020B0604030504040204" pitchFamily="34" charset="0"/>
               </a:rPr>
               <a:t>CONTACT</a:t>
             </a:r>
@@ -4610,8 +5078,8 @@
         </p:nvSpPr>
         <p:spPr bwMode="auto">
           <a:xfrm>
-            <a:off x="37923410" y="28920733"/>
-            <a:ext cx="5548313" cy="1473469"/>
+            <a:off x="33573747" y="3931742"/>
+            <a:ext cx="9914381" cy="1473469"/>
           </a:xfrm>
           <a:prstGeom prst="rect">
             <a:avLst/>
@@ -4721,8 +5189,8 @@
         </p:nvSpPr>
         <p:spPr bwMode="auto">
           <a:xfrm>
-            <a:off x="37923410" y="27806235"/>
-            <a:ext cx="5548313" cy="1114497"/>
+            <a:off x="33573747" y="3186238"/>
+            <a:ext cx="9914381" cy="680279"/>
           </a:xfrm>
           <a:prstGeom prst="rect">
             <a:avLst/>
@@ -4866,7 +5334,9 @@
             <a:pPr algn="ctr"/>
             <a:r>
               <a:rPr lang="en-US" sz="4800" dirty="0">
-                <a:latin typeface="Impact" pitchFamily="34" charset="0"/>
+                <a:latin typeface="Verdana" panose="020B0604030504040204" pitchFamily="34" charset="0"/>
+                <a:ea typeface="Verdana" panose="020B0604030504040204" pitchFamily="34" charset="0"/>
+                <a:cs typeface="Verdana" panose="020B0604030504040204" pitchFamily="34" charset="0"/>
               </a:rPr>
               <a:t>COURSE INFORMATION</a:t>
             </a:r>
@@ -4882,7 +5352,7 @@
           <p:nvPr/>
         </p:nvPicPr>
         <p:blipFill>
-          <a:blip r:embed="rId6">
+          <a:blip r:embed="rId7">
             <a:extLst>
               <a:ext uri="{28A0092B-C50C-407E-A947-70E740481C1C}">
                 <a14:useLocalDpi xmlns:a14="http://schemas.microsoft.com/office/drawing/2010/main" val="0"/>
@@ -4897,6 +5367,290 @@
           <a:xfrm>
             <a:off x="33573747" y="251787"/>
             <a:ext cx="9975141" cy="2306955"/>
+          </a:xfrm>
+          <a:prstGeom prst="rect">
+            <a:avLst/>
+          </a:prstGeom>
+        </p:spPr>
+      </p:pic>
+      <p:pic>
+        <p:nvPicPr>
+          <p:cNvPr id="2" name="Picture 1"/>
+          <p:cNvPicPr>
+            <a:picLocks noChangeAspect="1"/>
+          </p:cNvPicPr>
+          <p:nvPr/>
+        </p:nvPicPr>
+        <p:blipFill>
+          <a:blip r:embed="rId8">
+            <a:extLst>
+              <a:ext uri="{28A0092B-C50C-407E-A947-70E740481C1C}">
+                <a14:useLocalDpi xmlns:a14="http://schemas.microsoft.com/office/drawing/2010/main" val="0"/>
+              </a:ext>
+            </a:extLst>
+          </a:blip>
+          <a:stretch>
+            <a:fillRect/>
+          </a:stretch>
+        </p:blipFill>
+        <p:spPr>
+          <a:xfrm>
+            <a:off x="39885840" y="29287881"/>
+            <a:ext cx="3879524" cy="3418591"/>
+          </a:xfrm>
+          <a:prstGeom prst="rect">
+            <a:avLst/>
+          </a:prstGeom>
+        </p:spPr>
+      </p:pic>
+      <p:pic>
+        <p:nvPicPr>
+          <p:cNvPr id="3" name="Picture 2"/>
+          <p:cNvPicPr>
+            <a:picLocks noChangeAspect="1"/>
+          </p:cNvPicPr>
+          <p:nvPr/>
+        </p:nvPicPr>
+        <p:blipFill>
+          <a:blip r:embed="rId9">
+            <a:extLst>
+              <a:ext uri="{28A0092B-C50C-407E-A947-70E740481C1C}">
+                <a14:useLocalDpi xmlns:a14="http://schemas.microsoft.com/office/drawing/2010/main" val="0"/>
+              </a:ext>
+            </a:extLst>
+          </a:blip>
+          <a:stretch>
+            <a:fillRect/>
+          </a:stretch>
+        </p:blipFill>
+        <p:spPr>
+          <a:xfrm>
+            <a:off x="18194788" y="1872753"/>
+            <a:ext cx="4343400" cy="3600450"/>
+          </a:xfrm>
+          <a:prstGeom prst="rect">
+            <a:avLst/>
+          </a:prstGeom>
+        </p:spPr>
+      </p:pic>
+      <p:sp>
+        <p:nvSpPr>
+          <p:cNvPr id="21" name="Text Box 23"/>
+          <p:cNvSpPr txBox="1">
+            <a:spLocks noChangeArrowheads="1"/>
+          </p:cNvSpPr>
+          <p:nvPr/>
+        </p:nvSpPr>
+        <p:spPr bwMode="auto">
+          <a:xfrm>
+            <a:off x="18150543" y="5449109"/>
+            <a:ext cx="4343400" cy="510314"/>
+          </a:xfrm>
+          <a:prstGeom prst="rect">
+            <a:avLst/>
+          </a:prstGeom>
+          <a:noFill/>
+          <a:ln>
+            <a:noFill/>
+          </a:ln>
+          <a:effectLst/>
+          <a:extLst>
+            <a:ext uri="{909E8E84-426E-40DD-AFC4-6F175D3DCCD1}">
+              <a14:hiddenFill xmlns:a14="http://schemas.microsoft.com/office/drawing/2010/main">
+                <a:solidFill>
+                  <a:schemeClr val="accent1"/>
+                </a:solidFill>
+              </a14:hiddenFill>
+            </a:ext>
+            <a:ext uri="{91240B29-F687-4F45-9708-019B960494DF}">
+              <a14:hiddenLine xmlns:a14="http://schemas.microsoft.com/office/drawing/2010/main" w="9525">
+                <a:solidFill>
+                  <a:schemeClr val="tx1"/>
+                </a:solidFill>
+                <a:prstDash val="sysDot"/>
+                <a:miter lim="800000"/>
+                <a:headEnd/>
+                <a:tailEnd/>
+              </a14:hiddenLine>
+            </a:ext>
+            <a:ext uri="{AF507438-7753-43E0-B8FC-AC1667EBCBE1}">
+              <a14:hiddenEffects xmlns:a14="http://schemas.microsoft.com/office/drawing/2010/main">
+                <a:effectLst>
+                  <a:outerShdw dist="35921" dir="2700000" algn="ctr" rotWithShape="0">
+                    <a:schemeClr val="bg2"/>
+                  </a:outerShdw>
+                </a:effectLst>
+              </a14:hiddenEffects>
+            </a:ext>
+          </a:extLst>
+        </p:spPr>
+        <p:txBody>
+          <a:bodyPr wrap="none" lIns="228600" tIns="228600" rIns="228600" bIns="228600" anchor="ctr" anchorCtr="1"/>
+          <a:lstStyle>
+            <a:lvl1pPr defTabSz="4389438">
+              <a:defRPr>
+                <a:solidFill>
+                  <a:schemeClr val="tx1"/>
+                </a:solidFill>
+                <a:latin typeface="Arial" charset="0"/>
+              </a:defRPr>
+            </a:lvl1pPr>
+            <a:lvl2pPr defTabSz="4389438">
+              <a:defRPr>
+                <a:solidFill>
+                  <a:schemeClr val="tx1"/>
+                </a:solidFill>
+                <a:latin typeface="Arial" charset="0"/>
+              </a:defRPr>
+            </a:lvl2pPr>
+            <a:lvl3pPr defTabSz="4389438">
+              <a:defRPr>
+                <a:solidFill>
+                  <a:schemeClr val="tx1"/>
+                </a:solidFill>
+                <a:latin typeface="Arial" charset="0"/>
+              </a:defRPr>
+            </a:lvl3pPr>
+            <a:lvl4pPr defTabSz="4389438">
+              <a:defRPr>
+                <a:solidFill>
+                  <a:schemeClr val="tx1"/>
+                </a:solidFill>
+                <a:latin typeface="Arial" charset="0"/>
+              </a:defRPr>
+            </a:lvl4pPr>
+            <a:lvl5pPr defTabSz="4389438">
+              <a:defRPr>
+                <a:solidFill>
+                  <a:schemeClr val="tx1"/>
+                </a:solidFill>
+                <a:latin typeface="Arial" charset="0"/>
+              </a:defRPr>
+            </a:lvl5pPr>
+            <a:lvl6pPr defTabSz="4389438" fontAlgn="base">
+              <a:spcBef>
+                <a:spcPct val="0"/>
+              </a:spcBef>
+              <a:spcAft>
+                <a:spcPct val="0"/>
+              </a:spcAft>
+              <a:defRPr>
+                <a:solidFill>
+                  <a:schemeClr val="tx1"/>
+                </a:solidFill>
+                <a:latin typeface="Arial" charset="0"/>
+              </a:defRPr>
+            </a:lvl6pPr>
+            <a:lvl7pPr defTabSz="4389438" fontAlgn="base">
+              <a:spcBef>
+                <a:spcPct val="0"/>
+              </a:spcBef>
+              <a:spcAft>
+                <a:spcPct val="0"/>
+              </a:spcAft>
+              <a:defRPr>
+                <a:solidFill>
+                  <a:schemeClr val="tx1"/>
+                </a:solidFill>
+                <a:latin typeface="Arial" charset="0"/>
+              </a:defRPr>
+            </a:lvl7pPr>
+            <a:lvl8pPr defTabSz="4389438" fontAlgn="base">
+              <a:spcBef>
+                <a:spcPct val="0"/>
+              </a:spcBef>
+              <a:spcAft>
+                <a:spcPct val="0"/>
+              </a:spcAft>
+              <a:defRPr>
+                <a:solidFill>
+                  <a:schemeClr val="tx1"/>
+                </a:solidFill>
+                <a:latin typeface="Arial" charset="0"/>
+              </a:defRPr>
+            </a:lvl8pPr>
+            <a:lvl9pPr defTabSz="4389438" fontAlgn="base">
+              <a:spcBef>
+                <a:spcPct val="0"/>
+              </a:spcBef>
+              <a:spcAft>
+                <a:spcPct val="0"/>
+              </a:spcAft>
+              <a:defRPr>
+                <a:solidFill>
+                  <a:schemeClr val="tx1"/>
+                </a:solidFill>
+                <a:latin typeface="Arial" charset="0"/>
+              </a:defRPr>
+            </a:lvl9pPr>
+          </a:lstStyle>
+          <a:p>
+            <a:pPr algn="ctr"/>
+            <a:r>
+              <a:rPr lang="en-US" sz="2800" dirty="0">
+                <a:latin typeface="Verdana" panose="020B0604030504040204" pitchFamily="34" charset="0"/>
+                <a:ea typeface="Verdana" panose="020B0604030504040204" pitchFamily="34" charset="0"/>
+                <a:cs typeface="Verdana" panose="020B0604030504040204" pitchFamily="34" charset="0"/>
+              </a:rPr>
+              <a:t>Fig. 1</a:t>
+            </a:r>
+          </a:p>
+        </p:txBody>
+      </p:sp>
+      <p:pic>
+        <p:nvPicPr>
+          <p:cNvPr id="6" name="Picture 5"/>
+          <p:cNvPicPr>
+            <a:picLocks noChangeAspect="1"/>
+          </p:cNvPicPr>
+          <p:nvPr/>
+        </p:nvPicPr>
+        <p:blipFill>
+          <a:blip r:embed="rId10">
+            <a:extLst>
+              <a:ext uri="{28A0092B-C50C-407E-A947-70E740481C1C}">
+                <a14:useLocalDpi xmlns:a14="http://schemas.microsoft.com/office/drawing/2010/main" val="0"/>
+              </a:ext>
+            </a:extLst>
+          </a:blip>
+          <a:stretch>
+            <a:fillRect/>
+          </a:stretch>
+        </p:blipFill>
+        <p:spPr>
+          <a:xfrm>
+            <a:off x="7467600" y="7943459"/>
+            <a:ext cx="7973538" cy="2800741"/>
+          </a:xfrm>
+          <a:prstGeom prst="rect">
+            <a:avLst/>
+          </a:prstGeom>
+        </p:spPr>
+      </p:pic>
+      <p:pic>
+        <p:nvPicPr>
+          <p:cNvPr id="7" name="Picture 6"/>
+          <p:cNvPicPr>
+            <a:picLocks noChangeAspect="1"/>
+          </p:cNvPicPr>
+          <p:nvPr/>
+        </p:nvPicPr>
+        <p:blipFill>
+          <a:blip r:embed="rId11">
+            <a:extLst>
+              <a:ext uri="{28A0092B-C50C-407E-A947-70E740481C1C}">
+                <a14:useLocalDpi xmlns:a14="http://schemas.microsoft.com/office/drawing/2010/main" val="0"/>
+              </a:ext>
+            </a:extLst>
+          </a:blip>
+          <a:stretch>
+            <a:fillRect/>
+          </a:stretch>
+        </p:blipFill>
+        <p:spPr>
+          <a:xfrm>
+            <a:off x="15783829" y="7938543"/>
+            <a:ext cx="6754359" cy="2805657"/>
           </a:xfrm>
           <a:prstGeom prst="rect">
             <a:avLst/>
@@ -5197,4 +5951,299 @@
   <a:objectDefaults/>
   <a:extraClrSchemeLst/>
 </a:theme>
+</file>
+
+<file path=ppt/theme/theme2.xml><?xml version="1.0" encoding="utf-8"?>
+<a:theme xmlns:a="http://schemas.openxmlformats.org/drawingml/2006/main" name="Office Theme">
+  <a:themeElements>
+    <a:clrScheme name="Office">
+      <a:dk1>
+        <a:sysClr val="windowText" lastClr="000000"/>
+      </a:dk1>
+      <a:lt1>
+        <a:sysClr val="window" lastClr="FFFFFF"/>
+      </a:lt1>
+      <a:dk2>
+        <a:srgbClr val="44546A"/>
+      </a:dk2>
+      <a:lt2>
+        <a:srgbClr val="E7E6E6"/>
+      </a:lt2>
+      <a:accent1>
+        <a:srgbClr val="5B9BD5"/>
+      </a:accent1>
+      <a:accent2>
+        <a:srgbClr val="ED7D31"/>
+      </a:accent2>
+      <a:accent3>
+        <a:srgbClr val="A5A5A5"/>
+      </a:accent3>
+      <a:accent4>
+        <a:srgbClr val="FFC000"/>
+      </a:accent4>
+      <a:accent5>
+        <a:srgbClr val="4472C4"/>
+      </a:accent5>
+      <a:accent6>
+        <a:srgbClr val="70AD47"/>
+      </a:accent6>
+      <a:hlink>
+        <a:srgbClr val="0563C1"/>
+      </a:hlink>
+      <a:folHlink>
+        <a:srgbClr val="954F72"/>
+      </a:folHlink>
+    </a:clrScheme>
+    <a:fontScheme name="Office">
+      <a:majorFont>
+        <a:latin typeface="Calibri Light" panose="020F0302020204030204"/>
+        <a:ea typeface=""/>
+        <a:cs typeface=""/>
+        <a:font script="Jpan" typeface="游ゴシック Light"/>
+        <a:font script="Hang" typeface="맑은 고딕"/>
+        <a:font script="Hans" typeface="等线 Light"/>
+        <a:font script="Hant" typeface="新細明體"/>
+        <a:font script="Arab" typeface="Times New Roman"/>
+        <a:font script="Hebr" typeface="Times New Roman"/>
+        <a:font script="Thai" typeface="Angsana New"/>
+        <a:font script="Ethi" typeface="Nyala"/>
+        <a:font script="Beng" typeface="Vrinda"/>
+        <a:font script="Gujr" typeface="Shruti"/>
+        <a:font script="Khmr" typeface="MoolBoran"/>
+        <a:font script="Knda" typeface="Tunga"/>
+        <a:font script="Guru" typeface="Raavi"/>
+        <a:font script="Cans" typeface="Euphemia"/>
+        <a:font script="Cher" typeface="Plantagenet Cherokee"/>
+        <a:font script="Yiii" typeface="Microsoft Yi Baiti"/>
+        <a:font script="Tibt" typeface="Microsoft Himalaya"/>
+        <a:font script="Thaa" typeface="MV Boli"/>
+        <a:font script="Deva" typeface="Mangal"/>
+        <a:font script="Telu" typeface="Gautami"/>
+        <a:font script="Taml" typeface="Latha"/>
+        <a:font script="Syrc" typeface="Estrangelo Edessa"/>
+        <a:font script="Orya" typeface="Kalinga"/>
+        <a:font script="Mlym" typeface="Kartika"/>
+        <a:font script="Laoo" typeface="DokChampa"/>
+        <a:font script="Sinh" typeface="Iskoola Pota"/>
+        <a:font script="Mong" typeface="Mongolian Baiti"/>
+        <a:font script="Viet" typeface="Times New Roman"/>
+        <a:font script="Uigh" typeface="Microsoft Uighur"/>
+        <a:font script="Geor" typeface="Sylfaen"/>
+        <a:font script="Armn" typeface="Arial"/>
+        <a:font script="Bugi" typeface="Leelawadee UI"/>
+        <a:font script="Bopo" typeface="Microsoft JhengHei"/>
+        <a:font script="Java" typeface="Javanese Text"/>
+        <a:font script="Lisu" typeface="Segoe UI"/>
+        <a:font script="Mymr" typeface="Myanmar Text"/>
+        <a:font script="Nkoo" typeface="Ebrima"/>
+        <a:font script="Olck" typeface="Nirmala UI"/>
+        <a:font script="Osma" typeface="Ebrima"/>
+        <a:font script="Phag" typeface="Phagspa"/>
+        <a:font script="Syrn" typeface="Estrangelo Edessa"/>
+        <a:font script="Syrj" typeface="Estrangelo Edessa"/>
+        <a:font script="Syre" typeface="Estrangelo Edessa"/>
+        <a:font script="Sora" typeface="Nirmala UI"/>
+        <a:font script="Tale" typeface="Microsoft Tai Le"/>
+        <a:font script="Talu" typeface="Microsoft New Tai Lue"/>
+        <a:font script="Tfng" typeface="Ebrima"/>
+      </a:majorFont>
+      <a:minorFont>
+        <a:latin typeface="Calibri" panose="020F0502020204030204"/>
+        <a:ea typeface=""/>
+        <a:cs typeface=""/>
+        <a:font script="Jpan" typeface="游ゴシック"/>
+        <a:font script="Hang" typeface="맑은 고딕"/>
+        <a:font script="Hans" typeface="等线"/>
+        <a:font script="Hant" typeface="新細明體"/>
+        <a:font script="Arab" typeface="Arial"/>
+        <a:font script="Hebr" typeface="Arial"/>
+        <a:font script="Thai" typeface="Cordia New"/>
+        <a:font script="Ethi" typeface="Nyala"/>
+        <a:font script="Beng" typeface="Vrinda"/>
+        <a:font script="Gujr" typeface="Shruti"/>
+        <a:font script="Khmr" typeface="DaunPenh"/>
+        <a:font script="Knda" typeface="Tunga"/>
+        <a:font script="Guru" typeface="Raavi"/>
+        <a:font script="Cans" typeface="Euphemia"/>
+        <a:font script="Cher" typeface="Plantagenet Cherokee"/>
+        <a:font script="Yiii" typeface="Microsoft Yi Baiti"/>
+        <a:font script="Tibt" typeface="Microsoft Himalaya"/>
+        <a:font script="Thaa" typeface="MV Boli"/>
+        <a:font script="Deva" typeface="Mangal"/>
+        <a:font script="Telu" typeface="Gautami"/>
+        <a:font script="Taml" typeface="Latha"/>
+        <a:font script="Syrc" typeface="Estrangelo Edessa"/>
+        <a:font script="Orya" typeface="Kalinga"/>
+        <a:font script="Mlym" typeface="Kartika"/>
+        <a:font script="Laoo" typeface="DokChampa"/>
+        <a:font script="Sinh" typeface="Iskoola Pota"/>
+        <a:font script="Mong" typeface="Mongolian Baiti"/>
+        <a:font script="Viet" typeface="Arial"/>
+        <a:font script="Uigh" typeface="Microsoft Uighur"/>
+        <a:font script="Geor" typeface="Sylfaen"/>
+        <a:font script="Armn" typeface="Arial"/>
+        <a:font script="Bugi" typeface="Leelawadee UI"/>
+        <a:font script="Bopo" typeface="Microsoft JhengHei"/>
+        <a:font script="Java" typeface="Javanese Text"/>
+        <a:font script="Lisu" typeface="Segoe UI"/>
+        <a:font script="Mymr" typeface="Myanmar Text"/>
+        <a:font script="Nkoo" typeface="Ebrima"/>
+        <a:font script="Olck" typeface="Nirmala UI"/>
+        <a:font script="Osma" typeface="Ebrima"/>
+        <a:font script="Phag" typeface="Phagspa"/>
+        <a:font script="Syrn" typeface="Estrangelo Edessa"/>
+        <a:font script="Syrj" typeface="Estrangelo Edessa"/>
+        <a:font script="Syre" typeface="Estrangelo Edessa"/>
+        <a:font script="Sora" typeface="Nirmala UI"/>
+        <a:font script="Tale" typeface="Microsoft Tai Le"/>
+        <a:font script="Talu" typeface="Microsoft New Tai Lue"/>
+        <a:font script="Tfng" typeface="Ebrima"/>
+      </a:minorFont>
+    </a:fontScheme>
+    <a:fmtScheme name="Office">
+      <a:fillStyleLst>
+        <a:solidFill>
+          <a:schemeClr val="phClr"/>
+        </a:solidFill>
+        <a:gradFill rotWithShape="1">
+          <a:gsLst>
+            <a:gs pos="0">
+              <a:schemeClr val="phClr">
+                <a:lumMod val="110000"/>
+                <a:satMod val="105000"/>
+                <a:tint val="67000"/>
+              </a:schemeClr>
+            </a:gs>
+            <a:gs pos="50000">
+              <a:schemeClr val="phClr">
+                <a:lumMod val="105000"/>
+                <a:satMod val="103000"/>
+                <a:tint val="73000"/>
+              </a:schemeClr>
+            </a:gs>
+            <a:gs pos="100000">
+              <a:schemeClr val="phClr">
+                <a:lumMod val="105000"/>
+                <a:satMod val="109000"/>
+                <a:tint val="81000"/>
+              </a:schemeClr>
+            </a:gs>
+          </a:gsLst>
+          <a:lin ang="5400000" scaled="0"/>
+        </a:gradFill>
+        <a:gradFill rotWithShape="1">
+          <a:gsLst>
+            <a:gs pos="0">
+              <a:schemeClr val="phClr">
+                <a:satMod val="103000"/>
+                <a:lumMod val="102000"/>
+                <a:tint val="94000"/>
+              </a:schemeClr>
+            </a:gs>
+            <a:gs pos="50000">
+              <a:schemeClr val="phClr">
+                <a:satMod val="110000"/>
+                <a:lumMod val="100000"/>
+                <a:shade val="100000"/>
+              </a:schemeClr>
+            </a:gs>
+            <a:gs pos="100000">
+              <a:schemeClr val="phClr">
+                <a:lumMod val="99000"/>
+                <a:satMod val="120000"/>
+                <a:shade val="78000"/>
+              </a:schemeClr>
+            </a:gs>
+          </a:gsLst>
+          <a:lin ang="5400000" scaled="0"/>
+        </a:gradFill>
+      </a:fillStyleLst>
+      <a:lnStyleLst>
+        <a:ln w="6350" cap="flat" cmpd="sng" algn="ctr">
+          <a:solidFill>
+            <a:schemeClr val="phClr"/>
+          </a:solidFill>
+          <a:prstDash val="solid"/>
+          <a:miter lim="800000"/>
+        </a:ln>
+        <a:ln w="12700" cap="flat" cmpd="sng" algn="ctr">
+          <a:solidFill>
+            <a:schemeClr val="phClr"/>
+          </a:solidFill>
+          <a:prstDash val="solid"/>
+          <a:miter lim="800000"/>
+        </a:ln>
+        <a:ln w="19050" cap="flat" cmpd="sng" algn="ctr">
+          <a:solidFill>
+            <a:schemeClr val="phClr"/>
+          </a:solidFill>
+          <a:prstDash val="solid"/>
+          <a:miter lim="800000"/>
+        </a:ln>
+      </a:lnStyleLst>
+      <a:effectStyleLst>
+        <a:effectStyle>
+          <a:effectLst/>
+        </a:effectStyle>
+        <a:effectStyle>
+          <a:effectLst/>
+        </a:effectStyle>
+        <a:effectStyle>
+          <a:effectLst>
+            <a:outerShdw blurRad="57150" dist="19050" dir="5400000" algn="ctr" rotWithShape="0">
+              <a:srgbClr val="000000">
+                <a:alpha val="63000"/>
+              </a:srgbClr>
+            </a:outerShdw>
+          </a:effectLst>
+        </a:effectStyle>
+      </a:effectStyleLst>
+      <a:bgFillStyleLst>
+        <a:solidFill>
+          <a:schemeClr val="phClr"/>
+        </a:solidFill>
+        <a:solidFill>
+          <a:schemeClr val="phClr">
+            <a:tint val="95000"/>
+            <a:satMod val="170000"/>
+          </a:schemeClr>
+        </a:solidFill>
+        <a:gradFill rotWithShape="1">
+          <a:gsLst>
+            <a:gs pos="0">
+              <a:schemeClr val="phClr">
+                <a:tint val="93000"/>
+                <a:satMod val="150000"/>
+                <a:shade val="98000"/>
+                <a:lumMod val="102000"/>
+              </a:schemeClr>
+            </a:gs>
+            <a:gs pos="50000">
+              <a:schemeClr val="phClr">
+                <a:tint val="98000"/>
+                <a:satMod val="130000"/>
+                <a:shade val="90000"/>
+                <a:lumMod val="103000"/>
+              </a:schemeClr>
+            </a:gs>
+            <a:gs pos="100000">
+              <a:schemeClr val="phClr">
+                <a:shade val="63000"/>
+                <a:satMod val="120000"/>
+              </a:schemeClr>
+            </a:gs>
+          </a:gsLst>
+          <a:lin ang="5400000" scaled="0"/>
+        </a:gradFill>
+      </a:bgFillStyleLst>
+    </a:fmtScheme>
+  </a:themeElements>
+  <a:objectDefaults/>
+  <a:extraClrSchemeLst/>
+  <a:extLst>
+    <a:ext uri="{05A4C25C-085E-4340-85A3-A5531E510DB2}">
+      <thm15:themeFamily xmlns:thm15="http://schemas.microsoft.com/office/thememl/2012/main" name="Office Theme" id="{62F939B6-93AF-4DB8-9C6B-D6C7DFDC589F}" vid="{4A3C46E8-61CC-4603-A589-7422A47A8E4A}"/>
+    </a:ext>
+  </a:extLst>
+</a:theme>
 </file>
</xml_diff>

<commit_message>
updated poster, added some refs to use for lock bits
</commit_message>
<xml_diff>
--- a/Poster Artifacts/Poster.pptx
+++ b/Poster Artifacts/Poster.pptx
@@ -5,10 +5,11 @@
     <p:sldMasterId id="2147483648" r:id="rId1"/>
   </p:sldMasterIdLst>
   <p:notesMasterIdLst>
-    <p:notesMasterId r:id="rId3"/>
+    <p:notesMasterId r:id="rId4"/>
   </p:notesMasterIdLst>
   <p:sldIdLst>
     <p:sldId id="256" r:id="rId2"/>
+    <p:sldId id="258" r:id="rId3"/>
   </p:sldIdLst>
   <p:sldSz cx="43891200" cy="32918400"/>
   <p:notesSz cx="6858000" cy="9144000"/>
@@ -208,7 +209,7 @@
           <a:p>
             <a:fld id="{CAD4E7B3-883E-4909-856A-D4D2FBCEB0AE}" type="datetimeFigureOut">
               <a:rPr lang="en-US" smtClean="0"/>
-              <a:t>2/1/2017</a:t>
+              <a:t>2/20/2017</a:t>
             </a:fld>
             <a:endParaRPr lang="en-US"/>
           </a:p>
@@ -303,7 +304,6 @@
               <a:rPr lang="en-US"/>
               <a:t>Fifth level</a:t>
             </a:r>
-            <a:endParaRPr lang="en-US"/>
           </a:p>
         </p:txBody>
       </p:sp>
@@ -560,6 +560,90 @@
 </p:notes>
 </file>
 
+<file path=ppt/notesSlides/notesSlide2.xml><?xml version="1.0" encoding="utf-8"?>
+<p:notes xmlns:a="http://schemas.openxmlformats.org/drawingml/2006/main" xmlns:r="http://schemas.openxmlformats.org/officeDocument/2006/relationships" xmlns:p="http://schemas.openxmlformats.org/presentationml/2006/main">
+  <p:cSld>
+    <p:spTree>
+      <p:nvGrpSpPr>
+        <p:cNvPr id="1" name=""/>
+        <p:cNvGrpSpPr/>
+        <p:nvPr/>
+      </p:nvGrpSpPr>
+      <p:grpSpPr>
+        <a:xfrm>
+          <a:off x="0" y="0"/>
+          <a:ext cx="0" cy="0"/>
+          <a:chOff x="0" y="0"/>
+          <a:chExt cx="0" cy="0"/>
+        </a:xfrm>
+      </p:grpSpPr>
+      <p:sp>
+        <p:nvSpPr>
+          <p:cNvPr id="2" name="Slide Image Placeholder 1"/>
+          <p:cNvSpPr>
+            <a:spLocks noGrp="1" noRot="1" noChangeAspect="1"/>
+          </p:cNvSpPr>
+          <p:nvPr>
+            <p:ph type="sldImg"/>
+          </p:nvPr>
+        </p:nvSpPr>
+        <p:spPr/>
+      </p:sp>
+      <p:sp>
+        <p:nvSpPr>
+          <p:cNvPr id="3" name="Notes Placeholder 2"/>
+          <p:cNvSpPr>
+            <a:spLocks noGrp="1"/>
+          </p:cNvSpPr>
+          <p:nvPr>
+            <p:ph type="body" idx="1"/>
+          </p:nvPr>
+        </p:nvSpPr>
+        <p:spPr/>
+        <p:txBody>
+          <a:bodyPr/>
+          <a:lstStyle/>
+          <a:p>
+            <a:endParaRPr lang="en-US" dirty="0"/>
+          </a:p>
+        </p:txBody>
+      </p:sp>
+      <p:sp>
+        <p:nvSpPr>
+          <p:cNvPr id="4" name="Slide Number Placeholder 3"/>
+          <p:cNvSpPr>
+            <a:spLocks noGrp="1"/>
+          </p:cNvSpPr>
+          <p:nvPr>
+            <p:ph type="sldNum" sz="quarter" idx="10"/>
+          </p:nvPr>
+        </p:nvSpPr>
+        <p:spPr/>
+        <p:txBody>
+          <a:bodyPr/>
+          <a:lstStyle/>
+          <a:p>
+            <a:fld id="{4BC4B03E-A05D-444D-8D88-A502D3A7EEBD}" type="slidenum">
+              <a:rPr lang="en-US" smtClean="0"/>
+              <a:t>2</a:t>
+            </a:fld>
+            <a:endParaRPr lang="en-US"/>
+          </a:p>
+        </p:txBody>
+      </p:sp>
+    </p:spTree>
+    <p:extLst>
+      <p:ext uri="{BB962C8B-B14F-4D97-AF65-F5344CB8AC3E}">
+        <p14:creationId xmlns:p14="http://schemas.microsoft.com/office/powerpoint/2010/main" val="2373076266"/>
+      </p:ext>
+    </p:extLst>
+  </p:cSld>
+  <p:clrMapOvr>
+    <a:masterClrMapping/>
+  </p:clrMapOvr>
+</p:notes>
+</file>
+
 <file path=ppt/slideLayouts/slideLayout1.xml><?xml version="1.0" encoding="utf-8"?>
 <p:sldLayout xmlns:a="http://schemas.openxmlformats.org/drawingml/2006/main" xmlns:r="http://schemas.openxmlformats.org/officeDocument/2006/relationships" xmlns:p="http://schemas.openxmlformats.org/presentationml/2006/main" type="title" preserve="1">
   <p:cSld name="Title Slide">
@@ -740,7 +824,7 @@
             <a:fld id="{1D8BD707-D9CF-40AE-B4C6-C98DA3205C09}" type="datetimeFigureOut">
               <a:rPr lang="en-US" smtClean="0"/>
               <a:pPr/>
-              <a:t>2/1/2017</a:t>
+              <a:t>2/20/2017</a:t>
             </a:fld>
             <a:endParaRPr lang="en-US"/>
           </a:p>
@@ -905,7 +989,7 @@
             <a:fld id="{1D8BD707-D9CF-40AE-B4C6-C98DA3205C09}" type="datetimeFigureOut">
               <a:rPr lang="en-US" smtClean="0"/>
               <a:pPr/>
-              <a:t>2/1/2017</a:t>
+              <a:t>2/20/2017</a:t>
             </a:fld>
             <a:endParaRPr lang="en-US"/>
           </a:p>
@@ -1080,7 +1164,7 @@
             <a:fld id="{1D8BD707-D9CF-40AE-B4C6-C98DA3205C09}" type="datetimeFigureOut">
               <a:rPr lang="en-US" smtClean="0"/>
               <a:pPr/>
-              <a:t>2/1/2017</a:t>
+              <a:t>2/20/2017</a:t>
             </a:fld>
             <a:endParaRPr lang="en-US"/>
           </a:p>
@@ -1245,7 +1329,7 @@
             <a:fld id="{1D8BD707-D9CF-40AE-B4C6-C98DA3205C09}" type="datetimeFigureOut">
               <a:rPr lang="en-US" smtClean="0"/>
               <a:pPr/>
-              <a:t>2/1/2017</a:t>
+              <a:t>2/20/2017</a:t>
             </a:fld>
             <a:endParaRPr lang="en-US"/>
           </a:p>
@@ -1487,7 +1571,7 @@
             <a:fld id="{1D8BD707-D9CF-40AE-B4C6-C98DA3205C09}" type="datetimeFigureOut">
               <a:rPr lang="en-US" smtClean="0"/>
               <a:pPr/>
-              <a:t>2/1/2017</a:t>
+              <a:t>2/20/2017</a:t>
             </a:fld>
             <a:endParaRPr lang="en-US"/>
           </a:p>
@@ -1769,7 +1853,7 @@
             <a:fld id="{1D8BD707-D9CF-40AE-B4C6-C98DA3205C09}" type="datetimeFigureOut">
               <a:rPr lang="en-US" smtClean="0"/>
               <a:pPr/>
-              <a:t>2/1/2017</a:t>
+              <a:t>2/20/2017</a:t>
             </a:fld>
             <a:endParaRPr lang="en-US"/>
           </a:p>
@@ -2185,7 +2269,7 @@
             <a:fld id="{1D8BD707-D9CF-40AE-B4C6-C98DA3205C09}" type="datetimeFigureOut">
               <a:rPr lang="en-US" smtClean="0"/>
               <a:pPr/>
-              <a:t>2/1/2017</a:t>
+              <a:t>2/20/2017</a:t>
             </a:fld>
             <a:endParaRPr lang="en-US"/>
           </a:p>
@@ -2299,7 +2383,7 @@
             <a:fld id="{1D8BD707-D9CF-40AE-B4C6-C98DA3205C09}" type="datetimeFigureOut">
               <a:rPr lang="en-US" smtClean="0"/>
               <a:pPr/>
-              <a:t>2/1/2017</a:t>
+              <a:t>2/20/2017</a:t>
             </a:fld>
             <a:endParaRPr lang="en-US"/>
           </a:p>
@@ -2391,7 +2475,7 @@
             <a:fld id="{1D8BD707-D9CF-40AE-B4C6-C98DA3205C09}" type="datetimeFigureOut">
               <a:rPr lang="en-US" smtClean="0"/>
               <a:pPr/>
-              <a:t>2/1/2017</a:t>
+              <a:t>2/20/2017</a:t>
             </a:fld>
             <a:endParaRPr lang="en-US"/>
           </a:p>
@@ -2663,7 +2747,7 @@
             <a:fld id="{1D8BD707-D9CF-40AE-B4C6-C98DA3205C09}" type="datetimeFigureOut">
               <a:rPr lang="en-US" smtClean="0"/>
               <a:pPr/>
-              <a:t>2/1/2017</a:t>
+              <a:t>2/20/2017</a:t>
             </a:fld>
             <a:endParaRPr lang="en-US"/>
           </a:p>
@@ -2912,7 +2996,7 @@
             <a:fld id="{1D8BD707-D9CF-40AE-B4C6-C98DA3205C09}" type="datetimeFigureOut">
               <a:rPr lang="en-US" smtClean="0"/>
               <a:pPr/>
-              <a:t>2/1/2017</a:t>
+              <a:t>2/20/2017</a:t>
             </a:fld>
             <a:endParaRPr lang="en-US"/>
           </a:p>
@@ -3120,7 +3204,7 @@
             <a:fld id="{1D8BD707-D9CF-40AE-B4C6-C98DA3205C09}" type="datetimeFigureOut">
               <a:rPr lang="en-US" smtClean="0"/>
               <a:pPr/>
-              <a:t>2/1/2017</a:t>
+              <a:t>2/20/2017</a:t>
             </a:fld>
             <a:endParaRPr lang="en-US"/>
           </a:p>
@@ -3531,31 +3615,27 @@
         </p:nvSpPr>
         <p:spPr bwMode="auto">
           <a:xfrm>
-            <a:off x="7315200" y="13758816"/>
-            <a:ext cx="30624615" cy="3103631"/>
+            <a:off x="5867400" y="13345397"/>
+            <a:ext cx="33885959" cy="3952003"/>
           </a:xfrm>
           <a:prstGeom prst="rect">
             <a:avLst/>
           </a:prstGeom>
           <a:solidFill>
-            <a:schemeClr val="accent6">
-              <a:alpha val="50000"/>
-            </a:schemeClr>
+            <a:srgbClr val="FF0000"/>
           </a:solidFill>
-          <a:ln>
-            <a:noFill/>
-          </a:ln>
+          <a:ln/>
           <a:extLst/>
         </p:spPr>
         <p:style>
           <a:lnRef idx="0">
-            <a:scrgbClr r="0" g="0" b="0"/>
+            <a:schemeClr val="dk1"/>
           </a:lnRef>
-          <a:fillRef idx="0">
-            <a:scrgbClr r="0" g="0" b="0"/>
+          <a:fillRef idx="3">
+            <a:schemeClr val="dk1"/>
           </a:fillRef>
-          <a:effectRef idx="0">
-            <a:scrgbClr r="0" g="0" b="0"/>
+          <a:effectRef idx="3">
+            <a:schemeClr val="dk1"/>
           </a:effectRef>
           <a:fontRef idx="minor">
             <a:schemeClr val="lt1"/>
@@ -3667,14 +3747,12 @@
               <a:rPr lang="en-US" sz="11500" b="1" dirty="0">
                 <a:ln w="12700">
                   <a:solidFill>
-                    <a:schemeClr val="accent3">
-                      <a:lumMod val="50000"/>
-                    </a:schemeClr>
+                    <a:schemeClr val="tx1"/>
                   </a:solidFill>
                   <a:prstDash val="solid"/>
                 </a:ln>
                 <a:solidFill>
-                  <a:srgbClr val="FFFF00"/>
+                  <a:schemeClr val="bg1"/>
                 </a:solidFill>
                 <a:effectLst>
                   <a:innerShdw blurRad="177800">
@@ -4141,6 +4219,103 @@
       </p:sp>
       <p:pic>
         <p:nvPicPr>
+          <p:cNvPr id="40" name="Picture 39"/>
+          <p:cNvPicPr>
+            <a:picLocks noChangeAspect="1"/>
+          </p:cNvPicPr>
+          <p:nvPr/>
+        </p:nvPicPr>
+        <p:blipFill>
+          <a:blip r:embed="rId3">
+            <a:extLst>
+              <a:ext uri="{28A0092B-C50C-407E-A947-70E740481C1C}">
+                <a14:useLocalDpi xmlns:a14="http://schemas.microsoft.com/office/drawing/2010/main" val="0"/>
+              </a:ext>
+            </a:extLst>
+          </a:blip>
+          <a:stretch>
+            <a:fillRect/>
+          </a:stretch>
+        </p:blipFill>
+        <p:spPr>
+          <a:xfrm>
+            <a:off x="732210" y="179691"/>
+            <a:ext cx="5952005" cy="32702614"/>
+          </a:xfrm>
+          <a:prstGeom prst="rect">
+            <a:avLst/>
+          </a:prstGeom>
+        </p:spPr>
+      </p:pic>
+      <p:sp>
+        <p:nvSpPr>
+          <p:cNvPr id="44" name="Striped Right Arrow 43"/>
+          <p:cNvSpPr/>
+          <p:nvPr/>
+        </p:nvSpPr>
+        <p:spPr>
+          <a:xfrm rot="10800000">
+            <a:off x="4953000" y="11365768"/>
+            <a:ext cx="34932840" cy="4343400"/>
+          </a:xfrm>
+          <a:prstGeom prst="stripedRightArrow">
+            <a:avLst/>
+          </a:prstGeom>
+          <a:ln w="76200">
+            <a:solidFill>
+              <a:schemeClr val="tx1"/>
+            </a:solidFill>
+          </a:ln>
+          <a:effectLst>
+            <a:outerShdw blurRad="44450" dist="27940" dir="5400000" algn="ctr">
+              <a:srgbClr val="000000">
+                <a:alpha val="32000"/>
+              </a:srgbClr>
+            </a:outerShdw>
+          </a:effectLst>
+          <a:scene3d>
+            <a:camera prst="orthographicFront">
+              <a:rot lat="0" lon="0" rev="0"/>
+            </a:camera>
+            <a:lightRig rig="balanced" dir="t">
+              <a:rot lat="0" lon="0" rev="8700000"/>
+            </a:lightRig>
+          </a:scene3d>
+          <a:sp3d>
+            <a:bevelT w="190500" h="38100"/>
+          </a:sp3d>
+        </p:spPr>
+        <p:style>
+          <a:lnRef idx="1">
+            <a:schemeClr val="accent5"/>
+          </a:lnRef>
+          <a:fillRef idx="2">
+            <a:schemeClr val="accent5"/>
+          </a:fillRef>
+          <a:effectRef idx="1">
+            <a:schemeClr val="accent5"/>
+          </a:effectRef>
+          <a:fontRef idx="minor">
+            <a:schemeClr val="dk1"/>
+          </a:fontRef>
+        </p:style>
+        <p:txBody>
+          <a:bodyPr rtlCol="0" anchor="ctr"/>
+          <a:lstStyle/>
+          <a:p>
+            <a:pPr algn="ctr"/>
+            <a:endParaRPr lang="en-US" dirty="0">
+              <a:ln w="76200">
+                <a:solidFill>
+                  <a:schemeClr val="tx1"/>
+                </a:solidFill>
+              </a:ln>
+            </a:endParaRPr>
+          </a:p>
+        </p:txBody>
+      </p:sp>
+      <p:pic>
+        <p:nvPicPr>
           <p:cNvPr id="34" name="Picture 33" descr="NFC Forum"/>
           <p:cNvPicPr preferRelativeResize="0">
             <a:picLocks noChangeAspect="1"/>
@@ -4148,7 +4323,7 @@
           <p:nvPr/>
         </p:nvPicPr>
         <p:blipFill>
-          <a:blip r:embed="rId3">
+          <a:blip r:embed="rId4">
             <a:extLst>
               <a:ext uri="{28A0092B-C50C-407E-A947-70E740481C1C}">
                 <a14:useLocalDpi xmlns:a14="http://schemas.microsoft.com/office/drawing/2010/main" val="0"/>
@@ -4183,7 +4358,7 @@
           <p:nvPr/>
         </p:nvPicPr>
         <p:blipFill>
-          <a:blip r:embed="rId4">
+          <a:blip r:embed="rId5">
             <a:extLst>
               <a:ext uri="{28A0092B-C50C-407E-A947-70E740481C1C}">
                 <a14:useLocalDpi xmlns:a14="http://schemas.microsoft.com/office/drawing/2010/main" val="0"/>
@@ -4199,87 +4374,95 @@
             <a:off x="39093293" y="12461862"/>
             <a:ext cx="4455595" cy="6054738"/>
           </a:xfrm>
-          <a:prstGeom prst="rect">
+          <a:prstGeom prst="ellipse">
             <a:avLst/>
           </a:prstGeom>
+          <a:ln w="63500" cap="rnd">
+            <a:solidFill>
+              <a:srgbClr val="333333"/>
+            </a:solidFill>
+          </a:ln>
+          <a:effectLst>
+            <a:outerShdw blurRad="381000" dist="292100" dir="5400000" sx="-80000" sy="-18000" rotWithShape="0">
+              <a:srgbClr val="000000">
+                <a:alpha val="22000"/>
+              </a:srgbClr>
+            </a:outerShdw>
+          </a:effectLst>
+          <a:scene3d>
+            <a:camera prst="orthographicFront"/>
+            <a:lightRig rig="contrasting" dir="t">
+              <a:rot lat="0" lon="0" rev="3000000"/>
+            </a:lightRig>
+          </a:scene3d>
+          <a:sp3d contourW="7620">
+            <a:bevelT w="95250" h="31750"/>
+            <a:contourClr>
+              <a:srgbClr val="333333"/>
+            </a:contourClr>
+          </a:sp3d>
         </p:spPr>
       </p:pic>
-      <p:pic>
-        <p:nvPicPr>
-          <p:cNvPr id="40" name="Picture 39"/>
-          <p:cNvPicPr>
-            <a:picLocks noChangeAspect="1"/>
-          </p:cNvPicPr>
+      <p:sp>
+        <p:nvSpPr>
+          <p:cNvPr id="25" name="Text Box 18"/>
+          <p:cNvSpPr txBox="1">
+            <a:spLocks noChangeArrowheads="1"/>
+          </p:cNvSpPr>
           <p:nvPr/>
-        </p:nvPicPr>
-        <p:blipFill>
-          <a:blip r:embed="rId5">
-            <a:extLst>
-              <a:ext uri="{28A0092B-C50C-407E-A947-70E740481C1C}">
-                <a14:useLocalDpi xmlns:a14="http://schemas.microsoft.com/office/drawing/2010/main" val="0"/>
-              </a:ext>
-            </a:extLst>
-          </a:blip>
-          <a:stretch>
-            <a:fillRect/>
-          </a:stretch>
-        </p:blipFill>
-        <p:spPr>
+        </p:nvSpPr>
+        <p:spPr bwMode="auto">
           <a:xfrm>
-            <a:off x="732210" y="179691"/>
-            <a:ext cx="5952005" cy="32702614"/>
+            <a:off x="10870845" y="1196515"/>
+            <a:ext cx="22160418" cy="3136919"/>
           </a:xfrm>
           <a:prstGeom prst="rect">
             <a:avLst/>
           </a:prstGeom>
-        </p:spPr>
-      </p:pic>
-      <p:sp>
-        <p:nvSpPr>
-          <p:cNvPr id="25" name="Text Box 18"/>
-          <p:cNvSpPr txBox="1">
-            <a:spLocks noChangeArrowheads="1"/>
-          </p:cNvSpPr>
-          <p:nvPr/>
-        </p:nvSpPr>
-        <p:spPr bwMode="auto">
-          <a:xfrm>
-            <a:off x="7470058" y="1872753"/>
-            <a:ext cx="10221708" cy="5696969"/>
-          </a:xfrm>
-          <a:prstGeom prst="rect">
-            <a:avLst/>
-          </a:prstGeom>
-          <a:noFill/>
-          <a:ln w="19050">
-            <a:solidFill>
-              <a:srgbClr val="FFFFFF"/>
-            </a:solidFill>
-            <a:prstDash val="dash"/>
-            <a:miter lim="800000"/>
+          <a:solidFill>
+            <a:schemeClr val="bg1">
+              <a:lumMod val="95000"/>
+            </a:schemeClr>
+          </a:solidFill>
+          <a:ln>
+            <a:noFill/>
             <a:headEnd/>
             <a:tailEnd/>
           </a:ln>
-          <a:effectLst/>
-          <a:extLst>
-            <a:ext uri="{909E8E84-426E-40DD-AFC4-6F175D3DCCD1}">
-              <a14:hiddenFill xmlns:a14="http://schemas.microsoft.com/office/drawing/2010/main">
-                <a:solidFill>
-                  <a:schemeClr val="accent1"/>
-                </a:solidFill>
-              </a14:hiddenFill>
-            </a:ext>
-            <a:ext uri="{AF507438-7753-43E0-B8FC-AC1667EBCBE1}">
-              <a14:hiddenEffects xmlns:a14="http://schemas.microsoft.com/office/drawing/2010/main">
-                <a:effectLst>
-                  <a:outerShdw dist="35921" dir="2700000" algn="ctr" rotWithShape="0">
-                    <a:schemeClr val="bg2"/>
-                  </a:outerShdw>
-                </a:effectLst>
-              </a14:hiddenEffects>
-            </a:ext>
-          </a:extLst>
+          <a:effectLst>
+            <a:outerShdw blurRad="149987" dist="250190" dir="8460000" algn="ctr">
+              <a:srgbClr val="000000">
+                <a:alpha val="28000"/>
+              </a:srgbClr>
+            </a:outerShdw>
+          </a:effectLst>
+          <a:scene3d>
+            <a:camera prst="orthographicFront">
+              <a:rot lat="0" lon="0" rev="0"/>
+            </a:camera>
+            <a:lightRig rig="contrasting" dir="t">
+              <a:rot lat="0" lon="0" rev="1500000"/>
+            </a:lightRig>
+          </a:scene3d>
+          <a:sp3d prstMaterial="metal">
+            <a:bevelT w="88900" h="88900"/>
+          </a:sp3d>
+          <a:extLst/>
         </p:spPr>
+        <p:style>
+          <a:lnRef idx="2">
+            <a:schemeClr val="accent6"/>
+          </a:lnRef>
+          <a:fillRef idx="1">
+            <a:schemeClr val="lt1"/>
+          </a:fillRef>
+          <a:effectRef idx="0">
+            <a:schemeClr val="accent6"/>
+          </a:effectRef>
+          <a:fontRef idx="minor">
+            <a:schemeClr val="dk1"/>
+          </a:fontRef>
+        </p:style>
         <p:txBody>
           <a:bodyPr lIns="228600" tIns="228600" rIns="228600" bIns="228600"/>
           <a:lstStyle/>
@@ -4454,6 +4637,67 @@
       </p:sp>
       <p:sp>
         <p:nvSpPr>
+          <p:cNvPr id="43" name="Striped Right Arrow 42"/>
+          <p:cNvSpPr/>
+          <p:nvPr/>
+        </p:nvSpPr>
+        <p:spPr>
+          <a:xfrm>
+            <a:off x="6684214" y="15392400"/>
+            <a:ext cx="33854185" cy="4343400"/>
+          </a:xfrm>
+          <a:prstGeom prst="stripedRightArrow">
+            <a:avLst/>
+          </a:prstGeom>
+          <a:ln w="76200">
+            <a:solidFill>
+              <a:schemeClr val="tx1"/>
+            </a:solidFill>
+          </a:ln>
+          <a:effectLst>
+            <a:outerShdw blurRad="149987" dist="250190" dir="8460000" algn="ctr">
+              <a:srgbClr val="000000">
+                <a:alpha val="28000"/>
+              </a:srgbClr>
+            </a:outerShdw>
+          </a:effectLst>
+          <a:scene3d>
+            <a:camera prst="orthographicFront">
+              <a:rot lat="0" lon="0" rev="0"/>
+            </a:camera>
+            <a:lightRig rig="contrasting" dir="t">
+              <a:rot lat="0" lon="0" rev="1500000"/>
+            </a:lightRig>
+          </a:scene3d>
+          <a:sp3d prstMaterial="metal">
+            <a:bevelT w="88900" h="88900"/>
+          </a:sp3d>
+        </p:spPr>
+        <p:style>
+          <a:lnRef idx="1">
+            <a:schemeClr val="accent3"/>
+          </a:lnRef>
+          <a:fillRef idx="2">
+            <a:schemeClr val="accent3"/>
+          </a:fillRef>
+          <a:effectRef idx="1">
+            <a:schemeClr val="accent3"/>
+          </a:effectRef>
+          <a:fontRef idx="minor">
+            <a:schemeClr val="dk1"/>
+          </a:fontRef>
+        </p:style>
+        <p:txBody>
+          <a:bodyPr rtlCol="0" anchor="ctr"/>
+          <a:lstStyle/>
+          <a:p>
+            <a:pPr algn="ctr"/>
+            <a:endParaRPr lang="en-US"/>
+          </a:p>
+        </p:txBody>
+      </p:sp>
+      <p:sp>
+        <p:nvSpPr>
           <p:cNvPr id="26" name="Text Box 23"/>
           <p:cNvSpPr txBox="1">
             <a:spLocks noChangeArrowheads="1"/>
@@ -4462,7 +4706,7 @@
         </p:nvSpPr>
         <p:spPr bwMode="auto">
           <a:xfrm>
-            <a:off x="7470058" y="1203955"/>
+            <a:off x="16840200" y="372941"/>
             <a:ext cx="10221708" cy="671972"/>
           </a:xfrm>
           <a:prstGeom prst="rect">
@@ -4625,52 +4869,14 @@
       </p:sp>
       <p:sp>
         <p:nvSpPr>
-          <p:cNvPr id="43" name="Striped Right Arrow 42"/>
+          <p:cNvPr id="38" name="Rectangle 37"/>
           <p:cNvSpPr/>
           <p:nvPr/>
         </p:nvSpPr>
         <p:spPr>
           <a:xfrm>
-            <a:off x="6661803" y="15392400"/>
-            <a:ext cx="33311650" cy="4343400"/>
-          </a:xfrm>
-          <a:prstGeom prst="stripedRightArrow">
-            <a:avLst/>
-          </a:prstGeom>
-        </p:spPr>
-        <p:style>
-          <a:lnRef idx="1">
-            <a:schemeClr val="accent3"/>
-          </a:lnRef>
-          <a:fillRef idx="2">
-            <a:schemeClr val="accent3"/>
-          </a:fillRef>
-          <a:effectRef idx="1">
-            <a:schemeClr val="accent3"/>
-          </a:effectRef>
-          <a:fontRef idx="minor">
-            <a:schemeClr val="dk1"/>
-          </a:fontRef>
-        </p:style>
-        <p:txBody>
-          <a:bodyPr rtlCol="0" anchor="ctr"/>
-          <a:lstStyle/>
-          <a:p>
-            <a:pPr algn="ctr"/>
-            <a:endParaRPr lang="en-US"/>
-          </a:p>
-        </p:txBody>
-      </p:sp>
-      <p:sp>
-        <p:nvSpPr>
-          <p:cNvPr id="42" name="Rectangle 41"/>
-          <p:cNvSpPr/>
-          <p:nvPr/>
-        </p:nvSpPr>
-        <p:spPr>
-          <a:xfrm>
-            <a:off x="7741376" y="16773261"/>
-            <a:ext cx="30198439" cy="1631216"/>
+            <a:off x="6684214" y="12725400"/>
+            <a:ext cx="32409079" cy="1569660"/>
           </a:xfrm>
           <a:prstGeom prst="rect">
             <a:avLst/>
@@ -4687,81 +4893,484 @@
           <a:lstStyle/>
           <a:p>
             <a:r>
-              <a:rPr lang="en-US" sz="2000" dirty="0"/>
-              <a:t>000000000000000000000000000000000000000000000000000000000000000000000000000000000000000000000000000000000000000000000000000000000000000000000000000000000000000000000000000000000000000000000000000000000000000000000000000000000000000000000000000000000000000000000000000000000000000000000000000000000000000000000000000000000000000000000000000000000000000000000000000000000000000000000000000000000000000000000000000000000000000000000000000000000000000000000000000000000000000000000000000000000000000000000000000000000000000000000000000000000000000000000000000000000000000000000000000000000000000000000000000000000000000000000000000000000000000000000000000000000000000000000000000000000000000000000000000000000000000000000000000000000000000000000000000000000000000000000000000000000000000000000000000000000000000000000000000000000000000000000000000000000000000000000000000000000000000000000000000000000000000000000000000000000000000000000000000000000000000000000000000000000000000000000000000000000000000000000000000000000000000000000000000000000000000000000000000000000000000000000000000000000000000000000000000000000000000000000000000000000000000000000000</a:t>
-            </a:r>
-            <a:endParaRPr lang="en-US" sz="700" dirty="0"/>
-          </a:p>
-        </p:txBody>
-      </p:sp>
-      <p:sp>
-        <p:nvSpPr>
-          <p:cNvPr id="44" name="Striped Right Arrow 43"/>
-          <p:cNvSpPr/>
-          <p:nvPr/>
-        </p:nvSpPr>
-        <p:spPr>
-          <a:xfrm rot="10800000">
-            <a:off x="5006788" y="11365768"/>
-            <a:ext cx="34050922" cy="4343400"/>
-          </a:xfrm>
-          <a:prstGeom prst="stripedRightArrow">
-            <a:avLst/>
-          </a:prstGeom>
-        </p:spPr>
-        <p:style>
-          <a:lnRef idx="1">
-            <a:schemeClr val="accent5"/>
-          </a:lnRef>
-          <a:fillRef idx="2">
-            <a:schemeClr val="accent5"/>
-          </a:fillRef>
-          <a:effectRef idx="1">
-            <a:schemeClr val="accent5"/>
-          </a:effectRef>
-          <a:fontRef idx="minor">
-            <a:schemeClr val="dk1"/>
-          </a:fontRef>
-        </p:style>
-        <p:txBody>
-          <a:bodyPr rtlCol="0" anchor="ctr"/>
-          <a:lstStyle/>
-          <a:p>
-            <a:pPr algn="ctr"/>
-            <a:endParaRPr lang="en-US"/>
-          </a:p>
-        </p:txBody>
-      </p:sp>
-      <p:sp>
-        <p:nvSpPr>
-          <p:cNvPr id="38" name="Rectangle 37"/>
-          <p:cNvSpPr/>
-          <p:nvPr/>
-        </p:nvSpPr>
-        <p:spPr>
-          <a:xfrm>
-            <a:off x="8052852" y="12791634"/>
-            <a:ext cx="29886963" cy="1631216"/>
-          </a:xfrm>
-          <a:prstGeom prst="rect">
-            <a:avLst/>
-          </a:prstGeom>
-          <a:noFill/>
-          <a:ln>
-            <a:noFill/>
-          </a:ln>
-        </p:spPr>
-        <p:txBody>
-          <a:bodyPr wrap="square">
-            <a:spAutoFit/>
-          </a:bodyPr>
-          <a:lstStyle/>
-          <a:p>
-            <a:r>
-              <a:rPr lang="en-US" sz="2000" dirty="0"/>
-              <a:t>000000000000000000000000000000000000000000000000000000000000000000000000000000000000000000000000000000000000000000000000000000000000000000000000000000000000000000000000000000000000000000000000000000000000000000000000000000000000000000000000000000000000000000000000000000000000000000000000000000000000000000000000000000000000000000000000000000000000000000000000000000000000000000000000000000000000000000000000000000000000000000000000000000000000000000000000000000000000000000000000000000000000000000000000000000000000000000000000000000000000000000000000000000000000000000000000000000000000000000000000000000000000000000000000000000000000000000000000000000000000000000000000000000000000000000000000000000000000000000000000000000000000000000000000000000000000000000000000000000000000000000000000000000000000000000000000000000000000000000000000000000000000000000000000000000000000000000000000000000000000000000000000000000000000000000000000000000000000000000000000000000000000000000000000000000000000000000000000000000000000000000000000000000000000000000000000000000000000000000000000000000000000000000000000000000000000000000000000000000000000000000000000</a:t>
-            </a:r>
-            <a:endParaRPr lang="en-US" sz="700" dirty="0"/>
+              <a:rPr lang="en-US" sz="3200" b="1" dirty="0">
+                <a:solidFill>
+                  <a:schemeClr val="bg1"/>
+                </a:solidFill>
+                <a:highlight>
+                  <a:srgbClr val="000000"/>
+                </a:highlight>
+                <a:latin typeface="Courier New" panose="02070309020205020404" pitchFamily="49" charset="0"/>
+                <a:cs typeface="Courier New" panose="02070309020205020404" pitchFamily="49" charset="0"/>
+              </a:rPr>
+              <a:t>AA </a:t>
+            </a:r>
+            <a:r>
+              <a:rPr lang="en-US" sz="3200" b="1" dirty="0" err="1">
+                <a:solidFill>
+                  <a:schemeClr val="bg1"/>
+                </a:solidFill>
+                <a:highlight>
+                  <a:srgbClr val="000000"/>
+                </a:highlight>
+                <a:latin typeface="Courier New" panose="02070309020205020404" pitchFamily="49" charset="0"/>
+                <a:cs typeface="Courier New" panose="02070309020205020404" pitchFamily="49" charset="0"/>
+              </a:rPr>
+              <a:t>AA</a:t>
+            </a:r>
+            <a:r>
+              <a:rPr lang="en-US" sz="3200" b="1" dirty="0">
+                <a:solidFill>
+                  <a:schemeClr val="bg1"/>
+                </a:solidFill>
+                <a:highlight>
+                  <a:srgbClr val="000000"/>
+                </a:highlight>
+                <a:latin typeface="Courier New" panose="02070309020205020404" pitchFamily="49" charset="0"/>
+                <a:cs typeface="Courier New" panose="02070309020205020404" pitchFamily="49" charset="0"/>
+              </a:rPr>
+              <a:t> </a:t>
+            </a:r>
+            <a:r>
+              <a:rPr lang="en-US" sz="3200" b="1" dirty="0" err="1">
+                <a:solidFill>
+                  <a:schemeClr val="bg1"/>
+                </a:solidFill>
+                <a:highlight>
+                  <a:srgbClr val="000000"/>
+                </a:highlight>
+                <a:latin typeface="Courier New" panose="02070309020205020404" pitchFamily="49" charset="0"/>
+                <a:cs typeface="Courier New" panose="02070309020205020404" pitchFamily="49" charset="0"/>
+              </a:rPr>
+              <a:t>AA</a:t>
+            </a:r>
+            <a:r>
+              <a:rPr lang="en-US" sz="3200" b="1" dirty="0">
+                <a:solidFill>
+                  <a:schemeClr val="bg1"/>
+                </a:solidFill>
+                <a:highlight>
+                  <a:srgbClr val="000000"/>
+                </a:highlight>
+                <a:latin typeface="Courier New" panose="02070309020205020404" pitchFamily="49" charset="0"/>
+                <a:cs typeface="Courier New" panose="02070309020205020404" pitchFamily="49" charset="0"/>
+              </a:rPr>
+              <a:t> </a:t>
+            </a:r>
+            <a:r>
+              <a:rPr lang="en-US" sz="3200" b="1" dirty="0" err="1">
+                <a:solidFill>
+                  <a:schemeClr val="bg1"/>
+                </a:solidFill>
+                <a:highlight>
+                  <a:srgbClr val="000000"/>
+                </a:highlight>
+                <a:latin typeface="Courier New" panose="02070309020205020404" pitchFamily="49" charset="0"/>
+                <a:cs typeface="Courier New" panose="02070309020205020404" pitchFamily="49" charset="0"/>
+              </a:rPr>
+              <a:t>AA</a:t>
+            </a:r>
+            <a:r>
+              <a:rPr lang="en-US" sz="3200" b="1" dirty="0">
+                <a:solidFill>
+                  <a:schemeClr val="bg1"/>
+                </a:solidFill>
+                <a:latin typeface="Courier New" panose="02070309020205020404" pitchFamily="49" charset="0"/>
+                <a:cs typeface="Courier New" panose="02070309020205020404" pitchFamily="49" charset="0"/>
+              </a:rPr>
+              <a:t> </a:t>
+            </a:r>
+            <a:r>
+              <a:rPr lang="en-US" sz="3200" b="1" dirty="0" err="1">
+                <a:solidFill>
+                  <a:schemeClr val="bg1"/>
+                </a:solidFill>
+                <a:highlight>
+                  <a:srgbClr val="000000"/>
+                </a:highlight>
+                <a:latin typeface="Courier New" panose="02070309020205020404" pitchFamily="49" charset="0"/>
+                <a:cs typeface="Courier New" panose="02070309020205020404" pitchFamily="49" charset="0"/>
+              </a:rPr>
+              <a:t>AA</a:t>
+            </a:r>
+            <a:r>
+              <a:rPr lang="en-US" sz="3200" b="1" dirty="0">
+                <a:solidFill>
+                  <a:schemeClr val="bg1"/>
+                </a:solidFill>
+                <a:highlight>
+                  <a:srgbClr val="000000"/>
+                </a:highlight>
+                <a:latin typeface="Courier New" panose="02070309020205020404" pitchFamily="49" charset="0"/>
+                <a:cs typeface="Courier New" panose="02070309020205020404" pitchFamily="49" charset="0"/>
+              </a:rPr>
+              <a:t> </a:t>
+            </a:r>
+            <a:r>
+              <a:rPr lang="en-US" sz="3200" b="1" dirty="0" err="1">
+                <a:solidFill>
+                  <a:schemeClr val="bg1"/>
+                </a:solidFill>
+                <a:highlight>
+                  <a:srgbClr val="000000"/>
+                </a:highlight>
+                <a:latin typeface="Courier New" panose="02070309020205020404" pitchFamily="49" charset="0"/>
+                <a:cs typeface="Courier New" panose="02070309020205020404" pitchFamily="49" charset="0"/>
+              </a:rPr>
+              <a:t>AA</a:t>
+            </a:r>
+            <a:r>
+              <a:rPr lang="en-US" sz="3200" b="1" dirty="0">
+                <a:solidFill>
+                  <a:schemeClr val="bg1"/>
+                </a:solidFill>
+                <a:highlight>
+                  <a:srgbClr val="000000"/>
+                </a:highlight>
+                <a:latin typeface="Courier New" panose="02070309020205020404" pitchFamily="49" charset="0"/>
+                <a:cs typeface="Courier New" panose="02070309020205020404" pitchFamily="49" charset="0"/>
+              </a:rPr>
+              <a:t> </a:t>
+            </a:r>
+            <a:r>
+              <a:rPr lang="en-US" sz="3200" b="1" dirty="0" err="1">
+                <a:solidFill>
+                  <a:schemeClr val="bg1"/>
+                </a:solidFill>
+                <a:highlight>
+                  <a:srgbClr val="000000"/>
+                </a:highlight>
+                <a:latin typeface="Courier New" panose="02070309020205020404" pitchFamily="49" charset="0"/>
+                <a:cs typeface="Courier New" panose="02070309020205020404" pitchFamily="49" charset="0"/>
+              </a:rPr>
+              <a:t>AA</a:t>
+            </a:r>
+            <a:r>
+              <a:rPr lang="en-US" sz="3200" b="1" dirty="0">
+                <a:solidFill>
+                  <a:schemeClr val="bg1"/>
+                </a:solidFill>
+                <a:highlight>
+                  <a:srgbClr val="000000"/>
+                </a:highlight>
+                <a:latin typeface="Courier New" panose="02070309020205020404" pitchFamily="49" charset="0"/>
+                <a:cs typeface="Courier New" panose="02070309020205020404" pitchFamily="49" charset="0"/>
+              </a:rPr>
+              <a:t> </a:t>
+            </a:r>
+            <a:r>
+              <a:rPr lang="en-US" sz="3200" b="1" dirty="0" err="1">
+                <a:solidFill>
+                  <a:schemeClr val="bg1"/>
+                </a:solidFill>
+                <a:highlight>
+                  <a:srgbClr val="000000"/>
+                </a:highlight>
+                <a:latin typeface="Courier New" panose="02070309020205020404" pitchFamily="49" charset="0"/>
+                <a:cs typeface="Courier New" panose="02070309020205020404" pitchFamily="49" charset="0"/>
+              </a:rPr>
+              <a:t>AA</a:t>
+            </a:r>
+            <a:r>
+              <a:rPr lang="en-US" sz="3200" b="1" dirty="0">
+                <a:solidFill>
+                  <a:schemeClr val="bg1"/>
+                </a:solidFill>
+                <a:latin typeface="Courier New" panose="02070309020205020404" pitchFamily="49" charset="0"/>
+                <a:cs typeface="Courier New" panose="02070309020205020404" pitchFamily="49" charset="0"/>
+              </a:rPr>
+              <a:t> </a:t>
+            </a:r>
+            <a:r>
+              <a:rPr lang="en-US" sz="3200" b="1" dirty="0" err="1">
+                <a:solidFill>
+                  <a:schemeClr val="bg1"/>
+                </a:solidFill>
+                <a:highlight>
+                  <a:srgbClr val="000000"/>
+                </a:highlight>
+                <a:latin typeface="Courier New" panose="02070309020205020404" pitchFamily="49" charset="0"/>
+                <a:cs typeface="Courier New" panose="02070309020205020404" pitchFamily="49" charset="0"/>
+              </a:rPr>
+              <a:t>AA</a:t>
+            </a:r>
+            <a:r>
+              <a:rPr lang="en-US" sz="3200" b="1" dirty="0">
+                <a:solidFill>
+                  <a:schemeClr val="bg1"/>
+                </a:solidFill>
+                <a:highlight>
+                  <a:srgbClr val="000000"/>
+                </a:highlight>
+                <a:latin typeface="Courier New" panose="02070309020205020404" pitchFamily="49" charset="0"/>
+                <a:cs typeface="Courier New" panose="02070309020205020404" pitchFamily="49" charset="0"/>
+              </a:rPr>
+              <a:t> </a:t>
+            </a:r>
+            <a:r>
+              <a:rPr lang="en-US" sz="3200" b="1" dirty="0" err="1">
+                <a:solidFill>
+                  <a:schemeClr val="bg1"/>
+                </a:solidFill>
+                <a:highlight>
+                  <a:srgbClr val="000000"/>
+                </a:highlight>
+                <a:latin typeface="Courier New" panose="02070309020205020404" pitchFamily="49" charset="0"/>
+                <a:cs typeface="Courier New" panose="02070309020205020404" pitchFamily="49" charset="0"/>
+              </a:rPr>
+              <a:t>AA</a:t>
+            </a:r>
+            <a:r>
+              <a:rPr lang="en-US" sz="3200" b="1" dirty="0">
+                <a:solidFill>
+                  <a:schemeClr val="bg1"/>
+                </a:solidFill>
+                <a:highlight>
+                  <a:srgbClr val="000000"/>
+                </a:highlight>
+                <a:latin typeface="Courier New" panose="02070309020205020404" pitchFamily="49" charset="0"/>
+                <a:cs typeface="Courier New" panose="02070309020205020404" pitchFamily="49" charset="0"/>
+              </a:rPr>
+              <a:t> </a:t>
+            </a:r>
+            <a:r>
+              <a:rPr lang="fi-FI" sz="3200" b="1" dirty="0">
+                <a:highlight>
+                  <a:srgbClr val="FFFF00"/>
+                </a:highlight>
+                <a:latin typeface="Courier New" panose="02070309020205020404" pitchFamily="49" charset="0"/>
+                <a:cs typeface="Courier New" panose="02070309020205020404" pitchFamily="49" charset="0"/>
+              </a:rPr>
+              <a:t>00</a:t>
+            </a:r>
+            <a:r>
+              <a:rPr lang="fi-FI" sz="3200" b="1" dirty="0">
+                <a:solidFill>
+                  <a:schemeClr val="bg1"/>
+                </a:solidFill>
+                <a:highlight>
+                  <a:srgbClr val="000000"/>
+                </a:highlight>
+                <a:latin typeface="Courier New" panose="02070309020205020404" pitchFamily="49" charset="0"/>
+                <a:cs typeface="Courier New" panose="02070309020205020404" pitchFamily="49" charset="0"/>
+              </a:rPr>
+              <a:t> </a:t>
+            </a:r>
+            <a:r>
+              <a:rPr lang="fi-FI" sz="3200" b="1" dirty="0">
+                <a:highlight>
+                  <a:srgbClr val="FFFF00"/>
+                </a:highlight>
+                <a:latin typeface="Courier New" panose="02070309020205020404" pitchFamily="49" charset="0"/>
+                <a:cs typeface="Courier New" panose="02070309020205020404" pitchFamily="49" charset="0"/>
+              </a:rPr>
+              <a:t>00</a:t>
+            </a:r>
+            <a:r>
+              <a:rPr lang="fi-FI" sz="3200" b="1" dirty="0">
+                <a:solidFill>
+                  <a:schemeClr val="bg1"/>
+                </a:solidFill>
+                <a:latin typeface="Courier New" panose="02070309020205020404" pitchFamily="49" charset="0"/>
+                <a:cs typeface="Courier New" panose="02070309020205020404" pitchFamily="49" charset="0"/>
+              </a:rPr>
+              <a:t> </a:t>
+            </a:r>
+            <a:r>
+              <a:rPr lang="fi-FI" sz="3200" b="1" dirty="0">
+                <a:solidFill>
+                  <a:schemeClr val="bg1"/>
+                </a:solidFill>
+                <a:highlight>
+                  <a:srgbClr val="000000"/>
+                </a:highlight>
+                <a:latin typeface="Courier New" panose="02070309020205020404" pitchFamily="49" charset="0"/>
+                <a:cs typeface="Courier New" panose="02070309020205020404" pitchFamily="49" charset="0"/>
+              </a:rPr>
+              <a:t>AA AA AA AA</a:t>
+            </a:r>
+            <a:r>
+              <a:rPr lang="fi-FI" sz="3200" b="1" dirty="0">
+                <a:latin typeface="Courier New" panose="02070309020205020404" pitchFamily="49" charset="0"/>
+                <a:cs typeface="Courier New" panose="02070309020205020404" pitchFamily="49" charset="0"/>
+              </a:rPr>
+              <a:t> </a:t>
+            </a:r>
+            <a:r>
+              <a:rPr lang="fi-FI" sz="3200" b="1" dirty="0">
+                <a:latin typeface="Courier New" panose="02070309020205020404" pitchFamily="49" charset="0"/>
+                <a:cs typeface="Courier New" panose="02070309020205020404" pitchFamily="49" charset="0"/>
+              </a:rPr>
+              <a:t>AA AA AA AA AA AA AA AA AA AA AA AA AA AA AA AA AA AA AA AA AA AA AA AA AA AA AA AA AA AA AA AA AA AA AA AA AA AA AA AA AA AA AA AA AA AA AA AA AA AA AA AA AA AA AA AA AA AA AA AA AA AA AA AA AA AA AA AA AA AA AA AA AA AA AA AA AA AA AA AA AA AA AA AA AA AA AA AA AA AA AA AA AA AA </a:t>
+            </a:r>
+            <a:r>
+              <a:rPr lang="fi-FI" sz="3200" b="1" dirty="0">
+                <a:highlight>
+                  <a:srgbClr val="FFFF00"/>
+                </a:highlight>
+                <a:latin typeface="Courier New" panose="02070309020205020404" pitchFamily="49" charset="0"/>
+                <a:cs typeface="Courier New" panose="02070309020205020404" pitchFamily="49" charset="0"/>
+              </a:rPr>
+              <a:t>00</a:t>
+            </a:r>
+            <a:r>
+              <a:rPr lang="fi-FI" sz="3200" b="1" dirty="0">
+                <a:highlight>
+                  <a:srgbClr val="000000"/>
+                </a:highlight>
+                <a:latin typeface="Courier New" panose="02070309020205020404" pitchFamily="49" charset="0"/>
+                <a:cs typeface="Courier New" panose="02070309020205020404" pitchFamily="49" charset="0"/>
+              </a:rPr>
+              <a:t> </a:t>
+            </a:r>
+            <a:r>
+              <a:rPr lang="fi-FI" sz="3200" b="1" dirty="0">
+                <a:highlight>
+                  <a:srgbClr val="FFFF00"/>
+                </a:highlight>
+                <a:latin typeface="Courier New" panose="02070309020205020404" pitchFamily="49" charset="0"/>
+                <a:cs typeface="Courier New" panose="02070309020205020404" pitchFamily="49" charset="0"/>
+              </a:rPr>
+              <a:t>00</a:t>
+            </a:r>
+            <a:r>
+              <a:rPr lang="fi-FI" sz="3200" b="1" dirty="0">
+                <a:highlight>
+                  <a:srgbClr val="000000"/>
+                </a:highlight>
+                <a:latin typeface="Courier New" panose="02070309020205020404" pitchFamily="49" charset="0"/>
+                <a:cs typeface="Courier New" panose="02070309020205020404" pitchFamily="49" charset="0"/>
+              </a:rPr>
+              <a:t> </a:t>
+            </a:r>
+            <a:r>
+              <a:rPr lang="fi-FI" sz="3200" b="1" dirty="0">
+                <a:solidFill>
+                  <a:schemeClr val="bg1"/>
+                </a:solidFill>
+                <a:highlight>
+                  <a:srgbClr val="000000"/>
+                </a:highlight>
+                <a:latin typeface="Courier New" panose="02070309020205020404" pitchFamily="49" charset="0"/>
+                <a:cs typeface="Courier New" panose="02070309020205020404" pitchFamily="49" charset="0"/>
+              </a:rPr>
+              <a:t>AA AA</a:t>
+            </a:r>
+            <a:r>
+              <a:rPr lang="fi-FI" sz="3200" b="1" dirty="0">
+                <a:solidFill>
+                  <a:schemeClr val="bg1"/>
+                </a:solidFill>
+                <a:latin typeface="Courier New" panose="02070309020205020404" pitchFamily="49" charset="0"/>
+                <a:cs typeface="Courier New" panose="02070309020205020404" pitchFamily="49" charset="0"/>
+              </a:rPr>
+              <a:t> </a:t>
+            </a:r>
+            <a:r>
+              <a:rPr lang="fi-FI" sz="3200" b="1" dirty="0">
+                <a:solidFill>
+                  <a:schemeClr val="bg1"/>
+                </a:solidFill>
+                <a:highlight>
+                  <a:srgbClr val="000000"/>
+                </a:highlight>
+                <a:latin typeface="Courier New" panose="02070309020205020404" pitchFamily="49" charset="0"/>
+                <a:cs typeface="Courier New" panose="02070309020205020404" pitchFamily="49" charset="0"/>
+              </a:rPr>
+              <a:t>AA AA AA AA</a:t>
+            </a:r>
+            <a:r>
+              <a:rPr lang="fi-FI" sz="3200" b="1" dirty="0">
+                <a:solidFill>
+                  <a:schemeClr val="bg1"/>
+                </a:solidFill>
+                <a:latin typeface="Courier New" panose="02070309020205020404" pitchFamily="49" charset="0"/>
+                <a:cs typeface="Courier New" panose="02070309020205020404" pitchFamily="49" charset="0"/>
+              </a:rPr>
+              <a:t> </a:t>
+            </a:r>
+            <a:r>
+              <a:rPr lang="fi-FI" sz="3200" b="1" dirty="0">
+                <a:solidFill>
+                  <a:schemeClr val="bg1"/>
+                </a:solidFill>
+                <a:highlight>
+                  <a:srgbClr val="000000"/>
+                </a:highlight>
+                <a:latin typeface="Courier New" panose="02070309020205020404" pitchFamily="49" charset="0"/>
+                <a:cs typeface="Courier New" panose="02070309020205020404" pitchFamily="49" charset="0"/>
+              </a:rPr>
+              <a:t>AA AA AA AA</a:t>
+            </a:r>
+            <a:r>
+              <a:rPr lang="fi-FI" sz="3200" b="1" dirty="0">
+                <a:solidFill>
+                  <a:schemeClr val="bg1"/>
+                </a:solidFill>
+                <a:latin typeface="Courier New" panose="02070309020205020404" pitchFamily="49" charset="0"/>
+                <a:cs typeface="Courier New" panose="02070309020205020404" pitchFamily="49" charset="0"/>
+              </a:rPr>
+              <a:t> </a:t>
+            </a:r>
+            <a:r>
+              <a:rPr lang="fi-FI" sz="3200" b="1" dirty="0">
+                <a:solidFill>
+                  <a:schemeClr val="bg1"/>
+                </a:solidFill>
+                <a:highlight>
+                  <a:srgbClr val="000000"/>
+                </a:highlight>
+                <a:latin typeface="Courier New" panose="02070309020205020404" pitchFamily="49" charset="0"/>
+                <a:cs typeface="Courier New" panose="02070309020205020404" pitchFamily="49" charset="0"/>
+              </a:rPr>
+              <a:t>AA AA AA AA</a:t>
+            </a:r>
+            <a:r>
+              <a:rPr lang="fi-FI" sz="3200" b="1" dirty="0">
+                <a:solidFill>
+                  <a:schemeClr val="bg1"/>
+                </a:solidFill>
+                <a:latin typeface="Courier New" panose="02070309020205020404" pitchFamily="49" charset="0"/>
+                <a:cs typeface="Courier New" panose="02070309020205020404" pitchFamily="49" charset="0"/>
+              </a:rPr>
+              <a:t> </a:t>
+            </a:r>
+            <a:r>
+              <a:rPr lang="fi-FI" sz="3200" b="1" dirty="0">
+                <a:solidFill>
+                  <a:schemeClr val="bg1"/>
+                </a:solidFill>
+                <a:highlight>
+                  <a:srgbClr val="000000"/>
+                </a:highlight>
+                <a:latin typeface="Courier New" panose="02070309020205020404" pitchFamily="49" charset="0"/>
+                <a:cs typeface="Courier New" panose="02070309020205020404" pitchFamily="49" charset="0"/>
+              </a:rPr>
+              <a:t>AA AA AA AA</a:t>
+            </a:r>
+            <a:r>
+              <a:rPr lang="fi-FI" sz="3200" b="1" dirty="0">
+                <a:solidFill>
+                  <a:schemeClr val="bg1"/>
+                </a:solidFill>
+                <a:highlight>
+                  <a:srgbClr val="000080"/>
+                </a:highlight>
+                <a:latin typeface="Courier New" panose="02070309020205020404" pitchFamily="49" charset="0"/>
+                <a:cs typeface="Courier New" panose="02070309020205020404" pitchFamily="49" charset="0"/>
+              </a:rPr>
+              <a:t> </a:t>
+            </a:r>
+            <a:endParaRPr lang="en-US" sz="3200" b="1" dirty="0">
+              <a:solidFill>
+                <a:schemeClr val="bg1"/>
+              </a:solidFill>
+              <a:highlight>
+                <a:srgbClr val="000080"/>
+              </a:highlight>
+              <a:latin typeface="Courier New" panose="02070309020205020404" pitchFamily="49" charset="0"/>
+              <a:cs typeface="Courier New" panose="02070309020205020404" pitchFamily="49" charset="0"/>
+            </a:endParaRPr>
           </a:p>
         </p:txBody>
       </p:sp>
@@ -5403,16 +6012,248 @@
           </a:prstGeom>
         </p:spPr>
       </p:pic>
+      <p:sp>
+        <p:nvSpPr>
+          <p:cNvPr id="27" name="Rectangle 26"/>
+          <p:cNvSpPr/>
+          <p:nvPr/>
+        </p:nvSpPr>
+        <p:spPr>
+          <a:xfrm>
+            <a:off x="7406767" y="16764000"/>
+            <a:ext cx="32409079" cy="1569660"/>
+          </a:xfrm>
+          <a:prstGeom prst="rect">
+            <a:avLst/>
+          </a:prstGeom>
+          <a:noFill/>
+          <a:ln>
+            <a:noFill/>
+          </a:ln>
+        </p:spPr>
+        <p:txBody>
+          <a:bodyPr wrap="square">
+            <a:spAutoFit/>
+          </a:bodyPr>
+          <a:lstStyle/>
+          <a:p>
+            <a:r>
+              <a:rPr lang="en-US" sz="3200" b="1" dirty="0">
+                <a:latin typeface="Courier New" panose="02070309020205020404" pitchFamily="49" charset="0"/>
+                <a:cs typeface="Courier New" panose="02070309020205020404" pitchFamily="49" charset="0"/>
+              </a:rPr>
+              <a:t>AA </a:t>
+            </a:r>
+            <a:r>
+              <a:rPr lang="en-US" sz="3200" b="1" dirty="0" err="1">
+                <a:latin typeface="Courier New" panose="02070309020205020404" pitchFamily="49" charset="0"/>
+                <a:cs typeface="Courier New" panose="02070309020205020404" pitchFamily="49" charset="0"/>
+              </a:rPr>
+              <a:t>AA</a:t>
+            </a:r>
+            <a:r>
+              <a:rPr lang="en-US" sz="3200" b="1" dirty="0">
+                <a:latin typeface="Courier New" panose="02070309020205020404" pitchFamily="49" charset="0"/>
+                <a:cs typeface="Courier New" panose="02070309020205020404" pitchFamily="49" charset="0"/>
+              </a:rPr>
+              <a:t> </a:t>
+            </a:r>
+            <a:r>
+              <a:rPr lang="en-US" sz="3200" b="1" dirty="0" err="1">
+                <a:latin typeface="Courier New" panose="02070309020205020404" pitchFamily="49" charset="0"/>
+                <a:cs typeface="Courier New" panose="02070309020205020404" pitchFamily="49" charset="0"/>
+              </a:rPr>
+              <a:t>AA</a:t>
+            </a:r>
+            <a:r>
+              <a:rPr lang="en-US" sz="3200" b="1" dirty="0">
+                <a:latin typeface="Courier New" panose="02070309020205020404" pitchFamily="49" charset="0"/>
+                <a:cs typeface="Courier New" panose="02070309020205020404" pitchFamily="49" charset="0"/>
+              </a:rPr>
+              <a:t> </a:t>
+            </a:r>
+            <a:r>
+              <a:rPr lang="en-US" sz="3200" b="1" dirty="0" err="1">
+                <a:latin typeface="Courier New" panose="02070309020205020404" pitchFamily="49" charset="0"/>
+                <a:cs typeface="Courier New" panose="02070309020205020404" pitchFamily="49" charset="0"/>
+              </a:rPr>
+              <a:t>AA</a:t>
+            </a:r>
+            <a:r>
+              <a:rPr lang="en-US" sz="3200" b="1" dirty="0">
+                <a:latin typeface="Courier New" panose="02070309020205020404" pitchFamily="49" charset="0"/>
+                <a:cs typeface="Courier New" panose="02070309020205020404" pitchFamily="49" charset="0"/>
+              </a:rPr>
+              <a:t> </a:t>
+            </a:r>
+            <a:r>
+              <a:rPr lang="en-US" sz="3200" b="1" dirty="0" err="1">
+                <a:latin typeface="Courier New" panose="02070309020205020404" pitchFamily="49" charset="0"/>
+                <a:cs typeface="Courier New" panose="02070309020205020404" pitchFamily="49" charset="0"/>
+              </a:rPr>
+              <a:t>AA</a:t>
+            </a:r>
+            <a:r>
+              <a:rPr lang="en-US" sz="3200" b="1" dirty="0">
+                <a:latin typeface="Courier New" panose="02070309020205020404" pitchFamily="49" charset="0"/>
+                <a:cs typeface="Courier New" panose="02070309020205020404" pitchFamily="49" charset="0"/>
+              </a:rPr>
+              <a:t> </a:t>
+            </a:r>
+            <a:r>
+              <a:rPr lang="en-US" sz="3200" b="1" dirty="0" err="1">
+                <a:latin typeface="Courier New" panose="02070309020205020404" pitchFamily="49" charset="0"/>
+                <a:cs typeface="Courier New" panose="02070309020205020404" pitchFamily="49" charset="0"/>
+              </a:rPr>
+              <a:t>AA</a:t>
+            </a:r>
+            <a:r>
+              <a:rPr lang="en-US" sz="3200" b="1" dirty="0">
+                <a:latin typeface="Courier New" panose="02070309020205020404" pitchFamily="49" charset="0"/>
+                <a:cs typeface="Courier New" panose="02070309020205020404" pitchFamily="49" charset="0"/>
+              </a:rPr>
+              <a:t> </a:t>
+            </a:r>
+            <a:r>
+              <a:rPr lang="en-US" sz="3200" b="1" dirty="0" err="1">
+                <a:latin typeface="Courier New" panose="02070309020205020404" pitchFamily="49" charset="0"/>
+                <a:cs typeface="Courier New" panose="02070309020205020404" pitchFamily="49" charset="0"/>
+              </a:rPr>
+              <a:t>AA</a:t>
+            </a:r>
+            <a:r>
+              <a:rPr lang="en-US" sz="3200" b="1" dirty="0">
+                <a:latin typeface="Courier New" panose="02070309020205020404" pitchFamily="49" charset="0"/>
+                <a:cs typeface="Courier New" panose="02070309020205020404" pitchFamily="49" charset="0"/>
+              </a:rPr>
+              <a:t> </a:t>
+            </a:r>
+            <a:r>
+              <a:rPr lang="en-US" sz="3200" b="1" dirty="0" err="1">
+                <a:latin typeface="Courier New" panose="02070309020205020404" pitchFamily="49" charset="0"/>
+                <a:cs typeface="Courier New" panose="02070309020205020404" pitchFamily="49" charset="0"/>
+              </a:rPr>
+              <a:t>AA</a:t>
+            </a:r>
+            <a:r>
+              <a:rPr lang="en-US" sz="3200" b="1" dirty="0">
+                <a:latin typeface="Courier New" panose="02070309020205020404" pitchFamily="49" charset="0"/>
+                <a:cs typeface="Courier New" panose="02070309020205020404" pitchFamily="49" charset="0"/>
+              </a:rPr>
+              <a:t> </a:t>
+            </a:r>
+            <a:r>
+              <a:rPr lang="en-US" sz="3200" b="1" dirty="0" err="1">
+                <a:latin typeface="Courier New" panose="02070309020205020404" pitchFamily="49" charset="0"/>
+                <a:cs typeface="Courier New" panose="02070309020205020404" pitchFamily="49" charset="0"/>
+              </a:rPr>
+              <a:t>AA</a:t>
+            </a:r>
+            <a:r>
+              <a:rPr lang="en-US" sz="3200" b="1" dirty="0">
+                <a:latin typeface="Courier New" panose="02070309020205020404" pitchFamily="49" charset="0"/>
+                <a:cs typeface="Courier New" panose="02070309020205020404" pitchFamily="49" charset="0"/>
+              </a:rPr>
+              <a:t> </a:t>
+            </a:r>
+            <a:r>
+              <a:rPr lang="en-US" sz="3200" b="1" dirty="0" err="1">
+                <a:latin typeface="Courier New" panose="02070309020205020404" pitchFamily="49" charset="0"/>
+                <a:cs typeface="Courier New" panose="02070309020205020404" pitchFamily="49" charset="0"/>
+              </a:rPr>
+              <a:t>AA</a:t>
+            </a:r>
+            <a:r>
+              <a:rPr lang="en-US" sz="3200" b="1" dirty="0">
+                <a:latin typeface="Courier New" panose="02070309020205020404" pitchFamily="49" charset="0"/>
+                <a:cs typeface="Courier New" panose="02070309020205020404" pitchFamily="49" charset="0"/>
+              </a:rPr>
+              <a:t> </a:t>
+            </a:r>
+            <a:r>
+              <a:rPr lang="fi-FI" sz="3200" b="1" dirty="0">
+                <a:latin typeface="Courier New" panose="02070309020205020404" pitchFamily="49" charset="0"/>
+                <a:cs typeface="Courier New" panose="02070309020205020404" pitchFamily="49" charset="0"/>
+              </a:rPr>
+              <a:t>AA AA AA AA AA AA AA AA AA AA AA AA AA AA AA AA AA AA AA AA AA AA AA AA AA AA AA AA AA AA AA AA AA AA AA AA AA AA AA AA AA AA AA AA AA AA AA AA AA AA AA AA AA AA AA AA AA AA AA AA AA AA AA AA AA AA AA AA AA AA AA AA AA AA AA AA AA AA AA AA AA AA AA AA AA AA AA AA AA AA AA AA AA AA AA AA AA AA AA AA AA AA AA AA AA AA AA AA AA AA AA AA AA AA AA AA AA AA AA AA </a:t>
+            </a:r>
+            <a:endParaRPr lang="en-US" sz="3200" b="1" dirty="0">
+              <a:latin typeface="Courier New" panose="02070309020205020404" pitchFamily="49" charset="0"/>
+              <a:cs typeface="Courier New" panose="02070309020205020404" pitchFamily="49" charset="0"/>
+            </a:endParaRPr>
+          </a:p>
+        </p:txBody>
+      </p:sp>
+    </p:spTree>
+    <p:extLst>
+      <p:ext uri="{BB962C8B-B14F-4D97-AF65-F5344CB8AC3E}">
+        <p14:creationId xmlns:p14="http://schemas.microsoft.com/office/powerpoint/2010/main" val="1647237238"/>
+      </p:ext>
+    </p:extLst>
+  </p:cSld>
+  <p:clrMapOvr>
+    <a:masterClrMapping/>
+  </p:clrMapOvr>
+</p:sld>
+</file>
+
+<file path=ppt/slides/slide2.xml><?xml version="1.0" encoding="utf-8"?>
+<p:sld xmlns:a="http://schemas.openxmlformats.org/drawingml/2006/main" xmlns:r="http://schemas.openxmlformats.org/officeDocument/2006/relationships" xmlns:p="http://schemas.openxmlformats.org/presentationml/2006/main">
+  <p:cSld>
+    <p:bg>
+      <p:bgPr>
+        <a:gradFill>
+          <a:gsLst>
+            <a:gs pos="0">
+              <a:srgbClr val="00B050"/>
+            </a:gs>
+            <a:gs pos="25000">
+              <a:srgbClr val="92D050"/>
+            </a:gs>
+            <a:gs pos="75000">
+              <a:schemeClr val="accent5">
+                <a:lumMod val="60000"/>
+                <a:lumOff val="40000"/>
+              </a:schemeClr>
+            </a:gs>
+            <a:gs pos="50000">
+              <a:schemeClr val="bg1">
+                <a:lumMod val="95000"/>
+              </a:schemeClr>
+            </a:gs>
+            <a:gs pos="100000">
+              <a:srgbClr val="00B0F0"/>
+            </a:gs>
+          </a:gsLst>
+          <a:lin ang="0" scaled="1"/>
+        </a:gradFill>
+        <a:effectLst/>
+      </p:bgPr>
+    </p:bg>
+    <p:spTree>
+      <p:nvGrpSpPr>
+        <p:cNvPr id="1" name=""/>
+        <p:cNvGrpSpPr/>
+        <p:nvPr/>
+      </p:nvGrpSpPr>
+      <p:grpSpPr>
+        <a:xfrm>
+          <a:off x="0" y="0"/>
+          <a:ext cx="0" cy="0"/>
+          <a:chOff x="0" y="0"/>
+          <a:chExt cx="0" cy="0"/>
+        </a:xfrm>
+      </p:grpSpPr>
       <p:pic>
         <p:nvPicPr>
-          <p:cNvPr id="3" name="Picture 2"/>
+          <p:cNvPr id="36" name="Picture 35"/>
           <p:cNvPicPr>
             <a:picLocks noChangeAspect="1"/>
           </p:cNvPicPr>
           <p:nvPr/>
         </p:nvPicPr>
         <p:blipFill>
-          <a:blip r:embed="rId9">
+          <a:blip r:embed="rId3">
             <a:extLst>
               <a:ext uri="{28A0092B-C50C-407E-A947-70E740481C1C}">
                 <a14:useLocalDpi xmlns:a14="http://schemas.microsoft.com/office/drawing/2010/main" val="0"/>
@@ -5425,188 +6266,45 @@
         </p:blipFill>
         <p:spPr>
           <a:xfrm>
-            <a:off x="18194788" y="1872753"/>
-            <a:ext cx="4343400" cy="3600450"/>
+            <a:off x="29794200" y="11582400"/>
+            <a:ext cx="5127475" cy="5334000"/>
           </a:xfrm>
           <a:prstGeom prst="rect">
             <a:avLst/>
           </a:prstGeom>
-        </p:spPr>
-      </p:pic>
-      <p:sp>
-        <p:nvSpPr>
-          <p:cNvPr id="21" name="Text Box 23"/>
-          <p:cNvSpPr txBox="1">
-            <a:spLocks noChangeArrowheads="1"/>
-          </p:cNvSpPr>
-          <p:nvPr/>
-        </p:nvSpPr>
-        <p:spPr bwMode="auto">
-          <a:xfrm>
-            <a:off x="18150543" y="5449109"/>
-            <a:ext cx="4343400" cy="510314"/>
-          </a:xfrm>
-          <a:prstGeom prst="rect">
-            <a:avLst/>
-          </a:prstGeom>
-          <a:noFill/>
           <a:ln>
             <a:noFill/>
           </a:ln>
-          <a:effectLst/>
-          <a:extLst>
-            <a:ext uri="{909E8E84-426E-40DD-AFC4-6F175D3DCCD1}">
-              <a14:hiddenFill xmlns:a14="http://schemas.microsoft.com/office/drawing/2010/main">
-                <a:solidFill>
-                  <a:schemeClr val="accent1"/>
-                </a:solidFill>
-              </a14:hiddenFill>
-            </a:ext>
-            <a:ext uri="{91240B29-F687-4F45-9708-019B960494DF}">
-              <a14:hiddenLine xmlns:a14="http://schemas.microsoft.com/office/drawing/2010/main" w="9525">
-                <a:solidFill>
-                  <a:schemeClr val="tx1"/>
-                </a:solidFill>
-                <a:prstDash val="sysDot"/>
-                <a:miter lim="800000"/>
-                <a:headEnd/>
-                <a:tailEnd/>
-              </a14:hiddenLine>
-            </a:ext>
-            <a:ext uri="{AF507438-7753-43E0-B8FC-AC1667EBCBE1}">
-              <a14:hiddenEffects xmlns:a14="http://schemas.microsoft.com/office/drawing/2010/main">
-                <a:effectLst>
-                  <a:outerShdw dist="35921" dir="2700000" algn="ctr" rotWithShape="0">
-                    <a:schemeClr val="bg2"/>
-                  </a:outerShdw>
-                </a:effectLst>
-              </a14:hiddenEffects>
-            </a:ext>
-          </a:extLst>
+          <a:effectLst>
+            <a:outerShdw blurRad="190500" dist="228600" dir="2700000" algn="ctr">
+              <a:srgbClr val="000000">
+                <a:alpha val="30000"/>
+              </a:srgbClr>
+            </a:outerShdw>
+          </a:effectLst>
+          <a:scene3d>
+            <a:camera prst="orthographicFront">
+              <a:rot lat="0" lon="0" rev="0"/>
+            </a:camera>
+            <a:lightRig rig="glow" dir="t">
+              <a:rot lat="0" lon="0" rev="4800000"/>
+            </a:lightRig>
+          </a:scene3d>
+          <a:sp3d prstMaterial="matte">
+            <a:bevelT w="127000" h="63500"/>
+          </a:sp3d>
         </p:spPr>
-        <p:txBody>
-          <a:bodyPr wrap="none" lIns="228600" tIns="228600" rIns="228600" bIns="228600" anchor="ctr" anchorCtr="1"/>
-          <a:lstStyle>
-            <a:lvl1pPr defTabSz="4389438">
-              <a:defRPr>
-                <a:solidFill>
-                  <a:schemeClr val="tx1"/>
-                </a:solidFill>
-                <a:latin typeface="Arial" charset="0"/>
-              </a:defRPr>
-            </a:lvl1pPr>
-            <a:lvl2pPr defTabSz="4389438">
-              <a:defRPr>
-                <a:solidFill>
-                  <a:schemeClr val="tx1"/>
-                </a:solidFill>
-                <a:latin typeface="Arial" charset="0"/>
-              </a:defRPr>
-            </a:lvl2pPr>
-            <a:lvl3pPr defTabSz="4389438">
-              <a:defRPr>
-                <a:solidFill>
-                  <a:schemeClr val="tx1"/>
-                </a:solidFill>
-                <a:latin typeface="Arial" charset="0"/>
-              </a:defRPr>
-            </a:lvl3pPr>
-            <a:lvl4pPr defTabSz="4389438">
-              <a:defRPr>
-                <a:solidFill>
-                  <a:schemeClr val="tx1"/>
-                </a:solidFill>
-                <a:latin typeface="Arial" charset="0"/>
-              </a:defRPr>
-            </a:lvl4pPr>
-            <a:lvl5pPr defTabSz="4389438">
-              <a:defRPr>
-                <a:solidFill>
-                  <a:schemeClr val="tx1"/>
-                </a:solidFill>
-                <a:latin typeface="Arial" charset="0"/>
-              </a:defRPr>
-            </a:lvl5pPr>
-            <a:lvl6pPr defTabSz="4389438" fontAlgn="base">
-              <a:spcBef>
-                <a:spcPct val="0"/>
-              </a:spcBef>
-              <a:spcAft>
-                <a:spcPct val="0"/>
-              </a:spcAft>
-              <a:defRPr>
-                <a:solidFill>
-                  <a:schemeClr val="tx1"/>
-                </a:solidFill>
-                <a:latin typeface="Arial" charset="0"/>
-              </a:defRPr>
-            </a:lvl6pPr>
-            <a:lvl7pPr defTabSz="4389438" fontAlgn="base">
-              <a:spcBef>
-                <a:spcPct val="0"/>
-              </a:spcBef>
-              <a:spcAft>
-                <a:spcPct val="0"/>
-              </a:spcAft>
-              <a:defRPr>
-                <a:solidFill>
-                  <a:schemeClr val="tx1"/>
-                </a:solidFill>
-                <a:latin typeface="Arial" charset="0"/>
-              </a:defRPr>
-            </a:lvl7pPr>
-            <a:lvl8pPr defTabSz="4389438" fontAlgn="base">
-              <a:spcBef>
-                <a:spcPct val="0"/>
-              </a:spcBef>
-              <a:spcAft>
-                <a:spcPct val="0"/>
-              </a:spcAft>
-              <a:defRPr>
-                <a:solidFill>
-                  <a:schemeClr val="tx1"/>
-                </a:solidFill>
-                <a:latin typeface="Arial" charset="0"/>
-              </a:defRPr>
-            </a:lvl8pPr>
-            <a:lvl9pPr defTabSz="4389438" fontAlgn="base">
-              <a:spcBef>
-                <a:spcPct val="0"/>
-              </a:spcBef>
-              <a:spcAft>
-                <a:spcPct val="0"/>
-              </a:spcAft>
-              <a:defRPr>
-                <a:solidFill>
-                  <a:schemeClr val="tx1"/>
-                </a:solidFill>
-                <a:latin typeface="Arial" charset="0"/>
-              </a:defRPr>
-            </a:lvl9pPr>
-          </a:lstStyle>
-          <a:p>
-            <a:pPr algn="ctr"/>
-            <a:r>
-              <a:rPr lang="en-US" sz="2800" dirty="0">
-                <a:latin typeface="Verdana" panose="020B0604030504040204" pitchFamily="34" charset="0"/>
-                <a:ea typeface="Verdana" panose="020B0604030504040204" pitchFamily="34" charset="0"/>
-                <a:cs typeface="Verdana" panose="020B0604030504040204" pitchFamily="34" charset="0"/>
-              </a:rPr>
-              <a:t>Fig. 1</a:t>
-            </a:r>
-          </a:p>
-        </p:txBody>
-      </p:sp>
+      </p:pic>
       <p:pic>
         <p:nvPicPr>
-          <p:cNvPr id="6" name="Picture 5"/>
+          <p:cNvPr id="40" name="Picture 39"/>
           <p:cNvPicPr>
             <a:picLocks noChangeAspect="1"/>
           </p:cNvPicPr>
           <p:nvPr/>
         </p:nvPicPr>
         <p:blipFill>
-          <a:blip r:embed="rId10">
+          <a:blip r:embed="rId4">
             <a:extLst>
               <a:ext uri="{28A0092B-C50C-407E-A947-70E740481C1C}">
                 <a14:useLocalDpi xmlns:a14="http://schemas.microsoft.com/office/drawing/2010/main" val="0"/>
@@ -5619,8 +6317,59 @@
         </p:blipFill>
         <p:spPr>
           <a:xfrm>
-            <a:off x="7467600" y="7943459"/>
-            <a:ext cx="7973538" cy="2800741"/>
+            <a:off x="8382000" y="179691"/>
+            <a:ext cx="5952005" cy="32702614"/>
+          </a:xfrm>
+          <a:prstGeom prst="rect">
+            <a:avLst/>
+          </a:prstGeom>
+          <a:ln>
+            <a:noFill/>
+          </a:ln>
+          <a:effectLst>
+            <a:outerShdw blurRad="190500" dist="228600" dir="2700000" algn="ctr">
+              <a:srgbClr val="000000">
+                <a:alpha val="30000"/>
+              </a:srgbClr>
+            </a:outerShdw>
+          </a:effectLst>
+          <a:scene3d>
+            <a:camera prst="orthographicFront">
+              <a:rot lat="0" lon="0" rev="0"/>
+            </a:camera>
+            <a:lightRig rig="glow" dir="t">
+              <a:rot lat="0" lon="0" rev="4800000"/>
+            </a:lightRig>
+          </a:scene3d>
+          <a:sp3d prstMaterial="matte">
+            <a:bevelT w="127000" h="63500"/>
+          </a:sp3d>
+        </p:spPr>
+      </p:pic>
+      <p:pic>
+        <p:nvPicPr>
+          <p:cNvPr id="6" name="Picture 5"/>
+          <p:cNvPicPr>
+            <a:picLocks noChangeAspect="1"/>
+          </p:cNvPicPr>
+          <p:nvPr/>
+        </p:nvPicPr>
+        <p:blipFill>
+          <a:blip r:embed="rId5">
+            <a:extLst>
+              <a:ext uri="{28A0092B-C50C-407E-A947-70E740481C1C}">
+                <a14:useLocalDpi xmlns:a14="http://schemas.microsoft.com/office/drawing/2010/main" val="0"/>
+              </a:ext>
+            </a:extLst>
+          </a:blip>
+          <a:stretch>
+            <a:fillRect/>
+          </a:stretch>
+        </p:blipFill>
+        <p:spPr>
+          <a:xfrm>
+            <a:off x="16459200" y="22098001"/>
+            <a:ext cx="10946680" cy="3845070"/>
           </a:xfrm>
           <a:prstGeom prst="rect">
             <a:avLst/>
@@ -5636,7 +6385,7 @@
           <p:nvPr/>
         </p:nvPicPr>
         <p:blipFill>
-          <a:blip r:embed="rId11">
+          <a:blip r:embed="rId6">
             <a:extLst>
               <a:ext uri="{28A0092B-C50C-407E-A947-70E740481C1C}">
                 <a14:useLocalDpi xmlns:a14="http://schemas.microsoft.com/office/drawing/2010/main" val="0"/>
@@ -5649,18 +6398,59 @@
         </p:blipFill>
         <p:spPr>
           <a:xfrm>
-            <a:off x="15783829" y="7938543"/>
-            <a:ext cx="6754359" cy="2805657"/>
+            <a:off x="16459200" y="26553138"/>
+            <a:ext cx="10946680" cy="4547082"/>
           </a:xfrm>
           <a:prstGeom prst="rect">
             <a:avLst/>
           </a:prstGeom>
         </p:spPr>
       </p:pic>
+      <p:pic>
+        <p:nvPicPr>
+          <p:cNvPr id="3" name="Picture 2"/>
+          <p:cNvPicPr>
+            <a:picLocks noChangeAspect="1"/>
+          </p:cNvPicPr>
+          <p:nvPr/>
+        </p:nvPicPr>
+        <p:blipFill>
+          <a:blip r:embed="rId7">
+            <a:extLst>
+              <a:ext uri="{28A0092B-C50C-407E-A947-70E740481C1C}">
+                <a14:useLocalDpi xmlns:a14="http://schemas.microsoft.com/office/drawing/2010/main" val="0"/>
+              </a:ext>
+            </a:extLst>
+          </a:blip>
+          <a:stretch>
+            <a:fillRect/>
+          </a:stretch>
+        </p:blipFill>
+        <p:spPr>
+          <a:xfrm>
+            <a:off x="15373117" y="9601200"/>
+            <a:ext cx="13430483" cy="11133163"/>
+          </a:xfrm>
+          <a:prstGeom prst="rect">
+            <a:avLst/>
+          </a:prstGeom>
+          <a:noFill/>
+          <a:ln>
+            <a:noFill/>
+          </a:ln>
+          <a:effectLst>
+            <a:outerShdw blurRad="190500" dist="228600" dir="2700000" algn="ctr">
+              <a:srgbClr val="000000">
+                <a:alpha val="30000"/>
+              </a:srgbClr>
+            </a:outerShdw>
+          </a:effectLst>
+        </p:spPr>
+      </p:pic>
     </p:spTree>
     <p:extLst>
       <p:ext uri="{BB962C8B-B14F-4D97-AF65-F5344CB8AC3E}">
-        <p14:creationId xmlns:p14="http://schemas.microsoft.com/office/powerpoint/2010/main" val="1647237238"/>
+        <p14:creationId xmlns:p14="http://schemas.microsoft.com/office/powerpoint/2010/main" val="3387750735"/>
       </p:ext>
     </p:extLst>
   </p:cSld>

</xml_diff>

<commit_message>
updated poster to focus on lock bits
</commit_message>
<xml_diff>
--- a/Poster Artifacts/Poster.pptx
+++ b/Poster Artifacts/Poster.pptx
@@ -209,7 +209,7 @@
           <a:p>
             <a:fld id="{CAD4E7B3-883E-4909-856A-D4D2FBCEB0AE}" type="datetimeFigureOut">
               <a:rPr lang="en-US" smtClean="0"/>
-              <a:t>2/20/2017</a:t>
+              <a:t>2/22/2017</a:t>
             </a:fld>
             <a:endParaRPr lang="en-US"/>
           </a:p>
@@ -824,7 +824,7 @@
             <a:fld id="{1D8BD707-D9CF-40AE-B4C6-C98DA3205C09}" type="datetimeFigureOut">
               <a:rPr lang="en-US" smtClean="0"/>
               <a:pPr/>
-              <a:t>2/20/2017</a:t>
+              <a:t>2/22/2017</a:t>
             </a:fld>
             <a:endParaRPr lang="en-US"/>
           </a:p>
@@ -989,7 +989,7 @@
             <a:fld id="{1D8BD707-D9CF-40AE-B4C6-C98DA3205C09}" type="datetimeFigureOut">
               <a:rPr lang="en-US" smtClean="0"/>
               <a:pPr/>
-              <a:t>2/20/2017</a:t>
+              <a:t>2/22/2017</a:t>
             </a:fld>
             <a:endParaRPr lang="en-US"/>
           </a:p>
@@ -1164,7 +1164,7 @@
             <a:fld id="{1D8BD707-D9CF-40AE-B4C6-C98DA3205C09}" type="datetimeFigureOut">
               <a:rPr lang="en-US" smtClean="0"/>
               <a:pPr/>
-              <a:t>2/20/2017</a:t>
+              <a:t>2/22/2017</a:t>
             </a:fld>
             <a:endParaRPr lang="en-US"/>
           </a:p>
@@ -1329,7 +1329,7 @@
             <a:fld id="{1D8BD707-D9CF-40AE-B4C6-C98DA3205C09}" type="datetimeFigureOut">
               <a:rPr lang="en-US" smtClean="0"/>
               <a:pPr/>
-              <a:t>2/20/2017</a:t>
+              <a:t>2/22/2017</a:t>
             </a:fld>
             <a:endParaRPr lang="en-US"/>
           </a:p>
@@ -1571,7 +1571,7 @@
             <a:fld id="{1D8BD707-D9CF-40AE-B4C6-C98DA3205C09}" type="datetimeFigureOut">
               <a:rPr lang="en-US" smtClean="0"/>
               <a:pPr/>
-              <a:t>2/20/2017</a:t>
+              <a:t>2/22/2017</a:t>
             </a:fld>
             <a:endParaRPr lang="en-US"/>
           </a:p>
@@ -1853,7 +1853,7 @@
             <a:fld id="{1D8BD707-D9CF-40AE-B4C6-C98DA3205C09}" type="datetimeFigureOut">
               <a:rPr lang="en-US" smtClean="0"/>
               <a:pPr/>
-              <a:t>2/20/2017</a:t>
+              <a:t>2/22/2017</a:t>
             </a:fld>
             <a:endParaRPr lang="en-US"/>
           </a:p>
@@ -2269,7 +2269,7 @@
             <a:fld id="{1D8BD707-D9CF-40AE-B4C6-C98DA3205C09}" type="datetimeFigureOut">
               <a:rPr lang="en-US" smtClean="0"/>
               <a:pPr/>
-              <a:t>2/20/2017</a:t>
+              <a:t>2/22/2017</a:t>
             </a:fld>
             <a:endParaRPr lang="en-US"/>
           </a:p>
@@ -2383,7 +2383,7 @@
             <a:fld id="{1D8BD707-D9CF-40AE-B4C6-C98DA3205C09}" type="datetimeFigureOut">
               <a:rPr lang="en-US" smtClean="0"/>
               <a:pPr/>
-              <a:t>2/20/2017</a:t>
+              <a:t>2/22/2017</a:t>
             </a:fld>
             <a:endParaRPr lang="en-US"/>
           </a:p>
@@ -2475,7 +2475,7 @@
             <a:fld id="{1D8BD707-D9CF-40AE-B4C6-C98DA3205C09}" type="datetimeFigureOut">
               <a:rPr lang="en-US" smtClean="0"/>
               <a:pPr/>
-              <a:t>2/20/2017</a:t>
+              <a:t>2/22/2017</a:t>
             </a:fld>
             <a:endParaRPr lang="en-US"/>
           </a:p>
@@ -2747,7 +2747,7 @@
             <a:fld id="{1D8BD707-D9CF-40AE-B4C6-C98DA3205C09}" type="datetimeFigureOut">
               <a:rPr lang="en-US" smtClean="0"/>
               <a:pPr/>
-              <a:t>2/20/2017</a:t>
+              <a:t>2/22/2017</a:t>
             </a:fld>
             <a:endParaRPr lang="en-US"/>
           </a:p>
@@ -2996,7 +2996,7 @@
             <a:fld id="{1D8BD707-D9CF-40AE-B4C6-C98DA3205C09}" type="datetimeFigureOut">
               <a:rPr lang="en-US" smtClean="0"/>
               <a:pPr/>
-              <a:t>2/20/2017</a:t>
+              <a:t>2/22/2017</a:t>
             </a:fld>
             <a:endParaRPr lang="en-US"/>
           </a:p>
@@ -3204,7 +3204,7 @@
             <a:fld id="{1D8BD707-D9CF-40AE-B4C6-C98DA3205C09}" type="datetimeFigureOut">
               <a:rPr lang="en-US" smtClean="0"/>
               <a:pPr/>
-              <a:t>2/20/2017</a:t>
+              <a:t>2/22/2017</a:t>
             </a:fld>
             <a:endParaRPr lang="en-US"/>
           </a:p>
@@ -4405,238 +4405,6 @@
       </p:pic>
       <p:sp>
         <p:nvSpPr>
-          <p:cNvPr id="25" name="Text Box 18"/>
-          <p:cNvSpPr txBox="1">
-            <a:spLocks noChangeArrowheads="1"/>
-          </p:cNvSpPr>
-          <p:nvPr/>
-        </p:nvSpPr>
-        <p:spPr bwMode="auto">
-          <a:xfrm>
-            <a:off x="10870845" y="1196515"/>
-            <a:ext cx="22160418" cy="3136919"/>
-          </a:xfrm>
-          <a:prstGeom prst="rect">
-            <a:avLst/>
-          </a:prstGeom>
-          <a:solidFill>
-            <a:schemeClr val="bg1">
-              <a:lumMod val="95000"/>
-            </a:schemeClr>
-          </a:solidFill>
-          <a:ln>
-            <a:noFill/>
-            <a:headEnd/>
-            <a:tailEnd/>
-          </a:ln>
-          <a:effectLst>
-            <a:outerShdw blurRad="149987" dist="250190" dir="8460000" algn="ctr">
-              <a:srgbClr val="000000">
-                <a:alpha val="28000"/>
-              </a:srgbClr>
-            </a:outerShdw>
-          </a:effectLst>
-          <a:scene3d>
-            <a:camera prst="orthographicFront">
-              <a:rot lat="0" lon="0" rev="0"/>
-            </a:camera>
-            <a:lightRig rig="contrasting" dir="t">
-              <a:rot lat="0" lon="0" rev="1500000"/>
-            </a:lightRig>
-          </a:scene3d>
-          <a:sp3d prstMaterial="metal">
-            <a:bevelT w="88900" h="88900"/>
-          </a:sp3d>
-          <a:extLst/>
-        </p:spPr>
-        <p:style>
-          <a:lnRef idx="2">
-            <a:schemeClr val="accent6"/>
-          </a:lnRef>
-          <a:fillRef idx="1">
-            <a:schemeClr val="lt1"/>
-          </a:fillRef>
-          <a:effectRef idx="0">
-            <a:schemeClr val="accent6"/>
-          </a:effectRef>
-          <a:fontRef idx="minor">
-            <a:schemeClr val="dk1"/>
-          </a:fontRef>
-        </p:style>
-        <p:txBody>
-          <a:bodyPr lIns="228600" tIns="228600" rIns="228600" bIns="228600"/>
-          <a:lstStyle/>
-          <a:p>
-            <a:pPr marL="0" marR="0" lvl="0" indent="0" defTabSz="457200" eaLnBrk="1" fontAlgn="auto" latinLnBrk="0" hangingPunct="1">
-              <a:lnSpc>
-                <a:spcPct val="100000"/>
-              </a:lnSpc>
-              <a:spcBef>
-                <a:spcPts val="0"/>
-              </a:spcBef>
-              <a:spcAft>
-                <a:spcPts val="0"/>
-              </a:spcAft>
-              <a:buClrTx/>
-              <a:buSzTx/>
-              <a:buFontTx/>
-              <a:buNone/>
-              <a:tabLst/>
-              <a:defRPr/>
-            </a:pPr>
-            <a:r>
-              <a:rPr lang="en-US" sz="1800" kern="0" dirty="0">
-                <a:latin typeface="Century Schoolbook" panose="02040604050505020304"/>
-              </a:rPr>
-              <a:t>Near Field Communication (NFC) was developed to enable contactless transmission of data. This poster focuses on the electromechanical properties of technology that can generate a message using an Android device (smartphone) and illustrating the standardized format of a typical message facilitating the exchange (NDEF).</a:t>
-            </a:r>
-          </a:p>
-          <a:p>
-            <a:pPr marL="0" marR="0" lvl="0" indent="0" defTabSz="457200" eaLnBrk="1" fontAlgn="auto" latinLnBrk="0" hangingPunct="1">
-              <a:lnSpc>
-                <a:spcPct val="100000"/>
-              </a:lnSpc>
-              <a:spcBef>
-                <a:spcPts val="0"/>
-              </a:spcBef>
-              <a:spcAft>
-                <a:spcPts val="0"/>
-              </a:spcAft>
-              <a:buClrTx/>
-              <a:buSzTx/>
-              <a:buFontTx/>
-              <a:buNone/>
-              <a:tabLst/>
-              <a:defRPr/>
-            </a:pPr>
-            <a:endParaRPr kumimoji="0" lang="en-US" sz="1800" b="0" i="0" u="none" strike="noStrike" kern="0" cap="none" spc="0" normalizeH="0" baseline="0" noProof="0" dirty="0">
-              <a:ln>
-                <a:noFill/>
-              </a:ln>
-              <a:effectLst/>
-              <a:uLnTx/>
-              <a:uFillTx/>
-              <a:latin typeface="Century Schoolbook" panose="02040604050505020304"/>
-            </a:endParaRPr>
-          </a:p>
-          <a:p>
-            <a:pPr lvl="0" defTabSz="457200">
-              <a:defRPr/>
-            </a:pPr>
-            <a:r>
-              <a:rPr lang="en-US" sz="1800" kern="0" dirty="0">
-                <a:latin typeface="Century Schoolbook" panose="02040604050505020304"/>
-              </a:rPr>
-              <a:t>Fig. 1 illustrates how a controlled electric current applied to an antenna coil attached to the powered device actively generates a directed electromagnetic field. NFC technology makes use of an phenomenon called electromagnetic induction. The presence/absence of this field over time is used to logically generate a stream of binary data.</a:t>
-            </a:r>
-          </a:p>
-          <a:p>
-            <a:pPr lvl="0" defTabSz="457200">
-              <a:defRPr/>
-            </a:pPr>
-            <a:endParaRPr lang="en-US" sz="1800" kern="0" dirty="0">
-              <a:latin typeface="Century Schoolbook" panose="02040604050505020304"/>
-            </a:endParaRPr>
-          </a:p>
-          <a:p>
-            <a:pPr lvl="0" defTabSz="457200">
-              <a:defRPr/>
-            </a:pPr>
-            <a:r>
-              <a:rPr lang="en-US" sz="1800" kern="0" dirty="0">
-                <a:latin typeface="Century Schoolbook" panose="02040604050505020304"/>
-              </a:rPr>
-              <a:t>ISO/IEC 14443 specifies the characteristics of the fields to be provided for power and bi-directional communication between proximity coupling devices (PCDs) and proximity cards or objects (PICCs).</a:t>
-            </a:r>
-          </a:p>
-          <a:p>
-            <a:pPr lvl="0" defTabSz="457200">
-              <a:defRPr/>
-            </a:pPr>
-            <a:endParaRPr lang="en-US" sz="1800" kern="0" dirty="0">
-              <a:latin typeface="Century Schoolbook" panose="02040604050505020304"/>
-            </a:endParaRPr>
-          </a:p>
-          <a:p>
-            <a:pPr lvl="0" defTabSz="457200">
-              <a:defRPr/>
-            </a:pPr>
-            <a:r>
-              <a:rPr lang="en-US" sz="1800" kern="0" dirty="0">
-                <a:latin typeface="Century Schoolbook" panose="02040604050505020304"/>
-              </a:rPr>
-              <a:t>Smartphone devices that are NFC-enable operate in reader/writer mode, one of three modes defined by the NFC Forum, when interfacing with passive NFC tags. RF interfaces must be compliant with the ISO 14443 standard in order to generate, transmit, and receive messages on ISO/IEC 18000-3 air interface which describes the parameters for air interface communications at 13.56 </a:t>
-            </a:r>
-            <a:r>
-              <a:rPr lang="en-US" sz="1800" kern="0" dirty="0" err="1">
-                <a:latin typeface="Century Schoolbook" panose="02040604050505020304"/>
-              </a:rPr>
-              <a:t>MHz.</a:t>
-            </a:r>
-            <a:endParaRPr lang="en-US" sz="1800" kern="0" dirty="0">
-              <a:latin typeface="Century Schoolbook" panose="02040604050505020304"/>
-            </a:endParaRPr>
-          </a:p>
-          <a:p>
-            <a:pPr marL="0" marR="0" lvl="0" indent="0" defTabSz="457200" eaLnBrk="1" fontAlgn="auto" latinLnBrk="0" hangingPunct="1">
-              <a:lnSpc>
-                <a:spcPct val="100000"/>
-              </a:lnSpc>
-              <a:spcBef>
-                <a:spcPts val="0"/>
-              </a:spcBef>
-              <a:spcAft>
-                <a:spcPts val="0"/>
-              </a:spcAft>
-              <a:buClrTx/>
-              <a:buSzTx/>
-              <a:buFontTx/>
-              <a:buNone/>
-              <a:tabLst/>
-              <a:defRPr/>
-            </a:pPr>
-            <a:endParaRPr kumimoji="0" lang="en-US" sz="1800" b="0" i="0" u="none" strike="noStrike" kern="0" cap="none" spc="0" normalizeH="0" baseline="0" noProof="0" dirty="0">
-              <a:ln>
-                <a:noFill/>
-              </a:ln>
-              <a:effectLst/>
-              <a:uLnTx/>
-              <a:uFillTx/>
-              <a:latin typeface="Century Schoolbook" panose="02040604050505020304"/>
-            </a:endParaRPr>
-          </a:p>
-          <a:p>
-            <a:pPr marL="0" marR="0" lvl="0" indent="0" defTabSz="457200" eaLnBrk="1" fontAlgn="auto" latinLnBrk="0" hangingPunct="1">
-              <a:lnSpc>
-                <a:spcPct val="100000"/>
-              </a:lnSpc>
-              <a:spcBef>
-                <a:spcPts val="0"/>
-              </a:spcBef>
-              <a:spcAft>
-                <a:spcPts val="0"/>
-              </a:spcAft>
-              <a:buClrTx/>
-              <a:buSzTx/>
-              <a:buFontTx/>
-              <a:buNone/>
-              <a:tabLst/>
-              <a:defRPr/>
-            </a:pPr>
-            <a:endParaRPr kumimoji="0" lang="en-US" sz="1800" b="0" i="0" u="none" strike="noStrike" kern="0" cap="none" spc="0" normalizeH="0" baseline="0" noProof="0" dirty="0">
-              <a:ln>
-                <a:noFill/>
-              </a:ln>
-              <a:effectLst/>
-              <a:uLnTx/>
-              <a:uFillTx/>
-              <a:latin typeface="Century Schoolbook" panose="02040604050505020304"/>
-            </a:endParaRPr>
-          </a:p>
-        </p:txBody>
-      </p:sp>
-      <p:sp>
-        <p:nvSpPr>
           <p:cNvPr id="43" name="Striped Right Arrow 42"/>
           <p:cNvSpPr/>
           <p:nvPr/>
@@ -4644,7 +4412,7 @@
         <p:spPr>
           <a:xfrm>
             <a:off x="6684214" y="15392400"/>
-            <a:ext cx="33854185" cy="4343400"/>
+            <a:ext cx="34692386" cy="4343400"/>
           </a:xfrm>
           <a:prstGeom prst="stripedRightArrow">
             <a:avLst/>
@@ -4698,684 +4466,6 @@
       </p:sp>
       <p:sp>
         <p:nvSpPr>
-          <p:cNvPr id="26" name="Text Box 23"/>
-          <p:cNvSpPr txBox="1">
-            <a:spLocks noChangeArrowheads="1"/>
-          </p:cNvSpPr>
-          <p:nvPr/>
-        </p:nvSpPr>
-        <p:spPr bwMode="auto">
-          <a:xfrm>
-            <a:off x="16840200" y="372941"/>
-            <a:ext cx="10221708" cy="671972"/>
-          </a:xfrm>
-          <a:prstGeom prst="rect">
-            <a:avLst/>
-          </a:prstGeom>
-          <a:noFill/>
-          <a:ln>
-            <a:noFill/>
-          </a:ln>
-          <a:effectLst/>
-          <a:extLst>
-            <a:ext uri="{909E8E84-426E-40DD-AFC4-6F175D3DCCD1}">
-              <a14:hiddenFill xmlns:a14="http://schemas.microsoft.com/office/drawing/2010/main">
-                <a:solidFill>
-                  <a:schemeClr val="accent1"/>
-                </a:solidFill>
-              </a14:hiddenFill>
-            </a:ext>
-            <a:ext uri="{91240B29-F687-4F45-9708-019B960494DF}">
-              <a14:hiddenLine xmlns:a14="http://schemas.microsoft.com/office/drawing/2010/main" w="9525">
-                <a:solidFill>
-                  <a:schemeClr val="tx1"/>
-                </a:solidFill>
-                <a:prstDash val="sysDot"/>
-                <a:miter lim="800000"/>
-                <a:headEnd/>
-                <a:tailEnd/>
-              </a14:hiddenLine>
-            </a:ext>
-            <a:ext uri="{AF507438-7753-43E0-B8FC-AC1667EBCBE1}">
-              <a14:hiddenEffects xmlns:a14="http://schemas.microsoft.com/office/drawing/2010/main">
-                <a:effectLst>
-                  <a:outerShdw dist="35921" dir="2700000" algn="ctr" rotWithShape="0">
-                    <a:schemeClr val="bg2"/>
-                  </a:outerShdw>
-                </a:effectLst>
-              </a14:hiddenEffects>
-            </a:ext>
-          </a:extLst>
-        </p:spPr>
-        <p:txBody>
-          <a:bodyPr wrap="none" lIns="228600" tIns="228600" rIns="228600" bIns="228600" anchor="ctr" anchorCtr="1"/>
-          <a:lstStyle>
-            <a:lvl1pPr defTabSz="4389438">
-              <a:defRPr>
-                <a:solidFill>
-                  <a:schemeClr val="tx1"/>
-                </a:solidFill>
-                <a:latin typeface="Arial" charset="0"/>
-              </a:defRPr>
-            </a:lvl1pPr>
-            <a:lvl2pPr defTabSz="4389438">
-              <a:defRPr>
-                <a:solidFill>
-                  <a:schemeClr val="tx1"/>
-                </a:solidFill>
-                <a:latin typeface="Arial" charset="0"/>
-              </a:defRPr>
-            </a:lvl2pPr>
-            <a:lvl3pPr defTabSz="4389438">
-              <a:defRPr>
-                <a:solidFill>
-                  <a:schemeClr val="tx1"/>
-                </a:solidFill>
-                <a:latin typeface="Arial" charset="0"/>
-              </a:defRPr>
-            </a:lvl3pPr>
-            <a:lvl4pPr defTabSz="4389438">
-              <a:defRPr>
-                <a:solidFill>
-                  <a:schemeClr val="tx1"/>
-                </a:solidFill>
-                <a:latin typeface="Arial" charset="0"/>
-              </a:defRPr>
-            </a:lvl4pPr>
-            <a:lvl5pPr defTabSz="4389438">
-              <a:defRPr>
-                <a:solidFill>
-                  <a:schemeClr val="tx1"/>
-                </a:solidFill>
-                <a:latin typeface="Arial" charset="0"/>
-              </a:defRPr>
-            </a:lvl5pPr>
-            <a:lvl6pPr defTabSz="4389438" fontAlgn="base">
-              <a:spcBef>
-                <a:spcPct val="0"/>
-              </a:spcBef>
-              <a:spcAft>
-                <a:spcPct val="0"/>
-              </a:spcAft>
-              <a:defRPr>
-                <a:solidFill>
-                  <a:schemeClr val="tx1"/>
-                </a:solidFill>
-                <a:latin typeface="Arial" charset="0"/>
-              </a:defRPr>
-            </a:lvl6pPr>
-            <a:lvl7pPr defTabSz="4389438" fontAlgn="base">
-              <a:spcBef>
-                <a:spcPct val="0"/>
-              </a:spcBef>
-              <a:spcAft>
-                <a:spcPct val="0"/>
-              </a:spcAft>
-              <a:defRPr>
-                <a:solidFill>
-                  <a:schemeClr val="tx1"/>
-                </a:solidFill>
-                <a:latin typeface="Arial" charset="0"/>
-              </a:defRPr>
-            </a:lvl7pPr>
-            <a:lvl8pPr defTabSz="4389438" fontAlgn="base">
-              <a:spcBef>
-                <a:spcPct val="0"/>
-              </a:spcBef>
-              <a:spcAft>
-                <a:spcPct val="0"/>
-              </a:spcAft>
-              <a:defRPr>
-                <a:solidFill>
-                  <a:schemeClr val="tx1"/>
-                </a:solidFill>
-                <a:latin typeface="Arial" charset="0"/>
-              </a:defRPr>
-            </a:lvl8pPr>
-            <a:lvl9pPr defTabSz="4389438" fontAlgn="base">
-              <a:spcBef>
-                <a:spcPct val="0"/>
-              </a:spcBef>
-              <a:spcAft>
-                <a:spcPct val="0"/>
-              </a:spcAft>
-              <a:defRPr>
-                <a:solidFill>
-                  <a:schemeClr val="tx1"/>
-                </a:solidFill>
-                <a:latin typeface="Arial" charset="0"/>
-              </a:defRPr>
-            </a:lvl9pPr>
-          </a:lstStyle>
-          <a:p>
-            <a:r>
-              <a:rPr lang="en-US" sz="4800" dirty="0">
-                <a:ln w="0"/>
-                <a:effectLst>
-                  <a:outerShdw blurRad="38100" dist="19050" dir="2700000" algn="tl" rotWithShape="0">
-                    <a:schemeClr val="dk1">
-                      <a:alpha val="40000"/>
-                    </a:schemeClr>
-                  </a:outerShdw>
-                </a:effectLst>
-                <a:latin typeface="Verdana" panose="020B0604030504040204" pitchFamily="34" charset="0"/>
-                <a:ea typeface="Verdana" panose="020B0604030504040204" pitchFamily="34" charset="0"/>
-                <a:cs typeface="Verdana" panose="020B0604030504040204" pitchFamily="34" charset="0"/>
-              </a:rPr>
-              <a:t>INTRODUCTION</a:t>
-            </a:r>
-          </a:p>
-        </p:txBody>
-      </p:sp>
-      <p:sp>
-        <p:nvSpPr>
-          <p:cNvPr id="38" name="Rectangle 37"/>
-          <p:cNvSpPr/>
-          <p:nvPr/>
-        </p:nvSpPr>
-        <p:spPr>
-          <a:xfrm>
-            <a:off x="6684214" y="12725400"/>
-            <a:ext cx="32409079" cy="1569660"/>
-          </a:xfrm>
-          <a:prstGeom prst="rect">
-            <a:avLst/>
-          </a:prstGeom>
-          <a:noFill/>
-          <a:ln>
-            <a:noFill/>
-          </a:ln>
-        </p:spPr>
-        <p:txBody>
-          <a:bodyPr wrap="square">
-            <a:spAutoFit/>
-          </a:bodyPr>
-          <a:lstStyle/>
-          <a:p>
-            <a:r>
-              <a:rPr lang="en-US" sz="3200" b="1" dirty="0">
-                <a:solidFill>
-                  <a:schemeClr val="bg1"/>
-                </a:solidFill>
-                <a:highlight>
-                  <a:srgbClr val="000000"/>
-                </a:highlight>
-                <a:latin typeface="Courier New" panose="02070309020205020404" pitchFamily="49" charset="0"/>
-                <a:cs typeface="Courier New" panose="02070309020205020404" pitchFamily="49" charset="0"/>
-              </a:rPr>
-              <a:t>AA </a:t>
-            </a:r>
-            <a:r>
-              <a:rPr lang="en-US" sz="3200" b="1" dirty="0" err="1">
-                <a:solidFill>
-                  <a:schemeClr val="bg1"/>
-                </a:solidFill>
-                <a:highlight>
-                  <a:srgbClr val="000000"/>
-                </a:highlight>
-                <a:latin typeface="Courier New" panose="02070309020205020404" pitchFamily="49" charset="0"/>
-                <a:cs typeface="Courier New" panose="02070309020205020404" pitchFamily="49" charset="0"/>
-              </a:rPr>
-              <a:t>AA</a:t>
-            </a:r>
-            <a:r>
-              <a:rPr lang="en-US" sz="3200" b="1" dirty="0">
-                <a:solidFill>
-                  <a:schemeClr val="bg1"/>
-                </a:solidFill>
-                <a:highlight>
-                  <a:srgbClr val="000000"/>
-                </a:highlight>
-                <a:latin typeface="Courier New" panose="02070309020205020404" pitchFamily="49" charset="0"/>
-                <a:cs typeface="Courier New" panose="02070309020205020404" pitchFamily="49" charset="0"/>
-              </a:rPr>
-              <a:t> </a:t>
-            </a:r>
-            <a:r>
-              <a:rPr lang="en-US" sz="3200" b="1" dirty="0" err="1">
-                <a:solidFill>
-                  <a:schemeClr val="bg1"/>
-                </a:solidFill>
-                <a:highlight>
-                  <a:srgbClr val="000000"/>
-                </a:highlight>
-                <a:latin typeface="Courier New" panose="02070309020205020404" pitchFamily="49" charset="0"/>
-                <a:cs typeface="Courier New" panose="02070309020205020404" pitchFamily="49" charset="0"/>
-              </a:rPr>
-              <a:t>AA</a:t>
-            </a:r>
-            <a:r>
-              <a:rPr lang="en-US" sz="3200" b="1" dirty="0">
-                <a:solidFill>
-                  <a:schemeClr val="bg1"/>
-                </a:solidFill>
-                <a:highlight>
-                  <a:srgbClr val="000000"/>
-                </a:highlight>
-                <a:latin typeface="Courier New" panose="02070309020205020404" pitchFamily="49" charset="0"/>
-                <a:cs typeface="Courier New" panose="02070309020205020404" pitchFamily="49" charset="0"/>
-              </a:rPr>
-              <a:t> </a:t>
-            </a:r>
-            <a:r>
-              <a:rPr lang="en-US" sz="3200" b="1" dirty="0" err="1">
-                <a:solidFill>
-                  <a:schemeClr val="bg1"/>
-                </a:solidFill>
-                <a:highlight>
-                  <a:srgbClr val="000000"/>
-                </a:highlight>
-                <a:latin typeface="Courier New" panose="02070309020205020404" pitchFamily="49" charset="0"/>
-                <a:cs typeface="Courier New" panose="02070309020205020404" pitchFamily="49" charset="0"/>
-              </a:rPr>
-              <a:t>AA</a:t>
-            </a:r>
-            <a:r>
-              <a:rPr lang="en-US" sz="3200" b="1" dirty="0">
-                <a:solidFill>
-                  <a:schemeClr val="bg1"/>
-                </a:solidFill>
-                <a:latin typeface="Courier New" panose="02070309020205020404" pitchFamily="49" charset="0"/>
-                <a:cs typeface="Courier New" panose="02070309020205020404" pitchFamily="49" charset="0"/>
-              </a:rPr>
-              <a:t> </a:t>
-            </a:r>
-            <a:r>
-              <a:rPr lang="en-US" sz="3200" b="1" dirty="0" err="1">
-                <a:solidFill>
-                  <a:schemeClr val="bg1"/>
-                </a:solidFill>
-                <a:highlight>
-                  <a:srgbClr val="000000"/>
-                </a:highlight>
-                <a:latin typeface="Courier New" panose="02070309020205020404" pitchFamily="49" charset="0"/>
-                <a:cs typeface="Courier New" panose="02070309020205020404" pitchFamily="49" charset="0"/>
-              </a:rPr>
-              <a:t>AA</a:t>
-            </a:r>
-            <a:r>
-              <a:rPr lang="en-US" sz="3200" b="1" dirty="0">
-                <a:solidFill>
-                  <a:schemeClr val="bg1"/>
-                </a:solidFill>
-                <a:highlight>
-                  <a:srgbClr val="000000"/>
-                </a:highlight>
-                <a:latin typeface="Courier New" panose="02070309020205020404" pitchFamily="49" charset="0"/>
-                <a:cs typeface="Courier New" panose="02070309020205020404" pitchFamily="49" charset="0"/>
-              </a:rPr>
-              <a:t> </a:t>
-            </a:r>
-            <a:r>
-              <a:rPr lang="en-US" sz="3200" b="1" dirty="0" err="1">
-                <a:solidFill>
-                  <a:schemeClr val="bg1"/>
-                </a:solidFill>
-                <a:highlight>
-                  <a:srgbClr val="000000"/>
-                </a:highlight>
-                <a:latin typeface="Courier New" panose="02070309020205020404" pitchFamily="49" charset="0"/>
-                <a:cs typeface="Courier New" panose="02070309020205020404" pitchFamily="49" charset="0"/>
-              </a:rPr>
-              <a:t>AA</a:t>
-            </a:r>
-            <a:r>
-              <a:rPr lang="en-US" sz="3200" b="1" dirty="0">
-                <a:solidFill>
-                  <a:schemeClr val="bg1"/>
-                </a:solidFill>
-                <a:highlight>
-                  <a:srgbClr val="000000"/>
-                </a:highlight>
-                <a:latin typeface="Courier New" panose="02070309020205020404" pitchFamily="49" charset="0"/>
-                <a:cs typeface="Courier New" panose="02070309020205020404" pitchFamily="49" charset="0"/>
-              </a:rPr>
-              <a:t> </a:t>
-            </a:r>
-            <a:r>
-              <a:rPr lang="en-US" sz="3200" b="1" dirty="0" err="1">
-                <a:solidFill>
-                  <a:schemeClr val="bg1"/>
-                </a:solidFill>
-                <a:highlight>
-                  <a:srgbClr val="000000"/>
-                </a:highlight>
-                <a:latin typeface="Courier New" panose="02070309020205020404" pitchFamily="49" charset="0"/>
-                <a:cs typeface="Courier New" panose="02070309020205020404" pitchFamily="49" charset="0"/>
-              </a:rPr>
-              <a:t>AA</a:t>
-            </a:r>
-            <a:r>
-              <a:rPr lang="en-US" sz="3200" b="1" dirty="0">
-                <a:solidFill>
-                  <a:schemeClr val="bg1"/>
-                </a:solidFill>
-                <a:highlight>
-                  <a:srgbClr val="000000"/>
-                </a:highlight>
-                <a:latin typeface="Courier New" panose="02070309020205020404" pitchFamily="49" charset="0"/>
-                <a:cs typeface="Courier New" panose="02070309020205020404" pitchFamily="49" charset="0"/>
-              </a:rPr>
-              <a:t> </a:t>
-            </a:r>
-            <a:r>
-              <a:rPr lang="en-US" sz="3200" b="1" dirty="0" err="1">
-                <a:solidFill>
-                  <a:schemeClr val="bg1"/>
-                </a:solidFill>
-                <a:highlight>
-                  <a:srgbClr val="000000"/>
-                </a:highlight>
-                <a:latin typeface="Courier New" panose="02070309020205020404" pitchFamily="49" charset="0"/>
-                <a:cs typeface="Courier New" panose="02070309020205020404" pitchFamily="49" charset="0"/>
-              </a:rPr>
-              <a:t>AA</a:t>
-            </a:r>
-            <a:r>
-              <a:rPr lang="en-US" sz="3200" b="1" dirty="0">
-                <a:solidFill>
-                  <a:schemeClr val="bg1"/>
-                </a:solidFill>
-                <a:latin typeface="Courier New" panose="02070309020205020404" pitchFamily="49" charset="0"/>
-                <a:cs typeface="Courier New" panose="02070309020205020404" pitchFamily="49" charset="0"/>
-              </a:rPr>
-              <a:t> </a:t>
-            </a:r>
-            <a:r>
-              <a:rPr lang="en-US" sz="3200" b="1" dirty="0" err="1">
-                <a:solidFill>
-                  <a:schemeClr val="bg1"/>
-                </a:solidFill>
-                <a:highlight>
-                  <a:srgbClr val="000000"/>
-                </a:highlight>
-                <a:latin typeface="Courier New" panose="02070309020205020404" pitchFamily="49" charset="0"/>
-                <a:cs typeface="Courier New" panose="02070309020205020404" pitchFamily="49" charset="0"/>
-              </a:rPr>
-              <a:t>AA</a:t>
-            </a:r>
-            <a:r>
-              <a:rPr lang="en-US" sz="3200" b="1" dirty="0">
-                <a:solidFill>
-                  <a:schemeClr val="bg1"/>
-                </a:solidFill>
-                <a:highlight>
-                  <a:srgbClr val="000000"/>
-                </a:highlight>
-                <a:latin typeface="Courier New" panose="02070309020205020404" pitchFamily="49" charset="0"/>
-                <a:cs typeface="Courier New" panose="02070309020205020404" pitchFamily="49" charset="0"/>
-              </a:rPr>
-              <a:t> </a:t>
-            </a:r>
-            <a:r>
-              <a:rPr lang="en-US" sz="3200" b="1" dirty="0" err="1">
-                <a:solidFill>
-                  <a:schemeClr val="bg1"/>
-                </a:solidFill>
-                <a:highlight>
-                  <a:srgbClr val="000000"/>
-                </a:highlight>
-                <a:latin typeface="Courier New" panose="02070309020205020404" pitchFamily="49" charset="0"/>
-                <a:cs typeface="Courier New" panose="02070309020205020404" pitchFamily="49" charset="0"/>
-              </a:rPr>
-              <a:t>AA</a:t>
-            </a:r>
-            <a:r>
-              <a:rPr lang="en-US" sz="3200" b="1" dirty="0">
-                <a:solidFill>
-                  <a:schemeClr val="bg1"/>
-                </a:solidFill>
-                <a:highlight>
-                  <a:srgbClr val="000000"/>
-                </a:highlight>
-                <a:latin typeface="Courier New" panose="02070309020205020404" pitchFamily="49" charset="0"/>
-                <a:cs typeface="Courier New" panose="02070309020205020404" pitchFamily="49" charset="0"/>
-              </a:rPr>
-              <a:t> </a:t>
-            </a:r>
-            <a:r>
-              <a:rPr lang="fi-FI" sz="3200" b="1" dirty="0">
-                <a:highlight>
-                  <a:srgbClr val="FFFF00"/>
-                </a:highlight>
-                <a:latin typeface="Courier New" panose="02070309020205020404" pitchFamily="49" charset="0"/>
-                <a:cs typeface="Courier New" panose="02070309020205020404" pitchFamily="49" charset="0"/>
-              </a:rPr>
-              <a:t>00</a:t>
-            </a:r>
-            <a:r>
-              <a:rPr lang="fi-FI" sz="3200" b="1" dirty="0">
-                <a:solidFill>
-                  <a:schemeClr val="bg1"/>
-                </a:solidFill>
-                <a:highlight>
-                  <a:srgbClr val="000000"/>
-                </a:highlight>
-                <a:latin typeface="Courier New" panose="02070309020205020404" pitchFamily="49" charset="0"/>
-                <a:cs typeface="Courier New" panose="02070309020205020404" pitchFamily="49" charset="0"/>
-              </a:rPr>
-              <a:t> </a:t>
-            </a:r>
-            <a:r>
-              <a:rPr lang="fi-FI" sz="3200" b="1" dirty="0">
-                <a:highlight>
-                  <a:srgbClr val="FFFF00"/>
-                </a:highlight>
-                <a:latin typeface="Courier New" panose="02070309020205020404" pitchFamily="49" charset="0"/>
-                <a:cs typeface="Courier New" panose="02070309020205020404" pitchFamily="49" charset="0"/>
-              </a:rPr>
-              <a:t>00</a:t>
-            </a:r>
-            <a:r>
-              <a:rPr lang="fi-FI" sz="3200" b="1" dirty="0">
-                <a:solidFill>
-                  <a:schemeClr val="bg1"/>
-                </a:solidFill>
-                <a:latin typeface="Courier New" panose="02070309020205020404" pitchFamily="49" charset="0"/>
-                <a:cs typeface="Courier New" panose="02070309020205020404" pitchFamily="49" charset="0"/>
-              </a:rPr>
-              <a:t> </a:t>
-            </a:r>
-            <a:r>
-              <a:rPr lang="fi-FI" sz="3200" b="1" dirty="0">
-                <a:solidFill>
-                  <a:schemeClr val="bg1"/>
-                </a:solidFill>
-                <a:highlight>
-                  <a:srgbClr val="000000"/>
-                </a:highlight>
-                <a:latin typeface="Courier New" panose="02070309020205020404" pitchFamily="49" charset="0"/>
-                <a:cs typeface="Courier New" panose="02070309020205020404" pitchFamily="49" charset="0"/>
-              </a:rPr>
-              <a:t>AA AA AA AA</a:t>
-            </a:r>
-            <a:r>
-              <a:rPr lang="fi-FI" sz="3200" b="1" dirty="0">
-                <a:latin typeface="Courier New" panose="02070309020205020404" pitchFamily="49" charset="0"/>
-                <a:cs typeface="Courier New" panose="02070309020205020404" pitchFamily="49" charset="0"/>
-              </a:rPr>
-              <a:t> </a:t>
-            </a:r>
-            <a:r>
-              <a:rPr lang="fi-FI" sz="3200" b="1" dirty="0">
-                <a:latin typeface="Courier New" panose="02070309020205020404" pitchFamily="49" charset="0"/>
-                <a:cs typeface="Courier New" panose="02070309020205020404" pitchFamily="49" charset="0"/>
-              </a:rPr>
-              <a:t>AA AA AA AA AA AA AA AA AA AA AA AA AA AA AA AA AA AA AA AA AA AA AA AA AA AA AA AA AA AA AA AA AA AA AA AA AA AA AA AA AA AA AA AA AA AA AA AA AA AA AA AA AA AA AA AA AA AA AA AA AA AA AA AA AA AA AA AA AA AA AA AA AA AA AA AA AA AA AA AA AA AA AA AA AA AA AA AA AA AA AA AA AA AA </a:t>
-            </a:r>
-            <a:r>
-              <a:rPr lang="fi-FI" sz="3200" b="1" dirty="0">
-                <a:highlight>
-                  <a:srgbClr val="FFFF00"/>
-                </a:highlight>
-                <a:latin typeface="Courier New" panose="02070309020205020404" pitchFamily="49" charset="0"/>
-                <a:cs typeface="Courier New" panose="02070309020205020404" pitchFamily="49" charset="0"/>
-              </a:rPr>
-              <a:t>00</a:t>
-            </a:r>
-            <a:r>
-              <a:rPr lang="fi-FI" sz="3200" b="1" dirty="0">
-                <a:highlight>
-                  <a:srgbClr val="000000"/>
-                </a:highlight>
-                <a:latin typeface="Courier New" panose="02070309020205020404" pitchFamily="49" charset="0"/>
-                <a:cs typeface="Courier New" panose="02070309020205020404" pitchFamily="49" charset="0"/>
-              </a:rPr>
-              <a:t> </a:t>
-            </a:r>
-            <a:r>
-              <a:rPr lang="fi-FI" sz="3200" b="1" dirty="0">
-                <a:highlight>
-                  <a:srgbClr val="FFFF00"/>
-                </a:highlight>
-                <a:latin typeface="Courier New" panose="02070309020205020404" pitchFamily="49" charset="0"/>
-                <a:cs typeface="Courier New" panose="02070309020205020404" pitchFamily="49" charset="0"/>
-              </a:rPr>
-              <a:t>00</a:t>
-            </a:r>
-            <a:r>
-              <a:rPr lang="fi-FI" sz="3200" b="1" dirty="0">
-                <a:highlight>
-                  <a:srgbClr val="000000"/>
-                </a:highlight>
-                <a:latin typeface="Courier New" panose="02070309020205020404" pitchFamily="49" charset="0"/>
-                <a:cs typeface="Courier New" panose="02070309020205020404" pitchFamily="49" charset="0"/>
-              </a:rPr>
-              <a:t> </a:t>
-            </a:r>
-            <a:r>
-              <a:rPr lang="fi-FI" sz="3200" b="1" dirty="0">
-                <a:solidFill>
-                  <a:schemeClr val="bg1"/>
-                </a:solidFill>
-                <a:highlight>
-                  <a:srgbClr val="000000"/>
-                </a:highlight>
-                <a:latin typeface="Courier New" panose="02070309020205020404" pitchFamily="49" charset="0"/>
-                <a:cs typeface="Courier New" panose="02070309020205020404" pitchFamily="49" charset="0"/>
-              </a:rPr>
-              <a:t>AA AA</a:t>
-            </a:r>
-            <a:r>
-              <a:rPr lang="fi-FI" sz="3200" b="1" dirty="0">
-                <a:solidFill>
-                  <a:schemeClr val="bg1"/>
-                </a:solidFill>
-                <a:latin typeface="Courier New" panose="02070309020205020404" pitchFamily="49" charset="0"/>
-                <a:cs typeface="Courier New" panose="02070309020205020404" pitchFamily="49" charset="0"/>
-              </a:rPr>
-              <a:t> </a:t>
-            </a:r>
-            <a:r>
-              <a:rPr lang="fi-FI" sz="3200" b="1" dirty="0">
-                <a:solidFill>
-                  <a:schemeClr val="bg1"/>
-                </a:solidFill>
-                <a:highlight>
-                  <a:srgbClr val="000000"/>
-                </a:highlight>
-                <a:latin typeface="Courier New" panose="02070309020205020404" pitchFamily="49" charset="0"/>
-                <a:cs typeface="Courier New" panose="02070309020205020404" pitchFamily="49" charset="0"/>
-              </a:rPr>
-              <a:t>AA AA AA AA</a:t>
-            </a:r>
-            <a:r>
-              <a:rPr lang="fi-FI" sz="3200" b="1" dirty="0">
-                <a:solidFill>
-                  <a:schemeClr val="bg1"/>
-                </a:solidFill>
-                <a:latin typeface="Courier New" panose="02070309020205020404" pitchFamily="49" charset="0"/>
-                <a:cs typeface="Courier New" panose="02070309020205020404" pitchFamily="49" charset="0"/>
-              </a:rPr>
-              <a:t> </a:t>
-            </a:r>
-            <a:r>
-              <a:rPr lang="fi-FI" sz="3200" b="1" dirty="0">
-                <a:solidFill>
-                  <a:schemeClr val="bg1"/>
-                </a:solidFill>
-                <a:highlight>
-                  <a:srgbClr val="000000"/>
-                </a:highlight>
-                <a:latin typeface="Courier New" panose="02070309020205020404" pitchFamily="49" charset="0"/>
-                <a:cs typeface="Courier New" panose="02070309020205020404" pitchFamily="49" charset="0"/>
-              </a:rPr>
-              <a:t>AA AA AA AA</a:t>
-            </a:r>
-            <a:r>
-              <a:rPr lang="fi-FI" sz="3200" b="1" dirty="0">
-                <a:solidFill>
-                  <a:schemeClr val="bg1"/>
-                </a:solidFill>
-                <a:latin typeface="Courier New" panose="02070309020205020404" pitchFamily="49" charset="0"/>
-                <a:cs typeface="Courier New" panose="02070309020205020404" pitchFamily="49" charset="0"/>
-              </a:rPr>
-              <a:t> </a:t>
-            </a:r>
-            <a:r>
-              <a:rPr lang="fi-FI" sz="3200" b="1" dirty="0">
-                <a:solidFill>
-                  <a:schemeClr val="bg1"/>
-                </a:solidFill>
-                <a:highlight>
-                  <a:srgbClr val="000000"/>
-                </a:highlight>
-                <a:latin typeface="Courier New" panose="02070309020205020404" pitchFamily="49" charset="0"/>
-                <a:cs typeface="Courier New" panose="02070309020205020404" pitchFamily="49" charset="0"/>
-              </a:rPr>
-              <a:t>AA AA AA AA</a:t>
-            </a:r>
-            <a:r>
-              <a:rPr lang="fi-FI" sz="3200" b="1" dirty="0">
-                <a:solidFill>
-                  <a:schemeClr val="bg1"/>
-                </a:solidFill>
-                <a:latin typeface="Courier New" panose="02070309020205020404" pitchFamily="49" charset="0"/>
-                <a:cs typeface="Courier New" panose="02070309020205020404" pitchFamily="49" charset="0"/>
-              </a:rPr>
-              <a:t> </a:t>
-            </a:r>
-            <a:r>
-              <a:rPr lang="fi-FI" sz="3200" b="1" dirty="0">
-                <a:solidFill>
-                  <a:schemeClr val="bg1"/>
-                </a:solidFill>
-                <a:highlight>
-                  <a:srgbClr val="000000"/>
-                </a:highlight>
-                <a:latin typeface="Courier New" panose="02070309020205020404" pitchFamily="49" charset="0"/>
-                <a:cs typeface="Courier New" panose="02070309020205020404" pitchFamily="49" charset="0"/>
-              </a:rPr>
-              <a:t>AA AA AA AA</a:t>
-            </a:r>
-            <a:r>
-              <a:rPr lang="fi-FI" sz="3200" b="1" dirty="0">
-                <a:solidFill>
-                  <a:schemeClr val="bg1"/>
-                </a:solidFill>
-                <a:highlight>
-                  <a:srgbClr val="000080"/>
-                </a:highlight>
-                <a:latin typeface="Courier New" panose="02070309020205020404" pitchFamily="49" charset="0"/>
-                <a:cs typeface="Courier New" panose="02070309020205020404" pitchFamily="49" charset="0"/>
-              </a:rPr>
-              <a:t> </a:t>
-            </a:r>
-            <a:endParaRPr lang="en-US" sz="3200" b="1" dirty="0">
-              <a:solidFill>
-                <a:schemeClr val="bg1"/>
-              </a:solidFill>
-              <a:highlight>
-                <a:srgbClr val="000080"/>
-              </a:highlight>
-              <a:latin typeface="Courier New" panose="02070309020205020404" pitchFamily="49" charset="0"/>
-              <a:cs typeface="Courier New" panose="02070309020205020404" pitchFamily="49" charset="0"/>
-            </a:endParaRPr>
-          </a:p>
-        </p:txBody>
-      </p:sp>
-      <p:sp>
-        <p:nvSpPr>
           <p:cNvPr id="35" name="Text Box 22"/>
           <p:cNvSpPr txBox="1">
             <a:spLocks noChangeArrowheads="1"/>
@@ -5384,8 +4474,8 @@
         </p:nvSpPr>
         <p:spPr bwMode="auto">
           <a:xfrm>
-            <a:off x="33573747" y="6519709"/>
-            <a:ext cx="9914381" cy="1176491"/>
+            <a:off x="37212977" y="5368834"/>
+            <a:ext cx="5952003" cy="1176491"/>
           </a:xfrm>
           <a:prstGeom prst="rect">
             <a:avLst/>
@@ -5523,8 +4613,8 @@
         </p:nvSpPr>
         <p:spPr bwMode="auto">
           <a:xfrm>
-            <a:off x="33519242" y="5891429"/>
-            <a:ext cx="9914381" cy="628279"/>
+            <a:off x="37158472" y="4740554"/>
+            <a:ext cx="5952003" cy="628279"/>
           </a:xfrm>
           <a:prstGeom prst="rect">
             <a:avLst/>
@@ -5667,7 +4757,7 @@
           <a:p>
             <a:pPr algn="ctr"/>
             <a:r>
-              <a:rPr lang="en-US" sz="4800" dirty="0">
+              <a:rPr lang="en-US" sz="4000" dirty="0">
                 <a:latin typeface="Verdana" panose="020B0604030504040204" pitchFamily="34" charset="0"/>
                 <a:ea typeface="Verdana" panose="020B0604030504040204" pitchFamily="34" charset="0"/>
                 <a:cs typeface="Verdana" panose="020B0604030504040204" pitchFamily="34" charset="0"/>
@@ -5687,8 +4777,8 @@
         </p:nvSpPr>
         <p:spPr bwMode="auto">
           <a:xfrm>
-            <a:off x="33573747" y="3931742"/>
-            <a:ext cx="9914381" cy="1473469"/>
+            <a:off x="37212977" y="2780867"/>
+            <a:ext cx="5952003" cy="1473469"/>
           </a:xfrm>
           <a:prstGeom prst="rect">
             <a:avLst/>
@@ -5798,8 +4888,8 @@
         </p:nvSpPr>
         <p:spPr bwMode="auto">
           <a:xfrm>
-            <a:off x="33573747" y="3186238"/>
-            <a:ext cx="9914381" cy="680279"/>
+            <a:off x="37212977" y="2035363"/>
+            <a:ext cx="5952003" cy="680279"/>
           </a:xfrm>
           <a:prstGeom prst="rect">
             <a:avLst/>
@@ -5942,7 +5032,7 @@
           <a:p>
             <a:pPr algn="ctr"/>
             <a:r>
-              <a:rPr lang="en-US" sz="4800" dirty="0">
+              <a:rPr lang="en-US" sz="4000" dirty="0">
                 <a:latin typeface="Verdana" panose="020B0604030504040204" pitchFamily="34" charset="0"/>
                 <a:ea typeface="Verdana" panose="020B0604030504040204" pitchFamily="34" charset="0"/>
                 <a:cs typeface="Verdana" panose="020B0604030504040204" pitchFamily="34" charset="0"/>
@@ -5974,8 +5064,8 @@
         </p:blipFill>
         <p:spPr>
           <a:xfrm>
-            <a:off x="33573747" y="251787"/>
-            <a:ext cx="9975141" cy="2306955"/>
+            <a:off x="37217893" y="490770"/>
+            <a:ext cx="5952003" cy="1376522"/>
           </a:xfrm>
           <a:prstGeom prst="rect">
             <a:avLst/>
@@ -6012,15 +5102,239 @@
           </a:prstGeom>
         </p:spPr>
       </p:pic>
-      <p:sp>
-        <p:nvSpPr>
-          <p:cNvPr id="27" name="Rectangle 26"/>
+      <p:pic>
+        <p:nvPicPr>
+          <p:cNvPr id="3" name="Picture 2"/>
+          <p:cNvPicPr>
+            <a:picLocks noChangeAspect="1"/>
+          </p:cNvPicPr>
+          <p:nvPr/>
+        </p:nvPicPr>
+        <p:blipFill>
+          <a:blip r:embed="rId9" cstate="print">
+            <a:extLst>
+              <a:ext uri="{28A0092B-C50C-407E-A947-70E740481C1C}">
+                <a14:useLocalDpi xmlns:a14="http://schemas.microsoft.com/office/drawing/2010/main" val="0"/>
+              </a:ext>
+            </a:extLst>
+          </a:blip>
+          <a:stretch>
+            <a:fillRect/>
+          </a:stretch>
+        </p:blipFill>
+        <p:spPr>
+          <a:xfrm>
+            <a:off x="9372600" y="14740897"/>
+            <a:ext cx="1546726" cy="1546726"/>
+          </a:xfrm>
+          <a:prstGeom prst="rect">
+            <a:avLst/>
+          </a:prstGeom>
+        </p:spPr>
+      </p:pic>
+      <p:pic>
+        <p:nvPicPr>
+          <p:cNvPr id="21" name="Picture 20"/>
+          <p:cNvPicPr>
+            <a:picLocks noChangeAspect="1"/>
+          </p:cNvPicPr>
+          <p:nvPr/>
+        </p:nvPicPr>
+        <p:blipFill>
+          <a:blip r:embed="rId9" cstate="print">
+            <a:extLst>
+              <a:ext uri="{28A0092B-C50C-407E-A947-70E740481C1C}">
+                <a14:useLocalDpi xmlns:a14="http://schemas.microsoft.com/office/drawing/2010/main" val="0"/>
+              </a:ext>
+            </a:extLst>
+          </a:blip>
+          <a:stretch>
+            <a:fillRect/>
+          </a:stretch>
+        </p:blipFill>
+        <p:spPr>
+          <a:xfrm>
+            <a:off x="34800674" y="14740897"/>
+            <a:ext cx="1546726" cy="1546726"/>
+          </a:xfrm>
+          <a:prstGeom prst="rect">
+            <a:avLst/>
+          </a:prstGeom>
+        </p:spPr>
+      </p:pic>
+      <p:sp>
+        <p:nvSpPr>
+          <p:cNvPr id="29" name="Pentagon 28"/>
           <p:cNvSpPr/>
           <p:nvPr/>
         </p:nvSpPr>
         <p:spPr>
+          <a:xfrm rot="16200000">
+            <a:off x="13594095" y="11464278"/>
+            <a:ext cx="2983242" cy="491523"/>
+          </a:xfrm>
+          <a:prstGeom prst="homePlate">
+            <a:avLst/>
+          </a:prstGeom>
+          <a:solidFill>
+            <a:srgbClr val="FFFF00"/>
+          </a:solidFill>
+        </p:spPr>
+        <p:style>
+          <a:lnRef idx="0">
+            <a:schemeClr val="accent6"/>
+          </a:lnRef>
+          <a:fillRef idx="3">
+            <a:schemeClr val="accent6"/>
+          </a:fillRef>
+          <a:effectRef idx="3">
+            <a:schemeClr val="accent6"/>
+          </a:effectRef>
+          <a:fontRef idx="minor">
+            <a:schemeClr val="lt1"/>
+          </a:fontRef>
+        </p:style>
+        <p:txBody>
+          <a:bodyPr rtlCol="0" anchor="ctr"/>
+          <a:lstStyle/>
+          <a:p>
+            <a:pPr algn="ctr"/>
+            <a:endParaRPr lang="en-US"/>
+          </a:p>
+        </p:txBody>
+      </p:sp>
+      <p:sp>
+        <p:nvSpPr>
+          <p:cNvPr id="30" name="Pentagon 29"/>
+          <p:cNvSpPr/>
+          <p:nvPr/>
+        </p:nvSpPr>
+        <p:spPr>
+          <a:xfrm rot="16200000">
+            <a:off x="12851142" y="11471898"/>
+            <a:ext cx="2983242" cy="491523"/>
+          </a:xfrm>
+          <a:prstGeom prst="homePlate">
+            <a:avLst/>
+          </a:prstGeom>
+          <a:solidFill>
+            <a:srgbClr val="FFFF00"/>
+          </a:solidFill>
+        </p:spPr>
+        <p:style>
+          <a:lnRef idx="0">
+            <a:schemeClr val="accent6"/>
+          </a:lnRef>
+          <a:fillRef idx="3">
+            <a:schemeClr val="accent6"/>
+          </a:fillRef>
+          <a:effectRef idx="3">
+            <a:schemeClr val="accent6"/>
+          </a:effectRef>
+          <a:fontRef idx="minor">
+            <a:schemeClr val="lt1"/>
+          </a:fontRef>
+        </p:style>
+        <p:txBody>
+          <a:bodyPr vert="wordArtVert" rtlCol="0" anchor="ctr"/>
+          <a:lstStyle/>
+          <a:p>
+            <a:pPr algn="ctr"/>
+            <a:endParaRPr lang="en-US" dirty="0"/>
+          </a:p>
+        </p:txBody>
+      </p:sp>
+      <p:sp>
+        <p:nvSpPr>
+          <p:cNvPr id="31" name="Pentagon 30"/>
+          <p:cNvSpPr/>
+          <p:nvPr/>
+        </p:nvSpPr>
+        <p:spPr>
+          <a:xfrm rot="16200000">
+            <a:off x="21910522" y="11964155"/>
+            <a:ext cx="3998234" cy="491523"/>
+          </a:xfrm>
+          <a:prstGeom prst="homePlate">
+            <a:avLst/>
+          </a:prstGeom>
+          <a:solidFill>
+            <a:srgbClr val="FFFF00"/>
+          </a:solidFill>
+        </p:spPr>
+        <p:style>
+          <a:lnRef idx="0">
+            <a:schemeClr val="accent6"/>
+          </a:lnRef>
+          <a:fillRef idx="3">
+            <a:schemeClr val="accent6"/>
+          </a:fillRef>
+          <a:effectRef idx="3">
+            <a:schemeClr val="accent6"/>
+          </a:effectRef>
+          <a:fontRef idx="minor">
+            <a:schemeClr val="lt1"/>
+          </a:fontRef>
+        </p:style>
+        <p:txBody>
+          <a:bodyPr rtlCol="0" anchor="ctr"/>
+          <a:lstStyle/>
+          <a:p>
+            <a:pPr algn="ctr"/>
+            <a:endParaRPr lang="en-US"/>
+          </a:p>
+        </p:txBody>
+      </p:sp>
+      <p:sp>
+        <p:nvSpPr>
+          <p:cNvPr id="33" name="Pentagon 32"/>
+          <p:cNvSpPr/>
+          <p:nvPr/>
+        </p:nvSpPr>
+        <p:spPr>
+          <a:xfrm rot="16200000">
+            <a:off x="21167569" y="11971775"/>
+            <a:ext cx="3998234" cy="491523"/>
+          </a:xfrm>
+          <a:prstGeom prst="homePlate">
+            <a:avLst/>
+          </a:prstGeom>
+          <a:solidFill>
+            <a:srgbClr val="FFFF00"/>
+          </a:solidFill>
+        </p:spPr>
+        <p:style>
+          <a:lnRef idx="0">
+            <a:schemeClr val="accent6"/>
+          </a:lnRef>
+          <a:fillRef idx="3">
+            <a:schemeClr val="accent6"/>
+          </a:fillRef>
+          <a:effectRef idx="3">
+            <a:schemeClr val="accent6"/>
+          </a:effectRef>
+          <a:fontRef idx="minor">
+            <a:schemeClr val="lt1"/>
+          </a:fontRef>
+        </p:style>
+        <p:txBody>
+          <a:bodyPr rtlCol="0" anchor="ctr"/>
+          <a:lstStyle/>
+          <a:p>
+            <a:pPr algn="ctr"/>
+            <a:endParaRPr lang="en-US"/>
+          </a:p>
+        </p:txBody>
+      </p:sp>
+      <p:sp>
+        <p:nvSpPr>
+          <p:cNvPr id="38" name="Rectangle 37"/>
+          <p:cNvSpPr/>
+          <p:nvPr/>
+        </p:nvSpPr>
+        <p:spPr>
           <a:xfrm>
-            <a:off x="7406767" y="16764000"/>
+            <a:off x="6684214" y="12725400"/>
             <a:ext cx="32409079" cy="1569660"/>
           </a:xfrm>
           <a:prstGeom prst="rect">
@@ -6039,17 +5353,39 @@
           <a:p>
             <a:r>
               <a:rPr lang="en-US" sz="3200" b="1" dirty="0">
+                <a:solidFill>
+                  <a:schemeClr val="bg1"/>
+                </a:solidFill>
+                <a:highlight>
+                  <a:srgbClr val="000000"/>
+                </a:highlight>
                 <a:latin typeface="Courier New" panose="02070309020205020404" pitchFamily="49" charset="0"/>
                 <a:cs typeface="Courier New" panose="02070309020205020404" pitchFamily="49" charset="0"/>
               </a:rPr>
-              <a:t>AA </a:t>
-            </a:r>
-            <a:r>
-              <a:rPr lang="en-US" sz="3200" b="1" dirty="0" err="1">
+              <a:t>04 80 16 1A</a:t>
+            </a:r>
+            <a:r>
+              <a:rPr lang="en-US" sz="3200" b="1" dirty="0">
+                <a:solidFill>
+                  <a:schemeClr val="bg1"/>
+                </a:solidFill>
                 <a:latin typeface="Courier New" panose="02070309020205020404" pitchFamily="49" charset="0"/>
                 <a:cs typeface="Courier New" panose="02070309020205020404" pitchFamily="49" charset="0"/>
               </a:rPr>
-              <a:t>AA</a:t>
+              <a:t> </a:t>
+            </a:r>
+            <a:r>
+              <a:rPr lang="en-US" sz="3200" b="1" dirty="0">
+                <a:solidFill>
+                  <a:schemeClr val="bg1"/>
+                </a:solidFill>
+                <a:highlight>
+                  <a:srgbClr val="000000"/>
+                </a:highlight>
+                <a:latin typeface="Courier New" panose="02070309020205020404" pitchFamily="49" charset="0"/>
+                <a:cs typeface="Courier New" panose="02070309020205020404" pitchFamily="49" charset="0"/>
+              </a:rPr>
+              <a:t>52 A3 40 80</a:t>
             </a:r>
             <a:r>
               <a:rPr lang="en-US" sz="3200" b="1" dirty="0">
@@ -6059,11 +5395,736 @@
               <a:t> </a:t>
             </a:r>
             <a:r>
-              <a:rPr lang="en-US" sz="3200" b="1" dirty="0" err="1">
+              <a:rPr lang="en-US" sz="3200" b="1" dirty="0">
+                <a:solidFill>
+                  <a:schemeClr val="bg1"/>
+                </a:solidFill>
+                <a:highlight>
+                  <a:srgbClr val="000000"/>
+                </a:highlight>
                 <a:latin typeface="Courier New" panose="02070309020205020404" pitchFamily="49" charset="0"/>
                 <a:cs typeface="Courier New" panose="02070309020205020404" pitchFamily="49" charset="0"/>
               </a:rPr>
-              <a:t>AA</a:t>
+              <a:t>31 48 </a:t>
+            </a:r>
+            <a:r>
+              <a:rPr lang="fi-FI" sz="3200" b="1" dirty="0">
+                <a:highlight>
+                  <a:srgbClr val="FFFF00"/>
+                </a:highlight>
+                <a:latin typeface="Courier New" panose="02070309020205020404" pitchFamily="49" charset="0"/>
+                <a:cs typeface="Courier New" panose="02070309020205020404" pitchFamily="49" charset="0"/>
+              </a:rPr>
+              <a:t>00</a:t>
+            </a:r>
+            <a:r>
+              <a:rPr lang="fi-FI" sz="3200" b="1" dirty="0">
+                <a:solidFill>
+                  <a:schemeClr val="bg1"/>
+                </a:solidFill>
+                <a:highlight>
+                  <a:srgbClr val="000000"/>
+                </a:highlight>
+                <a:latin typeface="Courier New" panose="02070309020205020404" pitchFamily="49" charset="0"/>
+                <a:cs typeface="Courier New" panose="02070309020205020404" pitchFamily="49" charset="0"/>
+              </a:rPr>
+              <a:t> </a:t>
+            </a:r>
+            <a:r>
+              <a:rPr lang="fi-FI" sz="3200" b="1" dirty="0">
+                <a:highlight>
+                  <a:srgbClr val="FFFF00"/>
+                </a:highlight>
+                <a:latin typeface="Courier New" panose="02070309020205020404" pitchFamily="49" charset="0"/>
+                <a:cs typeface="Courier New" panose="02070309020205020404" pitchFamily="49" charset="0"/>
+              </a:rPr>
+              <a:t>00</a:t>
+            </a:r>
+            <a:r>
+              <a:rPr lang="fi-FI" sz="3200" b="1" dirty="0">
+                <a:solidFill>
+                  <a:schemeClr val="bg1"/>
+                </a:solidFill>
+                <a:latin typeface="Courier New" panose="02070309020205020404" pitchFamily="49" charset="0"/>
+                <a:cs typeface="Courier New" panose="02070309020205020404" pitchFamily="49" charset="0"/>
+              </a:rPr>
+              <a:t> </a:t>
+            </a:r>
+            <a:r>
+              <a:rPr lang="en-US" sz="3200" b="1" dirty="0">
+                <a:solidFill>
+                  <a:schemeClr val="bg1"/>
+                </a:solidFill>
+                <a:highlight>
+                  <a:srgbClr val="000000"/>
+                </a:highlight>
+                <a:latin typeface="Courier New" panose="02070309020205020404" pitchFamily="49" charset="0"/>
+                <a:cs typeface="Courier New" panose="02070309020205020404" pitchFamily="49" charset="0"/>
+              </a:rPr>
+              <a:t>E1 10 00 00</a:t>
+            </a:r>
+            <a:r>
+              <a:rPr lang="fi-FI" sz="3200" b="1" dirty="0">
+                <a:latin typeface="Courier New" panose="02070309020205020404" pitchFamily="49" charset="0"/>
+                <a:cs typeface="Courier New" panose="02070309020205020404" pitchFamily="49" charset="0"/>
+              </a:rPr>
+              <a:t> </a:t>
+            </a:r>
+            <a:r>
+              <a:rPr lang="fi-FI" sz="3200" b="1" dirty="0">
+                <a:solidFill>
+                  <a:srgbClr val="00B0F0"/>
+                </a:solidFill>
+                <a:latin typeface="Courier New" panose="02070309020205020404" pitchFamily="49" charset="0"/>
+                <a:cs typeface="Courier New" panose="02070309020205020404" pitchFamily="49" charset="0"/>
+              </a:rPr>
+              <a:t>AA AA AA AA AA AA AA AA AA AA AA AA AA AA AA AA AA AA AA AA AA AA AA AA AA AA AA AA AA AA AA AA AA AA AA AA AA AA AA AA AA AA AA AA AA AA AA AA AA AA AA AA AA AA AA AA AA AA AA AA AA AA AA AA AA AA AA AA AA AA AA AA AA AA AA AA AA AA AA AA AA AA AA AA AA AA AA AA AA AA AA AA AA AA</a:t>
+            </a:r>
+            <a:r>
+              <a:rPr lang="fi-FI" sz="3200" b="1" dirty="0">
+                <a:latin typeface="Courier New" panose="02070309020205020404" pitchFamily="49" charset="0"/>
+                <a:cs typeface="Courier New" panose="02070309020205020404" pitchFamily="49" charset="0"/>
+              </a:rPr>
+              <a:t> </a:t>
+            </a:r>
+            <a:r>
+              <a:rPr lang="fi-FI" sz="3200" b="1" dirty="0">
+                <a:highlight>
+                  <a:srgbClr val="FFFF00"/>
+                </a:highlight>
+                <a:latin typeface="Courier New" panose="02070309020205020404" pitchFamily="49" charset="0"/>
+                <a:cs typeface="Courier New" panose="02070309020205020404" pitchFamily="49" charset="0"/>
+              </a:rPr>
+              <a:t>00</a:t>
+            </a:r>
+            <a:r>
+              <a:rPr lang="fi-FI" sz="3200" b="1" dirty="0">
+                <a:highlight>
+                  <a:srgbClr val="000000"/>
+                </a:highlight>
+                <a:latin typeface="Courier New" panose="02070309020205020404" pitchFamily="49" charset="0"/>
+                <a:cs typeface="Courier New" panose="02070309020205020404" pitchFamily="49" charset="0"/>
+              </a:rPr>
+              <a:t> </a:t>
+            </a:r>
+            <a:r>
+              <a:rPr lang="fi-FI" sz="3200" b="1" dirty="0">
+                <a:highlight>
+                  <a:srgbClr val="FFFF00"/>
+                </a:highlight>
+                <a:latin typeface="Courier New" panose="02070309020205020404" pitchFamily="49" charset="0"/>
+                <a:cs typeface="Courier New" panose="02070309020205020404" pitchFamily="49" charset="0"/>
+              </a:rPr>
+              <a:t>00</a:t>
+            </a:r>
+            <a:r>
+              <a:rPr lang="fi-FI" sz="3200" b="1" dirty="0">
+                <a:highlight>
+                  <a:srgbClr val="000000"/>
+                </a:highlight>
+                <a:latin typeface="Courier New" panose="02070309020205020404" pitchFamily="49" charset="0"/>
+                <a:cs typeface="Courier New" panose="02070309020205020404" pitchFamily="49" charset="0"/>
+              </a:rPr>
+              <a:t> </a:t>
+            </a:r>
+            <a:r>
+              <a:rPr lang="fi-FI" sz="3200" b="1" dirty="0">
+                <a:solidFill>
+                  <a:schemeClr val="bg1"/>
+                </a:solidFill>
+                <a:highlight>
+                  <a:srgbClr val="000000"/>
+                </a:highlight>
+                <a:latin typeface="Courier New" panose="02070309020205020404" pitchFamily="49" charset="0"/>
+                <a:cs typeface="Courier New" panose="02070309020205020404" pitchFamily="49" charset="0"/>
+              </a:rPr>
+              <a:t>00 BD</a:t>
+            </a:r>
+            <a:r>
+              <a:rPr lang="fi-FI" sz="3200" b="1" dirty="0">
+                <a:solidFill>
+                  <a:schemeClr val="bg1"/>
+                </a:solidFill>
+                <a:latin typeface="Courier New" panose="02070309020205020404" pitchFamily="49" charset="0"/>
+                <a:cs typeface="Courier New" panose="02070309020205020404" pitchFamily="49" charset="0"/>
+              </a:rPr>
+              <a:t> </a:t>
+            </a:r>
+            <a:r>
+              <a:rPr lang="en-US" sz="3200" b="1" dirty="0">
+                <a:solidFill>
+                  <a:schemeClr val="bg1"/>
+                </a:solidFill>
+                <a:highlight>
+                  <a:srgbClr val="000000"/>
+                </a:highlight>
+                <a:latin typeface="Courier New" panose="02070309020205020404" pitchFamily="49" charset="0"/>
+                <a:cs typeface="Courier New" panose="02070309020205020404" pitchFamily="49" charset="0"/>
+              </a:rPr>
+              <a:t>04 00 00 FF</a:t>
+            </a:r>
+            <a:r>
+              <a:rPr lang="fi-FI" sz="3200" b="1" dirty="0">
+                <a:solidFill>
+                  <a:schemeClr val="bg1"/>
+                </a:solidFill>
+                <a:latin typeface="Courier New" panose="02070309020205020404" pitchFamily="49" charset="0"/>
+                <a:cs typeface="Courier New" panose="02070309020205020404" pitchFamily="49" charset="0"/>
+              </a:rPr>
+              <a:t> </a:t>
+            </a:r>
+            <a:r>
+              <a:rPr lang="en-US" sz="3200" b="1" dirty="0">
+                <a:solidFill>
+                  <a:schemeClr val="bg1"/>
+                </a:solidFill>
+                <a:highlight>
+                  <a:srgbClr val="000000"/>
+                </a:highlight>
+                <a:latin typeface="Courier New" panose="02070309020205020404" pitchFamily="49" charset="0"/>
+                <a:cs typeface="Courier New" panose="02070309020205020404" pitchFamily="49" charset="0"/>
+              </a:rPr>
+              <a:t>00 05 -- --</a:t>
+            </a:r>
+            <a:r>
+              <a:rPr lang="fi-FI" sz="3200" b="1" dirty="0">
+                <a:solidFill>
+                  <a:schemeClr val="bg1"/>
+                </a:solidFill>
+                <a:latin typeface="Courier New" panose="02070309020205020404" pitchFamily="49" charset="0"/>
+                <a:cs typeface="Courier New" panose="02070309020205020404" pitchFamily="49" charset="0"/>
+              </a:rPr>
+              <a:t> </a:t>
+            </a:r>
+            <a:r>
+              <a:rPr lang="en-US" sz="3200" b="1" dirty="0">
+                <a:solidFill>
+                  <a:schemeClr val="bg1"/>
+                </a:solidFill>
+                <a:highlight>
+                  <a:srgbClr val="000000"/>
+                </a:highlight>
+                <a:latin typeface="Courier New" panose="02070309020205020404" pitchFamily="49" charset="0"/>
+                <a:cs typeface="Courier New" panose="02070309020205020404" pitchFamily="49" charset="0"/>
+              </a:rPr>
+              <a:t>FF FF FF FF</a:t>
+            </a:r>
+            <a:r>
+              <a:rPr lang="fi-FI" sz="3200" b="1" dirty="0">
+                <a:solidFill>
+                  <a:schemeClr val="bg1"/>
+                </a:solidFill>
+                <a:latin typeface="Courier New" panose="02070309020205020404" pitchFamily="49" charset="0"/>
+                <a:cs typeface="Courier New" panose="02070309020205020404" pitchFamily="49" charset="0"/>
+              </a:rPr>
+              <a:t> </a:t>
+            </a:r>
+            <a:r>
+              <a:rPr lang="en-US" sz="3200" b="1" dirty="0">
+                <a:solidFill>
+                  <a:schemeClr val="bg1"/>
+                </a:solidFill>
+                <a:highlight>
+                  <a:srgbClr val="000000"/>
+                </a:highlight>
+                <a:latin typeface="Courier New" panose="02070309020205020404" pitchFamily="49" charset="0"/>
+                <a:cs typeface="Courier New" panose="02070309020205020404" pitchFamily="49" charset="0"/>
+              </a:rPr>
+              <a:t>00 00 -- -- </a:t>
+            </a:r>
+            <a:endParaRPr lang="en-US" sz="3200" b="1" dirty="0">
+              <a:solidFill>
+                <a:schemeClr val="bg1"/>
+              </a:solidFill>
+              <a:highlight>
+                <a:srgbClr val="000080"/>
+              </a:highlight>
+              <a:latin typeface="Courier New" panose="02070309020205020404" pitchFamily="49" charset="0"/>
+              <a:cs typeface="Courier New" panose="02070309020205020404" pitchFamily="49" charset="0"/>
+            </a:endParaRPr>
+          </a:p>
+        </p:txBody>
+      </p:sp>
+      <p:sp>
+        <p:nvSpPr>
+          <p:cNvPr id="10" name="TextBox 9"/>
+          <p:cNvSpPr txBox="1"/>
+          <p:nvPr/>
+        </p:nvSpPr>
+        <p:spPr>
+          <a:xfrm rot="16200000">
+            <a:off x="13321683" y="10954730"/>
+            <a:ext cx="2042162" cy="584775"/>
+          </a:xfrm>
+          <a:prstGeom prst="rect">
+            <a:avLst/>
+          </a:prstGeom>
+          <a:noFill/>
+        </p:spPr>
+        <p:txBody>
+          <a:bodyPr wrap="square" rtlCol="0">
+            <a:spAutoFit/>
+          </a:bodyPr>
+          <a:lstStyle/>
+          <a:p>
+            <a:r>
+              <a:rPr lang="en-US" sz="3200" dirty="0">
+                <a:latin typeface="Arial Black" panose="020B0A04020102020204" pitchFamily="34" charset="0"/>
+                <a:cs typeface="Courier New" panose="02070309020205020404" pitchFamily="49" charset="0"/>
+              </a:rPr>
+              <a:t>LOCK0</a:t>
+            </a:r>
+          </a:p>
+        </p:txBody>
+      </p:sp>
+      <p:sp>
+        <p:nvSpPr>
+          <p:cNvPr id="42" name="TextBox 41"/>
+          <p:cNvSpPr txBox="1"/>
+          <p:nvPr/>
+        </p:nvSpPr>
+        <p:spPr>
+          <a:xfrm rot="16200000">
+            <a:off x="14078931" y="10954730"/>
+            <a:ext cx="2042162" cy="584775"/>
+          </a:xfrm>
+          <a:prstGeom prst="rect">
+            <a:avLst/>
+          </a:prstGeom>
+          <a:noFill/>
+        </p:spPr>
+        <p:txBody>
+          <a:bodyPr wrap="square" rtlCol="0">
+            <a:spAutoFit/>
+          </a:bodyPr>
+          <a:lstStyle/>
+          <a:p>
+            <a:r>
+              <a:rPr lang="en-US" sz="3200" dirty="0">
+                <a:latin typeface="Arial Black" panose="020B0A04020102020204" pitchFamily="34" charset="0"/>
+                <a:cs typeface="Courier New" panose="02070309020205020404" pitchFamily="49" charset="0"/>
+              </a:rPr>
+              <a:t>LOCK1</a:t>
+            </a:r>
+          </a:p>
+        </p:txBody>
+      </p:sp>
+      <p:sp>
+        <p:nvSpPr>
+          <p:cNvPr id="45" name="TextBox 44"/>
+          <p:cNvSpPr txBox="1"/>
+          <p:nvPr/>
+        </p:nvSpPr>
+        <p:spPr>
+          <a:xfrm rot="16200000">
+            <a:off x="22161656" y="10954730"/>
+            <a:ext cx="2042162" cy="584775"/>
+          </a:xfrm>
+          <a:prstGeom prst="rect">
+            <a:avLst/>
+          </a:prstGeom>
+          <a:noFill/>
+        </p:spPr>
+        <p:txBody>
+          <a:bodyPr wrap="square" rtlCol="0">
+            <a:spAutoFit/>
+          </a:bodyPr>
+          <a:lstStyle/>
+          <a:p>
+            <a:r>
+              <a:rPr lang="en-US" sz="3200" dirty="0">
+                <a:latin typeface="Arial Black" panose="020B0A04020102020204" pitchFamily="34" charset="0"/>
+                <a:cs typeface="Courier New" panose="02070309020205020404" pitchFamily="49" charset="0"/>
+              </a:rPr>
+              <a:t>LOCK2</a:t>
+            </a:r>
+          </a:p>
+        </p:txBody>
+      </p:sp>
+      <p:sp>
+        <p:nvSpPr>
+          <p:cNvPr id="46" name="TextBox 45"/>
+          <p:cNvSpPr txBox="1"/>
+          <p:nvPr/>
+        </p:nvSpPr>
+        <p:spPr>
+          <a:xfrm rot="16200000">
+            <a:off x="22894082" y="10954730"/>
+            <a:ext cx="2042162" cy="584775"/>
+          </a:xfrm>
+          <a:prstGeom prst="rect">
+            <a:avLst/>
+          </a:prstGeom>
+          <a:noFill/>
+        </p:spPr>
+        <p:txBody>
+          <a:bodyPr wrap="square" rtlCol="0">
+            <a:spAutoFit/>
+          </a:bodyPr>
+          <a:lstStyle/>
+          <a:p>
+            <a:r>
+              <a:rPr lang="en-US" sz="3200" dirty="0">
+                <a:latin typeface="Arial Black" panose="020B0A04020102020204" pitchFamily="34" charset="0"/>
+                <a:cs typeface="Courier New" panose="02070309020205020404" pitchFamily="49" charset="0"/>
+              </a:rPr>
+              <a:t>LOCK3</a:t>
+            </a:r>
+          </a:p>
+        </p:txBody>
+      </p:sp>
+      <p:sp>
+        <p:nvSpPr>
+          <p:cNvPr id="48" name="Pentagon 47"/>
+          <p:cNvSpPr/>
+          <p:nvPr/>
+        </p:nvSpPr>
+        <p:spPr>
+          <a:xfrm rot="5400000">
+            <a:off x="23241919" y="19076660"/>
+            <a:ext cx="2983242" cy="491523"/>
+          </a:xfrm>
+          <a:prstGeom prst="homePlate">
+            <a:avLst/>
+          </a:prstGeom>
+          <a:solidFill>
+            <a:srgbClr val="FFFF00"/>
+          </a:solidFill>
+        </p:spPr>
+        <p:style>
+          <a:lnRef idx="0">
+            <a:schemeClr val="accent6"/>
+          </a:lnRef>
+          <a:fillRef idx="3">
+            <a:schemeClr val="accent6"/>
+          </a:fillRef>
+          <a:effectRef idx="3">
+            <a:schemeClr val="accent6"/>
+          </a:effectRef>
+          <a:fontRef idx="minor">
+            <a:schemeClr val="lt1"/>
+          </a:fontRef>
+        </p:style>
+        <p:txBody>
+          <a:bodyPr rtlCol="0" anchor="ctr"/>
+          <a:lstStyle/>
+          <a:p>
+            <a:pPr algn="ctr"/>
+            <a:endParaRPr lang="en-US"/>
+          </a:p>
+        </p:txBody>
+      </p:sp>
+      <p:sp>
+        <p:nvSpPr>
+          <p:cNvPr id="49" name="Pentagon 48"/>
+          <p:cNvSpPr/>
+          <p:nvPr/>
+        </p:nvSpPr>
+        <p:spPr>
+          <a:xfrm rot="5400000">
+            <a:off x="22498966" y="19084280"/>
+            <a:ext cx="2983242" cy="491523"/>
+          </a:xfrm>
+          <a:prstGeom prst="homePlate">
+            <a:avLst/>
+          </a:prstGeom>
+          <a:solidFill>
+            <a:srgbClr val="FFFF00"/>
+          </a:solidFill>
+        </p:spPr>
+        <p:style>
+          <a:lnRef idx="0">
+            <a:schemeClr val="accent6"/>
+          </a:lnRef>
+          <a:fillRef idx="3">
+            <a:schemeClr val="accent6"/>
+          </a:fillRef>
+          <a:effectRef idx="3">
+            <a:schemeClr val="accent6"/>
+          </a:effectRef>
+          <a:fontRef idx="minor">
+            <a:schemeClr val="lt1"/>
+          </a:fontRef>
+        </p:style>
+        <p:txBody>
+          <a:bodyPr vert="wordArtVert" rtlCol="0" anchor="ctr"/>
+          <a:lstStyle/>
+          <a:p>
+            <a:pPr algn="ctr"/>
+            <a:endParaRPr lang="en-US" dirty="0"/>
+          </a:p>
+        </p:txBody>
+      </p:sp>
+      <p:sp>
+        <p:nvSpPr>
+          <p:cNvPr id="50" name="Pentagon 49"/>
+          <p:cNvSpPr/>
+          <p:nvPr/>
+        </p:nvSpPr>
+        <p:spPr>
+          <a:xfrm rot="5400000">
+            <a:off x="13933571" y="18642164"/>
+            <a:ext cx="3998234" cy="491523"/>
+          </a:xfrm>
+          <a:prstGeom prst="homePlate">
+            <a:avLst/>
+          </a:prstGeom>
+          <a:solidFill>
+            <a:srgbClr val="FFFF00"/>
+          </a:solidFill>
+        </p:spPr>
+        <p:style>
+          <a:lnRef idx="0">
+            <a:schemeClr val="accent6"/>
+          </a:lnRef>
+          <a:fillRef idx="3">
+            <a:schemeClr val="accent6"/>
+          </a:fillRef>
+          <a:effectRef idx="3">
+            <a:schemeClr val="accent6"/>
+          </a:effectRef>
+          <a:fontRef idx="minor">
+            <a:schemeClr val="lt1"/>
+          </a:fontRef>
+        </p:style>
+        <p:txBody>
+          <a:bodyPr rtlCol="0" anchor="ctr"/>
+          <a:lstStyle/>
+          <a:p>
+            <a:pPr algn="ctr"/>
+            <a:endParaRPr lang="en-US"/>
+          </a:p>
+        </p:txBody>
+      </p:sp>
+      <p:sp>
+        <p:nvSpPr>
+          <p:cNvPr id="51" name="Pentagon 50"/>
+          <p:cNvSpPr/>
+          <p:nvPr/>
+        </p:nvSpPr>
+        <p:spPr>
+          <a:xfrm rot="5400000">
+            <a:off x="13190618" y="18649784"/>
+            <a:ext cx="3998234" cy="491523"/>
+          </a:xfrm>
+          <a:prstGeom prst="homePlate">
+            <a:avLst/>
+          </a:prstGeom>
+          <a:solidFill>
+            <a:srgbClr val="FFFF00"/>
+          </a:solidFill>
+        </p:spPr>
+        <p:style>
+          <a:lnRef idx="0">
+            <a:schemeClr val="accent6"/>
+          </a:lnRef>
+          <a:fillRef idx="3">
+            <a:schemeClr val="accent6"/>
+          </a:fillRef>
+          <a:effectRef idx="3">
+            <a:schemeClr val="accent6"/>
+          </a:effectRef>
+          <a:fontRef idx="minor">
+            <a:schemeClr val="lt1"/>
+          </a:fontRef>
+        </p:style>
+        <p:txBody>
+          <a:bodyPr rtlCol="0" anchor="ctr"/>
+          <a:lstStyle/>
+          <a:p>
+            <a:pPr algn="ctr"/>
+            <a:endParaRPr lang="en-US"/>
+          </a:p>
+        </p:txBody>
+      </p:sp>
+      <p:sp>
+        <p:nvSpPr>
+          <p:cNvPr id="52" name="TextBox 51"/>
+          <p:cNvSpPr txBox="1"/>
+          <p:nvPr/>
+        </p:nvSpPr>
+        <p:spPr>
+          <a:xfrm rot="5400000">
+            <a:off x="23113016" y="19264345"/>
+            <a:ext cx="1755144" cy="584775"/>
+          </a:xfrm>
+          <a:prstGeom prst="rect">
+            <a:avLst/>
+          </a:prstGeom>
+          <a:noFill/>
+        </p:spPr>
+        <p:txBody>
+          <a:bodyPr wrap="square" rtlCol="0">
+            <a:spAutoFit/>
+          </a:bodyPr>
+          <a:lstStyle/>
+          <a:p>
+            <a:r>
+              <a:rPr lang="en-US" sz="3200" dirty="0">
+                <a:latin typeface="Arial Black" panose="020B0A04020102020204" pitchFamily="34" charset="0"/>
+                <a:cs typeface="Courier New" panose="02070309020205020404" pitchFamily="49" charset="0"/>
+              </a:rPr>
+              <a:t>LOCK2</a:t>
+            </a:r>
+          </a:p>
+        </p:txBody>
+      </p:sp>
+      <p:sp>
+        <p:nvSpPr>
+          <p:cNvPr id="53" name="TextBox 52"/>
+          <p:cNvSpPr txBox="1"/>
+          <p:nvPr/>
+        </p:nvSpPr>
+        <p:spPr>
+          <a:xfrm rot="5400000">
+            <a:off x="23845442" y="19264345"/>
+            <a:ext cx="1755143" cy="584775"/>
+          </a:xfrm>
+          <a:prstGeom prst="rect">
+            <a:avLst/>
+          </a:prstGeom>
+          <a:noFill/>
+        </p:spPr>
+        <p:txBody>
+          <a:bodyPr wrap="square" rtlCol="0">
+            <a:spAutoFit/>
+          </a:bodyPr>
+          <a:lstStyle/>
+          <a:p>
+            <a:r>
+              <a:rPr lang="en-US" sz="3200" dirty="0">
+                <a:latin typeface="Arial Black" panose="020B0A04020102020204" pitchFamily="34" charset="0"/>
+                <a:cs typeface="Courier New" panose="02070309020205020404" pitchFamily="49" charset="0"/>
+              </a:rPr>
+              <a:t>LOCK3</a:t>
+            </a:r>
+          </a:p>
+        </p:txBody>
+      </p:sp>
+      <p:sp>
+        <p:nvSpPr>
+          <p:cNvPr id="54" name="TextBox 53"/>
+          <p:cNvSpPr txBox="1"/>
+          <p:nvPr/>
+        </p:nvSpPr>
+        <p:spPr>
+          <a:xfrm rot="5400000">
+            <a:off x="14293733" y="19335292"/>
+            <a:ext cx="1764958" cy="584775"/>
+          </a:xfrm>
+          <a:prstGeom prst="rect">
+            <a:avLst/>
+          </a:prstGeom>
+          <a:noFill/>
+        </p:spPr>
+        <p:txBody>
+          <a:bodyPr wrap="square" rtlCol="0">
+            <a:spAutoFit/>
+          </a:bodyPr>
+          <a:lstStyle/>
+          <a:p>
+            <a:r>
+              <a:rPr lang="en-US" sz="3200" dirty="0">
+                <a:latin typeface="Arial Black" panose="020B0A04020102020204" pitchFamily="34" charset="0"/>
+                <a:cs typeface="Courier New" panose="02070309020205020404" pitchFamily="49" charset="0"/>
+              </a:rPr>
+              <a:t>LOCK0</a:t>
+            </a:r>
+          </a:p>
+        </p:txBody>
+      </p:sp>
+      <p:sp>
+        <p:nvSpPr>
+          <p:cNvPr id="55" name="TextBox 54"/>
+          <p:cNvSpPr txBox="1"/>
+          <p:nvPr/>
+        </p:nvSpPr>
+        <p:spPr>
+          <a:xfrm rot="5400000">
+            <a:off x="15055734" y="19335291"/>
+            <a:ext cx="1764956" cy="584775"/>
+          </a:xfrm>
+          <a:prstGeom prst="rect">
+            <a:avLst/>
+          </a:prstGeom>
+          <a:noFill/>
+        </p:spPr>
+        <p:txBody>
+          <a:bodyPr wrap="square" rtlCol="0">
+            <a:spAutoFit/>
+          </a:bodyPr>
+          <a:lstStyle/>
+          <a:p>
+            <a:r>
+              <a:rPr lang="en-US" sz="3200" dirty="0">
+                <a:latin typeface="Arial Black" panose="020B0A04020102020204" pitchFamily="34" charset="0"/>
+                <a:cs typeface="Courier New" panose="02070309020205020404" pitchFamily="49" charset="0"/>
+              </a:rPr>
+              <a:t>LOCK1</a:t>
+            </a:r>
+          </a:p>
+        </p:txBody>
+      </p:sp>
+      <p:sp>
+        <p:nvSpPr>
+          <p:cNvPr id="47" name="Rectangle 46"/>
+          <p:cNvSpPr/>
+          <p:nvPr/>
+        </p:nvSpPr>
+        <p:spPr>
+          <a:xfrm>
+            <a:off x="7526256" y="16764000"/>
+            <a:ext cx="32409079" cy="1569660"/>
+          </a:xfrm>
+          <a:prstGeom prst="rect">
+            <a:avLst/>
+          </a:prstGeom>
+          <a:noFill/>
+          <a:ln>
+            <a:noFill/>
+          </a:ln>
+        </p:spPr>
+        <p:txBody>
+          <a:bodyPr wrap="square">
+            <a:spAutoFit/>
+          </a:bodyPr>
+          <a:lstStyle/>
+          <a:p>
+            <a:r>
+              <a:rPr lang="en-US" sz="3200" b="1" dirty="0">
+                <a:solidFill>
+                  <a:schemeClr val="bg1"/>
+                </a:solidFill>
+                <a:highlight>
+                  <a:srgbClr val="000000"/>
+                </a:highlight>
+                <a:latin typeface="Courier New" panose="02070309020205020404" pitchFamily="49" charset="0"/>
+                <a:cs typeface="Courier New" panose="02070309020205020404" pitchFamily="49" charset="0"/>
+              </a:rPr>
+              <a:t>04 80 16 1A</a:t>
+            </a:r>
+            <a:r>
+              <a:rPr lang="en-US" sz="3200" b="1" dirty="0">
+                <a:solidFill>
+                  <a:schemeClr val="bg1"/>
+                </a:solidFill>
+                <a:latin typeface="Courier New" panose="02070309020205020404" pitchFamily="49" charset="0"/>
+                <a:cs typeface="Courier New" panose="02070309020205020404" pitchFamily="49" charset="0"/>
+              </a:rPr>
+              <a:t> </a:t>
+            </a:r>
+            <a:r>
+              <a:rPr lang="en-US" sz="3200" b="1" dirty="0">
+                <a:solidFill>
+                  <a:schemeClr val="bg1"/>
+                </a:solidFill>
+                <a:highlight>
+                  <a:srgbClr val="000000"/>
+                </a:highlight>
+                <a:latin typeface="Courier New" panose="02070309020205020404" pitchFamily="49" charset="0"/>
+                <a:cs typeface="Courier New" panose="02070309020205020404" pitchFamily="49" charset="0"/>
+              </a:rPr>
+              <a:t>52 A3 40 80</a:t>
             </a:r>
             <a:r>
               <a:rPr lang="en-US" sz="3200" b="1" dirty="0">
@@ -6073,111 +6134,243 @@
               <a:t> </a:t>
             </a:r>
             <a:r>
-              <a:rPr lang="en-US" sz="3200" b="1" dirty="0" err="1">
+              <a:rPr lang="en-US" sz="3200" b="1" dirty="0">
+                <a:solidFill>
+                  <a:schemeClr val="bg1"/>
+                </a:solidFill>
+                <a:highlight>
+                  <a:srgbClr val="000000"/>
+                </a:highlight>
                 <a:latin typeface="Courier New" panose="02070309020205020404" pitchFamily="49" charset="0"/>
                 <a:cs typeface="Courier New" panose="02070309020205020404" pitchFamily="49" charset="0"/>
               </a:rPr>
-              <a:t>AA</a:t>
-            </a:r>
-            <a:r>
-              <a:rPr lang="en-US" sz="3200" b="1" dirty="0">
+              <a:t>31 48 </a:t>
+            </a:r>
+            <a:r>
+              <a:rPr lang="fi-FI" sz="3200" b="1" dirty="0">
+                <a:highlight>
+                  <a:srgbClr val="FFFF00"/>
+                </a:highlight>
+                <a:latin typeface="Courier New" panose="02070309020205020404" pitchFamily="49" charset="0"/>
+                <a:cs typeface="Courier New" panose="02070309020205020404" pitchFamily="49" charset="0"/>
+              </a:rPr>
+              <a:t>00</a:t>
+            </a:r>
+            <a:r>
+              <a:rPr lang="fi-FI" sz="3200" b="1" dirty="0">
+                <a:solidFill>
+                  <a:schemeClr val="bg1"/>
+                </a:solidFill>
+                <a:highlight>
+                  <a:srgbClr val="000000"/>
+                </a:highlight>
                 <a:latin typeface="Courier New" panose="02070309020205020404" pitchFamily="49" charset="0"/>
                 <a:cs typeface="Courier New" panose="02070309020205020404" pitchFamily="49" charset="0"/>
               </a:rPr>
               <a:t> </a:t>
             </a:r>
             <a:r>
-              <a:rPr lang="en-US" sz="3200" b="1" dirty="0" err="1">
+              <a:rPr lang="fi-FI" sz="3200" b="1" dirty="0">
+                <a:highlight>
+                  <a:srgbClr val="FFFF00"/>
+                </a:highlight>
                 <a:latin typeface="Courier New" panose="02070309020205020404" pitchFamily="49" charset="0"/>
                 <a:cs typeface="Courier New" panose="02070309020205020404" pitchFamily="49" charset="0"/>
               </a:rPr>
-              <a:t>AA</a:t>
-            </a:r>
-            <a:r>
-              <a:rPr lang="en-US" sz="3200" b="1" dirty="0">
+              <a:t>00</a:t>
+            </a:r>
+            <a:r>
+              <a:rPr lang="fi-FI" sz="3200" b="1" dirty="0">
+                <a:solidFill>
+                  <a:schemeClr val="bg1"/>
+                </a:solidFill>
                 <a:latin typeface="Courier New" panose="02070309020205020404" pitchFamily="49" charset="0"/>
                 <a:cs typeface="Courier New" panose="02070309020205020404" pitchFamily="49" charset="0"/>
               </a:rPr>
               <a:t> </a:t>
             </a:r>
             <a:r>
-              <a:rPr lang="en-US" sz="3200" b="1" dirty="0" err="1">
+              <a:rPr lang="en-US" sz="3200" b="1" dirty="0">
+                <a:solidFill>
+                  <a:schemeClr val="bg1"/>
+                </a:solidFill>
+                <a:highlight>
+                  <a:srgbClr val="000000"/>
+                </a:highlight>
                 <a:latin typeface="Courier New" panose="02070309020205020404" pitchFamily="49" charset="0"/>
                 <a:cs typeface="Courier New" panose="02070309020205020404" pitchFamily="49" charset="0"/>
               </a:rPr>
-              <a:t>AA</a:t>
-            </a:r>
-            <a:r>
-              <a:rPr lang="en-US" sz="3200" b="1" dirty="0">
+              <a:t>E1 10 00 00</a:t>
+            </a:r>
+            <a:r>
+              <a:rPr lang="fi-FI" sz="3200" b="1" dirty="0">
                 <a:latin typeface="Courier New" panose="02070309020205020404" pitchFamily="49" charset="0"/>
                 <a:cs typeface="Courier New" panose="02070309020205020404" pitchFamily="49" charset="0"/>
               </a:rPr>
               <a:t> </a:t>
             </a:r>
             <a:r>
-              <a:rPr lang="en-US" sz="3200" b="1" dirty="0" err="1">
+              <a:rPr lang="fi-FI" sz="3200" b="1" dirty="0">
+                <a:solidFill>
+                  <a:schemeClr val="accent3"/>
+                </a:solidFill>
                 <a:latin typeface="Courier New" panose="02070309020205020404" pitchFamily="49" charset="0"/>
                 <a:cs typeface="Courier New" panose="02070309020205020404" pitchFamily="49" charset="0"/>
               </a:rPr>
-              <a:t>AA</a:t>
-            </a:r>
-            <a:r>
-              <a:rPr lang="en-US" sz="3200" b="1" dirty="0">
+              <a:t>AA AA AA AA AA AA AA AA AA AA AA AA AA AA AA AA AA AA AA AA AA AA AA AA AA AA AA AA AA AA AA AA AA AA AA AA AA AA AA AA AA AA AA AA AA AA AA AA AA AA AA AA AA AA AA AA AA AA AA AA AA AA AA AA AA AA AA AA AA AA AA AA AA AA AA AA AA AA AA AA AA AA AA AA AA AA AA AA AA AA AA AA AA AA </a:t>
+            </a:r>
+            <a:r>
+              <a:rPr lang="fi-FI" sz="3200" b="1" dirty="0">
+                <a:highlight>
+                  <a:srgbClr val="FFFF00"/>
+                </a:highlight>
+                <a:latin typeface="Courier New" panose="02070309020205020404" pitchFamily="49" charset="0"/>
+                <a:cs typeface="Courier New" panose="02070309020205020404" pitchFamily="49" charset="0"/>
+              </a:rPr>
+              <a:t>00</a:t>
+            </a:r>
+            <a:r>
+              <a:rPr lang="fi-FI" sz="3200" b="1" dirty="0">
+                <a:highlight>
+                  <a:srgbClr val="000000"/>
+                </a:highlight>
                 <a:latin typeface="Courier New" panose="02070309020205020404" pitchFamily="49" charset="0"/>
                 <a:cs typeface="Courier New" panose="02070309020205020404" pitchFamily="49" charset="0"/>
               </a:rPr>
               <a:t> </a:t>
             </a:r>
             <a:r>
-              <a:rPr lang="en-US" sz="3200" b="1" dirty="0" err="1">
+              <a:rPr lang="fi-FI" sz="3200" b="1" dirty="0">
+                <a:highlight>
+                  <a:srgbClr val="FFFF00"/>
+                </a:highlight>
                 <a:latin typeface="Courier New" panose="02070309020205020404" pitchFamily="49" charset="0"/>
                 <a:cs typeface="Courier New" panose="02070309020205020404" pitchFamily="49" charset="0"/>
               </a:rPr>
-              <a:t>AA</a:t>
-            </a:r>
-            <a:r>
-              <a:rPr lang="en-US" sz="3200" b="1" dirty="0">
+              <a:t>00</a:t>
+            </a:r>
+            <a:r>
+              <a:rPr lang="fi-FI" sz="3200" b="1" dirty="0">
+                <a:highlight>
+                  <a:srgbClr val="000000"/>
+                </a:highlight>
                 <a:latin typeface="Courier New" panose="02070309020205020404" pitchFamily="49" charset="0"/>
                 <a:cs typeface="Courier New" panose="02070309020205020404" pitchFamily="49" charset="0"/>
               </a:rPr>
               <a:t> </a:t>
             </a:r>
             <a:r>
-              <a:rPr lang="en-US" sz="3200" b="1" dirty="0" err="1">
+              <a:rPr lang="fi-FI" sz="3200" b="1" dirty="0">
+                <a:solidFill>
+                  <a:schemeClr val="bg1"/>
+                </a:solidFill>
+                <a:highlight>
+                  <a:srgbClr val="000000"/>
+                </a:highlight>
                 <a:latin typeface="Courier New" panose="02070309020205020404" pitchFamily="49" charset="0"/>
                 <a:cs typeface="Courier New" panose="02070309020205020404" pitchFamily="49" charset="0"/>
               </a:rPr>
-              <a:t>AA</a:t>
-            </a:r>
-            <a:r>
-              <a:rPr lang="en-US" sz="3200" b="1" dirty="0">
+              <a:t>00 BD</a:t>
+            </a:r>
+            <a:r>
+              <a:rPr lang="fi-FI" sz="3200" b="1" dirty="0">
+                <a:solidFill>
+                  <a:schemeClr val="bg1"/>
+                </a:solidFill>
                 <a:latin typeface="Courier New" panose="02070309020205020404" pitchFamily="49" charset="0"/>
                 <a:cs typeface="Courier New" panose="02070309020205020404" pitchFamily="49" charset="0"/>
               </a:rPr>
               <a:t> </a:t>
             </a:r>
             <a:r>
-              <a:rPr lang="en-US" sz="3200" b="1" dirty="0" err="1">
+              <a:rPr lang="en-US" sz="3200" b="1" dirty="0">
+                <a:solidFill>
+                  <a:schemeClr val="bg1"/>
+                </a:solidFill>
+                <a:highlight>
+                  <a:srgbClr val="000000"/>
+                </a:highlight>
                 <a:latin typeface="Courier New" panose="02070309020205020404" pitchFamily="49" charset="0"/>
                 <a:cs typeface="Courier New" panose="02070309020205020404" pitchFamily="49" charset="0"/>
               </a:rPr>
-              <a:t>AA</a:t>
-            </a:r>
-            <a:r>
-              <a:rPr lang="en-US" sz="3200" b="1" dirty="0">
+              <a:t>04 00 00 FF</a:t>
+            </a:r>
+            <a:r>
+              <a:rPr lang="fi-FI" sz="3200" b="1" dirty="0">
+                <a:solidFill>
+                  <a:schemeClr val="bg1"/>
+                </a:solidFill>
                 <a:latin typeface="Courier New" panose="02070309020205020404" pitchFamily="49" charset="0"/>
                 <a:cs typeface="Courier New" panose="02070309020205020404" pitchFamily="49" charset="0"/>
               </a:rPr>
               <a:t> </a:t>
             </a:r>
             <a:r>
-              <a:rPr lang="fi-FI" sz="3200" b="1" dirty="0">
+              <a:rPr lang="en-US" sz="3200" b="1" dirty="0">
+                <a:solidFill>
+                  <a:schemeClr val="bg1"/>
+                </a:solidFill>
+                <a:highlight>
+                  <a:srgbClr val="000000"/>
+                </a:highlight>
                 <a:latin typeface="Courier New" panose="02070309020205020404" pitchFamily="49" charset="0"/>
                 <a:cs typeface="Courier New" panose="02070309020205020404" pitchFamily="49" charset="0"/>
               </a:rPr>
-              <a:t>AA AA AA AA AA AA AA AA AA AA AA AA AA AA AA AA AA AA AA AA AA AA AA AA AA AA AA AA AA AA AA AA AA AA AA AA AA AA AA AA AA AA AA AA AA AA AA AA AA AA AA AA AA AA AA AA AA AA AA AA AA AA AA AA AA AA AA AA AA AA AA AA AA AA AA AA AA AA AA AA AA AA AA AA AA AA AA AA AA AA AA AA AA AA AA AA AA AA AA AA AA AA AA AA AA AA AA AA AA AA AA AA AA AA AA AA AA AA AA AA </a:t>
+              <a:t>00 05 -- --</a:t>
+            </a:r>
+            <a:r>
+              <a:rPr lang="fi-FI" sz="3200" b="1" dirty="0">
+                <a:solidFill>
+                  <a:schemeClr val="bg1"/>
+                </a:solidFill>
+                <a:latin typeface="Courier New" panose="02070309020205020404" pitchFamily="49" charset="0"/>
+                <a:cs typeface="Courier New" panose="02070309020205020404" pitchFamily="49" charset="0"/>
+              </a:rPr>
+              <a:t> </a:t>
+            </a:r>
+            <a:r>
+              <a:rPr lang="en-US" sz="3200" b="1" dirty="0">
+                <a:solidFill>
+                  <a:schemeClr val="bg1"/>
+                </a:solidFill>
+                <a:highlight>
+                  <a:srgbClr val="000000"/>
+                </a:highlight>
+                <a:latin typeface="Courier New" panose="02070309020205020404" pitchFamily="49" charset="0"/>
+                <a:cs typeface="Courier New" panose="02070309020205020404" pitchFamily="49" charset="0"/>
+              </a:rPr>
+              <a:t>FF FF FF FF</a:t>
+            </a:r>
+            <a:r>
+              <a:rPr lang="fi-FI" sz="3200" b="1" dirty="0">
+                <a:solidFill>
+                  <a:schemeClr val="bg1"/>
+                </a:solidFill>
+                <a:latin typeface="Courier New" panose="02070309020205020404" pitchFamily="49" charset="0"/>
+                <a:cs typeface="Courier New" panose="02070309020205020404" pitchFamily="49" charset="0"/>
+              </a:rPr>
+              <a:t> </a:t>
+            </a:r>
+            <a:r>
+              <a:rPr lang="en-US" sz="3200" b="1" dirty="0">
+                <a:solidFill>
+                  <a:schemeClr val="bg1"/>
+                </a:solidFill>
+                <a:highlight>
+                  <a:srgbClr val="000000"/>
+                </a:highlight>
+                <a:latin typeface="Courier New" panose="02070309020205020404" pitchFamily="49" charset="0"/>
+                <a:cs typeface="Courier New" panose="02070309020205020404" pitchFamily="49" charset="0"/>
+              </a:rPr>
+              <a:t>00 00 -- -- </a:t>
             </a:r>
             <a:endParaRPr lang="en-US" sz="3200" b="1" dirty="0">
+              <a:solidFill>
+                <a:schemeClr val="bg1"/>
+              </a:solidFill>
+              <a:highlight>
+                <a:srgbClr val="000080"/>
+              </a:highlight>
               <a:latin typeface="Courier New" panose="02070309020205020404" pitchFamily="49" charset="0"/>
               <a:cs typeface="Courier New" panose="02070309020205020404" pitchFamily="49" charset="0"/>
             </a:endParaRPr>
@@ -6266,7 +6459,7 @@
         </p:blipFill>
         <p:spPr>
           <a:xfrm>
-            <a:off x="29794200" y="11582400"/>
+            <a:off x="29794200" y="12885763"/>
             <a:ext cx="5127475" cy="5334000"/>
           </a:xfrm>
           <a:prstGeom prst="rect">
@@ -6317,7 +6510,7 @@
         </p:blipFill>
         <p:spPr>
           <a:xfrm>
-            <a:off x="8382000" y="179691"/>
+            <a:off x="8602195" y="179691"/>
             <a:ext cx="5952005" cy="32702614"/>
           </a:xfrm>
           <a:prstGeom prst="rect">
@@ -6368,8 +6561,8 @@
         </p:blipFill>
         <p:spPr>
           <a:xfrm>
-            <a:off x="16459200" y="22098001"/>
-            <a:ext cx="10946680" cy="3845070"/>
+            <a:off x="30133504" y="22804130"/>
+            <a:ext cx="13426001" cy="4791381"/>
           </a:xfrm>
           <a:prstGeom prst="rect">
             <a:avLst/>
@@ -6398,8 +6591,8 @@
         </p:blipFill>
         <p:spPr>
           <a:xfrm>
-            <a:off x="16459200" y="26553138"/>
-            <a:ext cx="10946680" cy="4547082"/>
+            <a:off x="30155916" y="27885149"/>
+            <a:ext cx="13430484" cy="4800599"/>
           </a:xfrm>
           <a:prstGeom prst="rect">
             <a:avLst/>
@@ -6428,7 +6621,7 @@
         </p:blipFill>
         <p:spPr>
           <a:xfrm>
-            <a:off x="15373117" y="9601200"/>
+            <a:off x="15373117" y="11125200"/>
             <a:ext cx="13430483" cy="11133163"/>
           </a:xfrm>
           <a:prstGeom prst="rect">
@@ -6447,6 +6640,717 @@
           </a:effectLst>
         </p:spPr>
       </p:pic>
+      <p:sp>
+        <p:nvSpPr>
+          <p:cNvPr id="8" name="Text Box 18"/>
+          <p:cNvSpPr txBox="1">
+            <a:spLocks noChangeArrowheads="1"/>
+          </p:cNvSpPr>
+          <p:nvPr/>
+        </p:nvSpPr>
+        <p:spPr bwMode="auto">
+          <a:xfrm>
+            <a:off x="381000" y="12496800"/>
+            <a:ext cx="7848600" cy="6477000"/>
+          </a:xfrm>
+          <a:prstGeom prst="rect">
+            <a:avLst/>
+          </a:prstGeom>
+          <a:solidFill>
+            <a:schemeClr val="bg1"/>
+          </a:solidFill>
+          <a:ln>
+            <a:noFill/>
+            <a:headEnd/>
+            <a:tailEnd/>
+          </a:ln>
+          <a:effectLst>
+            <a:outerShdw blurRad="149987" dist="250190" dir="8460000" algn="ctr">
+              <a:srgbClr val="000000">
+                <a:alpha val="28000"/>
+              </a:srgbClr>
+            </a:outerShdw>
+          </a:effectLst>
+          <a:scene3d>
+            <a:camera prst="orthographicFront">
+              <a:rot lat="0" lon="0" rev="0"/>
+            </a:camera>
+            <a:lightRig rig="contrasting" dir="t">
+              <a:rot lat="0" lon="0" rev="1500000"/>
+            </a:lightRig>
+          </a:scene3d>
+          <a:sp3d prstMaterial="metal">
+            <a:bevelT w="88900" h="88900"/>
+          </a:sp3d>
+          <a:extLst/>
+        </p:spPr>
+        <p:style>
+          <a:lnRef idx="2">
+            <a:schemeClr val="accent6"/>
+          </a:lnRef>
+          <a:fillRef idx="1">
+            <a:schemeClr val="lt1"/>
+          </a:fillRef>
+          <a:effectRef idx="0">
+            <a:schemeClr val="accent6"/>
+          </a:effectRef>
+          <a:fontRef idx="minor">
+            <a:schemeClr val="dk1"/>
+          </a:fontRef>
+        </p:style>
+        <p:txBody>
+          <a:bodyPr lIns="228600" tIns="228600" rIns="228600" bIns="228600"/>
+          <a:lstStyle/>
+          <a:p>
+            <a:pPr marL="0" marR="0" lvl="0" indent="0" algn="just" defTabSz="457200" eaLnBrk="1" fontAlgn="auto" latinLnBrk="0" hangingPunct="1">
+              <a:lnSpc>
+                <a:spcPct val="100000"/>
+              </a:lnSpc>
+              <a:spcBef>
+                <a:spcPts val="0"/>
+              </a:spcBef>
+              <a:spcAft>
+                <a:spcPts val="0"/>
+              </a:spcAft>
+              <a:buClrTx/>
+              <a:buSzTx/>
+              <a:buFontTx/>
+              <a:buNone/>
+              <a:tabLst/>
+              <a:defRPr/>
+            </a:pPr>
+            <a:r>
+              <a:rPr lang="en-US" sz="3600" kern="0" dirty="0">
+                <a:latin typeface="Century Schoolbook" panose="02040604050505020304"/>
+              </a:rPr>
+              <a:t>Near Field Communication (NFC) was developed to enable contactless transmission of data. This poster focuses on the electromechanical properties of technology that can generate a message using an Android device (smartphone) and illustrating the standardized format of a typical message facilitating the exchange (NDEF).</a:t>
+            </a:r>
+          </a:p>
+          <a:p>
+            <a:pPr lvl="0" algn="just" defTabSz="457200">
+              <a:defRPr/>
+            </a:pPr>
+            <a:endParaRPr lang="en-US" sz="3600" kern="0" dirty="0">
+              <a:latin typeface="Century Schoolbook" panose="02040604050505020304"/>
+            </a:endParaRPr>
+          </a:p>
+          <a:p>
+            <a:pPr marL="0" marR="0" lvl="0" indent="0" algn="just" defTabSz="457200" eaLnBrk="1" fontAlgn="auto" latinLnBrk="0" hangingPunct="1">
+              <a:lnSpc>
+                <a:spcPct val="100000"/>
+              </a:lnSpc>
+              <a:spcBef>
+                <a:spcPts val="0"/>
+              </a:spcBef>
+              <a:spcAft>
+                <a:spcPts val="0"/>
+              </a:spcAft>
+              <a:buClrTx/>
+              <a:buSzTx/>
+              <a:buFontTx/>
+              <a:buNone/>
+              <a:tabLst/>
+              <a:defRPr/>
+            </a:pPr>
+            <a:endParaRPr kumimoji="0" lang="en-US" sz="1800" b="0" i="0" u="none" strike="noStrike" kern="0" cap="none" spc="0" normalizeH="0" baseline="0" noProof="0" dirty="0">
+              <a:ln>
+                <a:noFill/>
+              </a:ln>
+              <a:effectLst/>
+              <a:uLnTx/>
+              <a:uFillTx/>
+              <a:latin typeface="Century Schoolbook" panose="02040604050505020304"/>
+            </a:endParaRPr>
+          </a:p>
+          <a:p>
+            <a:pPr marL="0" marR="0" lvl="0" indent="0" algn="just" defTabSz="457200" eaLnBrk="1" fontAlgn="auto" latinLnBrk="0" hangingPunct="1">
+              <a:lnSpc>
+                <a:spcPct val="100000"/>
+              </a:lnSpc>
+              <a:spcBef>
+                <a:spcPts val="0"/>
+              </a:spcBef>
+              <a:spcAft>
+                <a:spcPts val="0"/>
+              </a:spcAft>
+              <a:buClrTx/>
+              <a:buSzTx/>
+              <a:buFontTx/>
+              <a:buNone/>
+              <a:tabLst/>
+              <a:defRPr/>
+            </a:pPr>
+            <a:endParaRPr kumimoji="0" lang="en-US" sz="1800" b="0" i="0" u="none" strike="noStrike" kern="0" cap="none" spc="0" normalizeH="0" baseline="0" noProof="0" dirty="0">
+              <a:ln>
+                <a:noFill/>
+              </a:ln>
+              <a:effectLst/>
+              <a:uLnTx/>
+              <a:uFillTx/>
+              <a:latin typeface="Century Schoolbook" panose="02040604050505020304"/>
+            </a:endParaRPr>
+          </a:p>
+        </p:txBody>
+      </p:sp>
+      <p:sp>
+        <p:nvSpPr>
+          <p:cNvPr id="9" name="Text Box 27"/>
+          <p:cNvSpPr txBox="1">
+            <a:spLocks noChangeArrowheads="1"/>
+          </p:cNvSpPr>
+          <p:nvPr/>
+        </p:nvSpPr>
+        <p:spPr bwMode="auto">
+          <a:xfrm>
+            <a:off x="428906" y="11493125"/>
+            <a:ext cx="7752789" cy="1003675"/>
+          </a:xfrm>
+          <a:prstGeom prst="rect">
+            <a:avLst/>
+          </a:prstGeom>
+          <a:noFill/>
+          <a:ln>
+            <a:noFill/>
+          </a:ln>
+          <a:effectLst/>
+          <a:extLst>
+            <a:ext uri="{909E8E84-426E-40DD-AFC4-6F175D3DCCD1}">
+              <a14:hiddenFill xmlns:a14="http://schemas.microsoft.com/office/drawing/2010/main">
+                <a:solidFill>
+                  <a:schemeClr val="accent1"/>
+                </a:solidFill>
+              </a14:hiddenFill>
+            </a:ext>
+            <a:ext uri="{91240B29-F687-4F45-9708-019B960494DF}">
+              <a14:hiddenLine xmlns:a14="http://schemas.microsoft.com/office/drawing/2010/main" w="9525">
+                <a:solidFill>
+                  <a:schemeClr val="tx1"/>
+                </a:solidFill>
+                <a:prstDash val="sysDot"/>
+                <a:miter lim="800000"/>
+                <a:headEnd/>
+                <a:tailEnd/>
+              </a14:hiddenLine>
+            </a:ext>
+            <a:ext uri="{AF507438-7753-43E0-B8FC-AC1667EBCBE1}">
+              <a14:hiddenEffects xmlns:a14="http://schemas.microsoft.com/office/drawing/2010/main">
+                <a:effectLst>
+                  <a:outerShdw dist="35921" dir="2700000" algn="ctr" rotWithShape="0">
+                    <a:schemeClr val="bg2"/>
+                  </a:outerShdw>
+                </a:effectLst>
+              </a14:hiddenEffects>
+            </a:ext>
+          </a:extLst>
+        </p:spPr>
+        <p:txBody>
+          <a:bodyPr wrap="none" lIns="228600" tIns="228600" rIns="228600" bIns="228600" anchor="ctr" anchorCtr="1"/>
+          <a:lstStyle>
+            <a:lvl1pPr defTabSz="4389438">
+              <a:defRPr>
+                <a:solidFill>
+                  <a:schemeClr val="tx1"/>
+                </a:solidFill>
+                <a:latin typeface="Arial" charset="0"/>
+              </a:defRPr>
+            </a:lvl1pPr>
+            <a:lvl2pPr defTabSz="4389438">
+              <a:defRPr>
+                <a:solidFill>
+                  <a:schemeClr val="tx1"/>
+                </a:solidFill>
+                <a:latin typeface="Arial" charset="0"/>
+              </a:defRPr>
+            </a:lvl2pPr>
+            <a:lvl3pPr defTabSz="4389438">
+              <a:defRPr>
+                <a:solidFill>
+                  <a:schemeClr val="tx1"/>
+                </a:solidFill>
+                <a:latin typeface="Arial" charset="0"/>
+              </a:defRPr>
+            </a:lvl3pPr>
+            <a:lvl4pPr defTabSz="4389438">
+              <a:defRPr>
+                <a:solidFill>
+                  <a:schemeClr val="tx1"/>
+                </a:solidFill>
+                <a:latin typeface="Arial" charset="0"/>
+              </a:defRPr>
+            </a:lvl4pPr>
+            <a:lvl5pPr defTabSz="4389438">
+              <a:defRPr>
+                <a:solidFill>
+                  <a:schemeClr val="tx1"/>
+                </a:solidFill>
+                <a:latin typeface="Arial" charset="0"/>
+              </a:defRPr>
+            </a:lvl5pPr>
+            <a:lvl6pPr defTabSz="4389438" fontAlgn="base">
+              <a:spcBef>
+                <a:spcPct val="0"/>
+              </a:spcBef>
+              <a:spcAft>
+                <a:spcPct val="0"/>
+              </a:spcAft>
+              <a:defRPr>
+                <a:solidFill>
+                  <a:schemeClr val="tx1"/>
+                </a:solidFill>
+                <a:latin typeface="Arial" charset="0"/>
+              </a:defRPr>
+            </a:lvl6pPr>
+            <a:lvl7pPr defTabSz="4389438" fontAlgn="base">
+              <a:spcBef>
+                <a:spcPct val="0"/>
+              </a:spcBef>
+              <a:spcAft>
+                <a:spcPct val="0"/>
+              </a:spcAft>
+              <a:defRPr>
+                <a:solidFill>
+                  <a:schemeClr val="tx1"/>
+                </a:solidFill>
+                <a:latin typeface="Arial" charset="0"/>
+              </a:defRPr>
+            </a:lvl7pPr>
+            <a:lvl8pPr defTabSz="4389438" fontAlgn="base">
+              <a:spcBef>
+                <a:spcPct val="0"/>
+              </a:spcBef>
+              <a:spcAft>
+                <a:spcPct val="0"/>
+              </a:spcAft>
+              <a:defRPr>
+                <a:solidFill>
+                  <a:schemeClr val="tx1"/>
+                </a:solidFill>
+                <a:latin typeface="Arial" charset="0"/>
+              </a:defRPr>
+            </a:lvl8pPr>
+            <a:lvl9pPr defTabSz="4389438" fontAlgn="base">
+              <a:spcBef>
+                <a:spcPct val="0"/>
+              </a:spcBef>
+              <a:spcAft>
+                <a:spcPct val="0"/>
+              </a:spcAft>
+              <a:defRPr>
+                <a:solidFill>
+                  <a:schemeClr val="tx1"/>
+                </a:solidFill>
+                <a:latin typeface="Arial" charset="0"/>
+              </a:defRPr>
+            </a:lvl9pPr>
+          </a:lstStyle>
+          <a:p>
+            <a:pPr algn="ctr"/>
+            <a:r>
+              <a:rPr lang="en-US" sz="4000" dirty="0">
+                <a:latin typeface="Verdana" panose="020B0604030504040204" pitchFamily="34" charset="0"/>
+                <a:ea typeface="Verdana" panose="020B0604030504040204" pitchFamily="34" charset="0"/>
+                <a:cs typeface="Verdana" panose="020B0604030504040204" pitchFamily="34" charset="0"/>
+              </a:rPr>
+              <a:t>INTRODUCTION</a:t>
+            </a:r>
+          </a:p>
+        </p:txBody>
+      </p:sp>
+      <p:sp>
+        <p:nvSpPr>
+          <p:cNvPr id="10" name="Text Box 18"/>
+          <p:cNvSpPr txBox="1">
+            <a:spLocks noChangeArrowheads="1"/>
+          </p:cNvSpPr>
+          <p:nvPr/>
+        </p:nvSpPr>
+        <p:spPr bwMode="auto">
+          <a:xfrm>
+            <a:off x="17797287" y="25122985"/>
+            <a:ext cx="8582142" cy="6544235"/>
+          </a:xfrm>
+          <a:prstGeom prst="rect">
+            <a:avLst/>
+          </a:prstGeom>
+          <a:solidFill>
+            <a:schemeClr val="bg1"/>
+          </a:solidFill>
+          <a:ln>
+            <a:noFill/>
+            <a:headEnd/>
+            <a:tailEnd/>
+          </a:ln>
+          <a:effectLst>
+            <a:outerShdw blurRad="149987" dist="250190" dir="8460000" algn="ctr">
+              <a:srgbClr val="000000">
+                <a:alpha val="28000"/>
+              </a:srgbClr>
+            </a:outerShdw>
+          </a:effectLst>
+          <a:scene3d>
+            <a:camera prst="orthographicFront">
+              <a:rot lat="0" lon="0" rev="0"/>
+            </a:camera>
+            <a:lightRig rig="contrasting" dir="t">
+              <a:rot lat="0" lon="0" rev="1500000"/>
+            </a:lightRig>
+          </a:scene3d>
+          <a:sp3d prstMaterial="metal">
+            <a:bevelT w="88900" h="88900"/>
+          </a:sp3d>
+          <a:extLst/>
+        </p:spPr>
+        <p:style>
+          <a:lnRef idx="2">
+            <a:schemeClr val="accent6"/>
+          </a:lnRef>
+          <a:fillRef idx="1">
+            <a:schemeClr val="lt1"/>
+          </a:fillRef>
+          <a:effectRef idx="0">
+            <a:schemeClr val="accent6"/>
+          </a:effectRef>
+          <a:fontRef idx="minor">
+            <a:schemeClr val="dk1"/>
+          </a:fontRef>
+        </p:style>
+        <p:txBody>
+          <a:bodyPr lIns="228600" tIns="228600" rIns="228600" bIns="228600"/>
+          <a:lstStyle/>
+          <a:p>
+            <a:pPr lvl="0" algn="just" defTabSz="457200">
+              <a:defRPr/>
+            </a:pPr>
+            <a:r>
+              <a:rPr lang="en-US" sz="3600" kern="0" dirty="0">
+                <a:latin typeface="Century Schoolbook" panose="02040604050505020304"/>
+              </a:rPr>
+              <a:t>Figure 1 illustrates how a controlled electric current applied to an antenna coil attached to the powered device actively generates a directed electromagnetic field. NFC technology makes use of a phenomenon called electromagnetic induction. The presence/absence of this field over time is used to logically generate a stream of binary data bits.</a:t>
+            </a:r>
+          </a:p>
+        </p:txBody>
+      </p:sp>
+      <p:sp>
+        <p:nvSpPr>
+          <p:cNvPr id="11" name="Text Box 18"/>
+          <p:cNvSpPr txBox="1">
+            <a:spLocks noChangeArrowheads="1"/>
+          </p:cNvSpPr>
+          <p:nvPr/>
+        </p:nvSpPr>
+        <p:spPr bwMode="auto">
+          <a:xfrm>
+            <a:off x="18164058" y="3773856"/>
+            <a:ext cx="7848600" cy="4352283"/>
+          </a:xfrm>
+          <a:prstGeom prst="rect">
+            <a:avLst/>
+          </a:prstGeom>
+          <a:solidFill>
+            <a:schemeClr val="bg1"/>
+          </a:solidFill>
+          <a:ln>
+            <a:noFill/>
+            <a:headEnd/>
+            <a:tailEnd/>
+          </a:ln>
+          <a:effectLst>
+            <a:outerShdw blurRad="149987" dist="250190" dir="8460000" algn="ctr">
+              <a:srgbClr val="000000">
+                <a:alpha val="28000"/>
+              </a:srgbClr>
+            </a:outerShdw>
+          </a:effectLst>
+          <a:scene3d>
+            <a:camera prst="orthographicFront">
+              <a:rot lat="0" lon="0" rev="0"/>
+            </a:camera>
+            <a:lightRig rig="contrasting" dir="t">
+              <a:rot lat="0" lon="0" rev="1500000"/>
+            </a:lightRig>
+          </a:scene3d>
+          <a:sp3d prstMaterial="metal">
+            <a:bevelT w="88900" h="88900"/>
+          </a:sp3d>
+          <a:extLst/>
+        </p:spPr>
+        <p:style>
+          <a:lnRef idx="2">
+            <a:schemeClr val="accent6"/>
+          </a:lnRef>
+          <a:fillRef idx="1">
+            <a:schemeClr val="lt1"/>
+          </a:fillRef>
+          <a:effectRef idx="0">
+            <a:schemeClr val="accent6"/>
+          </a:effectRef>
+          <a:fontRef idx="minor">
+            <a:schemeClr val="dk1"/>
+          </a:fontRef>
+        </p:style>
+        <p:txBody>
+          <a:bodyPr lIns="228600" tIns="228600" rIns="228600" bIns="228600"/>
+          <a:lstStyle/>
+          <a:p>
+            <a:pPr lvl="0" algn="just" defTabSz="457200">
+              <a:defRPr/>
+            </a:pPr>
+            <a:r>
+              <a:rPr lang="en-US" sz="3600" kern="0" dirty="0">
+                <a:latin typeface="Century Schoolbook" panose="02040604050505020304"/>
+              </a:rPr>
+              <a:t>ISO/IEC 14443 specifies the characteristics of the fields to be provided for power and bi-directional communication between proximity coupling devices (PCDs) and proximity cards or objects (PICCs).</a:t>
+            </a:r>
+          </a:p>
+        </p:txBody>
+      </p:sp>
+      <p:sp>
+        <p:nvSpPr>
+          <p:cNvPr id="12" name="Text Box 18"/>
+          <p:cNvSpPr txBox="1">
+            <a:spLocks noChangeArrowheads="1"/>
+          </p:cNvSpPr>
+          <p:nvPr/>
+        </p:nvSpPr>
+        <p:spPr bwMode="auto">
+          <a:xfrm>
+            <a:off x="35760212" y="11781113"/>
+            <a:ext cx="7848600" cy="7543300"/>
+          </a:xfrm>
+          <a:prstGeom prst="rect">
+            <a:avLst/>
+          </a:prstGeom>
+          <a:solidFill>
+            <a:schemeClr val="bg1"/>
+          </a:solidFill>
+          <a:ln>
+            <a:noFill/>
+            <a:headEnd/>
+            <a:tailEnd/>
+          </a:ln>
+          <a:effectLst>
+            <a:outerShdw blurRad="149987" dist="250190" dir="8460000" algn="ctr">
+              <a:srgbClr val="000000">
+                <a:alpha val="28000"/>
+              </a:srgbClr>
+            </a:outerShdw>
+          </a:effectLst>
+          <a:scene3d>
+            <a:camera prst="orthographicFront">
+              <a:rot lat="0" lon="0" rev="0"/>
+            </a:camera>
+            <a:lightRig rig="contrasting" dir="t">
+              <a:rot lat="0" lon="0" rev="1500000"/>
+            </a:lightRig>
+          </a:scene3d>
+          <a:sp3d prstMaterial="metal">
+            <a:bevelT w="88900" h="88900"/>
+          </a:sp3d>
+          <a:extLst/>
+        </p:spPr>
+        <p:style>
+          <a:lnRef idx="2">
+            <a:schemeClr val="accent6"/>
+          </a:lnRef>
+          <a:fillRef idx="1">
+            <a:schemeClr val="lt1"/>
+          </a:fillRef>
+          <a:effectRef idx="0">
+            <a:schemeClr val="accent6"/>
+          </a:effectRef>
+          <a:fontRef idx="minor">
+            <a:schemeClr val="dk1"/>
+          </a:fontRef>
+        </p:style>
+        <p:txBody>
+          <a:bodyPr lIns="228600" tIns="228600" rIns="228600" bIns="228600"/>
+          <a:lstStyle/>
+          <a:p>
+            <a:pPr lvl="0" algn="just" defTabSz="457200">
+              <a:defRPr/>
+            </a:pPr>
+            <a:r>
+              <a:rPr lang="en-US" sz="3600" kern="0" dirty="0">
+                <a:latin typeface="Century Schoolbook" panose="02040604050505020304"/>
+              </a:rPr>
+              <a:t>Smartphone devices that are NFC-enable operate in reader/writer mode, one of three modes defined by the NFC Forum, when interfacing with passive NFC tags. RF interfaces must be compliant with the ISO 14443 standard in order to generate, transmit, and receive messages on ISO/IEC 18000-3 air interface which describes the parameters for air interface communications at 13.56 </a:t>
+            </a:r>
+            <a:r>
+              <a:rPr lang="en-US" sz="3600" kern="0" dirty="0" err="1">
+                <a:latin typeface="Century Schoolbook" panose="02040604050505020304"/>
+              </a:rPr>
+              <a:t>MHz.</a:t>
+            </a:r>
+            <a:endParaRPr lang="en-US" sz="3600" kern="0" dirty="0">
+              <a:latin typeface="Century Schoolbook" panose="02040604050505020304"/>
+            </a:endParaRPr>
+          </a:p>
+        </p:txBody>
+      </p:sp>
+      <p:sp>
+        <p:nvSpPr>
+          <p:cNvPr id="13" name="Text Box 27"/>
+          <p:cNvSpPr txBox="1">
+            <a:spLocks noChangeArrowheads="1"/>
+          </p:cNvSpPr>
+          <p:nvPr/>
+        </p:nvSpPr>
+        <p:spPr bwMode="auto">
+          <a:xfrm>
+            <a:off x="17797287" y="22302292"/>
+            <a:ext cx="8582142" cy="1014907"/>
+          </a:xfrm>
+          <a:prstGeom prst="rect">
+            <a:avLst/>
+          </a:prstGeom>
+          <a:noFill/>
+          <a:ln>
+            <a:noFill/>
+          </a:ln>
+          <a:effectLst/>
+          <a:extLst>
+            <a:ext uri="{909E8E84-426E-40DD-AFC4-6F175D3DCCD1}">
+              <a14:hiddenFill xmlns:a14="http://schemas.microsoft.com/office/drawing/2010/main">
+                <a:solidFill>
+                  <a:schemeClr val="accent1"/>
+                </a:solidFill>
+              </a14:hiddenFill>
+            </a:ext>
+            <a:ext uri="{91240B29-F687-4F45-9708-019B960494DF}">
+              <a14:hiddenLine xmlns:a14="http://schemas.microsoft.com/office/drawing/2010/main" w="9525">
+                <a:solidFill>
+                  <a:schemeClr val="tx1"/>
+                </a:solidFill>
+                <a:prstDash val="sysDot"/>
+                <a:miter lim="800000"/>
+                <a:headEnd/>
+                <a:tailEnd/>
+              </a14:hiddenLine>
+            </a:ext>
+            <a:ext uri="{AF507438-7753-43E0-B8FC-AC1667EBCBE1}">
+              <a14:hiddenEffects xmlns:a14="http://schemas.microsoft.com/office/drawing/2010/main">
+                <a:effectLst>
+                  <a:outerShdw dist="35921" dir="2700000" algn="ctr" rotWithShape="0">
+                    <a:schemeClr val="bg2"/>
+                  </a:outerShdw>
+                </a:effectLst>
+              </a14:hiddenEffects>
+            </a:ext>
+          </a:extLst>
+        </p:spPr>
+        <p:txBody>
+          <a:bodyPr wrap="none" lIns="228600" tIns="228600" rIns="228600" bIns="228600" anchor="ctr" anchorCtr="1"/>
+          <a:lstStyle>
+            <a:lvl1pPr defTabSz="4389438">
+              <a:defRPr>
+                <a:solidFill>
+                  <a:schemeClr val="tx1"/>
+                </a:solidFill>
+                <a:latin typeface="Arial" charset="0"/>
+              </a:defRPr>
+            </a:lvl1pPr>
+            <a:lvl2pPr defTabSz="4389438">
+              <a:defRPr>
+                <a:solidFill>
+                  <a:schemeClr val="tx1"/>
+                </a:solidFill>
+                <a:latin typeface="Arial" charset="0"/>
+              </a:defRPr>
+            </a:lvl2pPr>
+            <a:lvl3pPr defTabSz="4389438">
+              <a:defRPr>
+                <a:solidFill>
+                  <a:schemeClr val="tx1"/>
+                </a:solidFill>
+                <a:latin typeface="Arial" charset="0"/>
+              </a:defRPr>
+            </a:lvl3pPr>
+            <a:lvl4pPr defTabSz="4389438">
+              <a:defRPr>
+                <a:solidFill>
+                  <a:schemeClr val="tx1"/>
+                </a:solidFill>
+                <a:latin typeface="Arial" charset="0"/>
+              </a:defRPr>
+            </a:lvl4pPr>
+            <a:lvl5pPr defTabSz="4389438">
+              <a:defRPr>
+                <a:solidFill>
+                  <a:schemeClr val="tx1"/>
+                </a:solidFill>
+                <a:latin typeface="Arial" charset="0"/>
+              </a:defRPr>
+            </a:lvl5pPr>
+            <a:lvl6pPr defTabSz="4389438" fontAlgn="base">
+              <a:spcBef>
+                <a:spcPct val="0"/>
+              </a:spcBef>
+              <a:spcAft>
+                <a:spcPct val="0"/>
+              </a:spcAft>
+              <a:defRPr>
+                <a:solidFill>
+                  <a:schemeClr val="tx1"/>
+                </a:solidFill>
+                <a:latin typeface="Arial" charset="0"/>
+              </a:defRPr>
+            </a:lvl6pPr>
+            <a:lvl7pPr defTabSz="4389438" fontAlgn="base">
+              <a:spcBef>
+                <a:spcPct val="0"/>
+              </a:spcBef>
+              <a:spcAft>
+                <a:spcPct val="0"/>
+              </a:spcAft>
+              <a:defRPr>
+                <a:solidFill>
+                  <a:schemeClr val="tx1"/>
+                </a:solidFill>
+                <a:latin typeface="Arial" charset="0"/>
+              </a:defRPr>
+            </a:lvl7pPr>
+            <a:lvl8pPr defTabSz="4389438" fontAlgn="base">
+              <a:spcBef>
+                <a:spcPct val="0"/>
+              </a:spcBef>
+              <a:spcAft>
+                <a:spcPct val="0"/>
+              </a:spcAft>
+              <a:defRPr>
+                <a:solidFill>
+                  <a:schemeClr val="tx1"/>
+                </a:solidFill>
+                <a:latin typeface="Arial" charset="0"/>
+              </a:defRPr>
+            </a:lvl8pPr>
+            <a:lvl9pPr defTabSz="4389438" fontAlgn="base">
+              <a:spcBef>
+                <a:spcPct val="0"/>
+              </a:spcBef>
+              <a:spcAft>
+                <a:spcPct val="0"/>
+              </a:spcAft>
+              <a:defRPr>
+                <a:solidFill>
+                  <a:schemeClr val="tx1"/>
+                </a:solidFill>
+                <a:latin typeface="Arial" charset="0"/>
+              </a:defRPr>
+            </a:lvl9pPr>
+          </a:lstStyle>
+          <a:p>
+            <a:pPr algn="ctr"/>
+            <a:r>
+              <a:rPr lang="en-US" sz="4000" dirty="0">
+                <a:latin typeface="Verdana" panose="020B0604030504040204" pitchFamily="34" charset="0"/>
+                <a:ea typeface="Verdana" panose="020B0604030504040204" pitchFamily="34" charset="0"/>
+                <a:cs typeface="Verdana" panose="020B0604030504040204" pitchFamily="34" charset="0"/>
+              </a:rPr>
+              <a:t>Fig. 1</a:t>
+            </a:r>
+          </a:p>
+        </p:txBody>
+      </p:sp>
     </p:spTree>
     <p:extLst>
       <p:ext uri="{BB962C8B-B14F-4D97-AF65-F5344CB8AC3E}">

</xml_diff>

<commit_message>
added more graphics to poster
</commit_message>
<xml_diff>
--- a/Poster Artifacts/Poster.pptx
+++ b/Poster Artifacts/Poster.pptx
@@ -3780,8 +3780,8 @@
         </p:nvSpPr>
         <p:spPr bwMode="auto">
           <a:xfrm>
-            <a:off x="10996981" y="28194000"/>
-            <a:ext cx="22122318" cy="4413021"/>
+            <a:off x="7526256" y="30140961"/>
+            <a:ext cx="25593043" cy="2466059"/>
           </a:xfrm>
           <a:prstGeom prst="rect">
             <a:avLst/>
@@ -3926,15 +3926,15 @@
               <a:defRPr/>
             </a:pPr>
             <a:r>
-              <a:rPr lang="en-US" sz="2400" kern="0" dirty="0"/>
+              <a:rPr lang="en-US" sz="1800" kern="0" dirty="0"/>
               <a:t>M. Roland and J. Langer, "Digital Signature Records for the NFC Data Exchange Format," 2010 Second International Workshop on Near Field Communication, Monaco, 2010, pp. 71-76. </a:t>
             </a:r>
             <a:r>
-              <a:rPr lang="en-US" sz="2400" kern="0" dirty="0" err="1"/>
+              <a:rPr lang="en-US" sz="1800" kern="0" dirty="0" err="1"/>
               <a:t>doi</a:t>
             </a:r>
             <a:r>
-              <a:rPr lang="en-US" sz="2400" kern="0" dirty="0"/>
+              <a:rPr lang="en-US" sz="1800" kern="0" dirty="0"/>
               <a:t>: 10.1109/NFC.2010.10</a:t>
             </a:r>
           </a:p>
@@ -3948,15 +3948,15 @@
               <a:defRPr/>
             </a:pPr>
             <a:r>
-              <a:rPr lang="en-US" sz="2400" kern="0" dirty="0"/>
+              <a:rPr lang="en-US" sz="1800" kern="0" dirty="0"/>
               <a:t>B. Jepson, D. Coleman, and T. </a:t>
             </a:r>
             <a:r>
-              <a:rPr lang="en-US" sz="2400" kern="0" dirty="0" err="1"/>
+              <a:rPr lang="en-US" sz="1800" kern="0" dirty="0" err="1"/>
               <a:t>Igoe</a:t>
             </a:r>
             <a:r>
-              <a:rPr lang="en-US" sz="2400" kern="0" dirty="0"/>
+              <a:rPr lang="en-US" sz="1800" kern="0" dirty="0"/>
               <a:t>, 4. Introducing NDEF [Book]. Safari, 2017. [Online]. Available: https://www.safaribooksonline.com/library/view/beginning-nfc/9781449324094/ch04.html. Accessed: Feb. 2, 2017.</a:t>
             </a:r>
           </a:p>
@@ -3970,7 +3970,7 @@
               <a:defRPr/>
             </a:pPr>
             <a:r>
-              <a:rPr lang="en-US" sz="2400" kern="0" dirty="0"/>
+              <a:rPr lang="en-US" sz="1800" kern="0" dirty="0"/>
               <a:t>NFC, Forum. "NFC Forum Technical Specifications Improve RF Communication and NFC Tag Interoperability with NFC Devices." Business Wire (English) Dec. 0010: Regional Business News. Web. 1 Feb. 2017.</a:t>
             </a:r>
           </a:p>
@@ -3984,7 +3984,7 @@
               <a:defRPr/>
             </a:pPr>
             <a:r>
-              <a:rPr lang="en-US" sz="2400" kern="0" dirty="0"/>
+              <a:rPr lang="en-US" sz="1800" kern="0" dirty="0"/>
               <a:t>electrical 4 u, "Air core transformer," 2011. [Online]. Available: http://www.electrical4u.com/air-core-transformer/. Accessed: Feb. 1, 2017.</a:t>
             </a:r>
           </a:p>
@@ -3998,7 +3998,7 @@
               <a:defRPr/>
             </a:pPr>
             <a:r>
-              <a:rPr lang="en-US" sz="2400" kern="0" dirty="0"/>
+              <a:rPr lang="en-US" sz="1800" kern="0" dirty="0"/>
               <a:t>N. Forum, A. rights reserved, A. M. services, Virtual, P. P. Terms, and C. Feedback, "What are the operating modes of NFC devices? - NFC forum," NFC Forum, 2017. [Online]. Available: http://nfc-forum.org/resources/what-are-the-operating-modes-of-nfc-devices/. Accessed: Feb. 2, 2017.</a:t>
             </a:r>
           </a:p>
@@ -4055,7 +4055,7 @@
         </p:nvSpPr>
         <p:spPr bwMode="auto">
           <a:xfrm>
-            <a:off x="10996981" y="27431999"/>
+            <a:off x="10996981" y="29641001"/>
             <a:ext cx="22122318" cy="610399"/>
           </a:xfrm>
           <a:prstGeom prst="rect">
@@ -4239,8 +4239,8 @@
         </p:blipFill>
         <p:spPr>
           <a:xfrm>
-            <a:off x="732210" y="179691"/>
-            <a:ext cx="5952005" cy="32702614"/>
+            <a:off x="601195" y="533400"/>
+            <a:ext cx="5952005" cy="31752762"/>
           </a:xfrm>
           <a:prstGeom prst="rect">
             <a:avLst/>
@@ -4412,7 +4412,7 @@
         <p:spPr>
           <a:xfrm>
             <a:off x="6684214" y="15392400"/>
-            <a:ext cx="34692386" cy="4343400"/>
+            <a:ext cx="33983545" cy="4343400"/>
           </a:xfrm>
           <a:prstGeom prst="stripedRightArrow">
             <a:avLst/>
@@ -4474,7 +4474,7 @@
         </p:nvSpPr>
         <p:spPr bwMode="auto">
           <a:xfrm>
-            <a:off x="37212977" y="5368834"/>
+            <a:off x="37212977" y="5047880"/>
             <a:ext cx="5952003" cy="1176491"/>
           </a:xfrm>
           <a:prstGeom prst="rect">
@@ -4613,7 +4613,7 @@
         </p:nvSpPr>
         <p:spPr bwMode="auto">
           <a:xfrm>
-            <a:off x="37158472" y="4740554"/>
+            <a:off x="37158472" y="4419600"/>
             <a:ext cx="5952003" cy="628279"/>
           </a:xfrm>
           <a:prstGeom prst="rect">
@@ -5170,8 +5170,8 @@
         </p:nvSpPr>
         <p:spPr>
           <a:xfrm rot="16200000">
-            <a:off x="13594095" y="11464278"/>
-            <a:ext cx="2983242" cy="491523"/>
+            <a:off x="10309879" y="8180058"/>
+            <a:ext cx="9551679" cy="491523"/>
           </a:xfrm>
           <a:prstGeom prst="homePlate">
             <a:avLst/>
@@ -5211,8 +5211,8 @@
         </p:nvSpPr>
         <p:spPr>
           <a:xfrm rot="16200000">
-            <a:off x="12851142" y="11471898"/>
-            <a:ext cx="2983242" cy="491523"/>
+            <a:off x="9566926" y="8187678"/>
+            <a:ext cx="9551679" cy="491523"/>
           </a:xfrm>
           <a:prstGeom prst="homePlate">
             <a:avLst/>
@@ -5287,20 +5287,20 @@
       </p:sp>
       <p:sp>
         <p:nvSpPr>
-          <p:cNvPr id="33" name="Pentagon 32"/>
+          <p:cNvPr id="56" name="Pentagon 28"/>
           <p:cNvSpPr/>
           <p:nvPr/>
         </p:nvSpPr>
         <p:spPr>
           <a:xfrm rot="16200000">
-            <a:off x="21167569" y="11971775"/>
-            <a:ext cx="3998234" cy="491523"/>
+            <a:off x="13386394" y="9780259"/>
+            <a:ext cx="6336042" cy="491523"/>
           </a:xfrm>
           <a:prstGeom prst="homePlate">
             <a:avLst/>
           </a:prstGeom>
           <a:solidFill>
-            <a:srgbClr val="FFFF00"/>
+            <a:srgbClr val="FF0000"/>
           </a:solidFill>
         </p:spPr>
         <p:style>
@@ -5328,467 +5328,20 @@
       </p:sp>
       <p:sp>
         <p:nvSpPr>
-          <p:cNvPr id="38" name="Rectangle 37"/>
+          <p:cNvPr id="57" name="Pentagon 29"/>
           <p:cNvSpPr/>
           <p:nvPr/>
         </p:nvSpPr>
         <p:spPr>
-          <a:xfrm>
-            <a:off x="6684214" y="12725400"/>
-            <a:ext cx="32409079" cy="1569660"/>
-          </a:xfrm>
-          <a:prstGeom prst="rect">
-            <a:avLst/>
-          </a:prstGeom>
-          <a:noFill/>
-          <a:ln>
-            <a:noFill/>
-          </a:ln>
-        </p:spPr>
-        <p:txBody>
-          <a:bodyPr wrap="square">
-            <a:spAutoFit/>
-          </a:bodyPr>
-          <a:lstStyle/>
-          <a:p>
-            <a:r>
-              <a:rPr lang="en-US" sz="3200" b="1" dirty="0">
-                <a:solidFill>
-                  <a:schemeClr val="bg1"/>
-                </a:solidFill>
-                <a:highlight>
-                  <a:srgbClr val="000000"/>
-                </a:highlight>
-                <a:latin typeface="Courier New" panose="02070309020205020404" pitchFamily="49" charset="0"/>
-                <a:cs typeface="Courier New" panose="02070309020205020404" pitchFamily="49" charset="0"/>
-              </a:rPr>
-              <a:t>04 80 16 1A</a:t>
-            </a:r>
-            <a:r>
-              <a:rPr lang="en-US" sz="3200" b="1" dirty="0">
-                <a:solidFill>
-                  <a:schemeClr val="bg1"/>
-                </a:solidFill>
-                <a:latin typeface="Courier New" panose="02070309020205020404" pitchFamily="49" charset="0"/>
-                <a:cs typeface="Courier New" panose="02070309020205020404" pitchFamily="49" charset="0"/>
-              </a:rPr>
-              <a:t> </a:t>
-            </a:r>
-            <a:r>
-              <a:rPr lang="en-US" sz="3200" b="1" dirty="0">
-                <a:solidFill>
-                  <a:schemeClr val="bg1"/>
-                </a:solidFill>
-                <a:highlight>
-                  <a:srgbClr val="000000"/>
-                </a:highlight>
-                <a:latin typeface="Courier New" panose="02070309020205020404" pitchFamily="49" charset="0"/>
-                <a:cs typeface="Courier New" panose="02070309020205020404" pitchFamily="49" charset="0"/>
-              </a:rPr>
-              <a:t>52 A3 40 80</a:t>
-            </a:r>
-            <a:r>
-              <a:rPr lang="en-US" sz="3200" b="1" dirty="0">
-                <a:latin typeface="Courier New" panose="02070309020205020404" pitchFamily="49" charset="0"/>
-                <a:cs typeface="Courier New" panose="02070309020205020404" pitchFamily="49" charset="0"/>
-              </a:rPr>
-              <a:t> </a:t>
-            </a:r>
-            <a:r>
-              <a:rPr lang="en-US" sz="3200" b="1" dirty="0">
-                <a:solidFill>
-                  <a:schemeClr val="bg1"/>
-                </a:solidFill>
-                <a:highlight>
-                  <a:srgbClr val="000000"/>
-                </a:highlight>
-                <a:latin typeface="Courier New" panose="02070309020205020404" pitchFamily="49" charset="0"/>
-                <a:cs typeface="Courier New" panose="02070309020205020404" pitchFamily="49" charset="0"/>
-              </a:rPr>
-              <a:t>31 48 </a:t>
-            </a:r>
-            <a:r>
-              <a:rPr lang="fi-FI" sz="3200" b="1" dirty="0">
-                <a:highlight>
-                  <a:srgbClr val="FFFF00"/>
-                </a:highlight>
-                <a:latin typeface="Courier New" panose="02070309020205020404" pitchFamily="49" charset="0"/>
-                <a:cs typeface="Courier New" panose="02070309020205020404" pitchFamily="49" charset="0"/>
-              </a:rPr>
-              <a:t>00</a:t>
-            </a:r>
-            <a:r>
-              <a:rPr lang="fi-FI" sz="3200" b="1" dirty="0">
-                <a:solidFill>
-                  <a:schemeClr val="bg1"/>
-                </a:solidFill>
-                <a:highlight>
-                  <a:srgbClr val="000000"/>
-                </a:highlight>
-                <a:latin typeface="Courier New" panose="02070309020205020404" pitchFamily="49" charset="0"/>
-                <a:cs typeface="Courier New" panose="02070309020205020404" pitchFamily="49" charset="0"/>
-              </a:rPr>
-              <a:t> </a:t>
-            </a:r>
-            <a:r>
-              <a:rPr lang="fi-FI" sz="3200" b="1" dirty="0">
-                <a:highlight>
-                  <a:srgbClr val="FFFF00"/>
-                </a:highlight>
-                <a:latin typeface="Courier New" panose="02070309020205020404" pitchFamily="49" charset="0"/>
-                <a:cs typeface="Courier New" panose="02070309020205020404" pitchFamily="49" charset="0"/>
-              </a:rPr>
-              <a:t>00</a:t>
-            </a:r>
-            <a:r>
-              <a:rPr lang="fi-FI" sz="3200" b="1" dirty="0">
-                <a:solidFill>
-                  <a:schemeClr val="bg1"/>
-                </a:solidFill>
-                <a:latin typeface="Courier New" panose="02070309020205020404" pitchFamily="49" charset="0"/>
-                <a:cs typeface="Courier New" panose="02070309020205020404" pitchFamily="49" charset="0"/>
-              </a:rPr>
-              <a:t> </a:t>
-            </a:r>
-            <a:r>
-              <a:rPr lang="en-US" sz="3200" b="1" dirty="0">
-                <a:solidFill>
-                  <a:schemeClr val="bg1"/>
-                </a:solidFill>
-                <a:highlight>
-                  <a:srgbClr val="000000"/>
-                </a:highlight>
-                <a:latin typeface="Courier New" panose="02070309020205020404" pitchFamily="49" charset="0"/>
-                <a:cs typeface="Courier New" panose="02070309020205020404" pitchFamily="49" charset="0"/>
-              </a:rPr>
-              <a:t>E1 10 00 00</a:t>
-            </a:r>
-            <a:r>
-              <a:rPr lang="fi-FI" sz="3200" b="1" dirty="0">
-                <a:latin typeface="Courier New" panose="02070309020205020404" pitchFamily="49" charset="0"/>
-                <a:cs typeface="Courier New" panose="02070309020205020404" pitchFamily="49" charset="0"/>
-              </a:rPr>
-              <a:t> </a:t>
-            </a:r>
-            <a:r>
-              <a:rPr lang="fi-FI" sz="3200" b="1" dirty="0">
-                <a:solidFill>
-                  <a:srgbClr val="00B0F0"/>
-                </a:solidFill>
-                <a:latin typeface="Courier New" panose="02070309020205020404" pitchFamily="49" charset="0"/>
-                <a:cs typeface="Courier New" panose="02070309020205020404" pitchFamily="49" charset="0"/>
-              </a:rPr>
-              <a:t>AA AA AA AA AA AA AA AA AA AA AA AA AA AA AA AA AA AA AA AA AA AA AA AA AA AA AA AA AA AA AA AA AA AA AA AA AA AA AA AA AA AA AA AA AA AA AA AA AA AA AA AA AA AA AA AA AA AA AA AA AA AA AA AA AA AA AA AA AA AA AA AA AA AA AA AA AA AA AA AA AA AA AA AA AA AA AA AA AA AA AA AA AA AA</a:t>
-            </a:r>
-            <a:r>
-              <a:rPr lang="fi-FI" sz="3200" b="1" dirty="0">
-                <a:latin typeface="Courier New" panose="02070309020205020404" pitchFamily="49" charset="0"/>
-                <a:cs typeface="Courier New" panose="02070309020205020404" pitchFamily="49" charset="0"/>
-              </a:rPr>
-              <a:t> </a:t>
-            </a:r>
-            <a:r>
-              <a:rPr lang="fi-FI" sz="3200" b="1" dirty="0">
-                <a:highlight>
-                  <a:srgbClr val="FFFF00"/>
-                </a:highlight>
-                <a:latin typeface="Courier New" panose="02070309020205020404" pitchFamily="49" charset="0"/>
-                <a:cs typeface="Courier New" panose="02070309020205020404" pitchFamily="49" charset="0"/>
-              </a:rPr>
-              <a:t>00</a:t>
-            </a:r>
-            <a:r>
-              <a:rPr lang="fi-FI" sz="3200" b="1" dirty="0">
-                <a:highlight>
-                  <a:srgbClr val="000000"/>
-                </a:highlight>
-                <a:latin typeface="Courier New" panose="02070309020205020404" pitchFamily="49" charset="0"/>
-                <a:cs typeface="Courier New" panose="02070309020205020404" pitchFamily="49" charset="0"/>
-              </a:rPr>
-              <a:t> </a:t>
-            </a:r>
-            <a:r>
-              <a:rPr lang="fi-FI" sz="3200" b="1" dirty="0">
-                <a:highlight>
-                  <a:srgbClr val="FFFF00"/>
-                </a:highlight>
-                <a:latin typeface="Courier New" panose="02070309020205020404" pitchFamily="49" charset="0"/>
-                <a:cs typeface="Courier New" panose="02070309020205020404" pitchFamily="49" charset="0"/>
-              </a:rPr>
-              <a:t>00</a:t>
-            </a:r>
-            <a:r>
-              <a:rPr lang="fi-FI" sz="3200" b="1" dirty="0">
-                <a:highlight>
-                  <a:srgbClr val="000000"/>
-                </a:highlight>
-                <a:latin typeface="Courier New" panose="02070309020205020404" pitchFamily="49" charset="0"/>
-                <a:cs typeface="Courier New" panose="02070309020205020404" pitchFamily="49" charset="0"/>
-              </a:rPr>
-              <a:t> </a:t>
-            </a:r>
-            <a:r>
-              <a:rPr lang="fi-FI" sz="3200" b="1" dirty="0">
-                <a:solidFill>
-                  <a:schemeClr val="bg1"/>
-                </a:solidFill>
-                <a:highlight>
-                  <a:srgbClr val="000000"/>
-                </a:highlight>
-                <a:latin typeface="Courier New" panose="02070309020205020404" pitchFamily="49" charset="0"/>
-                <a:cs typeface="Courier New" panose="02070309020205020404" pitchFamily="49" charset="0"/>
-              </a:rPr>
-              <a:t>00 BD</a:t>
-            </a:r>
-            <a:r>
-              <a:rPr lang="fi-FI" sz="3200" b="1" dirty="0">
-                <a:solidFill>
-                  <a:schemeClr val="bg1"/>
-                </a:solidFill>
-                <a:latin typeface="Courier New" panose="02070309020205020404" pitchFamily="49" charset="0"/>
-                <a:cs typeface="Courier New" panose="02070309020205020404" pitchFamily="49" charset="0"/>
-              </a:rPr>
-              <a:t> </a:t>
-            </a:r>
-            <a:r>
-              <a:rPr lang="en-US" sz="3200" b="1" dirty="0">
-                <a:solidFill>
-                  <a:schemeClr val="bg1"/>
-                </a:solidFill>
-                <a:highlight>
-                  <a:srgbClr val="000000"/>
-                </a:highlight>
-                <a:latin typeface="Courier New" panose="02070309020205020404" pitchFamily="49" charset="0"/>
-                <a:cs typeface="Courier New" panose="02070309020205020404" pitchFamily="49" charset="0"/>
-              </a:rPr>
-              <a:t>04 00 00 FF</a:t>
-            </a:r>
-            <a:r>
-              <a:rPr lang="fi-FI" sz="3200" b="1" dirty="0">
-                <a:solidFill>
-                  <a:schemeClr val="bg1"/>
-                </a:solidFill>
-                <a:latin typeface="Courier New" panose="02070309020205020404" pitchFamily="49" charset="0"/>
-                <a:cs typeface="Courier New" panose="02070309020205020404" pitchFamily="49" charset="0"/>
-              </a:rPr>
-              <a:t> </a:t>
-            </a:r>
-            <a:r>
-              <a:rPr lang="en-US" sz="3200" b="1" dirty="0">
-                <a:solidFill>
-                  <a:schemeClr val="bg1"/>
-                </a:solidFill>
-                <a:highlight>
-                  <a:srgbClr val="000000"/>
-                </a:highlight>
-                <a:latin typeface="Courier New" panose="02070309020205020404" pitchFamily="49" charset="0"/>
-                <a:cs typeface="Courier New" panose="02070309020205020404" pitchFamily="49" charset="0"/>
-              </a:rPr>
-              <a:t>00 05 -- --</a:t>
-            </a:r>
-            <a:r>
-              <a:rPr lang="fi-FI" sz="3200" b="1" dirty="0">
-                <a:solidFill>
-                  <a:schemeClr val="bg1"/>
-                </a:solidFill>
-                <a:latin typeface="Courier New" panose="02070309020205020404" pitchFamily="49" charset="0"/>
-                <a:cs typeface="Courier New" panose="02070309020205020404" pitchFamily="49" charset="0"/>
-              </a:rPr>
-              <a:t> </a:t>
-            </a:r>
-            <a:r>
-              <a:rPr lang="en-US" sz="3200" b="1" dirty="0">
-                <a:solidFill>
-                  <a:schemeClr val="bg1"/>
-                </a:solidFill>
-                <a:highlight>
-                  <a:srgbClr val="000000"/>
-                </a:highlight>
-                <a:latin typeface="Courier New" panose="02070309020205020404" pitchFamily="49" charset="0"/>
-                <a:cs typeface="Courier New" panose="02070309020205020404" pitchFamily="49" charset="0"/>
-              </a:rPr>
-              <a:t>FF FF FF FF</a:t>
-            </a:r>
-            <a:r>
-              <a:rPr lang="fi-FI" sz="3200" b="1" dirty="0">
-                <a:solidFill>
-                  <a:schemeClr val="bg1"/>
-                </a:solidFill>
-                <a:latin typeface="Courier New" panose="02070309020205020404" pitchFamily="49" charset="0"/>
-                <a:cs typeface="Courier New" panose="02070309020205020404" pitchFamily="49" charset="0"/>
-              </a:rPr>
-              <a:t> </a:t>
-            </a:r>
-            <a:r>
-              <a:rPr lang="en-US" sz="3200" b="1" dirty="0">
-                <a:solidFill>
-                  <a:schemeClr val="bg1"/>
-                </a:solidFill>
-                <a:highlight>
-                  <a:srgbClr val="000000"/>
-                </a:highlight>
-                <a:latin typeface="Courier New" panose="02070309020205020404" pitchFamily="49" charset="0"/>
-                <a:cs typeface="Courier New" panose="02070309020205020404" pitchFamily="49" charset="0"/>
-              </a:rPr>
-              <a:t>00 00 -- -- </a:t>
-            </a:r>
-            <a:endParaRPr lang="en-US" sz="3200" b="1" dirty="0">
-              <a:solidFill>
-                <a:schemeClr val="bg1"/>
-              </a:solidFill>
-              <a:highlight>
-                <a:srgbClr val="000080"/>
-              </a:highlight>
-              <a:latin typeface="Courier New" panose="02070309020205020404" pitchFamily="49" charset="0"/>
-              <a:cs typeface="Courier New" panose="02070309020205020404" pitchFamily="49" charset="0"/>
-            </a:endParaRPr>
-          </a:p>
-        </p:txBody>
-      </p:sp>
-      <p:sp>
-        <p:nvSpPr>
-          <p:cNvPr id="10" name="TextBox 9"/>
-          <p:cNvSpPr txBox="1"/>
-          <p:nvPr/>
-        </p:nvSpPr>
-        <p:spPr>
           <a:xfrm rot="16200000">
-            <a:off x="13321683" y="10954730"/>
-            <a:ext cx="2042162" cy="584775"/>
-          </a:xfrm>
-          <a:prstGeom prst="rect">
-            <a:avLst/>
-          </a:prstGeom>
-          <a:noFill/>
-        </p:spPr>
-        <p:txBody>
-          <a:bodyPr wrap="square" rtlCol="0">
-            <a:spAutoFit/>
-          </a:bodyPr>
-          <a:lstStyle/>
-          <a:p>
-            <a:r>
-              <a:rPr lang="en-US" sz="3200" dirty="0">
-                <a:latin typeface="Arial Black" panose="020B0A04020102020204" pitchFamily="34" charset="0"/>
-                <a:cs typeface="Courier New" panose="02070309020205020404" pitchFamily="49" charset="0"/>
-              </a:rPr>
-              <a:t>LOCK0</a:t>
-            </a:r>
-          </a:p>
-        </p:txBody>
-      </p:sp>
-      <p:sp>
-        <p:nvSpPr>
-          <p:cNvPr id="42" name="TextBox 41"/>
-          <p:cNvSpPr txBox="1"/>
-          <p:nvPr/>
-        </p:nvSpPr>
-        <p:spPr>
-          <a:xfrm rot="16200000">
-            <a:off x="14078931" y="10954730"/>
-            <a:ext cx="2042162" cy="584775"/>
-          </a:xfrm>
-          <a:prstGeom prst="rect">
-            <a:avLst/>
-          </a:prstGeom>
-          <a:noFill/>
-        </p:spPr>
-        <p:txBody>
-          <a:bodyPr wrap="square" rtlCol="0">
-            <a:spAutoFit/>
-          </a:bodyPr>
-          <a:lstStyle/>
-          <a:p>
-            <a:r>
-              <a:rPr lang="en-US" sz="3200" dirty="0">
-                <a:latin typeface="Arial Black" panose="020B0A04020102020204" pitchFamily="34" charset="0"/>
-                <a:cs typeface="Courier New" panose="02070309020205020404" pitchFamily="49" charset="0"/>
-              </a:rPr>
-              <a:t>LOCK1</a:t>
-            </a:r>
-          </a:p>
-        </p:txBody>
-      </p:sp>
-      <p:sp>
-        <p:nvSpPr>
-          <p:cNvPr id="45" name="TextBox 44"/>
-          <p:cNvSpPr txBox="1"/>
-          <p:nvPr/>
-        </p:nvSpPr>
-        <p:spPr>
-          <a:xfrm rot="16200000">
-            <a:off x="22161656" y="10954730"/>
-            <a:ext cx="2042162" cy="584775"/>
-          </a:xfrm>
-          <a:prstGeom prst="rect">
-            <a:avLst/>
-          </a:prstGeom>
-          <a:noFill/>
-        </p:spPr>
-        <p:txBody>
-          <a:bodyPr wrap="square" rtlCol="0">
-            <a:spAutoFit/>
-          </a:bodyPr>
-          <a:lstStyle/>
-          <a:p>
-            <a:r>
-              <a:rPr lang="en-US" sz="3200" dirty="0">
-                <a:latin typeface="Arial Black" panose="020B0A04020102020204" pitchFamily="34" charset="0"/>
-                <a:cs typeface="Courier New" panose="02070309020205020404" pitchFamily="49" charset="0"/>
-              </a:rPr>
-              <a:t>LOCK2</a:t>
-            </a:r>
-          </a:p>
-        </p:txBody>
-      </p:sp>
-      <p:sp>
-        <p:nvSpPr>
-          <p:cNvPr id="46" name="TextBox 45"/>
-          <p:cNvSpPr txBox="1"/>
-          <p:nvPr/>
-        </p:nvSpPr>
-        <p:spPr>
-          <a:xfrm rot="16200000">
-            <a:off x="22894082" y="10954730"/>
-            <a:ext cx="2042162" cy="584775"/>
-          </a:xfrm>
-          <a:prstGeom prst="rect">
-            <a:avLst/>
-          </a:prstGeom>
-          <a:noFill/>
-        </p:spPr>
-        <p:txBody>
-          <a:bodyPr wrap="square" rtlCol="0">
-            <a:spAutoFit/>
-          </a:bodyPr>
-          <a:lstStyle/>
-          <a:p>
-            <a:r>
-              <a:rPr lang="en-US" sz="3200" dirty="0">
-                <a:latin typeface="Arial Black" panose="020B0A04020102020204" pitchFamily="34" charset="0"/>
-                <a:cs typeface="Courier New" panose="02070309020205020404" pitchFamily="49" charset="0"/>
-              </a:rPr>
-              <a:t>LOCK3</a:t>
-            </a:r>
-          </a:p>
-        </p:txBody>
-      </p:sp>
-      <p:sp>
-        <p:nvSpPr>
-          <p:cNvPr id="48" name="Pentagon 47"/>
-          <p:cNvSpPr/>
-          <p:nvPr/>
-        </p:nvSpPr>
-        <p:spPr>
-          <a:xfrm rot="5400000">
-            <a:off x="23241919" y="19076660"/>
-            <a:ext cx="2983242" cy="491523"/>
+            <a:off x="12643441" y="9787879"/>
+            <a:ext cx="6336042" cy="491523"/>
           </a:xfrm>
           <a:prstGeom prst="homePlate">
             <a:avLst/>
           </a:prstGeom>
           <a:solidFill>
-            <a:srgbClr val="FFFF00"/>
+            <a:srgbClr val="FF0000"/>
           </a:solidFill>
         </p:spPr>
         <p:style>
@@ -5806,30 +5359,94 @@
           </a:fontRef>
         </p:style>
         <p:txBody>
-          <a:bodyPr rtlCol="0" anchor="ctr"/>
+          <a:bodyPr vert="wordArtVert" rtlCol="0" anchor="ctr"/>
           <a:lstStyle/>
           <a:p>
             <a:pPr algn="ctr"/>
-            <a:endParaRPr lang="en-US"/>
-          </a:p>
-        </p:txBody>
-      </p:sp>
-      <p:sp>
-        <p:nvSpPr>
-          <p:cNvPr id="49" name="Pentagon 48"/>
+            <a:endParaRPr lang="en-US" dirty="0"/>
+          </a:p>
+        </p:txBody>
+      </p:sp>
+      <p:sp>
+        <p:nvSpPr>
+          <p:cNvPr id="58" name="TextBox 57"/>
+          <p:cNvSpPr txBox="1"/>
+          <p:nvPr/>
+        </p:nvSpPr>
+        <p:spPr>
+          <a:xfrm rot="16200000">
+            <a:off x="14302966" y="10126159"/>
+            <a:ext cx="3074481" cy="584775"/>
+          </a:xfrm>
+          <a:prstGeom prst="rect">
+            <a:avLst/>
+          </a:prstGeom>
+          <a:noFill/>
+        </p:spPr>
+        <p:txBody>
+          <a:bodyPr wrap="square" rtlCol="0">
+            <a:spAutoFit/>
+          </a:bodyPr>
+          <a:lstStyle/>
+          <a:p>
+            <a:r>
+              <a:rPr lang="en-US" sz="3200" dirty="0">
+                <a:latin typeface="Arial Black" panose="020B0A04020102020204" pitchFamily="34" charset="0"/>
+                <a:cs typeface="Courier New" panose="02070309020205020404" pitchFamily="49" charset="0"/>
+              </a:rPr>
+              <a:t>OTP0</a:t>
+            </a:r>
+          </a:p>
+        </p:txBody>
+      </p:sp>
+      <p:sp>
+        <p:nvSpPr>
+          <p:cNvPr id="59" name="TextBox 58"/>
+          <p:cNvSpPr txBox="1"/>
+          <p:nvPr/>
+        </p:nvSpPr>
+        <p:spPr>
+          <a:xfrm rot="16200000">
+            <a:off x="15060216" y="10126159"/>
+            <a:ext cx="3074477" cy="584775"/>
+          </a:xfrm>
+          <a:prstGeom prst="rect">
+            <a:avLst/>
+          </a:prstGeom>
+          <a:noFill/>
+        </p:spPr>
+        <p:txBody>
+          <a:bodyPr wrap="square" rtlCol="0">
+            <a:spAutoFit/>
+          </a:bodyPr>
+          <a:lstStyle/>
+          <a:p>
+            <a:r>
+              <a:rPr lang="en-US" sz="3200" dirty="0">
+                <a:latin typeface="Arial Black" panose="020B0A04020102020204" pitchFamily="34" charset="0"/>
+                <a:cs typeface="Courier New" panose="02070309020205020404" pitchFamily="49" charset="0"/>
+              </a:rPr>
+              <a:t>OTP1</a:t>
+            </a:r>
+          </a:p>
+        </p:txBody>
+      </p:sp>
+      <p:sp>
+        <p:nvSpPr>
+          <p:cNvPr id="60" name="Pentagon 28"/>
           <p:cNvSpPr/>
           <p:nvPr/>
         </p:nvSpPr>
         <p:spPr>
-          <a:xfrm rot="5400000">
-            <a:off x="22498966" y="19084280"/>
-            <a:ext cx="2983242" cy="491523"/>
+          <a:xfrm rot="16200000">
+            <a:off x="14860754" y="9780259"/>
+            <a:ext cx="6336042" cy="491523"/>
           </a:xfrm>
           <a:prstGeom prst="homePlate">
             <a:avLst/>
           </a:prstGeom>
           <a:solidFill>
-            <a:srgbClr val="FFFF00"/>
+            <a:srgbClr val="FF0000"/>
           </a:solidFill>
         </p:spPr>
         <p:style>
@@ -5847,30 +5464,30 @@
           </a:fontRef>
         </p:style>
         <p:txBody>
-          <a:bodyPr vert="wordArtVert" rtlCol="0" anchor="ctr"/>
+          <a:bodyPr rtlCol="0" anchor="ctr"/>
           <a:lstStyle/>
           <a:p>
             <a:pPr algn="ctr"/>
-            <a:endParaRPr lang="en-US" dirty="0"/>
-          </a:p>
-        </p:txBody>
-      </p:sp>
-      <p:sp>
-        <p:nvSpPr>
-          <p:cNvPr id="50" name="Pentagon 49"/>
+            <a:endParaRPr lang="en-US"/>
+          </a:p>
+        </p:txBody>
+      </p:sp>
+      <p:sp>
+        <p:nvSpPr>
+          <p:cNvPr id="61" name="Pentagon 29"/>
           <p:cNvSpPr/>
           <p:nvPr/>
         </p:nvSpPr>
         <p:spPr>
-          <a:xfrm rot="5400000">
-            <a:off x="13933571" y="18642164"/>
-            <a:ext cx="3998234" cy="491523"/>
+          <a:xfrm rot="16200000">
+            <a:off x="14117801" y="9787879"/>
+            <a:ext cx="6336042" cy="491523"/>
           </a:xfrm>
           <a:prstGeom prst="homePlate">
             <a:avLst/>
           </a:prstGeom>
           <a:solidFill>
-            <a:srgbClr val="FFFF00"/>
+            <a:srgbClr val="FF0000"/>
           </a:solidFill>
         </p:spPr>
         <p:style>
@@ -5888,23 +5505,87 @@
           </a:fontRef>
         </p:style>
         <p:txBody>
-          <a:bodyPr rtlCol="0" anchor="ctr"/>
+          <a:bodyPr vert="wordArtVert" rtlCol="0" anchor="ctr"/>
           <a:lstStyle/>
           <a:p>
             <a:pPr algn="ctr"/>
-            <a:endParaRPr lang="en-US"/>
-          </a:p>
-        </p:txBody>
-      </p:sp>
-      <p:sp>
-        <p:nvSpPr>
-          <p:cNvPr id="51" name="Pentagon 50"/>
+            <a:endParaRPr lang="en-US" dirty="0"/>
+          </a:p>
+        </p:txBody>
+      </p:sp>
+      <p:sp>
+        <p:nvSpPr>
+          <p:cNvPr id="62" name="TextBox 61"/>
+          <p:cNvSpPr txBox="1"/>
+          <p:nvPr/>
+        </p:nvSpPr>
+        <p:spPr>
+          <a:xfrm rot="16200000">
+            <a:off x="15777330" y="10126162"/>
+            <a:ext cx="3074472" cy="584775"/>
+          </a:xfrm>
+          <a:prstGeom prst="rect">
+            <a:avLst/>
+          </a:prstGeom>
+          <a:noFill/>
+        </p:spPr>
+        <p:txBody>
+          <a:bodyPr wrap="square" rtlCol="0">
+            <a:spAutoFit/>
+          </a:bodyPr>
+          <a:lstStyle/>
+          <a:p>
+            <a:r>
+              <a:rPr lang="en-US" sz="3200" dirty="0">
+                <a:latin typeface="Arial Black" panose="020B0A04020102020204" pitchFamily="34" charset="0"/>
+                <a:cs typeface="Courier New" panose="02070309020205020404" pitchFamily="49" charset="0"/>
+              </a:rPr>
+              <a:t>OTP2</a:t>
+            </a:r>
+          </a:p>
+        </p:txBody>
+      </p:sp>
+      <p:sp>
+        <p:nvSpPr>
+          <p:cNvPr id="63" name="TextBox 62"/>
+          <p:cNvSpPr txBox="1"/>
+          <p:nvPr/>
+        </p:nvSpPr>
+        <p:spPr>
+          <a:xfrm rot="16200000">
+            <a:off x="16534579" y="10126163"/>
+            <a:ext cx="3074467" cy="584775"/>
+          </a:xfrm>
+          <a:prstGeom prst="rect">
+            <a:avLst/>
+          </a:prstGeom>
+          <a:noFill/>
+        </p:spPr>
+        <p:txBody>
+          <a:bodyPr wrap="square" rtlCol="0">
+            <a:spAutoFit/>
+          </a:bodyPr>
+          <a:lstStyle/>
+          <a:p>
+            <a:r>
+              <a:rPr lang="en-US" sz="3200" dirty="0">
+                <a:latin typeface="Arial Black" panose="020B0A04020102020204" pitchFamily="34" charset="0"/>
+                <a:cs typeface="Courier New" panose="02070309020205020404" pitchFamily="49" charset="0"/>
+              </a:rPr>
+              <a:t>OTP3</a:t>
+            </a:r>
+          </a:p>
+        </p:txBody>
+      </p:sp>
+      <p:sp>
+        <p:nvSpPr>
+          <p:cNvPr id="33" name="Pentagon 32"/>
           <p:cNvSpPr/>
           <p:nvPr/>
         </p:nvSpPr>
         <p:spPr>
-          <a:xfrm rot="5400000">
-            <a:off x="13190618" y="18649784"/>
+          <a:xfrm rot="16200000">
+            <a:off x="21167569" y="11971775"/>
             <a:ext cx="3998234" cy="491523"/>
           </a:xfrm>
           <a:prstGeom prst="homePlate">
@@ -5939,141 +5620,54 @@
       </p:sp>
       <p:sp>
         <p:nvSpPr>
-          <p:cNvPr id="52" name="TextBox 51"/>
-          <p:cNvSpPr txBox="1"/>
+          <p:cNvPr id="97" name="Pentagon 30"/>
+          <p:cNvSpPr/>
           <p:nvPr/>
         </p:nvSpPr>
         <p:spPr>
-          <a:xfrm rot="5400000">
-            <a:off x="23113016" y="19264345"/>
-            <a:ext cx="1755144" cy="584775"/>
-          </a:xfrm>
-          <a:prstGeom prst="rect">
+          <a:xfrm rot="16200000">
+            <a:off x="22636909" y="11975583"/>
+            <a:ext cx="3990618" cy="491523"/>
+          </a:xfrm>
+          <a:prstGeom prst="homePlate">
             <a:avLst/>
           </a:prstGeom>
-          <a:noFill/>
-        </p:spPr>
-        <p:txBody>
-          <a:bodyPr wrap="square" rtlCol="0">
-            <a:spAutoFit/>
-          </a:bodyPr>
-          <a:lstStyle/>
-          <a:p>
-            <a:r>
-              <a:rPr lang="en-US" sz="3200" dirty="0">
-                <a:latin typeface="Arial Black" panose="020B0A04020102020204" pitchFamily="34" charset="0"/>
-                <a:cs typeface="Courier New" panose="02070309020205020404" pitchFamily="49" charset="0"/>
-              </a:rPr>
-              <a:t>LOCK2</a:t>
-            </a:r>
-          </a:p>
-        </p:txBody>
-      </p:sp>
-      <p:sp>
-        <p:nvSpPr>
-          <p:cNvPr id="53" name="TextBox 52"/>
-          <p:cNvSpPr txBox="1"/>
-          <p:nvPr/>
-        </p:nvSpPr>
-        <p:spPr>
-          <a:xfrm rot="5400000">
-            <a:off x="23845442" y="19264345"/>
-            <a:ext cx="1755143" cy="584775"/>
-          </a:xfrm>
-          <a:prstGeom prst="rect">
-            <a:avLst/>
-          </a:prstGeom>
-          <a:noFill/>
-        </p:spPr>
-        <p:txBody>
-          <a:bodyPr wrap="square" rtlCol="0">
-            <a:spAutoFit/>
-          </a:bodyPr>
-          <a:lstStyle/>
-          <a:p>
-            <a:r>
-              <a:rPr lang="en-US" sz="3200" dirty="0">
-                <a:latin typeface="Arial Black" panose="020B0A04020102020204" pitchFamily="34" charset="0"/>
-                <a:cs typeface="Courier New" panose="02070309020205020404" pitchFamily="49" charset="0"/>
-              </a:rPr>
-              <a:t>LOCK3</a:t>
-            </a:r>
-          </a:p>
-        </p:txBody>
-      </p:sp>
-      <p:sp>
-        <p:nvSpPr>
-          <p:cNvPr id="54" name="TextBox 53"/>
-          <p:cNvSpPr txBox="1"/>
-          <p:nvPr/>
-        </p:nvSpPr>
-        <p:spPr>
-          <a:xfrm rot="5400000">
-            <a:off x="14293733" y="19335292"/>
-            <a:ext cx="1764958" cy="584775"/>
-          </a:xfrm>
-          <a:prstGeom prst="rect">
-            <a:avLst/>
-          </a:prstGeom>
-          <a:noFill/>
-        </p:spPr>
-        <p:txBody>
-          <a:bodyPr wrap="square" rtlCol="0">
-            <a:spAutoFit/>
-          </a:bodyPr>
-          <a:lstStyle/>
-          <a:p>
-            <a:r>
-              <a:rPr lang="en-US" sz="3200" dirty="0">
-                <a:latin typeface="Arial Black" panose="020B0A04020102020204" pitchFamily="34" charset="0"/>
-                <a:cs typeface="Courier New" panose="02070309020205020404" pitchFamily="49" charset="0"/>
-              </a:rPr>
-              <a:t>LOCK0</a:t>
-            </a:r>
-          </a:p>
-        </p:txBody>
-      </p:sp>
-      <p:sp>
-        <p:nvSpPr>
-          <p:cNvPr id="55" name="TextBox 54"/>
-          <p:cNvSpPr txBox="1"/>
-          <p:nvPr/>
-        </p:nvSpPr>
-        <p:spPr>
-          <a:xfrm rot="5400000">
-            <a:off x="15055734" y="19335291"/>
-            <a:ext cx="1764956" cy="584775"/>
-          </a:xfrm>
-          <a:prstGeom prst="rect">
-            <a:avLst/>
-          </a:prstGeom>
-          <a:noFill/>
-        </p:spPr>
-        <p:txBody>
-          <a:bodyPr wrap="square" rtlCol="0">
-            <a:spAutoFit/>
-          </a:bodyPr>
-          <a:lstStyle/>
-          <a:p>
-            <a:r>
-              <a:rPr lang="en-US" sz="3200" dirty="0">
-                <a:latin typeface="Arial Black" panose="020B0A04020102020204" pitchFamily="34" charset="0"/>
-                <a:cs typeface="Courier New" panose="02070309020205020404" pitchFamily="49" charset="0"/>
-              </a:rPr>
-              <a:t>LOCK1</a:t>
-            </a:r>
-          </a:p>
-        </p:txBody>
-      </p:sp>
-      <p:sp>
-        <p:nvSpPr>
-          <p:cNvPr id="47" name="Rectangle 46"/>
+          <a:solidFill>
+            <a:srgbClr val="FFFF00"/>
+          </a:solidFill>
+        </p:spPr>
+        <p:style>
+          <a:lnRef idx="0">
+            <a:schemeClr val="accent6"/>
+          </a:lnRef>
+          <a:fillRef idx="3">
+            <a:schemeClr val="accent6"/>
+          </a:fillRef>
+          <a:effectRef idx="3">
+            <a:schemeClr val="accent6"/>
+          </a:effectRef>
+          <a:fontRef idx="minor">
+            <a:schemeClr val="lt1"/>
+          </a:fontRef>
+        </p:style>
+        <p:txBody>
+          <a:bodyPr rtlCol="0" anchor="ctr"/>
+          <a:lstStyle/>
+          <a:p>
+            <a:pPr algn="ctr"/>
+            <a:endParaRPr lang="en-US"/>
+          </a:p>
+        </p:txBody>
+      </p:sp>
+      <p:sp>
+        <p:nvSpPr>
+          <p:cNvPr id="38" name="Rectangle 37"/>
           <p:cNvSpPr/>
           <p:nvPr/>
         </p:nvSpPr>
         <p:spPr>
           <a:xfrm>
-            <a:off x="7526256" y="16764000"/>
+            <a:off x="6684214" y="12755940"/>
             <a:ext cx="32409079" cy="1569660"/>
           </a:xfrm>
           <a:prstGeom prst="rect">
@@ -6195,12 +5789,90 @@
                   <a:schemeClr val="bg1"/>
                 </a:solidFill>
                 <a:highlight>
+                  <a:srgbClr val="FF0000"/>
+                </a:highlight>
+                <a:latin typeface="Courier New" panose="02070309020205020404" pitchFamily="49" charset="0"/>
+                <a:cs typeface="Courier New" panose="02070309020205020404" pitchFamily="49" charset="0"/>
+              </a:rPr>
+              <a:t>E1</a:t>
+            </a:r>
+            <a:r>
+              <a:rPr lang="en-US" sz="3200" b="1" dirty="0">
+                <a:solidFill>
+                  <a:schemeClr val="bg1"/>
+                </a:solidFill>
+                <a:highlight>
                   <a:srgbClr val="000000"/>
                 </a:highlight>
                 <a:latin typeface="Courier New" panose="02070309020205020404" pitchFamily="49" charset="0"/>
                 <a:cs typeface="Courier New" panose="02070309020205020404" pitchFamily="49" charset="0"/>
               </a:rPr>
-              <a:t>E1 10 00 00</a:t>
+              <a:t> </a:t>
+            </a:r>
+            <a:r>
+              <a:rPr lang="en-US" sz="3200" b="1" dirty="0">
+                <a:solidFill>
+                  <a:schemeClr val="bg1"/>
+                </a:solidFill>
+                <a:highlight>
+                  <a:srgbClr val="FF0000"/>
+                </a:highlight>
+                <a:latin typeface="Courier New" panose="02070309020205020404" pitchFamily="49" charset="0"/>
+                <a:cs typeface="Courier New" panose="02070309020205020404" pitchFamily="49" charset="0"/>
+              </a:rPr>
+              <a:t>10</a:t>
+            </a:r>
+            <a:r>
+              <a:rPr lang="en-US" sz="3200" b="1" dirty="0">
+                <a:solidFill>
+                  <a:schemeClr val="bg1"/>
+                </a:solidFill>
+                <a:highlight>
+                  <a:srgbClr val="000000"/>
+                </a:highlight>
+                <a:latin typeface="Courier New" panose="02070309020205020404" pitchFamily="49" charset="0"/>
+                <a:cs typeface="Courier New" panose="02070309020205020404" pitchFamily="49" charset="0"/>
+              </a:rPr>
+              <a:t> </a:t>
+            </a:r>
+            <a:r>
+              <a:rPr lang="en-US" sz="3200" b="1" dirty="0">
+                <a:solidFill>
+                  <a:schemeClr val="bg1"/>
+                </a:solidFill>
+                <a:highlight>
+                  <a:srgbClr val="FF0000"/>
+                </a:highlight>
+                <a:latin typeface="Courier New" panose="02070309020205020404" pitchFamily="49" charset="0"/>
+                <a:cs typeface="Courier New" panose="02070309020205020404" pitchFamily="49" charset="0"/>
+              </a:rPr>
+              <a:t>12</a:t>
+            </a:r>
+            <a:r>
+              <a:rPr lang="en-US" sz="3200" b="1" dirty="0">
+                <a:solidFill>
+                  <a:schemeClr val="bg1"/>
+                </a:solidFill>
+                <a:highlight>
+                  <a:srgbClr val="000000"/>
+                </a:highlight>
+                <a:latin typeface="Courier New" panose="02070309020205020404" pitchFamily="49" charset="0"/>
+                <a:cs typeface="Courier New" panose="02070309020205020404" pitchFamily="49" charset="0"/>
+              </a:rPr>
+              <a:t> </a:t>
+            </a:r>
+            <a:r>
+              <a:rPr lang="en-US" sz="3200" b="1" dirty="0">
+                <a:solidFill>
+                  <a:schemeClr val="bg1"/>
+                </a:solidFill>
+                <a:highlight>
+                  <a:srgbClr val="FF0000"/>
+                </a:highlight>
+                <a:latin typeface="Courier New" panose="02070309020205020404" pitchFamily="49" charset="0"/>
+                <a:cs typeface="Courier New" panose="02070309020205020404" pitchFamily="49" charset="0"/>
+              </a:rPr>
+              <a:t>00</a:t>
             </a:r>
             <a:r>
               <a:rPr lang="fi-FI" sz="3200" b="1" dirty="0">
@@ -6212,12 +5884,19 @@
             <a:r>
               <a:rPr lang="fi-FI" sz="3200" b="1" dirty="0">
                 <a:solidFill>
-                  <a:schemeClr val="accent3"/>
+                  <a:srgbClr val="00B0F0"/>
                 </a:solidFill>
                 <a:latin typeface="Courier New" panose="02070309020205020404" pitchFamily="49" charset="0"/>
                 <a:cs typeface="Courier New" panose="02070309020205020404" pitchFamily="49" charset="0"/>
               </a:rPr>
-              <a:t>AA AA AA AA AA AA AA AA AA AA AA AA AA AA AA AA AA AA AA AA AA AA AA AA AA AA AA AA AA AA AA AA AA AA AA AA AA AA AA AA AA AA AA AA AA AA AA AA AA AA AA AA AA AA AA AA AA AA AA AA AA AA AA AA AA AA AA AA AA AA AA AA AA AA AA AA AA AA AA AA AA AA AA AA AA AA AA AA AA AA AA AA AA AA </a:t>
+              <a:t>AA AA AA AA AA AA AA AA AA AA AA AA AA AA AA AA AA AA AA AA AA AA AA AA AA AA AA AA AA AA AA AA AA AA AA AA AA AA AA AA AA AA AA AA AA AA AA AA AA AA AA AA AA AA AA AA AA AA AA AA AA AA AA AA AA AA AA AA AA AA AA AA AA AA AA AA AA AA AA AA AA AA AA AA AA AA AA AA AA AA AA AA AA AA</a:t>
+            </a:r>
+            <a:r>
+              <a:rPr lang="fi-FI" sz="3200" b="1" dirty="0">
+                <a:latin typeface="Courier New" panose="02070309020205020404" pitchFamily="49" charset="0"/>
+                <a:cs typeface="Courier New" panose="02070309020205020404" pitchFamily="49" charset="0"/>
+              </a:rPr>
+              <a:t> </a:t>
             </a:r>
             <a:r>
               <a:rPr lang="fi-FI" sz="3200" b="1" dirty="0">
@@ -6261,6 +5940,16 @@
             </a:r>
             <a:r>
               <a:rPr lang="fi-FI" sz="3200" b="1" dirty="0">
+                <a:highlight>
+                  <a:srgbClr val="FFFF00"/>
+                </a:highlight>
+                <a:latin typeface="Courier New" panose="02070309020205020404" pitchFamily="49" charset="0"/>
+                <a:cs typeface="Courier New" panose="02070309020205020404" pitchFamily="49" charset="0"/>
+              </a:rPr>
+              <a:t>00</a:t>
+            </a:r>
+            <a:r>
+              <a:rPr lang="fi-FI" sz="3200" b="1" dirty="0">
                 <a:solidFill>
                   <a:schemeClr val="bg1"/>
                 </a:solidFill>
@@ -6270,7 +5959,7 @@
                 <a:latin typeface="Courier New" panose="02070309020205020404" pitchFamily="49" charset="0"/>
                 <a:cs typeface="Courier New" panose="02070309020205020404" pitchFamily="49" charset="0"/>
               </a:rPr>
-              <a:t>00 BD</a:t>
+              <a:t> BD</a:t>
             </a:r>
             <a:r>
               <a:rPr lang="fi-FI" sz="3200" b="1" dirty="0">
@@ -6374,6 +6063,1582 @@
               <a:latin typeface="Courier New" panose="02070309020205020404" pitchFamily="49" charset="0"/>
               <a:cs typeface="Courier New" panose="02070309020205020404" pitchFamily="49" charset="0"/>
             </a:endParaRPr>
+          </a:p>
+        </p:txBody>
+      </p:sp>
+      <p:sp>
+        <p:nvSpPr>
+          <p:cNvPr id="10" name="TextBox 9"/>
+          <p:cNvSpPr txBox="1"/>
+          <p:nvPr/>
+        </p:nvSpPr>
+        <p:spPr>
+          <a:xfrm rot="16200000">
+            <a:off x="11073491" y="8706534"/>
+            <a:ext cx="6538551" cy="584775"/>
+          </a:xfrm>
+          <a:prstGeom prst="rect">
+            <a:avLst/>
+          </a:prstGeom>
+          <a:noFill/>
+        </p:spPr>
+        <p:txBody>
+          <a:bodyPr wrap="square" rtlCol="0">
+            <a:spAutoFit/>
+          </a:bodyPr>
+          <a:lstStyle/>
+          <a:p>
+            <a:r>
+              <a:rPr lang="en-US" sz="3200" dirty="0">
+                <a:latin typeface="Arial Black" panose="020B0A04020102020204" pitchFamily="34" charset="0"/>
+                <a:cs typeface="Courier New" panose="02070309020205020404" pitchFamily="49" charset="0"/>
+              </a:rPr>
+              <a:t>LOCK0</a:t>
+            </a:r>
+          </a:p>
+        </p:txBody>
+      </p:sp>
+      <p:sp>
+        <p:nvSpPr>
+          <p:cNvPr id="42" name="TextBox 41"/>
+          <p:cNvSpPr txBox="1"/>
+          <p:nvPr/>
+        </p:nvSpPr>
+        <p:spPr>
+          <a:xfrm rot="16200000">
+            <a:off x="11830739" y="8706534"/>
+            <a:ext cx="6538551" cy="584775"/>
+          </a:xfrm>
+          <a:prstGeom prst="rect">
+            <a:avLst/>
+          </a:prstGeom>
+          <a:noFill/>
+        </p:spPr>
+        <p:txBody>
+          <a:bodyPr wrap="square" rtlCol="0">
+            <a:spAutoFit/>
+          </a:bodyPr>
+          <a:lstStyle/>
+          <a:p>
+            <a:r>
+              <a:rPr lang="en-US" sz="3200" dirty="0">
+                <a:latin typeface="Arial Black" panose="020B0A04020102020204" pitchFamily="34" charset="0"/>
+                <a:cs typeface="Courier New" panose="02070309020205020404" pitchFamily="49" charset="0"/>
+              </a:rPr>
+              <a:t>LOCK1</a:t>
+            </a:r>
+          </a:p>
+        </p:txBody>
+      </p:sp>
+      <p:sp>
+        <p:nvSpPr>
+          <p:cNvPr id="45" name="TextBox 44"/>
+          <p:cNvSpPr txBox="1"/>
+          <p:nvPr/>
+        </p:nvSpPr>
+        <p:spPr>
+          <a:xfrm rot="16200000">
+            <a:off x="22161656" y="10954730"/>
+            <a:ext cx="2042162" cy="584775"/>
+          </a:xfrm>
+          <a:prstGeom prst="rect">
+            <a:avLst/>
+          </a:prstGeom>
+          <a:noFill/>
+        </p:spPr>
+        <p:txBody>
+          <a:bodyPr wrap="square" rtlCol="0">
+            <a:spAutoFit/>
+          </a:bodyPr>
+          <a:lstStyle/>
+          <a:p>
+            <a:r>
+              <a:rPr lang="en-US" sz="3200" dirty="0">
+                <a:latin typeface="Arial Black" panose="020B0A04020102020204" pitchFamily="34" charset="0"/>
+                <a:cs typeface="Courier New" panose="02070309020205020404" pitchFamily="49" charset="0"/>
+              </a:rPr>
+              <a:t>LOCK2</a:t>
+            </a:r>
+          </a:p>
+        </p:txBody>
+      </p:sp>
+      <p:sp>
+        <p:nvSpPr>
+          <p:cNvPr id="46" name="TextBox 45"/>
+          <p:cNvSpPr txBox="1"/>
+          <p:nvPr/>
+        </p:nvSpPr>
+        <p:spPr>
+          <a:xfrm rot="16200000">
+            <a:off x="22894082" y="10954730"/>
+            <a:ext cx="2042162" cy="584775"/>
+          </a:xfrm>
+          <a:prstGeom prst="rect">
+            <a:avLst/>
+          </a:prstGeom>
+          <a:noFill/>
+        </p:spPr>
+        <p:txBody>
+          <a:bodyPr wrap="square" rtlCol="0">
+            <a:spAutoFit/>
+          </a:bodyPr>
+          <a:lstStyle/>
+          <a:p>
+            <a:r>
+              <a:rPr lang="en-US" sz="3200" dirty="0">
+                <a:latin typeface="Arial Black" panose="020B0A04020102020204" pitchFamily="34" charset="0"/>
+                <a:cs typeface="Courier New" panose="02070309020205020404" pitchFamily="49" charset="0"/>
+              </a:rPr>
+              <a:t>LOCK3</a:t>
+            </a:r>
+          </a:p>
+        </p:txBody>
+      </p:sp>
+      <p:sp>
+        <p:nvSpPr>
+          <p:cNvPr id="48" name="Pentagon 47"/>
+          <p:cNvSpPr/>
+          <p:nvPr/>
+        </p:nvSpPr>
+        <p:spPr>
+          <a:xfrm rot="5400000">
+            <a:off x="23201513" y="19117066"/>
+            <a:ext cx="3064054" cy="491523"/>
+          </a:xfrm>
+          <a:prstGeom prst="homePlate">
+            <a:avLst/>
+          </a:prstGeom>
+          <a:solidFill>
+            <a:srgbClr val="FFFF00"/>
+          </a:solidFill>
+        </p:spPr>
+        <p:style>
+          <a:lnRef idx="0">
+            <a:schemeClr val="accent6"/>
+          </a:lnRef>
+          <a:fillRef idx="3">
+            <a:schemeClr val="accent6"/>
+          </a:fillRef>
+          <a:effectRef idx="3">
+            <a:schemeClr val="accent6"/>
+          </a:effectRef>
+          <a:fontRef idx="minor">
+            <a:schemeClr val="lt1"/>
+          </a:fontRef>
+        </p:style>
+        <p:txBody>
+          <a:bodyPr rtlCol="0" anchor="ctr"/>
+          <a:lstStyle/>
+          <a:p>
+            <a:pPr algn="ctr"/>
+            <a:endParaRPr lang="en-US"/>
+          </a:p>
+        </p:txBody>
+      </p:sp>
+      <p:sp>
+        <p:nvSpPr>
+          <p:cNvPr id="49" name="Pentagon 48"/>
+          <p:cNvSpPr/>
+          <p:nvPr/>
+        </p:nvSpPr>
+        <p:spPr>
+          <a:xfrm rot="5400000">
+            <a:off x="22462465" y="19120781"/>
+            <a:ext cx="3056244" cy="491523"/>
+          </a:xfrm>
+          <a:prstGeom prst="homePlate">
+            <a:avLst/>
+          </a:prstGeom>
+          <a:solidFill>
+            <a:srgbClr val="FFFF00"/>
+          </a:solidFill>
+        </p:spPr>
+        <p:style>
+          <a:lnRef idx="0">
+            <a:schemeClr val="accent6"/>
+          </a:lnRef>
+          <a:fillRef idx="3">
+            <a:schemeClr val="accent6"/>
+          </a:fillRef>
+          <a:effectRef idx="3">
+            <a:schemeClr val="accent6"/>
+          </a:effectRef>
+          <a:fontRef idx="minor">
+            <a:schemeClr val="lt1"/>
+          </a:fontRef>
+        </p:style>
+        <p:txBody>
+          <a:bodyPr vert="wordArtVert" rtlCol="0" anchor="ctr"/>
+          <a:lstStyle/>
+          <a:p>
+            <a:pPr algn="ctr"/>
+            <a:endParaRPr lang="en-US" dirty="0"/>
+          </a:p>
+        </p:txBody>
+      </p:sp>
+      <p:sp>
+        <p:nvSpPr>
+          <p:cNvPr id="50" name="Pentagon 49"/>
+          <p:cNvSpPr/>
+          <p:nvPr/>
+        </p:nvSpPr>
+        <p:spPr>
+          <a:xfrm rot="5400000">
+            <a:off x="13933571" y="18642164"/>
+            <a:ext cx="3998234" cy="491523"/>
+          </a:xfrm>
+          <a:prstGeom prst="homePlate">
+            <a:avLst/>
+          </a:prstGeom>
+          <a:solidFill>
+            <a:srgbClr val="FFFF00"/>
+          </a:solidFill>
+        </p:spPr>
+        <p:style>
+          <a:lnRef idx="0">
+            <a:schemeClr val="accent6"/>
+          </a:lnRef>
+          <a:fillRef idx="3">
+            <a:schemeClr val="accent6"/>
+          </a:fillRef>
+          <a:effectRef idx="3">
+            <a:schemeClr val="accent6"/>
+          </a:effectRef>
+          <a:fontRef idx="minor">
+            <a:schemeClr val="lt1"/>
+          </a:fontRef>
+        </p:style>
+        <p:txBody>
+          <a:bodyPr rtlCol="0" anchor="ctr"/>
+          <a:lstStyle/>
+          <a:p>
+            <a:pPr algn="ctr"/>
+            <a:endParaRPr lang="en-US"/>
+          </a:p>
+        </p:txBody>
+      </p:sp>
+      <p:sp>
+        <p:nvSpPr>
+          <p:cNvPr id="51" name="Pentagon 50"/>
+          <p:cNvSpPr/>
+          <p:nvPr/>
+        </p:nvSpPr>
+        <p:spPr>
+          <a:xfrm rot="5400000">
+            <a:off x="13190618" y="18649784"/>
+            <a:ext cx="3998234" cy="491523"/>
+          </a:xfrm>
+          <a:prstGeom prst="homePlate">
+            <a:avLst/>
+          </a:prstGeom>
+          <a:solidFill>
+            <a:srgbClr val="FFFF00"/>
+          </a:solidFill>
+        </p:spPr>
+        <p:style>
+          <a:lnRef idx="0">
+            <a:schemeClr val="accent6"/>
+          </a:lnRef>
+          <a:fillRef idx="3">
+            <a:schemeClr val="accent6"/>
+          </a:fillRef>
+          <a:effectRef idx="3">
+            <a:schemeClr val="accent6"/>
+          </a:effectRef>
+          <a:fontRef idx="minor">
+            <a:schemeClr val="lt1"/>
+          </a:fontRef>
+        </p:style>
+        <p:txBody>
+          <a:bodyPr rtlCol="0" anchor="ctr"/>
+          <a:lstStyle/>
+          <a:p>
+            <a:pPr algn="ctr"/>
+            <a:endParaRPr lang="en-US"/>
+          </a:p>
+        </p:txBody>
+      </p:sp>
+      <p:sp>
+        <p:nvSpPr>
+          <p:cNvPr id="52" name="TextBox 51"/>
+          <p:cNvSpPr txBox="1"/>
+          <p:nvPr/>
+        </p:nvSpPr>
+        <p:spPr>
+          <a:xfrm rot="5400000">
+            <a:off x="23099314" y="19428060"/>
+            <a:ext cx="1798095" cy="584775"/>
+          </a:xfrm>
+          <a:prstGeom prst="rect">
+            <a:avLst/>
+          </a:prstGeom>
+          <a:noFill/>
+        </p:spPr>
+        <p:txBody>
+          <a:bodyPr wrap="square" rtlCol="0">
+            <a:spAutoFit/>
+          </a:bodyPr>
+          <a:lstStyle/>
+          <a:p>
+            <a:r>
+              <a:rPr lang="en-US" sz="3200" dirty="0">
+                <a:latin typeface="Arial Black" panose="020B0A04020102020204" pitchFamily="34" charset="0"/>
+                <a:cs typeface="Courier New" panose="02070309020205020404" pitchFamily="49" charset="0"/>
+              </a:rPr>
+              <a:t>LOCK2</a:t>
+            </a:r>
+          </a:p>
+        </p:txBody>
+      </p:sp>
+      <p:sp>
+        <p:nvSpPr>
+          <p:cNvPr id="53" name="TextBox 52"/>
+          <p:cNvSpPr txBox="1"/>
+          <p:nvPr/>
+        </p:nvSpPr>
+        <p:spPr>
+          <a:xfrm rot="5400000">
+            <a:off x="23831741" y="19428059"/>
+            <a:ext cx="1798092" cy="584775"/>
+          </a:xfrm>
+          <a:prstGeom prst="rect">
+            <a:avLst/>
+          </a:prstGeom>
+          <a:noFill/>
+        </p:spPr>
+        <p:txBody>
+          <a:bodyPr wrap="square" rtlCol="0">
+            <a:spAutoFit/>
+          </a:bodyPr>
+          <a:lstStyle/>
+          <a:p>
+            <a:r>
+              <a:rPr lang="en-US" sz="3200" dirty="0">
+                <a:latin typeface="Arial Black" panose="020B0A04020102020204" pitchFamily="34" charset="0"/>
+                <a:cs typeface="Courier New" panose="02070309020205020404" pitchFamily="49" charset="0"/>
+              </a:rPr>
+              <a:t>LOCK3</a:t>
+            </a:r>
+          </a:p>
+        </p:txBody>
+      </p:sp>
+      <p:sp>
+        <p:nvSpPr>
+          <p:cNvPr id="54" name="TextBox 53"/>
+          <p:cNvSpPr txBox="1"/>
+          <p:nvPr/>
+        </p:nvSpPr>
+        <p:spPr>
+          <a:xfrm rot="5400000">
+            <a:off x="14293733" y="19335292"/>
+            <a:ext cx="1764958" cy="584775"/>
+          </a:xfrm>
+          <a:prstGeom prst="rect">
+            <a:avLst/>
+          </a:prstGeom>
+          <a:noFill/>
+        </p:spPr>
+        <p:txBody>
+          <a:bodyPr wrap="square" rtlCol="0">
+            <a:spAutoFit/>
+          </a:bodyPr>
+          <a:lstStyle/>
+          <a:p>
+            <a:r>
+              <a:rPr lang="en-US" sz="3200" dirty="0">
+                <a:latin typeface="Arial Black" panose="020B0A04020102020204" pitchFamily="34" charset="0"/>
+                <a:cs typeface="Courier New" panose="02070309020205020404" pitchFamily="49" charset="0"/>
+              </a:rPr>
+              <a:t>LOCK0</a:t>
+            </a:r>
+          </a:p>
+        </p:txBody>
+      </p:sp>
+      <p:sp>
+        <p:nvSpPr>
+          <p:cNvPr id="55" name="TextBox 54"/>
+          <p:cNvSpPr txBox="1"/>
+          <p:nvPr/>
+        </p:nvSpPr>
+        <p:spPr>
+          <a:xfrm rot="5400000">
+            <a:off x="15055734" y="19335291"/>
+            <a:ext cx="1764956" cy="584775"/>
+          </a:xfrm>
+          <a:prstGeom prst="rect">
+            <a:avLst/>
+          </a:prstGeom>
+          <a:noFill/>
+        </p:spPr>
+        <p:txBody>
+          <a:bodyPr wrap="square" rtlCol="0">
+            <a:spAutoFit/>
+          </a:bodyPr>
+          <a:lstStyle/>
+          <a:p>
+            <a:r>
+              <a:rPr lang="en-US" sz="3200" dirty="0">
+                <a:latin typeface="Arial Black" panose="020B0A04020102020204" pitchFamily="34" charset="0"/>
+                <a:cs typeface="Courier New" panose="02070309020205020404" pitchFamily="49" charset="0"/>
+              </a:rPr>
+              <a:t>LOCK1</a:t>
+            </a:r>
+          </a:p>
+        </p:txBody>
+      </p:sp>
+      <p:sp>
+        <p:nvSpPr>
+          <p:cNvPr id="64" name="Pentagon 28"/>
+          <p:cNvSpPr/>
+          <p:nvPr/>
+        </p:nvSpPr>
+        <p:spPr>
+          <a:xfrm rot="5400000">
+            <a:off x="15370529" y="18618401"/>
+            <a:ext cx="4045761" cy="491523"/>
+          </a:xfrm>
+          <a:prstGeom prst="homePlate">
+            <a:avLst/>
+          </a:prstGeom>
+          <a:solidFill>
+            <a:srgbClr val="FF0000"/>
+          </a:solidFill>
+        </p:spPr>
+        <p:style>
+          <a:lnRef idx="0">
+            <a:schemeClr val="accent6"/>
+          </a:lnRef>
+          <a:fillRef idx="3">
+            <a:schemeClr val="accent6"/>
+          </a:fillRef>
+          <a:effectRef idx="3">
+            <a:schemeClr val="accent6"/>
+          </a:effectRef>
+          <a:fontRef idx="minor">
+            <a:schemeClr val="lt1"/>
+          </a:fontRef>
+        </p:style>
+        <p:txBody>
+          <a:bodyPr rtlCol="0" anchor="ctr"/>
+          <a:lstStyle/>
+          <a:p>
+            <a:pPr algn="ctr"/>
+            <a:endParaRPr lang="en-US"/>
+          </a:p>
+        </p:txBody>
+      </p:sp>
+      <p:sp>
+        <p:nvSpPr>
+          <p:cNvPr id="65" name="Pentagon 29"/>
+          <p:cNvSpPr/>
+          <p:nvPr/>
+        </p:nvSpPr>
+        <p:spPr>
+          <a:xfrm rot="5400000">
+            <a:off x="14627576" y="18626021"/>
+            <a:ext cx="4045761" cy="491523"/>
+          </a:xfrm>
+          <a:prstGeom prst="homePlate">
+            <a:avLst/>
+          </a:prstGeom>
+          <a:solidFill>
+            <a:srgbClr val="FF0000"/>
+          </a:solidFill>
+        </p:spPr>
+        <p:style>
+          <a:lnRef idx="0">
+            <a:schemeClr val="accent6"/>
+          </a:lnRef>
+          <a:fillRef idx="3">
+            <a:schemeClr val="accent6"/>
+          </a:fillRef>
+          <a:effectRef idx="3">
+            <a:schemeClr val="accent6"/>
+          </a:effectRef>
+          <a:fontRef idx="minor">
+            <a:schemeClr val="lt1"/>
+          </a:fontRef>
+        </p:style>
+        <p:txBody>
+          <a:bodyPr vert="wordArtVert" rtlCol="0" anchor="ctr"/>
+          <a:lstStyle/>
+          <a:p>
+            <a:pPr algn="ctr"/>
+            <a:endParaRPr lang="en-US" dirty="0"/>
+          </a:p>
+        </p:txBody>
+      </p:sp>
+      <p:sp>
+        <p:nvSpPr>
+          <p:cNvPr id="66" name="TextBox 65"/>
+          <p:cNvSpPr txBox="1"/>
+          <p:nvPr/>
+        </p:nvSpPr>
+        <p:spPr>
+          <a:xfrm rot="5400000">
+            <a:off x="15913388" y="19443413"/>
+            <a:ext cx="1371600" cy="584775"/>
+          </a:xfrm>
+          <a:prstGeom prst="rect">
+            <a:avLst/>
+          </a:prstGeom>
+          <a:noFill/>
+        </p:spPr>
+        <p:txBody>
+          <a:bodyPr wrap="square" rtlCol="0">
+            <a:spAutoFit/>
+          </a:bodyPr>
+          <a:lstStyle/>
+          <a:p>
+            <a:r>
+              <a:rPr lang="en-US" sz="3200" dirty="0">
+                <a:latin typeface="Arial Black" panose="020B0A04020102020204" pitchFamily="34" charset="0"/>
+                <a:cs typeface="Courier New" panose="02070309020205020404" pitchFamily="49" charset="0"/>
+              </a:rPr>
+              <a:t>OTP0</a:t>
+            </a:r>
+          </a:p>
+        </p:txBody>
+      </p:sp>
+      <p:sp>
+        <p:nvSpPr>
+          <p:cNvPr id="67" name="TextBox 66"/>
+          <p:cNvSpPr txBox="1"/>
+          <p:nvPr/>
+        </p:nvSpPr>
+        <p:spPr>
+          <a:xfrm rot="5400000">
+            <a:off x="16670636" y="19443413"/>
+            <a:ext cx="1371600" cy="584775"/>
+          </a:xfrm>
+          <a:prstGeom prst="rect">
+            <a:avLst/>
+          </a:prstGeom>
+          <a:noFill/>
+        </p:spPr>
+        <p:txBody>
+          <a:bodyPr wrap="square" rtlCol="0">
+            <a:spAutoFit/>
+          </a:bodyPr>
+          <a:lstStyle/>
+          <a:p>
+            <a:r>
+              <a:rPr lang="en-US" sz="3200" dirty="0">
+                <a:latin typeface="Arial Black" panose="020B0A04020102020204" pitchFamily="34" charset="0"/>
+                <a:cs typeface="Courier New" panose="02070309020205020404" pitchFamily="49" charset="0"/>
+              </a:rPr>
+              <a:t>OTP1</a:t>
+            </a:r>
+          </a:p>
+        </p:txBody>
+      </p:sp>
+      <p:sp>
+        <p:nvSpPr>
+          <p:cNvPr id="68" name="Pentagon 28"/>
+          <p:cNvSpPr/>
+          <p:nvPr/>
+        </p:nvSpPr>
+        <p:spPr>
+          <a:xfrm rot="5400000">
+            <a:off x="16844889" y="18618401"/>
+            <a:ext cx="4045761" cy="491523"/>
+          </a:xfrm>
+          <a:prstGeom prst="homePlate">
+            <a:avLst/>
+          </a:prstGeom>
+          <a:solidFill>
+            <a:srgbClr val="FF0000"/>
+          </a:solidFill>
+        </p:spPr>
+        <p:style>
+          <a:lnRef idx="0">
+            <a:schemeClr val="accent6"/>
+          </a:lnRef>
+          <a:fillRef idx="3">
+            <a:schemeClr val="accent6"/>
+          </a:fillRef>
+          <a:effectRef idx="3">
+            <a:schemeClr val="accent6"/>
+          </a:effectRef>
+          <a:fontRef idx="minor">
+            <a:schemeClr val="lt1"/>
+          </a:fontRef>
+        </p:style>
+        <p:txBody>
+          <a:bodyPr rtlCol="0" anchor="ctr"/>
+          <a:lstStyle/>
+          <a:p>
+            <a:pPr algn="ctr"/>
+            <a:endParaRPr lang="en-US"/>
+          </a:p>
+        </p:txBody>
+      </p:sp>
+      <p:sp>
+        <p:nvSpPr>
+          <p:cNvPr id="69" name="Pentagon 29"/>
+          <p:cNvSpPr/>
+          <p:nvPr/>
+        </p:nvSpPr>
+        <p:spPr>
+          <a:xfrm rot="5400000">
+            <a:off x="16101936" y="18626021"/>
+            <a:ext cx="4045761" cy="491523"/>
+          </a:xfrm>
+          <a:prstGeom prst="homePlate">
+            <a:avLst/>
+          </a:prstGeom>
+          <a:solidFill>
+            <a:srgbClr val="FF0000"/>
+          </a:solidFill>
+        </p:spPr>
+        <p:style>
+          <a:lnRef idx="0">
+            <a:schemeClr val="accent6"/>
+          </a:lnRef>
+          <a:fillRef idx="3">
+            <a:schemeClr val="accent6"/>
+          </a:fillRef>
+          <a:effectRef idx="3">
+            <a:schemeClr val="accent6"/>
+          </a:effectRef>
+          <a:fontRef idx="minor">
+            <a:schemeClr val="lt1"/>
+          </a:fontRef>
+        </p:style>
+        <p:txBody>
+          <a:bodyPr vert="wordArtVert" rtlCol="0" anchor="ctr"/>
+          <a:lstStyle/>
+          <a:p>
+            <a:pPr algn="ctr"/>
+            <a:endParaRPr lang="en-US" dirty="0"/>
+          </a:p>
+        </p:txBody>
+      </p:sp>
+      <p:sp>
+        <p:nvSpPr>
+          <p:cNvPr id="70" name="TextBox 69"/>
+          <p:cNvSpPr txBox="1"/>
+          <p:nvPr/>
+        </p:nvSpPr>
+        <p:spPr>
+          <a:xfrm rot="5400000">
+            <a:off x="17387748" y="19443413"/>
+            <a:ext cx="1371600" cy="584775"/>
+          </a:xfrm>
+          <a:prstGeom prst="rect">
+            <a:avLst/>
+          </a:prstGeom>
+          <a:noFill/>
+        </p:spPr>
+        <p:txBody>
+          <a:bodyPr wrap="square" rtlCol="0">
+            <a:spAutoFit/>
+          </a:bodyPr>
+          <a:lstStyle/>
+          <a:p>
+            <a:r>
+              <a:rPr lang="en-US" sz="3200" dirty="0">
+                <a:latin typeface="Arial Black" panose="020B0A04020102020204" pitchFamily="34" charset="0"/>
+                <a:cs typeface="Courier New" panose="02070309020205020404" pitchFamily="49" charset="0"/>
+              </a:rPr>
+              <a:t>OTP2</a:t>
+            </a:r>
+          </a:p>
+        </p:txBody>
+      </p:sp>
+      <p:sp>
+        <p:nvSpPr>
+          <p:cNvPr id="71" name="TextBox 70"/>
+          <p:cNvSpPr txBox="1"/>
+          <p:nvPr/>
+        </p:nvSpPr>
+        <p:spPr>
+          <a:xfrm rot="5400000">
+            <a:off x="18144996" y="19443413"/>
+            <a:ext cx="1371600" cy="584775"/>
+          </a:xfrm>
+          <a:prstGeom prst="rect">
+            <a:avLst/>
+          </a:prstGeom>
+          <a:noFill/>
+        </p:spPr>
+        <p:txBody>
+          <a:bodyPr wrap="square" rtlCol="0">
+            <a:spAutoFit/>
+          </a:bodyPr>
+          <a:lstStyle/>
+          <a:p>
+            <a:r>
+              <a:rPr lang="en-US" sz="3200" dirty="0">
+                <a:latin typeface="Arial Black" panose="020B0A04020102020204" pitchFamily="34" charset="0"/>
+                <a:cs typeface="Courier New" panose="02070309020205020404" pitchFamily="49" charset="0"/>
+              </a:rPr>
+              <a:t>OTP3</a:t>
+            </a:r>
+          </a:p>
+        </p:txBody>
+      </p:sp>
+      <p:sp>
+        <p:nvSpPr>
+          <p:cNvPr id="95" name="Pentagon 30"/>
+          <p:cNvSpPr/>
+          <p:nvPr/>
+        </p:nvSpPr>
+        <p:spPr>
+          <a:xfrm rot="5400000">
+            <a:off x="23926452" y="19117063"/>
+            <a:ext cx="3064050" cy="491523"/>
+          </a:xfrm>
+          <a:prstGeom prst="homePlate">
+            <a:avLst/>
+          </a:prstGeom>
+          <a:solidFill>
+            <a:srgbClr val="FFFF00"/>
+          </a:solidFill>
+        </p:spPr>
+        <p:style>
+          <a:lnRef idx="0">
+            <a:schemeClr val="accent6"/>
+          </a:lnRef>
+          <a:fillRef idx="3">
+            <a:schemeClr val="accent6"/>
+          </a:fillRef>
+          <a:effectRef idx="3">
+            <a:schemeClr val="accent6"/>
+          </a:effectRef>
+          <a:fontRef idx="minor">
+            <a:schemeClr val="lt1"/>
+          </a:fontRef>
+        </p:style>
+        <p:txBody>
+          <a:bodyPr rtlCol="0" anchor="ctr"/>
+          <a:lstStyle/>
+          <a:p>
+            <a:pPr algn="ctr"/>
+            <a:endParaRPr lang="en-US"/>
+          </a:p>
+        </p:txBody>
+      </p:sp>
+      <p:sp>
+        <p:nvSpPr>
+          <p:cNvPr id="47" name="Rectangle 46"/>
+          <p:cNvSpPr/>
+          <p:nvPr/>
+        </p:nvSpPr>
+        <p:spPr>
+          <a:xfrm>
+            <a:off x="7526256" y="16794540"/>
+            <a:ext cx="32409079" cy="1569660"/>
+          </a:xfrm>
+          <a:prstGeom prst="rect">
+            <a:avLst/>
+          </a:prstGeom>
+          <a:noFill/>
+          <a:ln>
+            <a:noFill/>
+          </a:ln>
+        </p:spPr>
+        <p:txBody>
+          <a:bodyPr wrap="square">
+            <a:spAutoFit/>
+          </a:bodyPr>
+          <a:lstStyle/>
+          <a:p>
+            <a:r>
+              <a:rPr lang="en-US" sz="3200" b="1" dirty="0">
+                <a:solidFill>
+                  <a:schemeClr val="bg1"/>
+                </a:solidFill>
+                <a:highlight>
+                  <a:srgbClr val="000000"/>
+                </a:highlight>
+                <a:latin typeface="Courier New" panose="02070309020205020404" pitchFamily="49" charset="0"/>
+                <a:cs typeface="Courier New" panose="02070309020205020404" pitchFamily="49" charset="0"/>
+              </a:rPr>
+              <a:t>04 80 16 1A</a:t>
+            </a:r>
+            <a:r>
+              <a:rPr lang="en-US" sz="3200" b="1" dirty="0">
+                <a:solidFill>
+                  <a:schemeClr val="bg1"/>
+                </a:solidFill>
+                <a:latin typeface="Courier New" panose="02070309020205020404" pitchFamily="49" charset="0"/>
+                <a:cs typeface="Courier New" panose="02070309020205020404" pitchFamily="49" charset="0"/>
+              </a:rPr>
+              <a:t> </a:t>
+            </a:r>
+            <a:r>
+              <a:rPr lang="en-US" sz="3200" b="1" dirty="0">
+                <a:solidFill>
+                  <a:schemeClr val="bg1"/>
+                </a:solidFill>
+                <a:highlight>
+                  <a:srgbClr val="000000"/>
+                </a:highlight>
+                <a:latin typeface="Courier New" panose="02070309020205020404" pitchFamily="49" charset="0"/>
+                <a:cs typeface="Courier New" panose="02070309020205020404" pitchFamily="49" charset="0"/>
+              </a:rPr>
+              <a:t>52 A3 40 80</a:t>
+            </a:r>
+            <a:r>
+              <a:rPr lang="en-US" sz="3200" b="1" dirty="0">
+                <a:latin typeface="Courier New" panose="02070309020205020404" pitchFamily="49" charset="0"/>
+                <a:cs typeface="Courier New" panose="02070309020205020404" pitchFamily="49" charset="0"/>
+              </a:rPr>
+              <a:t> </a:t>
+            </a:r>
+            <a:r>
+              <a:rPr lang="en-US" sz="3200" b="1" dirty="0">
+                <a:solidFill>
+                  <a:schemeClr val="bg1"/>
+                </a:solidFill>
+                <a:highlight>
+                  <a:srgbClr val="000000"/>
+                </a:highlight>
+                <a:latin typeface="Courier New" panose="02070309020205020404" pitchFamily="49" charset="0"/>
+                <a:cs typeface="Courier New" panose="02070309020205020404" pitchFamily="49" charset="0"/>
+              </a:rPr>
+              <a:t>31 48 </a:t>
+            </a:r>
+            <a:r>
+              <a:rPr lang="fi-FI" sz="3200" b="1" dirty="0">
+                <a:highlight>
+                  <a:srgbClr val="FFFF00"/>
+                </a:highlight>
+                <a:latin typeface="Courier New" panose="02070309020205020404" pitchFamily="49" charset="0"/>
+                <a:cs typeface="Courier New" panose="02070309020205020404" pitchFamily="49" charset="0"/>
+              </a:rPr>
+              <a:t>00</a:t>
+            </a:r>
+            <a:r>
+              <a:rPr lang="fi-FI" sz="3200" b="1" dirty="0">
+                <a:solidFill>
+                  <a:schemeClr val="bg1"/>
+                </a:solidFill>
+                <a:highlight>
+                  <a:srgbClr val="000000"/>
+                </a:highlight>
+                <a:latin typeface="Courier New" panose="02070309020205020404" pitchFamily="49" charset="0"/>
+                <a:cs typeface="Courier New" panose="02070309020205020404" pitchFamily="49" charset="0"/>
+              </a:rPr>
+              <a:t> </a:t>
+            </a:r>
+            <a:r>
+              <a:rPr lang="fi-FI" sz="3200" b="1" dirty="0">
+                <a:highlight>
+                  <a:srgbClr val="FFFF00"/>
+                </a:highlight>
+                <a:latin typeface="Courier New" panose="02070309020205020404" pitchFamily="49" charset="0"/>
+                <a:cs typeface="Courier New" panose="02070309020205020404" pitchFamily="49" charset="0"/>
+              </a:rPr>
+              <a:t>00</a:t>
+            </a:r>
+            <a:r>
+              <a:rPr lang="fi-FI" sz="3200" b="1" dirty="0">
+                <a:solidFill>
+                  <a:schemeClr val="bg1"/>
+                </a:solidFill>
+                <a:latin typeface="Courier New" panose="02070309020205020404" pitchFamily="49" charset="0"/>
+                <a:cs typeface="Courier New" panose="02070309020205020404" pitchFamily="49" charset="0"/>
+              </a:rPr>
+              <a:t> </a:t>
+            </a:r>
+            <a:r>
+              <a:rPr lang="en-US" sz="3200" b="1" dirty="0">
+                <a:solidFill>
+                  <a:schemeClr val="bg1"/>
+                </a:solidFill>
+                <a:highlight>
+                  <a:srgbClr val="FF0000"/>
+                </a:highlight>
+                <a:latin typeface="Courier New" panose="02070309020205020404" pitchFamily="49" charset="0"/>
+                <a:cs typeface="Courier New" panose="02070309020205020404" pitchFamily="49" charset="0"/>
+              </a:rPr>
+              <a:t>E1</a:t>
+            </a:r>
+            <a:r>
+              <a:rPr lang="en-US" sz="3200" b="1" dirty="0">
+                <a:solidFill>
+                  <a:schemeClr val="bg1"/>
+                </a:solidFill>
+                <a:highlight>
+                  <a:srgbClr val="000000"/>
+                </a:highlight>
+                <a:latin typeface="Courier New" panose="02070309020205020404" pitchFamily="49" charset="0"/>
+                <a:cs typeface="Courier New" panose="02070309020205020404" pitchFamily="49" charset="0"/>
+              </a:rPr>
+              <a:t> </a:t>
+            </a:r>
+            <a:r>
+              <a:rPr lang="en-US" sz="3200" b="1" dirty="0">
+                <a:solidFill>
+                  <a:schemeClr val="bg1"/>
+                </a:solidFill>
+                <a:highlight>
+                  <a:srgbClr val="FF0000"/>
+                </a:highlight>
+                <a:latin typeface="Courier New" panose="02070309020205020404" pitchFamily="49" charset="0"/>
+                <a:cs typeface="Courier New" panose="02070309020205020404" pitchFamily="49" charset="0"/>
+              </a:rPr>
+              <a:t>10</a:t>
+            </a:r>
+            <a:r>
+              <a:rPr lang="en-US" sz="3200" b="1" dirty="0">
+                <a:solidFill>
+                  <a:schemeClr val="bg1"/>
+                </a:solidFill>
+                <a:highlight>
+                  <a:srgbClr val="000000"/>
+                </a:highlight>
+                <a:latin typeface="Courier New" panose="02070309020205020404" pitchFamily="49" charset="0"/>
+                <a:cs typeface="Courier New" panose="02070309020205020404" pitchFamily="49" charset="0"/>
+              </a:rPr>
+              <a:t> </a:t>
+            </a:r>
+            <a:r>
+              <a:rPr lang="en-US" sz="3200" b="1" dirty="0">
+                <a:solidFill>
+                  <a:schemeClr val="bg1"/>
+                </a:solidFill>
+                <a:highlight>
+                  <a:srgbClr val="FF0000"/>
+                </a:highlight>
+                <a:latin typeface="Courier New" panose="02070309020205020404" pitchFamily="49" charset="0"/>
+                <a:cs typeface="Courier New" panose="02070309020205020404" pitchFamily="49" charset="0"/>
+              </a:rPr>
+              <a:t>12</a:t>
+            </a:r>
+            <a:r>
+              <a:rPr lang="en-US" sz="3200" b="1" dirty="0">
+                <a:solidFill>
+                  <a:schemeClr val="bg1"/>
+                </a:solidFill>
+                <a:highlight>
+                  <a:srgbClr val="000000"/>
+                </a:highlight>
+                <a:latin typeface="Courier New" panose="02070309020205020404" pitchFamily="49" charset="0"/>
+                <a:cs typeface="Courier New" panose="02070309020205020404" pitchFamily="49" charset="0"/>
+              </a:rPr>
+              <a:t> </a:t>
+            </a:r>
+            <a:r>
+              <a:rPr lang="en-US" sz="3200" b="1" dirty="0">
+                <a:solidFill>
+                  <a:schemeClr val="bg1"/>
+                </a:solidFill>
+                <a:highlight>
+                  <a:srgbClr val="FF0000"/>
+                </a:highlight>
+                <a:latin typeface="Courier New" panose="02070309020205020404" pitchFamily="49" charset="0"/>
+                <a:cs typeface="Courier New" panose="02070309020205020404" pitchFamily="49" charset="0"/>
+              </a:rPr>
+              <a:t>00</a:t>
+            </a:r>
+            <a:r>
+              <a:rPr lang="fi-FI" sz="3200" b="1" dirty="0">
+                <a:latin typeface="Courier New" panose="02070309020205020404" pitchFamily="49" charset="0"/>
+                <a:cs typeface="Courier New" panose="02070309020205020404" pitchFamily="49" charset="0"/>
+              </a:rPr>
+              <a:t> </a:t>
+            </a:r>
+            <a:r>
+              <a:rPr lang="fi-FI" sz="3200" b="1" dirty="0">
+                <a:solidFill>
+                  <a:schemeClr val="accent3"/>
+                </a:solidFill>
+                <a:latin typeface="Courier New" panose="02070309020205020404" pitchFamily="49" charset="0"/>
+                <a:cs typeface="Courier New" panose="02070309020205020404" pitchFamily="49" charset="0"/>
+              </a:rPr>
+              <a:t>AA AA AA AA AA AA AA AA AA AA AA AA AA AA AA AA AA AA AA AA AA AA AA AA AA AA AA AA AA AA AA AA AA AA AA AA AA AA AA AA AA AA AA AA AA AA AA AA AA AA AA AA AA AA AA AA AA AA AA AA AA AA AA AA AA AA AA AA AA AA AA AA AA AA AA AA AA AA AA AA AA AA AA AA AA AA AA AA AA AA AA AA AA AA </a:t>
+            </a:r>
+            <a:r>
+              <a:rPr lang="fi-FI" sz="3200" b="1" dirty="0">
+                <a:highlight>
+                  <a:srgbClr val="FFFF00"/>
+                </a:highlight>
+                <a:latin typeface="Courier New" panose="02070309020205020404" pitchFamily="49" charset="0"/>
+                <a:cs typeface="Courier New" panose="02070309020205020404" pitchFamily="49" charset="0"/>
+              </a:rPr>
+              <a:t>00</a:t>
+            </a:r>
+            <a:r>
+              <a:rPr lang="fi-FI" sz="3200" b="1" dirty="0">
+                <a:highlight>
+                  <a:srgbClr val="000000"/>
+                </a:highlight>
+                <a:latin typeface="Courier New" panose="02070309020205020404" pitchFamily="49" charset="0"/>
+                <a:cs typeface="Courier New" panose="02070309020205020404" pitchFamily="49" charset="0"/>
+              </a:rPr>
+              <a:t> </a:t>
+            </a:r>
+            <a:r>
+              <a:rPr lang="fi-FI" sz="3200" b="1" dirty="0">
+                <a:highlight>
+                  <a:srgbClr val="FFFF00"/>
+                </a:highlight>
+                <a:latin typeface="Courier New" panose="02070309020205020404" pitchFamily="49" charset="0"/>
+                <a:cs typeface="Courier New" panose="02070309020205020404" pitchFamily="49" charset="0"/>
+              </a:rPr>
+              <a:t>00</a:t>
+            </a:r>
+            <a:r>
+              <a:rPr lang="fi-FI" sz="3200" b="1" dirty="0">
+                <a:highlight>
+                  <a:srgbClr val="000000"/>
+                </a:highlight>
+                <a:latin typeface="Courier New" panose="02070309020205020404" pitchFamily="49" charset="0"/>
+                <a:cs typeface="Courier New" panose="02070309020205020404" pitchFamily="49" charset="0"/>
+              </a:rPr>
+              <a:t> </a:t>
+            </a:r>
+            <a:r>
+              <a:rPr lang="fi-FI" sz="3200" b="1" dirty="0">
+                <a:highlight>
+                  <a:srgbClr val="FFFF00"/>
+                </a:highlight>
+                <a:latin typeface="Courier New" panose="02070309020205020404" pitchFamily="49" charset="0"/>
+                <a:cs typeface="Courier New" panose="02070309020205020404" pitchFamily="49" charset="0"/>
+              </a:rPr>
+              <a:t>00</a:t>
+            </a:r>
+            <a:r>
+              <a:rPr lang="fi-FI" sz="3200" b="1" dirty="0">
+                <a:solidFill>
+                  <a:schemeClr val="bg1"/>
+                </a:solidFill>
+                <a:highlight>
+                  <a:srgbClr val="000000"/>
+                </a:highlight>
+                <a:latin typeface="Courier New" panose="02070309020205020404" pitchFamily="49" charset="0"/>
+                <a:cs typeface="Courier New" panose="02070309020205020404" pitchFamily="49" charset="0"/>
+              </a:rPr>
+              <a:t> BD</a:t>
+            </a:r>
+            <a:r>
+              <a:rPr lang="fi-FI" sz="3200" b="1" dirty="0">
+                <a:solidFill>
+                  <a:schemeClr val="bg1"/>
+                </a:solidFill>
+                <a:latin typeface="Courier New" panose="02070309020205020404" pitchFamily="49" charset="0"/>
+                <a:cs typeface="Courier New" panose="02070309020205020404" pitchFamily="49" charset="0"/>
+              </a:rPr>
+              <a:t> </a:t>
+            </a:r>
+            <a:r>
+              <a:rPr lang="en-US" sz="3200" b="1" dirty="0">
+                <a:solidFill>
+                  <a:schemeClr val="bg1"/>
+                </a:solidFill>
+                <a:highlight>
+                  <a:srgbClr val="000000"/>
+                </a:highlight>
+                <a:latin typeface="Courier New" panose="02070309020205020404" pitchFamily="49" charset="0"/>
+                <a:cs typeface="Courier New" panose="02070309020205020404" pitchFamily="49" charset="0"/>
+              </a:rPr>
+              <a:t>04 00 00 FF</a:t>
+            </a:r>
+            <a:r>
+              <a:rPr lang="fi-FI" sz="3200" b="1" dirty="0">
+                <a:solidFill>
+                  <a:schemeClr val="bg1"/>
+                </a:solidFill>
+                <a:latin typeface="Courier New" panose="02070309020205020404" pitchFamily="49" charset="0"/>
+                <a:cs typeface="Courier New" panose="02070309020205020404" pitchFamily="49" charset="0"/>
+              </a:rPr>
+              <a:t> </a:t>
+            </a:r>
+            <a:r>
+              <a:rPr lang="en-US" sz="3200" b="1" dirty="0">
+                <a:solidFill>
+                  <a:schemeClr val="bg1"/>
+                </a:solidFill>
+                <a:highlight>
+                  <a:srgbClr val="000000"/>
+                </a:highlight>
+                <a:latin typeface="Courier New" panose="02070309020205020404" pitchFamily="49" charset="0"/>
+                <a:cs typeface="Courier New" panose="02070309020205020404" pitchFamily="49" charset="0"/>
+              </a:rPr>
+              <a:t>00 05 -- --</a:t>
+            </a:r>
+            <a:r>
+              <a:rPr lang="fi-FI" sz="3200" b="1" dirty="0">
+                <a:solidFill>
+                  <a:schemeClr val="bg1"/>
+                </a:solidFill>
+                <a:latin typeface="Courier New" panose="02070309020205020404" pitchFamily="49" charset="0"/>
+                <a:cs typeface="Courier New" panose="02070309020205020404" pitchFamily="49" charset="0"/>
+              </a:rPr>
+              <a:t> </a:t>
+            </a:r>
+            <a:r>
+              <a:rPr lang="en-US" sz="3200" b="1" dirty="0">
+                <a:solidFill>
+                  <a:schemeClr val="bg1"/>
+                </a:solidFill>
+                <a:highlight>
+                  <a:srgbClr val="000000"/>
+                </a:highlight>
+                <a:latin typeface="Courier New" panose="02070309020205020404" pitchFamily="49" charset="0"/>
+                <a:cs typeface="Courier New" panose="02070309020205020404" pitchFamily="49" charset="0"/>
+              </a:rPr>
+              <a:t>FF FF FF FF</a:t>
+            </a:r>
+            <a:r>
+              <a:rPr lang="fi-FI" sz="3200" b="1" dirty="0">
+                <a:solidFill>
+                  <a:schemeClr val="bg1"/>
+                </a:solidFill>
+                <a:latin typeface="Courier New" panose="02070309020205020404" pitchFamily="49" charset="0"/>
+                <a:cs typeface="Courier New" panose="02070309020205020404" pitchFamily="49" charset="0"/>
+              </a:rPr>
+              <a:t> </a:t>
+            </a:r>
+            <a:r>
+              <a:rPr lang="en-US" sz="3200" b="1" dirty="0">
+                <a:solidFill>
+                  <a:schemeClr val="bg1"/>
+                </a:solidFill>
+                <a:highlight>
+                  <a:srgbClr val="000000"/>
+                </a:highlight>
+                <a:latin typeface="Courier New" panose="02070309020205020404" pitchFamily="49" charset="0"/>
+                <a:cs typeface="Courier New" panose="02070309020205020404" pitchFamily="49" charset="0"/>
+              </a:rPr>
+              <a:t>00 00 -- -- </a:t>
+            </a:r>
+            <a:endParaRPr lang="en-US" sz="3200" b="1" dirty="0">
+              <a:solidFill>
+                <a:schemeClr val="bg1"/>
+              </a:solidFill>
+              <a:highlight>
+                <a:srgbClr val="000080"/>
+              </a:highlight>
+              <a:latin typeface="Courier New" panose="02070309020205020404" pitchFamily="49" charset="0"/>
+              <a:cs typeface="Courier New" panose="02070309020205020404" pitchFamily="49" charset="0"/>
+            </a:endParaRPr>
+          </a:p>
+        </p:txBody>
+      </p:sp>
+      <p:sp>
+        <p:nvSpPr>
+          <p:cNvPr id="89" name="Rectangle: Rounded Corners 88"/>
+          <p:cNvSpPr/>
+          <p:nvPr/>
+        </p:nvSpPr>
+        <p:spPr>
+          <a:xfrm>
+            <a:off x="6941430" y="21242471"/>
+            <a:ext cx="36223550" cy="7247287"/>
+          </a:xfrm>
+          <a:prstGeom prst="roundRect">
+            <a:avLst/>
+          </a:prstGeom>
+          <a:gradFill flip="none" rotWithShape="1">
+            <a:gsLst>
+              <a:gs pos="0">
+                <a:srgbClr val="FF0000"/>
+              </a:gs>
+              <a:gs pos="47000">
+                <a:srgbClr val="FFFF00"/>
+              </a:gs>
+              <a:gs pos="16000">
+                <a:srgbClr val="FFC000"/>
+              </a:gs>
+              <a:gs pos="100000">
+                <a:schemeClr val="accent1">
+                  <a:lumMod val="30000"/>
+                  <a:lumOff val="70000"/>
+                </a:schemeClr>
+              </a:gs>
+            </a:gsLst>
+            <a:lin ang="5400000" scaled="1"/>
+            <a:tileRect/>
+          </a:gradFill>
+          <a:ln w="203200" cmpd="tri">
+            <a:noFill/>
+            <a:prstDash val="solid"/>
+          </a:ln>
+          <a:effectLst>
+            <a:outerShdw blurRad="190500" dist="228600" dir="2700000" algn="ctr">
+              <a:srgbClr val="000000">
+                <a:alpha val="30000"/>
+              </a:srgbClr>
+            </a:outerShdw>
+          </a:effectLst>
+          <a:scene3d>
+            <a:camera prst="orthographicFront">
+              <a:rot lat="0" lon="0" rev="0"/>
+            </a:camera>
+            <a:lightRig rig="glow" dir="t">
+              <a:rot lat="0" lon="0" rev="4800000"/>
+            </a:lightRig>
+          </a:scene3d>
+          <a:sp3d prstMaterial="matte">
+            <a:bevelT w="127000" h="63500"/>
+          </a:sp3d>
+        </p:spPr>
+        <p:style>
+          <a:lnRef idx="2">
+            <a:schemeClr val="accent6"/>
+          </a:lnRef>
+          <a:fillRef idx="1">
+            <a:schemeClr val="lt1"/>
+          </a:fillRef>
+          <a:effectRef idx="0">
+            <a:schemeClr val="accent6"/>
+          </a:effectRef>
+          <a:fontRef idx="minor">
+            <a:schemeClr val="dk1"/>
+          </a:fontRef>
+        </p:style>
+        <p:txBody>
+          <a:bodyPr rot="0" spcFirstLastPara="0" vertOverflow="overflow" horzOverflow="overflow" vert="horz" wrap="square" lIns="91440" tIns="45720" rIns="91440" bIns="45720" numCol="1" spcCol="0" rtlCol="0" fromWordArt="0" anchor="ctr" anchorCtr="0" forceAA="0" compatLnSpc="1">
+            <a:prstTxWarp prst="textNoShape">
+              <a:avLst/>
+            </a:prstTxWarp>
+            <a:noAutofit/>
+          </a:bodyPr>
+          <a:lstStyle/>
+          <a:p>
+            <a:pPr algn="ctr"/>
+            <a:endParaRPr lang="en-US" sz="4000">
+              <a:solidFill>
+                <a:schemeClr val="dk1"/>
+              </a:solidFill>
+            </a:endParaRPr>
+          </a:p>
+        </p:txBody>
+      </p:sp>
+      <p:sp>
+        <p:nvSpPr>
+          <p:cNvPr id="90" name="Rectangle: Diagonal Corners Snipped 89"/>
+          <p:cNvSpPr/>
+          <p:nvPr/>
+        </p:nvSpPr>
+        <p:spPr>
+          <a:xfrm rot="10800000" flipH="1">
+            <a:off x="15536283" y="3697190"/>
+            <a:ext cx="20811118" cy="2942369"/>
+          </a:xfrm>
+          <a:prstGeom prst="snip2DiagRect">
+            <a:avLst/>
+          </a:prstGeom>
+          <a:gradFill>
+            <a:gsLst>
+              <a:gs pos="100000">
+                <a:srgbClr val="FF0000"/>
+              </a:gs>
+              <a:gs pos="76000">
+                <a:srgbClr val="808080">
+                  <a:alpha val="0"/>
+                </a:srgbClr>
+              </a:gs>
+            </a:gsLst>
+            <a:path path="circle">
+              <a:fillToRect l="100000" t="100000"/>
+            </a:path>
+          </a:gradFill>
+          <a:ln w="57150" cmpd="tri">
+            <a:gradFill flip="none" rotWithShape="1">
+              <a:gsLst>
+                <a:gs pos="0">
+                  <a:schemeClr val="tx1"/>
+                </a:gs>
+                <a:gs pos="50000">
+                  <a:schemeClr val="bg1"/>
+                </a:gs>
+                <a:gs pos="100000">
+                  <a:srgbClr val="FF0000"/>
+                </a:gs>
+              </a:gsLst>
+              <a:path path="circle">
+                <a:fillToRect l="100000" t="100000"/>
+              </a:path>
+              <a:tileRect r="-100000" b="-100000"/>
+            </a:gradFill>
+            <a:prstDash val="solid"/>
+          </a:ln>
+        </p:spPr>
+        <p:style>
+          <a:lnRef idx="2">
+            <a:schemeClr val="accent6"/>
+          </a:lnRef>
+          <a:fillRef idx="1">
+            <a:schemeClr val="lt1"/>
+          </a:fillRef>
+          <a:effectRef idx="0">
+            <a:schemeClr val="accent6"/>
+          </a:effectRef>
+          <a:fontRef idx="minor">
+            <a:schemeClr val="dk1"/>
+          </a:fontRef>
+        </p:style>
+        <p:txBody>
+          <a:bodyPr rot="0" spcFirstLastPara="0" vertOverflow="overflow" horzOverflow="overflow" vert="horz" wrap="square" lIns="91440" tIns="45720" rIns="91440" bIns="45720" numCol="1" spcCol="0" rtlCol="0" fromWordArt="0" anchor="ctr" anchorCtr="0" forceAA="0" compatLnSpc="1">
+            <a:prstTxWarp prst="textNoShape">
+              <a:avLst/>
+            </a:prstTxWarp>
+            <a:noAutofit/>
+          </a:bodyPr>
+          <a:lstStyle/>
+          <a:p>
+            <a:pPr algn="ctr"/>
+            <a:endParaRPr lang="en-US"/>
+          </a:p>
+        </p:txBody>
+      </p:sp>
+      <p:sp>
+        <p:nvSpPr>
+          <p:cNvPr id="91" name="Rectangle: Diagonal Corners Snipped 90"/>
+          <p:cNvSpPr/>
+          <p:nvPr/>
+        </p:nvSpPr>
+        <p:spPr>
+          <a:xfrm rot="10800000" flipH="1">
+            <a:off x="14050378" y="390206"/>
+            <a:ext cx="22297022" cy="2942369"/>
+          </a:xfrm>
+          <a:prstGeom prst="snip2DiagRect">
+            <a:avLst/>
+          </a:prstGeom>
+          <a:gradFill>
+            <a:gsLst>
+              <a:gs pos="100000">
+                <a:srgbClr val="ECEC14"/>
+              </a:gs>
+              <a:gs pos="76000">
+                <a:srgbClr val="808080">
+                  <a:alpha val="0"/>
+                </a:srgbClr>
+              </a:gs>
+            </a:gsLst>
+            <a:path path="circle">
+              <a:fillToRect l="100000" t="100000"/>
+            </a:path>
+          </a:gradFill>
+          <a:ln w="57150" cmpd="tri">
+            <a:gradFill flip="none" rotWithShape="1">
+              <a:gsLst>
+                <a:gs pos="0">
+                  <a:schemeClr val="tx1"/>
+                </a:gs>
+                <a:gs pos="50000">
+                  <a:schemeClr val="bg1"/>
+                </a:gs>
+                <a:gs pos="100000">
+                  <a:srgbClr val="FFFF00"/>
+                </a:gs>
+              </a:gsLst>
+              <a:path path="circle">
+                <a:fillToRect l="100000" t="100000"/>
+              </a:path>
+              <a:tileRect r="-100000" b="-100000"/>
+            </a:gradFill>
+            <a:prstDash val="solid"/>
+          </a:ln>
+        </p:spPr>
+        <p:style>
+          <a:lnRef idx="2">
+            <a:schemeClr val="accent6"/>
+          </a:lnRef>
+          <a:fillRef idx="1">
+            <a:schemeClr val="lt1"/>
+          </a:fillRef>
+          <a:effectRef idx="0">
+            <a:schemeClr val="accent6"/>
+          </a:effectRef>
+          <a:fontRef idx="minor">
+            <a:schemeClr val="dk1"/>
+          </a:fontRef>
+        </p:style>
+        <p:txBody>
+          <a:bodyPr rot="0" spcFirstLastPara="0" vertOverflow="overflow" horzOverflow="overflow" vert="horz" wrap="square" lIns="91440" tIns="45720" rIns="91440" bIns="45720" numCol="1" spcCol="0" rtlCol="0" fromWordArt="0" anchor="ctr" anchorCtr="0" forceAA="0" compatLnSpc="1">
+            <a:prstTxWarp prst="textNoShape">
+              <a:avLst/>
+            </a:prstTxWarp>
+            <a:noAutofit/>
+          </a:bodyPr>
+          <a:lstStyle/>
+          <a:p>
+            <a:pPr algn="ctr"/>
+            <a:endParaRPr lang="en-US" sz="4000" dirty="0">
+              <a:latin typeface="Courier New" panose="02070309020205020404" pitchFamily="49" charset="0"/>
+              <a:cs typeface="Courier New" panose="02070309020205020404" pitchFamily="49" charset="0"/>
+            </a:endParaRPr>
+          </a:p>
+        </p:txBody>
+      </p:sp>
+      <p:sp>
+        <p:nvSpPr>
+          <p:cNvPr id="92" name="Rectangle: Diagonal Corners Snipped 91"/>
+          <p:cNvSpPr/>
+          <p:nvPr/>
+        </p:nvSpPr>
+        <p:spPr>
+          <a:xfrm rot="10800000" flipH="1">
+            <a:off x="22920924" y="7003827"/>
+            <a:ext cx="20244056" cy="2942369"/>
+          </a:xfrm>
+          <a:prstGeom prst="snip2DiagRect">
+            <a:avLst/>
+          </a:prstGeom>
+          <a:gradFill>
+            <a:gsLst>
+              <a:gs pos="100000">
+                <a:srgbClr val="ECEC14"/>
+              </a:gs>
+              <a:gs pos="76000">
+                <a:srgbClr val="808080">
+                  <a:alpha val="0"/>
+                </a:srgbClr>
+              </a:gs>
+            </a:gsLst>
+            <a:path path="circle">
+              <a:fillToRect l="100000" t="100000"/>
+            </a:path>
+          </a:gradFill>
+          <a:ln w="57150" cmpd="tri">
+            <a:gradFill flip="none" rotWithShape="1">
+              <a:gsLst>
+                <a:gs pos="0">
+                  <a:schemeClr val="tx1"/>
+                </a:gs>
+                <a:gs pos="50000">
+                  <a:schemeClr val="bg1"/>
+                </a:gs>
+                <a:gs pos="100000">
+                  <a:srgbClr val="FFFF00"/>
+                </a:gs>
+              </a:gsLst>
+              <a:path path="circle">
+                <a:fillToRect l="100000" t="100000"/>
+              </a:path>
+              <a:tileRect r="-100000" b="-100000"/>
+            </a:gradFill>
+            <a:prstDash val="solid"/>
+          </a:ln>
+        </p:spPr>
+        <p:style>
+          <a:lnRef idx="2">
+            <a:schemeClr val="accent6"/>
+          </a:lnRef>
+          <a:fillRef idx="1">
+            <a:schemeClr val="lt1"/>
+          </a:fillRef>
+          <a:effectRef idx="0">
+            <a:schemeClr val="accent6"/>
+          </a:effectRef>
+          <a:fontRef idx="minor">
+            <a:schemeClr val="dk1"/>
+          </a:fontRef>
+        </p:style>
+        <p:txBody>
+          <a:bodyPr rot="0" spcFirstLastPara="0" vertOverflow="overflow" horzOverflow="overflow" vert="horz" wrap="square" lIns="91440" tIns="45720" rIns="91440" bIns="45720" numCol="1" spcCol="0" rtlCol="0" fromWordArt="0" anchor="ctr" anchorCtr="0" forceAA="0" compatLnSpc="1">
+            <a:prstTxWarp prst="textNoShape">
+              <a:avLst/>
+            </a:prstTxWarp>
+            <a:noAutofit/>
+          </a:bodyPr>
+          <a:lstStyle/>
+          <a:p>
+            <a:pPr algn="ctr"/>
+            <a:endParaRPr lang="en-US"/>
+          </a:p>
+        </p:txBody>
+      </p:sp>
+      <p:sp>
+        <p:nvSpPr>
+          <p:cNvPr id="94" name="TextBox 93"/>
+          <p:cNvSpPr txBox="1"/>
+          <p:nvPr/>
+        </p:nvSpPr>
+        <p:spPr>
+          <a:xfrm>
+            <a:off x="14588527" y="533400"/>
+            <a:ext cx="21377873" cy="461665"/>
+          </a:xfrm>
+          <a:prstGeom prst="rect">
+            <a:avLst/>
+          </a:prstGeom>
+          <a:noFill/>
+        </p:spPr>
+        <p:txBody>
+          <a:bodyPr wrap="square" rtlCol="0">
+            <a:spAutoFit/>
+          </a:bodyPr>
+          <a:lstStyle/>
+          <a:p>
+            <a:r>
+              <a:rPr lang="en-US" sz="2400" dirty="0">
+                <a:latin typeface="Courier New" panose="02070309020205020404" pitchFamily="49" charset="0"/>
+                <a:cs typeface="Courier New" panose="02070309020205020404" pitchFamily="49" charset="0"/>
+              </a:rPr>
+              <a:t>Placeholder Text</a:t>
+            </a:r>
+          </a:p>
+        </p:txBody>
+      </p:sp>
+      <p:sp>
+        <p:nvSpPr>
+          <p:cNvPr id="96" name="TextBox 95"/>
+          <p:cNvSpPr txBox="1"/>
+          <p:nvPr/>
+        </p:nvSpPr>
+        <p:spPr>
+          <a:xfrm rot="16200000">
+            <a:off x="23645801" y="10983869"/>
+            <a:ext cx="1983880" cy="584775"/>
+          </a:xfrm>
+          <a:prstGeom prst="rect">
+            <a:avLst/>
+          </a:prstGeom>
+          <a:noFill/>
+        </p:spPr>
+        <p:txBody>
+          <a:bodyPr wrap="square" rtlCol="0">
+            <a:spAutoFit/>
+          </a:bodyPr>
+          <a:lstStyle/>
+          <a:p>
+            <a:r>
+              <a:rPr lang="en-US" sz="3200" dirty="0">
+                <a:latin typeface="Arial Black" panose="020B0A04020102020204" pitchFamily="34" charset="0"/>
+                <a:cs typeface="Courier New" panose="02070309020205020404" pitchFamily="49" charset="0"/>
+              </a:rPr>
+              <a:t>LOCK4</a:t>
+            </a:r>
+          </a:p>
+        </p:txBody>
+      </p:sp>
+      <p:sp>
+        <p:nvSpPr>
+          <p:cNvPr id="99" name="TextBox 98"/>
+          <p:cNvSpPr txBox="1"/>
+          <p:nvPr/>
+        </p:nvSpPr>
+        <p:spPr>
+          <a:xfrm rot="5400000">
+            <a:off x="24564166" y="19428059"/>
+            <a:ext cx="1798092" cy="584775"/>
+          </a:xfrm>
+          <a:prstGeom prst="rect">
+            <a:avLst/>
+          </a:prstGeom>
+          <a:noFill/>
+        </p:spPr>
+        <p:txBody>
+          <a:bodyPr wrap="square" rtlCol="0">
+            <a:spAutoFit/>
+          </a:bodyPr>
+          <a:lstStyle/>
+          <a:p>
+            <a:r>
+              <a:rPr lang="en-US" sz="3200" dirty="0">
+                <a:latin typeface="Arial Black" panose="020B0A04020102020204" pitchFamily="34" charset="0"/>
+                <a:cs typeface="Courier New" panose="02070309020205020404" pitchFamily="49" charset="0"/>
+              </a:rPr>
+              <a:t>LOCK4</a:t>
+            </a:r>
           </a:p>
         </p:txBody>
       </p:sp>

</xml_diff>

<commit_message>
added poster descriptions for static lock bytes and CC bytes
</commit_message>
<xml_diff>
--- a/Poster Artifacts/Poster.pptx
+++ b/Poster Artifacts/Poster.pptx
@@ -3780,8 +3780,8 @@
         </p:nvSpPr>
         <p:spPr bwMode="auto">
           <a:xfrm>
-            <a:off x="7526256" y="30140961"/>
-            <a:ext cx="25593043" cy="2466059"/>
+            <a:off x="14050378" y="29337000"/>
+            <a:ext cx="19324598" cy="3251304"/>
           </a:xfrm>
           <a:prstGeom prst="rect">
             <a:avLst/>
@@ -4055,8 +4055,8 @@
         </p:nvSpPr>
         <p:spPr bwMode="auto">
           <a:xfrm>
-            <a:off x="10996981" y="29641001"/>
-            <a:ext cx="22122318" cy="610399"/>
+            <a:off x="14097002" y="28956000"/>
+            <a:ext cx="19277973" cy="440536"/>
           </a:xfrm>
           <a:prstGeom prst="rect">
             <a:avLst/>
@@ -4199,7 +4199,7 @@
           <a:p>
             <a:pPr algn="ctr"/>
             <a:r>
-              <a:rPr lang="en-US" sz="4800" dirty="0">
+              <a:rPr lang="en-US" sz="3600" dirty="0">
                 <a:ln w="0"/>
                 <a:effectLst>
                   <a:outerShdw blurRad="38100" dist="19050" dir="2700000" algn="tl" rotWithShape="0">
@@ -4337,7 +4337,7 @@
         </p:blipFill>
         <p:spPr bwMode="auto">
           <a:xfrm>
-            <a:off x="33374976" y="29567961"/>
+            <a:off x="33374976" y="30251400"/>
             <a:ext cx="6342799" cy="2675570"/>
           </a:xfrm>
           <a:prstGeom prst="rect">
@@ -5094,7 +5094,7 @@
         </p:blipFill>
         <p:spPr>
           <a:xfrm>
-            <a:off x="39885840" y="29287881"/>
+            <a:off x="39776400" y="29287881"/>
             <a:ext cx="3879524" cy="3418591"/>
           </a:xfrm>
           <a:prstGeom prst="rect">
@@ -5170,8 +5170,8 @@
         </p:nvSpPr>
         <p:spPr>
           <a:xfrm rot="16200000">
-            <a:off x="10309879" y="8180058"/>
-            <a:ext cx="9551679" cy="491523"/>
+            <a:off x="10329673" y="8199850"/>
+            <a:ext cx="9512092" cy="491523"/>
           </a:xfrm>
           <a:prstGeom prst="homePlate">
             <a:avLst/>
@@ -5211,8 +5211,8 @@
         </p:nvSpPr>
         <p:spPr>
           <a:xfrm rot="16200000">
-            <a:off x="9566926" y="8187678"/>
-            <a:ext cx="9551679" cy="491523"/>
+            <a:off x="9582910" y="8203660"/>
+            <a:ext cx="9519713" cy="491523"/>
           </a:xfrm>
           <a:prstGeom prst="homePlate">
             <a:avLst/>
@@ -5375,8 +5375,8 @@
         </p:nvSpPr>
         <p:spPr>
           <a:xfrm rot="16200000">
-            <a:off x="14302966" y="10126159"/>
-            <a:ext cx="3074481" cy="584775"/>
+            <a:off x="15120112" y="7590508"/>
+            <a:ext cx="1440189" cy="584775"/>
           </a:xfrm>
           <a:prstGeom prst="rect">
             <a:avLst/>
@@ -5407,8 +5407,8 @@
         </p:nvSpPr>
         <p:spPr>
           <a:xfrm rot="16200000">
-            <a:off x="15060216" y="10126159"/>
-            <a:ext cx="3074477" cy="584775"/>
+            <a:off x="15877361" y="7590507"/>
+            <a:ext cx="1440187" cy="584775"/>
           </a:xfrm>
           <a:prstGeom prst="rect">
             <a:avLst/>
@@ -5521,8 +5521,8 @@
         </p:nvSpPr>
         <p:spPr>
           <a:xfrm rot="16200000">
-            <a:off x="15777330" y="10126162"/>
-            <a:ext cx="3074472" cy="584775"/>
+            <a:off x="16594474" y="7590509"/>
+            <a:ext cx="1440185" cy="584775"/>
           </a:xfrm>
           <a:prstGeom prst="rect">
             <a:avLst/>
@@ -5553,8 +5553,8 @@
         </p:nvSpPr>
         <p:spPr>
           <a:xfrm rot="16200000">
-            <a:off x="16534579" y="10126163"/>
-            <a:ext cx="3074467" cy="584775"/>
+            <a:off x="17351722" y="7590508"/>
+            <a:ext cx="1440182" cy="584775"/>
           </a:xfrm>
           <a:prstGeom prst="rect">
             <a:avLst/>
@@ -6074,8 +6074,8 @@
         </p:nvSpPr>
         <p:spPr>
           <a:xfrm rot="16200000">
-            <a:off x="11073491" y="8706534"/>
-            <a:ext cx="6538551" cy="584775"/>
+            <a:off x="13466468" y="4546312"/>
+            <a:ext cx="1752597" cy="584775"/>
           </a:xfrm>
           <a:prstGeom prst="rect">
             <a:avLst/>
@@ -6106,8 +6106,8 @@
         </p:nvSpPr>
         <p:spPr>
           <a:xfrm rot="16200000">
-            <a:off x="11830739" y="8706534"/>
-            <a:ext cx="6538551" cy="584775"/>
+            <a:off x="14223716" y="4546312"/>
+            <a:ext cx="1752597" cy="584775"/>
           </a:xfrm>
           <a:prstGeom prst="rect">
             <a:avLst/>
@@ -7227,35 +7227,30 @@
         </p:nvSpPr>
         <p:spPr>
           <a:xfrm>
-            <a:off x="6941430" y="21242471"/>
-            <a:ext cx="36223550" cy="7247287"/>
+            <a:off x="14097003" y="21234853"/>
+            <a:ext cx="19277973" cy="7323484"/>
           </a:xfrm>
           <a:prstGeom prst="roundRect">
             <a:avLst/>
           </a:prstGeom>
-          <a:gradFill flip="none" rotWithShape="1">
-            <a:gsLst>
-              <a:gs pos="0">
-                <a:srgbClr val="FF0000"/>
-              </a:gs>
-              <a:gs pos="47000">
-                <a:srgbClr val="FFFF00"/>
-              </a:gs>
-              <a:gs pos="16000">
-                <a:srgbClr val="FFC000"/>
-              </a:gs>
-              <a:gs pos="100000">
-                <a:schemeClr val="accent1">
-                  <a:lumMod val="30000"/>
-                  <a:lumOff val="70000"/>
-                </a:schemeClr>
-              </a:gs>
-            </a:gsLst>
-            <a:lin ang="5400000" scaled="1"/>
-            <a:tileRect/>
-          </a:gradFill>
+          <a:solidFill>
+            <a:schemeClr val="tx1">
+              <a:alpha val="15000"/>
+            </a:schemeClr>
+          </a:solidFill>
           <a:ln w="203200" cmpd="tri">
-            <a:noFill/>
+            <a:gradFill flip="none" rotWithShape="1">
+              <a:gsLst>
+                <a:gs pos="100000">
+                  <a:schemeClr val="tx1"/>
+                </a:gs>
+                <a:gs pos="0">
+                  <a:schemeClr val="bg1"/>
+                </a:gs>
+              </a:gsLst>
+              <a:lin ang="5400000" scaled="1"/>
+              <a:tileRect/>
+            </a:gradFill>
             <a:prstDash val="solid"/>
           </a:ln>
           <a:effectLst>
@@ -7317,8 +7312,8 @@
         </p:nvSpPr>
         <p:spPr>
           <a:xfrm rot="10800000" flipH="1">
-            <a:off x="15536283" y="3697190"/>
-            <a:ext cx="20811118" cy="2942369"/>
+            <a:off x="15536283" y="3697187"/>
+            <a:ext cx="20506317" cy="2942369"/>
           </a:xfrm>
           <a:prstGeom prst="snip2DiagRect">
             <a:avLst/>
@@ -7328,9 +7323,9 @@
               <a:gs pos="100000">
                 <a:srgbClr val="FF0000"/>
               </a:gs>
-              <a:gs pos="76000">
+              <a:gs pos="90000">
                 <a:srgbClr val="808080">
-                  <a:alpha val="0"/>
+                  <a:alpha val="15000"/>
                 </a:srgbClr>
               </a:gs>
             </a:gsLst>
@@ -7395,8 +7390,8 @@
         </p:nvSpPr>
         <p:spPr>
           <a:xfrm rot="10800000" flipH="1">
-            <a:off x="14050378" y="390206"/>
-            <a:ext cx="22297022" cy="2942369"/>
+            <a:off x="14050378" y="390202"/>
+            <a:ext cx="21992222" cy="2942369"/>
           </a:xfrm>
           <a:prstGeom prst="snip2DiagRect">
             <a:avLst/>
@@ -7406,9 +7401,9 @@
               <a:gs pos="100000">
                 <a:srgbClr val="ECEC14"/>
               </a:gs>
-              <a:gs pos="76000">
+              <a:gs pos="85000">
                 <a:srgbClr val="808080">
-                  <a:alpha val="0"/>
+                  <a:alpha val="15000"/>
                 </a:srgbClr>
               </a:gs>
             </a:gsLst>
@@ -7476,8 +7471,8 @@
         </p:nvSpPr>
         <p:spPr>
           <a:xfrm rot="10800000" flipH="1">
-            <a:off x="22920924" y="7003827"/>
-            <a:ext cx="20244056" cy="2942369"/>
+            <a:off x="22920924" y="7003823"/>
+            <a:ext cx="13121676" cy="2942369"/>
           </a:xfrm>
           <a:prstGeom prst="snip2DiagRect">
             <a:avLst/>
@@ -7487,9 +7482,9 @@
               <a:gs pos="100000">
                 <a:srgbClr val="ECEC14"/>
               </a:gs>
-              <a:gs pos="76000">
+              <a:gs pos="84000">
                 <a:srgbClr val="808080">
-                  <a:alpha val="0"/>
+                  <a:alpha val="15000"/>
                 </a:srgbClr>
               </a:gs>
             </a:gsLst>
@@ -7554,8 +7549,8 @@
         </p:nvSpPr>
         <p:spPr>
           <a:xfrm>
-            <a:off x="14588527" y="533400"/>
-            <a:ext cx="21377873" cy="461665"/>
+            <a:off x="14325600" y="533400"/>
+            <a:ext cx="21488399" cy="1569660"/>
           </a:xfrm>
           <a:prstGeom prst="rect">
             <a:avLst/>
@@ -7569,11 +7564,70 @@
           <a:lstStyle/>
           <a:p>
             <a:r>
+              <a:rPr lang="en-US" sz="2400" b="1" dirty="0">
+                <a:latin typeface="Courier New" panose="02070309020205020404" pitchFamily="49" charset="0"/>
+                <a:cs typeface="Courier New" panose="02070309020205020404" pitchFamily="49" charset="0"/>
+              </a:rPr>
+              <a:t>STATIC LOCK BYTES:</a:t>
+            </a:r>
+            <a:r>
               <a:rPr lang="en-US" sz="2400" dirty="0">
                 <a:latin typeface="Courier New" panose="02070309020205020404" pitchFamily="49" charset="0"/>
                 <a:cs typeface="Courier New" panose="02070309020205020404" pitchFamily="49" charset="0"/>
               </a:rPr>
-              <a:t>Placeholder Text</a:t>
+              <a:t> </a:t>
+            </a:r>
+            <a:r>
+              <a:rPr lang="en-US" sz="2400" dirty="0">
+                <a:latin typeface="Courier New" panose="02070309020205020404" pitchFamily="49" charset="0"/>
+                <a:cs typeface="Courier New" panose="02070309020205020404" pitchFamily="49" charset="0"/>
+              </a:rPr>
+              <a:t>Field Programmable Read-Only Locking Mechanism</a:t>
+            </a:r>
+          </a:p>
+          <a:p>
+            <a:r>
+              <a:rPr lang="en-US" sz="2400" b="1" dirty="0">
+                <a:latin typeface="Courier New" panose="02070309020205020404" pitchFamily="49" charset="0"/>
+                <a:cs typeface="Courier New" panose="02070309020205020404" pitchFamily="49" charset="0"/>
+              </a:rPr>
+              <a:t>MEMORY LOCATION:   </a:t>
+            </a:r>
+            <a:r>
+              <a:rPr lang="en-US" sz="2400" dirty="0">
+                <a:latin typeface="Courier New" panose="02070309020205020404" pitchFamily="49" charset="0"/>
+                <a:cs typeface="Courier New" panose="02070309020205020404" pitchFamily="49" charset="0"/>
+              </a:rPr>
+              <a:t>PAGE 02h (Hex)</a:t>
+            </a:r>
+          </a:p>
+          <a:p>
+            <a:r>
+              <a:rPr lang="en-US" sz="2400" b="1" dirty="0">
+                <a:latin typeface="Courier New" panose="02070309020205020404" pitchFamily="49" charset="0"/>
+                <a:cs typeface="Courier New" panose="02070309020205020404" pitchFamily="49" charset="0"/>
+              </a:rPr>
+              <a:t>DETAILS:</a:t>
+            </a:r>
+            <a:r>
+              <a:rPr lang="en-US" sz="2400" dirty="0">
+                <a:latin typeface="Courier New" panose="02070309020205020404" pitchFamily="49" charset="0"/>
+                <a:cs typeface="Courier New" panose="02070309020205020404" pitchFamily="49" charset="0"/>
+              </a:rPr>
+              <a:t>           Each bit represents an individual 16-bit page from 03h to 0Fh. Bits set to 1</a:t>
+            </a:r>
+            <a:br>
+              <a:rPr lang="en-US" sz="2400" dirty="0">
+                <a:latin typeface="Courier New" panose="02070309020205020404" pitchFamily="49" charset="0"/>
+                <a:cs typeface="Courier New" panose="02070309020205020404" pitchFamily="49" charset="0"/>
+              </a:rPr>
+            </a:br>
+            <a:r>
+              <a:rPr lang="en-US" sz="2400" dirty="0">
+                <a:latin typeface="Courier New" panose="02070309020205020404" pitchFamily="49" charset="0"/>
+                <a:cs typeface="Courier New" panose="02070309020205020404" pitchFamily="49" charset="0"/>
+              </a:rPr>
+              <a:t>                   permanently lock their corresponding pages as read-only.</a:t>
             </a:r>
           </a:p>
         </p:txBody>
@@ -7642,6 +7696,2047 @@
           </a:p>
         </p:txBody>
       </p:sp>
+      <p:graphicFrame>
+        <p:nvGraphicFramePr>
+          <p:cNvPr id="6" name="Table 5"/>
+          <p:cNvGraphicFramePr>
+            <a:graphicFrameLocks noGrp="1"/>
+          </p:cNvGraphicFramePr>
+          <p:nvPr>
+            <p:extLst>
+              <p:ext uri="{D42A27DB-BD31-4B8C-83A1-F6EECF244321}">
+                <p14:modId xmlns:p14="http://schemas.microsoft.com/office/powerpoint/2010/main" val="2729954717"/>
+              </p:ext>
+            </p:extLst>
+          </p:nvPr>
+        </p:nvGraphicFramePr>
+        <p:xfrm>
+          <a:off x="14325600" y="2133600"/>
+          <a:ext cx="10338912" cy="1059080"/>
+        </p:xfrm>
+        <a:graphic>
+          <a:graphicData uri="http://schemas.openxmlformats.org/drawingml/2006/table">
+            <a:tbl>
+              <a:tblPr>
+                <a:effectLst/>
+                <a:tableStyleId>{5C22544A-7EE6-4342-B048-85BDC9FD1C3A}</a:tableStyleId>
+              </a:tblPr>
+              <a:tblGrid>
+                <a:gridCol w="1292364">
+                  <a:extLst>
+                    <a:ext uri="{9D8B030D-6E8A-4147-A177-3AD203B41FA5}">
+                      <a16:colId xmlns:a16="http://schemas.microsoft.com/office/drawing/2014/main" val="3022783514"/>
+                    </a:ext>
+                  </a:extLst>
+                </a:gridCol>
+                <a:gridCol w="1292364">
+                  <a:extLst>
+                    <a:ext uri="{9D8B030D-6E8A-4147-A177-3AD203B41FA5}">
+                      <a16:colId xmlns:a16="http://schemas.microsoft.com/office/drawing/2014/main" val="757080785"/>
+                    </a:ext>
+                  </a:extLst>
+                </a:gridCol>
+                <a:gridCol w="1292364">
+                  <a:extLst>
+                    <a:ext uri="{9D8B030D-6E8A-4147-A177-3AD203B41FA5}">
+                      <a16:colId xmlns:a16="http://schemas.microsoft.com/office/drawing/2014/main" val="2276908230"/>
+                    </a:ext>
+                  </a:extLst>
+                </a:gridCol>
+                <a:gridCol w="1292364">
+                  <a:extLst>
+                    <a:ext uri="{9D8B030D-6E8A-4147-A177-3AD203B41FA5}">
+                      <a16:colId xmlns:a16="http://schemas.microsoft.com/office/drawing/2014/main" val="645744466"/>
+                    </a:ext>
+                  </a:extLst>
+                </a:gridCol>
+                <a:gridCol w="1292364">
+                  <a:extLst>
+                    <a:ext uri="{9D8B030D-6E8A-4147-A177-3AD203B41FA5}">
+                      <a16:colId xmlns:a16="http://schemas.microsoft.com/office/drawing/2014/main" val="3599940090"/>
+                    </a:ext>
+                  </a:extLst>
+                </a:gridCol>
+                <a:gridCol w="1292364">
+                  <a:extLst>
+                    <a:ext uri="{9D8B030D-6E8A-4147-A177-3AD203B41FA5}">
+                      <a16:colId xmlns:a16="http://schemas.microsoft.com/office/drawing/2014/main" val="2077798771"/>
+                    </a:ext>
+                  </a:extLst>
+                </a:gridCol>
+                <a:gridCol w="1292364">
+                  <a:extLst>
+                    <a:ext uri="{9D8B030D-6E8A-4147-A177-3AD203B41FA5}">
+                      <a16:colId xmlns:a16="http://schemas.microsoft.com/office/drawing/2014/main" val="1876429225"/>
+                    </a:ext>
+                  </a:extLst>
+                </a:gridCol>
+                <a:gridCol w="1292364">
+                  <a:extLst>
+                    <a:ext uri="{9D8B030D-6E8A-4147-A177-3AD203B41FA5}">
+                      <a16:colId xmlns:a16="http://schemas.microsoft.com/office/drawing/2014/main" val="73856520"/>
+                    </a:ext>
+                  </a:extLst>
+                </a:gridCol>
+              </a:tblGrid>
+              <a:tr h="1059080">
+                <a:tc>
+                  <a:txBody>
+                    <a:bodyPr/>
+                    <a:lstStyle/>
+                    <a:p>
+                      <a:pPr algn="ctr"/>
+                      <a:r>
+                        <a:rPr lang="en-US" sz="2800" dirty="0">
+                          <a:latin typeface="Courier New" panose="02070309020205020404" pitchFamily="49" charset="0"/>
+                          <a:cs typeface="Courier New" panose="02070309020205020404" pitchFamily="49" charset="0"/>
+                        </a:rPr>
+                        <a:t>L7</a:t>
+                      </a:r>
+                    </a:p>
+                  </a:txBody>
+                  <a:tcPr vert="wordArtVert" anchor="ctr">
+                    <a:lnL w="12700" cap="flat" cmpd="sng" algn="ctr">
+                      <a:solidFill>
+                        <a:schemeClr val="tx1"/>
+                      </a:solidFill>
+                      <a:prstDash val="solid"/>
+                      <a:round/>
+                      <a:headEnd type="none" w="med" len="med"/>
+                      <a:tailEnd type="none" w="med" len="med"/>
+                    </a:lnL>
+                    <a:lnR w="12700" cap="flat" cmpd="sng" algn="ctr">
+                      <a:solidFill>
+                        <a:schemeClr val="tx1"/>
+                      </a:solidFill>
+                      <a:prstDash val="solid"/>
+                      <a:round/>
+                      <a:headEnd type="none" w="med" len="med"/>
+                      <a:tailEnd type="none" w="med" len="med"/>
+                    </a:lnR>
+                    <a:lnT w="12700" cap="flat" cmpd="sng" algn="ctr">
+                      <a:solidFill>
+                        <a:schemeClr val="tx1"/>
+                      </a:solidFill>
+                      <a:prstDash val="solid"/>
+                      <a:round/>
+                      <a:headEnd type="none" w="med" len="med"/>
+                      <a:tailEnd type="none" w="med" len="med"/>
+                    </a:lnT>
+                    <a:lnB w="12700" cap="flat" cmpd="sng" algn="ctr">
+                      <a:solidFill>
+                        <a:schemeClr val="tx1"/>
+                      </a:solidFill>
+                      <a:prstDash val="solid"/>
+                      <a:round/>
+                      <a:headEnd type="none" w="med" len="med"/>
+                      <a:tailEnd type="none" w="med" len="med"/>
+                    </a:lnB>
+                    <a:lnTlToBr w="12700" cmpd="sng">
+                      <a:noFill/>
+                      <a:prstDash val="solid"/>
+                    </a:lnTlToBr>
+                    <a:lnBlToTr w="12700" cmpd="sng">
+                      <a:noFill/>
+                      <a:prstDash val="solid"/>
+                    </a:lnBlToTr>
+                    <a:solidFill>
+                      <a:schemeClr val="bg1"/>
+                    </a:solidFill>
+                  </a:tcPr>
+                </a:tc>
+                <a:tc>
+                  <a:txBody>
+                    <a:bodyPr/>
+                    <a:lstStyle/>
+                    <a:p>
+                      <a:pPr algn="ctr"/>
+                      <a:r>
+                        <a:rPr lang="en-US" sz="2800" dirty="0">
+                          <a:latin typeface="Courier New" panose="02070309020205020404" pitchFamily="49" charset="0"/>
+                          <a:cs typeface="Courier New" panose="02070309020205020404" pitchFamily="49" charset="0"/>
+                        </a:rPr>
+                        <a:t>L6</a:t>
+                      </a:r>
+                    </a:p>
+                  </a:txBody>
+                  <a:tcPr vert="wordArtVert" anchor="ctr">
+                    <a:lnL w="12700" cap="flat" cmpd="sng" algn="ctr">
+                      <a:solidFill>
+                        <a:schemeClr val="tx1"/>
+                      </a:solidFill>
+                      <a:prstDash val="solid"/>
+                      <a:round/>
+                      <a:headEnd type="none" w="med" len="med"/>
+                      <a:tailEnd type="none" w="med" len="med"/>
+                    </a:lnL>
+                    <a:lnR w="12700" cap="flat" cmpd="sng" algn="ctr">
+                      <a:solidFill>
+                        <a:schemeClr val="tx1"/>
+                      </a:solidFill>
+                      <a:prstDash val="solid"/>
+                      <a:round/>
+                      <a:headEnd type="none" w="med" len="med"/>
+                      <a:tailEnd type="none" w="med" len="med"/>
+                    </a:lnR>
+                    <a:lnT w="12700" cap="flat" cmpd="sng" algn="ctr">
+                      <a:solidFill>
+                        <a:schemeClr val="tx1"/>
+                      </a:solidFill>
+                      <a:prstDash val="solid"/>
+                      <a:round/>
+                      <a:headEnd type="none" w="med" len="med"/>
+                      <a:tailEnd type="none" w="med" len="med"/>
+                    </a:lnT>
+                    <a:lnB w="12700" cap="flat" cmpd="sng" algn="ctr">
+                      <a:solidFill>
+                        <a:schemeClr val="tx1"/>
+                      </a:solidFill>
+                      <a:prstDash val="solid"/>
+                      <a:round/>
+                      <a:headEnd type="none" w="med" len="med"/>
+                      <a:tailEnd type="none" w="med" len="med"/>
+                    </a:lnB>
+                    <a:lnTlToBr w="12700" cmpd="sng">
+                      <a:noFill/>
+                      <a:prstDash val="solid"/>
+                    </a:lnTlToBr>
+                    <a:lnBlToTr w="12700" cmpd="sng">
+                      <a:noFill/>
+                      <a:prstDash val="solid"/>
+                    </a:lnBlToTr>
+                    <a:solidFill>
+                      <a:schemeClr val="bg1"/>
+                    </a:solidFill>
+                  </a:tcPr>
+                </a:tc>
+                <a:tc>
+                  <a:txBody>
+                    <a:bodyPr/>
+                    <a:lstStyle/>
+                    <a:p>
+                      <a:pPr algn="ctr"/>
+                      <a:r>
+                        <a:rPr lang="en-US" sz="2800" dirty="0">
+                          <a:latin typeface="Courier New" panose="02070309020205020404" pitchFamily="49" charset="0"/>
+                          <a:cs typeface="Courier New" panose="02070309020205020404" pitchFamily="49" charset="0"/>
+                        </a:rPr>
+                        <a:t>L5</a:t>
+                      </a:r>
+                    </a:p>
+                  </a:txBody>
+                  <a:tcPr vert="wordArtVert" anchor="ctr">
+                    <a:lnL w="12700" cap="flat" cmpd="sng" algn="ctr">
+                      <a:solidFill>
+                        <a:schemeClr val="tx1"/>
+                      </a:solidFill>
+                      <a:prstDash val="solid"/>
+                      <a:round/>
+                      <a:headEnd type="none" w="med" len="med"/>
+                      <a:tailEnd type="none" w="med" len="med"/>
+                    </a:lnL>
+                    <a:lnR w="12700" cap="flat" cmpd="sng" algn="ctr">
+                      <a:solidFill>
+                        <a:schemeClr val="tx1"/>
+                      </a:solidFill>
+                      <a:prstDash val="solid"/>
+                      <a:round/>
+                      <a:headEnd type="none" w="med" len="med"/>
+                      <a:tailEnd type="none" w="med" len="med"/>
+                    </a:lnR>
+                    <a:lnT w="12700" cap="flat" cmpd="sng" algn="ctr">
+                      <a:solidFill>
+                        <a:schemeClr val="tx1"/>
+                      </a:solidFill>
+                      <a:prstDash val="solid"/>
+                      <a:round/>
+                      <a:headEnd type="none" w="med" len="med"/>
+                      <a:tailEnd type="none" w="med" len="med"/>
+                    </a:lnT>
+                    <a:lnB w="12700" cap="flat" cmpd="sng" algn="ctr">
+                      <a:solidFill>
+                        <a:schemeClr val="tx1"/>
+                      </a:solidFill>
+                      <a:prstDash val="solid"/>
+                      <a:round/>
+                      <a:headEnd type="none" w="med" len="med"/>
+                      <a:tailEnd type="none" w="med" len="med"/>
+                    </a:lnB>
+                    <a:lnTlToBr w="12700" cmpd="sng">
+                      <a:noFill/>
+                      <a:prstDash val="solid"/>
+                    </a:lnTlToBr>
+                    <a:lnBlToTr w="12700" cmpd="sng">
+                      <a:noFill/>
+                      <a:prstDash val="solid"/>
+                    </a:lnBlToTr>
+                    <a:solidFill>
+                      <a:schemeClr val="bg1"/>
+                    </a:solidFill>
+                  </a:tcPr>
+                </a:tc>
+                <a:tc>
+                  <a:txBody>
+                    <a:bodyPr/>
+                    <a:lstStyle/>
+                    <a:p>
+                      <a:pPr algn="ctr"/>
+                      <a:r>
+                        <a:rPr lang="en-US" sz="2800" dirty="0">
+                          <a:latin typeface="Courier New" panose="02070309020205020404" pitchFamily="49" charset="0"/>
+                          <a:cs typeface="Courier New" panose="02070309020205020404" pitchFamily="49" charset="0"/>
+                        </a:rPr>
+                        <a:t>L4</a:t>
+                      </a:r>
+                    </a:p>
+                  </a:txBody>
+                  <a:tcPr vert="wordArtVert" anchor="ctr">
+                    <a:lnL w="12700" cap="flat" cmpd="sng" algn="ctr">
+                      <a:solidFill>
+                        <a:schemeClr val="tx1"/>
+                      </a:solidFill>
+                      <a:prstDash val="solid"/>
+                      <a:round/>
+                      <a:headEnd type="none" w="med" len="med"/>
+                      <a:tailEnd type="none" w="med" len="med"/>
+                    </a:lnL>
+                    <a:lnR w="12700" cap="flat" cmpd="sng" algn="ctr">
+                      <a:solidFill>
+                        <a:schemeClr val="tx1"/>
+                      </a:solidFill>
+                      <a:prstDash val="solid"/>
+                      <a:round/>
+                      <a:headEnd type="none" w="med" len="med"/>
+                      <a:tailEnd type="none" w="med" len="med"/>
+                    </a:lnR>
+                    <a:lnT w="12700" cap="flat" cmpd="sng" algn="ctr">
+                      <a:solidFill>
+                        <a:schemeClr val="tx1"/>
+                      </a:solidFill>
+                      <a:prstDash val="solid"/>
+                      <a:round/>
+                      <a:headEnd type="none" w="med" len="med"/>
+                      <a:tailEnd type="none" w="med" len="med"/>
+                    </a:lnT>
+                    <a:lnB w="12700" cap="flat" cmpd="sng" algn="ctr">
+                      <a:solidFill>
+                        <a:schemeClr val="tx1"/>
+                      </a:solidFill>
+                      <a:prstDash val="solid"/>
+                      <a:round/>
+                      <a:headEnd type="none" w="med" len="med"/>
+                      <a:tailEnd type="none" w="med" len="med"/>
+                    </a:lnB>
+                    <a:lnTlToBr w="12700" cmpd="sng">
+                      <a:noFill/>
+                      <a:prstDash val="solid"/>
+                    </a:lnTlToBr>
+                    <a:lnBlToTr w="12700" cmpd="sng">
+                      <a:noFill/>
+                      <a:prstDash val="solid"/>
+                    </a:lnBlToTr>
+                    <a:solidFill>
+                      <a:schemeClr val="bg1"/>
+                    </a:solidFill>
+                  </a:tcPr>
+                </a:tc>
+                <a:tc>
+                  <a:txBody>
+                    <a:bodyPr/>
+                    <a:lstStyle/>
+                    <a:p>
+                      <a:pPr algn="ctr"/>
+                      <a:r>
+                        <a:rPr lang="en-US" sz="2800" dirty="0">
+                          <a:latin typeface="Courier New" panose="02070309020205020404" pitchFamily="49" charset="0"/>
+                          <a:cs typeface="Courier New" panose="02070309020205020404" pitchFamily="49" charset="0"/>
+                        </a:rPr>
+                        <a:t>L</a:t>
+                      </a:r>
+                    </a:p>
+                    <a:p>
+                      <a:pPr algn="ctr"/>
+                      <a:r>
+                        <a:rPr lang="en-US" sz="2800" dirty="0">
+                          <a:latin typeface="Courier New" panose="02070309020205020404" pitchFamily="49" charset="0"/>
+                          <a:cs typeface="Courier New" panose="02070309020205020404" pitchFamily="49" charset="0"/>
+                        </a:rPr>
+                        <a:t>CC</a:t>
+                      </a:r>
+                    </a:p>
+                  </a:txBody>
+                  <a:tcPr anchor="ctr">
+                    <a:lnL w="12700" cap="flat" cmpd="sng" algn="ctr">
+                      <a:solidFill>
+                        <a:schemeClr val="tx1"/>
+                      </a:solidFill>
+                      <a:prstDash val="solid"/>
+                      <a:round/>
+                      <a:headEnd type="none" w="med" len="med"/>
+                      <a:tailEnd type="none" w="med" len="med"/>
+                    </a:lnL>
+                    <a:lnR w="12700" cap="flat" cmpd="sng" algn="ctr">
+                      <a:solidFill>
+                        <a:schemeClr val="tx1"/>
+                      </a:solidFill>
+                      <a:prstDash val="solid"/>
+                      <a:round/>
+                      <a:headEnd type="none" w="med" len="med"/>
+                      <a:tailEnd type="none" w="med" len="med"/>
+                    </a:lnR>
+                    <a:lnT w="12700" cap="flat" cmpd="sng" algn="ctr">
+                      <a:solidFill>
+                        <a:schemeClr val="tx1"/>
+                      </a:solidFill>
+                      <a:prstDash val="solid"/>
+                      <a:round/>
+                      <a:headEnd type="none" w="med" len="med"/>
+                      <a:tailEnd type="none" w="med" len="med"/>
+                    </a:lnT>
+                    <a:lnB w="12700" cap="flat" cmpd="sng" algn="ctr">
+                      <a:solidFill>
+                        <a:schemeClr val="tx1"/>
+                      </a:solidFill>
+                      <a:prstDash val="solid"/>
+                      <a:round/>
+                      <a:headEnd type="none" w="med" len="med"/>
+                      <a:tailEnd type="none" w="med" len="med"/>
+                    </a:lnB>
+                    <a:lnTlToBr w="12700" cmpd="sng">
+                      <a:noFill/>
+                      <a:prstDash val="solid"/>
+                    </a:lnTlToBr>
+                    <a:lnBlToTr w="12700" cmpd="sng">
+                      <a:noFill/>
+                      <a:prstDash val="solid"/>
+                    </a:lnBlToTr>
+                    <a:solidFill>
+                      <a:schemeClr val="bg1"/>
+                    </a:solidFill>
+                  </a:tcPr>
+                </a:tc>
+                <a:tc>
+                  <a:txBody>
+                    <a:bodyPr/>
+                    <a:lstStyle/>
+                    <a:p>
+                      <a:pPr algn="ctr"/>
+                      <a:r>
+                        <a:rPr lang="en-US" sz="2800" dirty="0">
+                          <a:latin typeface="Courier New" panose="02070309020205020404" pitchFamily="49" charset="0"/>
+                          <a:cs typeface="Courier New" panose="02070309020205020404" pitchFamily="49" charset="0"/>
+                        </a:rPr>
+                        <a:t>BL</a:t>
+                      </a:r>
+                    </a:p>
+                    <a:p>
+                      <a:pPr algn="ctr"/>
+                      <a:r>
+                        <a:rPr lang="en-US" sz="2800" dirty="0">
+                          <a:latin typeface="Courier New" panose="02070309020205020404" pitchFamily="49" charset="0"/>
+                          <a:cs typeface="Courier New" panose="02070309020205020404" pitchFamily="49" charset="0"/>
+                        </a:rPr>
+                        <a:t>15-10</a:t>
+                      </a:r>
+                    </a:p>
+                  </a:txBody>
+                  <a:tcPr anchor="ctr">
+                    <a:lnL w="12700" cap="flat" cmpd="sng" algn="ctr">
+                      <a:solidFill>
+                        <a:schemeClr val="tx1"/>
+                      </a:solidFill>
+                      <a:prstDash val="solid"/>
+                      <a:round/>
+                      <a:headEnd type="none" w="med" len="med"/>
+                      <a:tailEnd type="none" w="med" len="med"/>
+                    </a:lnL>
+                    <a:lnR w="12700" cap="flat" cmpd="sng" algn="ctr">
+                      <a:solidFill>
+                        <a:schemeClr val="tx1"/>
+                      </a:solidFill>
+                      <a:prstDash val="solid"/>
+                      <a:round/>
+                      <a:headEnd type="none" w="med" len="med"/>
+                      <a:tailEnd type="none" w="med" len="med"/>
+                    </a:lnR>
+                    <a:lnT w="12700" cap="flat" cmpd="sng" algn="ctr">
+                      <a:solidFill>
+                        <a:schemeClr val="tx1"/>
+                      </a:solidFill>
+                      <a:prstDash val="solid"/>
+                      <a:round/>
+                      <a:headEnd type="none" w="med" len="med"/>
+                      <a:tailEnd type="none" w="med" len="med"/>
+                    </a:lnT>
+                    <a:lnB w="12700" cap="flat" cmpd="sng" algn="ctr">
+                      <a:solidFill>
+                        <a:schemeClr val="tx1"/>
+                      </a:solidFill>
+                      <a:prstDash val="solid"/>
+                      <a:round/>
+                      <a:headEnd type="none" w="med" len="med"/>
+                      <a:tailEnd type="none" w="med" len="med"/>
+                    </a:lnB>
+                    <a:lnTlToBr w="12700" cmpd="sng">
+                      <a:noFill/>
+                      <a:prstDash val="solid"/>
+                    </a:lnTlToBr>
+                    <a:lnBlToTr w="12700" cmpd="sng">
+                      <a:noFill/>
+                      <a:prstDash val="solid"/>
+                    </a:lnBlToTr>
+                    <a:solidFill>
+                      <a:schemeClr val="bg1"/>
+                    </a:solidFill>
+                  </a:tcPr>
+                </a:tc>
+                <a:tc>
+                  <a:txBody>
+                    <a:bodyPr/>
+                    <a:lstStyle/>
+                    <a:p>
+                      <a:pPr algn="ctr"/>
+                      <a:r>
+                        <a:rPr lang="en-US" sz="2800" dirty="0">
+                          <a:latin typeface="Courier New" panose="02070309020205020404" pitchFamily="49" charset="0"/>
+                          <a:cs typeface="Courier New" panose="02070309020205020404" pitchFamily="49" charset="0"/>
+                        </a:rPr>
+                        <a:t>BL</a:t>
+                      </a:r>
+                    </a:p>
+                    <a:p>
+                      <a:pPr algn="ctr"/>
+                      <a:r>
+                        <a:rPr lang="en-US" sz="2800" dirty="0">
+                          <a:latin typeface="Courier New" panose="02070309020205020404" pitchFamily="49" charset="0"/>
+                          <a:cs typeface="Courier New" panose="02070309020205020404" pitchFamily="49" charset="0"/>
+                        </a:rPr>
+                        <a:t>9-4</a:t>
+                      </a:r>
+                    </a:p>
+                  </a:txBody>
+                  <a:tcPr anchor="ctr">
+                    <a:lnL w="12700" cap="flat" cmpd="sng" algn="ctr">
+                      <a:solidFill>
+                        <a:schemeClr val="tx1"/>
+                      </a:solidFill>
+                      <a:prstDash val="solid"/>
+                      <a:round/>
+                      <a:headEnd type="none" w="med" len="med"/>
+                      <a:tailEnd type="none" w="med" len="med"/>
+                    </a:lnL>
+                    <a:lnR w="12700" cap="flat" cmpd="sng" algn="ctr">
+                      <a:solidFill>
+                        <a:schemeClr val="tx1"/>
+                      </a:solidFill>
+                      <a:prstDash val="solid"/>
+                      <a:round/>
+                      <a:headEnd type="none" w="med" len="med"/>
+                      <a:tailEnd type="none" w="med" len="med"/>
+                    </a:lnR>
+                    <a:lnT w="12700" cap="flat" cmpd="sng" algn="ctr">
+                      <a:solidFill>
+                        <a:schemeClr val="tx1"/>
+                      </a:solidFill>
+                      <a:prstDash val="solid"/>
+                      <a:round/>
+                      <a:headEnd type="none" w="med" len="med"/>
+                      <a:tailEnd type="none" w="med" len="med"/>
+                    </a:lnT>
+                    <a:lnB w="12700" cap="flat" cmpd="sng" algn="ctr">
+                      <a:solidFill>
+                        <a:schemeClr val="tx1"/>
+                      </a:solidFill>
+                      <a:prstDash val="solid"/>
+                      <a:round/>
+                      <a:headEnd type="none" w="med" len="med"/>
+                      <a:tailEnd type="none" w="med" len="med"/>
+                    </a:lnB>
+                    <a:lnTlToBr w="12700" cmpd="sng">
+                      <a:noFill/>
+                      <a:prstDash val="solid"/>
+                    </a:lnTlToBr>
+                    <a:lnBlToTr w="12700" cmpd="sng">
+                      <a:noFill/>
+                      <a:prstDash val="solid"/>
+                    </a:lnBlToTr>
+                    <a:solidFill>
+                      <a:schemeClr val="bg1"/>
+                    </a:solidFill>
+                  </a:tcPr>
+                </a:tc>
+                <a:tc>
+                  <a:txBody>
+                    <a:bodyPr/>
+                    <a:lstStyle/>
+                    <a:p>
+                      <a:pPr algn="ctr"/>
+                      <a:r>
+                        <a:rPr lang="en-US" sz="2800" dirty="0">
+                          <a:latin typeface="Courier New" panose="02070309020205020404" pitchFamily="49" charset="0"/>
+                          <a:cs typeface="Courier New" panose="02070309020205020404" pitchFamily="49" charset="0"/>
+                        </a:rPr>
+                        <a:t>BL</a:t>
+                      </a:r>
+                    </a:p>
+                    <a:p>
+                      <a:pPr algn="ctr"/>
+                      <a:r>
+                        <a:rPr lang="en-US" sz="2800" dirty="0">
+                          <a:latin typeface="Courier New" panose="02070309020205020404" pitchFamily="49" charset="0"/>
+                          <a:cs typeface="Courier New" panose="02070309020205020404" pitchFamily="49" charset="0"/>
+                        </a:rPr>
+                        <a:t>CC</a:t>
+                      </a:r>
+                    </a:p>
+                  </a:txBody>
+                  <a:tcPr anchor="ctr">
+                    <a:lnL w="12700" cap="flat" cmpd="sng" algn="ctr">
+                      <a:solidFill>
+                        <a:schemeClr val="tx1"/>
+                      </a:solidFill>
+                      <a:prstDash val="solid"/>
+                      <a:round/>
+                      <a:headEnd type="none" w="med" len="med"/>
+                      <a:tailEnd type="none" w="med" len="med"/>
+                    </a:lnL>
+                    <a:lnR w="12700" cap="flat" cmpd="sng" algn="ctr">
+                      <a:solidFill>
+                        <a:schemeClr val="tx1"/>
+                      </a:solidFill>
+                      <a:prstDash val="solid"/>
+                      <a:round/>
+                      <a:headEnd type="none" w="med" len="med"/>
+                      <a:tailEnd type="none" w="med" len="med"/>
+                    </a:lnR>
+                    <a:lnT w="12700" cap="flat" cmpd="sng" algn="ctr">
+                      <a:solidFill>
+                        <a:schemeClr val="tx1"/>
+                      </a:solidFill>
+                      <a:prstDash val="solid"/>
+                      <a:round/>
+                      <a:headEnd type="none" w="med" len="med"/>
+                      <a:tailEnd type="none" w="med" len="med"/>
+                    </a:lnT>
+                    <a:lnB w="12700" cap="flat" cmpd="sng" algn="ctr">
+                      <a:solidFill>
+                        <a:schemeClr val="tx1"/>
+                      </a:solidFill>
+                      <a:prstDash val="solid"/>
+                      <a:round/>
+                      <a:headEnd type="none" w="med" len="med"/>
+                      <a:tailEnd type="none" w="med" len="med"/>
+                    </a:lnB>
+                    <a:lnTlToBr w="12700" cmpd="sng">
+                      <a:noFill/>
+                      <a:prstDash val="solid"/>
+                    </a:lnTlToBr>
+                    <a:lnBlToTr w="12700" cmpd="sng">
+                      <a:noFill/>
+                      <a:prstDash val="solid"/>
+                    </a:lnBlToTr>
+                    <a:solidFill>
+                      <a:schemeClr val="bg1"/>
+                    </a:solidFill>
+                  </a:tcPr>
+                </a:tc>
+                <a:extLst>
+                  <a:ext uri="{0D108BD9-81ED-4DB2-BD59-A6C34878D82A}">
+                    <a16:rowId xmlns:a16="http://schemas.microsoft.com/office/drawing/2014/main" val="3088978739"/>
+                  </a:ext>
+                </a:extLst>
+              </a:tr>
+            </a:tbl>
+          </a:graphicData>
+        </a:graphic>
+      </p:graphicFrame>
+      <p:graphicFrame>
+        <p:nvGraphicFramePr>
+          <p:cNvPr id="74" name="Table 73"/>
+          <p:cNvGraphicFramePr>
+            <a:graphicFrameLocks noGrp="1"/>
+          </p:cNvGraphicFramePr>
+          <p:nvPr>
+            <p:extLst>
+              <p:ext uri="{D42A27DB-BD31-4B8C-83A1-F6EECF244321}">
+                <p14:modId xmlns:p14="http://schemas.microsoft.com/office/powerpoint/2010/main" val="3217856295"/>
+              </p:ext>
+            </p:extLst>
+          </p:nvPr>
+        </p:nvGraphicFramePr>
+        <p:xfrm>
+          <a:off x="25017888" y="2104707"/>
+          <a:ext cx="10338912" cy="1059080"/>
+        </p:xfrm>
+        <a:graphic>
+          <a:graphicData uri="http://schemas.openxmlformats.org/drawingml/2006/table">
+            <a:tbl>
+              <a:tblPr>
+                <a:effectLst/>
+                <a:tableStyleId>{5C22544A-7EE6-4342-B048-85BDC9FD1C3A}</a:tableStyleId>
+              </a:tblPr>
+              <a:tblGrid>
+                <a:gridCol w="1292364">
+                  <a:extLst>
+                    <a:ext uri="{9D8B030D-6E8A-4147-A177-3AD203B41FA5}">
+                      <a16:colId xmlns:a16="http://schemas.microsoft.com/office/drawing/2014/main" val="3022783514"/>
+                    </a:ext>
+                  </a:extLst>
+                </a:gridCol>
+                <a:gridCol w="1292364">
+                  <a:extLst>
+                    <a:ext uri="{9D8B030D-6E8A-4147-A177-3AD203B41FA5}">
+                      <a16:colId xmlns:a16="http://schemas.microsoft.com/office/drawing/2014/main" val="757080785"/>
+                    </a:ext>
+                  </a:extLst>
+                </a:gridCol>
+                <a:gridCol w="1292364">
+                  <a:extLst>
+                    <a:ext uri="{9D8B030D-6E8A-4147-A177-3AD203B41FA5}">
+                      <a16:colId xmlns:a16="http://schemas.microsoft.com/office/drawing/2014/main" val="2276908230"/>
+                    </a:ext>
+                  </a:extLst>
+                </a:gridCol>
+                <a:gridCol w="1292364">
+                  <a:extLst>
+                    <a:ext uri="{9D8B030D-6E8A-4147-A177-3AD203B41FA5}">
+                      <a16:colId xmlns:a16="http://schemas.microsoft.com/office/drawing/2014/main" val="645744466"/>
+                    </a:ext>
+                  </a:extLst>
+                </a:gridCol>
+                <a:gridCol w="1292364">
+                  <a:extLst>
+                    <a:ext uri="{9D8B030D-6E8A-4147-A177-3AD203B41FA5}">
+                      <a16:colId xmlns:a16="http://schemas.microsoft.com/office/drawing/2014/main" val="3599940090"/>
+                    </a:ext>
+                  </a:extLst>
+                </a:gridCol>
+                <a:gridCol w="1292364">
+                  <a:extLst>
+                    <a:ext uri="{9D8B030D-6E8A-4147-A177-3AD203B41FA5}">
+                      <a16:colId xmlns:a16="http://schemas.microsoft.com/office/drawing/2014/main" val="2077798771"/>
+                    </a:ext>
+                  </a:extLst>
+                </a:gridCol>
+                <a:gridCol w="1292364">
+                  <a:extLst>
+                    <a:ext uri="{9D8B030D-6E8A-4147-A177-3AD203B41FA5}">
+                      <a16:colId xmlns:a16="http://schemas.microsoft.com/office/drawing/2014/main" val="1876429225"/>
+                    </a:ext>
+                  </a:extLst>
+                </a:gridCol>
+                <a:gridCol w="1292364">
+                  <a:extLst>
+                    <a:ext uri="{9D8B030D-6E8A-4147-A177-3AD203B41FA5}">
+                      <a16:colId xmlns:a16="http://schemas.microsoft.com/office/drawing/2014/main" val="73856520"/>
+                    </a:ext>
+                  </a:extLst>
+                </a:gridCol>
+              </a:tblGrid>
+              <a:tr h="1059080">
+                <a:tc>
+                  <a:txBody>
+                    <a:bodyPr/>
+                    <a:lstStyle/>
+                    <a:p>
+                      <a:pPr algn="ctr"/>
+                      <a:r>
+                        <a:rPr lang="en-US" sz="2800" dirty="0">
+                          <a:latin typeface="Courier New" panose="02070309020205020404" pitchFamily="49" charset="0"/>
+                          <a:cs typeface="Courier New" panose="02070309020205020404" pitchFamily="49" charset="0"/>
+                        </a:rPr>
+                        <a:t>L</a:t>
+                      </a:r>
+                    </a:p>
+                    <a:p>
+                      <a:pPr algn="ctr"/>
+                      <a:r>
+                        <a:rPr lang="en-US" sz="2800" dirty="0">
+                          <a:latin typeface="Courier New" panose="02070309020205020404" pitchFamily="49" charset="0"/>
+                          <a:cs typeface="Courier New" panose="02070309020205020404" pitchFamily="49" charset="0"/>
+                        </a:rPr>
+                        <a:t>15</a:t>
+                      </a:r>
+                    </a:p>
+                  </a:txBody>
+                  <a:tcPr anchor="ctr">
+                    <a:lnL w="12700" cap="flat" cmpd="sng" algn="ctr">
+                      <a:solidFill>
+                        <a:schemeClr val="tx1"/>
+                      </a:solidFill>
+                      <a:prstDash val="solid"/>
+                      <a:round/>
+                      <a:headEnd type="none" w="med" len="med"/>
+                      <a:tailEnd type="none" w="med" len="med"/>
+                    </a:lnL>
+                    <a:lnR w="12700" cap="flat" cmpd="sng" algn="ctr">
+                      <a:solidFill>
+                        <a:schemeClr val="tx1"/>
+                      </a:solidFill>
+                      <a:prstDash val="solid"/>
+                      <a:round/>
+                      <a:headEnd type="none" w="med" len="med"/>
+                      <a:tailEnd type="none" w="med" len="med"/>
+                    </a:lnR>
+                    <a:lnT w="12700" cap="flat" cmpd="sng" algn="ctr">
+                      <a:solidFill>
+                        <a:schemeClr val="tx1"/>
+                      </a:solidFill>
+                      <a:prstDash val="solid"/>
+                      <a:round/>
+                      <a:headEnd type="none" w="med" len="med"/>
+                      <a:tailEnd type="none" w="med" len="med"/>
+                    </a:lnT>
+                    <a:lnB w="12700" cap="flat" cmpd="sng" algn="ctr">
+                      <a:solidFill>
+                        <a:schemeClr val="tx1"/>
+                      </a:solidFill>
+                      <a:prstDash val="solid"/>
+                      <a:round/>
+                      <a:headEnd type="none" w="med" len="med"/>
+                      <a:tailEnd type="none" w="med" len="med"/>
+                    </a:lnB>
+                    <a:lnTlToBr w="12700" cmpd="sng">
+                      <a:noFill/>
+                      <a:prstDash val="solid"/>
+                    </a:lnTlToBr>
+                    <a:lnBlToTr w="12700" cmpd="sng">
+                      <a:noFill/>
+                      <a:prstDash val="solid"/>
+                    </a:lnBlToTr>
+                    <a:solidFill>
+                      <a:schemeClr val="bg1"/>
+                    </a:solidFill>
+                  </a:tcPr>
+                </a:tc>
+                <a:tc>
+                  <a:txBody>
+                    <a:bodyPr/>
+                    <a:lstStyle/>
+                    <a:p>
+                      <a:pPr algn="ctr"/>
+                      <a:r>
+                        <a:rPr lang="en-US" sz="2800" dirty="0">
+                          <a:latin typeface="Courier New" panose="02070309020205020404" pitchFamily="49" charset="0"/>
+                          <a:cs typeface="Courier New" panose="02070309020205020404" pitchFamily="49" charset="0"/>
+                        </a:rPr>
+                        <a:t>L</a:t>
+                      </a:r>
+                    </a:p>
+                    <a:p>
+                      <a:pPr algn="ctr"/>
+                      <a:r>
+                        <a:rPr lang="en-US" sz="2800" dirty="0">
+                          <a:latin typeface="Courier New" panose="02070309020205020404" pitchFamily="49" charset="0"/>
+                          <a:cs typeface="Courier New" panose="02070309020205020404" pitchFamily="49" charset="0"/>
+                        </a:rPr>
+                        <a:t>14</a:t>
+                      </a:r>
+                    </a:p>
+                  </a:txBody>
+                  <a:tcPr anchor="ctr">
+                    <a:lnL w="12700" cap="flat" cmpd="sng" algn="ctr">
+                      <a:solidFill>
+                        <a:schemeClr val="tx1"/>
+                      </a:solidFill>
+                      <a:prstDash val="solid"/>
+                      <a:round/>
+                      <a:headEnd type="none" w="med" len="med"/>
+                      <a:tailEnd type="none" w="med" len="med"/>
+                    </a:lnL>
+                    <a:lnR w="12700" cap="flat" cmpd="sng" algn="ctr">
+                      <a:solidFill>
+                        <a:schemeClr val="tx1"/>
+                      </a:solidFill>
+                      <a:prstDash val="solid"/>
+                      <a:round/>
+                      <a:headEnd type="none" w="med" len="med"/>
+                      <a:tailEnd type="none" w="med" len="med"/>
+                    </a:lnR>
+                    <a:lnT w="12700" cap="flat" cmpd="sng" algn="ctr">
+                      <a:solidFill>
+                        <a:schemeClr val="tx1"/>
+                      </a:solidFill>
+                      <a:prstDash val="solid"/>
+                      <a:round/>
+                      <a:headEnd type="none" w="med" len="med"/>
+                      <a:tailEnd type="none" w="med" len="med"/>
+                    </a:lnT>
+                    <a:lnB w="12700" cap="flat" cmpd="sng" algn="ctr">
+                      <a:solidFill>
+                        <a:schemeClr val="tx1"/>
+                      </a:solidFill>
+                      <a:prstDash val="solid"/>
+                      <a:round/>
+                      <a:headEnd type="none" w="med" len="med"/>
+                      <a:tailEnd type="none" w="med" len="med"/>
+                    </a:lnB>
+                    <a:lnTlToBr w="12700" cmpd="sng">
+                      <a:noFill/>
+                      <a:prstDash val="solid"/>
+                    </a:lnTlToBr>
+                    <a:lnBlToTr w="12700" cmpd="sng">
+                      <a:noFill/>
+                      <a:prstDash val="solid"/>
+                    </a:lnBlToTr>
+                    <a:solidFill>
+                      <a:schemeClr val="bg1"/>
+                    </a:solidFill>
+                  </a:tcPr>
+                </a:tc>
+                <a:tc>
+                  <a:txBody>
+                    <a:bodyPr/>
+                    <a:lstStyle/>
+                    <a:p>
+                      <a:pPr algn="ctr"/>
+                      <a:r>
+                        <a:rPr lang="en-US" sz="2800" dirty="0">
+                          <a:latin typeface="Courier New" panose="02070309020205020404" pitchFamily="49" charset="0"/>
+                          <a:cs typeface="Courier New" panose="02070309020205020404" pitchFamily="49" charset="0"/>
+                        </a:rPr>
+                        <a:t>L</a:t>
+                      </a:r>
+                    </a:p>
+                    <a:p>
+                      <a:pPr algn="ctr"/>
+                      <a:r>
+                        <a:rPr lang="en-US" sz="2800" dirty="0">
+                          <a:latin typeface="Courier New" panose="02070309020205020404" pitchFamily="49" charset="0"/>
+                          <a:cs typeface="Courier New" panose="02070309020205020404" pitchFamily="49" charset="0"/>
+                        </a:rPr>
+                        <a:t>13</a:t>
+                      </a:r>
+                    </a:p>
+                  </a:txBody>
+                  <a:tcPr anchor="ctr">
+                    <a:lnL w="12700" cap="flat" cmpd="sng" algn="ctr">
+                      <a:solidFill>
+                        <a:schemeClr val="tx1"/>
+                      </a:solidFill>
+                      <a:prstDash val="solid"/>
+                      <a:round/>
+                      <a:headEnd type="none" w="med" len="med"/>
+                      <a:tailEnd type="none" w="med" len="med"/>
+                    </a:lnL>
+                    <a:lnR w="12700" cap="flat" cmpd="sng" algn="ctr">
+                      <a:solidFill>
+                        <a:schemeClr val="tx1"/>
+                      </a:solidFill>
+                      <a:prstDash val="solid"/>
+                      <a:round/>
+                      <a:headEnd type="none" w="med" len="med"/>
+                      <a:tailEnd type="none" w="med" len="med"/>
+                    </a:lnR>
+                    <a:lnT w="12700" cap="flat" cmpd="sng" algn="ctr">
+                      <a:solidFill>
+                        <a:schemeClr val="tx1"/>
+                      </a:solidFill>
+                      <a:prstDash val="solid"/>
+                      <a:round/>
+                      <a:headEnd type="none" w="med" len="med"/>
+                      <a:tailEnd type="none" w="med" len="med"/>
+                    </a:lnT>
+                    <a:lnB w="12700" cap="flat" cmpd="sng" algn="ctr">
+                      <a:solidFill>
+                        <a:schemeClr val="tx1"/>
+                      </a:solidFill>
+                      <a:prstDash val="solid"/>
+                      <a:round/>
+                      <a:headEnd type="none" w="med" len="med"/>
+                      <a:tailEnd type="none" w="med" len="med"/>
+                    </a:lnB>
+                    <a:lnTlToBr w="12700" cmpd="sng">
+                      <a:noFill/>
+                      <a:prstDash val="solid"/>
+                    </a:lnTlToBr>
+                    <a:lnBlToTr w="12700" cmpd="sng">
+                      <a:noFill/>
+                      <a:prstDash val="solid"/>
+                    </a:lnBlToTr>
+                    <a:solidFill>
+                      <a:schemeClr val="bg1"/>
+                    </a:solidFill>
+                  </a:tcPr>
+                </a:tc>
+                <a:tc>
+                  <a:txBody>
+                    <a:bodyPr/>
+                    <a:lstStyle/>
+                    <a:p>
+                      <a:pPr algn="ctr"/>
+                      <a:r>
+                        <a:rPr lang="en-US" sz="2800" dirty="0">
+                          <a:latin typeface="Courier New" panose="02070309020205020404" pitchFamily="49" charset="0"/>
+                          <a:cs typeface="Courier New" panose="02070309020205020404" pitchFamily="49" charset="0"/>
+                        </a:rPr>
+                        <a:t>L</a:t>
+                      </a:r>
+                    </a:p>
+                    <a:p>
+                      <a:pPr algn="ctr"/>
+                      <a:r>
+                        <a:rPr lang="en-US" sz="2800" dirty="0">
+                          <a:latin typeface="Courier New" panose="02070309020205020404" pitchFamily="49" charset="0"/>
+                          <a:cs typeface="Courier New" panose="02070309020205020404" pitchFamily="49" charset="0"/>
+                        </a:rPr>
+                        <a:t>12</a:t>
+                      </a:r>
+                    </a:p>
+                  </a:txBody>
+                  <a:tcPr anchor="ctr">
+                    <a:lnL w="12700" cap="flat" cmpd="sng" algn="ctr">
+                      <a:solidFill>
+                        <a:schemeClr val="tx1"/>
+                      </a:solidFill>
+                      <a:prstDash val="solid"/>
+                      <a:round/>
+                      <a:headEnd type="none" w="med" len="med"/>
+                      <a:tailEnd type="none" w="med" len="med"/>
+                    </a:lnL>
+                    <a:lnR w="12700" cap="flat" cmpd="sng" algn="ctr">
+                      <a:solidFill>
+                        <a:schemeClr val="tx1"/>
+                      </a:solidFill>
+                      <a:prstDash val="solid"/>
+                      <a:round/>
+                      <a:headEnd type="none" w="med" len="med"/>
+                      <a:tailEnd type="none" w="med" len="med"/>
+                    </a:lnR>
+                    <a:lnT w="12700" cap="flat" cmpd="sng" algn="ctr">
+                      <a:solidFill>
+                        <a:schemeClr val="tx1"/>
+                      </a:solidFill>
+                      <a:prstDash val="solid"/>
+                      <a:round/>
+                      <a:headEnd type="none" w="med" len="med"/>
+                      <a:tailEnd type="none" w="med" len="med"/>
+                    </a:lnT>
+                    <a:lnB w="12700" cap="flat" cmpd="sng" algn="ctr">
+                      <a:solidFill>
+                        <a:schemeClr val="tx1"/>
+                      </a:solidFill>
+                      <a:prstDash val="solid"/>
+                      <a:round/>
+                      <a:headEnd type="none" w="med" len="med"/>
+                      <a:tailEnd type="none" w="med" len="med"/>
+                    </a:lnB>
+                    <a:lnTlToBr w="12700" cmpd="sng">
+                      <a:noFill/>
+                      <a:prstDash val="solid"/>
+                    </a:lnTlToBr>
+                    <a:lnBlToTr w="12700" cmpd="sng">
+                      <a:noFill/>
+                      <a:prstDash val="solid"/>
+                    </a:lnBlToTr>
+                    <a:solidFill>
+                      <a:schemeClr val="bg1"/>
+                    </a:solidFill>
+                  </a:tcPr>
+                </a:tc>
+                <a:tc>
+                  <a:txBody>
+                    <a:bodyPr/>
+                    <a:lstStyle/>
+                    <a:p>
+                      <a:pPr algn="ctr"/>
+                      <a:r>
+                        <a:rPr lang="en-US" sz="2800" dirty="0">
+                          <a:latin typeface="Courier New" panose="02070309020205020404" pitchFamily="49" charset="0"/>
+                          <a:cs typeface="Courier New" panose="02070309020205020404" pitchFamily="49" charset="0"/>
+                        </a:rPr>
+                        <a:t>L</a:t>
+                      </a:r>
+                    </a:p>
+                    <a:p>
+                      <a:pPr algn="ctr"/>
+                      <a:r>
+                        <a:rPr lang="en-US" sz="2800" dirty="0">
+                          <a:latin typeface="Courier New" panose="02070309020205020404" pitchFamily="49" charset="0"/>
+                          <a:cs typeface="Courier New" panose="02070309020205020404" pitchFamily="49" charset="0"/>
+                        </a:rPr>
+                        <a:t>11</a:t>
+                      </a:r>
+                    </a:p>
+                  </a:txBody>
+                  <a:tcPr anchor="ctr">
+                    <a:lnL w="12700" cap="flat" cmpd="sng" algn="ctr">
+                      <a:solidFill>
+                        <a:schemeClr val="tx1"/>
+                      </a:solidFill>
+                      <a:prstDash val="solid"/>
+                      <a:round/>
+                      <a:headEnd type="none" w="med" len="med"/>
+                      <a:tailEnd type="none" w="med" len="med"/>
+                    </a:lnL>
+                    <a:lnR w="12700" cap="flat" cmpd="sng" algn="ctr">
+                      <a:solidFill>
+                        <a:schemeClr val="tx1"/>
+                      </a:solidFill>
+                      <a:prstDash val="solid"/>
+                      <a:round/>
+                      <a:headEnd type="none" w="med" len="med"/>
+                      <a:tailEnd type="none" w="med" len="med"/>
+                    </a:lnR>
+                    <a:lnT w="12700" cap="flat" cmpd="sng" algn="ctr">
+                      <a:solidFill>
+                        <a:schemeClr val="tx1"/>
+                      </a:solidFill>
+                      <a:prstDash val="solid"/>
+                      <a:round/>
+                      <a:headEnd type="none" w="med" len="med"/>
+                      <a:tailEnd type="none" w="med" len="med"/>
+                    </a:lnT>
+                    <a:lnB w="12700" cap="flat" cmpd="sng" algn="ctr">
+                      <a:solidFill>
+                        <a:schemeClr val="tx1"/>
+                      </a:solidFill>
+                      <a:prstDash val="solid"/>
+                      <a:round/>
+                      <a:headEnd type="none" w="med" len="med"/>
+                      <a:tailEnd type="none" w="med" len="med"/>
+                    </a:lnB>
+                    <a:lnTlToBr w="12700" cmpd="sng">
+                      <a:noFill/>
+                      <a:prstDash val="solid"/>
+                    </a:lnTlToBr>
+                    <a:lnBlToTr w="12700" cmpd="sng">
+                      <a:noFill/>
+                      <a:prstDash val="solid"/>
+                    </a:lnBlToTr>
+                    <a:solidFill>
+                      <a:schemeClr val="bg1"/>
+                    </a:solidFill>
+                  </a:tcPr>
+                </a:tc>
+                <a:tc>
+                  <a:txBody>
+                    <a:bodyPr/>
+                    <a:lstStyle/>
+                    <a:p>
+                      <a:pPr algn="ctr"/>
+                      <a:r>
+                        <a:rPr lang="en-US" sz="2800" dirty="0">
+                          <a:latin typeface="Courier New" panose="02070309020205020404" pitchFamily="49" charset="0"/>
+                          <a:cs typeface="Courier New" panose="02070309020205020404" pitchFamily="49" charset="0"/>
+                        </a:rPr>
+                        <a:t>L</a:t>
+                      </a:r>
+                    </a:p>
+                    <a:p>
+                      <a:pPr algn="ctr"/>
+                      <a:r>
+                        <a:rPr lang="en-US" sz="2800" dirty="0">
+                          <a:latin typeface="Courier New" panose="02070309020205020404" pitchFamily="49" charset="0"/>
+                          <a:cs typeface="Courier New" panose="02070309020205020404" pitchFamily="49" charset="0"/>
+                        </a:rPr>
+                        <a:t>10</a:t>
+                      </a:r>
+                    </a:p>
+                  </a:txBody>
+                  <a:tcPr anchor="ctr">
+                    <a:lnL w="12700" cap="flat" cmpd="sng" algn="ctr">
+                      <a:solidFill>
+                        <a:schemeClr val="tx1"/>
+                      </a:solidFill>
+                      <a:prstDash val="solid"/>
+                      <a:round/>
+                      <a:headEnd type="none" w="med" len="med"/>
+                      <a:tailEnd type="none" w="med" len="med"/>
+                    </a:lnL>
+                    <a:lnR w="12700" cap="flat" cmpd="sng" algn="ctr">
+                      <a:solidFill>
+                        <a:schemeClr val="tx1"/>
+                      </a:solidFill>
+                      <a:prstDash val="solid"/>
+                      <a:round/>
+                      <a:headEnd type="none" w="med" len="med"/>
+                      <a:tailEnd type="none" w="med" len="med"/>
+                    </a:lnR>
+                    <a:lnT w="12700" cap="flat" cmpd="sng" algn="ctr">
+                      <a:solidFill>
+                        <a:schemeClr val="tx1"/>
+                      </a:solidFill>
+                      <a:prstDash val="solid"/>
+                      <a:round/>
+                      <a:headEnd type="none" w="med" len="med"/>
+                      <a:tailEnd type="none" w="med" len="med"/>
+                    </a:lnT>
+                    <a:lnB w="12700" cap="flat" cmpd="sng" algn="ctr">
+                      <a:solidFill>
+                        <a:schemeClr val="tx1"/>
+                      </a:solidFill>
+                      <a:prstDash val="solid"/>
+                      <a:round/>
+                      <a:headEnd type="none" w="med" len="med"/>
+                      <a:tailEnd type="none" w="med" len="med"/>
+                    </a:lnB>
+                    <a:lnTlToBr w="12700" cmpd="sng">
+                      <a:noFill/>
+                      <a:prstDash val="solid"/>
+                    </a:lnTlToBr>
+                    <a:lnBlToTr w="12700" cmpd="sng">
+                      <a:noFill/>
+                      <a:prstDash val="solid"/>
+                    </a:lnBlToTr>
+                    <a:solidFill>
+                      <a:schemeClr val="bg1"/>
+                    </a:solidFill>
+                  </a:tcPr>
+                </a:tc>
+                <a:tc>
+                  <a:txBody>
+                    <a:bodyPr/>
+                    <a:lstStyle/>
+                    <a:p>
+                      <a:pPr algn="ctr"/>
+                      <a:r>
+                        <a:rPr lang="en-US" sz="2800" dirty="0">
+                          <a:latin typeface="Courier New" panose="02070309020205020404" pitchFamily="49" charset="0"/>
+                          <a:cs typeface="Courier New" panose="02070309020205020404" pitchFamily="49" charset="0"/>
+                        </a:rPr>
+                        <a:t>L</a:t>
+                      </a:r>
+                    </a:p>
+                    <a:p>
+                      <a:pPr algn="ctr"/>
+                      <a:r>
+                        <a:rPr lang="en-US" sz="2800" dirty="0">
+                          <a:latin typeface="Courier New" panose="02070309020205020404" pitchFamily="49" charset="0"/>
+                          <a:cs typeface="Courier New" panose="02070309020205020404" pitchFamily="49" charset="0"/>
+                        </a:rPr>
+                        <a:t>9</a:t>
+                      </a:r>
+                    </a:p>
+                  </a:txBody>
+                  <a:tcPr anchor="ctr">
+                    <a:lnL w="12700" cap="flat" cmpd="sng" algn="ctr">
+                      <a:solidFill>
+                        <a:schemeClr val="tx1"/>
+                      </a:solidFill>
+                      <a:prstDash val="solid"/>
+                      <a:round/>
+                      <a:headEnd type="none" w="med" len="med"/>
+                      <a:tailEnd type="none" w="med" len="med"/>
+                    </a:lnL>
+                    <a:lnR w="12700" cap="flat" cmpd="sng" algn="ctr">
+                      <a:solidFill>
+                        <a:schemeClr val="tx1"/>
+                      </a:solidFill>
+                      <a:prstDash val="solid"/>
+                      <a:round/>
+                      <a:headEnd type="none" w="med" len="med"/>
+                      <a:tailEnd type="none" w="med" len="med"/>
+                    </a:lnR>
+                    <a:lnT w="12700" cap="flat" cmpd="sng" algn="ctr">
+                      <a:solidFill>
+                        <a:schemeClr val="tx1"/>
+                      </a:solidFill>
+                      <a:prstDash val="solid"/>
+                      <a:round/>
+                      <a:headEnd type="none" w="med" len="med"/>
+                      <a:tailEnd type="none" w="med" len="med"/>
+                    </a:lnT>
+                    <a:lnB w="12700" cap="flat" cmpd="sng" algn="ctr">
+                      <a:solidFill>
+                        <a:schemeClr val="tx1"/>
+                      </a:solidFill>
+                      <a:prstDash val="solid"/>
+                      <a:round/>
+                      <a:headEnd type="none" w="med" len="med"/>
+                      <a:tailEnd type="none" w="med" len="med"/>
+                    </a:lnB>
+                    <a:lnTlToBr w="12700" cmpd="sng">
+                      <a:noFill/>
+                      <a:prstDash val="solid"/>
+                    </a:lnTlToBr>
+                    <a:lnBlToTr w="12700" cmpd="sng">
+                      <a:noFill/>
+                      <a:prstDash val="solid"/>
+                    </a:lnBlToTr>
+                    <a:solidFill>
+                      <a:schemeClr val="bg1"/>
+                    </a:solidFill>
+                  </a:tcPr>
+                </a:tc>
+                <a:tc>
+                  <a:txBody>
+                    <a:bodyPr/>
+                    <a:lstStyle/>
+                    <a:p>
+                      <a:pPr algn="ctr"/>
+                      <a:r>
+                        <a:rPr lang="en-US" sz="2800" dirty="0">
+                          <a:latin typeface="Courier New" panose="02070309020205020404" pitchFamily="49" charset="0"/>
+                          <a:cs typeface="Courier New" panose="02070309020205020404" pitchFamily="49" charset="0"/>
+                        </a:rPr>
+                        <a:t>L</a:t>
+                      </a:r>
+                    </a:p>
+                    <a:p>
+                      <a:pPr algn="ctr"/>
+                      <a:r>
+                        <a:rPr lang="en-US" sz="2800" dirty="0">
+                          <a:latin typeface="Courier New" panose="02070309020205020404" pitchFamily="49" charset="0"/>
+                          <a:cs typeface="Courier New" panose="02070309020205020404" pitchFamily="49" charset="0"/>
+                        </a:rPr>
+                        <a:t>8</a:t>
+                      </a:r>
+                    </a:p>
+                  </a:txBody>
+                  <a:tcPr anchor="ctr">
+                    <a:lnL w="12700" cap="flat" cmpd="sng" algn="ctr">
+                      <a:solidFill>
+                        <a:schemeClr val="tx1"/>
+                      </a:solidFill>
+                      <a:prstDash val="solid"/>
+                      <a:round/>
+                      <a:headEnd type="none" w="med" len="med"/>
+                      <a:tailEnd type="none" w="med" len="med"/>
+                    </a:lnL>
+                    <a:lnR w="12700" cap="flat" cmpd="sng" algn="ctr">
+                      <a:solidFill>
+                        <a:schemeClr val="tx1"/>
+                      </a:solidFill>
+                      <a:prstDash val="solid"/>
+                      <a:round/>
+                      <a:headEnd type="none" w="med" len="med"/>
+                      <a:tailEnd type="none" w="med" len="med"/>
+                    </a:lnR>
+                    <a:lnT w="12700" cap="flat" cmpd="sng" algn="ctr">
+                      <a:solidFill>
+                        <a:schemeClr val="tx1"/>
+                      </a:solidFill>
+                      <a:prstDash val="solid"/>
+                      <a:round/>
+                      <a:headEnd type="none" w="med" len="med"/>
+                      <a:tailEnd type="none" w="med" len="med"/>
+                    </a:lnT>
+                    <a:lnB w="12700" cap="flat" cmpd="sng" algn="ctr">
+                      <a:solidFill>
+                        <a:schemeClr val="tx1"/>
+                      </a:solidFill>
+                      <a:prstDash val="solid"/>
+                      <a:round/>
+                      <a:headEnd type="none" w="med" len="med"/>
+                      <a:tailEnd type="none" w="med" len="med"/>
+                    </a:lnB>
+                    <a:lnTlToBr w="12700" cmpd="sng">
+                      <a:noFill/>
+                      <a:prstDash val="solid"/>
+                    </a:lnTlToBr>
+                    <a:lnBlToTr w="12700" cmpd="sng">
+                      <a:noFill/>
+                      <a:prstDash val="solid"/>
+                    </a:lnBlToTr>
+                    <a:solidFill>
+                      <a:schemeClr val="bg1"/>
+                    </a:solidFill>
+                  </a:tcPr>
+                </a:tc>
+                <a:extLst>
+                  <a:ext uri="{0D108BD9-81ED-4DB2-BD59-A6C34878D82A}">
+                    <a16:rowId xmlns:a16="http://schemas.microsoft.com/office/drawing/2014/main" val="3088978739"/>
+                  </a:ext>
+                </a:extLst>
+              </a:tr>
+            </a:tbl>
+          </a:graphicData>
+        </a:graphic>
+      </p:graphicFrame>
+      <p:sp>
+        <p:nvSpPr>
+          <p:cNvPr id="75" name="TextBox 74"/>
+          <p:cNvSpPr txBox="1"/>
+          <p:nvPr/>
+        </p:nvSpPr>
+        <p:spPr>
+          <a:xfrm>
+            <a:off x="15760124" y="3924300"/>
+            <a:ext cx="20053875" cy="1569660"/>
+          </a:xfrm>
+          <a:prstGeom prst="rect">
+            <a:avLst/>
+          </a:prstGeom>
+          <a:noFill/>
+        </p:spPr>
+        <p:txBody>
+          <a:bodyPr wrap="square" rtlCol="0">
+            <a:spAutoFit/>
+          </a:bodyPr>
+          <a:lstStyle/>
+          <a:p>
+            <a:r>
+              <a:rPr lang="en-US" sz="2400" b="1" dirty="0">
+                <a:latin typeface="Courier New" panose="02070309020205020404" pitchFamily="49" charset="0"/>
+                <a:cs typeface="Courier New" panose="02070309020205020404" pitchFamily="49" charset="0"/>
+              </a:rPr>
+              <a:t>Capability Container:</a:t>
+            </a:r>
+            <a:r>
+              <a:rPr lang="en-US" sz="2400" dirty="0">
+                <a:latin typeface="Courier New" panose="02070309020205020404" pitchFamily="49" charset="0"/>
+                <a:cs typeface="Courier New" panose="02070309020205020404" pitchFamily="49" charset="0"/>
+              </a:rPr>
+              <a:t> </a:t>
+            </a:r>
+            <a:r>
+              <a:rPr lang="en-US" sz="2400" dirty="0">
+                <a:latin typeface="Courier New" panose="02070309020205020404" pitchFamily="49" charset="0"/>
+                <a:cs typeface="Courier New" panose="02070309020205020404" pitchFamily="49" charset="0"/>
+              </a:rPr>
+              <a:t>One Time Programmable Bits</a:t>
+            </a:r>
+          </a:p>
+          <a:p>
+            <a:r>
+              <a:rPr lang="en-US" sz="2400" b="1" dirty="0">
+                <a:latin typeface="Courier New" panose="02070309020205020404" pitchFamily="49" charset="0"/>
+                <a:cs typeface="Courier New" panose="02070309020205020404" pitchFamily="49" charset="0"/>
+              </a:rPr>
+              <a:t>MEMORY LOCATION:      </a:t>
+            </a:r>
+            <a:r>
+              <a:rPr lang="en-US" sz="2400" dirty="0">
+                <a:latin typeface="Courier New" panose="02070309020205020404" pitchFamily="49" charset="0"/>
+                <a:cs typeface="Courier New" panose="02070309020205020404" pitchFamily="49" charset="0"/>
+              </a:rPr>
+              <a:t>PAGE 03h</a:t>
+            </a:r>
+          </a:p>
+          <a:p>
+            <a:r>
+              <a:rPr lang="en-US" sz="2400" b="1" dirty="0">
+                <a:latin typeface="Courier New" panose="02070309020205020404" pitchFamily="49" charset="0"/>
+                <a:cs typeface="Courier New" panose="02070309020205020404" pitchFamily="49" charset="0"/>
+              </a:rPr>
+              <a:t>DETAILS:              Writability set according to Static Lock Bytes. Stores control data for managing </a:t>
+            </a:r>
+            <a:br>
+              <a:rPr lang="en-US" sz="2400" b="1" dirty="0">
+                <a:latin typeface="Courier New" panose="02070309020205020404" pitchFamily="49" charset="0"/>
+                <a:cs typeface="Courier New" panose="02070309020205020404" pitchFamily="49" charset="0"/>
+              </a:rPr>
+            </a:br>
+            <a:r>
+              <a:rPr lang="en-US" sz="2400" b="1" dirty="0">
+                <a:latin typeface="Courier New" panose="02070309020205020404" pitchFamily="49" charset="0"/>
+                <a:cs typeface="Courier New" panose="02070309020205020404" pitchFamily="49" charset="0"/>
+              </a:rPr>
+              <a:t>                      NFC Forum defined data inside the tag. </a:t>
+            </a:r>
+            <a:endParaRPr lang="en-US" sz="2400" dirty="0">
+              <a:latin typeface="Courier New" panose="02070309020205020404" pitchFamily="49" charset="0"/>
+              <a:cs typeface="Courier New" panose="02070309020205020404" pitchFamily="49" charset="0"/>
+            </a:endParaRPr>
+          </a:p>
+        </p:txBody>
+      </p:sp>
+      <p:graphicFrame>
+        <p:nvGraphicFramePr>
+          <p:cNvPr id="76" name="Table 75"/>
+          <p:cNvGraphicFramePr>
+            <a:graphicFrameLocks noGrp="1"/>
+          </p:cNvGraphicFramePr>
+          <p:nvPr>
+            <p:extLst>
+              <p:ext uri="{D42A27DB-BD31-4B8C-83A1-F6EECF244321}">
+                <p14:modId xmlns:p14="http://schemas.microsoft.com/office/powerpoint/2010/main" val="958015606"/>
+              </p:ext>
+            </p:extLst>
+          </p:nvPr>
+        </p:nvGraphicFramePr>
+        <p:xfrm>
+          <a:off x="17297400" y="5562600"/>
+          <a:ext cx="18129199" cy="914400"/>
+        </p:xfrm>
+        <a:graphic>
+          <a:graphicData uri="http://schemas.openxmlformats.org/drawingml/2006/table">
+            <a:tbl>
+              <a:tblPr>
+                <a:effectLst/>
+                <a:tableStyleId>{5C22544A-7EE6-4342-B048-85BDC9FD1C3A}</a:tableStyleId>
+              </a:tblPr>
+              <a:tblGrid>
+                <a:gridCol w="3733732">
+                  <a:extLst>
+                    <a:ext uri="{9D8B030D-6E8A-4147-A177-3AD203B41FA5}">
+                      <a16:colId xmlns:a16="http://schemas.microsoft.com/office/drawing/2014/main" val="3022783514"/>
+                    </a:ext>
+                  </a:extLst>
+                </a:gridCol>
+                <a:gridCol w="4798489">
+                  <a:extLst>
+                    <a:ext uri="{9D8B030D-6E8A-4147-A177-3AD203B41FA5}">
+                      <a16:colId xmlns:a16="http://schemas.microsoft.com/office/drawing/2014/main" val="757080785"/>
+                    </a:ext>
+                  </a:extLst>
+                </a:gridCol>
+                <a:gridCol w="4798489">
+                  <a:extLst>
+                    <a:ext uri="{9D8B030D-6E8A-4147-A177-3AD203B41FA5}">
+                      <a16:colId xmlns:a16="http://schemas.microsoft.com/office/drawing/2014/main" val="2276908230"/>
+                    </a:ext>
+                  </a:extLst>
+                </a:gridCol>
+                <a:gridCol w="4798489">
+                  <a:extLst>
+                    <a:ext uri="{9D8B030D-6E8A-4147-A177-3AD203B41FA5}">
+                      <a16:colId xmlns:a16="http://schemas.microsoft.com/office/drawing/2014/main" val="645744466"/>
+                    </a:ext>
+                  </a:extLst>
+                </a:gridCol>
+              </a:tblGrid>
+              <a:tr h="442884">
+                <a:tc>
+                  <a:txBody>
+                    <a:bodyPr/>
+                    <a:lstStyle/>
+                    <a:p>
+                      <a:pPr algn="ctr"/>
+                      <a:r>
+                        <a:rPr lang="en-US" sz="2400" dirty="0">
+                          <a:solidFill>
+                            <a:schemeClr val="bg1"/>
+                          </a:solidFill>
+                          <a:latin typeface="Courier New" panose="02070309020205020404" pitchFamily="49" charset="0"/>
+                          <a:cs typeface="Courier New" panose="02070309020205020404" pitchFamily="49" charset="0"/>
+                        </a:rPr>
+                        <a:t>E1</a:t>
+                      </a:r>
+                    </a:p>
+                  </a:txBody>
+                  <a:tcPr anchor="ctr">
+                    <a:lnL w="12700" cap="flat" cmpd="sng" algn="ctr">
+                      <a:solidFill>
+                        <a:schemeClr val="tx1"/>
+                      </a:solidFill>
+                      <a:prstDash val="solid"/>
+                      <a:round/>
+                      <a:headEnd type="none" w="med" len="med"/>
+                      <a:tailEnd type="none" w="med" len="med"/>
+                    </a:lnL>
+                    <a:lnR w="12700" cap="flat" cmpd="sng" algn="ctr">
+                      <a:solidFill>
+                        <a:schemeClr val="tx1"/>
+                      </a:solidFill>
+                      <a:prstDash val="solid"/>
+                      <a:round/>
+                      <a:headEnd type="none" w="med" len="med"/>
+                      <a:tailEnd type="none" w="med" len="med"/>
+                    </a:lnR>
+                    <a:lnT w="12700" cap="flat" cmpd="sng" algn="ctr">
+                      <a:solidFill>
+                        <a:schemeClr val="tx1"/>
+                      </a:solidFill>
+                      <a:prstDash val="solid"/>
+                      <a:round/>
+                      <a:headEnd type="none" w="med" len="med"/>
+                      <a:tailEnd type="none" w="med" len="med"/>
+                    </a:lnT>
+                    <a:lnB w="12700" cap="flat" cmpd="sng" algn="ctr">
+                      <a:solidFill>
+                        <a:schemeClr val="tx1"/>
+                      </a:solidFill>
+                      <a:prstDash val="solid"/>
+                      <a:round/>
+                      <a:headEnd type="none" w="med" len="med"/>
+                      <a:tailEnd type="none" w="med" len="med"/>
+                    </a:lnB>
+                    <a:lnTlToBr w="12700" cmpd="sng">
+                      <a:noFill/>
+                      <a:prstDash val="solid"/>
+                    </a:lnTlToBr>
+                    <a:lnBlToTr w="12700" cmpd="sng">
+                      <a:noFill/>
+                      <a:prstDash val="solid"/>
+                    </a:lnBlToTr>
+                    <a:solidFill>
+                      <a:srgbClr val="FF0000"/>
+                    </a:solidFill>
+                  </a:tcPr>
+                </a:tc>
+                <a:tc>
+                  <a:txBody>
+                    <a:bodyPr/>
+                    <a:lstStyle/>
+                    <a:p>
+                      <a:pPr algn="ctr"/>
+                      <a:r>
+                        <a:rPr lang="en-US" sz="2400" dirty="0">
+                          <a:solidFill>
+                            <a:schemeClr val="bg1"/>
+                          </a:solidFill>
+                          <a:latin typeface="Courier New" panose="02070309020205020404" pitchFamily="49" charset="0"/>
+                          <a:cs typeface="Courier New" panose="02070309020205020404" pitchFamily="49" charset="0"/>
+                        </a:rPr>
+                        <a:t>10</a:t>
+                      </a:r>
+                    </a:p>
+                  </a:txBody>
+                  <a:tcPr anchor="ctr">
+                    <a:lnL w="12700" cap="flat" cmpd="sng" algn="ctr">
+                      <a:solidFill>
+                        <a:schemeClr val="tx1"/>
+                      </a:solidFill>
+                      <a:prstDash val="solid"/>
+                      <a:round/>
+                      <a:headEnd type="none" w="med" len="med"/>
+                      <a:tailEnd type="none" w="med" len="med"/>
+                    </a:lnL>
+                    <a:lnR w="12700" cap="flat" cmpd="sng" algn="ctr">
+                      <a:solidFill>
+                        <a:schemeClr val="tx1"/>
+                      </a:solidFill>
+                      <a:prstDash val="solid"/>
+                      <a:round/>
+                      <a:headEnd type="none" w="med" len="med"/>
+                      <a:tailEnd type="none" w="med" len="med"/>
+                    </a:lnR>
+                    <a:lnT w="12700" cap="flat" cmpd="sng" algn="ctr">
+                      <a:solidFill>
+                        <a:schemeClr val="tx1"/>
+                      </a:solidFill>
+                      <a:prstDash val="solid"/>
+                      <a:round/>
+                      <a:headEnd type="none" w="med" len="med"/>
+                      <a:tailEnd type="none" w="med" len="med"/>
+                    </a:lnT>
+                    <a:lnB w="12700" cap="flat" cmpd="sng" algn="ctr">
+                      <a:solidFill>
+                        <a:schemeClr val="tx1"/>
+                      </a:solidFill>
+                      <a:prstDash val="solid"/>
+                      <a:round/>
+                      <a:headEnd type="none" w="med" len="med"/>
+                      <a:tailEnd type="none" w="med" len="med"/>
+                    </a:lnB>
+                    <a:lnTlToBr w="12700" cmpd="sng">
+                      <a:noFill/>
+                      <a:prstDash val="solid"/>
+                    </a:lnTlToBr>
+                    <a:lnBlToTr w="12700" cmpd="sng">
+                      <a:noFill/>
+                      <a:prstDash val="solid"/>
+                    </a:lnBlToTr>
+                    <a:solidFill>
+                      <a:srgbClr val="FF0000"/>
+                    </a:solidFill>
+                  </a:tcPr>
+                </a:tc>
+                <a:tc>
+                  <a:txBody>
+                    <a:bodyPr/>
+                    <a:lstStyle/>
+                    <a:p>
+                      <a:pPr algn="ctr"/>
+                      <a:r>
+                        <a:rPr lang="en-US" sz="2400" dirty="0">
+                          <a:solidFill>
+                            <a:schemeClr val="bg1"/>
+                          </a:solidFill>
+                          <a:latin typeface="Courier New" panose="02070309020205020404" pitchFamily="49" charset="0"/>
+                          <a:cs typeface="Courier New" panose="02070309020205020404" pitchFamily="49" charset="0"/>
+                        </a:rPr>
+                        <a:t>12</a:t>
+                      </a:r>
+                    </a:p>
+                  </a:txBody>
+                  <a:tcPr anchor="ctr">
+                    <a:lnL w="12700" cap="flat" cmpd="sng" algn="ctr">
+                      <a:solidFill>
+                        <a:schemeClr val="tx1"/>
+                      </a:solidFill>
+                      <a:prstDash val="solid"/>
+                      <a:round/>
+                      <a:headEnd type="none" w="med" len="med"/>
+                      <a:tailEnd type="none" w="med" len="med"/>
+                    </a:lnL>
+                    <a:lnR w="12700" cap="flat" cmpd="sng" algn="ctr">
+                      <a:solidFill>
+                        <a:schemeClr val="tx1"/>
+                      </a:solidFill>
+                      <a:prstDash val="solid"/>
+                      <a:round/>
+                      <a:headEnd type="none" w="med" len="med"/>
+                      <a:tailEnd type="none" w="med" len="med"/>
+                    </a:lnR>
+                    <a:lnT w="12700" cap="flat" cmpd="sng" algn="ctr">
+                      <a:solidFill>
+                        <a:schemeClr val="tx1"/>
+                      </a:solidFill>
+                      <a:prstDash val="solid"/>
+                      <a:round/>
+                      <a:headEnd type="none" w="med" len="med"/>
+                      <a:tailEnd type="none" w="med" len="med"/>
+                    </a:lnT>
+                    <a:lnB w="12700" cap="flat" cmpd="sng" algn="ctr">
+                      <a:solidFill>
+                        <a:schemeClr val="tx1"/>
+                      </a:solidFill>
+                      <a:prstDash val="solid"/>
+                      <a:round/>
+                      <a:headEnd type="none" w="med" len="med"/>
+                      <a:tailEnd type="none" w="med" len="med"/>
+                    </a:lnB>
+                    <a:lnTlToBr w="12700" cmpd="sng">
+                      <a:noFill/>
+                      <a:prstDash val="solid"/>
+                    </a:lnTlToBr>
+                    <a:lnBlToTr w="12700" cmpd="sng">
+                      <a:noFill/>
+                      <a:prstDash val="solid"/>
+                    </a:lnBlToTr>
+                    <a:solidFill>
+                      <a:srgbClr val="FF0000"/>
+                    </a:solidFill>
+                  </a:tcPr>
+                </a:tc>
+                <a:tc>
+                  <a:txBody>
+                    <a:bodyPr/>
+                    <a:lstStyle/>
+                    <a:p>
+                      <a:pPr algn="ctr"/>
+                      <a:r>
+                        <a:rPr lang="en-US" sz="2400" dirty="0">
+                          <a:solidFill>
+                            <a:schemeClr val="bg1"/>
+                          </a:solidFill>
+                          <a:latin typeface="Courier New" panose="02070309020205020404" pitchFamily="49" charset="0"/>
+                          <a:cs typeface="Courier New" panose="02070309020205020404" pitchFamily="49" charset="0"/>
+                        </a:rPr>
+                        <a:t>00</a:t>
+                      </a:r>
+                    </a:p>
+                  </a:txBody>
+                  <a:tcPr anchor="ctr">
+                    <a:lnL w="12700" cap="flat" cmpd="sng" algn="ctr">
+                      <a:solidFill>
+                        <a:schemeClr val="tx1"/>
+                      </a:solidFill>
+                      <a:prstDash val="solid"/>
+                      <a:round/>
+                      <a:headEnd type="none" w="med" len="med"/>
+                      <a:tailEnd type="none" w="med" len="med"/>
+                    </a:lnL>
+                    <a:lnR w="12700" cap="flat" cmpd="sng" algn="ctr">
+                      <a:solidFill>
+                        <a:schemeClr val="tx1"/>
+                      </a:solidFill>
+                      <a:prstDash val="solid"/>
+                      <a:round/>
+                      <a:headEnd type="none" w="med" len="med"/>
+                      <a:tailEnd type="none" w="med" len="med"/>
+                    </a:lnR>
+                    <a:lnT w="12700" cap="flat" cmpd="sng" algn="ctr">
+                      <a:solidFill>
+                        <a:schemeClr val="tx1"/>
+                      </a:solidFill>
+                      <a:prstDash val="solid"/>
+                      <a:round/>
+                      <a:headEnd type="none" w="med" len="med"/>
+                      <a:tailEnd type="none" w="med" len="med"/>
+                    </a:lnT>
+                    <a:lnB w="12700" cap="flat" cmpd="sng" algn="ctr">
+                      <a:solidFill>
+                        <a:schemeClr val="tx1"/>
+                      </a:solidFill>
+                      <a:prstDash val="solid"/>
+                      <a:round/>
+                      <a:headEnd type="none" w="med" len="med"/>
+                      <a:tailEnd type="none" w="med" len="med"/>
+                    </a:lnB>
+                    <a:lnTlToBr w="12700" cmpd="sng">
+                      <a:noFill/>
+                      <a:prstDash val="solid"/>
+                    </a:lnTlToBr>
+                    <a:lnBlToTr w="12700" cmpd="sng">
+                      <a:noFill/>
+                      <a:prstDash val="solid"/>
+                    </a:lnBlToTr>
+                    <a:solidFill>
+                      <a:srgbClr val="FF0000"/>
+                    </a:solidFill>
+                  </a:tcPr>
+                </a:tc>
+                <a:extLst>
+                  <a:ext uri="{0D108BD9-81ED-4DB2-BD59-A6C34878D82A}">
+                    <a16:rowId xmlns:a16="http://schemas.microsoft.com/office/drawing/2014/main" val="1653739609"/>
+                  </a:ext>
+                </a:extLst>
+              </a:tr>
+              <a:tr h="442884">
+                <a:tc>
+                  <a:txBody>
+                    <a:bodyPr/>
+                    <a:lstStyle/>
+                    <a:p>
+                      <a:pPr algn="ctr"/>
+                      <a:r>
+                        <a:rPr lang="en-US" sz="2400" dirty="0">
+                          <a:latin typeface="Courier New" panose="02070309020205020404" pitchFamily="49" charset="0"/>
+                          <a:cs typeface="Courier New" panose="02070309020205020404" pitchFamily="49" charset="0"/>
+                        </a:rPr>
+                        <a:t>Magic Number</a:t>
+                      </a:r>
+                    </a:p>
+                  </a:txBody>
+                  <a:tcPr anchor="ctr">
+                    <a:lnL w="12700" cap="flat" cmpd="sng" algn="ctr">
+                      <a:solidFill>
+                        <a:schemeClr val="tx1"/>
+                      </a:solidFill>
+                      <a:prstDash val="solid"/>
+                      <a:round/>
+                      <a:headEnd type="none" w="med" len="med"/>
+                      <a:tailEnd type="none" w="med" len="med"/>
+                    </a:lnL>
+                    <a:lnR w="12700" cap="flat" cmpd="sng" algn="ctr">
+                      <a:solidFill>
+                        <a:schemeClr val="tx1"/>
+                      </a:solidFill>
+                      <a:prstDash val="solid"/>
+                      <a:round/>
+                      <a:headEnd type="none" w="med" len="med"/>
+                      <a:tailEnd type="none" w="med" len="med"/>
+                    </a:lnR>
+                    <a:lnT w="12700" cap="flat" cmpd="sng" algn="ctr">
+                      <a:solidFill>
+                        <a:schemeClr val="tx1"/>
+                      </a:solidFill>
+                      <a:prstDash val="solid"/>
+                      <a:round/>
+                      <a:headEnd type="none" w="med" len="med"/>
+                      <a:tailEnd type="none" w="med" len="med"/>
+                    </a:lnT>
+                    <a:lnB w="12700" cap="flat" cmpd="sng" algn="ctr">
+                      <a:solidFill>
+                        <a:schemeClr val="tx1"/>
+                      </a:solidFill>
+                      <a:prstDash val="solid"/>
+                      <a:round/>
+                      <a:headEnd type="none" w="med" len="med"/>
+                      <a:tailEnd type="none" w="med" len="med"/>
+                    </a:lnB>
+                    <a:lnTlToBr w="12700" cmpd="sng">
+                      <a:noFill/>
+                      <a:prstDash val="solid"/>
+                    </a:lnTlToBr>
+                    <a:lnBlToTr w="12700" cmpd="sng">
+                      <a:noFill/>
+                      <a:prstDash val="solid"/>
+                    </a:lnBlToTr>
+                    <a:solidFill>
+                      <a:schemeClr val="bg1"/>
+                    </a:solidFill>
+                  </a:tcPr>
+                </a:tc>
+                <a:tc>
+                  <a:txBody>
+                    <a:bodyPr/>
+                    <a:lstStyle/>
+                    <a:p>
+                      <a:pPr algn="ctr"/>
+                      <a:r>
+                        <a:rPr lang="en-US" sz="2400" dirty="0">
+                          <a:latin typeface="Courier New" panose="02070309020205020404" pitchFamily="49" charset="0"/>
+                          <a:cs typeface="Courier New" panose="02070309020205020404" pitchFamily="49" charset="0"/>
+                        </a:rPr>
+                        <a:t>NFC Type 2 Version Number</a:t>
+                      </a:r>
+                    </a:p>
+                  </a:txBody>
+                  <a:tcPr anchor="ctr">
+                    <a:lnL w="12700" cap="flat" cmpd="sng" algn="ctr">
+                      <a:solidFill>
+                        <a:schemeClr val="tx1"/>
+                      </a:solidFill>
+                      <a:prstDash val="solid"/>
+                      <a:round/>
+                      <a:headEnd type="none" w="med" len="med"/>
+                      <a:tailEnd type="none" w="med" len="med"/>
+                    </a:lnL>
+                    <a:lnR w="12700" cap="flat" cmpd="sng" algn="ctr">
+                      <a:solidFill>
+                        <a:schemeClr val="tx1"/>
+                      </a:solidFill>
+                      <a:prstDash val="solid"/>
+                      <a:round/>
+                      <a:headEnd type="none" w="med" len="med"/>
+                      <a:tailEnd type="none" w="med" len="med"/>
+                    </a:lnR>
+                    <a:lnT w="12700" cap="flat" cmpd="sng" algn="ctr">
+                      <a:solidFill>
+                        <a:schemeClr val="tx1"/>
+                      </a:solidFill>
+                      <a:prstDash val="solid"/>
+                      <a:round/>
+                      <a:headEnd type="none" w="med" len="med"/>
+                      <a:tailEnd type="none" w="med" len="med"/>
+                    </a:lnT>
+                    <a:lnB w="12700" cap="flat" cmpd="sng" algn="ctr">
+                      <a:solidFill>
+                        <a:schemeClr val="tx1"/>
+                      </a:solidFill>
+                      <a:prstDash val="solid"/>
+                      <a:round/>
+                      <a:headEnd type="none" w="med" len="med"/>
+                      <a:tailEnd type="none" w="med" len="med"/>
+                    </a:lnB>
+                    <a:lnTlToBr w="12700" cmpd="sng">
+                      <a:noFill/>
+                      <a:prstDash val="solid"/>
+                    </a:lnTlToBr>
+                    <a:lnBlToTr w="12700" cmpd="sng">
+                      <a:noFill/>
+                      <a:prstDash val="solid"/>
+                    </a:lnBlToTr>
+                    <a:solidFill>
+                      <a:schemeClr val="bg1"/>
+                    </a:solidFill>
+                  </a:tcPr>
+                </a:tc>
+                <a:tc>
+                  <a:txBody>
+                    <a:bodyPr/>
+                    <a:lstStyle/>
+                    <a:p>
+                      <a:pPr algn="ctr"/>
+                      <a:r>
+                        <a:rPr lang="en-US" sz="2400" dirty="0">
+                          <a:latin typeface="Courier New" panose="02070309020205020404" pitchFamily="49" charset="0"/>
+                          <a:cs typeface="Courier New" panose="02070309020205020404" pitchFamily="49" charset="0"/>
+                        </a:rPr>
+                        <a:t>Data Area (144 Bytes)</a:t>
+                      </a:r>
+                    </a:p>
+                  </a:txBody>
+                  <a:tcPr anchor="ctr">
+                    <a:lnL w="12700" cap="flat" cmpd="sng" algn="ctr">
+                      <a:solidFill>
+                        <a:schemeClr val="tx1"/>
+                      </a:solidFill>
+                      <a:prstDash val="solid"/>
+                      <a:round/>
+                      <a:headEnd type="none" w="med" len="med"/>
+                      <a:tailEnd type="none" w="med" len="med"/>
+                    </a:lnL>
+                    <a:lnR w="12700" cap="flat" cmpd="sng" algn="ctr">
+                      <a:solidFill>
+                        <a:schemeClr val="tx1"/>
+                      </a:solidFill>
+                      <a:prstDash val="solid"/>
+                      <a:round/>
+                      <a:headEnd type="none" w="med" len="med"/>
+                      <a:tailEnd type="none" w="med" len="med"/>
+                    </a:lnR>
+                    <a:lnT w="12700" cap="flat" cmpd="sng" algn="ctr">
+                      <a:solidFill>
+                        <a:schemeClr val="tx1"/>
+                      </a:solidFill>
+                      <a:prstDash val="solid"/>
+                      <a:round/>
+                      <a:headEnd type="none" w="med" len="med"/>
+                      <a:tailEnd type="none" w="med" len="med"/>
+                    </a:lnT>
+                    <a:lnB w="12700" cap="flat" cmpd="sng" algn="ctr">
+                      <a:solidFill>
+                        <a:schemeClr val="tx1"/>
+                      </a:solidFill>
+                      <a:prstDash val="solid"/>
+                      <a:round/>
+                      <a:headEnd type="none" w="med" len="med"/>
+                      <a:tailEnd type="none" w="med" len="med"/>
+                    </a:lnB>
+                    <a:lnTlToBr w="12700" cmpd="sng">
+                      <a:noFill/>
+                      <a:prstDash val="solid"/>
+                    </a:lnTlToBr>
+                    <a:lnBlToTr w="12700" cmpd="sng">
+                      <a:noFill/>
+                      <a:prstDash val="solid"/>
+                    </a:lnBlToTr>
+                    <a:solidFill>
+                      <a:schemeClr val="bg1"/>
+                    </a:solidFill>
+                  </a:tcPr>
+                </a:tc>
+                <a:tc>
+                  <a:txBody>
+                    <a:bodyPr/>
+                    <a:lstStyle/>
+                    <a:p>
+                      <a:pPr algn="ctr"/>
+                      <a:r>
+                        <a:rPr lang="en-US" sz="2400" dirty="0">
+                          <a:latin typeface="Courier New" panose="02070309020205020404" pitchFamily="49" charset="0"/>
+                          <a:cs typeface="Courier New" panose="02070309020205020404" pitchFamily="49" charset="0"/>
+                        </a:rPr>
+                        <a:t>R/W Access (No Security)</a:t>
+                      </a:r>
+                    </a:p>
+                  </a:txBody>
+                  <a:tcPr anchor="ctr">
+                    <a:lnL w="12700" cap="flat" cmpd="sng" algn="ctr">
+                      <a:solidFill>
+                        <a:schemeClr val="tx1"/>
+                      </a:solidFill>
+                      <a:prstDash val="solid"/>
+                      <a:round/>
+                      <a:headEnd type="none" w="med" len="med"/>
+                      <a:tailEnd type="none" w="med" len="med"/>
+                    </a:lnL>
+                    <a:lnR w="12700" cap="flat" cmpd="sng" algn="ctr">
+                      <a:solidFill>
+                        <a:schemeClr val="tx1"/>
+                      </a:solidFill>
+                      <a:prstDash val="solid"/>
+                      <a:round/>
+                      <a:headEnd type="none" w="med" len="med"/>
+                      <a:tailEnd type="none" w="med" len="med"/>
+                    </a:lnR>
+                    <a:lnT w="12700" cap="flat" cmpd="sng" algn="ctr">
+                      <a:solidFill>
+                        <a:schemeClr val="tx1"/>
+                      </a:solidFill>
+                      <a:prstDash val="solid"/>
+                      <a:round/>
+                      <a:headEnd type="none" w="med" len="med"/>
+                      <a:tailEnd type="none" w="med" len="med"/>
+                    </a:lnT>
+                    <a:lnB w="12700" cap="flat" cmpd="sng" algn="ctr">
+                      <a:solidFill>
+                        <a:schemeClr val="tx1"/>
+                      </a:solidFill>
+                      <a:prstDash val="solid"/>
+                      <a:round/>
+                      <a:headEnd type="none" w="med" len="med"/>
+                      <a:tailEnd type="none" w="med" len="med"/>
+                    </a:lnB>
+                    <a:lnTlToBr w="12700" cmpd="sng">
+                      <a:noFill/>
+                      <a:prstDash val="solid"/>
+                    </a:lnTlToBr>
+                    <a:lnBlToTr w="12700" cmpd="sng">
+                      <a:noFill/>
+                      <a:prstDash val="solid"/>
+                    </a:lnBlToTr>
+                    <a:solidFill>
+                      <a:schemeClr val="bg1"/>
+                    </a:solidFill>
+                  </a:tcPr>
+                </a:tc>
+                <a:extLst>
+                  <a:ext uri="{0D108BD9-81ED-4DB2-BD59-A6C34878D82A}">
+                    <a16:rowId xmlns:a16="http://schemas.microsoft.com/office/drawing/2014/main" val="3088978739"/>
+                  </a:ext>
+                </a:extLst>
+              </a:tr>
+            </a:tbl>
+          </a:graphicData>
+        </a:graphic>
+      </p:graphicFrame>
     </p:spTree>
     <p:extLst>
       <p:ext uri="{BB962C8B-B14F-4D97-AF65-F5344CB8AC3E}">

</xml_diff>

<commit_message>
updated read/write app and symposium app; and poster
wife needs me to go to bed because i am staying up too late
</commit_message>
<xml_diff>
--- a/Poster Artifacts/Poster.pptx
+++ b/Poster Artifacts/Poster.pptx
@@ -209,7 +209,7 @@
           <a:p>
             <a:fld id="{CAD4E7B3-883E-4909-856A-D4D2FBCEB0AE}" type="datetimeFigureOut">
               <a:rPr lang="en-US" smtClean="0"/>
-              <a:t>2/25/2017</a:t>
+              <a:t>3/12/2017</a:t>
             </a:fld>
             <a:endParaRPr lang="en-US"/>
           </a:p>
@@ -824,7 +824,7 @@
             <a:fld id="{1D8BD707-D9CF-40AE-B4C6-C98DA3205C09}" type="datetimeFigureOut">
               <a:rPr lang="en-US" smtClean="0"/>
               <a:pPr/>
-              <a:t>2/25/2017</a:t>
+              <a:t>3/12/2017</a:t>
             </a:fld>
             <a:endParaRPr lang="en-US"/>
           </a:p>
@@ -989,7 +989,7 @@
             <a:fld id="{1D8BD707-D9CF-40AE-B4C6-C98DA3205C09}" type="datetimeFigureOut">
               <a:rPr lang="en-US" smtClean="0"/>
               <a:pPr/>
-              <a:t>2/25/2017</a:t>
+              <a:t>3/12/2017</a:t>
             </a:fld>
             <a:endParaRPr lang="en-US"/>
           </a:p>
@@ -1164,7 +1164,7 @@
             <a:fld id="{1D8BD707-D9CF-40AE-B4C6-C98DA3205C09}" type="datetimeFigureOut">
               <a:rPr lang="en-US" smtClean="0"/>
               <a:pPr/>
-              <a:t>2/25/2017</a:t>
+              <a:t>3/12/2017</a:t>
             </a:fld>
             <a:endParaRPr lang="en-US"/>
           </a:p>
@@ -1329,7 +1329,7 @@
             <a:fld id="{1D8BD707-D9CF-40AE-B4C6-C98DA3205C09}" type="datetimeFigureOut">
               <a:rPr lang="en-US" smtClean="0"/>
               <a:pPr/>
-              <a:t>2/25/2017</a:t>
+              <a:t>3/12/2017</a:t>
             </a:fld>
             <a:endParaRPr lang="en-US"/>
           </a:p>
@@ -1571,7 +1571,7 @@
             <a:fld id="{1D8BD707-D9CF-40AE-B4C6-C98DA3205C09}" type="datetimeFigureOut">
               <a:rPr lang="en-US" smtClean="0"/>
               <a:pPr/>
-              <a:t>2/25/2017</a:t>
+              <a:t>3/12/2017</a:t>
             </a:fld>
             <a:endParaRPr lang="en-US"/>
           </a:p>
@@ -1853,7 +1853,7 @@
             <a:fld id="{1D8BD707-D9CF-40AE-B4C6-C98DA3205C09}" type="datetimeFigureOut">
               <a:rPr lang="en-US" smtClean="0"/>
               <a:pPr/>
-              <a:t>2/25/2017</a:t>
+              <a:t>3/12/2017</a:t>
             </a:fld>
             <a:endParaRPr lang="en-US"/>
           </a:p>
@@ -2269,7 +2269,7 @@
             <a:fld id="{1D8BD707-D9CF-40AE-B4C6-C98DA3205C09}" type="datetimeFigureOut">
               <a:rPr lang="en-US" smtClean="0"/>
               <a:pPr/>
-              <a:t>2/25/2017</a:t>
+              <a:t>3/12/2017</a:t>
             </a:fld>
             <a:endParaRPr lang="en-US"/>
           </a:p>
@@ -2383,7 +2383,7 @@
             <a:fld id="{1D8BD707-D9CF-40AE-B4C6-C98DA3205C09}" type="datetimeFigureOut">
               <a:rPr lang="en-US" smtClean="0"/>
               <a:pPr/>
-              <a:t>2/25/2017</a:t>
+              <a:t>3/12/2017</a:t>
             </a:fld>
             <a:endParaRPr lang="en-US"/>
           </a:p>
@@ -2475,7 +2475,7 @@
             <a:fld id="{1D8BD707-D9CF-40AE-B4C6-C98DA3205C09}" type="datetimeFigureOut">
               <a:rPr lang="en-US" smtClean="0"/>
               <a:pPr/>
-              <a:t>2/25/2017</a:t>
+              <a:t>3/12/2017</a:t>
             </a:fld>
             <a:endParaRPr lang="en-US"/>
           </a:p>
@@ -2747,7 +2747,7 @@
             <a:fld id="{1D8BD707-D9CF-40AE-B4C6-C98DA3205C09}" type="datetimeFigureOut">
               <a:rPr lang="en-US" smtClean="0"/>
               <a:pPr/>
-              <a:t>2/25/2017</a:t>
+              <a:t>3/12/2017</a:t>
             </a:fld>
             <a:endParaRPr lang="en-US"/>
           </a:p>
@@ -2996,7 +2996,7 @@
             <a:fld id="{1D8BD707-D9CF-40AE-B4C6-C98DA3205C09}" type="datetimeFigureOut">
               <a:rPr lang="en-US" smtClean="0"/>
               <a:pPr/>
-              <a:t>2/25/2017</a:t>
+              <a:t>3/12/2017</a:t>
             </a:fld>
             <a:endParaRPr lang="en-US"/>
           </a:p>
@@ -3204,7 +3204,7 @@
             <a:fld id="{1D8BD707-D9CF-40AE-B4C6-C98DA3205C09}" type="datetimeFigureOut">
               <a:rPr lang="en-US" smtClean="0"/>
               <a:pPr/>
-              <a:t>2/25/2017</a:t>
+              <a:t>3/12/2017</a:t>
             </a:fld>
             <a:endParaRPr lang="en-US"/>
           </a:p>
@@ -3605,6 +3605,36 @@
           <a:chExt cx="0" cy="0"/>
         </a:xfrm>
       </p:grpSpPr>
+      <p:pic>
+        <p:nvPicPr>
+          <p:cNvPr id="9" name="Picture 8"/>
+          <p:cNvPicPr>
+            <a:picLocks noChangeAspect="1"/>
+          </p:cNvPicPr>
+          <p:nvPr/>
+        </p:nvPicPr>
+        <p:blipFill>
+          <a:blip r:embed="rId3">
+            <a:extLst>
+              <a:ext uri="{28A0092B-C50C-407E-A947-70E740481C1C}">
+                <a14:useLocalDpi xmlns:a14="http://schemas.microsoft.com/office/drawing/2010/main" val="0"/>
+              </a:ext>
+            </a:extLst>
+          </a:blip>
+          <a:stretch>
+            <a:fillRect/>
+          </a:stretch>
+        </p:blipFill>
+        <p:spPr>
+          <a:xfrm>
+            <a:off x="627468" y="304800"/>
+            <a:ext cx="4401731" cy="32385000"/>
+          </a:xfrm>
+          <a:prstGeom prst="rect">
+            <a:avLst/>
+          </a:prstGeom>
+        </p:spPr>
+      </p:pic>
       <p:sp>
         <p:nvSpPr>
           <p:cNvPr id="20" name="Text Box 15"/>
@@ -3615,7 +3645,7 @@
         </p:nvSpPr>
         <p:spPr bwMode="auto">
           <a:xfrm>
-            <a:off x="5867400" y="13345397"/>
+            <a:off x="5029200" y="13345397"/>
             <a:ext cx="33885959" cy="3952003"/>
           </a:xfrm>
           <a:prstGeom prst="rect">
@@ -4217,36 +4247,6 @@
           </a:p>
         </p:txBody>
       </p:sp>
-      <p:pic>
-        <p:nvPicPr>
-          <p:cNvPr id="40" name="Picture 39"/>
-          <p:cNvPicPr>
-            <a:picLocks noChangeAspect="1"/>
-          </p:cNvPicPr>
-          <p:nvPr/>
-        </p:nvPicPr>
-        <p:blipFill>
-          <a:blip r:embed="rId3">
-            <a:extLst>
-              <a:ext uri="{28A0092B-C50C-407E-A947-70E740481C1C}">
-                <a14:useLocalDpi xmlns:a14="http://schemas.microsoft.com/office/drawing/2010/main" val="0"/>
-              </a:ext>
-            </a:extLst>
-          </a:blip>
-          <a:stretch>
-            <a:fillRect/>
-          </a:stretch>
-        </p:blipFill>
-        <p:spPr>
-          <a:xfrm>
-            <a:off x="601195" y="533400"/>
-            <a:ext cx="5952005" cy="31752762"/>
-          </a:xfrm>
-          <a:prstGeom prst="rect">
-            <a:avLst/>
-          </a:prstGeom>
-        </p:spPr>
-      </p:pic>
       <p:sp>
         <p:nvSpPr>
           <p:cNvPr id="44" name="Striped Right Arrow 43"/>
@@ -4255,8 +4255,8 @@
         </p:nvSpPr>
         <p:spPr>
           <a:xfrm rot="10800000">
-            <a:off x="4953000" y="11365768"/>
-            <a:ext cx="34932840" cy="4343400"/>
+            <a:off x="4114800" y="10382866"/>
+            <a:ext cx="34932840" cy="5326302"/>
           </a:xfrm>
           <a:prstGeom prst="stripedRightArrow">
             <a:avLst/>
@@ -4371,7 +4371,7 @@
         </p:blipFill>
         <p:spPr>
           <a:xfrm>
-            <a:off x="39093293" y="12461862"/>
+            <a:off x="38709600" y="12461862"/>
             <a:ext cx="4455595" cy="6054738"/>
           </a:xfrm>
           <a:prstGeom prst="ellipse">
@@ -4411,8 +4411,8 @@
         </p:nvSpPr>
         <p:spPr>
           <a:xfrm>
-            <a:off x="6684214" y="15392400"/>
-            <a:ext cx="33983545" cy="4343400"/>
+            <a:off x="5846014" y="15316200"/>
+            <a:ext cx="34387586" cy="5456107"/>
           </a:xfrm>
           <a:prstGeom prst="stripedRightArrow">
             <a:avLst/>
@@ -4474,7 +4474,7 @@
         </p:nvSpPr>
         <p:spPr bwMode="auto">
           <a:xfrm>
-            <a:off x="37212977" y="5047880"/>
+            <a:off x="37477081" y="5047880"/>
             <a:ext cx="5952003" cy="1176491"/>
           </a:xfrm>
           <a:prstGeom prst="rect">
@@ -4613,7 +4613,7 @@
         </p:nvSpPr>
         <p:spPr bwMode="auto">
           <a:xfrm>
-            <a:off x="37158472" y="4419600"/>
+            <a:off x="37422576" y="4419600"/>
             <a:ext cx="5952003" cy="628279"/>
           </a:xfrm>
           <a:prstGeom prst="rect">
@@ -4777,7 +4777,7 @@
         </p:nvSpPr>
         <p:spPr bwMode="auto">
           <a:xfrm>
-            <a:off x="37212977" y="2780867"/>
+            <a:off x="37477081" y="2780867"/>
             <a:ext cx="5952003" cy="1473469"/>
           </a:xfrm>
           <a:prstGeom prst="rect">
@@ -4888,7 +4888,7 @@
         </p:nvSpPr>
         <p:spPr bwMode="auto">
           <a:xfrm>
-            <a:off x="37212977" y="2035363"/>
+            <a:off x="37477081" y="2035363"/>
             <a:ext cx="5952003" cy="680279"/>
           </a:xfrm>
           <a:prstGeom prst="rect">
@@ -5064,7 +5064,7 @@
         </p:blipFill>
         <p:spPr>
           <a:xfrm>
-            <a:off x="37217893" y="490770"/>
+            <a:off x="37481997" y="490770"/>
             <a:ext cx="5952003" cy="1376522"/>
           </a:xfrm>
           <a:prstGeom prst="rect">
@@ -5124,7 +5124,7 @@
         </p:blipFill>
         <p:spPr>
           <a:xfrm>
-            <a:off x="9372600" y="14740897"/>
+            <a:off x="8534400" y="14740897"/>
             <a:ext cx="1546726" cy="1546726"/>
           </a:xfrm>
           <a:prstGeom prst="rect">
@@ -5154,7 +5154,7 @@
         </p:blipFill>
         <p:spPr>
           <a:xfrm>
-            <a:off x="34800674" y="14740897"/>
+            <a:off x="33962474" y="14740897"/>
             <a:ext cx="1546726" cy="1546726"/>
           </a:xfrm>
           <a:prstGeom prst="rect">
@@ -5170,8 +5170,8 @@
         </p:nvSpPr>
         <p:spPr>
           <a:xfrm rot="16200000">
-            <a:off x="10329673" y="8199850"/>
-            <a:ext cx="9512092" cy="491523"/>
+            <a:off x="9869531" y="7637431"/>
+            <a:ext cx="8755985" cy="491523"/>
           </a:xfrm>
           <a:prstGeom prst="homePlate">
             <a:avLst/>
@@ -5211,8 +5211,8 @@
         </p:nvSpPr>
         <p:spPr>
           <a:xfrm rot="16200000">
-            <a:off x="9582910" y="8203660"/>
-            <a:ext cx="9519713" cy="491523"/>
+            <a:off x="9123071" y="7641543"/>
+            <a:ext cx="8763000" cy="491523"/>
           </a:xfrm>
           <a:prstGeom prst="homePlate">
             <a:avLst/>
@@ -5252,8 +5252,8 @@
         </p:nvSpPr>
         <p:spPr>
           <a:xfrm rot="16200000">
-            <a:off x="21910522" y="11964155"/>
-            <a:ext cx="3998234" cy="491523"/>
+            <a:off x="25403413" y="11463920"/>
+            <a:ext cx="4149797" cy="491523"/>
           </a:xfrm>
           <a:prstGeom prst="homePlate">
             <a:avLst/>
@@ -5293,8 +5293,8 @@
         </p:nvSpPr>
         <p:spPr>
           <a:xfrm rot="16200000">
-            <a:off x="13386394" y="9780259"/>
-            <a:ext cx="6336042" cy="491523"/>
+            <a:off x="12942535" y="9234125"/>
+            <a:ext cx="5547364" cy="491523"/>
           </a:xfrm>
           <a:prstGeom prst="homePlate">
             <a:avLst/>
@@ -5334,8 +5334,8 @@
         </p:nvSpPr>
         <p:spPr>
           <a:xfrm rot="16200000">
-            <a:off x="12643441" y="9787879"/>
-            <a:ext cx="6336042" cy="491523"/>
+            <a:off x="12199582" y="9241745"/>
+            <a:ext cx="5547364" cy="491523"/>
           </a:xfrm>
           <a:prstGeom prst="homePlate">
             <a:avLst/>
@@ -5375,8 +5375,8 @@
         </p:nvSpPr>
         <p:spPr>
           <a:xfrm rot="16200000">
-            <a:off x="15120112" y="7590508"/>
-            <a:ext cx="1440189" cy="584775"/>
+            <a:off x="14181507" y="7650113"/>
+            <a:ext cx="1640999" cy="584775"/>
           </a:xfrm>
           <a:prstGeom prst="rect">
             <a:avLst/>
@@ -5407,8 +5407,8 @@
         </p:nvSpPr>
         <p:spPr>
           <a:xfrm rot="16200000">
-            <a:off x="15877361" y="7590507"/>
-            <a:ext cx="1440187" cy="584775"/>
+            <a:off x="14938756" y="7650112"/>
+            <a:ext cx="1640997" cy="584775"/>
           </a:xfrm>
           <a:prstGeom prst="rect">
             <a:avLst/>
@@ -5439,8 +5439,8 @@
         </p:nvSpPr>
         <p:spPr>
           <a:xfrm rot="16200000">
-            <a:off x="14860754" y="9780259"/>
-            <a:ext cx="6336042" cy="491523"/>
+            <a:off x="14416895" y="9234125"/>
+            <a:ext cx="5547364" cy="491523"/>
           </a:xfrm>
           <a:prstGeom prst="homePlate">
             <a:avLst/>
@@ -5480,8 +5480,8 @@
         </p:nvSpPr>
         <p:spPr>
           <a:xfrm rot="16200000">
-            <a:off x="14117801" y="9787879"/>
-            <a:ext cx="6336042" cy="491523"/>
+            <a:off x="13673942" y="9241745"/>
+            <a:ext cx="5547364" cy="491523"/>
           </a:xfrm>
           <a:prstGeom prst="homePlate">
             <a:avLst/>
@@ -5521,8 +5521,8 @@
         </p:nvSpPr>
         <p:spPr>
           <a:xfrm rot="16200000">
-            <a:off x="16594474" y="7590509"/>
-            <a:ext cx="1440185" cy="584775"/>
+            <a:off x="15655869" y="7650114"/>
+            <a:ext cx="1640995" cy="584775"/>
           </a:xfrm>
           <a:prstGeom prst="rect">
             <a:avLst/>
@@ -5553,8 +5553,8 @@
         </p:nvSpPr>
         <p:spPr>
           <a:xfrm rot="16200000">
-            <a:off x="17351722" y="7590508"/>
-            <a:ext cx="1440182" cy="584775"/>
+            <a:off x="16413118" y="7650115"/>
+            <a:ext cx="1640991" cy="584775"/>
           </a:xfrm>
           <a:prstGeom prst="rect">
             <a:avLst/>
@@ -5585,8 +5585,8 @@
         </p:nvSpPr>
         <p:spPr>
           <a:xfrm rot="16200000">
-            <a:off x="21167569" y="11971775"/>
-            <a:ext cx="3998234" cy="491523"/>
+            <a:off x="24660460" y="11471540"/>
+            <a:ext cx="4149797" cy="491523"/>
           </a:xfrm>
           <a:prstGeom prst="homePlate">
             <a:avLst/>
@@ -5626,8 +5626,8 @@
         </p:nvSpPr>
         <p:spPr>
           <a:xfrm rot="16200000">
-            <a:off x="22636909" y="11975583"/>
-            <a:ext cx="3990618" cy="491523"/>
+            <a:off x="26129945" y="11475492"/>
+            <a:ext cx="4141892" cy="491523"/>
           </a:xfrm>
           <a:prstGeom prst="homePlate">
             <a:avLst/>
@@ -5667,8 +5667,8 @@
         </p:nvSpPr>
         <p:spPr>
           <a:xfrm>
-            <a:off x="6684214" y="12755940"/>
-            <a:ext cx="32409079" cy="1569660"/>
+            <a:off x="5846014" y="11811000"/>
+            <a:ext cx="32409079" cy="2554545"/>
           </a:xfrm>
           <a:prstGeom prst="rect">
             <a:avLst/>
@@ -5687,197 +5687,210 @@
             <a:r>
               <a:rPr lang="en-US" sz="3200" b="1" dirty="0">
                 <a:solidFill>
-                  <a:schemeClr val="bg1"/>
+                  <a:srgbClr val="FFFFFF"/>
                 </a:solidFill>
                 <a:highlight>
                   <a:srgbClr val="000000"/>
                 </a:highlight>
                 <a:latin typeface="Courier New" panose="02070309020205020404" pitchFamily="49" charset="0"/>
-                <a:cs typeface="Courier New" panose="02070309020205020404" pitchFamily="49" charset="0"/>
               </a:rPr>
               <a:t>04 80 16 1A</a:t>
             </a:r>
             <a:r>
               <a:rPr lang="en-US" sz="3200" b="1" dirty="0">
                 <a:solidFill>
-                  <a:schemeClr val="bg1"/>
+                  <a:srgbClr val="FFFFFF"/>
                 </a:solidFill>
                 <a:latin typeface="Courier New" panose="02070309020205020404" pitchFamily="49" charset="0"/>
-                <a:cs typeface="Courier New" panose="02070309020205020404" pitchFamily="49" charset="0"/>
               </a:rPr>
               <a:t> </a:t>
             </a:r>
             <a:r>
               <a:rPr lang="en-US" sz="3200" b="1" dirty="0">
                 <a:solidFill>
-                  <a:schemeClr val="bg1"/>
+                  <a:srgbClr val="FFFFFF"/>
                 </a:solidFill>
                 <a:highlight>
                   <a:srgbClr val="000000"/>
                 </a:highlight>
                 <a:latin typeface="Courier New" panose="02070309020205020404" pitchFamily="49" charset="0"/>
-                <a:cs typeface="Courier New" panose="02070309020205020404" pitchFamily="49" charset="0"/>
               </a:rPr>
               <a:t>52 A3 40 80</a:t>
             </a:r>
             <a:r>
               <a:rPr lang="en-US" sz="3200" b="1" dirty="0">
+                <a:solidFill>
+                  <a:srgbClr val="000000"/>
+                </a:solidFill>
                 <a:latin typeface="Courier New" panose="02070309020205020404" pitchFamily="49" charset="0"/>
-                <a:cs typeface="Courier New" panose="02070309020205020404" pitchFamily="49" charset="0"/>
               </a:rPr>
               <a:t> </a:t>
             </a:r>
             <a:r>
               <a:rPr lang="en-US" sz="3200" b="1" dirty="0">
                 <a:solidFill>
-                  <a:schemeClr val="bg1"/>
+                  <a:srgbClr val="FFFFFF"/>
                 </a:solidFill>
                 <a:highlight>
                   <a:srgbClr val="000000"/>
                 </a:highlight>
                 <a:latin typeface="Courier New" panose="02070309020205020404" pitchFamily="49" charset="0"/>
-                <a:cs typeface="Courier New" panose="02070309020205020404" pitchFamily="49" charset="0"/>
               </a:rPr>
               <a:t>31 48 </a:t>
             </a:r>
             <a:r>
               <a:rPr lang="fi-FI" sz="3200" b="1" dirty="0">
+                <a:solidFill>
+                  <a:srgbClr val="000000"/>
+                </a:solidFill>
                 <a:highlight>
                   <a:srgbClr val="FFFF00"/>
                 </a:highlight>
                 <a:latin typeface="Courier New" panose="02070309020205020404" pitchFamily="49" charset="0"/>
-                <a:cs typeface="Courier New" panose="02070309020205020404" pitchFamily="49" charset="0"/>
               </a:rPr>
               <a:t>00</a:t>
             </a:r>
             <a:r>
               <a:rPr lang="fi-FI" sz="3200" b="1" dirty="0">
                 <a:solidFill>
-                  <a:schemeClr val="bg1"/>
+                  <a:srgbClr val="FFFFFF"/>
                 </a:solidFill>
                 <a:highlight>
                   <a:srgbClr val="000000"/>
                 </a:highlight>
                 <a:latin typeface="Courier New" panose="02070309020205020404" pitchFamily="49" charset="0"/>
-                <a:cs typeface="Courier New" panose="02070309020205020404" pitchFamily="49" charset="0"/>
               </a:rPr>
               <a:t> </a:t>
             </a:r>
             <a:r>
               <a:rPr lang="fi-FI" sz="3200" b="1" dirty="0">
+                <a:solidFill>
+                  <a:srgbClr val="000000"/>
+                </a:solidFill>
                 <a:highlight>
                   <a:srgbClr val="FFFF00"/>
                 </a:highlight>
                 <a:latin typeface="Courier New" panose="02070309020205020404" pitchFamily="49" charset="0"/>
-                <a:cs typeface="Courier New" panose="02070309020205020404" pitchFamily="49" charset="0"/>
               </a:rPr>
               <a:t>00</a:t>
             </a:r>
             <a:r>
               <a:rPr lang="fi-FI" sz="3200" b="1" dirty="0">
                 <a:solidFill>
-                  <a:schemeClr val="bg1"/>
+                  <a:srgbClr val="FFFFFF"/>
                 </a:solidFill>
                 <a:latin typeface="Courier New" panose="02070309020205020404" pitchFamily="49" charset="0"/>
-                <a:cs typeface="Courier New" panose="02070309020205020404" pitchFamily="49" charset="0"/>
               </a:rPr>
               <a:t> </a:t>
             </a:r>
             <a:r>
               <a:rPr lang="en-US" sz="3200" b="1" dirty="0">
                 <a:solidFill>
-                  <a:schemeClr val="bg1"/>
+                  <a:srgbClr val="FFFFFF"/>
                 </a:solidFill>
                 <a:highlight>
                   <a:srgbClr val="FF0000"/>
                 </a:highlight>
                 <a:latin typeface="Courier New" panose="02070309020205020404" pitchFamily="49" charset="0"/>
-                <a:cs typeface="Courier New" panose="02070309020205020404" pitchFamily="49" charset="0"/>
               </a:rPr>
               <a:t>E1</a:t>
             </a:r>
             <a:r>
               <a:rPr lang="en-US" sz="3200" b="1" dirty="0">
                 <a:solidFill>
-                  <a:schemeClr val="bg1"/>
+                  <a:srgbClr val="FFFFFF"/>
                 </a:solidFill>
                 <a:highlight>
                   <a:srgbClr val="000000"/>
                 </a:highlight>
                 <a:latin typeface="Courier New" panose="02070309020205020404" pitchFamily="49" charset="0"/>
-                <a:cs typeface="Courier New" panose="02070309020205020404" pitchFamily="49" charset="0"/>
               </a:rPr>
               <a:t> </a:t>
             </a:r>
             <a:r>
               <a:rPr lang="en-US" sz="3200" b="1" dirty="0">
                 <a:solidFill>
-                  <a:schemeClr val="bg1"/>
+                  <a:srgbClr val="FFFFFF"/>
                 </a:solidFill>
                 <a:highlight>
                   <a:srgbClr val="FF0000"/>
                 </a:highlight>
                 <a:latin typeface="Courier New" panose="02070309020205020404" pitchFamily="49" charset="0"/>
-                <a:cs typeface="Courier New" panose="02070309020205020404" pitchFamily="49" charset="0"/>
               </a:rPr>
               <a:t>10</a:t>
             </a:r>
             <a:r>
               <a:rPr lang="en-US" sz="3200" b="1" dirty="0">
                 <a:solidFill>
-                  <a:schemeClr val="bg1"/>
+                  <a:srgbClr val="FFFFFF"/>
                 </a:solidFill>
                 <a:highlight>
                   <a:srgbClr val="000000"/>
                 </a:highlight>
                 <a:latin typeface="Courier New" panose="02070309020205020404" pitchFamily="49" charset="0"/>
-                <a:cs typeface="Courier New" panose="02070309020205020404" pitchFamily="49" charset="0"/>
               </a:rPr>
               <a:t> </a:t>
             </a:r>
             <a:r>
               <a:rPr lang="en-US" sz="3200" b="1" dirty="0">
                 <a:solidFill>
-                  <a:schemeClr val="bg1"/>
+                  <a:srgbClr val="FFFFFF"/>
                 </a:solidFill>
                 <a:highlight>
                   <a:srgbClr val="FF0000"/>
                 </a:highlight>
                 <a:latin typeface="Courier New" panose="02070309020205020404" pitchFamily="49" charset="0"/>
-                <a:cs typeface="Courier New" panose="02070309020205020404" pitchFamily="49" charset="0"/>
               </a:rPr>
               <a:t>12</a:t>
             </a:r>
             <a:r>
               <a:rPr lang="en-US" sz="3200" b="1" dirty="0">
                 <a:solidFill>
-                  <a:schemeClr val="bg1"/>
+                  <a:srgbClr val="FFFFFF"/>
                 </a:solidFill>
                 <a:highlight>
                   <a:srgbClr val="000000"/>
                 </a:highlight>
                 <a:latin typeface="Courier New" panose="02070309020205020404" pitchFamily="49" charset="0"/>
-                <a:cs typeface="Courier New" panose="02070309020205020404" pitchFamily="49" charset="0"/>
               </a:rPr>
               <a:t> </a:t>
             </a:r>
             <a:r>
               <a:rPr lang="en-US" sz="3200" b="1" dirty="0">
                 <a:solidFill>
-                  <a:schemeClr val="bg1"/>
+                  <a:srgbClr val="FFFFFF"/>
                 </a:solidFill>
                 <a:highlight>
                   <a:srgbClr val="FF0000"/>
                 </a:highlight>
                 <a:latin typeface="Courier New" panose="02070309020205020404" pitchFamily="49" charset="0"/>
-                <a:cs typeface="Courier New" panose="02070309020205020404" pitchFamily="49" charset="0"/>
               </a:rPr>
               <a:t>00</a:t>
             </a:r>
             <a:r>
+              <a:rPr lang="en-US" sz="3200" b="1" dirty="0">
+                <a:solidFill>
+                  <a:srgbClr val="000000"/>
+                </a:solidFill>
+                <a:latin typeface="Courier New" panose="02070309020205020404" pitchFamily="49" charset="0"/>
+              </a:rPr>
+              <a:t> </a:t>
+            </a:r>
+            <a:r>
               <a:rPr lang="fi-FI" sz="3200" b="1" dirty="0">
+                <a:solidFill>
+                  <a:srgbClr val="00B0F0"/>
+                </a:solidFill>
                 <a:latin typeface="Courier New" panose="02070309020205020404" pitchFamily="49" charset="0"/>
-                <a:cs typeface="Courier New" panose="02070309020205020404" pitchFamily="49" charset="0"/>
+              </a:rPr>
+              <a:t>01 03 A0 0C 34 03 00 FE 00 00 00 00 00 00 00 00 00 00 00 00 00 00 00 00 00 00 00 00 00 00 00 00 00 00 00 00 00 00 00 00 00 00 00 00 00 00 00 00 00 00 00 00 00 00 00 00 00 00 00 00 00 00 00 00 00 00 00 00 00 00 00 00 00 00 00 00 00 00 00 00 00 00 00 00 00 00 00 00 00 00 00 00 00 00 00 00 00 00 00 00 00 00 00 00 00 00 00</a:t>
+            </a:r>
+            <a:r>
+              <a:rPr lang="fi-FI" sz="3200" b="1" dirty="0">
+                <a:solidFill>
+                  <a:srgbClr val="000000"/>
+                </a:solidFill>
+                <a:latin typeface="Courier New" panose="02070309020205020404" pitchFamily="49" charset="0"/>
               </a:rPr>
               <a:t> </a:t>
             </a:r>
@@ -5887,181 +5900,229 @@
                   <a:srgbClr val="00B0F0"/>
                 </a:solidFill>
                 <a:latin typeface="Courier New" panose="02070309020205020404" pitchFamily="49" charset="0"/>
-                <a:cs typeface="Courier New" panose="02070309020205020404" pitchFamily="49" charset="0"/>
-              </a:rPr>
-              <a:t>AA AA AA AA AA AA AA AA AA AA AA AA AA AA AA AA AA AA AA AA AA AA AA AA AA AA AA AA AA AA AA AA AA AA AA AA AA AA AA AA AA AA AA AA AA AA AA AA AA AA AA AA AA AA AA AA AA AA AA AA AA AA AA AA AA AA AA AA AA AA AA AA AA AA AA AA AA AA AA AA AA AA AA AA AA AA AA AA AA AA AA AA AA AA</a:t>
+              </a:rPr>
+              <a:t>00 00 00 00 00 00 00 00 00 00 00 00 00 00 00 00 00 00 00 00 00 00 00 00 00 00 00 00 00 00 00 00 00 00 00 00 00 </a:t>
             </a:r>
             <a:r>
               <a:rPr lang="fi-FI" sz="3200" b="1" dirty="0">
-                <a:latin typeface="Courier New" panose="02070309020205020404" pitchFamily="49" charset="0"/>
-                <a:cs typeface="Courier New" panose="02070309020205020404" pitchFamily="49" charset="0"/>
-              </a:rPr>
-              <a:t> </a:t>
-            </a:r>
-            <a:r>
-              <a:rPr lang="fi-FI" sz="3200" b="1" dirty="0">
+                <a:solidFill>
+                  <a:srgbClr val="000000"/>
+                </a:solidFill>
                 <a:highlight>
                   <a:srgbClr val="FFFF00"/>
                 </a:highlight>
                 <a:latin typeface="Courier New" panose="02070309020205020404" pitchFamily="49" charset="0"/>
-                <a:cs typeface="Courier New" panose="02070309020205020404" pitchFamily="49" charset="0"/>
               </a:rPr>
               <a:t>00</a:t>
             </a:r>
             <a:r>
               <a:rPr lang="fi-FI" sz="3200" b="1" dirty="0">
+                <a:solidFill>
+                  <a:srgbClr val="000000"/>
+                </a:solidFill>
                 <a:highlight>
                   <a:srgbClr val="000000"/>
                 </a:highlight>
                 <a:latin typeface="Courier New" panose="02070309020205020404" pitchFamily="49" charset="0"/>
-                <a:cs typeface="Courier New" panose="02070309020205020404" pitchFamily="49" charset="0"/>
               </a:rPr>
               <a:t> </a:t>
             </a:r>
             <a:r>
               <a:rPr lang="fi-FI" sz="3200" b="1" dirty="0">
+                <a:solidFill>
+                  <a:srgbClr val="000000"/>
+                </a:solidFill>
                 <a:highlight>
                   <a:srgbClr val="FFFF00"/>
                 </a:highlight>
                 <a:latin typeface="Courier New" panose="02070309020205020404" pitchFamily="49" charset="0"/>
-                <a:cs typeface="Courier New" panose="02070309020205020404" pitchFamily="49" charset="0"/>
               </a:rPr>
               <a:t>00</a:t>
             </a:r>
             <a:r>
               <a:rPr lang="fi-FI" sz="3200" b="1" dirty="0">
+                <a:solidFill>
+                  <a:srgbClr val="000000"/>
+                </a:solidFill>
                 <a:highlight>
                   <a:srgbClr val="000000"/>
                 </a:highlight>
                 <a:latin typeface="Courier New" panose="02070309020205020404" pitchFamily="49" charset="0"/>
-                <a:cs typeface="Courier New" panose="02070309020205020404" pitchFamily="49" charset="0"/>
               </a:rPr>
               <a:t> </a:t>
             </a:r>
             <a:r>
               <a:rPr lang="fi-FI" sz="3200" b="1" dirty="0">
+                <a:solidFill>
+                  <a:srgbClr val="000000"/>
+                </a:solidFill>
                 <a:highlight>
                   <a:srgbClr val="FFFF00"/>
                 </a:highlight>
                 <a:latin typeface="Courier New" panose="02070309020205020404" pitchFamily="49" charset="0"/>
-                <a:cs typeface="Courier New" panose="02070309020205020404" pitchFamily="49" charset="0"/>
               </a:rPr>
               <a:t>00</a:t>
             </a:r>
             <a:r>
               <a:rPr lang="fi-FI" sz="3200" b="1" dirty="0">
                 <a:solidFill>
-                  <a:schemeClr val="bg1"/>
+                  <a:srgbClr val="FFFFFF"/>
                 </a:solidFill>
                 <a:highlight>
                   <a:srgbClr val="000000"/>
                 </a:highlight>
                 <a:latin typeface="Courier New" panose="02070309020205020404" pitchFamily="49" charset="0"/>
-                <a:cs typeface="Courier New" panose="02070309020205020404" pitchFamily="49" charset="0"/>
               </a:rPr>
               <a:t> BD</a:t>
             </a:r>
             <a:r>
               <a:rPr lang="fi-FI" sz="3200" b="1" dirty="0">
                 <a:solidFill>
-                  <a:schemeClr val="bg1"/>
+                  <a:srgbClr val="FFFFFF"/>
                 </a:solidFill>
                 <a:latin typeface="Courier New" panose="02070309020205020404" pitchFamily="49" charset="0"/>
-                <a:cs typeface="Courier New" panose="02070309020205020404" pitchFamily="49" charset="0"/>
               </a:rPr>
               <a:t> </a:t>
             </a:r>
             <a:r>
               <a:rPr lang="en-US" sz="3200" b="1" dirty="0">
                 <a:solidFill>
-                  <a:schemeClr val="bg1"/>
+                  <a:srgbClr val="FFFFFF"/>
                 </a:solidFill>
                 <a:highlight>
                   <a:srgbClr val="000000"/>
                 </a:highlight>
                 <a:latin typeface="Courier New" panose="02070309020205020404" pitchFamily="49" charset="0"/>
-                <a:cs typeface="Courier New" panose="02070309020205020404" pitchFamily="49" charset="0"/>
               </a:rPr>
               <a:t>04 00 00 FF</a:t>
             </a:r>
             <a:r>
-              <a:rPr lang="fi-FI" sz="3200" b="1" dirty="0">
-                <a:solidFill>
-                  <a:schemeClr val="bg1"/>
+              <a:rPr lang="en-US" sz="3200" b="1" dirty="0">
+                <a:solidFill>
+                  <a:srgbClr val="FFFFFF"/>
                 </a:solidFill>
                 <a:latin typeface="Courier New" panose="02070309020205020404" pitchFamily="49" charset="0"/>
-                <a:cs typeface="Courier New" panose="02070309020205020404" pitchFamily="49" charset="0"/>
               </a:rPr>
               <a:t> </a:t>
             </a:r>
             <a:r>
               <a:rPr lang="en-US" sz="3200" b="1" dirty="0">
                 <a:solidFill>
-                  <a:schemeClr val="bg1"/>
+                  <a:srgbClr val="FFFFFF"/>
                 </a:solidFill>
                 <a:highlight>
                   <a:srgbClr val="000000"/>
                 </a:highlight>
                 <a:latin typeface="Courier New" panose="02070309020205020404" pitchFamily="49" charset="0"/>
-                <a:cs typeface="Courier New" panose="02070309020205020404" pitchFamily="49" charset="0"/>
               </a:rPr>
               <a:t>00 05 -- --</a:t>
             </a:r>
             <a:r>
-              <a:rPr lang="fi-FI" sz="3200" b="1" dirty="0">
-                <a:solidFill>
-                  <a:schemeClr val="bg1"/>
+              <a:rPr lang="en-US" sz="3200" b="1" dirty="0">
+                <a:solidFill>
+                  <a:srgbClr val="FFFFFF"/>
                 </a:solidFill>
                 <a:latin typeface="Courier New" panose="02070309020205020404" pitchFamily="49" charset="0"/>
-                <a:cs typeface="Courier New" panose="02070309020205020404" pitchFamily="49" charset="0"/>
               </a:rPr>
               <a:t> </a:t>
             </a:r>
             <a:r>
               <a:rPr lang="en-US" sz="3200" b="1" dirty="0">
                 <a:solidFill>
-                  <a:schemeClr val="bg1"/>
+                  <a:srgbClr val="FFFFFF"/>
                 </a:solidFill>
                 <a:highlight>
                   <a:srgbClr val="000000"/>
                 </a:highlight>
                 <a:latin typeface="Courier New" panose="02070309020205020404" pitchFamily="49" charset="0"/>
-                <a:cs typeface="Courier New" panose="02070309020205020404" pitchFamily="49" charset="0"/>
-              </a:rPr>
-              <a:t>FF FF FF FF</a:t>
-            </a:r>
-            <a:r>
-              <a:rPr lang="fi-FI" sz="3200" b="1" dirty="0">
-                <a:solidFill>
-                  <a:schemeClr val="bg1"/>
-                </a:solidFill>
-                <a:latin typeface="Courier New" panose="02070309020205020404" pitchFamily="49" charset="0"/>
-                <a:cs typeface="Courier New" panose="02070309020205020404" pitchFamily="49" charset="0"/>
-              </a:rPr>
-              <a:t> </a:t>
-            </a:r>
-            <a:r>
-              <a:rPr lang="en-US" sz="3200" b="1" dirty="0">
-                <a:solidFill>
-                  <a:schemeClr val="bg1"/>
+              </a:rPr>
+              <a:t>FF </a:t>
+            </a:r>
+            <a:r>
+              <a:rPr lang="en-US" sz="3200" b="1" dirty="0" err="1">
+                <a:solidFill>
+                  <a:srgbClr val="FFFFFF"/>
                 </a:solidFill>
                 <a:highlight>
                   <a:srgbClr val="000000"/>
                 </a:highlight>
                 <a:latin typeface="Courier New" panose="02070309020205020404" pitchFamily="49" charset="0"/>
-                <a:cs typeface="Courier New" panose="02070309020205020404" pitchFamily="49" charset="0"/>
+              </a:rPr>
+              <a:t>FF</a:t>
+            </a:r>
+            <a:r>
+              <a:rPr lang="en-US" sz="3200" b="1" dirty="0">
+                <a:solidFill>
+                  <a:srgbClr val="FFFFFF"/>
+                </a:solidFill>
+                <a:highlight>
+                  <a:srgbClr val="000000"/>
+                </a:highlight>
+                <a:latin typeface="Courier New" panose="02070309020205020404" pitchFamily="49" charset="0"/>
+              </a:rPr>
+              <a:t> </a:t>
+            </a:r>
+            <a:r>
+              <a:rPr lang="en-US" sz="3200" b="1" dirty="0" err="1">
+                <a:solidFill>
+                  <a:srgbClr val="FFFFFF"/>
+                </a:solidFill>
+                <a:highlight>
+                  <a:srgbClr val="000000"/>
+                </a:highlight>
+                <a:latin typeface="Courier New" panose="02070309020205020404" pitchFamily="49" charset="0"/>
+              </a:rPr>
+              <a:t>FF</a:t>
+            </a:r>
+            <a:r>
+              <a:rPr lang="en-US" sz="3200" b="1" dirty="0">
+                <a:solidFill>
+                  <a:srgbClr val="FFFFFF"/>
+                </a:solidFill>
+                <a:highlight>
+                  <a:srgbClr val="000000"/>
+                </a:highlight>
+                <a:latin typeface="Courier New" panose="02070309020205020404" pitchFamily="49" charset="0"/>
+              </a:rPr>
+              <a:t> </a:t>
+            </a:r>
+            <a:r>
+              <a:rPr lang="en-US" sz="3200" b="1" dirty="0" err="1">
+                <a:solidFill>
+                  <a:srgbClr val="FFFFFF"/>
+                </a:solidFill>
+                <a:highlight>
+                  <a:srgbClr val="000000"/>
+                </a:highlight>
+                <a:latin typeface="Courier New" panose="02070309020205020404" pitchFamily="49" charset="0"/>
+              </a:rPr>
+              <a:t>FF</a:t>
+            </a:r>
+            <a:r>
+              <a:rPr lang="en-US" sz="3200" b="1" dirty="0">
+                <a:solidFill>
+                  <a:srgbClr val="FFFFFF"/>
+                </a:solidFill>
+                <a:latin typeface="Courier New" panose="02070309020205020404" pitchFamily="49" charset="0"/>
+              </a:rPr>
+              <a:t> </a:t>
+            </a:r>
+            <a:r>
+              <a:rPr lang="en-US" sz="3200" b="1" dirty="0">
+                <a:solidFill>
+                  <a:srgbClr val="FFFFFF"/>
+                </a:solidFill>
+                <a:highlight>
+                  <a:srgbClr val="000000"/>
+                </a:highlight>
+                <a:latin typeface="Courier New" panose="02070309020205020404" pitchFamily="49" charset="0"/>
               </a:rPr>
               <a:t>00 00 -- -- </a:t>
             </a:r>
-            <a:endParaRPr lang="en-US" sz="3200" b="1" dirty="0">
-              <a:solidFill>
-                <a:schemeClr val="bg1"/>
-              </a:solidFill>
-              <a:highlight>
-                <a:srgbClr val="000080"/>
-              </a:highlight>
-              <a:latin typeface="Courier New" panose="02070309020205020404" pitchFamily="49" charset="0"/>
-              <a:cs typeface="Courier New" panose="02070309020205020404" pitchFamily="49" charset="0"/>
+            <a:endParaRPr lang="en-US" sz="1200" dirty="0">
+              <a:effectLst/>
+              <a:latin typeface="Times New Roman" panose="02020603050405020304" pitchFamily="18" charset="0"/>
+              <a:ea typeface="Times New Roman" panose="02020603050405020304" pitchFamily="18" charset="0"/>
             </a:endParaRPr>
           </a:p>
         </p:txBody>
@@ -6074,8 +6135,8 @@
         </p:nvSpPr>
         <p:spPr>
           <a:xfrm rot="16200000">
-            <a:off x="13466468" y="4546312"/>
-            <a:ext cx="1752597" cy="584775"/>
+            <a:off x="12454781" y="4643600"/>
+            <a:ext cx="2099574" cy="584775"/>
           </a:xfrm>
           <a:prstGeom prst="rect">
             <a:avLst/>
@@ -6106,8 +6167,8 @@
         </p:nvSpPr>
         <p:spPr>
           <a:xfrm rot="16200000">
-            <a:off x="14223716" y="4546312"/>
-            <a:ext cx="1752597" cy="584775"/>
+            <a:off x="13212029" y="4643600"/>
+            <a:ext cx="2099574" cy="584775"/>
           </a:xfrm>
           <a:prstGeom prst="rect">
             <a:avLst/>
@@ -6138,8 +6199,8 @@
         </p:nvSpPr>
         <p:spPr>
           <a:xfrm rot="16200000">
-            <a:off x="22161656" y="10954730"/>
-            <a:ext cx="2042162" cy="584775"/>
+            <a:off x="25691621" y="10216201"/>
+            <a:ext cx="2119575" cy="584775"/>
           </a:xfrm>
           <a:prstGeom prst="rect">
             <a:avLst/>
@@ -6170,8 +6231,8 @@
         </p:nvSpPr>
         <p:spPr>
           <a:xfrm rot="16200000">
-            <a:off x="22894082" y="10954730"/>
-            <a:ext cx="2042162" cy="584775"/>
+            <a:off x="26424047" y="10216201"/>
+            <a:ext cx="2119575" cy="584775"/>
           </a:xfrm>
           <a:prstGeom prst="rect">
             <a:avLst/>
@@ -6202,8 +6263,8 @@
         </p:nvSpPr>
         <p:spPr>
           <a:xfrm rot="5400000">
-            <a:off x="23201513" y="19117066"/>
-            <a:ext cx="3064054" cy="491523"/>
+            <a:off x="26679688" y="19767416"/>
+            <a:ext cx="3270501" cy="491523"/>
           </a:xfrm>
           <a:prstGeom prst="homePlate">
             <a:avLst/>
@@ -6243,8 +6304,8 @@
         </p:nvSpPr>
         <p:spPr>
           <a:xfrm rot="5400000">
-            <a:off x="22462465" y="19120781"/>
-            <a:ext cx="3056244" cy="491523"/>
+            <a:off x="25940903" y="19770868"/>
+            <a:ext cx="3262165" cy="491523"/>
           </a:xfrm>
           <a:prstGeom prst="homePlate">
             <a:avLst/>
@@ -6284,8 +6345,8 @@
         </p:nvSpPr>
         <p:spPr>
           <a:xfrm rot="5400000">
-            <a:off x="13933571" y="18642164"/>
-            <a:ext cx="3998234" cy="491523"/>
+            <a:off x="12715035" y="19022499"/>
+            <a:ext cx="4758903" cy="491523"/>
           </a:xfrm>
           <a:prstGeom prst="homePlate">
             <a:avLst/>
@@ -6325,8 +6386,8 @@
         </p:nvSpPr>
         <p:spPr>
           <a:xfrm rot="5400000">
-            <a:off x="13190618" y="18649784"/>
-            <a:ext cx="3998234" cy="491523"/>
+            <a:off x="11979346" y="19022854"/>
+            <a:ext cx="4744373" cy="491523"/>
           </a:xfrm>
           <a:prstGeom prst="homePlate">
             <a:avLst/>
@@ -6366,7 +6427,7 @@
         </p:nvSpPr>
         <p:spPr>
           <a:xfrm rot="5400000">
-            <a:off x="23099314" y="19428060"/>
+            <a:off x="26680714" y="20220765"/>
             <a:ext cx="1798095" cy="584775"/>
           </a:xfrm>
           <a:prstGeom prst="rect">
@@ -6398,7 +6459,7 @@
         </p:nvSpPr>
         <p:spPr>
           <a:xfrm rot="5400000">
-            <a:off x="23831741" y="19428059"/>
+            <a:off x="27413141" y="20220764"/>
             <a:ext cx="1798092" cy="584775"/>
           </a:xfrm>
           <a:prstGeom prst="rect">
@@ -6430,7 +6491,7 @@
         </p:nvSpPr>
         <p:spPr>
           <a:xfrm rot="5400000">
-            <a:off x="14293733" y="19335292"/>
+            <a:off x="13455533" y="20127997"/>
             <a:ext cx="1764958" cy="584775"/>
           </a:xfrm>
           <a:prstGeom prst="rect">
@@ -6462,7 +6523,7 @@
         </p:nvSpPr>
         <p:spPr>
           <a:xfrm rot="5400000">
-            <a:off x="15055734" y="19335291"/>
+            <a:off x="14217534" y="20127996"/>
             <a:ext cx="1764956" cy="584775"/>
           </a:xfrm>
           <a:prstGeom prst="rect">
@@ -6494,8 +6555,8 @@
         </p:nvSpPr>
         <p:spPr>
           <a:xfrm rot="5400000">
-            <a:off x="15370529" y="18618401"/>
-            <a:ext cx="4045761" cy="491523"/>
+            <a:off x="14177477" y="19011424"/>
+            <a:ext cx="4751993" cy="491523"/>
           </a:xfrm>
           <a:prstGeom prst="homePlate">
             <a:avLst/>
@@ -6535,8 +6596,8 @@
         </p:nvSpPr>
         <p:spPr>
           <a:xfrm rot="5400000">
-            <a:off x="14627576" y="18626021"/>
-            <a:ext cx="4045761" cy="491523"/>
+            <a:off x="13434524" y="19019044"/>
+            <a:ext cx="4751993" cy="491523"/>
           </a:xfrm>
           <a:prstGeom prst="homePlate">
             <a:avLst/>
@@ -6576,8 +6637,8 @@
         </p:nvSpPr>
         <p:spPr>
           <a:xfrm rot="5400000">
-            <a:off x="15913388" y="19443413"/>
-            <a:ext cx="1371600" cy="584775"/>
+            <a:off x="15012606" y="19992166"/>
+            <a:ext cx="1493293" cy="584775"/>
           </a:xfrm>
           <a:prstGeom prst="rect">
             <a:avLst/>
@@ -6608,8 +6669,8 @@
         </p:nvSpPr>
         <p:spPr>
           <a:xfrm rot="5400000">
-            <a:off x="16670636" y="19443413"/>
-            <a:ext cx="1371600" cy="584775"/>
+            <a:off x="15777246" y="19912042"/>
+            <a:ext cx="1478511" cy="584775"/>
           </a:xfrm>
           <a:prstGeom prst="rect">
             <a:avLst/>
@@ -6640,8 +6701,8 @@
         </p:nvSpPr>
         <p:spPr>
           <a:xfrm rot="5400000">
-            <a:off x="16844889" y="18618401"/>
-            <a:ext cx="4045761" cy="491523"/>
+            <a:off x="15651838" y="19011424"/>
+            <a:ext cx="4751994" cy="491523"/>
           </a:xfrm>
           <a:prstGeom prst="homePlate">
             <a:avLst/>
@@ -6681,8 +6742,8 @@
         </p:nvSpPr>
         <p:spPr>
           <a:xfrm rot="5400000">
-            <a:off x="16101936" y="18626021"/>
-            <a:ext cx="4045761" cy="491523"/>
+            <a:off x="14908884" y="19019044"/>
+            <a:ext cx="4751993" cy="491523"/>
           </a:xfrm>
           <a:prstGeom prst="homePlate">
             <a:avLst/>
@@ -6722,8 +6783,8 @@
         </p:nvSpPr>
         <p:spPr>
           <a:xfrm rot="5400000">
-            <a:off x="17387748" y="19443413"/>
-            <a:ext cx="1371600" cy="584775"/>
+            <a:off x="16494358" y="19912042"/>
+            <a:ext cx="1478511" cy="584775"/>
           </a:xfrm>
           <a:prstGeom prst="rect">
             <a:avLst/>
@@ -6754,8 +6815,8 @@
         </p:nvSpPr>
         <p:spPr>
           <a:xfrm rot="5400000">
-            <a:off x="18144996" y="19443413"/>
-            <a:ext cx="1371600" cy="584775"/>
+            <a:off x="17251606" y="19912042"/>
+            <a:ext cx="1478511" cy="584775"/>
           </a:xfrm>
           <a:prstGeom prst="rect">
             <a:avLst/>
@@ -6786,8 +6847,8 @@
         </p:nvSpPr>
         <p:spPr>
           <a:xfrm rot="5400000">
-            <a:off x="23926452" y="19117063"/>
-            <a:ext cx="3064050" cy="491523"/>
+            <a:off x="27404628" y="19767414"/>
+            <a:ext cx="3270498" cy="491523"/>
           </a:xfrm>
           <a:prstGeom prst="homePlate">
             <a:avLst/>
@@ -6827,8 +6888,8 @@
         </p:nvSpPr>
         <p:spPr>
           <a:xfrm>
-            <a:off x="7526256" y="16794540"/>
-            <a:ext cx="32409079" cy="1569660"/>
+            <a:off x="6688056" y="16794540"/>
+            <a:ext cx="32409079" cy="2554545"/>
           </a:xfrm>
           <a:prstGeom prst="rect">
             <a:avLst/>
@@ -6847,364 +6908,437 @@
             <a:r>
               <a:rPr lang="en-US" sz="3200" b="1" dirty="0">
                 <a:solidFill>
-                  <a:schemeClr val="bg1"/>
+                  <a:srgbClr val="FFFFFF"/>
                 </a:solidFill>
                 <a:highlight>
                   <a:srgbClr val="000000"/>
                 </a:highlight>
                 <a:latin typeface="Courier New" panose="02070309020205020404" pitchFamily="49" charset="0"/>
-                <a:cs typeface="Courier New" panose="02070309020205020404" pitchFamily="49" charset="0"/>
-              </a:rPr>
-              <a:t>04 80 16 1A</a:t>
+              </a:rPr>
+              <a:t>04 34 CB 73</a:t>
             </a:r>
             <a:r>
               <a:rPr lang="en-US" sz="3200" b="1" dirty="0">
                 <a:solidFill>
-                  <a:schemeClr val="bg1"/>
+                  <a:srgbClr val="FFFFFF"/>
                 </a:solidFill>
                 <a:latin typeface="Courier New" panose="02070309020205020404" pitchFamily="49" charset="0"/>
-                <a:cs typeface="Courier New" panose="02070309020205020404" pitchFamily="49" charset="0"/>
               </a:rPr>
               <a:t> </a:t>
             </a:r>
             <a:r>
               <a:rPr lang="en-US" sz="3200" b="1" dirty="0">
                 <a:solidFill>
-                  <a:schemeClr val="bg1"/>
+                  <a:srgbClr val="FFFFFF"/>
                 </a:solidFill>
                 <a:highlight>
                   <a:srgbClr val="000000"/>
                 </a:highlight>
                 <a:latin typeface="Courier New" panose="02070309020205020404" pitchFamily="49" charset="0"/>
-                <a:cs typeface="Courier New" panose="02070309020205020404" pitchFamily="49" charset="0"/>
-              </a:rPr>
-              <a:t>52 A3 40 80</a:t>
+              </a:rPr>
+              <a:t>2A 74 40 81</a:t>
             </a:r>
             <a:r>
               <a:rPr lang="en-US" sz="3200" b="1" dirty="0">
+                <a:solidFill>
+                  <a:srgbClr val="000000"/>
+                </a:solidFill>
                 <a:latin typeface="Courier New" panose="02070309020205020404" pitchFamily="49" charset="0"/>
-                <a:cs typeface="Courier New" panose="02070309020205020404" pitchFamily="49" charset="0"/>
               </a:rPr>
               <a:t> </a:t>
             </a:r>
             <a:r>
               <a:rPr lang="en-US" sz="3200" b="1" dirty="0">
                 <a:solidFill>
-                  <a:schemeClr val="bg1"/>
+                  <a:srgbClr val="FFFFFF"/>
                 </a:solidFill>
                 <a:highlight>
                   <a:srgbClr val="000000"/>
                 </a:highlight>
                 <a:latin typeface="Courier New" panose="02070309020205020404" pitchFamily="49" charset="0"/>
-                <a:cs typeface="Courier New" panose="02070309020205020404" pitchFamily="49" charset="0"/>
-              </a:rPr>
-              <a:t>31 48 </a:t>
+              </a:rPr>
+              <a:t>9F 48 </a:t>
             </a:r>
             <a:r>
               <a:rPr lang="fi-FI" sz="3200" b="1" dirty="0">
+                <a:solidFill>
+                  <a:srgbClr val="000000"/>
+                </a:solidFill>
                 <a:highlight>
                   <a:srgbClr val="FFFF00"/>
                 </a:highlight>
                 <a:latin typeface="Courier New" panose="02070309020205020404" pitchFamily="49" charset="0"/>
-                <a:cs typeface="Courier New" panose="02070309020205020404" pitchFamily="49" charset="0"/>
               </a:rPr>
               <a:t>00</a:t>
             </a:r>
             <a:r>
               <a:rPr lang="fi-FI" sz="3200" b="1" dirty="0">
                 <a:solidFill>
-                  <a:schemeClr val="bg1"/>
+                  <a:srgbClr val="FFFFFF"/>
                 </a:solidFill>
                 <a:highlight>
                   <a:srgbClr val="000000"/>
                 </a:highlight>
                 <a:latin typeface="Courier New" panose="02070309020205020404" pitchFamily="49" charset="0"/>
-                <a:cs typeface="Courier New" panose="02070309020205020404" pitchFamily="49" charset="0"/>
               </a:rPr>
               <a:t> </a:t>
             </a:r>
             <a:r>
               <a:rPr lang="fi-FI" sz="3200" b="1" dirty="0">
+                <a:solidFill>
+                  <a:srgbClr val="000000"/>
+                </a:solidFill>
                 <a:highlight>
                   <a:srgbClr val="FFFF00"/>
                 </a:highlight>
                 <a:latin typeface="Courier New" panose="02070309020205020404" pitchFamily="49" charset="0"/>
-                <a:cs typeface="Courier New" panose="02070309020205020404" pitchFamily="49" charset="0"/>
               </a:rPr>
               <a:t>00</a:t>
             </a:r>
             <a:r>
               <a:rPr lang="fi-FI" sz="3200" b="1" dirty="0">
                 <a:solidFill>
-                  <a:schemeClr val="bg1"/>
+                  <a:srgbClr val="FFFFFF"/>
                 </a:solidFill>
                 <a:latin typeface="Courier New" panose="02070309020205020404" pitchFamily="49" charset="0"/>
-                <a:cs typeface="Courier New" panose="02070309020205020404" pitchFamily="49" charset="0"/>
               </a:rPr>
               <a:t> </a:t>
             </a:r>
             <a:r>
               <a:rPr lang="en-US" sz="3200" b="1" dirty="0">
                 <a:solidFill>
-                  <a:schemeClr val="bg1"/>
+                  <a:srgbClr val="FFFFFF"/>
                 </a:solidFill>
                 <a:highlight>
                   <a:srgbClr val="FF0000"/>
                 </a:highlight>
                 <a:latin typeface="Courier New" panose="02070309020205020404" pitchFamily="49" charset="0"/>
-                <a:cs typeface="Courier New" panose="02070309020205020404" pitchFamily="49" charset="0"/>
               </a:rPr>
               <a:t>E1</a:t>
             </a:r>
             <a:r>
               <a:rPr lang="en-US" sz="3200" b="1" dirty="0">
                 <a:solidFill>
-                  <a:schemeClr val="bg1"/>
+                  <a:srgbClr val="FFFFFF"/>
                 </a:solidFill>
                 <a:highlight>
                   <a:srgbClr val="000000"/>
                 </a:highlight>
                 <a:latin typeface="Courier New" panose="02070309020205020404" pitchFamily="49" charset="0"/>
-                <a:cs typeface="Courier New" panose="02070309020205020404" pitchFamily="49" charset="0"/>
               </a:rPr>
               <a:t> </a:t>
             </a:r>
             <a:r>
               <a:rPr lang="en-US" sz="3200" b="1" dirty="0">
                 <a:solidFill>
-                  <a:schemeClr val="bg1"/>
+                  <a:srgbClr val="FFFFFF"/>
                 </a:solidFill>
                 <a:highlight>
                   <a:srgbClr val="FF0000"/>
                 </a:highlight>
                 <a:latin typeface="Courier New" panose="02070309020205020404" pitchFamily="49" charset="0"/>
-                <a:cs typeface="Courier New" panose="02070309020205020404" pitchFamily="49" charset="0"/>
               </a:rPr>
               <a:t>10</a:t>
             </a:r>
             <a:r>
               <a:rPr lang="en-US" sz="3200" b="1" dirty="0">
                 <a:solidFill>
-                  <a:schemeClr val="bg1"/>
+                  <a:srgbClr val="FFFFFF"/>
                 </a:solidFill>
                 <a:highlight>
                   <a:srgbClr val="000000"/>
                 </a:highlight>
                 <a:latin typeface="Courier New" panose="02070309020205020404" pitchFamily="49" charset="0"/>
-                <a:cs typeface="Courier New" panose="02070309020205020404" pitchFamily="49" charset="0"/>
               </a:rPr>
               <a:t> </a:t>
             </a:r>
             <a:r>
               <a:rPr lang="en-US" sz="3200" b="1" dirty="0">
                 <a:solidFill>
-                  <a:schemeClr val="bg1"/>
+                  <a:srgbClr val="FFFFFF"/>
                 </a:solidFill>
                 <a:highlight>
                   <a:srgbClr val="FF0000"/>
                 </a:highlight>
                 <a:latin typeface="Courier New" panose="02070309020205020404" pitchFamily="49" charset="0"/>
-                <a:cs typeface="Courier New" panose="02070309020205020404" pitchFamily="49" charset="0"/>
               </a:rPr>
               <a:t>12</a:t>
             </a:r>
             <a:r>
               <a:rPr lang="en-US" sz="3200" b="1" dirty="0">
                 <a:solidFill>
-                  <a:schemeClr val="bg1"/>
+                  <a:srgbClr val="FFFFFF"/>
                 </a:solidFill>
                 <a:highlight>
                   <a:srgbClr val="000000"/>
                 </a:highlight>
                 <a:latin typeface="Courier New" panose="02070309020205020404" pitchFamily="49" charset="0"/>
-                <a:cs typeface="Courier New" panose="02070309020205020404" pitchFamily="49" charset="0"/>
               </a:rPr>
               <a:t> </a:t>
             </a:r>
             <a:r>
               <a:rPr lang="en-US" sz="3200" b="1" dirty="0">
                 <a:solidFill>
-                  <a:schemeClr val="bg1"/>
+                  <a:srgbClr val="FFFFFF"/>
                 </a:solidFill>
                 <a:highlight>
                   <a:srgbClr val="FF0000"/>
                 </a:highlight>
                 <a:latin typeface="Courier New" panose="02070309020205020404" pitchFamily="49" charset="0"/>
-                <a:cs typeface="Courier New" panose="02070309020205020404" pitchFamily="49" charset="0"/>
               </a:rPr>
               <a:t>00</a:t>
             </a:r>
             <a:r>
+              <a:rPr lang="en-US" sz="3200" b="1" dirty="0">
+                <a:solidFill>
+                  <a:srgbClr val="000000"/>
+                </a:solidFill>
+                <a:latin typeface="Courier New" panose="02070309020205020404" pitchFamily="49" charset="0"/>
+              </a:rPr>
+              <a:t> </a:t>
+            </a:r>
+            <a:r>
               <a:rPr lang="fi-FI" sz="3200" b="1" dirty="0">
+                <a:solidFill>
+                  <a:srgbClr val="9BBB59"/>
+                </a:solidFill>
                 <a:latin typeface="Courier New" panose="02070309020205020404" pitchFamily="49" charset="0"/>
-                <a:cs typeface="Courier New" panose="02070309020205020404" pitchFamily="49" charset="0"/>
+              </a:rPr>
+              <a:t>01 03 A0 0C</a:t>
+            </a:r>
+            <a:r>
+              <a:rPr lang="fi-FI" sz="3200" b="1" dirty="0">
+                <a:solidFill>
+                  <a:srgbClr val="9BBB59"/>
+                </a:solidFill>
+                <a:latin typeface="Courier New" panose="02070309020205020404" pitchFamily="49" charset="0"/>
               </a:rPr>
               <a:t> </a:t>
             </a:r>
             <a:r>
               <a:rPr lang="fi-FI" sz="3200" b="1" dirty="0">
                 <a:solidFill>
-                  <a:schemeClr val="accent3"/>
+                  <a:srgbClr val="9BBB59"/>
                 </a:solidFill>
                 <a:latin typeface="Courier New" panose="02070309020205020404" pitchFamily="49" charset="0"/>
-                <a:cs typeface="Courier New" panose="02070309020205020404" pitchFamily="49" charset="0"/>
-              </a:rPr>
-              <a:t>AA AA AA AA AA AA AA AA AA AA AA AA AA AA AA AA AA AA AA AA AA AA AA AA AA AA AA AA AA AA AA AA AA AA AA AA AA AA AA AA AA AA AA AA AA AA AA AA AA AA AA AA AA AA AA AA AA AA AA AA AA AA AA AA AA AA AA AA AA AA AA AA AA AA AA AA AA AA AA AA AA AA AA AA AA AA AA AA AA AA AA AA AA AA </a:t>
+              </a:rPr>
+              <a:t>34 03 3A 91 01 08 54 02 65 6E 53 54 41 52 54 54 0F 1C 61 6E 64 72 6F 69 64 2E 63 6F 6D 3A 70 6B 67 63 6E 74 34 35 31 34 63 2E 75 6E 66 73 79 6D 70 6F 73 69 75 6D 6E 66 63 71 75 69 7A FE 00 00 00 00 00 00 00 00 00 00 00 00 00 00 00 00 00 00 00 00 00 00 00 00 00 00 00 00 00 00 00 00 00 00 00 00 00 00 00 00 00 00 00 00 00 00 00 00 00 00 00 00 00 00 00 00 00 00 00 00 00 00 00 00 00 00 00 00 00 00 00 00 00 00 00 00 00 00 </a:t>
             </a:r>
             <a:r>
               <a:rPr lang="fi-FI" sz="3200" b="1" dirty="0">
+                <a:solidFill>
+                  <a:srgbClr val="000000"/>
+                </a:solidFill>
                 <a:highlight>
                   <a:srgbClr val="FFFF00"/>
                 </a:highlight>
                 <a:latin typeface="Courier New" panose="02070309020205020404" pitchFamily="49" charset="0"/>
-                <a:cs typeface="Courier New" panose="02070309020205020404" pitchFamily="49" charset="0"/>
               </a:rPr>
               <a:t>00</a:t>
             </a:r>
             <a:r>
               <a:rPr lang="fi-FI" sz="3200" b="1" dirty="0">
+                <a:solidFill>
+                  <a:srgbClr val="000000"/>
+                </a:solidFill>
                 <a:highlight>
                   <a:srgbClr val="000000"/>
                 </a:highlight>
                 <a:latin typeface="Courier New" panose="02070309020205020404" pitchFamily="49" charset="0"/>
-                <a:cs typeface="Courier New" panose="02070309020205020404" pitchFamily="49" charset="0"/>
               </a:rPr>
               <a:t> </a:t>
             </a:r>
             <a:r>
               <a:rPr lang="fi-FI" sz="3200" b="1" dirty="0">
+                <a:solidFill>
+                  <a:srgbClr val="000000"/>
+                </a:solidFill>
                 <a:highlight>
                   <a:srgbClr val="FFFF00"/>
                 </a:highlight>
                 <a:latin typeface="Courier New" panose="02070309020205020404" pitchFamily="49" charset="0"/>
-                <a:cs typeface="Courier New" panose="02070309020205020404" pitchFamily="49" charset="0"/>
               </a:rPr>
               <a:t>00</a:t>
             </a:r>
             <a:r>
               <a:rPr lang="fi-FI" sz="3200" b="1" dirty="0">
+                <a:solidFill>
+                  <a:srgbClr val="000000"/>
+                </a:solidFill>
                 <a:highlight>
                   <a:srgbClr val="000000"/>
                 </a:highlight>
                 <a:latin typeface="Courier New" panose="02070309020205020404" pitchFamily="49" charset="0"/>
-                <a:cs typeface="Courier New" panose="02070309020205020404" pitchFamily="49" charset="0"/>
               </a:rPr>
               <a:t> </a:t>
             </a:r>
             <a:r>
               <a:rPr lang="fi-FI" sz="3200" b="1" dirty="0">
+                <a:solidFill>
+                  <a:srgbClr val="000000"/>
+                </a:solidFill>
                 <a:highlight>
                   <a:srgbClr val="FFFF00"/>
                 </a:highlight>
                 <a:latin typeface="Courier New" panose="02070309020205020404" pitchFamily="49" charset="0"/>
-                <a:cs typeface="Courier New" panose="02070309020205020404" pitchFamily="49" charset="0"/>
               </a:rPr>
               <a:t>00</a:t>
             </a:r>
             <a:r>
               <a:rPr lang="fi-FI" sz="3200" b="1" dirty="0">
                 <a:solidFill>
-                  <a:schemeClr val="bg1"/>
+                  <a:srgbClr val="FFFFFF"/>
                 </a:solidFill>
                 <a:highlight>
                   <a:srgbClr val="000000"/>
                 </a:highlight>
                 <a:latin typeface="Courier New" panose="02070309020205020404" pitchFamily="49" charset="0"/>
-                <a:cs typeface="Courier New" panose="02070309020205020404" pitchFamily="49" charset="0"/>
               </a:rPr>
               <a:t> BD</a:t>
             </a:r>
             <a:r>
               <a:rPr lang="fi-FI" sz="3200" b="1" dirty="0">
                 <a:solidFill>
-                  <a:schemeClr val="bg1"/>
+                  <a:srgbClr val="FFFFFF"/>
                 </a:solidFill>
                 <a:latin typeface="Courier New" panose="02070309020205020404" pitchFamily="49" charset="0"/>
-                <a:cs typeface="Courier New" panose="02070309020205020404" pitchFamily="49" charset="0"/>
               </a:rPr>
               <a:t> </a:t>
             </a:r>
             <a:r>
               <a:rPr lang="en-US" sz="3200" b="1" dirty="0">
                 <a:solidFill>
-                  <a:schemeClr val="bg1"/>
+                  <a:srgbClr val="FFFFFF"/>
                 </a:solidFill>
                 <a:highlight>
                   <a:srgbClr val="000000"/>
                 </a:highlight>
                 <a:latin typeface="Courier New" panose="02070309020205020404" pitchFamily="49" charset="0"/>
-                <a:cs typeface="Courier New" panose="02070309020205020404" pitchFamily="49" charset="0"/>
               </a:rPr>
               <a:t>04 00 00 FF</a:t>
             </a:r>
             <a:r>
-              <a:rPr lang="fi-FI" sz="3200" b="1" dirty="0">
-                <a:solidFill>
-                  <a:schemeClr val="bg1"/>
+              <a:rPr lang="en-US" sz="3200" b="1" dirty="0">
+                <a:solidFill>
+                  <a:srgbClr val="FFFFFF"/>
                 </a:solidFill>
                 <a:latin typeface="Courier New" panose="02070309020205020404" pitchFamily="49" charset="0"/>
-                <a:cs typeface="Courier New" panose="02070309020205020404" pitchFamily="49" charset="0"/>
               </a:rPr>
               <a:t> </a:t>
             </a:r>
             <a:r>
               <a:rPr lang="en-US" sz="3200" b="1" dirty="0">
                 <a:solidFill>
-                  <a:schemeClr val="bg1"/>
+                  <a:srgbClr val="FFFFFF"/>
                 </a:solidFill>
                 <a:highlight>
                   <a:srgbClr val="000000"/>
                 </a:highlight>
                 <a:latin typeface="Courier New" panose="02070309020205020404" pitchFamily="49" charset="0"/>
-                <a:cs typeface="Courier New" panose="02070309020205020404" pitchFamily="49" charset="0"/>
               </a:rPr>
               <a:t>00 05 -- --</a:t>
             </a:r>
             <a:r>
-              <a:rPr lang="fi-FI" sz="3200" b="1" dirty="0">
-                <a:solidFill>
-                  <a:schemeClr val="bg1"/>
+              <a:rPr lang="en-US" sz="3200" b="1" dirty="0">
+                <a:solidFill>
+                  <a:srgbClr val="FFFFFF"/>
                 </a:solidFill>
                 <a:latin typeface="Courier New" panose="02070309020205020404" pitchFamily="49" charset="0"/>
-                <a:cs typeface="Courier New" panose="02070309020205020404" pitchFamily="49" charset="0"/>
               </a:rPr>
               <a:t> </a:t>
             </a:r>
             <a:r>
               <a:rPr lang="en-US" sz="3200" b="1" dirty="0">
                 <a:solidFill>
-                  <a:schemeClr val="bg1"/>
+                  <a:srgbClr val="FFFFFF"/>
                 </a:solidFill>
                 <a:highlight>
                   <a:srgbClr val="000000"/>
                 </a:highlight>
                 <a:latin typeface="Courier New" panose="02070309020205020404" pitchFamily="49" charset="0"/>
-                <a:cs typeface="Courier New" panose="02070309020205020404" pitchFamily="49" charset="0"/>
-              </a:rPr>
-              <a:t>FF FF FF FF</a:t>
-            </a:r>
-            <a:r>
-              <a:rPr lang="fi-FI" sz="3200" b="1" dirty="0">
-                <a:solidFill>
-                  <a:schemeClr val="bg1"/>
-                </a:solidFill>
-                <a:latin typeface="Courier New" panose="02070309020205020404" pitchFamily="49" charset="0"/>
-                <a:cs typeface="Courier New" panose="02070309020205020404" pitchFamily="49" charset="0"/>
-              </a:rPr>
-              <a:t> </a:t>
-            </a:r>
-            <a:r>
-              <a:rPr lang="en-US" sz="3200" b="1" dirty="0">
-                <a:solidFill>
-                  <a:schemeClr val="bg1"/>
+              </a:rPr>
+              <a:t>FF </a:t>
+            </a:r>
+            <a:r>
+              <a:rPr lang="en-US" sz="3200" b="1" dirty="0" err="1">
+                <a:solidFill>
+                  <a:srgbClr val="FFFFFF"/>
                 </a:solidFill>
                 <a:highlight>
                   <a:srgbClr val="000000"/>
                 </a:highlight>
                 <a:latin typeface="Courier New" panose="02070309020205020404" pitchFamily="49" charset="0"/>
-                <a:cs typeface="Courier New" panose="02070309020205020404" pitchFamily="49" charset="0"/>
-              </a:rPr>
-              <a:t>00 00 -- -- </a:t>
+              </a:rPr>
+              <a:t>FF</a:t>
+            </a:r>
+            <a:r>
+              <a:rPr lang="en-US" sz="3200" b="1" dirty="0">
+                <a:solidFill>
+                  <a:srgbClr val="FFFFFF"/>
+                </a:solidFill>
+                <a:highlight>
+                  <a:srgbClr val="000000"/>
+                </a:highlight>
+                <a:latin typeface="Courier New" panose="02070309020205020404" pitchFamily="49" charset="0"/>
+              </a:rPr>
+              <a:t> </a:t>
+            </a:r>
+            <a:r>
+              <a:rPr lang="en-US" sz="3200" b="1" dirty="0" err="1">
+                <a:solidFill>
+                  <a:srgbClr val="FFFFFF"/>
+                </a:solidFill>
+                <a:highlight>
+                  <a:srgbClr val="000000"/>
+                </a:highlight>
+                <a:latin typeface="Courier New" panose="02070309020205020404" pitchFamily="49" charset="0"/>
+              </a:rPr>
+              <a:t>FF</a:t>
+            </a:r>
+            <a:r>
+              <a:rPr lang="en-US" sz="3200" b="1" dirty="0">
+                <a:solidFill>
+                  <a:srgbClr val="FFFFFF"/>
+                </a:solidFill>
+                <a:highlight>
+                  <a:srgbClr val="000000"/>
+                </a:highlight>
+                <a:latin typeface="Courier New" panose="02070309020205020404" pitchFamily="49" charset="0"/>
+              </a:rPr>
+              <a:t> </a:t>
+            </a:r>
+            <a:r>
+              <a:rPr lang="en-US" sz="3200" b="1" dirty="0" err="1">
+                <a:solidFill>
+                  <a:srgbClr val="FFFFFF"/>
+                </a:solidFill>
+                <a:highlight>
+                  <a:srgbClr val="000000"/>
+                </a:highlight>
+                <a:latin typeface="Courier New" panose="02070309020205020404" pitchFamily="49" charset="0"/>
+              </a:rPr>
+              <a:t>FF</a:t>
+            </a:r>
+            <a:r>
+              <a:rPr lang="en-US" sz="3200" b="1" dirty="0">
+                <a:solidFill>
+                  <a:srgbClr val="FFFFFF"/>
+                </a:solidFill>
+                <a:latin typeface="Courier New" panose="02070309020205020404" pitchFamily="49" charset="0"/>
+              </a:rPr>
+              <a:t> </a:t>
+            </a:r>
+            <a:r>
+              <a:rPr lang="en-US" sz="3200" b="1" dirty="0">
+                <a:solidFill>
+                  <a:srgbClr val="FFFFFF"/>
+                </a:solidFill>
+                <a:highlight>
+                  <a:srgbClr val="000000"/>
+                </a:highlight>
+                <a:latin typeface="Courier New" panose="02070309020205020404" pitchFamily="49" charset="0"/>
+              </a:rPr>
+              <a:t>00 00 -- --</a:t>
             </a:r>
             <a:endParaRPr lang="en-US" sz="3200" b="1" dirty="0">
               <a:solidFill>
@@ -7227,7 +7361,7 @@
         </p:nvSpPr>
         <p:spPr>
           <a:xfrm rot="10800000" flipH="1">
-            <a:off x="15536283" y="3697187"/>
+            <a:off x="14698083" y="3581401"/>
             <a:ext cx="20506317" cy="2942369"/>
           </a:xfrm>
           <a:prstGeom prst="snip2DiagRect">
@@ -7305,7 +7439,7 @@
         </p:nvSpPr>
         <p:spPr>
           <a:xfrm rot="10800000" flipH="1">
-            <a:off x="14050378" y="390202"/>
+            <a:off x="13212178" y="390202"/>
             <a:ext cx="21992222" cy="2942369"/>
           </a:xfrm>
           <a:prstGeom prst="snip2DiagRect">
@@ -7386,8 +7520,8 @@
         </p:nvSpPr>
         <p:spPr>
           <a:xfrm rot="10800000" flipH="1">
-            <a:off x="22920924" y="7003823"/>
-            <a:ext cx="13121676" cy="2942369"/>
+            <a:off x="26459020" y="6781800"/>
+            <a:ext cx="8745379" cy="2746202"/>
           </a:xfrm>
           <a:prstGeom prst="snip2DiagRect">
             <a:avLst/>
@@ -7464,7 +7598,7 @@
         </p:nvSpPr>
         <p:spPr>
           <a:xfrm>
-            <a:off x="14325600" y="533400"/>
+            <a:off x="13487400" y="533400"/>
             <a:ext cx="21488399" cy="1569660"/>
           </a:xfrm>
           <a:prstGeom prst="rect">
@@ -7483,14 +7617,7 @@
                 <a:latin typeface="Courier New" panose="02070309020205020404" pitchFamily="49" charset="0"/>
                 <a:cs typeface="Courier New" panose="02070309020205020404" pitchFamily="49" charset="0"/>
               </a:rPr>
-              <a:t>STATIC LOCK BYTES:</a:t>
-            </a:r>
-            <a:r>
-              <a:rPr lang="en-US" sz="2400" dirty="0">
-                <a:latin typeface="Courier New" panose="02070309020205020404" pitchFamily="49" charset="0"/>
-                <a:cs typeface="Courier New" panose="02070309020205020404" pitchFamily="49" charset="0"/>
-              </a:rPr>
-              <a:t> Field Programmable Read-Only Locking Mechanism</a:t>
+              <a:t>STATIC LOCK BYTES: Field Programmable Read-Only Locking Mechanism</a:t>
             </a:r>
           </a:p>
           <a:p>
@@ -7499,14 +7626,7 @@
                 <a:latin typeface="Courier New" panose="02070309020205020404" pitchFamily="49" charset="0"/>
                 <a:cs typeface="Courier New" panose="02070309020205020404" pitchFamily="49" charset="0"/>
               </a:rPr>
-              <a:t>MEMORY LOCATION:   </a:t>
-            </a:r>
-            <a:r>
-              <a:rPr lang="en-US" sz="2400" dirty="0">
-                <a:latin typeface="Courier New" panose="02070309020205020404" pitchFamily="49" charset="0"/>
-                <a:cs typeface="Courier New" panose="02070309020205020404" pitchFamily="49" charset="0"/>
-              </a:rPr>
-              <a:t>PAGE 02h (Hex)</a:t>
+              <a:t>MEMORY LOCATION:   PAGE 02h (Hex)</a:t>
             </a:r>
           </a:p>
           <a:p>
@@ -7515,23 +7635,16 @@
                 <a:latin typeface="Courier New" panose="02070309020205020404" pitchFamily="49" charset="0"/>
                 <a:cs typeface="Courier New" panose="02070309020205020404" pitchFamily="49" charset="0"/>
               </a:rPr>
-              <a:t>DETAILS:</a:t>
-            </a:r>
-            <a:r>
-              <a:rPr lang="en-US" sz="2400" dirty="0">
+              <a:t>DETAILS:           Each bit represents an individual 16-bit page from 03h to 0Fh. Bits set to 1</a:t>
+            </a:r>
+            <a:br>
+              <a:rPr lang="en-US" sz="2400" b="1" dirty="0">
                 <a:latin typeface="Courier New" panose="02070309020205020404" pitchFamily="49" charset="0"/>
                 <a:cs typeface="Courier New" panose="02070309020205020404" pitchFamily="49" charset="0"/>
               </a:rPr>
-              <a:t>           Each bit represents an individual 16-bit page from 03h to 0Fh. Bits set to 1</a:t>
-            </a:r>
-            <a:br>
-              <a:rPr lang="en-US" sz="2400" dirty="0">
-                <a:latin typeface="Courier New" panose="02070309020205020404" pitchFamily="49" charset="0"/>
-                <a:cs typeface="Courier New" panose="02070309020205020404" pitchFamily="49" charset="0"/>
-              </a:rPr>
             </a:br>
             <a:r>
-              <a:rPr lang="en-US" sz="2400" dirty="0">
+              <a:rPr lang="en-US" sz="2400" b="1" dirty="0">
                 <a:latin typeface="Courier New" panose="02070309020205020404" pitchFamily="49" charset="0"/>
                 <a:cs typeface="Courier New" panose="02070309020205020404" pitchFamily="49" charset="0"/>
               </a:rPr>
@@ -7548,8 +7661,8 @@
         </p:nvSpPr>
         <p:spPr>
           <a:xfrm rot="16200000">
-            <a:off x="23645801" y="10983869"/>
-            <a:ext cx="1983880" cy="584775"/>
+            <a:off x="27176871" y="10246445"/>
+            <a:ext cx="2059084" cy="584775"/>
           </a:xfrm>
           <a:prstGeom prst="rect">
             <a:avLst/>
@@ -7580,7 +7693,7 @@
         </p:nvSpPr>
         <p:spPr>
           <a:xfrm rot="5400000">
-            <a:off x="24564166" y="19428059"/>
+            <a:off x="28145566" y="20220764"/>
             <a:ext cx="1798092" cy="584775"/>
           </a:xfrm>
           <a:prstGeom prst="rect">
@@ -7613,13 +7726,13 @@
           <p:nvPr>
             <p:extLst>
               <p:ext uri="{D42A27DB-BD31-4B8C-83A1-F6EECF244321}">
-                <p14:modId xmlns:p14="http://schemas.microsoft.com/office/powerpoint/2010/main" val="2729954717"/>
+                <p14:modId xmlns:p14="http://schemas.microsoft.com/office/powerpoint/2010/main" val="307827880"/>
               </p:ext>
             </p:extLst>
           </p:nvPr>
         </p:nvGraphicFramePr>
         <p:xfrm>
-          <a:off x="14325600" y="2133600"/>
+          <a:off x="13487400" y="2133600"/>
           <a:ext cx="10338912" cy="1059080"/>
         </p:xfrm>
         <a:graphic>
@@ -8267,13 +8380,13 @@
           <p:nvPr>
             <p:extLst>
               <p:ext uri="{D42A27DB-BD31-4B8C-83A1-F6EECF244321}">
-                <p14:modId xmlns:p14="http://schemas.microsoft.com/office/powerpoint/2010/main" val="3217856295"/>
+                <p14:modId xmlns:p14="http://schemas.microsoft.com/office/powerpoint/2010/main" val="4005654034"/>
               </p:ext>
             </p:extLst>
           </p:nvPr>
         </p:nvGraphicFramePr>
         <p:xfrm>
-          <a:off x="25017888" y="2104707"/>
+          <a:off x="24179688" y="2104707"/>
           <a:ext cx="10338912" cy="1059080"/>
         </p:xfrm>
         <a:graphic>
@@ -8960,7 +9073,7 @@
         </p:nvSpPr>
         <p:spPr>
           <a:xfrm>
-            <a:off x="15760124" y="3924300"/>
+            <a:off x="14921924" y="3742470"/>
             <a:ext cx="20053875" cy="1569660"/>
           </a:xfrm>
           <a:prstGeom prst="rect">
@@ -8979,14 +9092,7 @@
                 <a:latin typeface="Courier New" panose="02070309020205020404" pitchFamily="49" charset="0"/>
                 <a:cs typeface="Courier New" panose="02070309020205020404" pitchFamily="49" charset="0"/>
               </a:rPr>
-              <a:t>Capability Container:</a:t>
-            </a:r>
-            <a:r>
-              <a:rPr lang="en-US" sz="2400" dirty="0">
-                <a:latin typeface="Courier New" panose="02070309020205020404" pitchFamily="49" charset="0"/>
-                <a:cs typeface="Courier New" panose="02070309020205020404" pitchFamily="49" charset="0"/>
-              </a:rPr>
-              <a:t> One Time Programmable Bits</a:t>
+              <a:t>Capability Container: One Time Programmable Bits</a:t>
             </a:r>
           </a:p>
           <a:p>
@@ -8995,14 +9101,7 @@
                 <a:latin typeface="Courier New" panose="02070309020205020404" pitchFamily="49" charset="0"/>
                 <a:cs typeface="Courier New" panose="02070309020205020404" pitchFamily="49" charset="0"/>
               </a:rPr>
-              <a:t>MEMORY LOCATION:      </a:t>
-            </a:r>
-            <a:r>
-              <a:rPr lang="en-US" sz="2400" dirty="0">
-                <a:latin typeface="Courier New" panose="02070309020205020404" pitchFamily="49" charset="0"/>
-                <a:cs typeface="Courier New" panose="02070309020205020404" pitchFamily="49" charset="0"/>
-              </a:rPr>
-              <a:t>PAGE 03h</a:t>
+              <a:t>MEMORY LOCATION:      PAGE 03h</a:t>
             </a:r>
           </a:p>
           <a:p>
@@ -9026,10 +9125,6 @@
               </a:rPr>
               <a:t>                      NFC Forum defined data inside the tag. </a:t>
             </a:r>
-            <a:endParaRPr lang="en-US" sz="2400" dirty="0">
-              <a:latin typeface="Courier New" panose="02070309020205020404" pitchFamily="49" charset="0"/>
-              <a:cs typeface="Courier New" panose="02070309020205020404" pitchFamily="49" charset="0"/>
-            </a:endParaRPr>
           </a:p>
         </p:txBody>
       </p:sp>
@@ -9042,13 +9137,13 @@
           <p:nvPr>
             <p:extLst>
               <p:ext uri="{D42A27DB-BD31-4B8C-83A1-F6EECF244321}">
-                <p14:modId xmlns:p14="http://schemas.microsoft.com/office/powerpoint/2010/main" val="958015606"/>
+                <p14:modId xmlns:p14="http://schemas.microsoft.com/office/powerpoint/2010/main" val="1219103299"/>
               </p:ext>
             </p:extLst>
           </p:nvPr>
         </p:nvGraphicFramePr>
         <p:xfrm>
-          <a:off x="17297400" y="5562600"/>
+          <a:off x="16459200" y="5380770"/>
           <a:ext cx="18129199" cy="914400"/>
         </p:xfrm>
         <a:graphic>

</xml_diff>

<commit_message>
minor style changes to poster
</commit_message>
<xml_diff>
--- a/Poster Artifacts/Poster.pptx
+++ b/Poster Artifacts/Poster.pptx
@@ -209,7 +209,7 @@
           <a:p>
             <a:fld id="{CAD4E7B3-883E-4909-856A-D4D2FBCEB0AE}" type="datetimeFigureOut">
               <a:rPr lang="en-US" smtClean="0"/>
-              <a:t>3/12/2017</a:t>
+              <a:t>3/13/2017</a:t>
             </a:fld>
             <a:endParaRPr lang="en-US"/>
           </a:p>
@@ -824,7 +824,7 @@
             <a:fld id="{1D8BD707-D9CF-40AE-B4C6-C98DA3205C09}" type="datetimeFigureOut">
               <a:rPr lang="en-US" smtClean="0"/>
               <a:pPr/>
-              <a:t>3/12/2017</a:t>
+              <a:t>3/13/2017</a:t>
             </a:fld>
             <a:endParaRPr lang="en-US"/>
           </a:p>
@@ -989,7 +989,7 @@
             <a:fld id="{1D8BD707-D9CF-40AE-B4C6-C98DA3205C09}" type="datetimeFigureOut">
               <a:rPr lang="en-US" smtClean="0"/>
               <a:pPr/>
-              <a:t>3/12/2017</a:t>
+              <a:t>3/13/2017</a:t>
             </a:fld>
             <a:endParaRPr lang="en-US"/>
           </a:p>
@@ -1164,7 +1164,7 @@
             <a:fld id="{1D8BD707-D9CF-40AE-B4C6-C98DA3205C09}" type="datetimeFigureOut">
               <a:rPr lang="en-US" smtClean="0"/>
               <a:pPr/>
-              <a:t>3/12/2017</a:t>
+              <a:t>3/13/2017</a:t>
             </a:fld>
             <a:endParaRPr lang="en-US"/>
           </a:p>
@@ -1329,7 +1329,7 @@
             <a:fld id="{1D8BD707-D9CF-40AE-B4C6-C98DA3205C09}" type="datetimeFigureOut">
               <a:rPr lang="en-US" smtClean="0"/>
               <a:pPr/>
-              <a:t>3/12/2017</a:t>
+              <a:t>3/13/2017</a:t>
             </a:fld>
             <a:endParaRPr lang="en-US"/>
           </a:p>
@@ -1571,7 +1571,7 @@
             <a:fld id="{1D8BD707-D9CF-40AE-B4C6-C98DA3205C09}" type="datetimeFigureOut">
               <a:rPr lang="en-US" smtClean="0"/>
               <a:pPr/>
-              <a:t>3/12/2017</a:t>
+              <a:t>3/13/2017</a:t>
             </a:fld>
             <a:endParaRPr lang="en-US"/>
           </a:p>
@@ -1853,7 +1853,7 @@
             <a:fld id="{1D8BD707-D9CF-40AE-B4C6-C98DA3205C09}" type="datetimeFigureOut">
               <a:rPr lang="en-US" smtClean="0"/>
               <a:pPr/>
-              <a:t>3/12/2017</a:t>
+              <a:t>3/13/2017</a:t>
             </a:fld>
             <a:endParaRPr lang="en-US"/>
           </a:p>
@@ -2269,7 +2269,7 @@
             <a:fld id="{1D8BD707-D9CF-40AE-B4C6-C98DA3205C09}" type="datetimeFigureOut">
               <a:rPr lang="en-US" smtClean="0"/>
               <a:pPr/>
-              <a:t>3/12/2017</a:t>
+              <a:t>3/13/2017</a:t>
             </a:fld>
             <a:endParaRPr lang="en-US"/>
           </a:p>
@@ -2383,7 +2383,7 @@
             <a:fld id="{1D8BD707-D9CF-40AE-B4C6-C98DA3205C09}" type="datetimeFigureOut">
               <a:rPr lang="en-US" smtClean="0"/>
               <a:pPr/>
-              <a:t>3/12/2017</a:t>
+              <a:t>3/13/2017</a:t>
             </a:fld>
             <a:endParaRPr lang="en-US"/>
           </a:p>
@@ -2475,7 +2475,7 @@
             <a:fld id="{1D8BD707-D9CF-40AE-B4C6-C98DA3205C09}" type="datetimeFigureOut">
               <a:rPr lang="en-US" smtClean="0"/>
               <a:pPr/>
-              <a:t>3/12/2017</a:t>
+              <a:t>3/13/2017</a:t>
             </a:fld>
             <a:endParaRPr lang="en-US"/>
           </a:p>
@@ -2747,7 +2747,7 @@
             <a:fld id="{1D8BD707-D9CF-40AE-B4C6-C98DA3205C09}" type="datetimeFigureOut">
               <a:rPr lang="en-US" smtClean="0"/>
               <a:pPr/>
-              <a:t>3/12/2017</a:t>
+              <a:t>3/13/2017</a:t>
             </a:fld>
             <a:endParaRPr lang="en-US"/>
           </a:p>
@@ -2996,7 +2996,7 @@
             <a:fld id="{1D8BD707-D9CF-40AE-B4C6-C98DA3205C09}" type="datetimeFigureOut">
               <a:rPr lang="en-US" smtClean="0"/>
               <a:pPr/>
-              <a:t>3/12/2017</a:t>
+              <a:t>3/13/2017</a:t>
             </a:fld>
             <a:endParaRPr lang="en-US"/>
           </a:p>
@@ -3204,7 +3204,7 @@
             <a:fld id="{1D8BD707-D9CF-40AE-B4C6-C98DA3205C09}" type="datetimeFigureOut">
               <a:rPr lang="en-US" smtClean="0"/>
               <a:pPr/>
-              <a:t>3/12/2017</a:t>
+              <a:t>3/13/2017</a:t>
             </a:fld>
             <a:endParaRPr lang="en-US"/>
           </a:p>
@@ -3605,36 +3605,6 @@
           <a:chExt cx="0" cy="0"/>
         </a:xfrm>
       </p:grpSpPr>
-      <p:pic>
-        <p:nvPicPr>
-          <p:cNvPr id="9" name="Picture 8"/>
-          <p:cNvPicPr>
-            <a:picLocks noChangeAspect="1"/>
-          </p:cNvPicPr>
-          <p:nvPr/>
-        </p:nvPicPr>
-        <p:blipFill>
-          <a:blip r:embed="rId3">
-            <a:extLst>
-              <a:ext uri="{28A0092B-C50C-407E-A947-70E740481C1C}">
-                <a14:useLocalDpi xmlns:a14="http://schemas.microsoft.com/office/drawing/2010/main" val="0"/>
-              </a:ext>
-            </a:extLst>
-          </a:blip>
-          <a:stretch>
-            <a:fillRect/>
-          </a:stretch>
-        </p:blipFill>
-        <p:spPr>
-          <a:xfrm>
-            <a:off x="627468" y="304800"/>
-            <a:ext cx="4401731" cy="32385000"/>
-          </a:xfrm>
-          <a:prstGeom prst="rect">
-            <a:avLst/>
-          </a:prstGeom>
-        </p:spPr>
-      </p:pic>
       <p:sp>
         <p:nvSpPr>
           <p:cNvPr id="20" name="Text Box 15"/>
@@ -3645,8 +3615,8 @@
         </p:nvSpPr>
         <p:spPr bwMode="auto">
           <a:xfrm>
-            <a:off x="5029200" y="13345397"/>
-            <a:ext cx="33885959" cy="3952003"/>
+            <a:off x="5108632" y="13345464"/>
+            <a:ext cx="35924195" cy="3952003"/>
           </a:xfrm>
           <a:prstGeom prst="rect">
             <a:avLst/>
@@ -3800,6 +3770,36 @@
           </a:p>
         </p:txBody>
       </p:sp>
+      <p:pic>
+        <p:nvPicPr>
+          <p:cNvPr id="9" name="Picture 8"/>
+          <p:cNvPicPr>
+            <a:picLocks noChangeAspect="1"/>
+          </p:cNvPicPr>
+          <p:nvPr/>
+        </p:nvPicPr>
+        <p:blipFill>
+          <a:blip r:embed="rId3">
+            <a:extLst>
+              <a:ext uri="{28A0092B-C50C-407E-A947-70E740481C1C}">
+                <a14:useLocalDpi xmlns:a14="http://schemas.microsoft.com/office/drawing/2010/main" val="0"/>
+              </a:ext>
+            </a:extLst>
+          </a:blip>
+          <a:stretch>
+            <a:fillRect/>
+          </a:stretch>
+        </p:blipFill>
+        <p:spPr>
+          <a:xfrm>
+            <a:off x="779869" y="304800"/>
+            <a:ext cx="4401731" cy="32385000"/>
+          </a:xfrm>
+          <a:prstGeom prst="rect">
+            <a:avLst/>
+          </a:prstGeom>
+        </p:spPr>
+      </p:pic>
       <p:sp>
         <p:nvSpPr>
           <p:cNvPr id="28" name="Text Box 26"/>
@@ -3810,7 +3810,7 @@
         </p:nvSpPr>
         <p:spPr bwMode="auto">
           <a:xfrm>
-            <a:off x="14050378" y="29337000"/>
+            <a:off x="12496800" y="29228345"/>
             <a:ext cx="19324598" cy="3251304"/>
           </a:xfrm>
           <a:prstGeom prst="rect">
@@ -4085,7 +4085,7 @@
         </p:nvSpPr>
         <p:spPr bwMode="auto">
           <a:xfrm>
-            <a:off x="14097002" y="28956000"/>
+            <a:off x="12543424" y="28847345"/>
             <a:ext cx="19277973" cy="440536"/>
           </a:xfrm>
           <a:prstGeom prst="rect">
@@ -4255,8 +4255,8 @@
         </p:nvSpPr>
         <p:spPr>
           <a:xfrm rot="10800000">
-            <a:off x="4114800" y="10382866"/>
-            <a:ext cx="34932840" cy="5326302"/>
+            <a:off x="3164659" y="10382866"/>
+            <a:ext cx="35908072" cy="5326302"/>
           </a:xfrm>
           <a:prstGeom prst="stripedRightArrow">
             <a:avLst/>
@@ -4337,7 +4337,7 @@
         </p:blipFill>
         <p:spPr bwMode="auto">
           <a:xfrm>
-            <a:off x="33374976" y="30251400"/>
+            <a:off x="33305452" y="30251400"/>
             <a:ext cx="6342799" cy="2675570"/>
           </a:xfrm>
           <a:prstGeom prst="rect">
@@ -4371,7 +4371,7 @@
         </p:blipFill>
         <p:spPr>
           <a:xfrm>
-            <a:off x="38709600" y="12461862"/>
+            <a:off x="38521205" y="12461862"/>
             <a:ext cx="4455595" cy="6054738"/>
           </a:xfrm>
           <a:prstGeom prst="ellipse">
@@ -4411,8 +4411,8 @@
         </p:nvSpPr>
         <p:spPr>
           <a:xfrm>
-            <a:off x="5846014" y="15316200"/>
-            <a:ext cx="34387586" cy="5456107"/>
+            <a:off x="4249330" y="15316200"/>
+            <a:ext cx="36250381" cy="5456107"/>
           </a:xfrm>
           <a:prstGeom prst="stripedRightArrow">
             <a:avLst/>
@@ -4474,7 +4474,7 @@
         </p:nvSpPr>
         <p:spPr bwMode="auto">
           <a:xfrm>
-            <a:off x="37477081" y="5047880"/>
+            <a:off x="37544905" y="5047880"/>
             <a:ext cx="5952003" cy="1176491"/>
           </a:xfrm>
           <a:prstGeom prst="rect">
@@ -4613,7 +4613,7 @@
         </p:nvSpPr>
         <p:spPr bwMode="auto">
           <a:xfrm>
-            <a:off x="37422576" y="4419600"/>
+            <a:off x="37490400" y="4419600"/>
             <a:ext cx="5952003" cy="628279"/>
           </a:xfrm>
           <a:prstGeom prst="rect">
@@ -4777,7 +4777,7 @@
         </p:nvSpPr>
         <p:spPr bwMode="auto">
           <a:xfrm>
-            <a:off x="37477081" y="2780867"/>
+            <a:off x="37544905" y="2780867"/>
             <a:ext cx="5952003" cy="1473469"/>
           </a:xfrm>
           <a:prstGeom prst="rect">
@@ -4888,7 +4888,7 @@
         </p:nvSpPr>
         <p:spPr bwMode="auto">
           <a:xfrm>
-            <a:off x="37477081" y="2035363"/>
+            <a:off x="37544905" y="2035363"/>
             <a:ext cx="5952003" cy="680279"/>
           </a:xfrm>
           <a:prstGeom prst="rect">
@@ -5064,7 +5064,7 @@
         </p:blipFill>
         <p:spPr>
           <a:xfrm>
-            <a:off x="37481997" y="490770"/>
+            <a:off x="37549821" y="490770"/>
             <a:ext cx="5952003" cy="1376522"/>
           </a:xfrm>
           <a:prstGeom prst="rect">
@@ -5094,7 +5094,7 @@
         </p:blipFill>
         <p:spPr>
           <a:xfrm>
-            <a:off x="39776400" y="29287881"/>
+            <a:off x="39706876" y="29287881"/>
             <a:ext cx="3879524" cy="3418591"/>
           </a:xfrm>
           <a:prstGeom prst="rect">
@@ -5124,7 +5124,7 @@
         </p:blipFill>
         <p:spPr>
           <a:xfrm>
-            <a:off x="8534400" y="14740897"/>
+            <a:off x="9730874" y="14740897"/>
             <a:ext cx="1546726" cy="1546726"/>
           </a:xfrm>
           <a:prstGeom prst="rect">
@@ -5154,7 +5154,7 @@
         </p:blipFill>
         <p:spPr>
           <a:xfrm>
-            <a:off x="33962474" y="14740897"/>
+            <a:off x="34724474" y="14740897"/>
             <a:ext cx="1546726" cy="1546726"/>
           </a:xfrm>
           <a:prstGeom prst="rect">
@@ -5170,7 +5170,7 @@
         </p:nvSpPr>
         <p:spPr>
           <a:xfrm rot="16200000">
-            <a:off x="9869531" y="7637431"/>
+            <a:off x="8708662" y="7637431"/>
             <a:ext cx="8755985" cy="491523"/>
           </a:xfrm>
           <a:prstGeom prst="homePlate">
@@ -5211,7 +5211,7 @@
         </p:nvSpPr>
         <p:spPr>
           <a:xfrm rot="16200000">
-            <a:off x="9123071" y="7641543"/>
+            <a:off x="7962202" y="7641543"/>
             <a:ext cx="8763000" cy="491523"/>
           </a:xfrm>
           <a:prstGeom prst="homePlate">
@@ -5252,7 +5252,7 @@
         </p:nvSpPr>
         <p:spPr>
           <a:xfrm rot="16200000">
-            <a:off x="25403413" y="11463920"/>
+            <a:off x="24242544" y="11463920"/>
             <a:ext cx="4149797" cy="491523"/>
           </a:xfrm>
           <a:prstGeom prst="homePlate">
@@ -5293,7 +5293,7 @@
         </p:nvSpPr>
         <p:spPr>
           <a:xfrm rot="16200000">
-            <a:off x="12942535" y="9234125"/>
+            <a:off x="11781666" y="9234125"/>
             <a:ext cx="5547364" cy="491523"/>
           </a:xfrm>
           <a:prstGeom prst="homePlate">
@@ -5334,7 +5334,7 @@
         </p:nvSpPr>
         <p:spPr>
           <a:xfrm rot="16200000">
-            <a:off x="12199582" y="9241745"/>
+            <a:off x="11038713" y="9241745"/>
             <a:ext cx="5547364" cy="491523"/>
           </a:xfrm>
           <a:prstGeom prst="homePlate">
@@ -5375,7 +5375,7 @@
         </p:nvSpPr>
         <p:spPr>
           <a:xfrm rot="16200000">
-            <a:off x="14181507" y="7650113"/>
+            <a:off x="13020638" y="7650113"/>
             <a:ext cx="1640999" cy="584775"/>
           </a:xfrm>
           <a:prstGeom prst="rect">
@@ -5407,7 +5407,7 @@
         </p:nvSpPr>
         <p:spPr>
           <a:xfrm rot="16200000">
-            <a:off x="14938756" y="7650112"/>
+            <a:off x="13777887" y="7650112"/>
             <a:ext cx="1640997" cy="584775"/>
           </a:xfrm>
           <a:prstGeom prst="rect">
@@ -5439,7 +5439,7 @@
         </p:nvSpPr>
         <p:spPr>
           <a:xfrm rot="16200000">
-            <a:off x="14416895" y="9234125"/>
+            <a:off x="13256026" y="9234125"/>
             <a:ext cx="5547364" cy="491523"/>
           </a:xfrm>
           <a:prstGeom prst="homePlate">
@@ -5480,7 +5480,7 @@
         </p:nvSpPr>
         <p:spPr>
           <a:xfrm rot="16200000">
-            <a:off x="13673942" y="9241745"/>
+            <a:off x="12513073" y="9241745"/>
             <a:ext cx="5547364" cy="491523"/>
           </a:xfrm>
           <a:prstGeom prst="homePlate">
@@ -5521,7 +5521,7 @@
         </p:nvSpPr>
         <p:spPr>
           <a:xfrm rot="16200000">
-            <a:off x="15655869" y="7650114"/>
+            <a:off x="14495000" y="7650114"/>
             <a:ext cx="1640995" cy="584775"/>
           </a:xfrm>
           <a:prstGeom prst="rect">
@@ -5553,7 +5553,7 @@
         </p:nvSpPr>
         <p:spPr>
           <a:xfrm rot="16200000">
-            <a:off x="16413118" y="7650115"/>
+            <a:off x="15252249" y="7650115"/>
             <a:ext cx="1640991" cy="584775"/>
           </a:xfrm>
           <a:prstGeom prst="rect">
@@ -5585,7 +5585,7 @@
         </p:nvSpPr>
         <p:spPr>
           <a:xfrm rot="16200000">
-            <a:off x="24660460" y="11471540"/>
+            <a:off x="23499591" y="11471540"/>
             <a:ext cx="4149797" cy="491523"/>
           </a:xfrm>
           <a:prstGeom prst="homePlate">
@@ -5626,7 +5626,7 @@
         </p:nvSpPr>
         <p:spPr>
           <a:xfrm rot="16200000">
-            <a:off x="26129945" y="11475492"/>
+            <a:off x="24969076" y="11475492"/>
             <a:ext cx="4141892" cy="491523"/>
           </a:xfrm>
           <a:prstGeom prst="homePlate">
@@ -5667,7 +5667,7 @@
         </p:nvSpPr>
         <p:spPr>
           <a:xfrm>
-            <a:off x="5846014" y="11811000"/>
+            <a:off x="4685145" y="11811000"/>
             <a:ext cx="32409079" cy="2554545"/>
           </a:xfrm>
           <a:prstGeom prst="rect">
@@ -6135,7 +6135,7 @@
         </p:nvSpPr>
         <p:spPr>
           <a:xfrm rot="16200000">
-            <a:off x="12454781" y="4643600"/>
+            <a:off x="11293912" y="4643600"/>
             <a:ext cx="2099574" cy="584775"/>
           </a:xfrm>
           <a:prstGeom prst="rect">
@@ -6167,7 +6167,7 @@
         </p:nvSpPr>
         <p:spPr>
           <a:xfrm rot="16200000">
-            <a:off x="13212029" y="4643600"/>
+            <a:off x="12051160" y="4643600"/>
             <a:ext cx="2099574" cy="584775"/>
           </a:xfrm>
           <a:prstGeom prst="rect">
@@ -6199,7 +6199,7 @@
         </p:nvSpPr>
         <p:spPr>
           <a:xfrm rot="16200000">
-            <a:off x="25691621" y="10216201"/>
+            <a:off x="24530752" y="10216201"/>
             <a:ext cx="2119575" cy="584775"/>
           </a:xfrm>
           <a:prstGeom prst="rect">
@@ -6231,7 +6231,7 @@
         </p:nvSpPr>
         <p:spPr>
           <a:xfrm rot="16200000">
-            <a:off x="26424047" y="10216201"/>
+            <a:off x="25263178" y="10216201"/>
             <a:ext cx="2119575" cy="584775"/>
           </a:xfrm>
           <a:prstGeom prst="rect">
@@ -6263,7 +6263,7 @@
         </p:nvSpPr>
         <p:spPr>
           <a:xfrm rot="5400000">
-            <a:off x="26679688" y="19767416"/>
+            <a:off x="25383963" y="19767416"/>
             <a:ext cx="3270501" cy="491523"/>
           </a:xfrm>
           <a:prstGeom prst="homePlate">
@@ -6304,7 +6304,7 @@
         </p:nvSpPr>
         <p:spPr>
           <a:xfrm rot="5400000">
-            <a:off x="25940903" y="19770868"/>
+            <a:off x="24645178" y="19770868"/>
             <a:ext cx="3262165" cy="491523"/>
           </a:xfrm>
           <a:prstGeom prst="homePlate">
@@ -6345,7 +6345,7 @@
         </p:nvSpPr>
         <p:spPr>
           <a:xfrm rot="5400000">
-            <a:off x="12715035" y="19022499"/>
+            <a:off x="11419310" y="19022499"/>
             <a:ext cx="4758903" cy="491523"/>
           </a:xfrm>
           <a:prstGeom prst="homePlate">
@@ -6386,7 +6386,7 @@
         </p:nvSpPr>
         <p:spPr>
           <a:xfrm rot="5400000">
-            <a:off x="11979346" y="19022854"/>
+            <a:off x="10683621" y="19022854"/>
             <a:ext cx="4744373" cy="491523"/>
           </a:xfrm>
           <a:prstGeom prst="homePlate">
@@ -6427,7 +6427,7 @@
         </p:nvSpPr>
         <p:spPr>
           <a:xfrm rot="5400000">
-            <a:off x="26680714" y="20220765"/>
+            <a:off x="25384989" y="20220765"/>
             <a:ext cx="1798095" cy="584775"/>
           </a:xfrm>
           <a:prstGeom prst="rect">
@@ -6459,7 +6459,7 @@
         </p:nvSpPr>
         <p:spPr>
           <a:xfrm rot="5400000">
-            <a:off x="27413141" y="20220764"/>
+            <a:off x="26117416" y="20220764"/>
             <a:ext cx="1798092" cy="584775"/>
           </a:xfrm>
           <a:prstGeom prst="rect">
@@ -6491,7 +6491,7 @@
         </p:nvSpPr>
         <p:spPr>
           <a:xfrm rot="5400000">
-            <a:off x="13455533" y="20127997"/>
+            <a:off x="12159808" y="20127997"/>
             <a:ext cx="1764958" cy="584775"/>
           </a:xfrm>
           <a:prstGeom prst="rect">
@@ -6523,7 +6523,7 @@
         </p:nvSpPr>
         <p:spPr>
           <a:xfrm rot="5400000">
-            <a:off x="14217534" y="20127996"/>
+            <a:off x="12921809" y="20127996"/>
             <a:ext cx="1764956" cy="584775"/>
           </a:xfrm>
           <a:prstGeom prst="rect">
@@ -6555,7 +6555,7 @@
         </p:nvSpPr>
         <p:spPr>
           <a:xfrm rot="5400000">
-            <a:off x="14177477" y="19011424"/>
+            <a:off x="12881752" y="19011424"/>
             <a:ext cx="4751993" cy="491523"/>
           </a:xfrm>
           <a:prstGeom prst="homePlate">
@@ -6596,7 +6596,7 @@
         </p:nvSpPr>
         <p:spPr>
           <a:xfrm rot="5400000">
-            <a:off x="13434524" y="19019044"/>
+            <a:off x="12138799" y="19019044"/>
             <a:ext cx="4751993" cy="491523"/>
           </a:xfrm>
           <a:prstGeom prst="homePlate">
@@ -6637,7 +6637,7 @@
         </p:nvSpPr>
         <p:spPr>
           <a:xfrm rot="5400000">
-            <a:off x="15012606" y="19992166"/>
+            <a:off x="13716881" y="19992166"/>
             <a:ext cx="1493293" cy="584775"/>
           </a:xfrm>
           <a:prstGeom prst="rect">
@@ -6669,7 +6669,7 @@
         </p:nvSpPr>
         <p:spPr>
           <a:xfrm rot="5400000">
-            <a:off x="15777246" y="19912042"/>
+            <a:off x="14481521" y="19912042"/>
             <a:ext cx="1478511" cy="584775"/>
           </a:xfrm>
           <a:prstGeom prst="rect">
@@ -6701,7 +6701,7 @@
         </p:nvSpPr>
         <p:spPr>
           <a:xfrm rot="5400000">
-            <a:off x="15651838" y="19011424"/>
+            <a:off x="14356113" y="19011424"/>
             <a:ext cx="4751994" cy="491523"/>
           </a:xfrm>
           <a:prstGeom prst="homePlate">
@@ -6742,7 +6742,7 @@
         </p:nvSpPr>
         <p:spPr>
           <a:xfrm rot="5400000">
-            <a:off x="14908884" y="19019044"/>
+            <a:off x="13613159" y="19019044"/>
             <a:ext cx="4751993" cy="491523"/>
           </a:xfrm>
           <a:prstGeom prst="homePlate">
@@ -6783,7 +6783,7 @@
         </p:nvSpPr>
         <p:spPr>
           <a:xfrm rot="5400000">
-            <a:off x="16494358" y="19912042"/>
+            <a:off x="15198633" y="19912042"/>
             <a:ext cx="1478511" cy="584775"/>
           </a:xfrm>
           <a:prstGeom prst="rect">
@@ -6815,7 +6815,7 @@
         </p:nvSpPr>
         <p:spPr>
           <a:xfrm rot="5400000">
-            <a:off x="17251606" y="19912042"/>
+            <a:off x="15955881" y="19912042"/>
             <a:ext cx="1478511" cy="584775"/>
           </a:xfrm>
           <a:prstGeom prst="rect">
@@ -6847,7 +6847,7 @@
         </p:nvSpPr>
         <p:spPr>
           <a:xfrm rot="5400000">
-            <a:off x="27404628" y="19767414"/>
+            <a:off x="26108903" y="19767414"/>
             <a:ext cx="3270498" cy="491523"/>
           </a:xfrm>
           <a:prstGeom prst="homePlate">
@@ -6888,7 +6888,7 @@
         </p:nvSpPr>
         <p:spPr>
           <a:xfrm>
-            <a:off x="6688056" y="16794540"/>
+            <a:off x="5392331" y="16794540"/>
             <a:ext cx="32409079" cy="2554545"/>
           </a:xfrm>
           <a:prstGeom prst="rect">
@@ -7104,25 +7104,7 @@
                 </a:solidFill>
                 <a:latin typeface="Courier New" panose="02070309020205020404" pitchFamily="49" charset="0"/>
               </a:rPr>
-              <a:t>01 03 A0 0C</a:t>
-            </a:r>
-            <a:r>
-              <a:rPr lang="fi-FI" sz="3200" b="1" dirty="0">
-                <a:solidFill>
-                  <a:srgbClr val="9BBB59"/>
-                </a:solidFill>
-                <a:latin typeface="Courier New" panose="02070309020205020404" pitchFamily="49" charset="0"/>
-              </a:rPr>
-              <a:t> </a:t>
-            </a:r>
-            <a:r>
-              <a:rPr lang="fi-FI" sz="3200" b="1" dirty="0">
-                <a:solidFill>
-                  <a:srgbClr val="9BBB59"/>
-                </a:solidFill>
-                <a:latin typeface="Courier New" panose="02070309020205020404" pitchFamily="49" charset="0"/>
-              </a:rPr>
-              <a:t>34 03 3A 91 01 08 54 02 65 6E 53 54 41 52 54 54 0F 1C 61 6E 64 72 6F 69 64 2E 63 6F 6D 3A 70 6B 67 63 6E 74 34 35 31 34 63 2E 75 6E 66 73 79 6D 70 6F 73 69 75 6D 6E 66 63 71 75 69 7A FE 00 00 00 00 00 00 00 00 00 00 00 00 00 00 00 00 00 00 00 00 00 00 00 00 00 00 00 00 00 00 00 00 00 00 00 00 00 00 00 00 00 00 00 00 00 00 00 00 00 00 00 00 00 00 00 00 00 00 00 00 00 00 00 00 00 00 00 00 00 00 00 00 00 00 00 00 00 00 </a:t>
+              <a:t>01 03 A0 0C 34 03 3A 91 01 08 54 02 65 6E 53 54 41 52 54 54 0F 1C 61 6E 64 72 6F 69 64 2E 63 6F 6D 3A 70 6B 67 63 6E 74 34 35 31 34 63 2E 75 6E 66 73 79 6D 70 6F 73 69 75 6D 6E 66 63 71 75 69 7A FE 00 00 00 00 00 00 00 00 00 00 00 00 00 00 00 00 00 00 00 00 00 00 00 00 00 00 00 00 00 00 00 00 00 00 00 00 00 00 00 00 00 00 00 00 00 00 00 00 00 00 00 00 00 00 00 00 00 00 00 00 00 00 00 00 00 00 00 00 00 00 00 00 00 00 00 00 00 00 </a:t>
             </a:r>
             <a:r>
               <a:rPr lang="fi-FI" sz="3200" b="1" dirty="0">
@@ -7361,7 +7343,7 @@
         </p:nvSpPr>
         <p:spPr>
           <a:xfrm rot="10800000" flipH="1">
-            <a:off x="14698083" y="3581401"/>
+            <a:off x="13537214" y="3581401"/>
             <a:ext cx="20506317" cy="2942369"/>
           </a:xfrm>
           <a:prstGeom prst="snip2DiagRect">
@@ -7439,7 +7421,7 @@
         </p:nvSpPr>
         <p:spPr>
           <a:xfrm rot="10800000" flipH="1">
-            <a:off x="13212178" y="390202"/>
+            <a:off x="12051309" y="390202"/>
             <a:ext cx="21992222" cy="2942369"/>
           </a:xfrm>
           <a:prstGeom prst="snip2DiagRect">
@@ -7520,7 +7502,7 @@
         </p:nvSpPr>
         <p:spPr>
           <a:xfrm rot="10800000" flipH="1">
-            <a:off x="26459020" y="6781800"/>
+            <a:off x="25298151" y="6781800"/>
             <a:ext cx="8745379" cy="2746202"/>
           </a:xfrm>
           <a:prstGeom prst="snip2DiagRect">
@@ -7598,7 +7580,7 @@
         </p:nvSpPr>
         <p:spPr>
           <a:xfrm>
-            <a:off x="13487400" y="533400"/>
+            <a:off x="12326531" y="533400"/>
             <a:ext cx="21488399" cy="1569660"/>
           </a:xfrm>
           <a:prstGeom prst="rect">
@@ -7661,7 +7643,7 @@
         </p:nvSpPr>
         <p:spPr>
           <a:xfrm rot="16200000">
-            <a:off x="27176871" y="10246445"/>
+            <a:off x="26016002" y="10246445"/>
             <a:ext cx="2059084" cy="584775"/>
           </a:xfrm>
           <a:prstGeom prst="rect">
@@ -7693,7 +7675,7 @@
         </p:nvSpPr>
         <p:spPr>
           <a:xfrm rot="5400000">
-            <a:off x="28145566" y="20220764"/>
+            <a:off x="26849841" y="20220764"/>
             <a:ext cx="1798092" cy="584775"/>
           </a:xfrm>
           <a:prstGeom prst="rect">
@@ -7726,13 +7708,13 @@
           <p:nvPr>
             <p:extLst>
               <p:ext uri="{D42A27DB-BD31-4B8C-83A1-F6EECF244321}">
-                <p14:modId xmlns:p14="http://schemas.microsoft.com/office/powerpoint/2010/main" val="307827880"/>
+                <p14:modId xmlns:p14="http://schemas.microsoft.com/office/powerpoint/2010/main" val="3072200920"/>
               </p:ext>
             </p:extLst>
           </p:nvPr>
         </p:nvGraphicFramePr>
         <p:xfrm>
-          <a:off x="13487400" y="2133600"/>
+          <a:off x="12326531" y="2133600"/>
           <a:ext cx="10338912" cy="1059080"/>
         </p:xfrm>
         <a:graphic>
@@ -8380,13 +8362,13 @@
           <p:nvPr>
             <p:extLst>
               <p:ext uri="{D42A27DB-BD31-4B8C-83A1-F6EECF244321}">
-                <p14:modId xmlns:p14="http://schemas.microsoft.com/office/powerpoint/2010/main" val="4005654034"/>
+                <p14:modId xmlns:p14="http://schemas.microsoft.com/office/powerpoint/2010/main" val="531979001"/>
               </p:ext>
             </p:extLst>
           </p:nvPr>
         </p:nvGraphicFramePr>
         <p:xfrm>
-          <a:off x="24179688" y="2104707"/>
+          <a:off x="23018819" y="2104707"/>
           <a:ext cx="10338912" cy="1059080"/>
         </p:xfrm>
         <a:graphic>
@@ -9073,7 +9055,7 @@
         </p:nvSpPr>
         <p:spPr>
           <a:xfrm>
-            <a:off x="14921924" y="3742470"/>
+            <a:off x="13761055" y="3742470"/>
             <a:ext cx="20053875" cy="1569660"/>
           </a:xfrm>
           <a:prstGeom prst="rect">
@@ -9137,13 +9119,13 @@
           <p:nvPr>
             <p:extLst>
               <p:ext uri="{D42A27DB-BD31-4B8C-83A1-F6EECF244321}">
-                <p14:modId xmlns:p14="http://schemas.microsoft.com/office/powerpoint/2010/main" val="1219103299"/>
+                <p14:modId xmlns:p14="http://schemas.microsoft.com/office/powerpoint/2010/main" val="2469492775"/>
               </p:ext>
             </p:extLst>
           </p:nvPr>
         </p:nvGraphicFramePr>
         <p:xfrm>
-          <a:off x="16459200" y="5380770"/>
+          <a:off x="15298331" y="5380770"/>
           <a:ext cx="18129199" cy="914400"/>
         </p:xfrm>
         <a:graphic>
@@ -9733,6 +9715,67 @@
           </a:graphicData>
         </a:graphic>
       </p:graphicFrame>
+      <p:sp>
+        <p:nvSpPr>
+          <p:cNvPr id="5" name="Rectangle: Rounded Corners 4"/>
+          <p:cNvSpPr/>
+          <p:nvPr/>
+        </p:nvSpPr>
+        <p:spPr>
+          <a:xfrm>
+            <a:off x="7162800" y="21867238"/>
+            <a:ext cx="30638609" cy="6201443"/>
+          </a:xfrm>
+          <a:prstGeom prst="roundRect">
+            <a:avLst/>
+          </a:prstGeom>
+          <a:gradFill flip="none" rotWithShape="1">
+            <a:gsLst>
+              <a:gs pos="0">
+                <a:srgbClr val="FFFF00">
+                  <a:alpha val="60000"/>
+                </a:srgbClr>
+              </a:gs>
+              <a:gs pos="66000">
+                <a:schemeClr val="bg2">
+                  <a:alpha val="0"/>
+                  <a:lumMod val="100000"/>
+                </a:schemeClr>
+              </a:gs>
+            </a:gsLst>
+            <a:lin ang="5400000" scaled="1"/>
+            <a:tileRect/>
+          </a:gradFill>
+          <a:ln>
+            <a:noFill/>
+          </a:ln>
+          <a:effectLst/>
+        </p:spPr>
+        <p:style>
+          <a:lnRef idx="2">
+            <a:schemeClr val="accent1">
+              <a:shade val="50000"/>
+            </a:schemeClr>
+          </a:lnRef>
+          <a:fillRef idx="1">
+            <a:schemeClr val="accent1"/>
+          </a:fillRef>
+          <a:effectRef idx="0">
+            <a:schemeClr val="accent1"/>
+          </a:effectRef>
+          <a:fontRef idx="minor">
+            <a:schemeClr val="lt1"/>
+          </a:fontRef>
+        </p:style>
+        <p:txBody>
+          <a:bodyPr rtlCol="0" anchor="ctr"/>
+          <a:lstStyle/>
+          <a:p>
+            <a:pPr algn="ctr"/>
+            <a:endParaRPr lang="en-US"/>
+          </a:p>
+        </p:txBody>
+      </p:sp>
     </p:spTree>
     <p:extLst>
       <p:ext uri="{BB962C8B-B14F-4D97-AF65-F5344CB8AC3E}">

</xml_diff>

<commit_message>
added lock tag method; successfully locked first tag; updated poster with representation of lock in hex stream
</commit_message>
<xml_diff>
--- a/Poster Artifacts/Poster.pptx
+++ b/Poster Artifacts/Poster.pptx
@@ -3615,8 +3615,8 @@
         </p:nvSpPr>
         <p:spPr bwMode="auto">
           <a:xfrm>
-            <a:off x="5108632" y="13345464"/>
-            <a:ext cx="35924195" cy="3952003"/>
+            <a:off x="5108632" y="13859812"/>
+            <a:ext cx="35924195" cy="2938685"/>
           </a:xfrm>
           <a:prstGeom prst="rect">
             <a:avLst/>
@@ -5685,7 +5685,7 @@
           <a:lstStyle/>
           <a:p>
             <a:r>
-              <a:rPr lang="en-US" sz="3200" b="1" dirty="0">
+              <a:rPr lang="en-US" sz="3200" b="1">
                 <a:solidFill>
                   <a:srgbClr val="FFFFFF"/>
                 </a:solidFill>
@@ -5694,10 +5694,10 @@
                 </a:highlight>
                 <a:latin typeface="Courier New" panose="02070309020205020404" pitchFamily="49" charset="0"/>
               </a:rPr>
-              <a:t>04 80 16 1A</a:t>
-            </a:r>
-            <a:r>
-              <a:rPr lang="en-US" sz="3200" b="1" dirty="0">
+              <a:t>04 34 CB 73</a:t>
+            </a:r>
+            <a:r>
+              <a:rPr lang="en-US" sz="3200" b="1">
                 <a:solidFill>
                   <a:srgbClr val="FFFFFF"/>
                 </a:solidFill>
@@ -5706,7 +5706,7 @@
               <a:t> </a:t>
             </a:r>
             <a:r>
-              <a:rPr lang="en-US" sz="3200" b="1" dirty="0">
+              <a:rPr lang="en-US" sz="3200" b="1">
                 <a:solidFill>
                   <a:srgbClr val="FFFFFF"/>
                 </a:solidFill>
@@ -5715,10 +5715,10 @@
                 </a:highlight>
                 <a:latin typeface="Courier New" panose="02070309020205020404" pitchFamily="49" charset="0"/>
               </a:rPr>
-              <a:t>52 A3 40 80</a:t>
-            </a:r>
-            <a:r>
-              <a:rPr lang="en-US" sz="3200" b="1" dirty="0">
+              <a:t>2A 74 40 81</a:t>
+            </a:r>
+            <a:r>
+              <a:rPr lang="en-US" sz="3200" b="1">
                 <a:solidFill>
                   <a:srgbClr val="000000"/>
                 </a:solidFill>
@@ -5727,7 +5727,7 @@
               <a:t> </a:t>
             </a:r>
             <a:r>
-              <a:rPr lang="en-US" sz="3200" b="1" dirty="0">
+              <a:rPr lang="en-US" sz="3200" b="1">
                 <a:solidFill>
                   <a:srgbClr val="FFFFFF"/>
                 </a:solidFill>
@@ -5736,7 +5736,43 @@
                 </a:highlight>
                 <a:latin typeface="Courier New" panose="02070309020205020404" pitchFamily="49" charset="0"/>
               </a:rPr>
-              <a:t>31 48 </a:t>
+              <a:t>9</a:t>
+            </a:r>
+            <a:r>
+              <a:rPr lang="en-US" sz="3200" b="1">
+                <a:solidFill>
+                  <a:srgbClr val="FFFFFF"/>
+                </a:solidFill>
+                <a:highlight>
+                  <a:srgbClr val="000000"/>
+                </a:highlight>
+                <a:latin typeface="Courier New" panose="02070309020205020404" pitchFamily="49" charset="0"/>
+              </a:rPr>
+              <a:t>F</a:t>
+            </a:r>
+            <a:r>
+              <a:rPr lang="en-US" sz="3200" b="1">
+                <a:solidFill>
+                  <a:srgbClr val="FFFFFF"/>
+                </a:solidFill>
+                <a:highlight>
+                  <a:srgbClr val="000000"/>
+                </a:highlight>
+                <a:latin typeface="Courier New" panose="02070309020205020404" pitchFamily="49" charset="0"/>
+              </a:rPr>
+              <a:t> </a:t>
+            </a:r>
+            <a:r>
+              <a:rPr lang="en-US" sz="3200" b="1" dirty="0">
+                <a:solidFill>
+                  <a:srgbClr val="FFFFFF"/>
+                </a:solidFill>
+                <a:highlight>
+                  <a:srgbClr val="000000"/>
+                </a:highlight>
+                <a:latin typeface="Courier New" panose="02070309020205020404" pitchFamily="49" charset="0"/>
+              </a:rPr>
+              <a:t>48 </a:t>
             </a:r>
             <a:r>
               <a:rPr lang="fi-FI" sz="3200" b="1" dirty="0">
@@ -6969,7 +7005,7 @@
                 </a:highlight>
                 <a:latin typeface="Courier New" panose="02070309020205020404" pitchFamily="49" charset="0"/>
               </a:rPr>
-              <a:t>00</a:t>
+              <a:t>F8</a:t>
             </a:r>
             <a:r>
               <a:rPr lang="fi-FI" sz="3200" b="1" dirty="0">
@@ -6993,7 +7029,7 @@
                 </a:highlight>
                 <a:latin typeface="Courier New" panose="02070309020205020404" pitchFamily="49" charset="0"/>
               </a:rPr>
-              <a:t>00</a:t>
+              <a:t>FF</a:t>
             </a:r>
             <a:r>
               <a:rPr lang="fi-FI" sz="3200" b="1" dirty="0">
@@ -7086,7 +7122,7 @@
                 </a:highlight>
                 <a:latin typeface="Courier New" panose="02070309020205020404" pitchFamily="49" charset="0"/>
               </a:rPr>
-              <a:t>00</a:t>
+              <a:t>0F</a:t>
             </a:r>
             <a:r>
               <a:rPr lang="en-US" sz="3200" b="1" dirty="0">
@@ -7116,7 +7152,7 @@
                 </a:highlight>
                 <a:latin typeface="Courier New" panose="02070309020205020404" pitchFamily="49" charset="0"/>
               </a:rPr>
-              <a:t>00</a:t>
+              <a:t>FF</a:t>
             </a:r>
             <a:r>
               <a:rPr lang="fi-FI" sz="3200" b="1" dirty="0">
@@ -7140,7 +7176,7 @@
                 </a:highlight>
                 <a:latin typeface="Courier New" panose="02070309020205020404" pitchFamily="49" charset="0"/>
               </a:rPr>
-              <a:t>00</a:t>
+              <a:t>01</a:t>
             </a:r>
             <a:r>
               <a:rPr lang="fi-FI" sz="3200" b="1" dirty="0">
@@ -9736,7 +9772,7 @@
                   <a:alpha val="60000"/>
                 </a:srgbClr>
               </a:gs>
-              <a:gs pos="66000">
+              <a:gs pos="46000">
                 <a:schemeClr val="bg2">
                   <a:alpha val="0"/>
                   <a:lumMod val="100000"/>

</xml_diff>

<commit_message>
started designing success activity; need to decide on whether to include letter hint for final question
</commit_message>
<xml_diff>
--- a/Poster Artifacts/Poster.pptx
+++ b/Poster Artifacts/Poster.pptx
@@ -209,7 +209,7 @@
           <a:p>
             <a:fld id="{CAD4E7B3-883E-4909-856A-D4D2FBCEB0AE}" type="datetimeFigureOut">
               <a:rPr lang="en-US" smtClean="0"/>
-              <a:t>3/13/2017</a:t>
+              <a:t>3/15/2017</a:t>
             </a:fld>
             <a:endParaRPr lang="en-US"/>
           </a:p>
@@ -824,7 +824,7 @@
             <a:fld id="{1D8BD707-D9CF-40AE-B4C6-C98DA3205C09}" type="datetimeFigureOut">
               <a:rPr lang="en-US" smtClean="0"/>
               <a:pPr/>
-              <a:t>3/13/2017</a:t>
+              <a:t>3/15/2017</a:t>
             </a:fld>
             <a:endParaRPr lang="en-US"/>
           </a:p>
@@ -989,7 +989,7 @@
             <a:fld id="{1D8BD707-D9CF-40AE-B4C6-C98DA3205C09}" type="datetimeFigureOut">
               <a:rPr lang="en-US" smtClean="0"/>
               <a:pPr/>
-              <a:t>3/13/2017</a:t>
+              <a:t>3/15/2017</a:t>
             </a:fld>
             <a:endParaRPr lang="en-US"/>
           </a:p>
@@ -1164,7 +1164,7 @@
             <a:fld id="{1D8BD707-D9CF-40AE-B4C6-C98DA3205C09}" type="datetimeFigureOut">
               <a:rPr lang="en-US" smtClean="0"/>
               <a:pPr/>
-              <a:t>3/13/2017</a:t>
+              <a:t>3/15/2017</a:t>
             </a:fld>
             <a:endParaRPr lang="en-US"/>
           </a:p>
@@ -1329,7 +1329,7 @@
             <a:fld id="{1D8BD707-D9CF-40AE-B4C6-C98DA3205C09}" type="datetimeFigureOut">
               <a:rPr lang="en-US" smtClean="0"/>
               <a:pPr/>
-              <a:t>3/13/2017</a:t>
+              <a:t>3/15/2017</a:t>
             </a:fld>
             <a:endParaRPr lang="en-US"/>
           </a:p>
@@ -1571,7 +1571,7 @@
             <a:fld id="{1D8BD707-D9CF-40AE-B4C6-C98DA3205C09}" type="datetimeFigureOut">
               <a:rPr lang="en-US" smtClean="0"/>
               <a:pPr/>
-              <a:t>3/13/2017</a:t>
+              <a:t>3/15/2017</a:t>
             </a:fld>
             <a:endParaRPr lang="en-US"/>
           </a:p>
@@ -1853,7 +1853,7 @@
             <a:fld id="{1D8BD707-D9CF-40AE-B4C6-C98DA3205C09}" type="datetimeFigureOut">
               <a:rPr lang="en-US" smtClean="0"/>
               <a:pPr/>
-              <a:t>3/13/2017</a:t>
+              <a:t>3/15/2017</a:t>
             </a:fld>
             <a:endParaRPr lang="en-US"/>
           </a:p>
@@ -2269,7 +2269,7 @@
             <a:fld id="{1D8BD707-D9CF-40AE-B4C6-C98DA3205C09}" type="datetimeFigureOut">
               <a:rPr lang="en-US" smtClean="0"/>
               <a:pPr/>
-              <a:t>3/13/2017</a:t>
+              <a:t>3/15/2017</a:t>
             </a:fld>
             <a:endParaRPr lang="en-US"/>
           </a:p>
@@ -2383,7 +2383,7 @@
             <a:fld id="{1D8BD707-D9CF-40AE-B4C6-C98DA3205C09}" type="datetimeFigureOut">
               <a:rPr lang="en-US" smtClean="0"/>
               <a:pPr/>
-              <a:t>3/13/2017</a:t>
+              <a:t>3/15/2017</a:t>
             </a:fld>
             <a:endParaRPr lang="en-US"/>
           </a:p>
@@ -2475,7 +2475,7 @@
             <a:fld id="{1D8BD707-D9CF-40AE-B4C6-C98DA3205C09}" type="datetimeFigureOut">
               <a:rPr lang="en-US" smtClean="0"/>
               <a:pPr/>
-              <a:t>3/13/2017</a:t>
+              <a:t>3/15/2017</a:t>
             </a:fld>
             <a:endParaRPr lang="en-US"/>
           </a:p>
@@ -2747,7 +2747,7 @@
             <a:fld id="{1D8BD707-D9CF-40AE-B4C6-C98DA3205C09}" type="datetimeFigureOut">
               <a:rPr lang="en-US" smtClean="0"/>
               <a:pPr/>
-              <a:t>3/13/2017</a:t>
+              <a:t>3/15/2017</a:t>
             </a:fld>
             <a:endParaRPr lang="en-US"/>
           </a:p>
@@ -2996,7 +2996,7 @@
             <a:fld id="{1D8BD707-D9CF-40AE-B4C6-C98DA3205C09}" type="datetimeFigureOut">
               <a:rPr lang="en-US" smtClean="0"/>
               <a:pPr/>
-              <a:t>3/13/2017</a:t>
+              <a:t>3/15/2017</a:t>
             </a:fld>
             <a:endParaRPr lang="en-US"/>
           </a:p>
@@ -3204,7 +3204,7 @@
             <a:fld id="{1D8BD707-D9CF-40AE-B4C6-C98DA3205C09}" type="datetimeFigureOut">
               <a:rPr lang="en-US" smtClean="0"/>
               <a:pPr/>
-              <a:t>3/13/2017</a:t>
+              <a:t>3/15/2017</a:t>
             </a:fld>
             <a:endParaRPr lang="en-US"/>
           </a:p>
@@ -4033,6 +4033,36 @@
             </a:r>
           </a:p>
           <a:p>
+            <a:pPr marL="457200" indent="-457200" defTabSz="457200">
+              <a:spcAft>
+                <a:spcPct val="50000"/>
+              </a:spcAft>
+              <a:buFont typeface="+mj-lt"/>
+              <a:buAutoNum type="arabicPeriod"/>
+              <a:defRPr/>
+            </a:pPr>
+            <a:r>
+              <a:rPr lang="en-US" sz="1800" kern="0" dirty="0"/>
+              <a:t>//add </a:t>
+            </a:r>
+            <a:r>
+              <a:rPr lang="en-US" sz="1800" kern="0" dirty="0" err="1"/>
+              <a:t>ndef</a:t>
+            </a:r>
+            <a:r>
+              <a:rPr lang="en-US" sz="1800" kern="0" dirty="0"/>
+              <a:t> standard doc reference (</a:t>
+            </a:r>
+            <a:r>
+              <a:rPr lang="en-US" sz="1800" kern="0" dirty="0" err="1"/>
+              <a:t>NFCForum</a:t>
+            </a:r>
+            <a:r>
+              <a:rPr lang="en-US" sz="1800" kern="0" dirty="0"/>
+              <a:t>-TS-NDEF pdf)</a:t>
+            </a:r>
+          </a:p>
+          <a:p>
             <a:pPr marL="457200" lvl="0" indent="-457200" defTabSz="457200">
               <a:spcAft>
                 <a:spcPct val="50000"/>
@@ -5736,31 +5766,7 @@
                 </a:highlight>
                 <a:latin typeface="Courier New" panose="02070309020205020404" pitchFamily="49" charset="0"/>
               </a:rPr>
-              <a:t>9</a:t>
-            </a:r>
-            <a:r>
-              <a:rPr lang="en-US" sz="3200" b="1">
-                <a:solidFill>
-                  <a:srgbClr val="FFFFFF"/>
-                </a:solidFill>
-                <a:highlight>
-                  <a:srgbClr val="000000"/>
-                </a:highlight>
-                <a:latin typeface="Courier New" panose="02070309020205020404" pitchFamily="49" charset="0"/>
-              </a:rPr>
-              <a:t>F</a:t>
-            </a:r>
-            <a:r>
-              <a:rPr lang="en-US" sz="3200" b="1">
-                <a:solidFill>
-                  <a:srgbClr val="FFFFFF"/>
-                </a:solidFill>
-                <a:highlight>
-                  <a:srgbClr val="000000"/>
-                </a:highlight>
-                <a:latin typeface="Courier New" panose="02070309020205020404" pitchFamily="49" charset="0"/>
-              </a:rPr>
-              <a:t> </a:t>
+              <a:t>9F </a:t>
             </a:r>
             <a:r>
               <a:rPr lang="en-US" sz="3200" b="1" dirty="0">
@@ -10158,7 +10164,7 @@
               <a:rPr lang="en-US" sz="3600" kern="0" dirty="0">
                 <a:latin typeface="Century Schoolbook" panose="02040604050505020304"/>
               </a:rPr>
-              <a:t>Near Field Communication (NFC) was developed to enable contactless transmission of data. This poster focuses on the electromechanical properties of technology that can generate a message using an Android device (smartphone) and illustrating the standardized format of a typical message facilitating the exchange (NDEF).</a:t>
+              <a:t>Near Field Communication (NFC) was developed to enable contactless transmission of data. This poster focuses on the electromechanical properties of technology that can generate a message using an Android device (smartphone) and illustrating the standardized format of a typical message facilitating the exchange (NDEF). //add references</a:t>
             </a:r>
           </a:p>
           <a:p>
@@ -10608,7 +10614,7 @@
               <a:rPr lang="en-US" sz="3600" kern="0" dirty="0">
                 <a:latin typeface="Century Schoolbook" panose="02040604050505020304"/>
               </a:rPr>
-              <a:t>Smartphone devices that are NFC-enable operate in reader/writer mode, one of three modes defined by the NFC Forum, when interfacing with passive NFC tags. RF interfaces must be compliant with the ISO 14443 standard in order to generate, transmit, and receive messages on ISO/IEC 18000-3 air interface which describes the parameters for air interface communications at 13.56 </a:t>
+              <a:t>Smartphone devices that are NFC-enable operate in reader/writer mode, one of three modes defined by the NFC Forum, when interfacing with passive NFC tags. RF interfaces must be compliant with in order to generate, transmit, and receive messages on ISO/IEC 18000-3 air interface which describes the parameters for air interface communications at 1the ISO 14443 standard 3.56 </a:t>
             </a:r>
             <a:r>
               <a:rPr lang="en-US" sz="3600" kern="0" dirty="0" err="1">

</xml_diff>

<commit_message>
cleaned up some unused resources; updated poster
</commit_message>
<xml_diff>
--- a/Poster Artifacts/Poster.pptx
+++ b/Poster Artifacts/Poster.pptx
@@ -209,7 +209,7 @@
           <a:p>
             <a:fld id="{CAD4E7B3-883E-4909-856A-D4D2FBCEB0AE}" type="datetimeFigureOut">
               <a:rPr lang="en-US" smtClean="0"/>
-              <a:t>3/15/2017</a:t>
+              <a:t>3/27/2017</a:t>
             </a:fld>
             <a:endParaRPr lang="en-US"/>
           </a:p>
@@ -824,7 +824,7 @@
             <a:fld id="{1D8BD707-D9CF-40AE-B4C6-C98DA3205C09}" type="datetimeFigureOut">
               <a:rPr lang="en-US" smtClean="0"/>
               <a:pPr/>
-              <a:t>3/15/2017</a:t>
+              <a:t>3/27/2017</a:t>
             </a:fld>
             <a:endParaRPr lang="en-US"/>
           </a:p>
@@ -989,7 +989,7 @@
             <a:fld id="{1D8BD707-D9CF-40AE-B4C6-C98DA3205C09}" type="datetimeFigureOut">
               <a:rPr lang="en-US" smtClean="0"/>
               <a:pPr/>
-              <a:t>3/15/2017</a:t>
+              <a:t>3/27/2017</a:t>
             </a:fld>
             <a:endParaRPr lang="en-US"/>
           </a:p>
@@ -1164,7 +1164,7 @@
             <a:fld id="{1D8BD707-D9CF-40AE-B4C6-C98DA3205C09}" type="datetimeFigureOut">
               <a:rPr lang="en-US" smtClean="0"/>
               <a:pPr/>
-              <a:t>3/15/2017</a:t>
+              <a:t>3/27/2017</a:t>
             </a:fld>
             <a:endParaRPr lang="en-US"/>
           </a:p>
@@ -1329,7 +1329,7 @@
             <a:fld id="{1D8BD707-D9CF-40AE-B4C6-C98DA3205C09}" type="datetimeFigureOut">
               <a:rPr lang="en-US" smtClean="0"/>
               <a:pPr/>
-              <a:t>3/15/2017</a:t>
+              <a:t>3/27/2017</a:t>
             </a:fld>
             <a:endParaRPr lang="en-US"/>
           </a:p>
@@ -1571,7 +1571,7 @@
             <a:fld id="{1D8BD707-D9CF-40AE-B4C6-C98DA3205C09}" type="datetimeFigureOut">
               <a:rPr lang="en-US" smtClean="0"/>
               <a:pPr/>
-              <a:t>3/15/2017</a:t>
+              <a:t>3/27/2017</a:t>
             </a:fld>
             <a:endParaRPr lang="en-US"/>
           </a:p>
@@ -1853,7 +1853,7 @@
             <a:fld id="{1D8BD707-D9CF-40AE-B4C6-C98DA3205C09}" type="datetimeFigureOut">
               <a:rPr lang="en-US" smtClean="0"/>
               <a:pPr/>
-              <a:t>3/15/2017</a:t>
+              <a:t>3/27/2017</a:t>
             </a:fld>
             <a:endParaRPr lang="en-US"/>
           </a:p>
@@ -2269,7 +2269,7 @@
             <a:fld id="{1D8BD707-D9CF-40AE-B4C6-C98DA3205C09}" type="datetimeFigureOut">
               <a:rPr lang="en-US" smtClean="0"/>
               <a:pPr/>
-              <a:t>3/15/2017</a:t>
+              <a:t>3/27/2017</a:t>
             </a:fld>
             <a:endParaRPr lang="en-US"/>
           </a:p>
@@ -2383,7 +2383,7 @@
             <a:fld id="{1D8BD707-D9CF-40AE-B4C6-C98DA3205C09}" type="datetimeFigureOut">
               <a:rPr lang="en-US" smtClean="0"/>
               <a:pPr/>
-              <a:t>3/15/2017</a:t>
+              <a:t>3/27/2017</a:t>
             </a:fld>
             <a:endParaRPr lang="en-US"/>
           </a:p>
@@ -2475,7 +2475,7 @@
             <a:fld id="{1D8BD707-D9CF-40AE-B4C6-C98DA3205C09}" type="datetimeFigureOut">
               <a:rPr lang="en-US" smtClean="0"/>
               <a:pPr/>
-              <a:t>3/15/2017</a:t>
+              <a:t>3/27/2017</a:t>
             </a:fld>
             <a:endParaRPr lang="en-US"/>
           </a:p>
@@ -2747,7 +2747,7 @@
             <a:fld id="{1D8BD707-D9CF-40AE-B4C6-C98DA3205C09}" type="datetimeFigureOut">
               <a:rPr lang="en-US" smtClean="0"/>
               <a:pPr/>
-              <a:t>3/15/2017</a:t>
+              <a:t>3/27/2017</a:t>
             </a:fld>
             <a:endParaRPr lang="en-US"/>
           </a:p>
@@ -2996,7 +2996,7 @@
             <a:fld id="{1D8BD707-D9CF-40AE-B4C6-C98DA3205C09}" type="datetimeFigureOut">
               <a:rPr lang="en-US" smtClean="0"/>
               <a:pPr/>
-              <a:t>3/15/2017</a:t>
+              <a:t>3/27/2017</a:t>
             </a:fld>
             <a:endParaRPr lang="en-US"/>
           </a:p>
@@ -3204,7 +3204,7 @@
             <a:fld id="{1D8BD707-D9CF-40AE-B4C6-C98DA3205C09}" type="datetimeFigureOut">
               <a:rPr lang="en-US" smtClean="0"/>
               <a:pPr/>
-              <a:t>3/15/2017</a:t>
+              <a:t>3/27/2017</a:t>
             </a:fld>
             <a:endParaRPr lang="en-US"/>
           </a:p>
@@ -3568,19 +3568,17 @@
             <a:gs pos="0">
               <a:srgbClr val="00B050"/>
             </a:gs>
-            <a:gs pos="25000">
+            <a:gs pos="10000">
               <a:srgbClr val="92D050"/>
             </a:gs>
-            <a:gs pos="75000">
+            <a:gs pos="90000">
               <a:schemeClr val="accent5">
                 <a:lumMod val="60000"/>
                 <a:lumOff val="40000"/>
               </a:schemeClr>
             </a:gs>
             <a:gs pos="50000">
-              <a:schemeClr val="bg1">
-                <a:lumMod val="95000"/>
-              </a:schemeClr>
+              <a:schemeClr val="bg1"/>
             </a:gs>
             <a:gs pos="100000">
               <a:srgbClr val="00B0F0"/>
@@ -3615,7 +3613,7 @@
         </p:nvSpPr>
         <p:spPr bwMode="auto">
           <a:xfrm>
-            <a:off x="5108632" y="13859812"/>
+            <a:off x="4080805" y="13859812"/>
             <a:ext cx="35924195" cy="2938685"/>
           </a:xfrm>
           <a:prstGeom prst="rect">
@@ -3792,8 +3790,8 @@
         </p:blipFill>
         <p:spPr>
           <a:xfrm>
-            <a:off x="779869" y="304800"/>
-            <a:ext cx="4401731" cy="32385000"/>
+            <a:off x="762000" y="1371600"/>
+            <a:ext cx="4074052" cy="29974158"/>
           </a:xfrm>
           <a:prstGeom prst="rect">
             <a:avLst/>
@@ -3810,8 +3808,8 @@
         </p:nvSpPr>
         <p:spPr bwMode="auto">
           <a:xfrm>
-            <a:off x="12496800" y="29228345"/>
-            <a:ext cx="19324598" cy="3251304"/>
+            <a:off x="11806011" y="30672138"/>
+            <a:ext cx="20279179" cy="2058915"/>
           </a:xfrm>
           <a:prstGeom prst="rect">
             <a:avLst/>
@@ -3956,15 +3954,15 @@
               <a:defRPr/>
             </a:pPr>
             <a:r>
-              <a:rPr lang="en-US" sz="1800" kern="0" dirty="0"/>
+              <a:rPr lang="en-US" sz="1600" kern="0" dirty="0"/>
               <a:t>M. Roland and J. Langer, "Digital Signature Records for the NFC Data Exchange Format," 2010 Second International Workshop on Near Field Communication, Monaco, 2010, pp. 71-76. </a:t>
             </a:r>
             <a:r>
-              <a:rPr lang="en-US" sz="1800" kern="0" dirty="0" err="1"/>
+              <a:rPr lang="en-US" sz="1600" kern="0" dirty="0" err="1"/>
               <a:t>doi</a:t>
             </a:r>
             <a:r>
-              <a:rPr lang="en-US" sz="1800" kern="0" dirty="0"/>
+              <a:rPr lang="en-US" sz="1600" kern="0" dirty="0"/>
               <a:t>: 10.1109/NFC.2010.10</a:t>
             </a:r>
           </a:p>
@@ -3978,15 +3976,15 @@
               <a:defRPr/>
             </a:pPr>
             <a:r>
-              <a:rPr lang="en-US" sz="1800" kern="0" dirty="0"/>
+              <a:rPr lang="en-US" sz="1600" kern="0" dirty="0"/>
               <a:t>B. Jepson, D. Coleman, and T. </a:t>
             </a:r>
             <a:r>
-              <a:rPr lang="en-US" sz="1800" kern="0" dirty="0" err="1"/>
+              <a:rPr lang="en-US" sz="1600" kern="0" dirty="0" err="1"/>
               <a:t>Igoe</a:t>
             </a:r>
             <a:r>
-              <a:rPr lang="en-US" sz="1800" kern="0" dirty="0"/>
+              <a:rPr lang="en-US" sz="1600" kern="0" dirty="0"/>
               <a:t>, 4. Introducing NDEF [Book]. Safari, 2017. [Online]. Available: https://www.safaribooksonline.com/library/view/beginning-nfc/9781449324094/ch04.html. Accessed: Feb. 2, 2017.</a:t>
             </a:r>
           </a:p>
@@ -4000,7 +3998,7 @@
               <a:defRPr/>
             </a:pPr>
             <a:r>
-              <a:rPr lang="en-US" sz="1800" kern="0" dirty="0"/>
+              <a:rPr lang="en-US" sz="1600" kern="0" dirty="0"/>
               <a:t>NFC, Forum. "NFC Forum Technical Specifications Improve RF Communication and NFC Tag Interoperability with NFC Devices." Business Wire (English) Dec. 0010: Regional Business News. Web. 1 Feb. 2017.</a:t>
             </a:r>
           </a:p>
@@ -4014,7 +4012,7 @@
               <a:defRPr/>
             </a:pPr>
             <a:r>
-              <a:rPr lang="en-US" sz="1800" kern="0" dirty="0"/>
+              <a:rPr lang="en-US" sz="1600" kern="0" dirty="0"/>
               <a:t>electrical 4 u, "Air core transformer," 2011. [Online]. Available: http://www.electrical4u.com/air-core-transformer/. Accessed: Feb. 1, 2017.</a:t>
             </a:r>
           </a:p>
@@ -4028,39 +4026,26 @@
               <a:defRPr/>
             </a:pPr>
             <a:r>
-              <a:rPr lang="en-US" sz="1800" kern="0" dirty="0"/>
-              <a:t>N. Forum, A. rights reserved, A. M. services, Virtual, P. P. Terms, and C. Feedback, "What are the operating modes of NFC devices? - NFC forum," NFC Forum, 2017. [Online]. Available: http://nfc-forum.org/resources/what-are-the-operating-modes-of-nfc-devices/. Accessed: Feb. 2, 2017.</a:t>
-            </a:r>
-          </a:p>
-          <a:p>
-            <a:pPr marL="457200" indent="-457200" defTabSz="457200">
-              <a:spcAft>
-                <a:spcPct val="50000"/>
-              </a:spcAft>
-              <a:buFont typeface="+mj-lt"/>
-              <a:buAutoNum type="arabicPeriod"/>
-              <a:defRPr/>
-            </a:pPr>
-            <a:r>
-              <a:rPr lang="en-US" sz="1800" kern="0" dirty="0"/>
-              <a:t>//add </a:t>
-            </a:r>
-            <a:r>
-              <a:rPr lang="en-US" sz="1800" kern="0" dirty="0" err="1"/>
-              <a:t>ndef</a:t>
-            </a:r>
-            <a:r>
-              <a:rPr lang="en-US" sz="1800" kern="0" dirty="0"/>
-              <a:t> standard doc reference (</a:t>
-            </a:r>
-            <a:r>
-              <a:rPr lang="en-US" sz="1800" kern="0" dirty="0" err="1"/>
-              <a:t>NFCForum</a:t>
-            </a:r>
-            <a:r>
-              <a:rPr lang="en-US" sz="1800" kern="0" dirty="0"/>
-              <a:t>-TS-NDEF pdf)</a:t>
-            </a:r>
+              <a:rPr lang="en-US" sz="1600" dirty="0"/>
+              <a:t>NFC Forum, 1</a:t>
+            </a:r>
+            <a:r>
+              <a:rPr lang="en-US" sz="1600" baseline="30000" dirty="0"/>
+              <a:t>st</a:t>
+            </a:r>
+            <a:r>
+              <a:rPr lang="en-US" sz="1600" dirty="0"/>
+              <a:t> ed.</a:t>
+            </a:r>
+            <a:r>
+              <a:rPr lang="en-US" sz="1600" i="1" dirty="0"/>
+              <a:t> NFC Data Exchange Format (NDEF) Technical Specification,</a:t>
+            </a:r>
+            <a:r>
+              <a:rPr lang="en-US" sz="1600" dirty="0"/>
+              <a:t> 1st ed. Wakefield, MA: NFC Forum, 2006. Web. 27 Mar. 2017.</a:t>
+            </a:r>
+            <a:endParaRPr lang="en-US" sz="2000" kern="0" dirty="0"/>
           </a:p>
           <a:p>
             <a:pPr marL="457200" lvl="0" indent="-457200" defTabSz="457200">
@@ -4071,7 +4056,7 @@
               <a:buAutoNum type="arabicPeriod"/>
               <a:defRPr/>
             </a:pPr>
-            <a:endParaRPr lang="en-US" sz="2400" kern="0" dirty="0"/>
+            <a:endParaRPr lang="en-US" sz="2000" kern="0" dirty="0"/>
           </a:p>
           <a:p>
             <a:pPr marL="457200" lvl="0" indent="-457200" defTabSz="457200">
@@ -4082,18 +4067,7 @@
               <a:buAutoNum type="arabicPeriod"/>
               <a:defRPr/>
             </a:pPr>
-            <a:endParaRPr lang="en-US" sz="2400" kern="0" dirty="0"/>
-          </a:p>
-          <a:p>
-            <a:pPr marL="457200" lvl="0" indent="-457200" defTabSz="457200">
-              <a:spcAft>
-                <a:spcPct val="50000"/>
-              </a:spcAft>
-              <a:buFont typeface="+mj-lt"/>
-              <a:buAutoNum type="arabicPeriod"/>
-              <a:defRPr/>
-            </a:pPr>
-            <a:endParaRPr kumimoji="0" lang="en-US" sz="2400" b="0" i="0" u="none" strike="noStrike" kern="0" cap="none" spc="0" normalizeH="0" baseline="0" noProof="0" dirty="0">
+            <a:endParaRPr kumimoji="0" lang="en-US" sz="2000" b="0" i="0" u="none" strike="noStrike" kern="0" cap="none" spc="0" normalizeH="0" baseline="0" noProof="0" dirty="0">
               <a:ln>
                 <a:noFill/>
               </a:ln>
@@ -4115,8 +4089,8 @@
         </p:nvSpPr>
         <p:spPr bwMode="auto">
           <a:xfrm>
-            <a:off x="12543424" y="28847345"/>
-            <a:ext cx="19277973" cy="440536"/>
+            <a:off x="11806011" y="30355635"/>
+            <a:ext cx="20279179" cy="200565"/>
           </a:xfrm>
           <a:prstGeom prst="rect">
             <a:avLst/>
@@ -4259,7 +4233,7 @@
           <a:p>
             <a:pPr algn="ctr"/>
             <a:r>
-              <a:rPr lang="en-US" sz="3600" dirty="0">
+              <a:rPr lang="en-US" sz="3200" dirty="0">
                 <a:ln w="0"/>
                 <a:effectLst>
                   <a:outerShdw blurRad="38100" dist="19050" dir="2700000" algn="tl" rotWithShape="0">
@@ -4367,8 +4341,8 @@
         </p:blipFill>
         <p:spPr bwMode="auto">
           <a:xfrm>
-            <a:off x="33305452" y="30251400"/>
-            <a:ext cx="6342799" cy="2675570"/>
+            <a:off x="38219901" y="30355635"/>
+            <a:ext cx="5366499" cy="2334165"/>
           </a:xfrm>
           <a:prstGeom prst="rect">
             <a:avLst/>
@@ -5124,8 +5098,8 @@
         </p:blipFill>
         <p:spPr>
           <a:xfrm>
-            <a:off x="39706876" y="29287881"/>
-            <a:ext cx="3879524" cy="3418591"/>
+            <a:off x="38452385" y="25991098"/>
+            <a:ext cx="4921198" cy="4336502"/>
           </a:xfrm>
           <a:prstGeom prst="rect">
             <a:avLst/>
@@ -5154,7 +5128,7 @@
         </p:blipFill>
         <p:spPr>
           <a:xfrm>
-            <a:off x="9730874" y="14740897"/>
+            <a:off x="8703047" y="14740897"/>
             <a:ext cx="1546726" cy="1546726"/>
           </a:xfrm>
           <a:prstGeom prst="rect">
@@ -5162,36 +5136,6 @@
           </a:prstGeom>
         </p:spPr>
       </p:pic>
-      <p:pic>
-        <p:nvPicPr>
-          <p:cNvPr id="21" name="Picture 20"/>
-          <p:cNvPicPr>
-            <a:picLocks noChangeAspect="1"/>
-          </p:cNvPicPr>
-          <p:nvPr/>
-        </p:nvPicPr>
-        <p:blipFill>
-          <a:blip r:embed="rId9" cstate="print">
-            <a:extLst>
-              <a:ext uri="{28A0092B-C50C-407E-A947-70E740481C1C}">
-                <a14:useLocalDpi xmlns:a14="http://schemas.microsoft.com/office/drawing/2010/main" val="0"/>
-              </a:ext>
-            </a:extLst>
-          </a:blip>
-          <a:stretch>
-            <a:fillRect/>
-          </a:stretch>
-        </p:blipFill>
-        <p:spPr>
-          <a:xfrm>
-            <a:off x="34724474" y="14740897"/>
-            <a:ext cx="1546726" cy="1546726"/>
-          </a:xfrm>
-          <a:prstGeom prst="rect">
-            <a:avLst/>
-          </a:prstGeom>
-        </p:spPr>
-      </p:pic>
       <p:sp>
         <p:nvSpPr>
           <p:cNvPr id="29" name="Pentagon 28"/>
@@ -5200,8 +5144,8 @@
         </p:nvSpPr>
         <p:spPr>
           <a:xfrm rot="16200000">
-            <a:off x="8708662" y="7637431"/>
-            <a:ext cx="8755985" cy="491523"/>
+            <a:off x="8862961" y="7791727"/>
+            <a:ext cx="8447388" cy="491523"/>
           </a:xfrm>
           <a:prstGeom prst="homePlate">
             <a:avLst/>
@@ -5241,8 +5185,8 @@
         </p:nvSpPr>
         <p:spPr>
           <a:xfrm rot="16200000">
-            <a:off x="7962202" y="7641543"/>
-            <a:ext cx="8763000" cy="491523"/>
+            <a:off x="8116625" y="7795963"/>
+            <a:ext cx="8454156" cy="491523"/>
           </a:xfrm>
           <a:prstGeom prst="homePlate">
             <a:avLst/>
@@ -5323,8 +5267,8 @@
         </p:nvSpPr>
         <p:spPr>
           <a:xfrm rot="16200000">
-            <a:off x="11781666" y="9234125"/>
-            <a:ext cx="5547364" cy="491523"/>
+            <a:off x="12022947" y="9475402"/>
+            <a:ext cx="5064805" cy="491523"/>
           </a:xfrm>
           <a:prstGeom prst="homePlate">
             <a:avLst/>
@@ -5364,8 +5308,8 @@
         </p:nvSpPr>
         <p:spPr>
           <a:xfrm rot="16200000">
-            <a:off x="11038713" y="9241745"/>
-            <a:ext cx="5547364" cy="491523"/>
+            <a:off x="11279994" y="9483022"/>
+            <a:ext cx="5064805" cy="491523"/>
           </a:xfrm>
           <a:prstGeom prst="homePlate">
             <a:avLst/>
@@ -5469,8 +5413,8 @@
         </p:nvSpPr>
         <p:spPr>
           <a:xfrm rot="16200000">
-            <a:off x="13256026" y="9234125"/>
-            <a:ext cx="5547364" cy="491523"/>
+            <a:off x="13497307" y="9475402"/>
+            <a:ext cx="5064805" cy="491523"/>
           </a:xfrm>
           <a:prstGeom prst="homePlate">
             <a:avLst/>
@@ -5510,8 +5454,8 @@
         </p:nvSpPr>
         <p:spPr>
           <a:xfrm rot="16200000">
-            <a:off x="12513073" y="9241745"/>
-            <a:ext cx="5547364" cy="491523"/>
+            <a:off x="12754354" y="9483022"/>
+            <a:ext cx="5064805" cy="491523"/>
           </a:xfrm>
           <a:prstGeom prst="homePlate">
             <a:avLst/>
@@ -5715,7 +5659,7 @@
           <a:lstStyle/>
           <a:p>
             <a:r>
-              <a:rPr lang="en-US" sz="3200" b="1">
+              <a:rPr lang="en-US" sz="3200" b="1" dirty="0">
                 <a:solidFill>
                   <a:srgbClr val="FFFFFF"/>
                 </a:solidFill>
@@ -5727,7 +5671,7 @@
               <a:t>04 34 CB 73</a:t>
             </a:r>
             <a:r>
-              <a:rPr lang="en-US" sz="3200" b="1">
+              <a:rPr lang="en-US" sz="3200" b="1" dirty="0">
                 <a:solidFill>
                   <a:srgbClr val="FFFFFF"/>
                 </a:solidFill>
@@ -5736,7 +5680,7 @@
               <a:t> </a:t>
             </a:r>
             <a:r>
-              <a:rPr lang="en-US" sz="3200" b="1">
+              <a:rPr lang="en-US" sz="3200" b="1" dirty="0">
                 <a:solidFill>
                   <a:srgbClr val="FFFFFF"/>
                 </a:solidFill>
@@ -5748,7 +5692,7 @@
               <a:t>2A 74 40 81</a:t>
             </a:r>
             <a:r>
-              <a:rPr lang="en-US" sz="3200" b="1">
+              <a:rPr lang="en-US" sz="3200" b="1" dirty="0">
                 <a:solidFill>
                   <a:srgbClr val="000000"/>
                 </a:solidFill>
@@ -5757,7 +5701,7 @@
               <a:t> </a:t>
             </a:r>
             <a:r>
-              <a:rPr lang="en-US" sz="3200" b="1">
+              <a:rPr lang="en-US" sz="3200" b="1" dirty="0">
                 <a:solidFill>
                   <a:srgbClr val="FFFFFF"/>
                 </a:solidFill>
@@ -5766,19 +5710,7 @@
                 </a:highlight>
                 <a:latin typeface="Courier New" panose="02070309020205020404" pitchFamily="49" charset="0"/>
               </a:rPr>
-              <a:t>9F </a:t>
-            </a:r>
-            <a:r>
-              <a:rPr lang="en-US" sz="3200" b="1" dirty="0">
-                <a:solidFill>
-                  <a:srgbClr val="FFFFFF"/>
-                </a:solidFill>
-                <a:highlight>
-                  <a:srgbClr val="000000"/>
-                </a:highlight>
-                <a:latin typeface="Courier New" panose="02070309020205020404" pitchFamily="49" charset="0"/>
-              </a:rPr>
-              <a:t>48 </a:t>
+              <a:t>9F 48 </a:t>
             </a:r>
             <a:r>
               <a:rPr lang="fi-FI" sz="3200" b="1" dirty="0">
@@ -6469,7 +6401,7 @@
         </p:nvSpPr>
         <p:spPr>
           <a:xfrm rot="5400000">
-            <a:off x="25384989" y="20220765"/>
+            <a:off x="25384989" y="20144565"/>
             <a:ext cx="1798095" cy="584775"/>
           </a:xfrm>
           <a:prstGeom prst="rect">
@@ -6501,7 +6433,7 @@
         </p:nvSpPr>
         <p:spPr>
           <a:xfrm rot="5400000">
-            <a:off x="26117416" y="20220764"/>
+            <a:off x="26117416" y="20144564"/>
             <a:ext cx="1798092" cy="584775"/>
           </a:xfrm>
           <a:prstGeom prst="rect">
@@ -6711,7 +6643,7 @@
         </p:nvSpPr>
         <p:spPr>
           <a:xfrm rot="5400000">
-            <a:off x="14481521" y="19912042"/>
+            <a:off x="14481521" y="19999557"/>
             <a:ext cx="1478511" cy="584775"/>
           </a:xfrm>
           <a:prstGeom prst="rect">
@@ -6825,7 +6757,7 @@
         </p:nvSpPr>
         <p:spPr>
           <a:xfrm rot="5400000">
-            <a:off x="15198633" y="19912042"/>
+            <a:off x="15198633" y="19999557"/>
             <a:ext cx="1478511" cy="584775"/>
           </a:xfrm>
           <a:prstGeom prst="rect">
@@ -6857,7 +6789,7 @@
         </p:nvSpPr>
         <p:spPr>
           <a:xfrm rot="5400000">
-            <a:off x="15955881" y="19912042"/>
+            <a:off x="15955881" y="19999557"/>
             <a:ext cx="1478511" cy="584775"/>
           </a:xfrm>
           <a:prstGeom prst="rect">
@@ -7385,8 +7317,8 @@
         </p:nvSpPr>
         <p:spPr>
           <a:xfrm rot="10800000" flipH="1">
-            <a:off x="13537214" y="3581401"/>
-            <a:ext cx="20506317" cy="2942369"/>
+            <a:off x="13537214" y="3814649"/>
+            <a:ext cx="23557010" cy="3195750"/>
           </a:xfrm>
           <a:prstGeom prst="snip2DiagRect">
             <a:avLst/>
@@ -7463,8 +7395,8 @@
         </p:nvSpPr>
         <p:spPr>
           <a:xfrm rot="10800000" flipH="1">
-            <a:off x="12051309" y="390202"/>
-            <a:ext cx="21992222" cy="2942369"/>
+            <a:off x="12051308" y="390199"/>
+            <a:ext cx="25042916" cy="3238466"/>
           </a:xfrm>
           <a:prstGeom prst="snip2DiagRect">
             <a:avLst/>
@@ -7544,8 +7476,8 @@
         </p:nvSpPr>
         <p:spPr>
           <a:xfrm rot="10800000" flipH="1">
-            <a:off x="25298151" y="6781800"/>
-            <a:ext cx="8745379" cy="2746202"/>
+            <a:off x="25298151" y="7196382"/>
+            <a:ext cx="11796073" cy="2209790"/>
           </a:xfrm>
           <a:prstGeom prst="snip2DiagRect">
             <a:avLst/>
@@ -7610,7 +7542,7 @@
           <a:lstStyle/>
           <a:p>
             <a:pPr algn="ctr"/>
-            <a:endParaRPr lang="en-US"/>
+            <a:endParaRPr lang="en-US" dirty="0"/>
           </a:p>
         </p:txBody>
       </p:sp>
@@ -7623,7 +7555,7 @@
         <p:spPr>
           <a:xfrm>
             <a:off x="12326531" y="533400"/>
-            <a:ext cx="21488399" cy="1569660"/>
+            <a:ext cx="23628691" cy="1815882"/>
           </a:xfrm>
           <a:prstGeom prst="rect">
             <a:avLst/>
@@ -7637,42 +7569,42 @@
           <a:lstStyle/>
           <a:p>
             <a:r>
-              <a:rPr lang="en-US" sz="2400" b="1" dirty="0">
+              <a:rPr lang="en-US" sz="2800" b="1" dirty="0">
                 <a:latin typeface="Courier New" panose="02070309020205020404" pitchFamily="49" charset="0"/>
                 <a:cs typeface="Courier New" panose="02070309020205020404" pitchFamily="49" charset="0"/>
               </a:rPr>
-              <a:t>STATIC LOCK BYTES: Field Programmable Read-Only Locking Mechanism</a:t>
-            </a:r>
-          </a:p>
-          <a:p>
-            <a:r>
-              <a:rPr lang="en-US" sz="2400" b="1" dirty="0">
+              <a:t>[STATIC LOCK BYTES] - Field Programmable Read-Only Locking Mechanism</a:t>
+            </a:r>
+          </a:p>
+          <a:p>
+            <a:r>
+              <a:rPr lang="en-US" sz="2800" b="1" dirty="0">
                 <a:latin typeface="Courier New" panose="02070309020205020404" pitchFamily="49" charset="0"/>
                 <a:cs typeface="Courier New" panose="02070309020205020404" pitchFamily="49" charset="0"/>
               </a:rPr>
-              <a:t>MEMORY LOCATION:   PAGE 02h (Hex)</a:t>
-            </a:r>
-          </a:p>
-          <a:p>
-            <a:r>
-              <a:rPr lang="en-US" sz="2400" b="1" dirty="0">
+              <a:t>  [MEMORY LOCATION] - PAGE 02h (Hex)</a:t>
+            </a:r>
+          </a:p>
+          <a:p>
+            <a:r>
+              <a:rPr lang="en-US" sz="2800" b="1" dirty="0">
                 <a:latin typeface="Courier New" panose="02070309020205020404" pitchFamily="49" charset="0"/>
                 <a:cs typeface="Courier New" panose="02070309020205020404" pitchFamily="49" charset="0"/>
               </a:rPr>
-              <a:t>DETAILS:           Each bit represents an individual 16-bit page from 03h to 0Fh. Bits set to 1</a:t>
+              <a:t>          [DETAILS] - Each bit represents an individual 16-bit page from 03h to 0Fh. Bits set to 1 permanently</a:t>
             </a:r>
             <a:br>
-              <a:rPr lang="en-US" sz="2400" b="1" dirty="0">
+              <a:rPr lang="en-US" sz="2800" b="1" dirty="0">
                 <a:latin typeface="Courier New" panose="02070309020205020404" pitchFamily="49" charset="0"/>
                 <a:cs typeface="Courier New" panose="02070309020205020404" pitchFamily="49" charset="0"/>
               </a:rPr>
             </a:br>
             <a:r>
-              <a:rPr lang="en-US" sz="2400" b="1" dirty="0">
+              <a:rPr lang="en-US" sz="2800" b="1" dirty="0">
                 <a:latin typeface="Courier New" panose="02070309020205020404" pitchFamily="49" charset="0"/>
                 <a:cs typeface="Courier New" panose="02070309020205020404" pitchFamily="49" charset="0"/>
               </a:rPr>
-              <a:t>                   permanently lock their corresponding pages as read-only.</a:t>
+              <a:t>                      lock their corresponding pages as read-only.</a:t>
             </a:r>
           </a:p>
         </p:txBody>
@@ -7717,7 +7649,7 @@
         </p:nvSpPr>
         <p:spPr>
           <a:xfrm rot="5400000">
-            <a:off x="26849841" y="20220764"/>
+            <a:off x="26849841" y="20144564"/>
             <a:ext cx="1798092" cy="584775"/>
           </a:xfrm>
           <a:prstGeom prst="rect">
@@ -7750,14 +7682,14 @@
           <p:nvPr>
             <p:extLst>
               <p:ext uri="{D42A27DB-BD31-4B8C-83A1-F6EECF244321}">
-                <p14:modId xmlns:p14="http://schemas.microsoft.com/office/powerpoint/2010/main" val="3072200920"/>
+                <p14:modId xmlns:p14="http://schemas.microsoft.com/office/powerpoint/2010/main" val="849221676"/>
               </p:ext>
             </p:extLst>
           </p:nvPr>
         </p:nvGraphicFramePr>
         <p:xfrm>
-          <a:off x="12326531" y="2133600"/>
-          <a:ext cx="10338912" cy="1059080"/>
+          <a:off x="17068800" y="2362200"/>
+          <a:ext cx="9361424" cy="1059080"/>
         </p:xfrm>
         <a:graphic>
           <a:graphicData uri="http://schemas.openxmlformats.org/drawingml/2006/table">
@@ -7767,56 +7699,56 @@
                 <a:tableStyleId>{5C22544A-7EE6-4342-B048-85BDC9FD1C3A}</a:tableStyleId>
               </a:tblPr>
               <a:tblGrid>
-                <a:gridCol w="1292364">
+                <a:gridCol w="1170178">
                   <a:extLst>
                     <a:ext uri="{9D8B030D-6E8A-4147-A177-3AD203B41FA5}">
                       <a16:colId xmlns:a16="http://schemas.microsoft.com/office/drawing/2014/main" val="3022783514"/>
                     </a:ext>
                   </a:extLst>
                 </a:gridCol>
-                <a:gridCol w="1292364">
+                <a:gridCol w="1170178">
                   <a:extLst>
                     <a:ext uri="{9D8B030D-6E8A-4147-A177-3AD203B41FA5}">
                       <a16:colId xmlns:a16="http://schemas.microsoft.com/office/drawing/2014/main" val="757080785"/>
                     </a:ext>
                   </a:extLst>
                 </a:gridCol>
-                <a:gridCol w="1292364">
+                <a:gridCol w="1170178">
                   <a:extLst>
                     <a:ext uri="{9D8B030D-6E8A-4147-A177-3AD203B41FA5}">
                       <a16:colId xmlns:a16="http://schemas.microsoft.com/office/drawing/2014/main" val="2276908230"/>
                     </a:ext>
                   </a:extLst>
                 </a:gridCol>
-                <a:gridCol w="1292364">
+                <a:gridCol w="1170178">
                   <a:extLst>
                     <a:ext uri="{9D8B030D-6E8A-4147-A177-3AD203B41FA5}">
                       <a16:colId xmlns:a16="http://schemas.microsoft.com/office/drawing/2014/main" val="645744466"/>
                     </a:ext>
                   </a:extLst>
                 </a:gridCol>
-                <a:gridCol w="1292364">
+                <a:gridCol w="1170178">
                   <a:extLst>
                     <a:ext uri="{9D8B030D-6E8A-4147-A177-3AD203B41FA5}">
                       <a16:colId xmlns:a16="http://schemas.microsoft.com/office/drawing/2014/main" val="3599940090"/>
                     </a:ext>
                   </a:extLst>
                 </a:gridCol>
-                <a:gridCol w="1292364">
+                <a:gridCol w="1170178">
                   <a:extLst>
                     <a:ext uri="{9D8B030D-6E8A-4147-A177-3AD203B41FA5}">
                       <a16:colId xmlns:a16="http://schemas.microsoft.com/office/drawing/2014/main" val="2077798771"/>
                     </a:ext>
                   </a:extLst>
                 </a:gridCol>
-                <a:gridCol w="1292364">
+                <a:gridCol w="1170178">
                   <a:extLst>
                     <a:ext uri="{9D8B030D-6E8A-4147-A177-3AD203B41FA5}">
                       <a16:colId xmlns:a16="http://schemas.microsoft.com/office/drawing/2014/main" val="1876429225"/>
                     </a:ext>
                   </a:extLst>
                 </a:gridCol>
-                <a:gridCol w="1292364">
+                <a:gridCol w="1170178">
                   <a:extLst>
                     <a:ext uri="{9D8B030D-6E8A-4147-A177-3AD203B41FA5}">
                       <a16:colId xmlns:a16="http://schemas.microsoft.com/office/drawing/2014/main" val="73856520"/>
@@ -7832,7 +7764,7 @@
                     <a:p>
                       <a:pPr algn="ctr"/>
                       <a:r>
-                        <a:rPr lang="en-US" sz="2800" dirty="0">
+                        <a:rPr lang="en-US" sz="2000" dirty="0">
                           <a:latin typeface="Courier New" panose="02070309020205020404" pitchFamily="49" charset="0"/>
                           <a:cs typeface="Courier New" panose="02070309020205020404" pitchFamily="49" charset="0"/>
                         </a:rPr>
@@ -7897,7 +7829,7 @@
                     <a:p>
                       <a:pPr algn="ctr"/>
                       <a:r>
-                        <a:rPr lang="en-US" sz="2800" dirty="0">
+                        <a:rPr lang="en-US" sz="2000" dirty="0">
                           <a:latin typeface="Courier New" panose="02070309020205020404" pitchFamily="49" charset="0"/>
                           <a:cs typeface="Courier New" panose="02070309020205020404" pitchFamily="49" charset="0"/>
                         </a:rPr>
@@ -7962,7 +7894,7 @@
                     <a:p>
                       <a:pPr algn="ctr"/>
                       <a:r>
-                        <a:rPr lang="en-US" sz="2800" dirty="0">
+                        <a:rPr lang="en-US" sz="2000" dirty="0">
                           <a:latin typeface="Courier New" panose="02070309020205020404" pitchFamily="49" charset="0"/>
                           <a:cs typeface="Courier New" panose="02070309020205020404" pitchFamily="49" charset="0"/>
                         </a:rPr>
@@ -8027,7 +7959,7 @@
                     <a:p>
                       <a:pPr algn="ctr"/>
                       <a:r>
-                        <a:rPr lang="en-US" sz="2800" dirty="0">
+                        <a:rPr lang="en-US" sz="2000" dirty="0">
                           <a:latin typeface="Courier New" panose="02070309020205020404" pitchFamily="49" charset="0"/>
                           <a:cs typeface="Courier New" panose="02070309020205020404" pitchFamily="49" charset="0"/>
                         </a:rPr>
@@ -8092,7 +8024,7 @@
                     <a:p>
                       <a:pPr algn="ctr"/>
                       <a:r>
-                        <a:rPr lang="en-US" sz="2800" dirty="0">
+                        <a:rPr lang="en-US" sz="2000" dirty="0">
                           <a:latin typeface="Courier New" panose="02070309020205020404" pitchFamily="49" charset="0"/>
                           <a:cs typeface="Courier New" panose="02070309020205020404" pitchFamily="49" charset="0"/>
                         </a:rPr>
@@ -8102,7 +8034,7 @@
                     <a:p>
                       <a:pPr algn="ctr"/>
                       <a:r>
-                        <a:rPr lang="en-US" sz="2800" dirty="0">
+                        <a:rPr lang="en-US" sz="2000" dirty="0">
                           <a:latin typeface="Courier New" panose="02070309020205020404" pitchFamily="49" charset="0"/>
                           <a:cs typeface="Courier New" panose="02070309020205020404" pitchFamily="49" charset="0"/>
                         </a:rPr>
@@ -8167,7 +8099,7 @@
                     <a:p>
                       <a:pPr algn="ctr"/>
                       <a:r>
-                        <a:rPr lang="en-US" sz="2800" dirty="0">
+                        <a:rPr lang="en-US" sz="2000" dirty="0">
                           <a:latin typeface="Courier New" panose="02070309020205020404" pitchFamily="49" charset="0"/>
                           <a:cs typeface="Courier New" panose="02070309020205020404" pitchFamily="49" charset="0"/>
                         </a:rPr>
@@ -8177,7 +8109,7 @@
                     <a:p>
                       <a:pPr algn="ctr"/>
                       <a:r>
-                        <a:rPr lang="en-US" sz="2800" dirty="0">
+                        <a:rPr lang="en-US" sz="2000" dirty="0">
                           <a:latin typeface="Courier New" panose="02070309020205020404" pitchFamily="49" charset="0"/>
                           <a:cs typeface="Courier New" panose="02070309020205020404" pitchFamily="49" charset="0"/>
                         </a:rPr>
@@ -8242,7 +8174,7 @@
                     <a:p>
                       <a:pPr algn="ctr"/>
                       <a:r>
-                        <a:rPr lang="en-US" sz="2800" dirty="0">
+                        <a:rPr lang="en-US" sz="2000" dirty="0">
                           <a:latin typeface="Courier New" panose="02070309020205020404" pitchFamily="49" charset="0"/>
                           <a:cs typeface="Courier New" panose="02070309020205020404" pitchFamily="49" charset="0"/>
                         </a:rPr>
@@ -8252,7 +8184,7 @@
                     <a:p>
                       <a:pPr algn="ctr"/>
                       <a:r>
-                        <a:rPr lang="en-US" sz="2800" dirty="0">
+                        <a:rPr lang="en-US" sz="2000" dirty="0">
                           <a:latin typeface="Courier New" panose="02070309020205020404" pitchFamily="49" charset="0"/>
                           <a:cs typeface="Courier New" panose="02070309020205020404" pitchFamily="49" charset="0"/>
                         </a:rPr>
@@ -8317,7 +8249,7 @@
                     <a:p>
                       <a:pPr algn="ctr"/>
                       <a:r>
-                        <a:rPr lang="en-US" sz="2800" dirty="0">
+                        <a:rPr lang="en-US" sz="2000" dirty="0">
                           <a:latin typeface="Courier New" panose="02070309020205020404" pitchFamily="49" charset="0"/>
                           <a:cs typeface="Courier New" panose="02070309020205020404" pitchFamily="49" charset="0"/>
                         </a:rPr>
@@ -8327,7 +8259,7 @@
                     <a:p>
                       <a:pPr algn="ctr"/>
                       <a:r>
-                        <a:rPr lang="en-US" sz="2800" dirty="0">
+                        <a:rPr lang="en-US" sz="2000" dirty="0">
                           <a:latin typeface="Courier New" panose="02070309020205020404" pitchFamily="49" charset="0"/>
                           <a:cs typeface="Courier New" panose="02070309020205020404" pitchFamily="49" charset="0"/>
                         </a:rPr>
@@ -8404,14 +8336,14 @@
           <p:nvPr>
             <p:extLst>
               <p:ext uri="{D42A27DB-BD31-4B8C-83A1-F6EECF244321}">
-                <p14:modId xmlns:p14="http://schemas.microsoft.com/office/powerpoint/2010/main" val="531979001"/>
+                <p14:modId xmlns:p14="http://schemas.microsoft.com/office/powerpoint/2010/main" val="2531200680"/>
               </p:ext>
             </p:extLst>
           </p:nvPr>
         </p:nvGraphicFramePr>
         <p:xfrm>
-          <a:off x="23018819" y="2104707"/>
-          <a:ext cx="10338912" cy="1059080"/>
+          <a:off x="26593800" y="2362200"/>
+          <a:ext cx="9361424" cy="1059080"/>
         </p:xfrm>
         <a:graphic>
           <a:graphicData uri="http://schemas.openxmlformats.org/drawingml/2006/table">
@@ -8421,56 +8353,56 @@
                 <a:tableStyleId>{5C22544A-7EE6-4342-B048-85BDC9FD1C3A}</a:tableStyleId>
               </a:tblPr>
               <a:tblGrid>
-                <a:gridCol w="1292364">
+                <a:gridCol w="1170178">
                   <a:extLst>
                     <a:ext uri="{9D8B030D-6E8A-4147-A177-3AD203B41FA5}">
                       <a16:colId xmlns:a16="http://schemas.microsoft.com/office/drawing/2014/main" val="3022783514"/>
                     </a:ext>
                   </a:extLst>
                 </a:gridCol>
-                <a:gridCol w="1292364">
+                <a:gridCol w="1170178">
                   <a:extLst>
                     <a:ext uri="{9D8B030D-6E8A-4147-A177-3AD203B41FA5}">
                       <a16:colId xmlns:a16="http://schemas.microsoft.com/office/drawing/2014/main" val="757080785"/>
                     </a:ext>
                   </a:extLst>
                 </a:gridCol>
-                <a:gridCol w="1292364">
+                <a:gridCol w="1170178">
                   <a:extLst>
                     <a:ext uri="{9D8B030D-6E8A-4147-A177-3AD203B41FA5}">
                       <a16:colId xmlns:a16="http://schemas.microsoft.com/office/drawing/2014/main" val="2276908230"/>
                     </a:ext>
                   </a:extLst>
                 </a:gridCol>
-                <a:gridCol w="1292364">
+                <a:gridCol w="1170178">
                   <a:extLst>
                     <a:ext uri="{9D8B030D-6E8A-4147-A177-3AD203B41FA5}">
                       <a16:colId xmlns:a16="http://schemas.microsoft.com/office/drawing/2014/main" val="645744466"/>
                     </a:ext>
                   </a:extLst>
                 </a:gridCol>
-                <a:gridCol w="1292364">
+                <a:gridCol w="1170178">
                   <a:extLst>
                     <a:ext uri="{9D8B030D-6E8A-4147-A177-3AD203B41FA5}">
                       <a16:colId xmlns:a16="http://schemas.microsoft.com/office/drawing/2014/main" val="3599940090"/>
                     </a:ext>
                   </a:extLst>
                 </a:gridCol>
-                <a:gridCol w="1292364">
+                <a:gridCol w="1170178">
                   <a:extLst>
                     <a:ext uri="{9D8B030D-6E8A-4147-A177-3AD203B41FA5}">
                       <a16:colId xmlns:a16="http://schemas.microsoft.com/office/drawing/2014/main" val="2077798771"/>
                     </a:ext>
                   </a:extLst>
                 </a:gridCol>
-                <a:gridCol w="1292364">
+                <a:gridCol w="1170178">
                   <a:extLst>
                     <a:ext uri="{9D8B030D-6E8A-4147-A177-3AD203B41FA5}">
                       <a16:colId xmlns:a16="http://schemas.microsoft.com/office/drawing/2014/main" val="1876429225"/>
                     </a:ext>
                   </a:extLst>
                 </a:gridCol>
-                <a:gridCol w="1292364">
+                <a:gridCol w="1170178">
                   <a:extLst>
                     <a:ext uri="{9D8B030D-6E8A-4147-A177-3AD203B41FA5}">
                       <a16:colId xmlns:a16="http://schemas.microsoft.com/office/drawing/2014/main" val="73856520"/>
@@ -8484,20 +8416,28 @@
                     <a:bodyPr/>
                     <a:lstStyle/>
                     <a:p>
-                      <a:pPr algn="ctr"/>
+                      <a:pPr marL="0" algn="ctr" defTabSz="4388419" rtl="0" eaLnBrk="1" latinLnBrk="0" hangingPunct="1"/>
                       <a:r>
-                        <a:rPr lang="en-US" sz="2800" dirty="0">
+                        <a:rPr lang="en-US" sz="2000" kern="1200" dirty="0">
+                          <a:solidFill>
+                            <a:schemeClr val="dk1"/>
+                          </a:solidFill>
                           <a:latin typeface="Courier New" panose="02070309020205020404" pitchFamily="49" charset="0"/>
+                          <a:ea typeface="+mn-ea"/>
                           <a:cs typeface="Courier New" panose="02070309020205020404" pitchFamily="49" charset="0"/>
                         </a:rPr>
                         <a:t>L</a:t>
                       </a:r>
                     </a:p>
                     <a:p>
-                      <a:pPr algn="ctr"/>
+                      <a:pPr marL="0" algn="ctr" defTabSz="4388419" rtl="0" eaLnBrk="1" latinLnBrk="0" hangingPunct="1"/>
                       <a:r>
-                        <a:rPr lang="en-US" sz="2800" dirty="0">
+                        <a:rPr lang="en-US" sz="2000" kern="1200" dirty="0">
+                          <a:solidFill>
+                            <a:schemeClr val="dk1"/>
+                          </a:solidFill>
                           <a:latin typeface="Courier New" panose="02070309020205020404" pitchFamily="49" charset="0"/>
+                          <a:ea typeface="+mn-ea"/>
                           <a:cs typeface="Courier New" panose="02070309020205020404" pitchFamily="49" charset="0"/>
                         </a:rPr>
                         <a:t>15</a:t>
@@ -8559,20 +8499,28 @@
                     <a:bodyPr/>
                     <a:lstStyle/>
                     <a:p>
-                      <a:pPr algn="ctr"/>
+                      <a:pPr marL="0" algn="ctr" defTabSz="4388419" rtl="0" eaLnBrk="1" latinLnBrk="0" hangingPunct="1"/>
                       <a:r>
-                        <a:rPr lang="en-US" sz="2800" dirty="0">
+                        <a:rPr lang="en-US" sz="2000" kern="1200" dirty="0">
+                          <a:solidFill>
+                            <a:schemeClr val="dk1"/>
+                          </a:solidFill>
                           <a:latin typeface="Courier New" panose="02070309020205020404" pitchFamily="49" charset="0"/>
+                          <a:ea typeface="+mn-ea"/>
                           <a:cs typeface="Courier New" panose="02070309020205020404" pitchFamily="49" charset="0"/>
                         </a:rPr>
                         <a:t>L</a:t>
                       </a:r>
                     </a:p>
                     <a:p>
-                      <a:pPr algn="ctr"/>
+                      <a:pPr marL="0" algn="ctr" defTabSz="4388419" rtl="0" eaLnBrk="1" latinLnBrk="0" hangingPunct="1"/>
                       <a:r>
-                        <a:rPr lang="en-US" sz="2800" dirty="0">
+                        <a:rPr lang="en-US" sz="2000" kern="1200" dirty="0">
+                          <a:solidFill>
+                            <a:schemeClr val="dk1"/>
+                          </a:solidFill>
                           <a:latin typeface="Courier New" panose="02070309020205020404" pitchFamily="49" charset="0"/>
+                          <a:ea typeface="+mn-ea"/>
                           <a:cs typeface="Courier New" panose="02070309020205020404" pitchFamily="49" charset="0"/>
                         </a:rPr>
                         <a:t>14</a:t>
@@ -8634,20 +8582,28 @@
                     <a:bodyPr/>
                     <a:lstStyle/>
                     <a:p>
-                      <a:pPr algn="ctr"/>
+                      <a:pPr marL="0" algn="ctr" defTabSz="4388419" rtl="0" eaLnBrk="1" latinLnBrk="0" hangingPunct="1"/>
                       <a:r>
-                        <a:rPr lang="en-US" sz="2800" dirty="0">
+                        <a:rPr lang="en-US" sz="2000" kern="1200" dirty="0">
+                          <a:solidFill>
+                            <a:schemeClr val="dk1"/>
+                          </a:solidFill>
                           <a:latin typeface="Courier New" panose="02070309020205020404" pitchFamily="49" charset="0"/>
+                          <a:ea typeface="+mn-ea"/>
                           <a:cs typeface="Courier New" panose="02070309020205020404" pitchFamily="49" charset="0"/>
                         </a:rPr>
                         <a:t>L</a:t>
                       </a:r>
                     </a:p>
                     <a:p>
-                      <a:pPr algn="ctr"/>
+                      <a:pPr marL="0" algn="ctr" defTabSz="4388419" rtl="0" eaLnBrk="1" latinLnBrk="0" hangingPunct="1"/>
                       <a:r>
-                        <a:rPr lang="en-US" sz="2800" dirty="0">
+                        <a:rPr lang="en-US" sz="2000" kern="1200" dirty="0">
+                          <a:solidFill>
+                            <a:schemeClr val="dk1"/>
+                          </a:solidFill>
                           <a:latin typeface="Courier New" panose="02070309020205020404" pitchFamily="49" charset="0"/>
+                          <a:ea typeface="+mn-ea"/>
                           <a:cs typeface="Courier New" panose="02070309020205020404" pitchFamily="49" charset="0"/>
                         </a:rPr>
                         <a:t>13</a:t>
@@ -8709,20 +8665,28 @@
                     <a:bodyPr/>
                     <a:lstStyle/>
                     <a:p>
-                      <a:pPr algn="ctr"/>
+                      <a:pPr marL="0" algn="ctr" defTabSz="4388419" rtl="0" eaLnBrk="1" latinLnBrk="0" hangingPunct="1"/>
                       <a:r>
-                        <a:rPr lang="en-US" sz="2800" dirty="0">
+                        <a:rPr lang="en-US" sz="2000" kern="1200" dirty="0">
+                          <a:solidFill>
+                            <a:schemeClr val="dk1"/>
+                          </a:solidFill>
                           <a:latin typeface="Courier New" panose="02070309020205020404" pitchFamily="49" charset="0"/>
+                          <a:ea typeface="+mn-ea"/>
                           <a:cs typeface="Courier New" panose="02070309020205020404" pitchFamily="49" charset="0"/>
                         </a:rPr>
                         <a:t>L</a:t>
                       </a:r>
                     </a:p>
                     <a:p>
-                      <a:pPr algn="ctr"/>
+                      <a:pPr marL="0" algn="ctr" defTabSz="4388419" rtl="0" eaLnBrk="1" latinLnBrk="0" hangingPunct="1"/>
                       <a:r>
-                        <a:rPr lang="en-US" sz="2800" dirty="0">
+                        <a:rPr lang="en-US" sz="2000" kern="1200" dirty="0">
+                          <a:solidFill>
+                            <a:schemeClr val="dk1"/>
+                          </a:solidFill>
                           <a:latin typeface="Courier New" panose="02070309020205020404" pitchFamily="49" charset="0"/>
+                          <a:ea typeface="+mn-ea"/>
                           <a:cs typeface="Courier New" panose="02070309020205020404" pitchFamily="49" charset="0"/>
                         </a:rPr>
                         <a:t>12</a:t>
@@ -8784,20 +8748,28 @@
                     <a:bodyPr/>
                     <a:lstStyle/>
                     <a:p>
-                      <a:pPr algn="ctr"/>
+                      <a:pPr marL="0" algn="ctr" defTabSz="4388419" rtl="0" eaLnBrk="1" latinLnBrk="0" hangingPunct="1"/>
                       <a:r>
-                        <a:rPr lang="en-US" sz="2800" dirty="0">
+                        <a:rPr lang="en-US" sz="2000" kern="1200" dirty="0">
+                          <a:solidFill>
+                            <a:schemeClr val="dk1"/>
+                          </a:solidFill>
                           <a:latin typeface="Courier New" panose="02070309020205020404" pitchFamily="49" charset="0"/>
+                          <a:ea typeface="+mn-ea"/>
                           <a:cs typeface="Courier New" panose="02070309020205020404" pitchFamily="49" charset="0"/>
                         </a:rPr>
                         <a:t>L</a:t>
                       </a:r>
                     </a:p>
                     <a:p>
-                      <a:pPr algn="ctr"/>
+                      <a:pPr marL="0" algn="ctr" defTabSz="4388419" rtl="0" eaLnBrk="1" latinLnBrk="0" hangingPunct="1"/>
                       <a:r>
-                        <a:rPr lang="en-US" sz="2800" dirty="0">
+                        <a:rPr lang="en-US" sz="2000" kern="1200" dirty="0">
+                          <a:solidFill>
+                            <a:schemeClr val="dk1"/>
+                          </a:solidFill>
                           <a:latin typeface="Courier New" panose="02070309020205020404" pitchFamily="49" charset="0"/>
+                          <a:ea typeface="+mn-ea"/>
                           <a:cs typeface="Courier New" panose="02070309020205020404" pitchFamily="49" charset="0"/>
                         </a:rPr>
                         <a:t>11</a:t>
@@ -8859,20 +8831,28 @@
                     <a:bodyPr/>
                     <a:lstStyle/>
                     <a:p>
-                      <a:pPr algn="ctr"/>
+                      <a:pPr marL="0" algn="ctr" defTabSz="4388419" rtl="0" eaLnBrk="1" latinLnBrk="0" hangingPunct="1"/>
                       <a:r>
-                        <a:rPr lang="en-US" sz="2800" dirty="0">
+                        <a:rPr lang="en-US" sz="2000" kern="1200" dirty="0">
+                          <a:solidFill>
+                            <a:schemeClr val="dk1"/>
+                          </a:solidFill>
                           <a:latin typeface="Courier New" panose="02070309020205020404" pitchFamily="49" charset="0"/>
+                          <a:ea typeface="+mn-ea"/>
                           <a:cs typeface="Courier New" panose="02070309020205020404" pitchFamily="49" charset="0"/>
                         </a:rPr>
                         <a:t>L</a:t>
                       </a:r>
                     </a:p>
                     <a:p>
-                      <a:pPr algn="ctr"/>
+                      <a:pPr marL="0" algn="ctr" defTabSz="4388419" rtl="0" eaLnBrk="1" latinLnBrk="0" hangingPunct="1"/>
                       <a:r>
-                        <a:rPr lang="en-US" sz="2800" dirty="0">
+                        <a:rPr lang="en-US" sz="2000" kern="1200" dirty="0">
+                          <a:solidFill>
+                            <a:schemeClr val="dk1"/>
+                          </a:solidFill>
                           <a:latin typeface="Courier New" panose="02070309020205020404" pitchFamily="49" charset="0"/>
+                          <a:ea typeface="+mn-ea"/>
                           <a:cs typeface="Courier New" panose="02070309020205020404" pitchFamily="49" charset="0"/>
                         </a:rPr>
                         <a:t>10</a:t>
@@ -8934,20 +8914,28 @@
                     <a:bodyPr/>
                     <a:lstStyle/>
                     <a:p>
-                      <a:pPr algn="ctr"/>
+                      <a:pPr marL="0" algn="ctr" defTabSz="4388419" rtl="0" eaLnBrk="1" latinLnBrk="0" hangingPunct="1"/>
                       <a:r>
-                        <a:rPr lang="en-US" sz="2800" dirty="0">
+                        <a:rPr lang="en-US" sz="2000" kern="1200" dirty="0">
+                          <a:solidFill>
+                            <a:schemeClr val="dk1"/>
+                          </a:solidFill>
                           <a:latin typeface="Courier New" panose="02070309020205020404" pitchFamily="49" charset="0"/>
+                          <a:ea typeface="+mn-ea"/>
                           <a:cs typeface="Courier New" panose="02070309020205020404" pitchFamily="49" charset="0"/>
                         </a:rPr>
                         <a:t>L</a:t>
                       </a:r>
                     </a:p>
                     <a:p>
-                      <a:pPr algn="ctr"/>
+                      <a:pPr marL="0" algn="ctr" defTabSz="4388419" rtl="0" eaLnBrk="1" latinLnBrk="0" hangingPunct="1"/>
                       <a:r>
-                        <a:rPr lang="en-US" sz="2800" dirty="0">
+                        <a:rPr lang="en-US" sz="2000" kern="1200" dirty="0">
+                          <a:solidFill>
+                            <a:schemeClr val="dk1"/>
+                          </a:solidFill>
                           <a:latin typeface="Courier New" panose="02070309020205020404" pitchFamily="49" charset="0"/>
+                          <a:ea typeface="+mn-ea"/>
                           <a:cs typeface="Courier New" panose="02070309020205020404" pitchFamily="49" charset="0"/>
                         </a:rPr>
                         <a:t>9</a:t>
@@ -9009,20 +8997,28 @@
                     <a:bodyPr/>
                     <a:lstStyle/>
                     <a:p>
-                      <a:pPr algn="ctr"/>
+                      <a:pPr marL="0" algn="ctr" defTabSz="4388419" rtl="0" eaLnBrk="1" latinLnBrk="0" hangingPunct="1"/>
                       <a:r>
-                        <a:rPr lang="en-US" sz="2800" dirty="0">
+                        <a:rPr lang="en-US" sz="2000" kern="1200" dirty="0">
+                          <a:solidFill>
+                            <a:schemeClr val="dk1"/>
+                          </a:solidFill>
                           <a:latin typeface="Courier New" panose="02070309020205020404" pitchFamily="49" charset="0"/>
+                          <a:ea typeface="+mn-ea"/>
                           <a:cs typeface="Courier New" panose="02070309020205020404" pitchFamily="49" charset="0"/>
                         </a:rPr>
                         <a:t>L</a:t>
                       </a:r>
                     </a:p>
                     <a:p>
-                      <a:pPr algn="ctr"/>
+                      <a:pPr marL="0" algn="ctr" defTabSz="4388419" rtl="0" eaLnBrk="1" latinLnBrk="0" hangingPunct="1"/>
                       <a:r>
-                        <a:rPr lang="en-US" sz="2800" dirty="0">
+                        <a:rPr lang="en-US" sz="2000" kern="1200" dirty="0">
+                          <a:solidFill>
+                            <a:schemeClr val="dk1"/>
+                          </a:solidFill>
                           <a:latin typeface="Courier New" panose="02070309020205020404" pitchFamily="49" charset="0"/>
+                          <a:ea typeface="+mn-ea"/>
                           <a:cs typeface="Courier New" panose="02070309020205020404" pitchFamily="49" charset="0"/>
                         </a:rPr>
                         <a:t>8</a:t>
@@ -9097,8 +9093,8 @@
         </p:nvSpPr>
         <p:spPr>
           <a:xfrm>
-            <a:off x="13761055" y="3742470"/>
-            <a:ext cx="20053875" cy="1569660"/>
+            <a:off x="13761055" y="3975721"/>
+            <a:ext cx="22194167" cy="1815882"/>
           </a:xfrm>
           <a:prstGeom prst="rect">
             <a:avLst/>
@@ -9112,42 +9108,42 @@
           <a:lstStyle/>
           <a:p>
             <a:r>
-              <a:rPr lang="en-US" sz="2400" b="1" dirty="0">
+              <a:rPr lang="en-US" sz="2800" b="1" dirty="0">
                 <a:latin typeface="Courier New" panose="02070309020205020404" pitchFamily="49" charset="0"/>
                 <a:cs typeface="Courier New" panose="02070309020205020404" pitchFamily="49" charset="0"/>
               </a:rPr>
-              <a:t>Capability Container: One Time Programmable Bits</a:t>
-            </a:r>
-          </a:p>
-          <a:p>
-            <a:r>
-              <a:rPr lang="en-US" sz="2400" b="1" dirty="0">
+              <a:t>[CAPABILITY CONTAINER] - One Time Programmable Bits</a:t>
+            </a:r>
+          </a:p>
+          <a:p>
+            <a:r>
+              <a:rPr lang="en-US" sz="2800" b="1" dirty="0">
                 <a:latin typeface="Courier New" panose="02070309020205020404" pitchFamily="49" charset="0"/>
                 <a:cs typeface="Courier New" panose="02070309020205020404" pitchFamily="49" charset="0"/>
               </a:rPr>
-              <a:t>MEMORY LOCATION:      PAGE 03h</a:t>
-            </a:r>
-          </a:p>
-          <a:p>
-            <a:r>
-              <a:rPr lang="en-US" sz="2400" b="1" dirty="0">
+              <a:t>     [MEMORY LOCATION] - PAGE 03h</a:t>
+            </a:r>
+          </a:p>
+          <a:p>
+            <a:r>
+              <a:rPr lang="en-US" sz="2800" b="1" dirty="0">
                 <a:latin typeface="Courier New" panose="02070309020205020404" pitchFamily="49" charset="0"/>
                 <a:cs typeface="Courier New" panose="02070309020205020404" pitchFamily="49" charset="0"/>
               </a:rPr>
-              <a:t>DETAILS:              Writability set according to Static Lock Bytes. Stores control data for managing </a:t>
+              <a:t>             [DETAILS] - Writability defined by Static Lock Bytes. Stores control data for managing </a:t>
             </a:r>
             <a:br>
-              <a:rPr lang="en-US" sz="2400" b="1" dirty="0">
+              <a:rPr lang="en-US" sz="2800" b="1" dirty="0">
                 <a:latin typeface="Courier New" panose="02070309020205020404" pitchFamily="49" charset="0"/>
                 <a:cs typeface="Courier New" panose="02070309020205020404" pitchFamily="49" charset="0"/>
               </a:rPr>
             </a:br>
             <a:r>
-              <a:rPr lang="en-US" sz="2400" b="1" dirty="0">
+              <a:rPr lang="en-US" sz="2800" b="1" dirty="0">
                 <a:latin typeface="Courier New" panose="02070309020205020404" pitchFamily="49" charset="0"/>
                 <a:cs typeface="Courier New" panose="02070309020205020404" pitchFamily="49" charset="0"/>
               </a:rPr>
-              <a:t>                      NFC Forum defined data inside the tag. </a:t>
+              <a:t>                         NFC Forum defined data inside the tag. </a:t>
             </a:r>
           </a:p>
         </p:txBody>
@@ -9161,14 +9157,14 @@
           <p:nvPr>
             <p:extLst>
               <p:ext uri="{D42A27DB-BD31-4B8C-83A1-F6EECF244321}">
-                <p14:modId xmlns:p14="http://schemas.microsoft.com/office/powerpoint/2010/main" val="2469492775"/>
+                <p14:modId xmlns:p14="http://schemas.microsoft.com/office/powerpoint/2010/main" val="995301459"/>
               </p:ext>
             </p:extLst>
           </p:nvPr>
         </p:nvGraphicFramePr>
         <p:xfrm>
-          <a:off x="15298331" y="5380770"/>
-          <a:ext cx="18129199" cy="914400"/>
+          <a:off x="19122046" y="5881716"/>
+          <a:ext cx="16833176" cy="900084"/>
         </p:xfrm>
         <a:graphic>
           <a:graphicData uri="http://schemas.openxmlformats.org/drawingml/2006/table">
@@ -9178,28 +9174,28 @@
                 <a:tableStyleId>{5C22544A-7EE6-4342-B048-85BDC9FD1C3A}</a:tableStyleId>
               </a:tblPr>
               <a:tblGrid>
-                <a:gridCol w="3733732">
+                <a:gridCol w="3466814">
                   <a:extLst>
                     <a:ext uri="{9D8B030D-6E8A-4147-A177-3AD203B41FA5}">
                       <a16:colId xmlns:a16="http://schemas.microsoft.com/office/drawing/2014/main" val="3022783514"/>
                     </a:ext>
                   </a:extLst>
                 </a:gridCol>
-                <a:gridCol w="4798489">
+                <a:gridCol w="4455454">
                   <a:extLst>
                     <a:ext uri="{9D8B030D-6E8A-4147-A177-3AD203B41FA5}">
                       <a16:colId xmlns:a16="http://schemas.microsoft.com/office/drawing/2014/main" val="757080785"/>
                     </a:ext>
                   </a:extLst>
                 </a:gridCol>
-                <a:gridCol w="4798489">
+                <a:gridCol w="4455454">
                   <a:extLst>
                     <a:ext uri="{9D8B030D-6E8A-4147-A177-3AD203B41FA5}">
                       <a16:colId xmlns:a16="http://schemas.microsoft.com/office/drawing/2014/main" val="2276908230"/>
                     </a:ext>
                   </a:extLst>
                 </a:gridCol>
-                <a:gridCol w="4798489">
+                <a:gridCol w="4455454">
                   <a:extLst>
                     <a:ext uri="{9D8B030D-6E8A-4147-A177-3AD203B41FA5}">
                       <a16:colId xmlns:a16="http://schemas.microsoft.com/office/drawing/2014/main" val="645744466"/>
@@ -9207,7 +9203,7 @@
                   </a:extLst>
                 </a:gridCol>
               </a:tblGrid>
-              <a:tr h="442884">
+              <a:tr h="457200">
                 <a:tc>
                   <a:txBody>
                     <a:bodyPr/>
@@ -9215,7 +9211,7 @@
                     <a:p>
                       <a:pPr algn="ctr"/>
                       <a:r>
-                        <a:rPr lang="en-US" sz="2400" dirty="0">
+                        <a:rPr lang="en-US" sz="2000" dirty="0">
                           <a:solidFill>
                             <a:schemeClr val="bg1"/>
                           </a:solidFill>
@@ -9283,7 +9279,7 @@
                     <a:p>
                       <a:pPr algn="ctr"/>
                       <a:r>
-                        <a:rPr lang="en-US" sz="2400" dirty="0">
+                        <a:rPr lang="en-US" sz="2000" dirty="0">
                           <a:solidFill>
                             <a:schemeClr val="bg1"/>
                           </a:solidFill>
@@ -9351,7 +9347,7 @@
                     <a:p>
                       <a:pPr algn="ctr"/>
                       <a:r>
-                        <a:rPr lang="en-US" sz="2400" dirty="0">
+                        <a:rPr lang="en-US" sz="2000" dirty="0">
                           <a:solidFill>
                             <a:schemeClr val="bg1"/>
                           </a:solidFill>
@@ -9419,7 +9415,7 @@
                     <a:p>
                       <a:pPr algn="ctr"/>
                       <a:r>
-                        <a:rPr lang="en-US" sz="2400" dirty="0">
+                        <a:rPr lang="en-US" sz="2000" dirty="0">
                           <a:solidFill>
                             <a:schemeClr val="bg1"/>
                           </a:solidFill>
@@ -9494,7 +9490,7 @@
                     <a:p>
                       <a:pPr algn="ctr"/>
                       <a:r>
-                        <a:rPr lang="en-US" sz="2400" dirty="0">
+                        <a:rPr lang="en-US" sz="2000" dirty="0">
                           <a:latin typeface="Courier New" panose="02070309020205020404" pitchFamily="49" charset="0"/>
                           <a:cs typeface="Courier New" panose="02070309020205020404" pitchFamily="49" charset="0"/>
                         </a:rPr>
@@ -9559,7 +9555,7 @@
                     <a:p>
                       <a:pPr algn="ctr"/>
                       <a:r>
-                        <a:rPr lang="en-US" sz="2400" dirty="0">
+                        <a:rPr lang="en-US" sz="2000" dirty="0">
                           <a:latin typeface="Courier New" panose="02070309020205020404" pitchFamily="49" charset="0"/>
                           <a:cs typeface="Courier New" panose="02070309020205020404" pitchFamily="49" charset="0"/>
                         </a:rPr>
@@ -9624,7 +9620,7 @@
                     <a:p>
                       <a:pPr algn="ctr"/>
                       <a:r>
-                        <a:rPr lang="en-US" sz="2400" dirty="0">
+                        <a:rPr lang="en-US" sz="2000" dirty="0">
                           <a:latin typeface="Courier New" panose="02070309020205020404" pitchFamily="49" charset="0"/>
                           <a:cs typeface="Courier New" panose="02070309020205020404" pitchFamily="49" charset="0"/>
                         </a:rPr>
@@ -9689,7 +9685,7 @@
                     <a:p>
                       <a:pPr algn="ctr"/>
                       <a:r>
-                        <a:rPr lang="en-US" sz="2400" dirty="0">
+                        <a:rPr lang="en-US" sz="2000" dirty="0">
                           <a:latin typeface="Courier New" panose="02070309020205020404" pitchFamily="49" charset="0"/>
                           <a:cs typeface="Courier New" panose="02070309020205020404" pitchFamily="49" charset="0"/>
                         </a:rPr>
@@ -9765,20 +9761,20 @@
         </p:nvSpPr>
         <p:spPr>
           <a:xfrm>
-            <a:off x="7162800" y="21867238"/>
-            <a:ext cx="30638609" cy="6201443"/>
+            <a:off x="11806011" y="21867238"/>
+            <a:ext cx="25288213" cy="6201443"/>
           </a:xfrm>
           <a:prstGeom prst="roundRect">
             <a:avLst/>
           </a:prstGeom>
           <a:gradFill flip="none" rotWithShape="1">
             <a:gsLst>
-              <a:gs pos="0">
+              <a:gs pos="26000">
                 <a:srgbClr val="FFFF00">
                   <a:alpha val="60000"/>
                 </a:srgbClr>
               </a:gs>
-              <a:gs pos="46000">
+              <a:gs pos="100000">
                 <a:schemeClr val="bg2">
                   <a:alpha val="0"/>
                   <a:lumMod val="100000"/>
@@ -9818,6 +9814,465 @@
           </a:p>
         </p:txBody>
       </p:sp>
+      <p:sp>
+        <p:nvSpPr>
+          <p:cNvPr id="72" name="TextBox 71"/>
+          <p:cNvSpPr txBox="1"/>
+          <p:nvPr/>
+        </p:nvSpPr>
+        <p:spPr>
+          <a:xfrm>
+            <a:off x="25387812" y="7467600"/>
+            <a:ext cx="11706412" cy="1815882"/>
+          </a:xfrm>
+          <a:prstGeom prst="rect">
+            <a:avLst/>
+          </a:prstGeom>
+          <a:noFill/>
+        </p:spPr>
+        <p:txBody>
+          <a:bodyPr wrap="square" rtlCol="0">
+            <a:spAutoFit/>
+          </a:bodyPr>
+          <a:lstStyle/>
+          <a:p>
+            <a:r>
+              <a:rPr lang="en-US" sz="2800" b="1" dirty="0">
+                <a:latin typeface="Courier New" panose="02070309020205020404" pitchFamily="49" charset="0"/>
+                <a:cs typeface="Courier New" panose="02070309020205020404" pitchFamily="49" charset="0"/>
+              </a:rPr>
+              <a:t>[DYNAMIC LOCK BYTES] - Position Based Locking</a:t>
+            </a:r>
+          </a:p>
+          <a:p>
+            <a:r>
+              <a:rPr lang="en-US" sz="2800" b="1" dirty="0">
+                <a:latin typeface="Courier New" panose="02070309020205020404" pitchFamily="49" charset="0"/>
+                <a:cs typeface="Courier New" panose="02070309020205020404" pitchFamily="49" charset="0"/>
+              </a:rPr>
+              <a:t>   [MEMORY LOCATION] - DYNAMIC</a:t>
+            </a:r>
+          </a:p>
+          <a:p>
+            <a:r>
+              <a:rPr lang="en-US" sz="2800" b="1" dirty="0">
+                <a:latin typeface="Courier New" panose="02070309020205020404" pitchFamily="49" charset="0"/>
+                <a:cs typeface="Courier New" panose="02070309020205020404" pitchFamily="49" charset="0"/>
+              </a:rPr>
+              <a:t>           [DETAILS] - Used to lock discrete memory</a:t>
+            </a:r>
+            <a:br>
+              <a:rPr lang="en-US" sz="2800" b="1" dirty="0">
+                <a:latin typeface="Courier New" panose="02070309020205020404" pitchFamily="49" charset="0"/>
+                <a:cs typeface="Courier New" panose="02070309020205020404" pitchFamily="49" charset="0"/>
+              </a:rPr>
+            </a:br>
+            <a:r>
+              <a:rPr lang="en-US" sz="2800" b="1" dirty="0">
+                <a:latin typeface="Courier New" panose="02070309020205020404" pitchFamily="49" charset="0"/>
+                <a:cs typeface="Courier New" panose="02070309020205020404" pitchFamily="49" charset="0"/>
+              </a:rPr>
+              <a:t>                       blocks after PAGE 15h.</a:t>
+            </a:r>
+          </a:p>
+        </p:txBody>
+      </p:sp>
+      <p:pic>
+        <p:nvPicPr>
+          <p:cNvPr id="11" name="Picture 10"/>
+          <p:cNvPicPr>
+            <a:picLocks noChangeAspect="1"/>
+          </p:cNvPicPr>
+          <p:nvPr/>
+        </p:nvPicPr>
+        <p:blipFill>
+          <a:blip r:embed="rId10" cstate="print">
+            <a:extLst>
+              <a:ext uri="{28A0092B-C50C-407E-A947-70E740481C1C}">
+                <a14:useLocalDpi xmlns:a14="http://schemas.microsoft.com/office/drawing/2010/main" val="0"/>
+              </a:ext>
+            </a:extLst>
+          </a:blip>
+          <a:stretch>
+            <a:fillRect/>
+          </a:stretch>
+        </p:blipFill>
+        <p:spPr>
+          <a:xfrm>
+            <a:off x="38452385" y="23941537"/>
+            <a:ext cx="4883098" cy="1966463"/>
+          </a:xfrm>
+          <a:prstGeom prst="rect">
+            <a:avLst/>
+          </a:prstGeom>
+        </p:spPr>
+      </p:pic>
+      <p:pic>
+        <p:nvPicPr>
+          <p:cNvPr id="13" name="Picture 12"/>
+          <p:cNvPicPr>
+            <a:picLocks noChangeAspect="1"/>
+          </p:cNvPicPr>
+          <p:nvPr/>
+        </p:nvPicPr>
+        <p:blipFill>
+          <a:blip r:embed="rId11" cstate="print">
+            <a:extLst>
+              <a:ext uri="{28A0092B-C50C-407E-A947-70E740481C1C}">
+                <a14:useLocalDpi xmlns:a14="http://schemas.microsoft.com/office/drawing/2010/main" val="0"/>
+              </a:ext>
+            </a:extLst>
+          </a:blip>
+          <a:stretch>
+            <a:fillRect/>
+          </a:stretch>
+        </p:blipFill>
+        <p:spPr>
+          <a:xfrm>
+            <a:off x="38452385" y="21606081"/>
+            <a:ext cx="2409575" cy="2244519"/>
+          </a:xfrm>
+          <a:prstGeom prst="rect">
+            <a:avLst/>
+          </a:prstGeom>
+        </p:spPr>
+      </p:pic>
+      <p:pic>
+        <p:nvPicPr>
+          <p:cNvPr id="16" name="Picture 15"/>
+          <p:cNvPicPr>
+            <a:picLocks noChangeAspect="1"/>
+          </p:cNvPicPr>
+          <p:nvPr/>
+        </p:nvPicPr>
+        <p:blipFill>
+          <a:blip r:embed="rId12">
+            <a:extLst>
+              <a:ext uri="{28A0092B-C50C-407E-A947-70E740481C1C}">
+                <a14:useLocalDpi xmlns:a14="http://schemas.microsoft.com/office/drawing/2010/main" val="0"/>
+              </a:ext>
+            </a:extLst>
+          </a:blip>
+          <a:stretch>
+            <a:fillRect/>
+          </a:stretch>
+        </p:blipFill>
+        <p:spPr>
+          <a:xfrm>
+            <a:off x="21336000" y="25726702"/>
+            <a:ext cx="5572903" cy="2314898"/>
+          </a:xfrm>
+          <a:prstGeom prst="rect">
+            <a:avLst/>
+          </a:prstGeom>
+        </p:spPr>
+      </p:pic>
+      <p:pic>
+        <p:nvPicPr>
+          <p:cNvPr id="18" name="Picture 17"/>
+          <p:cNvPicPr>
+            <a:picLocks noChangeAspect="1"/>
+          </p:cNvPicPr>
+          <p:nvPr/>
+        </p:nvPicPr>
+        <p:blipFill>
+          <a:blip r:embed="rId13">
+            <a:extLst>
+              <a:ext uri="{28A0092B-C50C-407E-A947-70E740481C1C}">
+                <a14:useLocalDpi xmlns:a14="http://schemas.microsoft.com/office/drawing/2010/main" val="0"/>
+              </a:ext>
+            </a:extLst>
+          </a:blip>
+          <a:stretch>
+            <a:fillRect/>
+          </a:stretch>
+        </p:blipFill>
+        <p:spPr>
+          <a:xfrm>
+            <a:off x="21336000" y="22824196"/>
+            <a:ext cx="5572903" cy="2667372"/>
+          </a:xfrm>
+          <a:prstGeom prst="rect">
+            <a:avLst/>
+          </a:prstGeom>
+        </p:spPr>
+      </p:pic>
+      <p:pic>
+        <p:nvPicPr>
+          <p:cNvPr id="23" name="Picture 22"/>
+          <p:cNvPicPr>
+            <a:picLocks noChangeAspect="1"/>
+          </p:cNvPicPr>
+          <p:nvPr/>
+        </p:nvPicPr>
+        <p:blipFill>
+          <a:blip r:embed="rId14">
+            <a:extLst>
+              <a:ext uri="{28A0092B-C50C-407E-A947-70E740481C1C}">
+                <a14:useLocalDpi xmlns:a14="http://schemas.microsoft.com/office/drawing/2010/main" val="0"/>
+              </a:ext>
+            </a:extLst>
+          </a:blip>
+          <a:stretch>
+            <a:fillRect/>
+          </a:stretch>
+        </p:blipFill>
+        <p:spPr>
+          <a:xfrm>
+            <a:off x="12954000" y="22821171"/>
+            <a:ext cx="7735380" cy="5220429"/>
+          </a:xfrm>
+          <a:prstGeom prst="rect">
+            <a:avLst/>
+          </a:prstGeom>
+        </p:spPr>
+      </p:pic>
+      <p:pic>
+        <p:nvPicPr>
+          <p:cNvPr id="27" name="Picture 26"/>
+          <p:cNvPicPr>
+            <a:picLocks noChangeAspect="1"/>
+          </p:cNvPicPr>
+          <p:nvPr/>
+        </p:nvPicPr>
+        <p:blipFill>
+          <a:blip r:embed="rId15">
+            <a:extLst>
+              <a:ext uri="{28A0092B-C50C-407E-A947-70E740481C1C}">
+                <a14:useLocalDpi xmlns:a14="http://schemas.microsoft.com/office/drawing/2010/main" val="0"/>
+              </a:ext>
+            </a:extLst>
+          </a:blip>
+          <a:stretch>
+            <a:fillRect/>
+          </a:stretch>
+        </p:blipFill>
+        <p:spPr>
+          <a:xfrm>
+            <a:off x="27498390" y="24924768"/>
+            <a:ext cx="3400900" cy="1333686"/>
+          </a:xfrm>
+          <a:prstGeom prst="rect">
+            <a:avLst/>
+          </a:prstGeom>
+        </p:spPr>
+      </p:pic>
+      <p:pic>
+        <p:nvPicPr>
+          <p:cNvPr id="85" name="Picture 84"/>
+          <p:cNvPicPr>
+            <a:picLocks noChangeAspect="1"/>
+          </p:cNvPicPr>
+          <p:nvPr/>
+        </p:nvPicPr>
+        <p:blipFill>
+          <a:blip r:embed="rId16" cstate="print">
+            <a:extLst>
+              <a:ext uri="{28A0092B-C50C-407E-A947-70E740481C1C}">
+                <a14:useLocalDpi xmlns:a14="http://schemas.microsoft.com/office/drawing/2010/main" val="0"/>
+              </a:ext>
+            </a:extLst>
+          </a:blip>
+          <a:stretch>
+            <a:fillRect/>
+          </a:stretch>
+        </p:blipFill>
+        <p:spPr>
+          <a:xfrm>
+            <a:off x="40919400" y="21555583"/>
+            <a:ext cx="2295017" cy="2295017"/>
+          </a:xfrm>
+          <a:prstGeom prst="rect">
+            <a:avLst/>
+          </a:prstGeom>
+        </p:spPr>
+      </p:pic>
+      <p:pic>
+        <p:nvPicPr>
+          <p:cNvPr id="98" name="Picture 97"/>
+          <p:cNvPicPr>
+            <a:picLocks noChangeAspect="1"/>
+          </p:cNvPicPr>
+          <p:nvPr/>
+        </p:nvPicPr>
+        <p:blipFill>
+          <a:blip r:embed="rId5">
+            <a:extLst>
+              <a:ext uri="{28A0092B-C50C-407E-A947-70E740481C1C}">
+                <a14:useLocalDpi xmlns:a14="http://schemas.microsoft.com/office/drawing/2010/main" val="0"/>
+              </a:ext>
+            </a:extLst>
+          </a:blip>
+          <a:stretch>
+            <a:fillRect/>
+          </a:stretch>
+        </p:blipFill>
+        <p:spPr>
+          <a:xfrm>
+            <a:off x="31876099" y="23252386"/>
+            <a:ext cx="3942614" cy="4161932"/>
+          </a:xfrm>
+          <a:prstGeom prst="ellipse">
+            <a:avLst/>
+          </a:prstGeom>
+          <a:ln w="63500" cap="rnd">
+            <a:solidFill>
+              <a:srgbClr val="333333"/>
+            </a:solidFill>
+          </a:ln>
+          <a:effectLst/>
+          <a:scene3d>
+            <a:camera prst="orthographicFront"/>
+            <a:lightRig rig="contrasting" dir="t">
+              <a:rot lat="0" lon="0" rev="3000000"/>
+            </a:lightRig>
+          </a:scene3d>
+          <a:sp3d contourW="7620">
+            <a:bevelT w="95250" h="31750"/>
+            <a:contourClr>
+              <a:srgbClr val="333333"/>
+            </a:contourClr>
+          </a:sp3d>
+        </p:spPr>
+      </p:pic>
+      <p:pic>
+        <p:nvPicPr>
+          <p:cNvPr id="104" name="Picture 103"/>
+          <p:cNvPicPr>
+            <a:picLocks noChangeAspect="1"/>
+          </p:cNvPicPr>
+          <p:nvPr/>
+        </p:nvPicPr>
+        <p:blipFill>
+          <a:blip r:embed="rId17">
+            <a:extLst>
+              <a:ext uri="{BEBA8EAE-BF5A-486C-A8C5-ECC9F3942E4B}">
+                <a14:imgProps xmlns:a14="http://schemas.microsoft.com/office/drawing/2010/main">
+                  <a14:imgLayer r:embed="rId18">
+                    <a14:imgEffect>
+                      <a14:brightnessContrast bright="5000"/>
+                    </a14:imgEffect>
+                  </a14:imgLayer>
+                </a14:imgProps>
+              </a:ext>
+              <a:ext uri="{28A0092B-C50C-407E-A947-70E740481C1C}">
+                <a14:useLocalDpi xmlns:a14="http://schemas.microsoft.com/office/drawing/2010/main" val="0"/>
+              </a:ext>
+            </a:extLst>
+          </a:blip>
+          <a:stretch>
+            <a:fillRect/>
+          </a:stretch>
+        </p:blipFill>
+        <p:spPr>
+          <a:xfrm>
+            <a:off x="32862247" y="24348193"/>
+            <a:ext cx="1970318" cy="1970318"/>
+          </a:xfrm>
+          <a:prstGeom prst="rect">
+            <a:avLst/>
+          </a:prstGeom>
+        </p:spPr>
+      </p:pic>
+      <p:sp>
+        <p:nvSpPr>
+          <p:cNvPr id="93" name="TextBox 92"/>
+          <p:cNvSpPr txBox="1"/>
+          <p:nvPr/>
+        </p:nvSpPr>
+        <p:spPr>
+          <a:xfrm rot="19792360">
+            <a:off x="30939182" y="24402328"/>
+            <a:ext cx="5761012" cy="1862048"/>
+          </a:xfrm>
+          <a:prstGeom prst="rect">
+            <a:avLst/>
+          </a:prstGeom>
+          <a:noFill/>
+          <a:effectLst>
+            <a:glow rad="127000">
+              <a:schemeClr val="accent1"/>
+            </a:glow>
+          </a:effectLst>
+        </p:spPr>
+        <p:txBody>
+          <a:bodyPr wrap="square" rtlCol="0">
+            <a:spAutoFit/>
+            <a:scene3d>
+              <a:camera prst="orthographicFront"/>
+              <a:lightRig rig="harsh" dir="t"/>
+            </a:scene3d>
+            <a:sp3d extrusionH="57150" prstMaterial="matte">
+              <a:bevelT w="63500" h="12700" prst="angle"/>
+              <a:contourClr>
+                <a:schemeClr val="bg1">
+                  <a:lumMod val="65000"/>
+                </a:schemeClr>
+              </a:contourClr>
+            </a:sp3d>
+          </a:bodyPr>
+          <a:lstStyle/>
+          <a:p>
+            <a:pPr algn="r"/>
+            <a:r>
+              <a:rPr lang="en-US" sz="11500" b="1" dirty="0">
+                <a:ln w="50800" cap="sq">
+                  <a:solidFill>
+                    <a:schemeClr val="tx1">
+                      <a:alpha val="80000"/>
+                    </a:schemeClr>
+                  </a:solidFill>
+                </a:ln>
+                <a:solidFill>
+                  <a:srgbClr val="FFFF00">
+                    <a:alpha val="80000"/>
+                  </a:srgbClr>
+                </a:solidFill>
+                <a:effectLst>
+                  <a:outerShdw blurRad="50800" dist="88900" dir="2700000" algn="tl" rotWithShape="0">
+                    <a:prstClr val="black">
+                      <a:alpha val="40000"/>
+                    </a:prstClr>
+                  </a:outerShdw>
+                </a:effectLst>
+                <a:latin typeface="Stencil" panose="040409050D0802020404" pitchFamily="82" charset="0"/>
+                <a:cs typeface="Courier New" panose="02070309020205020404" pitchFamily="49" charset="0"/>
+              </a:rPr>
+              <a:t>LOCKED</a:t>
+            </a:r>
+          </a:p>
+        </p:txBody>
+      </p:sp>
+      <p:pic>
+        <p:nvPicPr>
+          <p:cNvPr id="105" name="Picture 104"/>
+          <p:cNvPicPr>
+            <a:picLocks noChangeAspect="1"/>
+          </p:cNvPicPr>
+          <p:nvPr/>
+        </p:nvPicPr>
+        <p:blipFill>
+          <a:blip r:embed="rId9" cstate="print">
+            <a:extLst>
+              <a:ext uri="{28A0092B-C50C-407E-A947-70E740481C1C}">
+                <a14:useLocalDpi xmlns:a14="http://schemas.microsoft.com/office/drawing/2010/main" val="0"/>
+              </a:ext>
+            </a:extLst>
+          </a:blip>
+          <a:stretch>
+            <a:fillRect/>
+          </a:stretch>
+        </p:blipFill>
+        <p:spPr>
+          <a:xfrm>
+            <a:off x="33971960" y="14741127"/>
+            <a:ext cx="1546726" cy="1546726"/>
+          </a:xfrm>
+          <a:prstGeom prst="rect">
+            <a:avLst/>
+          </a:prstGeom>
+        </p:spPr>
+      </p:pic>
     </p:spTree>
     <p:extLst>
       <p:ext uri="{BB962C8B-B14F-4D97-AF65-F5344CB8AC3E}">
@@ -9832,7 +10287,7 @@
 </file>
 
 <file path=ppt/slides/slide2.xml><?xml version="1.0" encoding="utf-8"?>
-<p:sld xmlns:a="http://schemas.openxmlformats.org/drawingml/2006/main" xmlns:r="http://schemas.openxmlformats.org/officeDocument/2006/relationships" xmlns:p="http://schemas.openxmlformats.org/presentationml/2006/main">
+<p:sld xmlns:a="http://schemas.openxmlformats.org/drawingml/2006/main" xmlns:r="http://schemas.openxmlformats.org/officeDocument/2006/relationships" xmlns:p="http://schemas.openxmlformats.org/presentationml/2006/main" show="0">
   <p:cSld>
     <p:bg>
       <p:bgPr>

</xml_diff>